<commit_message>
Work done by Fri Jul  1 14:10:05 PDT 2022
</commit_message>
<xml_diff>
--- a/docs/presentation-orig.pptx
+++ b/docs/presentation-orig.pptx
@@ -4215,7 +4215,7 @@
               <a:t>Whether you use Quarto from </a:t>
             </a:r>
             <a:r>
-              <a:rPr>
+              <a:rPr sz="1200">
                 <a:latin typeface="Consolas"/>
               </a:rPr>
               <a:t>.qmd</a:t>
@@ -4225,7 +4225,7 @@
               <a:t>, </a:t>
             </a:r>
             <a:r>
-              <a:rPr>
+              <a:rPr sz="1200">
                 <a:latin typeface="Consolas"/>
               </a:rPr>
               <a:t>.ipynb</a:t>
@@ -4235,7 +4235,7 @@
               <a:t>, or </a:t>
             </a:r>
             <a:r>
-              <a:rPr>
+              <a:rPr sz="1200">
                 <a:latin typeface="Consolas"/>
               </a:rPr>
               <a:t>.Rmd</a:t>
@@ -4254,7 +4254,7 @@
               <a:t>The YAML configuration determines what’s the output format of your document. A few popular output options are </a:t>
             </a:r>
             <a:r>
-              <a:rPr>
+              <a:rPr sz="1200">
                 <a:latin typeface="Consolas"/>
               </a:rPr>
               <a:t>html</a:t>
@@ -4264,7 +4264,7 @@
               <a:t>, </a:t>
             </a:r>
             <a:r>
-              <a:rPr>
+              <a:rPr sz="1200">
                 <a:latin typeface="Consolas"/>
               </a:rPr>
               <a:t>pptx</a:t>
@@ -4274,7 +4274,7 @@
               <a:t>, </a:t>
             </a:r>
             <a:r>
-              <a:rPr>
+              <a:rPr sz="1200">
                 <a:latin typeface="Consolas"/>
               </a:rPr>
               <a:t>docx</a:t>
@@ -4284,7 +4284,7 @@
               <a:t>, and </a:t>
             </a:r>
             <a:r>
-              <a:rPr>
+              <a:rPr sz="1200">
                 <a:latin typeface="Consolas"/>
               </a:rPr>
               <a:t>pdf</a:t>
@@ -4333,7 +4333,7 @@
               <a:buNone/>
             </a:pPr>
             <a:r>
-              <a:rPr>
+              <a:rPr sz="1200">
                 <a:solidFill>
                   <a:srgbClr val="AD0000"/>
                 </a:solidFill>
@@ -4343,7 +4343,7 @@
             </a:r>
             <a:br/>
             <a:r>
-              <a:rPr>
+              <a:rPr sz="1200">
                 <a:solidFill>
                   <a:srgbClr val="4758AB"/>
                 </a:solidFill>
@@ -4352,7 +4352,7 @@
               <a:t>title</a:t>
             </a:r>
             <a:r>
-              <a:rPr>
+              <a:rPr sz="1200">
                 <a:solidFill>
                   <a:srgbClr val="003B4F"/>
                 </a:solidFill>
@@ -4361,7 +4361,7 @@
               <a:t>:</a:t>
             </a:r>
             <a:r>
-              <a:rPr>
+              <a:rPr sz="1200">
                 <a:solidFill>
                   <a:srgbClr val="657422"/>
                 </a:solidFill>
@@ -4370,7 +4370,7 @@
               <a:t> </a:t>
             </a:r>
             <a:r>
-              <a:rPr>
+              <a:rPr sz="1200">
                 <a:solidFill>
                   <a:srgbClr val="20794D"/>
                 </a:solidFill>
@@ -4380,7 +4380,7 @@
             </a:r>
             <a:br/>
             <a:r>
-              <a:rPr>
+              <a:rPr sz="1200">
                 <a:solidFill>
                   <a:srgbClr val="4758AB"/>
                 </a:solidFill>
@@ -4389,7 +4389,7 @@
               <a:t>format</a:t>
             </a:r>
             <a:r>
-              <a:rPr>
+              <a:rPr sz="1200">
                 <a:solidFill>
                   <a:srgbClr val="003B4F"/>
                 </a:solidFill>
@@ -4398,7 +4398,7 @@
               <a:t>:</a:t>
             </a:r>
             <a:r>
-              <a:rPr>
+              <a:rPr sz="1200">
                 <a:solidFill>
                   <a:srgbClr val="657422"/>
                 </a:solidFill>
@@ -4408,7 +4408,7 @@
             </a:r>
             <a:br/>
             <a:r>
-              <a:rPr>
+              <a:rPr sz="1200">
                 <a:solidFill>
                   <a:srgbClr val="657422"/>
                 </a:solidFill>
@@ -4417,7 +4417,7 @@
               <a:t>    </a:t>
             </a:r>
             <a:r>
-              <a:rPr>
+              <a:rPr sz="1200">
                 <a:solidFill>
                   <a:srgbClr val="4758AB"/>
                 </a:solidFill>
@@ -4426,7 +4426,7 @@
               <a:t>pptx</a:t>
             </a:r>
             <a:r>
-              <a:rPr>
+              <a:rPr sz="1200">
                 <a:solidFill>
                   <a:srgbClr val="003B4F"/>
                 </a:solidFill>
@@ -4436,7 +4436,7 @@
             </a:r>
             <a:br/>
             <a:r>
-              <a:rPr>
+              <a:rPr sz="1200">
                 <a:solidFill>
                   <a:srgbClr val="657422"/>
                 </a:solidFill>
@@ -4445,7 +4445,7 @@
               <a:t>        </a:t>
             </a:r>
             <a:r>
-              <a:rPr>
+              <a:rPr sz="1200">
                 <a:solidFill>
                   <a:srgbClr val="4758AB"/>
                 </a:solidFill>
@@ -4454,7 +4454,7 @@
               <a:t>reference-doc</a:t>
             </a:r>
             <a:r>
-              <a:rPr>
+              <a:rPr sz="1200">
                 <a:solidFill>
                   <a:srgbClr val="003B4F"/>
                 </a:solidFill>
@@ -4463,7 +4463,7 @@
               <a:t>:</a:t>
             </a:r>
             <a:r>
-              <a:rPr>
+              <a:rPr sz="1200">
                 <a:solidFill>
                   <a:srgbClr val="657422"/>
                 </a:solidFill>
@@ -4473,7 +4473,7 @@
             </a:r>
             <a:br/>
             <a:r>
-              <a:rPr>
+              <a:rPr sz="1200">
                 <a:solidFill>
                   <a:srgbClr val="657422"/>
                 </a:solidFill>
@@ -4482,7 +4482,7 @@
               <a:t>    </a:t>
             </a:r>
             <a:r>
-              <a:rPr>
+              <a:rPr sz="1200">
                 <a:solidFill>
                   <a:srgbClr val="4758AB"/>
                 </a:solidFill>
@@ -4491,7 +4491,7 @@
               <a:t>revealjs</a:t>
             </a:r>
             <a:r>
-              <a:rPr>
+              <a:rPr sz="1200">
                 <a:solidFill>
                   <a:srgbClr val="003B4F"/>
                 </a:solidFill>
@@ -4501,7 +4501,7 @@
             </a:r>
             <a:br/>
             <a:r>
-              <a:rPr>
+              <a:rPr sz="1200">
                 <a:solidFill>
                   <a:srgbClr val="657422"/>
                 </a:solidFill>
@@ -4510,7 +4510,7 @@
               <a:t>        </a:t>
             </a:r>
             <a:r>
-              <a:rPr>
+              <a:rPr sz="1200">
                 <a:solidFill>
                   <a:srgbClr val="4758AB"/>
                 </a:solidFill>
@@ -4519,7 +4519,7 @@
               <a:t>incremental</a:t>
             </a:r>
             <a:r>
-              <a:rPr>
+              <a:rPr sz="1200">
                 <a:solidFill>
                   <a:srgbClr val="003B4F"/>
                 </a:solidFill>
@@ -4528,7 +4528,7 @@
               <a:t>:</a:t>
             </a:r>
             <a:r>
-              <a:rPr>
+              <a:rPr sz="1200">
                 <a:solidFill>
                   <a:srgbClr val="657422"/>
                 </a:solidFill>
@@ -4537,7 +4537,7 @@
               <a:t> </a:t>
             </a:r>
             <a:r>
-              <a:rPr>
+              <a:rPr sz="1200">
                 <a:solidFill>
                   <a:srgbClr val="20794D"/>
                 </a:solidFill>
@@ -4547,7 +4547,7 @@
             </a:r>
             <a:br/>
             <a:r>
-              <a:rPr>
+              <a:rPr sz="1200">
                 <a:solidFill>
                   <a:srgbClr val="657422"/>
                 </a:solidFill>
@@ -4556,7 +4556,7 @@
               <a:t>        </a:t>
             </a:r>
             <a:r>
-              <a:rPr>
+              <a:rPr sz="1200">
                 <a:solidFill>
                   <a:srgbClr val="4758AB"/>
                 </a:solidFill>
@@ -4565,7 +4565,7 @@
               <a:t>theme</a:t>
             </a:r>
             <a:r>
-              <a:rPr>
+              <a:rPr sz="1200">
                 <a:solidFill>
                   <a:srgbClr val="003B4F"/>
                 </a:solidFill>
@@ -4574,7 +4574,7 @@
               <a:t>:</a:t>
             </a:r>
             <a:r>
-              <a:rPr>
+              <a:rPr sz="1200">
                 <a:solidFill>
                   <a:srgbClr val="657422"/>
                 </a:solidFill>
@@ -4585,7 +4585,7 @@
             <a:br/>
             <a:br/>
             <a:r>
-              <a:rPr>
+              <a:rPr sz="1200">
                 <a:solidFill>
                   <a:srgbClr val="4758AB"/>
                 </a:solidFill>
@@ -4594,7 +4594,7 @@
               <a:t>author</a:t>
             </a:r>
             <a:r>
-              <a:rPr>
+              <a:rPr sz="1200">
                 <a:solidFill>
                   <a:srgbClr val="003B4F"/>
                 </a:solidFill>
@@ -4603,7 +4603,7 @@
               <a:t>:</a:t>
             </a:r>
             <a:r>
-              <a:rPr>
+              <a:rPr sz="1200">
                 <a:solidFill>
                   <a:srgbClr val="657422"/>
                 </a:solidFill>
@@ -4613,7 +4613,7 @@
             </a:r>
             <a:br/>
             <a:r>
-              <a:rPr>
+              <a:rPr sz="1200">
                 <a:solidFill>
                   <a:srgbClr val="4758AB"/>
                 </a:solidFill>
@@ -4622,7 +4622,7 @@
               <a:t>date</a:t>
             </a:r>
             <a:r>
-              <a:rPr>
+              <a:rPr sz="1200">
                 <a:solidFill>
                   <a:srgbClr val="003B4F"/>
                 </a:solidFill>
@@ -4631,7 +4631,7 @@
               <a:t>:</a:t>
             </a:r>
             <a:r>
-              <a:rPr>
+              <a:rPr sz="1200">
                 <a:solidFill>
                   <a:srgbClr val="657422"/>
                 </a:solidFill>
@@ -4641,7 +4641,7 @@
             </a:r>
             <a:br/>
             <a:r>
-              <a:rPr>
+              <a:rPr sz="1200">
                 <a:solidFill>
                   <a:srgbClr val="AD0000"/>
                 </a:solidFill>
@@ -4718,7 +4718,7 @@
               <a:buNone/>
             </a:pPr>
             <a:r>
-              <a:rPr>
+              <a:rPr sz="1200">
                 <a:solidFill>
                   <a:srgbClr val="4758AB"/>
                 </a:solidFill>
@@ -4729,7 +4729,7 @@
             <a:br/>
             <a:br/>
             <a:r>
-              <a:rPr>
+              <a:rPr sz="1200">
                 <a:solidFill>
                   <a:srgbClr val="003B4F"/>
                 </a:solidFill>
@@ -4738,7 +4738,7 @@
               <a:t>Most writing in Quarto is done in </a:t>
             </a:r>
             <a:r>
-              <a:rPr>
+              <a:rPr sz="1200">
                 <a:solidFill>
                   <a:srgbClr val="5E5E5E"/>
                 </a:solidFill>
@@ -4747,7 +4747,7 @@
               <a:t>[</a:t>
             </a:r>
             <a:r>
-              <a:rPr>
+              <a:rPr sz="1200">
                 <a:solidFill>
                   <a:srgbClr val="003B4F"/>
                 </a:solidFill>
@@ -4756,7 +4756,7 @@
               <a:t>Markdown</a:t>
             </a:r>
             <a:r>
-              <a:rPr>
+              <a:rPr sz="1200">
                 <a:solidFill>
                   <a:srgbClr val="5E5E5E"/>
                 </a:solidFill>
@@ -4765,7 +4765,7 @@
               <a:t>]</a:t>
             </a:r>
             <a:r>
-              <a:rPr>
+              <a:rPr sz="1200">
                 <a:solidFill>
                   <a:srgbClr val="003B4F"/>
                 </a:solidFill>
@@ -4776,7 +4776,7 @@
             <a:br/>
             <a:br/>
             <a:r>
-              <a:rPr>
+              <a:rPr sz="1200">
                 <a:solidFill>
                   <a:srgbClr val="003B4F"/>
                 </a:solidFill>
@@ -4786,7 +4786,7 @@
             </a:r>
             <a:br/>
             <a:r>
-              <a:rPr>
+              <a:rPr sz="1200">
                 <a:solidFill>
                   <a:srgbClr val="003B4F"/>
                 </a:solidFill>
@@ -4797,7 +4797,7 @@
             <a:br/>
             <a:br/>
             <a:r>
-              <a:rPr>
+              <a:rPr sz="1200">
                 <a:solidFill>
                   <a:srgbClr val="003B4F"/>
                 </a:solidFill>
@@ -4807,7 +4807,7 @@
             </a:r>
             <a:br/>
             <a:r>
-              <a:rPr>
+              <a:rPr sz="1200">
                 <a:solidFill>
                   <a:srgbClr val="003B4F"/>
                 </a:solidFill>
@@ -4816,7 +4816,7 @@
               <a:t>diagrams with </a:t>
             </a:r>
             <a:r>
-              <a:rPr>
+              <a:rPr sz="1200">
                 <a:solidFill>
                   <a:srgbClr val="5E5E5E"/>
                 </a:solidFill>
@@ -4825,7 +4825,7 @@
               <a:t>`mermaid`</a:t>
             </a:r>
             <a:r>
-              <a:rPr>
+              <a:rPr sz="1200">
                 <a:solidFill>
                   <a:srgbClr val="003B4F"/>
                 </a:solidFill>
@@ -4834,7 +4834,7 @@
               <a:t> and </a:t>
             </a:r>
             <a:r>
-              <a:rPr>
+              <a:rPr sz="1200">
                 <a:solidFill>
                   <a:srgbClr val="5E5E5E"/>
                 </a:solidFill>
@@ -4843,7 +4843,7 @@
               <a:t>`GraphViz`</a:t>
             </a:r>
             <a:r>
-              <a:rPr>
+              <a:rPr sz="1200">
                 <a:solidFill>
                   <a:srgbClr val="003B4F"/>
                 </a:solidFill>
@@ -4853,7 +4853,7 @@
             </a:r>
             <a:br/>
             <a:r>
-              <a:rPr>
+              <a:rPr sz="1200">
                 <a:solidFill>
                   <a:srgbClr val="003B4F"/>
                 </a:solidFill>
@@ -4864,7 +4864,7 @@
             <a:br/>
             <a:br/>
             <a:r>
-              <a:rPr>
+              <a:rPr sz="1200">
                 <a:solidFill>
                   <a:srgbClr val="003B4F"/>
                 </a:solidFill>
@@ -4874,7 +4874,7 @@
             </a:r>
             <a:br/>
             <a:r>
-              <a:rPr>
+              <a:rPr sz="1200">
                 <a:solidFill>
                   <a:srgbClr val="003B4F"/>
                 </a:solidFill>
@@ -4884,7 +4884,7 @@
             </a:r>
             <a:br/>
             <a:r>
-              <a:rPr>
+              <a:rPr sz="1200">
                 <a:solidFill>
                   <a:srgbClr val="003B4F"/>
                 </a:solidFill>
@@ -5098,7 +5098,7 @@
             </a:pPr>
             <a:br/>
             <a:r>
-              <a:rPr>
+              <a:rPr sz="1200">
                 <a:solidFill>
                   <a:srgbClr val="00769E"/>
                 </a:solidFill>
@@ -5107,7 +5107,7 @@
               <a:t>import</a:t>
             </a:r>
             <a:r>
-              <a:rPr>
+              <a:rPr sz="1200">
                 <a:solidFill>
                   <a:srgbClr val="003B4F"/>
                 </a:solidFill>
@@ -5116,7 +5116,7 @@
               <a:t> numpy </a:t>
             </a:r>
             <a:r>
-              <a:rPr>
+              <a:rPr sz="1200">
                 <a:solidFill>
                   <a:srgbClr val="00769E"/>
                 </a:solidFill>
@@ -5125,7 +5125,7 @@
               <a:t>as</a:t>
             </a:r>
             <a:r>
-              <a:rPr>
+              <a:rPr sz="1200">
                 <a:solidFill>
                   <a:srgbClr val="003B4F"/>
                 </a:solidFill>
@@ -5135,7 +5135,7 @@
             </a:r>
             <a:br/>
             <a:r>
-              <a:rPr>
+              <a:rPr sz="1200">
                 <a:solidFill>
                   <a:srgbClr val="00769E"/>
                 </a:solidFill>
@@ -5144,7 +5144,7 @@
               <a:t>import</a:t>
             </a:r>
             <a:r>
-              <a:rPr>
+              <a:rPr sz="1200">
                 <a:solidFill>
                   <a:srgbClr val="003B4F"/>
                 </a:solidFill>
@@ -5153,7 +5153,7 @@
               <a:t> matplotlib.pyplot </a:t>
             </a:r>
             <a:r>
-              <a:rPr>
+              <a:rPr sz="1200">
                 <a:solidFill>
                   <a:srgbClr val="00769E"/>
                 </a:solidFill>
@@ -5162,7 +5162,7 @@
               <a:t>as</a:t>
             </a:r>
             <a:r>
-              <a:rPr>
+              <a:rPr sz="1200">
                 <a:solidFill>
                   <a:srgbClr val="003B4F"/>
                 </a:solidFill>
@@ -5173,7 +5173,7 @@
             <a:br/>
             <a:br/>
             <a:r>
-              <a:rPr>
+              <a:rPr sz="1200">
                 <a:solidFill>
                   <a:srgbClr val="003B4F"/>
                 </a:solidFill>
@@ -5182,7 +5182,7 @@
               <a:t>r </a:t>
             </a:r>
             <a:r>
-              <a:rPr>
+              <a:rPr sz="1200">
                 <a:solidFill>
                   <a:srgbClr val="5E5E5E"/>
                 </a:solidFill>
@@ -5191,7 +5191,7 @@
               <a:t>=</a:t>
             </a:r>
             <a:r>
-              <a:rPr>
+              <a:rPr sz="1200">
                 <a:solidFill>
                   <a:srgbClr val="003B4F"/>
                 </a:solidFill>
@@ -5200,7 +5200,7 @@
               <a:t> np.arange(</a:t>
             </a:r>
             <a:r>
-              <a:rPr>
+              <a:rPr sz="1200">
                 <a:solidFill>
                   <a:srgbClr val="AD0000"/>
                 </a:solidFill>
@@ -5209,7 +5209,7 @@
               <a:t>0</a:t>
             </a:r>
             <a:r>
-              <a:rPr>
+              <a:rPr sz="1200">
                 <a:solidFill>
                   <a:srgbClr val="003B4F"/>
                 </a:solidFill>
@@ -5218,7 +5218,7 @@
               <a:t>, </a:t>
             </a:r>
             <a:r>
-              <a:rPr>
+              <a:rPr sz="1200">
                 <a:solidFill>
                   <a:srgbClr val="AD0000"/>
                 </a:solidFill>
@@ -5227,7 +5227,7 @@
               <a:t>2</a:t>
             </a:r>
             <a:r>
-              <a:rPr>
+              <a:rPr sz="1200">
                 <a:solidFill>
                   <a:srgbClr val="003B4F"/>
                 </a:solidFill>
@@ -5236,7 +5236,7 @@
               <a:t>, </a:t>
             </a:r>
             <a:r>
-              <a:rPr>
+              <a:rPr sz="1200">
                 <a:solidFill>
                   <a:srgbClr val="AD0000"/>
                 </a:solidFill>
@@ -5245,7 +5245,7 @@
               <a:t>0.01</a:t>
             </a:r>
             <a:r>
-              <a:rPr>
+              <a:rPr sz="1200">
                 <a:solidFill>
                   <a:srgbClr val="003B4F"/>
                 </a:solidFill>
@@ -5255,7 +5255,7 @@
             </a:r>
             <a:br/>
             <a:r>
-              <a:rPr>
+              <a:rPr sz="1200">
                 <a:solidFill>
                   <a:srgbClr val="003B4F"/>
                 </a:solidFill>
@@ -5264,7 +5264,7 @@
               <a:t>theta </a:t>
             </a:r>
             <a:r>
-              <a:rPr>
+              <a:rPr sz="1200">
                 <a:solidFill>
                   <a:srgbClr val="5E5E5E"/>
                 </a:solidFill>
@@ -5273,7 +5273,7 @@
               <a:t>=</a:t>
             </a:r>
             <a:r>
-              <a:rPr>
+              <a:rPr sz="1200">
                 <a:solidFill>
                   <a:srgbClr val="003B4F"/>
                 </a:solidFill>
@@ -5282,7 +5282,7 @@
               <a:t> </a:t>
             </a:r>
             <a:r>
-              <a:rPr>
+              <a:rPr sz="1200">
                 <a:solidFill>
                   <a:srgbClr val="AD0000"/>
                 </a:solidFill>
@@ -5291,7 +5291,7 @@
               <a:t>2</a:t>
             </a:r>
             <a:r>
-              <a:rPr>
+              <a:rPr sz="1200">
                 <a:solidFill>
                   <a:srgbClr val="003B4F"/>
                 </a:solidFill>
@@ -5300,7 +5300,7 @@
               <a:t> </a:t>
             </a:r>
             <a:r>
-              <a:rPr>
+              <a:rPr sz="1200">
                 <a:solidFill>
                   <a:srgbClr val="5E5E5E"/>
                 </a:solidFill>
@@ -5309,7 +5309,7 @@
               <a:t>*</a:t>
             </a:r>
             <a:r>
-              <a:rPr>
+              <a:rPr sz="1200">
                 <a:solidFill>
                   <a:srgbClr val="003B4F"/>
                 </a:solidFill>
@@ -5318,7 +5318,7 @@
               <a:t> np.pi </a:t>
             </a:r>
             <a:r>
-              <a:rPr>
+              <a:rPr sz="1200">
                 <a:solidFill>
                   <a:srgbClr val="5E5E5E"/>
                 </a:solidFill>
@@ -5327,7 +5327,7 @@
               <a:t>*</a:t>
             </a:r>
             <a:r>
-              <a:rPr>
+              <a:rPr sz="1200">
                 <a:solidFill>
                   <a:srgbClr val="003B4F"/>
                 </a:solidFill>
@@ -5337,7 +5337,7 @@
             </a:r>
             <a:br/>
             <a:r>
-              <a:rPr>
+              <a:rPr sz="1200">
                 <a:solidFill>
                   <a:srgbClr val="003B4F"/>
                 </a:solidFill>
@@ -5346,7 +5346,7 @@
               <a:t>fig, ax </a:t>
             </a:r>
             <a:r>
-              <a:rPr>
+              <a:rPr sz="1200">
                 <a:solidFill>
                   <a:srgbClr val="5E5E5E"/>
                 </a:solidFill>
@@ -5355,7 +5355,7 @@
               <a:t>=</a:t>
             </a:r>
             <a:r>
-              <a:rPr>
+              <a:rPr sz="1200">
                 <a:solidFill>
                   <a:srgbClr val="003B4F"/>
                 </a:solidFill>
@@ -5364,7 +5364,7 @@
               <a:t> plt.subplots(subplot_kw</a:t>
             </a:r>
             <a:r>
-              <a:rPr>
+              <a:rPr sz="1200">
                 <a:solidFill>
                   <a:srgbClr val="5E5E5E"/>
                 </a:solidFill>
@@ -5374,7 +5374,7 @@
             </a:r>
             <a:br/>
             <a:r>
-              <a:rPr>
+              <a:rPr sz="1200">
                 <a:solidFill>
                   <a:srgbClr val="003B4F"/>
                 </a:solidFill>
@@ -5383,7 +5383,7 @@
               <a:t>                {</a:t>
             </a:r>
             <a:r>
-              <a:rPr>
+              <a:rPr sz="1200">
                 <a:solidFill>
                   <a:srgbClr val="20794D"/>
                 </a:solidFill>
@@ -5392,7 +5392,7 @@
               <a:t>'projection'</a:t>
             </a:r>
             <a:r>
-              <a:rPr>
+              <a:rPr sz="1200">
                 <a:solidFill>
                   <a:srgbClr val="003B4F"/>
                 </a:solidFill>
@@ -5401,7 +5401,7 @@
               <a:t>: </a:t>
             </a:r>
             <a:r>
-              <a:rPr>
+              <a:rPr sz="1200">
                 <a:solidFill>
                   <a:srgbClr val="20794D"/>
                 </a:solidFill>
@@ -5410,7 +5410,7 @@
               <a:t>'polar'</a:t>
             </a:r>
             <a:r>
-              <a:rPr>
+              <a:rPr sz="1200">
                 <a:solidFill>
                   <a:srgbClr val="003B4F"/>
                 </a:solidFill>
@@ -5420,7 +5420,7 @@
             </a:r>
             <a:br/>
             <a:r>
-              <a:rPr>
+              <a:rPr sz="1200">
                 <a:solidFill>
                   <a:srgbClr val="003B4F"/>
                 </a:solidFill>
@@ -5430,7 +5430,7 @@
             </a:r>
             <a:br/>
             <a:r>
-              <a:rPr>
+              <a:rPr sz="1200">
                 <a:solidFill>
                   <a:srgbClr val="003B4F"/>
                 </a:solidFill>
@@ -5439,7 +5439,7 @@
               <a:t>ax.set_rticks([</a:t>
             </a:r>
             <a:r>
-              <a:rPr>
+              <a:rPr sz="1200">
                 <a:solidFill>
                   <a:srgbClr val="AD0000"/>
                 </a:solidFill>
@@ -5448,7 +5448,7 @@
               <a:t>0.5</a:t>
             </a:r>
             <a:r>
-              <a:rPr>
+              <a:rPr sz="1200">
                 <a:solidFill>
                   <a:srgbClr val="003B4F"/>
                 </a:solidFill>
@@ -5457,7 +5457,7 @@
               <a:t>, </a:t>
             </a:r>
             <a:r>
-              <a:rPr>
+              <a:rPr sz="1200">
                 <a:solidFill>
                   <a:srgbClr val="AD0000"/>
                 </a:solidFill>
@@ -5466,7 +5466,7 @@
               <a:t>1</a:t>
             </a:r>
             <a:r>
-              <a:rPr>
+              <a:rPr sz="1200">
                 <a:solidFill>
                   <a:srgbClr val="003B4F"/>
                 </a:solidFill>
@@ -5475,7 +5475,7 @@
               <a:t>, </a:t>
             </a:r>
             <a:r>
-              <a:rPr>
+              <a:rPr sz="1200">
                 <a:solidFill>
                   <a:srgbClr val="AD0000"/>
                 </a:solidFill>
@@ -5484,7 +5484,7 @@
               <a:t>1.5</a:t>
             </a:r>
             <a:r>
-              <a:rPr>
+              <a:rPr sz="1200">
                 <a:solidFill>
                   <a:srgbClr val="003B4F"/>
                 </a:solidFill>
@@ -5493,7 +5493,7 @@
               <a:t>, </a:t>
             </a:r>
             <a:r>
-              <a:rPr>
+              <a:rPr sz="1200">
                 <a:solidFill>
                   <a:srgbClr val="AD0000"/>
                 </a:solidFill>
@@ -5502,7 +5502,7 @@
               <a:t>2</a:t>
             </a:r>
             <a:r>
-              <a:rPr>
+              <a:rPr sz="1200">
                 <a:solidFill>
                   <a:srgbClr val="003B4F"/>
                 </a:solidFill>
@@ -5512,7 +5512,7 @@
             </a:r>
             <a:br/>
             <a:r>
-              <a:rPr>
+              <a:rPr sz="1200">
                 <a:solidFill>
                   <a:srgbClr val="003B4F"/>
                 </a:solidFill>
@@ -5521,7 +5521,7 @@
               <a:t>ax.grid(</a:t>
             </a:r>
             <a:r>
-              <a:rPr>
+              <a:rPr sz="1200">
                 <a:solidFill>
                   <a:srgbClr val="111111"/>
                 </a:solidFill>
@@ -5530,7 +5530,7 @@
               <a:t>True</a:t>
             </a:r>
             <a:r>
-              <a:rPr>
+              <a:rPr sz="1200">
                 <a:solidFill>
                   <a:srgbClr val="003B4F"/>
                 </a:solidFill>
@@ -5540,7 +5540,7 @@
             </a:r>
             <a:br/>
             <a:r>
-              <a:rPr>
+              <a:rPr sz="1200">
                 <a:solidFill>
                   <a:srgbClr val="003B4F"/>
                 </a:solidFill>
@@ -5699,7 +5699,7 @@
               <a:buNone/>
             </a:pPr>
             <a:r>
-              <a:rPr>
+              <a:rPr sz="1200">
                 <a:solidFill>
                   <a:srgbClr val="003B4F"/>
                 </a:solidFill>
@@ -5709,7 +5709,7 @@
             </a:r>
             <a:br/>
             <a:r>
-              <a:rPr>
+              <a:rPr sz="1200">
                 <a:solidFill>
                   <a:srgbClr val="003B4F"/>
                 </a:solidFill>
@@ -5718,7 +5718,7 @@
               <a:t>with </a:t>
             </a:r>
             <a:r>
-              <a:rPr>
+              <a:rPr sz="1200">
                 <a:solidFill>
                   <a:srgbClr val="5E5E5E"/>
                 </a:solidFill>
@@ -5727,7 +5727,7 @@
               <a:t>`#`</a:t>
             </a:r>
             <a:r>
-              <a:rPr>
+              <a:rPr sz="1200">
                 <a:solidFill>
                   <a:srgbClr val="003B4F"/>
                 </a:solidFill>
@@ -5736,7 +5736,7 @@
               <a:t>, titles with </a:t>
             </a:r>
             <a:r>
-              <a:rPr>
+              <a:rPr sz="1200">
                 <a:solidFill>
                   <a:srgbClr val="5E5E5E"/>
                 </a:solidFill>
@@ -5745,7 +5745,7 @@
               <a:t>`##`</a:t>
             </a:r>
             <a:r>
-              <a:rPr>
+              <a:rPr sz="1200">
                 <a:solidFill>
                   <a:srgbClr val="003B4F"/>
                 </a:solidFill>
@@ -5755,7 +5755,7 @@
             </a:r>
             <a:br/>
             <a:r>
-              <a:rPr>
+              <a:rPr sz="1200">
                 <a:solidFill>
                   <a:srgbClr val="003B4F"/>
                 </a:solidFill>
@@ -5764,7 +5764,7 @@
               <a:t>with </a:t>
             </a:r>
             <a:r>
-              <a:rPr>
+              <a:rPr sz="1200">
                 <a:solidFill>
                   <a:srgbClr val="5E5E5E"/>
                 </a:solidFill>
@@ -5773,7 +5773,7 @@
               <a:t>`-`</a:t>
             </a:r>
             <a:r>
-              <a:rPr>
+              <a:rPr sz="1200">
                 <a:solidFill>
                   <a:srgbClr val="003B4F"/>
                 </a:solidFill>
@@ -5784,7 +5784,7 @@
             <a:br/>
             <a:br/>
             <a:r>
-              <a:rPr>
+              <a:rPr sz="1200">
                 <a:solidFill>
                   <a:srgbClr val="003B4F"/>
                 </a:solidFill>
@@ -5795,7 +5795,7 @@
             <a:br/>
             <a:br/>
             <a:r>
-              <a:rPr>
+              <a:rPr sz="1200">
                 <a:solidFill>
                   <a:srgbClr val="4758AB"/>
                 </a:solidFill>
@@ -5806,7 +5806,7 @@
             <a:br/>
             <a:br/>
             <a:r>
-              <a:rPr>
+              <a:rPr sz="1200">
                 <a:solidFill>
                   <a:srgbClr val="20794D"/>
                 </a:solidFill>
@@ -5815,7 +5815,7 @@
               <a:t>- </a:t>
             </a:r>
             <a:r>
-              <a:rPr>
+              <a:rPr sz="1200">
                 <a:solidFill>
                   <a:srgbClr val="003B4F"/>
                 </a:solidFill>
@@ -5825,7 +5825,7 @@
             </a:r>
             <a:br/>
             <a:r>
-              <a:rPr>
+              <a:rPr sz="1200">
                 <a:solidFill>
                   <a:srgbClr val="20794D"/>
                 </a:solidFill>
@@ -5834,7 +5834,7 @@
               <a:t>    - </a:t>
             </a:r>
             <a:r>
-              <a:rPr>
+              <a:rPr sz="1200">
                 <a:solidFill>
                   <a:srgbClr val="003B4F"/>
                 </a:solidFill>
@@ -5844,7 +5844,7 @@
             </a:r>
             <a:br/>
             <a:r>
-              <a:rPr>
+              <a:rPr sz="1200">
                 <a:solidFill>
                   <a:srgbClr val="20794D"/>
                 </a:solidFill>
@@ -5853,7 +5853,7 @@
               <a:t>    - </a:t>
             </a:r>
             <a:r>
-              <a:rPr>
+              <a:rPr sz="1200">
                 <a:solidFill>
                   <a:srgbClr val="003B4F"/>
                 </a:solidFill>
@@ -5863,7 +5863,7 @@
             </a:r>
             <a:br/>
             <a:r>
-              <a:rPr>
+              <a:rPr sz="1200">
                 <a:solidFill>
                   <a:srgbClr val="20794D"/>
                 </a:solidFill>
@@ -5872,7 +5872,7 @@
               <a:t>    - </a:t>
             </a:r>
             <a:r>
-              <a:rPr>
+              <a:rPr sz="1200">
                 <a:solidFill>
                   <a:srgbClr val="003B4F"/>
                 </a:solidFill>
@@ -5882,7 +5882,7 @@
             </a:r>
             <a:br/>
             <a:r>
-              <a:rPr>
+              <a:rPr sz="1200">
                 <a:solidFill>
                   <a:srgbClr val="20794D"/>
                 </a:solidFill>
@@ -5891,7 +5891,7 @@
               <a:t>    - </a:t>
             </a:r>
             <a:r>
-              <a:rPr>
+              <a:rPr sz="1200">
                 <a:solidFill>
                   <a:srgbClr val="003B4F"/>
                 </a:solidFill>
@@ -5901,7 +5901,7 @@
             </a:r>
             <a:br/>
             <a:r>
-              <a:rPr>
+              <a:rPr sz="1200">
                 <a:solidFill>
                   <a:srgbClr val="20794D"/>
                 </a:solidFill>
@@ -5910,7 +5910,7 @@
               <a:t>    - </a:t>
             </a:r>
             <a:r>
-              <a:rPr>
+              <a:rPr sz="1200">
                 <a:solidFill>
                   <a:srgbClr val="003B4F"/>
                 </a:solidFill>
@@ -5944,7 +5944,7 @@
               <a:t>To create slides, you create sections with </a:t>
             </a:r>
             <a:r>
-              <a:rPr>
+              <a:rPr sz="1200">
                 <a:latin typeface="Consolas"/>
               </a:rPr>
               <a:t>#</a:t>
@@ -5954,7 +5954,7 @@
               <a:t>, titles with </a:t>
             </a:r>
             <a:r>
-              <a:rPr>
+              <a:rPr sz="1200">
                 <a:latin typeface="Consolas"/>
               </a:rPr>
               <a:t>##</a:t>
@@ -5964,7 +5964,7 @@
               <a:t>, and bullets with </a:t>
             </a:r>
             <a:r>
-              <a:rPr>
+              <a:rPr sz="1200">
                 <a:latin typeface="Consolas"/>
               </a:rPr>
               <a:t>-</a:t>
@@ -6123,7 +6123,7 @@
               <a:buNone/>
             </a:pPr>
             <a:r>
-              <a:rPr>
+              <a:rPr sz="1200">
                 <a:solidFill>
                   <a:srgbClr val="003B4F"/>
                 </a:solidFill>
@@ -6132,7 +6132,7 @@
               <a:t>df_dr </a:t>
             </a:r>
             <a:r>
-              <a:rPr>
+              <a:rPr sz="1200">
                 <a:solidFill>
                   <a:srgbClr val="5E5E5E"/>
                 </a:solidFill>
@@ -6141,7 +6141,7 @@
               <a:t>=</a:t>
             </a:r>
             <a:r>
-              <a:rPr>
+              <a:rPr sz="1200">
                 <a:solidFill>
                   <a:srgbClr val="003B4F"/>
                 </a:solidFill>
@@ -6150,7 +6150,7 @@
               <a:t> pd.read_csv(</a:t>
             </a:r>
             <a:r>
-              <a:rPr>
+              <a:rPr sz="1200">
                 <a:solidFill>
                   <a:srgbClr val="20794D"/>
                 </a:solidFill>
@@ -6159,7 +6159,7 @@
               <a:t>"data/dr.csv.gz"</a:t>
             </a:r>
             <a:r>
-              <a:rPr>
+              <a:rPr sz="1200">
                 <a:solidFill>
                   <a:srgbClr val="003B4F"/>
                 </a:solidFill>
@@ -6168,7 +6168,7 @@
               <a:t>, compression</a:t>
             </a:r>
             <a:r>
-              <a:rPr>
+              <a:rPr sz="1200">
                 <a:solidFill>
                   <a:srgbClr val="5E5E5E"/>
                 </a:solidFill>
@@ -6177,7 +6177,7 @@
               <a:t>=</a:t>
             </a:r>
             <a:r>
-              <a:rPr>
+              <a:rPr sz="1200">
                 <a:solidFill>
                   <a:srgbClr val="20794D"/>
                 </a:solidFill>
@@ -6186,7 +6186,7 @@
               <a:t>"gzip"</a:t>
             </a:r>
             <a:r>
-              <a:rPr>
+              <a:rPr sz="1200">
                 <a:solidFill>
                   <a:srgbClr val="003B4F"/>
                 </a:solidFill>
@@ -6196,7 +6196,7 @@
             </a:r>
             <a:br/>
             <a:r>
-              <a:rPr>
+              <a:rPr sz="1200">
                 <a:solidFill>
                   <a:srgbClr val="003B4F"/>
                 </a:solidFill>
@@ -6205,7 +6205,7 @@
               <a:t>df_pop </a:t>
             </a:r>
             <a:r>
-              <a:rPr>
+              <a:rPr sz="1200">
                 <a:solidFill>
                   <a:srgbClr val="5E5E5E"/>
                 </a:solidFill>
@@ -6214,7 +6214,7 @@
               <a:t>=</a:t>
             </a:r>
             <a:r>
-              <a:rPr>
+              <a:rPr sz="1200">
                 <a:solidFill>
                   <a:srgbClr val="003B4F"/>
                 </a:solidFill>
@@ -6223,7 +6223,7 @@
               <a:t> pd.read_csv(</a:t>
             </a:r>
             <a:r>
-              <a:rPr>
+              <a:rPr sz="1200">
                 <a:solidFill>
                   <a:srgbClr val="20794D"/>
                 </a:solidFill>
@@ -6232,7 +6232,7 @@
               <a:t>"data/pop_brackets.csv.gz"</a:t>
             </a:r>
             <a:r>
-              <a:rPr>
+              <a:rPr sz="1200">
                 <a:solidFill>
                   <a:srgbClr val="003B4F"/>
                 </a:solidFill>
@@ -6241,7 +6241,7 @@
               <a:t>, compression</a:t>
             </a:r>
             <a:r>
-              <a:rPr>
+              <a:rPr sz="1200">
                 <a:solidFill>
                   <a:srgbClr val="5E5E5E"/>
                 </a:solidFill>
@@ -6250,7 +6250,7 @@
               <a:t>=</a:t>
             </a:r>
             <a:r>
-              <a:rPr>
+              <a:rPr sz="1200">
                 <a:solidFill>
                   <a:srgbClr val="20794D"/>
                 </a:solidFill>
@@ -6259,7 +6259,7 @@
               <a:t>"gzip"</a:t>
             </a:r>
             <a:r>
-              <a:rPr>
+              <a:rPr sz="1200">
                 <a:solidFill>
                   <a:srgbClr val="003B4F"/>
                 </a:solidFill>
@@ -6270,7 +6270,7 @@
             <a:br/>
             <a:br/>
             <a:r>
-              <a:rPr>
+              <a:rPr sz="1200">
                 <a:solidFill>
                   <a:srgbClr val="003B4F"/>
                 </a:solidFill>
@@ -6279,7 +6279,7 @@
               <a:t>years </a:t>
             </a:r>
             <a:r>
-              <a:rPr>
+              <a:rPr sz="1200">
                 <a:solidFill>
                   <a:srgbClr val="5E5E5E"/>
                 </a:solidFill>
@@ -6288,7 +6288,7 @@
               <a:t>=</a:t>
             </a:r>
             <a:r>
-              <a:rPr>
+              <a:rPr sz="1200">
                 <a:solidFill>
                   <a:srgbClr val="003B4F"/>
                 </a:solidFill>
@@ -6297,7 +6297,7 @@
               <a:t> [</a:t>
             </a:r>
             <a:r>
-              <a:rPr>
+              <a:rPr sz="1200">
                 <a:solidFill>
                   <a:srgbClr val="AD0000"/>
                 </a:solidFill>
@@ -6306,7 +6306,7 @@
               <a:t>2000</a:t>
             </a:r>
             <a:r>
-              <a:rPr>
+              <a:rPr sz="1200">
                 <a:solidFill>
                   <a:srgbClr val="003B4F"/>
                 </a:solidFill>
@@ -6315,7 +6315,7 @@
               <a:t>, </a:t>
             </a:r>
             <a:r>
-              <a:rPr>
+              <a:rPr sz="1200">
                 <a:solidFill>
                   <a:srgbClr val="AD0000"/>
                 </a:solidFill>
@@ -6324,7 +6324,7 @@
               <a:t>2025</a:t>
             </a:r>
             <a:r>
-              <a:rPr>
+              <a:rPr sz="1200">
                 <a:solidFill>
                   <a:srgbClr val="003B4F"/>
                 </a:solidFill>
@@ -6333,7 +6333,7 @@
               <a:t>, </a:t>
             </a:r>
             <a:r>
-              <a:rPr>
+              <a:rPr sz="1200">
                 <a:solidFill>
                   <a:srgbClr val="AD0000"/>
                 </a:solidFill>
@@ -6342,7 +6342,7 @@
               <a:t>2050</a:t>
             </a:r>
             <a:r>
-              <a:rPr>
+              <a:rPr sz="1200">
                 <a:solidFill>
                   <a:srgbClr val="003B4F"/>
                 </a:solidFill>
@@ -6351,7 +6351,7 @@
               <a:t>, </a:t>
             </a:r>
             <a:r>
-              <a:rPr>
+              <a:rPr sz="1200">
                 <a:solidFill>
                   <a:srgbClr val="AD0000"/>
                 </a:solidFill>
@@ -6360,7 +6360,7 @@
               <a:t>2075</a:t>
             </a:r>
             <a:r>
-              <a:rPr>
+              <a:rPr sz="1200">
                 <a:solidFill>
                   <a:srgbClr val="003B4F"/>
                 </a:solidFill>
@@ -6369,7 +6369,7 @@
               <a:t>, </a:t>
             </a:r>
             <a:r>
-              <a:rPr>
+              <a:rPr sz="1200">
                 <a:solidFill>
                   <a:srgbClr val="AD0000"/>
                 </a:solidFill>
@@ -6378,7 +6378,7 @@
               <a:t>2100</a:t>
             </a:r>
             <a:r>
-              <a:rPr>
+              <a:rPr sz="1200">
                 <a:solidFill>
                   <a:srgbClr val="003B4F"/>
                 </a:solidFill>
@@ -6388,7 +6388,7 @@
             </a:r>
             <a:br/>
             <a:r>
-              <a:rPr>
+              <a:rPr sz="1200">
                 <a:solidFill>
                   <a:srgbClr val="003B4F"/>
                 </a:solidFill>
@@ -6397,7 +6397,7 @@
               <a:t>regions </a:t>
             </a:r>
             <a:r>
-              <a:rPr>
+              <a:rPr sz="1200">
                 <a:solidFill>
                   <a:srgbClr val="5E5E5E"/>
                 </a:solidFill>
@@ -6406,7 +6406,7 @@
               <a:t>=</a:t>
             </a:r>
             <a:r>
-              <a:rPr>
+              <a:rPr sz="1200">
                 <a:solidFill>
                   <a:srgbClr val="003B4F"/>
                 </a:solidFill>
@@ -6415,7 +6415,7 @@
               <a:t> [</a:t>
             </a:r>
             <a:r>
-              <a:rPr>
+              <a:rPr sz="1200">
                 <a:solidFill>
                   <a:srgbClr val="20794D"/>
                 </a:solidFill>
@@ -6424,7 +6424,7 @@
               <a:t>"Belgium"</a:t>
             </a:r>
             <a:r>
-              <a:rPr>
+              <a:rPr sz="1200">
                 <a:solidFill>
                   <a:srgbClr val="003B4F"/>
                 </a:solidFill>
@@ -6433,7 +6433,7 @@
               <a:t>, </a:t>
             </a:r>
             <a:r>
-              <a:rPr>
+              <a:rPr sz="1200">
                 <a:solidFill>
                   <a:srgbClr val="20794D"/>
                 </a:solidFill>
@@ -6442,7 +6442,7 @@
               <a:t>"China"</a:t>
             </a:r>
             <a:r>
-              <a:rPr>
+              <a:rPr sz="1200">
                 <a:solidFill>
                   <a:srgbClr val="003B4F"/>
                 </a:solidFill>
@@ -6451,7 +6451,7 @@
               <a:t>, </a:t>
             </a:r>
             <a:r>
-              <a:rPr>
+              <a:rPr sz="1200">
                 <a:solidFill>
                   <a:srgbClr val="20794D"/>
                 </a:solidFill>
@@ -6460,7 +6460,7 @@
               <a:t>"Brazil"</a:t>
             </a:r>
             <a:r>
-              <a:rPr>
+              <a:rPr sz="1200">
                 <a:solidFill>
                   <a:srgbClr val="003B4F"/>
                 </a:solidFill>
@@ -6469,7 +6469,7 @@
               <a:t>, </a:t>
             </a:r>
             <a:r>
-              <a:rPr>
+              <a:rPr sz="1200">
                 <a:solidFill>
                   <a:srgbClr val="20794D"/>
                 </a:solidFill>
@@ -6478,7 +6478,7 @@
               <a:t>"India"</a:t>
             </a:r>
             <a:r>
-              <a:rPr>
+              <a:rPr sz="1200">
                 <a:solidFill>
                   <a:srgbClr val="003B4F"/>
                 </a:solidFill>
@@ -6487,7 +6487,7 @@
               <a:t>, </a:t>
             </a:r>
             <a:r>
-              <a:rPr>
+              <a:rPr sz="1200">
                 <a:solidFill>
                   <a:srgbClr val="20794D"/>
                 </a:solidFill>
@@ -6496,7 +6496,7 @@
               <a:t>"Japan"</a:t>
             </a:r>
             <a:r>
-              <a:rPr>
+              <a:rPr sz="1200">
                 <a:solidFill>
                   <a:srgbClr val="003B4F"/>
                 </a:solidFill>
@@ -6505,7 +6505,7 @@
               <a:t>, </a:t>
             </a:r>
             <a:r>
-              <a:rPr>
+              <a:rPr sz="1200">
                 <a:solidFill>
                   <a:srgbClr val="20794D"/>
                 </a:solidFill>
@@ -6514,7 +6514,7 @@
               <a:t>"Nigeria"</a:t>
             </a:r>
             <a:r>
-              <a:rPr>
+              <a:rPr sz="1200">
                 <a:solidFill>
                   <a:srgbClr val="003B4F"/>
                 </a:solidFill>
@@ -6525,7 +6525,7 @@
             <a:br/>
             <a:br/>
             <a:r>
-              <a:rPr>
+              <a:rPr sz="1200">
                 <a:solidFill>
                   <a:srgbClr val="003B4F"/>
                 </a:solidFill>
@@ -6535,7 +6535,7 @@
             </a:r>
             <a:br/>
             <a:r>
-              <a:rPr>
+              <a:rPr sz="1200">
                 <a:solidFill>
                   <a:srgbClr val="003B4F"/>
                 </a:solidFill>
@@ -6544,7 +6544,7 @@
               <a:t>    display(Markdown(</a:t>
             </a:r>
             <a:r>
-              <a:rPr>
+              <a:rPr sz="1200">
                 <a:solidFill>
                   <a:srgbClr val="20794D"/>
                 </a:solidFill>
@@ -6553,7 +6553,7 @@
               <a:t>f"## Age and Population Pyramids for </a:t>
             </a:r>
             <a:r>
-              <a:rPr>
+              <a:rPr sz="1200">
                 <a:solidFill>
                   <a:srgbClr val="5E5E5E"/>
                 </a:solidFill>
@@ -6562,7 +6562,7 @@
               <a:t>{</a:t>
             </a:r>
             <a:r>
-              <a:rPr>
+              <a:rPr sz="1200">
                 <a:solidFill>
                   <a:srgbClr val="003B4F"/>
                 </a:solidFill>
@@ -6571,7 +6571,7 @@
               <a:t>name</a:t>
             </a:r>
             <a:r>
-              <a:rPr>
+              <a:rPr sz="1200">
                 <a:solidFill>
                   <a:srgbClr val="5E5E5E"/>
                 </a:solidFill>
@@ -6580,7 +6580,7 @@
               <a:t>}</a:t>
             </a:r>
             <a:r>
-              <a:rPr>
+              <a:rPr sz="1200">
                 <a:solidFill>
                   <a:srgbClr val="20794D"/>
                 </a:solidFill>
@@ -6589,7 +6589,7 @@
               <a:t>"</a:t>
             </a:r>
             <a:r>
-              <a:rPr>
+              <a:rPr sz="1200">
                 <a:solidFill>
                   <a:srgbClr val="003B4F"/>
                 </a:solidFill>
@@ -6599,7 +6599,7 @@
             </a:r>
             <a:br/>
             <a:r>
-              <a:rPr>
+              <a:rPr sz="1200">
                 <a:solidFill>
                   <a:srgbClr val="003B4F"/>
                 </a:solidFill>
@@ -6608,7 +6608,7 @@
               <a:t>    display(Markdown(</a:t>
             </a:r>
             <a:r>
-              <a:rPr>
+              <a:rPr sz="1200">
                 <a:solidFill>
                   <a:srgbClr val="20794D"/>
                 </a:solidFill>
@@ -6617,7 +6617,7 @@
               <a:t>f'&lt;div class="columns"&gt;'</a:t>
             </a:r>
             <a:r>
-              <a:rPr>
+              <a:rPr sz="1200">
                 <a:solidFill>
                   <a:srgbClr val="003B4F"/>
                 </a:solidFill>
@@ -6627,7 +6627,7 @@
             </a:r>
             <a:br/>
             <a:r>
-              <a:rPr>
+              <a:rPr sz="1200">
                 <a:solidFill>
                   <a:srgbClr val="003B4F"/>
                 </a:solidFill>
@@ -6636,7 +6636,7 @@
               <a:t>    display(Markdown(</a:t>
             </a:r>
             <a:r>
-              <a:rPr>
+              <a:rPr sz="1200">
                 <a:solidFill>
                   <a:srgbClr val="20794D"/>
                 </a:solidFill>
@@ -6645,7 +6645,7 @@
               <a:t>f'&lt;div class="column"&gt;'</a:t>
             </a:r>
             <a:r>
-              <a:rPr>
+              <a:rPr sz="1200">
                 <a:solidFill>
                   <a:srgbClr val="003B4F"/>
                 </a:solidFill>
@@ -6655,7 +6655,7 @@
             </a:r>
             <a:br/>
             <a:r>
-              <a:rPr>
+              <a:rPr sz="1200">
                 <a:solidFill>
                   <a:srgbClr val="003B4F"/>
                 </a:solidFill>
@@ -6664,7 +6664,7 @@
               <a:t>    plot_dependency_ratio(df_dr[df_dr.Location </a:t>
             </a:r>
             <a:r>
-              <a:rPr>
+              <a:rPr sz="1200">
                 <a:solidFill>
                   <a:srgbClr val="5E5E5E"/>
                 </a:solidFill>
@@ -6673,7 +6673,7 @@
               <a:t>==</a:t>
             </a:r>
             <a:r>
-              <a:rPr>
+              <a:rPr sz="1200">
                 <a:solidFill>
                   <a:srgbClr val="003B4F"/>
                 </a:solidFill>
@@ -6683,7 +6683,7 @@
             </a:r>
             <a:br/>
             <a:r>
-              <a:rPr>
+              <a:rPr sz="1200">
                 <a:solidFill>
                   <a:srgbClr val="003B4F"/>
                 </a:solidFill>
@@ -6692,7 +6692,7 @@
               <a:t>    display(Markdown(</a:t>
             </a:r>
             <a:r>
-              <a:rPr>
+              <a:rPr sz="1200">
                 <a:solidFill>
                   <a:srgbClr val="20794D"/>
                 </a:solidFill>
@@ -6701,7 +6701,7 @@
               <a:t>f'&lt;/div&gt;'</a:t>
             </a:r>
             <a:r>
-              <a:rPr>
+              <a:rPr sz="1200">
                 <a:solidFill>
                   <a:srgbClr val="003B4F"/>
                 </a:solidFill>
@@ -6711,7 +6711,7 @@
             </a:r>
             <a:br/>
             <a:r>
-              <a:rPr>
+              <a:rPr sz="1200">
                 <a:solidFill>
                   <a:srgbClr val="003B4F"/>
                 </a:solidFill>
@@ -6720,7 +6720,7 @@
               <a:t>    display(Markdown(</a:t>
             </a:r>
             <a:r>
-              <a:rPr>
+              <a:rPr sz="1200">
                 <a:solidFill>
                   <a:srgbClr val="20794D"/>
                 </a:solidFill>
@@ -6729,7 +6729,7 @@
               <a:t>f'&lt;div class="column"&gt;'</a:t>
             </a:r>
             <a:r>
-              <a:rPr>
+              <a:rPr sz="1200">
                 <a:solidFill>
                   <a:srgbClr val="003B4F"/>
                 </a:solidFill>
@@ -6739,7 +6739,7 @@
             </a:r>
             <a:br/>
             <a:r>
-              <a:rPr>
+              <a:rPr sz="1200">
                 <a:solidFill>
                   <a:srgbClr val="003B4F"/>
                 </a:solidFill>
@@ -6748,7 +6748,7 @@
               <a:t>    plot_population_pyramid_series(df_pop[df_pop[</a:t>
             </a:r>
             <a:r>
-              <a:rPr>
+              <a:rPr sz="1200">
                 <a:solidFill>
                   <a:srgbClr val="20794D"/>
                 </a:solidFill>
@@ -6757,7 +6757,7 @@
               <a:t>"Location"</a:t>
             </a:r>
             <a:r>
-              <a:rPr>
+              <a:rPr sz="1200">
                 <a:solidFill>
                   <a:srgbClr val="003B4F"/>
                 </a:solidFill>
@@ -6766,7 +6766,7 @@
               <a:t>]</a:t>
             </a:r>
             <a:r>
-              <a:rPr>
+              <a:rPr sz="1200">
                 <a:solidFill>
                   <a:srgbClr val="5E5E5E"/>
                 </a:solidFill>
@@ -6775,7 +6775,7 @@
               <a:t>==</a:t>
             </a:r>
             <a:r>
-              <a:rPr>
+              <a:rPr sz="1200">
                 <a:solidFill>
                   <a:srgbClr val="003B4F"/>
                 </a:solidFill>
@@ -6785,7 +6785,7 @@
             </a:r>
             <a:br/>
             <a:r>
-              <a:rPr>
+              <a:rPr sz="1200">
                 <a:solidFill>
                   <a:srgbClr val="003B4F"/>
                 </a:solidFill>
@@ -6794,7 +6794,7 @@
               <a:t>    display(Markdown(</a:t>
             </a:r>
             <a:r>
-              <a:rPr>
+              <a:rPr sz="1200">
                 <a:solidFill>
                   <a:srgbClr val="20794D"/>
                 </a:solidFill>
@@ -6803,7 +6803,7 @@
               <a:t>f'&lt;/div&gt;'</a:t>
             </a:r>
             <a:r>
-              <a:rPr>
+              <a:rPr sz="1200">
                 <a:solidFill>
                   <a:srgbClr val="003B4F"/>
                 </a:solidFill>
@@ -6813,7 +6813,7 @@
             </a:r>
             <a:br/>
             <a:r>
-              <a:rPr>
+              <a:rPr sz="1200">
                 <a:solidFill>
                   <a:srgbClr val="003B4F"/>
                 </a:solidFill>
@@ -6822,7 +6822,7 @@
               <a:t>    display(Markdown(</a:t>
             </a:r>
             <a:r>
-              <a:rPr>
+              <a:rPr sz="1200">
                 <a:solidFill>
                   <a:srgbClr val="20794D"/>
                 </a:solidFill>
@@ -6831,7 +6831,7 @@
               <a:t>f'&lt;/div&gt;'</a:t>
             </a:r>
             <a:r>
-              <a:rPr>
+              <a:rPr sz="1200">
                 <a:solidFill>
                   <a:srgbClr val="003B4F"/>
                 </a:solidFill>
@@ -7654,7 +7654,7 @@
               <a:buNone/>
             </a:pPr>
             <a:r>
-              <a:rPr>
+              <a:rPr sz="1200">
                 <a:solidFill>
                   <a:srgbClr val="AD0000"/>
                 </a:solidFill>
@@ -7664,7 +7664,7 @@
             </a:r>
             <a:br/>
             <a:r>
-              <a:rPr>
+              <a:rPr sz="1200">
                 <a:solidFill>
                   <a:srgbClr val="4758AB"/>
                 </a:solidFill>
@@ -7673,7 +7673,7 @@
               <a:t>title</a:t>
             </a:r>
             <a:r>
-              <a:rPr>
+              <a:rPr sz="1200">
                 <a:solidFill>
                   <a:srgbClr val="003B4F"/>
                 </a:solidFill>
@@ -7682,7 +7682,7 @@
               <a:t>:</a:t>
             </a:r>
             <a:r>
-              <a:rPr>
+              <a:rPr sz="1200">
                 <a:solidFill>
                   <a:srgbClr val="657422"/>
                 </a:solidFill>
@@ -7691,7 +7691,7 @@
               <a:t> </a:t>
             </a:r>
             <a:r>
-              <a:rPr>
+              <a:rPr sz="1200">
                 <a:solidFill>
                   <a:srgbClr val="20794D"/>
                 </a:solidFill>
@@ -7701,7 +7701,7 @@
             </a:r>
             <a:br/>
             <a:r>
-              <a:rPr>
+              <a:rPr sz="1200">
                 <a:solidFill>
                   <a:srgbClr val="4758AB"/>
                 </a:solidFill>
@@ -7710,7 +7710,7 @@
               <a:t>format</a:t>
             </a:r>
             <a:r>
-              <a:rPr>
+              <a:rPr sz="1200">
                 <a:solidFill>
                   <a:srgbClr val="003B4F"/>
                 </a:solidFill>
@@ -7719,7 +7719,7 @@
               <a:t>:</a:t>
             </a:r>
             <a:r>
-              <a:rPr>
+              <a:rPr sz="1200">
                 <a:solidFill>
                   <a:srgbClr val="657422"/>
                 </a:solidFill>
@@ -7729,7 +7729,7 @@
             </a:r>
             <a:br/>
             <a:r>
-              <a:rPr>
+              <a:rPr sz="1200">
                 <a:solidFill>
                   <a:srgbClr val="5E5E5E"/>
                 </a:solidFill>
@@ -7739,7 +7739,7 @@
             </a:r>
             <a:br/>
             <a:r>
-              <a:rPr>
+              <a:rPr sz="1200">
                 <a:solidFill>
                   <a:srgbClr val="5E5E5E"/>
                 </a:solidFill>
@@ -7749,7 +7749,7 @@
             </a:r>
             <a:br/>
             <a:r>
-              <a:rPr>
+              <a:rPr sz="1200">
                 <a:solidFill>
                   <a:srgbClr val="5E5E5E"/>
                 </a:solidFill>
@@ -7759,7 +7759,7 @@
             </a:r>
             <a:br/>
             <a:r>
-              <a:rPr>
+              <a:rPr sz="1200">
                 <a:solidFill>
                   <a:srgbClr val="5E5E5E"/>
                 </a:solidFill>
@@ -7769,7 +7769,7 @@
             </a:r>
             <a:br/>
             <a:r>
-              <a:rPr>
+              <a:rPr sz="1200">
                 <a:solidFill>
                   <a:srgbClr val="5E5E5E"/>
                 </a:solidFill>
@@ -7779,7 +7779,7 @@
             </a:r>
             <a:br/>
             <a:r>
-              <a:rPr>
+              <a:rPr sz="1200">
                 <a:solidFill>
                   <a:srgbClr val="5E5E5E"/>
                 </a:solidFill>
@@ -7789,7 +7789,7 @@
             </a:r>
             <a:br/>
             <a:r>
-              <a:rPr>
+              <a:rPr sz="1200">
                 <a:solidFill>
                   <a:srgbClr val="5E5E5E"/>
                 </a:solidFill>
@@ -7800,7 +7800,7 @@
             <a:br/>
             <a:br/>
             <a:r>
-              <a:rPr>
+              <a:rPr sz="1200">
                 <a:solidFill>
                   <a:srgbClr val="4758AB"/>
                 </a:solidFill>
@@ -7809,7 +7809,7 @@
               <a:t>author</a:t>
             </a:r>
             <a:r>
-              <a:rPr>
+              <a:rPr sz="1200">
                 <a:solidFill>
                   <a:srgbClr val="003B4F"/>
                 </a:solidFill>
@@ -7818,7 +7818,7 @@
               <a:t>:</a:t>
             </a:r>
             <a:r>
-              <a:rPr>
+              <a:rPr sz="1200">
                 <a:solidFill>
                   <a:srgbClr val="657422"/>
                 </a:solidFill>
@@ -7828,7 +7828,7 @@
             </a:r>
             <a:br/>
             <a:r>
-              <a:rPr>
+              <a:rPr sz="1200">
                 <a:solidFill>
                   <a:srgbClr val="4758AB"/>
                 </a:solidFill>
@@ -7837,7 +7837,7 @@
               <a:t>date</a:t>
             </a:r>
             <a:r>
-              <a:rPr>
+              <a:rPr sz="1200">
                 <a:solidFill>
                   <a:srgbClr val="003B4F"/>
                 </a:solidFill>
@@ -7846,7 +7846,7 @@
               <a:t>:</a:t>
             </a:r>
             <a:r>
-              <a:rPr>
+              <a:rPr sz="1200">
                 <a:solidFill>
                   <a:srgbClr val="657422"/>
                 </a:solidFill>
@@ -7856,7 +7856,7 @@
             </a:r>
             <a:br/>
             <a:r>
-              <a:rPr>
+              <a:rPr sz="1200">
                 <a:solidFill>
                   <a:srgbClr val="AD0000"/>
                 </a:solidFill>
@@ -8982,7 +8982,7 @@
               <a:t>One of my proudest tech moments was to make </a:t>
             </a:r>
             <a:r>
-              <a:rPr>
+              <a:rPr sz="1200">
                 <a:latin typeface="Consolas"/>
               </a:rPr>
               <a:t>CWeave</a:t>
@@ -8992,7 +8992,7 @@
               <a:t> and </a:t>
             </a:r>
             <a:r>
-              <a:rPr>
+              <a:rPr sz="1200">
                 <a:latin typeface="Consolas"/>
               </a:rPr>
               <a:t>CWeb</a:t>
@@ -9110,7 +9110,7 @@
           <a:p>
             <a:pPr lvl="1"/>
             <a:r>
-              <a:rPr>
+              <a:rPr sz="1200">
                 <a:latin typeface="Consolas"/>
               </a:rPr>
               <a:t>\usepackage{ifthen}</a:t>
@@ -9119,7 +9119,7 @@
           <a:p>
             <a:pPr lvl="1"/>
             <a:r>
-              <a:rPr>
+              <a:rPr sz="1200">
                 <a:latin typeface="Consolas"/>
               </a:rPr>
               <a:t>@for</a:t>
@@ -9129,7 +9129,7 @@
               <a:t>, </a:t>
             </a:r>
             <a:r>
-              <a:rPr>
+              <a:rPr sz="1200">
                 <a:latin typeface="Consolas"/>
               </a:rPr>
               <a:t>@while</a:t>
@@ -9236,7 +9236,7 @@
               <a:t>Hugo and </a:t>
             </a:r>
             <a:r>
-              <a:rPr>
+              <a:rPr sz="1200">
                 <a:latin typeface="Consolas"/>
               </a:rPr>
               <a:t>blogdown</a:t>
@@ -9253,7 +9253,7 @@
               <a:t>Heavily dependent on R </a:t>
             </a:r>
             <a:r>
-              <a:rPr>
+              <a:rPr sz="1200">
                 <a:latin typeface="Consolas"/>
               </a:rPr>
               <a:t>R</a:t>
@@ -9404,7 +9404,7 @@
               <a:t> use Python through Jupyter notebooks, and one can use </a:t>
             </a:r>
             <a:r>
-              <a:rPr>
+              <a:rPr sz="1200">
                 <a:hlinkClick r:id="rId3"/>
                 <a:latin typeface="Consolas"/>
               </a:rPr>
@@ -9528,7 +9528,7 @@
               <a:t>In Quarto’s </a:t>
             </a:r>
             <a:r>
-              <a:rPr>
+              <a:rPr sz="1200">
                 <a:latin typeface="Consolas"/>
               </a:rPr>
               <a:t>.qmd</a:t>
@@ -9538,7 +9538,7 @@
               <a:t> files, you write Markdown and code, just like </a:t>
             </a:r>
             <a:r>
-              <a:rPr>
+              <a:rPr sz="1200">
                 <a:latin typeface="Consolas"/>
               </a:rPr>
               <a:t>.ipynb</a:t>
@@ -9548,7 +9548,7 @@
               <a:t>. Add some </a:t>
             </a:r>
             <a:r>
-              <a:rPr>
+              <a:rPr sz="1200">
                 <a:latin typeface="Consolas"/>
               </a:rPr>
               <a:t>YAML</a:t>
@@ -10026,299 +10026,4 @@
   </a:objectDefaults>
   <a:extraClrSchemeLst/>
 </a:theme>
-</file>
-
-<file path=ppt/theme/theme2.xml><?xml version="1.0" encoding="utf-8"?>
-<a:theme xmlns:a="http://schemas.openxmlformats.org/drawingml/2006/main" name="Office Theme">
-  <a:themeElements>
-    <a:clrScheme name="Office">
-      <a:dk1>
-        <a:sysClr val="windowText" lastClr="000000"/>
-      </a:dk1>
-      <a:lt1>
-        <a:sysClr val="window" lastClr="FFFFFF"/>
-      </a:lt1>
-      <a:dk2>
-        <a:srgbClr val="44546A"/>
-      </a:dk2>
-      <a:lt2>
-        <a:srgbClr val="E7E6E6"/>
-      </a:lt2>
-      <a:accent1>
-        <a:srgbClr val="4472C4"/>
-      </a:accent1>
-      <a:accent2>
-        <a:srgbClr val="ED7D31"/>
-      </a:accent2>
-      <a:accent3>
-        <a:srgbClr val="A5A5A5"/>
-      </a:accent3>
-      <a:accent4>
-        <a:srgbClr val="FFC000"/>
-      </a:accent4>
-      <a:accent5>
-        <a:srgbClr val="5B9BD5"/>
-      </a:accent5>
-      <a:accent6>
-        <a:srgbClr val="70AD47"/>
-      </a:accent6>
-      <a:hlink>
-        <a:srgbClr val="0563C1"/>
-      </a:hlink>
-      <a:folHlink>
-        <a:srgbClr val="954F72"/>
-      </a:folHlink>
-    </a:clrScheme>
-    <a:fontScheme name="Office">
-      <a:majorFont>
-        <a:latin typeface="Calibri Light" panose="020F0302020204030204"/>
-        <a:ea typeface=""/>
-        <a:cs typeface=""/>
-        <a:font script="Jpan" typeface="游ゴシック Light"/>
-        <a:font script="Hang" typeface="맑은 고딕"/>
-        <a:font script="Hans" typeface="等线 Light"/>
-        <a:font script="Hant" typeface="新細明體"/>
-        <a:font script="Arab" typeface="Times New Roman"/>
-        <a:font script="Hebr" typeface="Times New Roman"/>
-        <a:font script="Thai" typeface="Angsana New"/>
-        <a:font script="Ethi" typeface="Nyala"/>
-        <a:font script="Beng" typeface="Vrinda"/>
-        <a:font script="Gujr" typeface="Shruti"/>
-        <a:font script="Khmr" typeface="MoolBoran"/>
-        <a:font script="Knda" typeface="Tunga"/>
-        <a:font script="Guru" typeface="Raavi"/>
-        <a:font script="Cans" typeface="Euphemia"/>
-        <a:font script="Cher" typeface="Plantagenet Cherokee"/>
-        <a:font script="Yiii" typeface="Microsoft Yi Baiti"/>
-        <a:font script="Tibt" typeface="Microsoft Himalaya"/>
-        <a:font script="Thaa" typeface="MV Boli"/>
-        <a:font script="Deva" typeface="Mangal"/>
-        <a:font script="Telu" typeface="Gautami"/>
-        <a:font script="Taml" typeface="Latha"/>
-        <a:font script="Syrc" typeface="Estrangelo Edessa"/>
-        <a:font script="Orya" typeface="Kalinga"/>
-        <a:font script="Mlym" typeface="Kartika"/>
-        <a:font script="Laoo" typeface="DokChampa"/>
-        <a:font script="Sinh" typeface="Iskoola Pota"/>
-        <a:font script="Mong" typeface="Mongolian Baiti"/>
-        <a:font script="Viet" typeface="Times New Roman"/>
-        <a:font script="Uigh" typeface="Microsoft Uighur"/>
-        <a:font script="Geor" typeface="Sylfaen"/>
-        <a:font script="Armn" typeface="Arial"/>
-        <a:font script="Bugi" typeface="Leelawadee UI"/>
-        <a:font script="Bopo" typeface="Microsoft JhengHei"/>
-        <a:font script="Java" typeface="Javanese Text"/>
-        <a:font script="Lisu" typeface="Segoe UI"/>
-        <a:font script="Mymr" typeface="Myanmar Text"/>
-        <a:font script="Nkoo" typeface="Ebrima"/>
-        <a:font script="Olck" typeface="Nirmala UI"/>
-        <a:font script="Osma" typeface="Ebrima"/>
-        <a:font script="Phag" typeface="Phagspa"/>
-        <a:font script="Syrn" typeface="Estrangelo Edessa"/>
-        <a:font script="Syrj" typeface="Estrangelo Edessa"/>
-        <a:font script="Syre" typeface="Estrangelo Edessa"/>
-        <a:font script="Sora" typeface="Nirmala UI"/>
-        <a:font script="Tale" typeface="Microsoft Tai Le"/>
-        <a:font script="Talu" typeface="Microsoft New Tai Lue"/>
-        <a:font script="Tfng" typeface="Ebrima"/>
-      </a:majorFont>
-      <a:minorFont>
-        <a:latin typeface="Calibri" panose="020F0502020204030204"/>
-        <a:ea typeface=""/>
-        <a:cs typeface=""/>
-        <a:font script="Jpan" typeface="游ゴシック"/>
-        <a:font script="Hang" typeface="맑은 고딕"/>
-        <a:font script="Hans" typeface="等线"/>
-        <a:font script="Hant" typeface="新細明體"/>
-        <a:font script="Arab" typeface="Arial"/>
-        <a:font script="Hebr" typeface="Arial"/>
-        <a:font script="Thai" typeface="Cordia New"/>
-        <a:font script="Ethi" typeface="Nyala"/>
-        <a:font script="Beng" typeface="Vrinda"/>
-        <a:font script="Gujr" typeface="Shruti"/>
-        <a:font script="Khmr" typeface="DaunPenh"/>
-        <a:font script="Knda" typeface="Tunga"/>
-        <a:font script="Guru" typeface="Raavi"/>
-        <a:font script="Cans" typeface="Euphemia"/>
-        <a:font script="Cher" typeface="Plantagenet Cherokee"/>
-        <a:font script="Yiii" typeface="Microsoft Yi Baiti"/>
-        <a:font script="Tibt" typeface="Microsoft Himalaya"/>
-        <a:font script="Thaa" typeface="MV Boli"/>
-        <a:font script="Deva" typeface="Mangal"/>
-        <a:font script="Telu" typeface="Gautami"/>
-        <a:font script="Taml" typeface="Latha"/>
-        <a:font script="Syrc" typeface="Estrangelo Edessa"/>
-        <a:font script="Orya" typeface="Kalinga"/>
-        <a:font script="Mlym" typeface="Kartika"/>
-        <a:font script="Laoo" typeface="DokChampa"/>
-        <a:font script="Sinh" typeface="Iskoola Pota"/>
-        <a:font script="Mong" typeface="Mongolian Baiti"/>
-        <a:font script="Viet" typeface="Arial"/>
-        <a:font script="Uigh" typeface="Microsoft Uighur"/>
-        <a:font script="Geor" typeface="Sylfaen"/>
-        <a:font script="Armn" typeface="Arial"/>
-        <a:font script="Bugi" typeface="Leelawadee UI"/>
-        <a:font script="Bopo" typeface="Microsoft JhengHei"/>
-        <a:font script="Java" typeface="Javanese Text"/>
-        <a:font script="Lisu" typeface="Segoe UI"/>
-        <a:font script="Mymr" typeface="Myanmar Text"/>
-        <a:font script="Nkoo" typeface="Ebrima"/>
-        <a:font script="Olck" typeface="Nirmala UI"/>
-        <a:font script="Osma" typeface="Ebrima"/>
-        <a:font script="Phag" typeface="Phagspa"/>
-        <a:font script="Syrn" typeface="Estrangelo Edessa"/>
-        <a:font script="Syrj" typeface="Estrangelo Edessa"/>
-        <a:font script="Syre" typeface="Estrangelo Edessa"/>
-        <a:font script="Sora" typeface="Nirmala UI"/>
-        <a:font script="Tale" typeface="Microsoft Tai Le"/>
-        <a:font script="Talu" typeface="Microsoft New Tai Lue"/>
-        <a:font script="Tfng" typeface="Ebrima"/>
-      </a:minorFont>
-    </a:fontScheme>
-    <a:fmtScheme name="Office">
-      <a:fillStyleLst>
-        <a:solidFill>
-          <a:schemeClr val="phClr"/>
-        </a:solidFill>
-        <a:gradFill rotWithShape="1">
-          <a:gsLst>
-            <a:gs pos="0">
-              <a:schemeClr val="phClr">
-                <a:lumMod val="110000"/>
-                <a:satMod val="105000"/>
-                <a:tint val="67000"/>
-              </a:schemeClr>
-            </a:gs>
-            <a:gs pos="50000">
-              <a:schemeClr val="phClr">
-                <a:lumMod val="105000"/>
-                <a:satMod val="103000"/>
-                <a:tint val="73000"/>
-              </a:schemeClr>
-            </a:gs>
-            <a:gs pos="100000">
-              <a:schemeClr val="phClr">
-                <a:lumMod val="105000"/>
-                <a:satMod val="109000"/>
-                <a:tint val="81000"/>
-              </a:schemeClr>
-            </a:gs>
-          </a:gsLst>
-          <a:lin ang="5400000" scaled="0"/>
-        </a:gradFill>
-        <a:gradFill rotWithShape="1">
-          <a:gsLst>
-            <a:gs pos="0">
-              <a:schemeClr val="phClr">
-                <a:satMod val="103000"/>
-                <a:lumMod val="102000"/>
-                <a:tint val="94000"/>
-              </a:schemeClr>
-            </a:gs>
-            <a:gs pos="50000">
-              <a:schemeClr val="phClr">
-                <a:satMod val="110000"/>
-                <a:lumMod val="100000"/>
-                <a:shade val="100000"/>
-              </a:schemeClr>
-            </a:gs>
-            <a:gs pos="100000">
-              <a:schemeClr val="phClr">
-                <a:lumMod val="99000"/>
-                <a:satMod val="120000"/>
-                <a:shade val="78000"/>
-              </a:schemeClr>
-            </a:gs>
-          </a:gsLst>
-          <a:lin ang="5400000" scaled="0"/>
-        </a:gradFill>
-      </a:fillStyleLst>
-      <a:lnStyleLst>
-        <a:ln w="6350" cap="flat" cmpd="sng" algn="ctr">
-          <a:solidFill>
-            <a:schemeClr val="phClr"/>
-          </a:solidFill>
-          <a:prstDash val="solid"/>
-          <a:miter lim="800000"/>
-        </a:ln>
-        <a:ln w="12700" cap="flat" cmpd="sng" algn="ctr">
-          <a:solidFill>
-            <a:schemeClr val="phClr"/>
-          </a:solidFill>
-          <a:prstDash val="solid"/>
-          <a:miter lim="800000"/>
-        </a:ln>
-        <a:ln w="19050" cap="flat" cmpd="sng" algn="ctr">
-          <a:solidFill>
-            <a:schemeClr val="phClr"/>
-          </a:solidFill>
-          <a:prstDash val="solid"/>
-          <a:miter lim="800000"/>
-        </a:ln>
-      </a:lnStyleLst>
-      <a:effectStyleLst>
-        <a:effectStyle>
-          <a:effectLst/>
-        </a:effectStyle>
-        <a:effectStyle>
-          <a:effectLst/>
-        </a:effectStyle>
-        <a:effectStyle>
-          <a:effectLst>
-            <a:outerShdw blurRad="57150" dist="19050" dir="5400000" algn="ctr" rotWithShape="0">
-              <a:srgbClr val="000000">
-                <a:alpha val="63000"/>
-              </a:srgbClr>
-            </a:outerShdw>
-          </a:effectLst>
-        </a:effectStyle>
-      </a:effectStyleLst>
-      <a:bgFillStyleLst>
-        <a:solidFill>
-          <a:schemeClr val="phClr"/>
-        </a:solidFill>
-        <a:solidFill>
-          <a:schemeClr val="phClr">
-            <a:tint val="95000"/>
-            <a:satMod val="170000"/>
-          </a:schemeClr>
-        </a:solidFill>
-        <a:gradFill rotWithShape="1">
-          <a:gsLst>
-            <a:gs pos="0">
-              <a:schemeClr val="phClr">
-                <a:tint val="93000"/>
-                <a:satMod val="150000"/>
-                <a:shade val="98000"/>
-                <a:lumMod val="102000"/>
-              </a:schemeClr>
-            </a:gs>
-            <a:gs pos="50000">
-              <a:schemeClr val="phClr">
-                <a:tint val="98000"/>
-                <a:satMod val="130000"/>
-                <a:shade val="90000"/>
-                <a:lumMod val="103000"/>
-              </a:schemeClr>
-            </a:gs>
-            <a:gs pos="100000">
-              <a:schemeClr val="phClr">
-                <a:shade val="63000"/>
-                <a:satMod val="120000"/>
-              </a:schemeClr>
-            </a:gs>
-          </a:gsLst>
-          <a:lin ang="5400000" scaled="0"/>
-        </a:gradFill>
-      </a:bgFillStyleLst>
-    </a:fmtScheme>
-  </a:themeElements>
-  <a:objectDefaults/>
-  <a:extraClrSchemeLst/>
-  <a:extLst>
-    <a:ext uri="{05A4C25C-085E-4340-85A3-A5531E510DB2}">
-      <thm15:themeFamily xmlns:thm15="http://schemas.microsoft.com/office/thememl/2012/main" name="Office Theme" id="{62F939B6-93AF-4DB8-9C6B-D6C7DFDC589F}" vid="{4A3C46E8-61CC-4603-A589-7422A47A8E4A}"/>
-    </a:ext>
-  </a:extLst>
-</a:theme>
 </file>
</xml_diff>

<commit_message>
Work done by Fri Jul  1 14:10:34 PDT 2022
</commit_message>
<xml_diff>
--- a/docs/presentation-orig.pptx
+++ b/docs/presentation-orig.pptx
@@ -4215,7 +4215,7 @@
               <a:t>Whether you use Quarto from </a:t>
             </a:r>
             <a:r>
-              <a:rPr sz="1200">
+              <a:rPr>
                 <a:latin typeface="Consolas"/>
               </a:rPr>
               <a:t>.qmd</a:t>
@@ -4225,7 +4225,7 @@
               <a:t>, </a:t>
             </a:r>
             <a:r>
-              <a:rPr sz="1200">
+              <a:rPr>
                 <a:latin typeface="Consolas"/>
               </a:rPr>
               <a:t>.ipynb</a:t>
@@ -4235,7 +4235,7 @@
               <a:t>, or </a:t>
             </a:r>
             <a:r>
-              <a:rPr sz="1200">
+              <a:rPr>
                 <a:latin typeface="Consolas"/>
               </a:rPr>
               <a:t>.Rmd</a:t>
@@ -4254,7 +4254,7 @@
               <a:t>The YAML configuration determines what’s the output format of your document. A few popular output options are </a:t>
             </a:r>
             <a:r>
-              <a:rPr sz="1200">
+              <a:rPr>
                 <a:latin typeface="Consolas"/>
               </a:rPr>
               <a:t>html</a:t>
@@ -4264,7 +4264,7 @@
               <a:t>, </a:t>
             </a:r>
             <a:r>
-              <a:rPr sz="1200">
+              <a:rPr>
                 <a:latin typeface="Consolas"/>
               </a:rPr>
               <a:t>pptx</a:t>
@@ -4274,7 +4274,7 @@
               <a:t>, </a:t>
             </a:r>
             <a:r>
-              <a:rPr sz="1200">
+              <a:rPr>
                 <a:latin typeface="Consolas"/>
               </a:rPr>
               <a:t>docx</a:t>
@@ -4284,7 +4284,7 @@
               <a:t>, and </a:t>
             </a:r>
             <a:r>
-              <a:rPr sz="1200">
+              <a:rPr>
                 <a:latin typeface="Consolas"/>
               </a:rPr>
               <a:t>pdf</a:t>
@@ -4333,7 +4333,7 @@
               <a:buNone/>
             </a:pPr>
             <a:r>
-              <a:rPr sz="1200">
+              <a:rPr>
                 <a:solidFill>
                   <a:srgbClr val="AD0000"/>
                 </a:solidFill>
@@ -4343,7 +4343,7 @@
             </a:r>
             <a:br/>
             <a:r>
-              <a:rPr sz="1200">
+              <a:rPr>
                 <a:solidFill>
                   <a:srgbClr val="4758AB"/>
                 </a:solidFill>
@@ -4352,7 +4352,7 @@
               <a:t>title</a:t>
             </a:r>
             <a:r>
-              <a:rPr sz="1200">
+              <a:rPr>
                 <a:solidFill>
                   <a:srgbClr val="003B4F"/>
                 </a:solidFill>
@@ -4361,7 +4361,7 @@
               <a:t>:</a:t>
             </a:r>
             <a:r>
-              <a:rPr sz="1200">
+              <a:rPr>
                 <a:solidFill>
                   <a:srgbClr val="657422"/>
                 </a:solidFill>
@@ -4370,7 +4370,7 @@
               <a:t> </a:t>
             </a:r>
             <a:r>
-              <a:rPr sz="1200">
+              <a:rPr>
                 <a:solidFill>
                   <a:srgbClr val="20794D"/>
                 </a:solidFill>
@@ -4380,7 +4380,7 @@
             </a:r>
             <a:br/>
             <a:r>
-              <a:rPr sz="1200">
+              <a:rPr>
                 <a:solidFill>
                   <a:srgbClr val="4758AB"/>
                 </a:solidFill>
@@ -4389,7 +4389,7 @@
               <a:t>format</a:t>
             </a:r>
             <a:r>
-              <a:rPr sz="1200">
+              <a:rPr>
                 <a:solidFill>
                   <a:srgbClr val="003B4F"/>
                 </a:solidFill>
@@ -4398,7 +4398,7 @@
               <a:t>:</a:t>
             </a:r>
             <a:r>
-              <a:rPr sz="1200">
+              <a:rPr>
                 <a:solidFill>
                   <a:srgbClr val="657422"/>
                 </a:solidFill>
@@ -4408,7 +4408,7 @@
             </a:r>
             <a:br/>
             <a:r>
-              <a:rPr sz="1200">
+              <a:rPr>
                 <a:solidFill>
                   <a:srgbClr val="657422"/>
                 </a:solidFill>
@@ -4417,7 +4417,7 @@
               <a:t>    </a:t>
             </a:r>
             <a:r>
-              <a:rPr sz="1200">
+              <a:rPr>
                 <a:solidFill>
                   <a:srgbClr val="4758AB"/>
                 </a:solidFill>
@@ -4426,7 +4426,7 @@
               <a:t>pptx</a:t>
             </a:r>
             <a:r>
-              <a:rPr sz="1200">
+              <a:rPr>
                 <a:solidFill>
                   <a:srgbClr val="003B4F"/>
                 </a:solidFill>
@@ -4436,7 +4436,7 @@
             </a:r>
             <a:br/>
             <a:r>
-              <a:rPr sz="1200">
+              <a:rPr>
                 <a:solidFill>
                   <a:srgbClr val="657422"/>
                 </a:solidFill>
@@ -4445,7 +4445,7 @@
               <a:t>        </a:t>
             </a:r>
             <a:r>
-              <a:rPr sz="1200">
+              <a:rPr>
                 <a:solidFill>
                   <a:srgbClr val="4758AB"/>
                 </a:solidFill>
@@ -4454,7 +4454,7 @@
               <a:t>reference-doc</a:t>
             </a:r>
             <a:r>
-              <a:rPr sz="1200">
+              <a:rPr>
                 <a:solidFill>
                   <a:srgbClr val="003B4F"/>
                 </a:solidFill>
@@ -4463,7 +4463,7 @@
               <a:t>:</a:t>
             </a:r>
             <a:r>
-              <a:rPr sz="1200">
+              <a:rPr>
                 <a:solidFill>
                   <a:srgbClr val="657422"/>
                 </a:solidFill>
@@ -4473,7 +4473,7 @@
             </a:r>
             <a:br/>
             <a:r>
-              <a:rPr sz="1200">
+              <a:rPr>
                 <a:solidFill>
                   <a:srgbClr val="657422"/>
                 </a:solidFill>
@@ -4482,7 +4482,7 @@
               <a:t>    </a:t>
             </a:r>
             <a:r>
-              <a:rPr sz="1200">
+              <a:rPr>
                 <a:solidFill>
                   <a:srgbClr val="4758AB"/>
                 </a:solidFill>
@@ -4491,7 +4491,7 @@
               <a:t>revealjs</a:t>
             </a:r>
             <a:r>
-              <a:rPr sz="1200">
+              <a:rPr>
                 <a:solidFill>
                   <a:srgbClr val="003B4F"/>
                 </a:solidFill>
@@ -4501,7 +4501,7 @@
             </a:r>
             <a:br/>
             <a:r>
-              <a:rPr sz="1200">
+              <a:rPr>
                 <a:solidFill>
                   <a:srgbClr val="657422"/>
                 </a:solidFill>
@@ -4510,7 +4510,7 @@
               <a:t>        </a:t>
             </a:r>
             <a:r>
-              <a:rPr sz="1200">
+              <a:rPr>
                 <a:solidFill>
                   <a:srgbClr val="4758AB"/>
                 </a:solidFill>
@@ -4519,7 +4519,7 @@
               <a:t>incremental</a:t>
             </a:r>
             <a:r>
-              <a:rPr sz="1200">
+              <a:rPr>
                 <a:solidFill>
                   <a:srgbClr val="003B4F"/>
                 </a:solidFill>
@@ -4528,7 +4528,7 @@
               <a:t>:</a:t>
             </a:r>
             <a:r>
-              <a:rPr sz="1200">
+              <a:rPr>
                 <a:solidFill>
                   <a:srgbClr val="657422"/>
                 </a:solidFill>
@@ -4537,7 +4537,7 @@
               <a:t> </a:t>
             </a:r>
             <a:r>
-              <a:rPr sz="1200">
+              <a:rPr>
                 <a:solidFill>
                   <a:srgbClr val="20794D"/>
                 </a:solidFill>
@@ -4547,7 +4547,7 @@
             </a:r>
             <a:br/>
             <a:r>
-              <a:rPr sz="1200">
+              <a:rPr>
                 <a:solidFill>
                   <a:srgbClr val="657422"/>
                 </a:solidFill>
@@ -4556,7 +4556,7 @@
               <a:t>        </a:t>
             </a:r>
             <a:r>
-              <a:rPr sz="1200">
+              <a:rPr>
                 <a:solidFill>
                   <a:srgbClr val="4758AB"/>
                 </a:solidFill>
@@ -4565,7 +4565,7 @@
               <a:t>theme</a:t>
             </a:r>
             <a:r>
-              <a:rPr sz="1200">
+              <a:rPr>
                 <a:solidFill>
                   <a:srgbClr val="003B4F"/>
                 </a:solidFill>
@@ -4574,7 +4574,7 @@
               <a:t>:</a:t>
             </a:r>
             <a:r>
-              <a:rPr sz="1200">
+              <a:rPr>
                 <a:solidFill>
                   <a:srgbClr val="657422"/>
                 </a:solidFill>
@@ -4585,7 +4585,7 @@
             <a:br/>
             <a:br/>
             <a:r>
-              <a:rPr sz="1200">
+              <a:rPr>
                 <a:solidFill>
                   <a:srgbClr val="4758AB"/>
                 </a:solidFill>
@@ -4594,7 +4594,7 @@
               <a:t>author</a:t>
             </a:r>
             <a:r>
-              <a:rPr sz="1200">
+              <a:rPr>
                 <a:solidFill>
                   <a:srgbClr val="003B4F"/>
                 </a:solidFill>
@@ -4603,7 +4603,7 @@
               <a:t>:</a:t>
             </a:r>
             <a:r>
-              <a:rPr sz="1200">
+              <a:rPr>
                 <a:solidFill>
                   <a:srgbClr val="657422"/>
                 </a:solidFill>
@@ -4613,7 +4613,7 @@
             </a:r>
             <a:br/>
             <a:r>
-              <a:rPr sz="1200">
+              <a:rPr>
                 <a:solidFill>
                   <a:srgbClr val="4758AB"/>
                 </a:solidFill>
@@ -4622,7 +4622,7 @@
               <a:t>date</a:t>
             </a:r>
             <a:r>
-              <a:rPr sz="1200">
+              <a:rPr>
                 <a:solidFill>
                   <a:srgbClr val="003B4F"/>
                 </a:solidFill>
@@ -4631,7 +4631,7 @@
               <a:t>:</a:t>
             </a:r>
             <a:r>
-              <a:rPr sz="1200">
+              <a:rPr>
                 <a:solidFill>
                   <a:srgbClr val="657422"/>
                 </a:solidFill>
@@ -4641,7 +4641,7 @@
             </a:r>
             <a:br/>
             <a:r>
-              <a:rPr sz="1200">
+              <a:rPr>
                 <a:solidFill>
                   <a:srgbClr val="AD0000"/>
                 </a:solidFill>
@@ -4718,7 +4718,7 @@
               <a:buNone/>
             </a:pPr>
             <a:r>
-              <a:rPr sz="1200">
+              <a:rPr>
                 <a:solidFill>
                   <a:srgbClr val="4758AB"/>
                 </a:solidFill>
@@ -4729,7 +4729,7 @@
             <a:br/>
             <a:br/>
             <a:r>
-              <a:rPr sz="1200">
+              <a:rPr>
                 <a:solidFill>
                   <a:srgbClr val="003B4F"/>
                 </a:solidFill>
@@ -4738,7 +4738,7 @@
               <a:t>Most writing in Quarto is done in </a:t>
             </a:r>
             <a:r>
-              <a:rPr sz="1200">
+              <a:rPr>
                 <a:solidFill>
                   <a:srgbClr val="5E5E5E"/>
                 </a:solidFill>
@@ -4747,7 +4747,7 @@
               <a:t>[</a:t>
             </a:r>
             <a:r>
-              <a:rPr sz="1200">
+              <a:rPr>
                 <a:solidFill>
                   <a:srgbClr val="003B4F"/>
                 </a:solidFill>
@@ -4756,7 +4756,7 @@
               <a:t>Markdown</a:t>
             </a:r>
             <a:r>
-              <a:rPr sz="1200">
+              <a:rPr>
                 <a:solidFill>
                   <a:srgbClr val="5E5E5E"/>
                 </a:solidFill>
@@ -4765,7 +4765,7 @@
               <a:t>]</a:t>
             </a:r>
             <a:r>
-              <a:rPr sz="1200">
+              <a:rPr>
                 <a:solidFill>
                   <a:srgbClr val="003B4F"/>
                 </a:solidFill>
@@ -4776,7 +4776,7 @@
             <a:br/>
             <a:br/>
             <a:r>
-              <a:rPr sz="1200">
+              <a:rPr>
                 <a:solidFill>
                   <a:srgbClr val="003B4F"/>
                 </a:solidFill>
@@ -4786,7 +4786,7 @@
             </a:r>
             <a:br/>
             <a:r>
-              <a:rPr sz="1200">
+              <a:rPr>
                 <a:solidFill>
                   <a:srgbClr val="003B4F"/>
                 </a:solidFill>
@@ -4797,7 +4797,7 @@
             <a:br/>
             <a:br/>
             <a:r>
-              <a:rPr sz="1200">
+              <a:rPr>
                 <a:solidFill>
                   <a:srgbClr val="003B4F"/>
                 </a:solidFill>
@@ -4807,7 +4807,7 @@
             </a:r>
             <a:br/>
             <a:r>
-              <a:rPr sz="1200">
+              <a:rPr>
                 <a:solidFill>
                   <a:srgbClr val="003B4F"/>
                 </a:solidFill>
@@ -4816,7 +4816,7 @@
               <a:t>diagrams with </a:t>
             </a:r>
             <a:r>
-              <a:rPr sz="1200">
+              <a:rPr>
                 <a:solidFill>
                   <a:srgbClr val="5E5E5E"/>
                 </a:solidFill>
@@ -4825,7 +4825,7 @@
               <a:t>`mermaid`</a:t>
             </a:r>
             <a:r>
-              <a:rPr sz="1200">
+              <a:rPr>
                 <a:solidFill>
                   <a:srgbClr val="003B4F"/>
                 </a:solidFill>
@@ -4834,7 +4834,7 @@
               <a:t> and </a:t>
             </a:r>
             <a:r>
-              <a:rPr sz="1200">
+              <a:rPr>
                 <a:solidFill>
                   <a:srgbClr val="5E5E5E"/>
                 </a:solidFill>
@@ -4843,7 +4843,7 @@
               <a:t>`GraphViz`</a:t>
             </a:r>
             <a:r>
-              <a:rPr sz="1200">
+              <a:rPr>
                 <a:solidFill>
                   <a:srgbClr val="003B4F"/>
                 </a:solidFill>
@@ -4853,7 +4853,7 @@
             </a:r>
             <a:br/>
             <a:r>
-              <a:rPr sz="1200">
+              <a:rPr>
                 <a:solidFill>
                   <a:srgbClr val="003B4F"/>
                 </a:solidFill>
@@ -4864,7 +4864,7 @@
             <a:br/>
             <a:br/>
             <a:r>
-              <a:rPr sz="1200">
+              <a:rPr>
                 <a:solidFill>
                   <a:srgbClr val="003B4F"/>
                 </a:solidFill>
@@ -4874,7 +4874,7 @@
             </a:r>
             <a:br/>
             <a:r>
-              <a:rPr sz="1200">
+              <a:rPr>
                 <a:solidFill>
                   <a:srgbClr val="003B4F"/>
                 </a:solidFill>
@@ -4884,7 +4884,7 @@
             </a:r>
             <a:br/>
             <a:r>
-              <a:rPr sz="1200">
+              <a:rPr>
                 <a:solidFill>
                   <a:srgbClr val="003B4F"/>
                 </a:solidFill>
@@ -5098,7 +5098,7 @@
             </a:pPr>
             <a:br/>
             <a:r>
-              <a:rPr sz="1200">
+              <a:rPr>
                 <a:solidFill>
                   <a:srgbClr val="00769E"/>
                 </a:solidFill>
@@ -5107,7 +5107,7 @@
               <a:t>import</a:t>
             </a:r>
             <a:r>
-              <a:rPr sz="1200">
+              <a:rPr>
                 <a:solidFill>
                   <a:srgbClr val="003B4F"/>
                 </a:solidFill>
@@ -5116,7 +5116,7 @@
               <a:t> numpy </a:t>
             </a:r>
             <a:r>
-              <a:rPr sz="1200">
+              <a:rPr>
                 <a:solidFill>
                   <a:srgbClr val="00769E"/>
                 </a:solidFill>
@@ -5125,7 +5125,7 @@
               <a:t>as</a:t>
             </a:r>
             <a:r>
-              <a:rPr sz="1200">
+              <a:rPr>
                 <a:solidFill>
                   <a:srgbClr val="003B4F"/>
                 </a:solidFill>
@@ -5135,7 +5135,7 @@
             </a:r>
             <a:br/>
             <a:r>
-              <a:rPr sz="1200">
+              <a:rPr>
                 <a:solidFill>
                   <a:srgbClr val="00769E"/>
                 </a:solidFill>
@@ -5144,7 +5144,7 @@
               <a:t>import</a:t>
             </a:r>
             <a:r>
-              <a:rPr sz="1200">
+              <a:rPr>
                 <a:solidFill>
                   <a:srgbClr val="003B4F"/>
                 </a:solidFill>
@@ -5153,7 +5153,7 @@
               <a:t> matplotlib.pyplot </a:t>
             </a:r>
             <a:r>
-              <a:rPr sz="1200">
+              <a:rPr>
                 <a:solidFill>
                   <a:srgbClr val="00769E"/>
                 </a:solidFill>
@@ -5162,7 +5162,7 @@
               <a:t>as</a:t>
             </a:r>
             <a:r>
-              <a:rPr sz="1200">
+              <a:rPr>
                 <a:solidFill>
                   <a:srgbClr val="003B4F"/>
                 </a:solidFill>
@@ -5173,7 +5173,7 @@
             <a:br/>
             <a:br/>
             <a:r>
-              <a:rPr sz="1200">
+              <a:rPr>
                 <a:solidFill>
                   <a:srgbClr val="003B4F"/>
                 </a:solidFill>
@@ -5182,7 +5182,7 @@
               <a:t>r </a:t>
             </a:r>
             <a:r>
-              <a:rPr sz="1200">
+              <a:rPr>
                 <a:solidFill>
                   <a:srgbClr val="5E5E5E"/>
                 </a:solidFill>
@@ -5191,7 +5191,7 @@
               <a:t>=</a:t>
             </a:r>
             <a:r>
-              <a:rPr sz="1200">
+              <a:rPr>
                 <a:solidFill>
                   <a:srgbClr val="003B4F"/>
                 </a:solidFill>
@@ -5200,7 +5200,7 @@
               <a:t> np.arange(</a:t>
             </a:r>
             <a:r>
-              <a:rPr sz="1200">
+              <a:rPr>
                 <a:solidFill>
                   <a:srgbClr val="AD0000"/>
                 </a:solidFill>
@@ -5209,7 +5209,7 @@
               <a:t>0</a:t>
             </a:r>
             <a:r>
-              <a:rPr sz="1200">
+              <a:rPr>
                 <a:solidFill>
                   <a:srgbClr val="003B4F"/>
                 </a:solidFill>
@@ -5218,7 +5218,7 @@
               <a:t>, </a:t>
             </a:r>
             <a:r>
-              <a:rPr sz="1200">
+              <a:rPr>
                 <a:solidFill>
                   <a:srgbClr val="AD0000"/>
                 </a:solidFill>
@@ -5227,7 +5227,7 @@
               <a:t>2</a:t>
             </a:r>
             <a:r>
-              <a:rPr sz="1200">
+              <a:rPr>
                 <a:solidFill>
                   <a:srgbClr val="003B4F"/>
                 </a:solidFill>
@@ -5236,7 +5236,7 @@
               <a:t>, </a:t>
             </a:r>
             <a:r>
-              <a:rPr sz="1200">
+              <a:rPr>
                 <a:solidFill>
                   <a:srgbClr val="AD0000"/>
                 </a:solidFill>
@@ -5245,7 +5245,7 @@
               <a:t>0.01</a:t>
             </a:r>
             <a:r>
-              <a:rPr sz="1200">
+              <a:rPr>
                 <a:solidFill>
                   <a:srgbClr val="003B4F"/>
                 </a:solidFill>
@@ -5255,7 +5255,7 @@
             </a:r>
             <a:br/>
             <a:r>
-              <a:rPr sz="1200">
+              <a:rPr>
                 <a:solidFill>
                   <a:srgbClr val="003B4F"/>
                 </a:solidFill>
@@ -5264,7 +5264,7 @@
               <a:t>theta </a:t>
             </a:r>
             <a:r>
-              <a:rPr sz="1200">
+              <a:rPr>
                 <a:solidFill>
                   <a:srgbClr val="5E5E5E"/>
                 </a:solidFill>
@@ -5273,7 +5273,7 @@
               <a:t>=</a:t>
             </a:r>
             <a:r>
-              <a:rPr sz="1200">
+              <a:rPr>
                 <a:solidFill>
                   <a:srgbClr val="003B4F"/>
                 </a:solidFill>
@@ -5282,7 +5282,7 @@
               <a:t> </a:t>
             </a:r>
             <a:r>
-              <a:rPr sz="1200">
+              <a:rPr>
                 <a:solidFill>
                   <a:srgbClr val="AD0000"/>
                 </a:solidFill>
@@ -5291,7 +5291,7 @@
               <a:t>2</a:t>
             </a:r>
             <a:r>
-              <a:rPr sz="1200">
+              <a:rPr>
                 <a:solidFill>
                   <a:srgbClr val="003B4F"/>
                 </a:solidFill>
@@ -5300,7 +5300,7 @@
               <a:t> </a:t>
             </a:r>
             <a:r>
-              <a:rPr sz="1200">
+              <a:rPr>
                 <a:solidFill>
                   <a:srgbClr val="5E5E5E"/>
                 </a:solidFill>
@@ -5309,7 +5309,7 @@
               <a:t>*</a:t>
             </a:r>
             <a:r>
-              <a:rPr sz="1200">
+              <a:rPr>
                 <a:solidFill>
                   <a:srgbClr val="003B4F"/>
                 </a:solidFill>
@@ -5318,7 +5318,7 @@
               <a:t> np.pi </a:t>
             </a:r>
             <a:r>
-              <a:rPr sz="1200">
+              <a:rPr>
                 <a:solidFill>
                   <a:srgbClr val="5E5E5E"/>
                 </a:solidFill>
@@ -5327,7 +5327,7 @@
               <a:t>*</a:t>
             </a:r>
             <a:r>
-              <a:rPr sz="1200">
+              <a:rPr>
                 <a:solidFill>
                   <a:srgbClr val="003B4F"/>
                 </a:solidFill>
@@ -5337,7 +5337,7 @@
             </a:r>
             <a:br/>
             <a:r>
-              <a:rPr sz="1200">
+              <a:rPr>
                 <a:solidFill>
                   <a:srgbClr val="003B4F"/>
                 </a:solidFill>
@@ -5346,7 +5346,7 @@
               <a:t>fig, ax </a:t>
             </a:r>
             <a:r>
-              <a:rPr sz="1200">
+              <a:rPr>
                 <a:solidFill>
                   <a:srgbClr val="5E5E5E"/>
                 </a:solidFill>
@@ -5355,7 +5355,7 @@
               <a:t>=</a:t>
             </a:r>
             <a:r>
-              <a:rPr sz="1200">
+              <a:rPr>
                 <a:solidFill>
                   <a:srgbClr val="003B4F"/>
                 </a:solidFill>
@@ -5364,7 +5364,7 @@
               <a:t> plt.subplots(subplot_kw</a:t>
             </a:r>
             <a:r>
-              <a:rPr sz="1200">
+              <a:rPr>
                 <a:solidFill>
                   <a:srgbClr val="5E5E5E"/>
                 </a:solidFill>
@@ -5374,7 +5374,7 @@
             </a:r>
             <a:br/>
             <a:r>
-              <a:rPr sz="1200">
+              <a:rPr>
                 <a:solidFill>
                   <a:srgbClr val="003B4F"/>
                 </a:solidFill>
@@ -5383,7 +5383,7 @@
               <a:t>                {</a:t>
             </a:r>
             <a:r>
-              <a:rPr sz="1200">
+              <a:rPr>
                 <a:solidFill>
                   <a:srgbClr val="20794D"/>
                 </a:solidFill>
@@ -5392,7 +5392,7 @@
               <a:t>'projection'</a:t>
             </a:r>
             <a:r>
-              <a:rPr sz="1200">
+              <a:rPr>
                 <a:solidFill>
                   <a:srgbClr val="003B4F"/>
                 </a:solidFill>
@@ -5401,7 +5401,7 @@
               <a:t>: </a:t>
             </a:r>
             <a:r>
-              <a:rPr sz="1200">
+              <a:rPr>
                 <a:solidFill>
                   <a:srgbClr val="20794D"/>
                 </a:solidFill>
@@ -5410,7 +5410,7 @@
               <a:t>'polar'</a:t>
             </a:r>
             <a:r>
-              <a:rPr sz="1200">
+              <a:rPr>
                 <a:solidFill>
                   <a:srgbClr val="003B4F"/>
                 </a:solidFill>
@@ -5420,7 +5420,7 @@
             </a:r>
             <a:br/>
             <a:r>
-              <a:rPr sz="1200">
+              <a:rPr>
                 <a:solidFill>
                   <a:srgbClr val="003B4F"/>
                 </a:solidFill>
@@ -5430,7 +5430,7 @@
             </a:r>
             <a:br/>
             <a:r>
-              <a:rPr sz="1200">
+              <a:rPr>
                 <a:solidFill>
                   <a:srgbClr val="003B4F"/>
                 </a:solidFill>
@@ -5439,7 +5439,7 @@
               <a:t>ax.set_rticks([</a:t>
             </a:r>
             <a:r>
-              <a:rPr sz="1200">
+              <a:rPr>
                 <a:solidFill>
                   <a:srgbClr val="AD0000"/>
                 </a:solidFill>
@@ -5448,7 +5448,7 @@
               <a:t>0.5</a:t>
             </a:r>
             <a:r>
-              <a:rPr sz="1200">
+              <a:rPr>
                 <a:solidFill>
                   <a:srgbClr val="003B4F"/>
                 </a:solidFill>
@@ -5457,7 +5457,7 @@
               <a:t>, </a:t>
             </a:r>
             <a:r>
-              <a:rPr sz="1200">
+              <a:rPr>
                 <a:solidFill>
                   <a:srgbClr val="AD0000"/>
                 </a:solidFill>
@@ -5466,7 +5466,7 @@
               <a:t>1</a:t>
             </a:r>
             <a:r>
-              <a:rPr sz="1200">
+              <a:rPr>
                 <a:solidFill>
                   <a:srgbClr val="003B4F"/>
                 </a:solidFill>
@@ -5475,7 +5475,7 @@
               <a:t>, </a:t>
             </a:r>
             <a:r>
-              <a:rPr sz="1200">
+              <a:rPr>
                 <a:solidFill>
                   <a:srgbClr val="AD0000"/>
                 </a:solidFill>
@@ -5484,7 +5484,7 @@
               <a:t>1.5</a:t>
             </a:r>
             <a:r>
-              <a:rPr sz="1200">
+              <a:rPr>
                 <a:solidFill>
                   <a:srgbClr val="003B4F"/>
                 </a:solidFill>
@@ -5493,7 +5493,7 @@
               <a:t>, </a:t>
             </a:r>
             <a:r>
-              <a:rPr sz="1200">
+              <a:rPr>
                 <a:solidFill>
                   <a:srgbClr val="AD0000"/>
                 </a:solidFill>
@@ -5502,7 +5502,7 @@
               <a:t>2</a:t>
             </a:r>
             <a:r>
-              <a:rPr sz="1200">
+              <a:rPr>
                 <a:solidFill>
                   <a:srgbClr val="003B4F"/>
                 </a:solidFill>
@@ -5512,7 +5512,7 @@
             </a:r>
             <a:br/>
             <a:r>
-              <a:rPr sz="1200">
+              <a:rPr>
                 <a:solidFill>
                   <a:srgbClr val="003B4F"/>
                 </a:solidFill>
@@ -5521,7 +5521,7 @@
               <a:t>ax.grid(</a:t>
             </a:r>
             <a:r>
-              <a:rPr sz="1200">
+              <a:rPr>
                 <a:solidFill>
                   <a:srgbClr val="111111"/>
                 </a:solidFill>
@@ -5530,7 +5530,7 @@
               <a:t>True</a:t>
             </a:r>
             <a:r>
-              <a:rPr sz="1200">
+              <a:rPr>
                 <a:solidFill>
                   <a:srgbClr val="003B4F"/>
                 </a:solidFill>
@@ -5540,7 +5540,7 @@
             </a:r>
             <a:br/>
             <a:r>
-              <a:rPr sz="1200">
+              <a:rPr>
                 <a:solidFill>
                   <a:srgbClr val="003B4F"/>
                 </a:solidFill>
@@ -5699,7 +5699,7 @@
               <a:buNone/>
             </a:pPr>
             <a:r>
-              <a:rPr sz="1200">
+              <a:rPr>
                 <a:solidFill>
                   <a:srgbClr val="003B4F"/>
                 </a:solidFill>
@@ -5709,7 +5709,7 @@
             </a:r>
             <a:br/>
             <a:r>
-              <a:rPr sz="1200">
+              <a:rPr>
                 <a:solidFill>
                   <a:srgbClr val="003B4F"/>
                 </a:solidFill>
@@ -5718,7 +5718,7 @@
               <a:t>with </a:t>
             </a:r>
             <a:r>
-              <a:rPr sz="1200">
+              <a:rPr>
                 <a:solidFill>
                   <a:srgbClr val="5E5E5E"/>
                 </a:solidFill>
@@ -5727,7 +5727,7 @@
               <a:t>`#`</a:t>
             </a:r>
             <a:r>
-              <a:rPr sz="1200">
+              <a:rPr>
                 <a:solidFill>
                   <a:srgbClr val="003B4F"/>
                 </a:solidFill>
@@ -5736,7 +5736,7 @@
               <a:t>, titles with </a:t>
             </a:r>
             <a:r>
-              <a:rPr sz="1200">
+              <a:rPr>
                 <a:solidFill>
                   <a:srgbClr val="5E5E5E"/>
                 </a:solidFill>
@@ -5745,7 +5745,7 @@
               <a:t>`##`</a:t>
             </a:r>
             <a:r>
-              <a:rPr sz="1200">
+              <a:rPr>
                 <a:solidFill>
                   <a:srgbClr val="003B4F"/>
                 </a:solidFill>
@@ -5755,7 +5755,7 @@
             </a:r>
             <a:br/>
             <a:r>
-              <a:rPr sz="1200">
+              <a:rPr>
                 <a:solidFill>
                   <a:srgbClr val="003B4F"/>
                 </a:solidFill>
@@ -5764,7 +5764,7 @@
               <a:t>with </a:t>
             </a:r>
             <a:r>
-              <a:rPr sz="1200">
+              <a:rPr>
                 <a:solidFill>
                   <a:srgbClr val="5E5E5E"/>
                 </a:solidFill>
@@ -5773,7 +5773,7 @@
               <a:t>`-`</a:t>
             </a:r>
             <a:r>
-              <a:rPr sz="1200">
+              <a:rPr>
                 <a:solidFill>
                   <a:srgbClr val="003B4F"/>
                 </a:solidFill>
@@ -5784,7 +5784,7 @@
             <a:br/>
             <a:br/>
             <a:r>
-              <a:rPr sz="1200">
+              <a:rPr>
                 <a:solidFill>
                   <a:srgbClr val="003B4F"/>
                 </a:solidFill>
@@ -5795,7 +5795,7 @@
             <a:br/>
             <a:br/>
             <a:r>
-              <a:rPr sz="1200">
+              <a:rPr>
                 <a:solidFill>
                   <a:srgbClr val="4758AB"/>
                 </a:solidFill>
@@ -5806,7 +5806,7 @@
             <a:br/>
             <a:br/>
             <a:r>
-              <a:rPr sz="1200">
+              <a:rPr>
                 <a:solidFill>
                   <a:srgbClr val="20794D"/>
                 </a:solidFill>
@@ -5815,7 +5815,7 @@
               <a:t>- </a:t>
             </a:r>
             <a:r>
-              <a:rPr sz="1200">
+              <a:rPr>
                 <a:solidFill>
                   <a:srgbClr val="003B4F"/>
                 </a:solidFill>
@@ -5825,7 +5825,7 @@
             </a:r>
             <a:br/>
             <a:r>
-              <a:rPr sz="1200">
+              <a:rPr>
                 <a:solidFill>
                   <a:srgbClr val="20794D"/>
                 </a:solidFill>
@@ -5834,7 +5834,7 @@
               <a:t>    - </a:t>
             </a:r>
             <a:r>
-              <a:rPr sz="1200">
+              <a:rPr>
                 <a:solidFill>
                   <a:srgbClr val="003B4F"/>
                 </a:solidFill>
@@ -5844,7 +5844,7 @@
             </a:r>
             <a:br/>
             <a:r>
-              <a:rPr sz="1200">
+              <a:rPr>
                 <a:solidFill>
                   <a:srgbClr val="20794D"/>
                 </a:solidFill>
@@ -5853,7 +5853,7 @@
               <a:t>    - </a:t>
             </a:r>
             <a:r>
-              <a:rPr sz="1200">
+              <a:rPr>
                 <a:solidFill>
                   <a:srgbClr val="003B4F"/>
                 </a:solidFill>
@@ -5863,7 +5863,7 @@
             </a:r>
             <a:br/>
             <a:r>
-              <a:rPr sz="1200">
+              <a:rPr>
                 <a:solidFill>
                   <a:srgbClr val="20794D"/>
                 </a:solidFill>
@@ -5872,7 +5872,7 @@
               <a:t>    - </a:t>
             </a:r>
             <a:r>
-              <a:rPr sz="1200">
+              <a:rPr>
                 <a:solidFill>
                   <a:srgbClr val="003B4F"/>
                 </a:solidFill>
@@ -5882,7 +5882,7 @@
             </a:r>
             <a:br/>
             <a:r>
-              <a:rPr sz="1200">
+              <a:rPr>
                 <a:solidFill>
                   <a:srgbClr val="20794D"/>
                 </a:solidFill>
@@ -5891,7 +5891,7 @@
               <a:t>    - </a:t>
             </a:r>
             <a:r>
-              <a:rPr sz="1200">
+              <a:rPr>
                 <a:solidFill>
                   <a:srgbClr val="003B4F"/>
                 </a:solidFill>
@@ -5901,7 +5901,7 @@
             </a:r>
             <a:br/>
             <a:r>
-              <a:rPr sz="1200">
+              <a:rPr>
                 <a:solidFill>
                   <a:srgbClr val="20794D"/>
                 </a:solidFill>
@@ -5910,7 +5910,7 @@
               <a:t>    - </a:t>
             </a:r>
             <a:r>
-              <a:rPr sz="1200">
+              <a:rPr>
                 <a:solidFill>
                   <a:srgbClr val="003B4F"/>
                 </a:solidFill>
@@ -5944,7 +5944,7 @@
               <a:t>To create slides, you create sections with </a:t>
             </a:r>
             <a:r>
-              <a:rPr sz="1200">
+              <a:rPr>
                 <a:latin typeface="Consolas"/>
               </a:rPr>
               <a:t>#</a:t>
@@ -5954,7 +5954,7 @@
               <a:t>, titles with </a:t>
             </a:r>
             <a:r>
-              <a:rPr sz="1200">
+              <a:rPr>
                 <a:latin typeface="Consolas"/>
               </a:rPr>
               <a:t>##</a:t>
@@ -5964,7 +5964,7 @@
               <a:t>, and bullets with </a:t>
             </a:r>
             <a:r>
-              <a:rPr sz="1200">
+              <a:rPr>
                 <a:latin typeface="Consolas"/>
               </a:rPr>
               <a:t>-</a:t>
@@ -6123,7 +6123,7 @@
               <a:buNone/>
             </a:pPr>
             <a:r>
-              <a:rPr sz="1200">
+              <a:rPr>
                 <a:solidFill>
                   <a:srgbClr val="003B4F"/>
                 </a:solidFill>
@@ -6132,7 +6132,7 @@
               <a:t>df_dr </a:t>
             </a:r>
             <a:r>
-              <a:rPr sz="1200">
+              <a:rPr>
                 <a:solidFill>
                   <a:srgbClr val="5E5E5E"/>
                 </a:solidFill>
@@ -6141,7 +6141,7 @@
               <a:t>=</a:t>
             </a:r>
             <a:r>
-              <a:rPr sz="1200">
+              <a:rPr>
                 <a:solidFill>
                   <a:srgbClr val="003B4F"/>
                 </a:solidFill>
@@ -6150,7 +6150,7 @@
               <a:t> pd.read_csv(</a:t>
             </a:r>
             <a:r>
-              <a:rPr sz="1200">
+              <a:rPr>
                 <a:solidFill>
                   <a:srgbClr val="20794D"/>
                 </a:solidFill>
@@ -6159,7 +6159,7 @@
               <a:t>"data/dr.csv.gz"</a:t>
             </a:r>
             <a:r>
-              <a:rPr sz="1200">
+              <a:rPr>
                 <a:solidFill>
                   <a:srgbClr val="003B4F"/>
                 </a:solidFill>
@@ -6168,7 +6168,7 @@
               <a:t>, compression</a:t>
             </a:r>
             <a:r>
-              <a:rPr sz="1200">
+              <a:rPr>
                 <a:solidFill>
                   <a:srgbClr val="5E5E5E"/>
                 </a:solidFill>
@@ -6177,7 +6177,7 @@
               <a:t>=</a:t>
             </a:r>
             <a:r>
-              <a:rPr sz="1200">
+              <a:rPr>
                 <a:solidFill>
                   <a:srgbClr val="20794D"/>
                 </a:solidFill>
@@ -6186,7 +6186,7 @@
               <a:t>"gzip"</a:t>
             </a:r>
             <a:r>
-              <a:rPr sz="1200">
+              <a:rPr>
                 <a:solidFill>
                   <a:srgbClr val="003B4F"/>
                 </a:solidFill>
@@ -6196,7 +6196,7 @@
             </a:r>
             <a:br/>
             <a:r>
-              <a:rPr sz="1200">
+              <a:rPr>
                 <a:solidFill>
                   <a:srgbClr val="003B4F"/>
                 </a:solidFill>
@@ -6205,7 +6205,7 @@
               <a:t>df_pop </a:t>
             </a:r>
             <a:r>
-              <a:rPr sz="1200">
+              <a:rPr>
                 <a:solidFill>
                   <a:srgbClr val="5E5E5E"/>
                 </a:solidFill>
@@ -6214,7 +6214,7 @@
               <a:t>=</a:t>
             </a:r>
             <a:r>
-              <a:rPr sz="1200">
+              <a:rPr>
                 <a:solidFill>
                   <a:srgbClr val="003B4F"/>
                 </a:solidFill>
@@ -6223,7 +6223,7 @@
               <a:t> pd.read_csv(</a:t>
             </a:r>
             <a:r>
-              <a:rPr sz="1200">
+              <a:rPr>
                 <a:solidFill>
                   <a:srgbClr val="20794D"/>
                 </a:solidFill>
@@ -6232,7 +6232,7 @@
               <a:t>"data/pop_brackets.csv.gz"</a:t>
             </a:r>
             <a:r>
-              <a:rPr sz="1200">
+              <a:rPr>
                 <a:solidFill>
                   <a:srgbClr val="003B4F"/>
                 </a:solidFill>
@@ -6241,7 +6241,7 @@
               <a:t>, compression</a:t>
             </a:r>
             <a:r>
-              <a:rPr sz="1200">
+              <a:rPr>
                 <a:solidFill>
                   <a:srgbClr val="5E5E5E"/>
                 </a:solidFill>
@@ -6250,7 +6250,7 @@
               <a:t>=</a:t>
             </a:r>
             <a:r>
-              <a:rPr sz="1200">
+              <a:rPr>
                 <a:solidFill>
                   <a:srgbClr val="20794D"/>
                 </a:solidFill>
@@ -6259,7 +6259,7 @@
               <a:t>"gzip"</a:t>
             </a:r>
             <a:r>
-              <a:rPr sz="1200">
+              <a:rPr>
                 <a:solidFill>
                   <a:srgbClr val="003B4F"/>
                 </a:solidFill>
@@ -6270,7 +6270,7 @@
             <a:br/>
             <a:br/>
             <a:r>
-              <a:rPr sz="1200">
+              <a:rPr>
                 <a:solidFill>
                   <a:srgbClr val="003B4F"/>
                 </a:solidFill>
@@ -6279,7 +6279,7 @@
               <a:t>years </a:t>
             </a:r>
             <a:r>
-              <a:rPr sz="1200">
+              <a:rPr>
                 <a:solidFill>
                   <a:srgbClr val="5E5E5E"/>
                 </a:solidFill>
@@ -6288,7 +6288,7 @@
               <a:t>=</a:t>
             </a:r>
             <a:r>
-              <a:rPr sz="1200">
+              <a:rPr>
                 <a:solidFill>
                   <a:srgbClr val="003B4F"/>
                 </a:solidFill>
@@ -6297,7 +6297,7 @@
               <a:t> [</a:t>
             </a:r>
             <a:r>
-              <a:rPr sz="1200">
+              <a:rPr>
                 <a:solidFill>
                   <a:srgbClr val="AD0000"/>
                 </a:solidFill>
@@ -6306,7 +6306,7 @@
               <a:t>2000</a:t>
             </a:r>
             <a:r>
-              <a:rPr sz="1200">
+              <a:rPr>
                 <a:solidFill>
                   <a:srgbClr val="003B4F"/>
                 </a:solidFill>
@@ -6315,7 +6315,7 @@
               <a:t>, </a:t>
             </a:r>
             <a:r>
-              <a:rPr sz="1200">
+              <a:rPr>
                 <a:solidFill>
                   <a:srgbClr val="AD0000"/>
                 </a:solidFill>
@@ -6324,7 +6324,7 @@
               <a:t>2025</a:t>
             </a:r>
             <a:r>
-              <a:rPr sz="1200">
+              <a:rPr>
                 <a:solidFill>
                   <a:srgbClr val="003B4F"/>
                 </a:solidFill>
@@ -6333,7 +6333,7 @@
               <a:t>, </a:t>
             </a:r>
             <a:r>
-              <a:rPr sz="1200">
+              <a:rPr>
                 <a:solidFill>
                   <a:srgbClr val="AD0000"/>
                 </a:solidFill>
@@ -6342,7 +6342,7 @@
               <a:t>2050</a:t>
             </a:r>
             <a:r>
-              <a:rPr sz="1200">
+              <a:rPr>
                 <a:solidFill>
                   <a:srgbClr val="003B4F"/>
                 </a:solidFill>
@@ -6351,7 +6351,7 @@
               <a:t>, </a:t>
             </a:r>
             <a:r>
-              <a:rPr sz="1200">
+              <a:rPr>
                 <a:solidFill>
                   <a:srgbClr val="AD0000"/>
                 </a:solidFill>
@@ -6360,7 +6360,7 @@
               <a:t>2075</a:t>
             </a:r>
             <a:r>
-              <a:rPr sz="1200">
+              <a:rPr>
                 <a:solidFill>
                   <a:srgbClr val="003B4F"/>
                 </a:solidFill>
@@ -6369,7 +6369,7 @@
               <a:t>, </a:t>
             </a:r>
             <a:r>
-              <a:rPr sz="1200">
+              <a:rPr>
                 <a:solidFill>
                   <a:srgbClr val="AD0000"/>
                 </a:solidFill>
@@ -6378,7 +6378,7 @@
               <a:t>2100</a:t>
             </a:r>
             <a:r>
-              <a:rPr sz="1200">
+              <a:rPr>
                 <a:solidFill>
                   <a:srgbClr val="003B4F"/>
                 </a:solidFill>
@@ -6388,7 +6388,7 @@
             </a:r>
             <a:br/>
             <a:r>
-              <a:rPr sz="1200">
+              <a:rPr>
                 <a:solidFill>
                   <a:srgbClr val="003B4F"/>
                 </a:solidFill>
@@ -6397,7 +6397,7 @@
               <a:t>regions </a:t>
             </a:r>
             <a:r>
-              <a:rPr sz="1200">
+              <a:rPr>
                 <a:solidFill>
                   <a:srgbClr val="5E5E5E"/>
                 </a:solidFill>
@@ -6406,7 +6406,7 @@
               <a:t>=</a:t>
             </a:r>
             <a:r>
-              <a:rPr sz="1200">
+              <a:rPr>
                 <a:solidFill>
                   <a:srgbClr val="003B4F"/>
                 </a:solidFill>
@@ -6415,7 +6415,7 @@
               <a:t> [</a:t>
             </a:r>
             <a:r>
-              <a:rPr sz="1200">
+              <a:rPr>
                 <a:solidFill>
                   <a:srgbClr val="20794D"/>
                 </a:solidFill>
@@ -6424,7 +6424,7 @@
               <a:t>"Belgium"</a:t>
             </a:r>
             <a:r>
-              <a:rPr sz="1200">
+              <a:rPr>
                 <a:solidFill>
                   <a:srgbClr val="003B4F"/>
                 </a:solidFill>
@@ -6433,7 +6433,7 @@
               <a:t>, </a:t>
             </a:r>
             <a:r>
-              <a:rPr sz="1200">
+              <a:rPr>
                 <a:solidFill>
                   <a:srgbClr val="20794D"/>
                 </a:solidFill>
@@ -6442,7 +6442,7 @@
               <a:t>"China"</a:t>
             </a:r>
             <a:r>
-              <a:rPr sz="1200">
+              <a:rPr>
                 <a:solidFill>
                   <a:srgbClr val="003B4F"/>
                 </a:solidFill>
@@ -6451,7 +6451,7 @@
               <a:t>, </a:t>
             </a:r>
             <a:r>
-              <a:rPr sz="1200">
+              <a:rPr>
                 <a:solidFill>
                   <a:srgbClr val="20794D"/>
                 </a:solidFill>
@@ -6460,7 +6460,7 @@
               <a:t>"Brazil"</a:t>
             </a:r>
             <a:r>
-              <a:rPr sz="1200">
+              <a:rPr>
                 <a:solidFill>
                   <a:srgbClr val="003B4F"/>
                 </a:solidFill>
@@ -6469,7 +6469,7 @@
               <a:t>, </a:t>
             </a:r>
             <a:r>
-              <a:rPr sz="1200">
+              <a:rPr>
                 <a:solidFill>
                   <a:srgbClr val="20794D"/>
                 </a:solidFill>
@@ -6478,7 +6478,7 @@
               <a:t>"India"</a:t>
             </a:r>
             <a:r>
-              <a:rPr sz="1200">
+              <a:rPr>
                 <a:solidFill>
                   <a:srgbClr val="003B4F"/>
                 </a:solidFill>
@@ -6487,7 +6487,7 @@
               <a:t>, </a:t>
             </a:r>
             <a:r>
-              <a:rPr sz="1200">
+              <a:rPr>
                 <a:solidFill>
                   <a:srgbClr val="20794D"/>
                 </a:solidFill>
@@ -6496,7 +6496,7 @@
               <a:t>"Japan"</a:t>
             </a:r>
             <a:r>
-              <a:rPr sz="1200">
+              <a:rPr>
                 <a:solidFill>
                   <a:srgbClr val="003B4F"/>
                 </a:solidFill>
@@ -6505,7 +6505,7 @@
               <a:t>, </a:t>
             </a:r>
             <a:r>
-              <a:rPr sz="1200">
+              <a:rPr>
                 <a:solidFill>
                   <a:srgbClr val="20794D"/>
                 </a:solidFill>
@@ -6514,7 +6514,7 @@
               <a:t>"Nigeria"</a:t>
             </a:r>
             <a:r>
-              <a:rPr sz="1200">
+              <a:rPr>
                 <a:solidFill>
                   <a:srgbClr val="003B4F"/>
                 </a:solidFill>
@@ -6525,7 +6525,7 @@
             <a:br/>
             <a:br/>
             <a:r>
-              <a:rPr sz="1200">
+              <a:rPr>
                 <a:solidFill>
                   <a:srgbClr val="003B4F"/>
                 </a:solidFill>
@@ -6535,7 +6535,7 @@
             </a:r>
             <a:br/>
             <a:r>
-              <a:rPr sz="1200">
+              <a:rPr>
                 <a:solidFill>
                   <a:srgbClr val="003B4F"/>
                 </a:solidFill>
@@ -6544,7 +6544,7 @@
               <a:t>    display(Markdown(</a:t>
             </a:r>
             <a:r>
-              <a:rPr sz="1200">
+              <a:rPr>
                 <a:solidFill>
                   <a:srgbClr val="20794D"/>
                 </a:solidFill>
@@ -6553,7 +6553,7 @@
               <a:t>f"## Age and Population Pyramids for </a:t>
             </a:r>
             <a:r>
-              <a:rPr sz="1200">
+              <a:rPr>
                 <a:solidFill>
                   <a:srgbClr val="5E5E5E"/>
                 </a:solidFill>
@@ -6562,7 +6562,7 @@
               <a:t>{</a:t>
             </a:r>
             <a:r>
-              <a:rPr sz="1200">
+              <a:rPr>
                 <a:solidFill>
                   <a:srgbClr val="003B4F"/>
                 </a:solidFill>
@@ -6571,7 +6571,7 @@
               <a:t>name</a:t>
             </a:r>
             <a:r>
-              <a:rPr sz="1200">
+              <a:rPr>
                 <a:solidFill>
                   <a:srgbClr val="5E5E5E"/>
                 </a:solidFill>
@@ -6580,7 +6580,7 @@
               <a:t>}</a:t>
             </a:r>
             <a:r>
-              <a:rPr sz="1200">
+              <a:rPr>
                 <a:solidFill>
                   <a:srgbClr val="20794D"/>
                 </a:solidFill>
@@ -6589,7 +6589,7 @@
               <a:t>"</a:t>
             </a:r>
             <a:r>
-              <a:rPr sz="1200">
+              <a:rPr>
                 <a:solidFill>
                   <a:srgbClr val="003B4F"/>
                 </a:solidFill>
@@ -6599,7 +6599,7 @@
             </a:r>
             <a:br/>
             <a:r>
-              <a:rPr sz="1200">
+              <a:rPr>
                 <a:solidFill>
                   <a:srgbClr val="003B4F"/>
                 </a:solidFill>
@@ -6608,7 +6608,7 @@
               <a:t>    display(Markdown(</a:t>
             </a:r>
             <a:r>
-              <a:rPr sz="1200">
+              <a:rPr>
                 <a:solidFill>
                   <a:srgbClr val="20794D"/>
                 </a:solidFill>
@@ -6617,7 +6617,7 @@
               <a:t>f'&lt;div class="columns"&gt;'</a:t>
             </a:r>
             <a:r>
-              <a:rPr sz="1200">
+              <a:rPr>
                 <a:solidFill>
                   <a:srgbClr val="003B4F"/>
                 </a:solidFill>
@@ -6627,7 +6627,7 @@
             </a:r>
             <a:br/>
             <a:r>
-              <a:rPr sz="1200">
+              <a:rPr>
                 <a:solidFill>
                   <a:srgbClr val="003B4F"/>
                 </a:solidFill>
@@ -6636,7 +6636,7 @@
               <a:t>    display(Markdown(</a:t>
             </a:r>
             <a:r>
-              <a:rPr sz="1200">
+              <a:rPr>
                 <a:solidFill>
                   <a:srgbClr val="20794D"/>
                 </a:solidFill>
@@ -6645,7 +6645,7 @@
               <a:t>f'&lt;div class="column"&gt;'</a:t>
             </a:r>
             <a:r>
-              <a:rPr sz="1200">
+              <a:rPr>
                 <a:solidFill>
                   <a:srgbClr val="003B4F"/>
                 </a:solidFill>
@@ -6655,7 +6655,7 @@
             </a:r>
             <a:br/>
             <a:r>
-              <a:rPr sz="1200">
+              <a:rPr>
                 <a:solidFill>
                   <a:srgbClr val="003B4F"/>
                 </a:solidFill>
@@ -6664,7 +6664,7 @@
               <a:t>    plot_dependency_ratio(df_dr[df_dr.Location </a:t>
             </a:r>
             <a:r>
-              <a:rPr sz="1200">
+              <a:rPr>
                 <a:solidFill>
                   <a:srgbClr val="5E5E5E"/>
                 </a:solidFill>
@@ -6673,7 +6673,7 @@
               <a:t>==</a:t>
             </a:r>
             <a:r>
-              <a:rPr sz="1200">
+              <a:rPr>
                 <a:solidFill>
                   <a:srgbClr val="003B4F"/>
                 </a:solidFill>
@@ -6683,7 +6683,7 @@
             </a:r>
             <a:br/>
             <a:r>
-              <a:rPr sz="1200">
+              <a:rPr>
                 <a:solidFill>
                   <a:srgbClr val="003B4F"/>
                 </a:solidFill>
@@ -6692,7 +6692,7 @@
               <a:t>    display(Markdown(</a:t>
             </a:r>
             <a:r>
-              <a:rPr sz="1200">
+              <a:rPr>
                 <a:solidFill>
                   <a:srgbClr val="20794D"/>
                 </a:solidFill>
@@ -6701,7 +6701,7 @@
               <a:t>f'&lt;/div&gt;'</a:t>
             </a:r>
             <a:r>
-              <a:rPr sz="1200">
+              <a:rPr>
                 <a:solidFill>
                   <a:srgbClr val="003B4F"/>
                 </a:solidFill>
@@ -6711,7 +6711,7 @@
             </a:r>
             <a:br/>
             <a:r>
-              <a:rPr sz="1200">
+              <a:rPr>
                 <a:solidFill>
                   <a:srgbClr val="003B4F"/>
                 </a:solidFill>
@@ -6720,7 +6720,7 @@
               <a:t>    display(Markdown(</a:t>
             </a:r>
             <a:r>
-              <a:rPr sz="1200">
+              <a:rPr>
                 <a:solidFill>
                   <a:srgbClr val="20794D"/>
                 </a:solidFill>
@@ -6729,7 +6729,7 @@
               <a:t>f'&lt;div class="column"&gt;'</a:t>
             </a:r>
             <a:r>
-              <a:rPr sz="1200">
+              <a:rPr>
                 <a:solidFill>
                   <a:srgbClr val="003B4F"/>
                 </a:solidFill>
@@ -6739,7 +6739,7 @@
             </a:r>
             <a:br/>
             <a:r>
-              <a:rPr sz="1200">
+              <a:rPr>
                 <a:solidFill>
                   <a:srgbClr val="003B4F"/>
                 </a:solidFill>
@@ -6748,7 +6748,7 @@
               <a:t>    plot_population_pyramid_series(df_pop[df_pop[</a:t>
             </a:r>
             <a:r>
-              <a:rPr sz="1200">
+              <a:rPr>
                 <a:solidFill>
                   <a:srgbClr val="20794D"/>
                 </a:solidFill>
@@ -6757,7 +6757,7 @@
               <a:t>"Location"</a:t>
             </a:r>
             <a:r>
-              <a:rPr sz="1200">
+              <a:rPr>
                 <a:solidFill>
                   <a:srgbClr val="003B4F"/>
                 </a:solidFill>
@@ -6766,7 +6766,7 @@
               <a:t>]</a:t>
             </a:r>
             <a:r>
-              <a:rPr sz="1200">
+              <a:rPr>
                 <a:solidFill>
                   <a:srgbClr val="5E5E5E"/>
                 </a:solidFill>
@@ -6775,7 +6775,7 @@
               <a:t>==</a:t>
             </a:r>
             <a:r>
-              <a:rPr sz="1200">
+              <a:rPr>
                 <a:solidFill>
                   <a:srgbClr val="003B4F"/>
                 </a:solidFill>
@@ -6785,7 +6785,7 @@
             </a:r>
             <a:br/>
             <a:r>
-              <a:rPr sz="1200">
+              <a:rPr>
                 <a:solidFill>
                   <a:srgbClr val="003B4F"/>
                 </a:solidFill>
@@ -6794,7 +6794,7 @@
               <a:t>    display(Markdown(</a:t>
             </a:r>
             <a:r>
-              <a:rPr sz="1200">
+              <a:rPr>
                 <a:solidFill>
                   <a:srgbClr val="20794D"/>
                 </a:solidFill>
@@ -6803,7 +6803,7 @@
               <a:t>f'&lt;/div&gt;'</a:t>
             </a:r>
             <a:r>
-              <a:rPr sz="1200">
+              <a:rPr>
                 <a:solidFill>
                   <a:srgbClr val="003B4F"/>
                 </a:solidFill>
@@ -6813,7 +6813,7 @@
             </a:r>
             <a:br/>
             <a:r>
-              <a:rPr sz="1200">
+              <a:rPr>
                 <a:solidFill>
                   <a:srgbClr val="003B4F"/>
                 </a:solidFill>
@@ -6822,7 +6822,7 @@
               <a:t>    display(Markdown(</a:t>
             </a:r>
             <a:r>
-              <a:rPr sz="1200">
+              <a:rPr>
                 <a:solidFill>
                   <a:srgbClr val="20794D"/>
                 </a:solidFill>
@@ -6831,7 +6831,7 @@
               <a:t>f'&lt;/div&gt;'</a:t>
             </a:r>
             <a:r>
-              <a:rPr sz="1200">
+              <a:rPr>
                 <a:solidFill>
                   <a:srgbClr val="003B4F"/>
                 </a:solidFill>
@@ -7654,7 +7654,7 @@
               <a:buNone/>
             </a:pPr>
             <a:r>
-              <a:rPr sz="1200">
+              <a:rPr>
                 <a:solidFill>
                   <a:srgbClr val="AD0000"/>
                 </a:solidFill>
@@ -7664,7 +7664,7 @@
             </a:r>
             <a:br/>
             <a:r>
-              <a:rPr sz="1200">
+              <a:rPr>
                 <a:solidFill>
                   <a:srgbClr val="4758AB"/>
                 </a:solidFill>
@@ -7673,7 +7673,7 @@
               <a:t>title</a:t>
             </a:r>
             <a:r>
-              <a:rPr sz="1200">
+              <a:rPr>
                 <a:solidFill>
                   <a:srgbClr val="003B4F"/>
                 </a:solidFill>
@@ -7682,7 +7682,7 @@
               <a:t>:</a:t>
             </a:r>
             <a:r>
-              <a:rPr sz="1200">
+              <a:rPr>
                 <a:solidFill>
                   <a:srgbClr val="657422"/>
                 </a:solidFill>
@@ -7691,7 +7691,7 @@
               <a:t> </a:t>
             </a:r>
             <a:r>
-              <a:rPr sz="1200">
+              <a:rPr>
                 <a:solidFill>
                   <a:srgbClr val="20794D"/>
                 </a:solidFill>
@@ -7701,7 +7701,7 @@
             </a:r>
             <a:br/>
             <a:r>
-              <a:rPr sz="1200">
+              <a:rPr>
                 <a:solidFill>
                   <a:srgbClr val="4758AB"/>
                 </a:solidFill>
@@ -7710,7 +7710,7 @@
               <a:t>format</a:t>
             </a:r>
             <a:r>
-              <a:rPr sz="1200">
+              <a:rPr>
                 <a:solidFill>
                   <a:srgbClr val="003B4F"/>
                 </a:solidFill>
@@ -7719,7 +7719,7 @@
               <a:t>:</a:t>
             </a:r>
             <a:r>
-              <a:rPr sz="1200">
+              <a:rPr>
                 <a:solidFill>
                   <a:srgbClr val="657422"/>
                 </a:solidFill>
@@ -7729,7 +7729,7 @@
             </a:r>
             <a:br/>
             <a:r>
-              <a:rPr sz="1200">
+              <a:rPr>
                 <a:solidFill>
                   <a:srgbClr val="5E5E5E"/>
                 </a:solidFill>
@@ -7739,7 +7739,7 @@
             </a:r>
             <a:br/>
             <a:r>
-              <a:rPr sz="1200">
+              <a:rPr>
                 <a:solidFill>
                   <a:srgbClr val="5E5E5E"/>
                 </a:solidFill>
@@ -7749,7 +7749,7 @@
             </a:r>
             <a:br/>
             <a:r>
-              <a:rPr sz="1200">
+              <a:rPr>
                 <a:solidFill>
                   <a:srgbClr val="5E5E5E"/>
                 </a:solidFill>
@@ -7759,7 +7759,7 @@
             </a:r>
             <a:br/>
             <a:r>
-              <a:rPr sz="1200">
+              <a:rPr>
                 <a:solidFill>
                   <a:srgbClr val="5E5E5E"/>
                 </a:solidFill>
@@ -7769,7 +7769,7 @@
             </a:r>
             <a:br/>
             <a:r>
-              <a:rPr sz="1200">
+              <a:rPr>
                 <a:solidFill>
                   <a:srgbClr val="5E5E5E"/>
                 </a:solidFill>
@@ -7779,7 +7779,7 @@
             </a:r>
             <a:br/>
             <a:r>
-              <a:rPr sz="1200">
+              <a:rPr>
                 <a:solidFill>
                   <a:srgbClr val="5E5E5E"/>
                 </a:solidFill>
@@ -7789,7 +7789,7 @@
             </a:r>
             <a:br/>
             <a:r>
-              <a:rPr sz="1200">
+              <a:rPr>
                 <a:solidFill>
                   <a:srgbClr val="5E5E5E"/>
                 </a:solidFill>
@@ -7800,7 +7800,7 @@
             <a:br/>
             <a:br/>
             <a:r>
-              <a:rPr sz="1200">
+              <a:rPr>
                 <a:solidFill>
                   <a:srgbClr val="4758AB"/>
                 </a:solidFill>
@@ -7809,7 +7809,7 @@
               <a:t>author</a:t>
             </a:r>
             <a:r>
-              <a:rPr sz="1200">
+              <a:rPr>
                 <a:solidFill>
                   <a:srgbClr val="003B4F"/>
                 </a:solidFill>
@@ -7818,7 +7818,7 @@
               <a:t>:</a:t>
             </a:r>
             <a:r>
-              <a:rPr sz="1200">
+              <a:rPr>
                 <a:solidFill>
                   <a:srgbClr val="657422"/>
                 </a:solidFill>
@@ -7828,7 +7828,7 @@
             </a:r>
             <a:br/>
             <a:r>
-              <a:rPr sz="1200">
+              <a:rPr>
                 <a:solidFill>
                   <a:srgbClr val="4758AB"/>
                 </a:solidFill>
@@ -7837,7 +7837,7 @@
               <a:t>date</a:t>
             </a:r>
             <a:r>
-              <a:rPr sz="1200">
+              <a:rPr>
                 <a:solidFill>
                   <a:srgbClr val="003B4F"/>
                 </a:solidFill>
@@ -7846,7 +7846,7 @@
               <a:t>:</a:t>
             </a:r>
             <a:r>
-              <a:rPr sz="1200">
+              <a:rPr>
                 <a:solidFill>
                   <a:srgbClr val="657422"/>
                 </a:solidFill>
@@ -7856,7 +7856,7 @@
             </a:r>
             <a:br/>
             <a:r>
-              <a:rPr sz="1200">
+              <a:rPr>
                 <a:solidFill>
                   <a:srgbClr val="AD0000"/>
                 </a:solidFill>
@@ -8982,7 +8982,7 @@
               <a:t>One of my proudest tech moments was to make </a:t>
             </a:r>
             <a:r>
-              <a:rPr sz="1200">
+              <a:rPr>
                 <a:latin typeface="Consolas"/>
               </a:rPr>
               <a:t>CWeave</a:t>
@@ -8992,7 +8992,7 @@
               <a:t> and </a:t>
             </a:r>
             <a:r>
-              <a:rPr sz="1200">
+              <a:rPr>
                 <a:latin typeface="Consolas"/>
               </a:rPr>
               <a:t>CWeb</a:t>
@@ -9110,7 +9110,7 @@
           <a:p>
             <a:pPr lvl="1"/>
             <a:r>
-              <a:rPr sz="1200">
+              <a:rPr>
                 <a:latin typeface="Consolas"/>
               </a:rPr>
               <a:t>\usepackage{ifthen}</a:t>
@@ -9119,7 +9119,7 @@
           <a:p>
             <a:pPr lvl="1"/>
             <a:r>
-              <a:rPr sz="1200">
+              <a:rPr>
                 <a:latin typeface="Consolas"/>
               </a:rPr>
               <a:t>@for</a:t>
@@ -9129,7 +9129,7 @@
               <a:t>, </a:t>
             </a:r>
             <a:r>
-              <a:rPr sz="1200">
+              <a:rPr>
                 <a:latin typeface="Consolas"/>
               </a:rPr>
               <a:t>@while</a:t>
@@ -9236,7 +9236,7 @@
               <a:t>Hugo and </a:t>
             </a:r>
             <a:r>
-              <a:rPr sz="1200">
+              <a:rPr>
                 <a:latin typeface="Consolas"/>
               </a:rPr>
               <a:t>blogdown</a:t>
@@ -9253,7 +9253,7 @@
               <a:t>Heavily dependent on R </a:t>
             </a:r>
             <a:r>
-              <a:rPr sz="1200">
+              <a:rPr>
                 <a:latin typeface="Consolas"/>
               </a:rPr>
               <a:t>R</a:t>
@@ -9404,7 +9404,7 @@
               <a:t> use Python through Jupyter notebooks, and one can use </a:t>
             </a:r>
             <a:r>
-              <a:rPr sz="1200">
+              <a:rPr>
                 <a:hlinkClick r:id="rId3"/>
                 <a:latin typeface="Consolas"/>
               </a:rPr>
@@ -9528,7 +9528,7 @@
               <a:t>In Quarto’s </a:t>
             </a:r>
             <a:r>
-              <a:rPr sz="1200">
+              <a:rPr>
                 <a:latin typeface="Consolas"/>
               </a:rPr>
               <a:t>.qmd</a:t>
@@ -9538,7 +9538,7 @@
               <a:t> files, you write Markdown and code, just like </a:t>
             </a:r>
             <a:r>
-              <a:rPr sz="1200">
+              <a:rPr>
                 <a:latin typeface="Consolas"/>
               </a:rPr>
               <a:t>.ipynb</a:t>
@@ -9548,7 +9548,7 @@
               <a:t>. Add some </a:t>
             </a:r>
             <a:r>
-              <a:rPr sz="1200">
+              <a:rPr>
                 <a:latin typeface="Consolas"/>
               </a:rPr>
               <a:t>YAML</a:t>
@@ -10026,4 +10026,299 @@
   </a:objectDefaults>
   <a:extraClrSchemeLst/>
 </a:theme>
+</file>
+
+<file path=ppt/theme/theme2.xml><?xml version="1.0" encoding="utf-8"?>
+<a:theme xmlns:a="http://schemas.openxmlformats.org/drawingml/2006/main" name="Office Theme">
+  <a:themeElements>
+    <a:clrScheme name="Office">
+      <a:dk1>
+        <a:sysClr val="windowText" lastClr="000000"/>
+      </a:dk1>
+      <a:lt1>
+        <a:sysClr val="window" lastClr="FFFFFF"/>
+      </a:lt1>
+      <a:dk2>
+        <a:srgbClr val="44546A"/>
+      </a:dk2>
+      <a:lt2>
+        <a:srgbClr val="E7E6E6"/>
+      </a:lt2>
+      <a:accent1>
+        <a:srgbClr val="4472C4"/>
+      </a:accent1>
+      <a:accent2>
+        <a:srgbClr val="ED7D31"/>
+      </a:accent2>
+      <a:accent3>
+        <a:srgbClr val="A5A5A5"/>
+      </a:accent3>
+      <a:accent4>
+        <a:srgbClr val="FFC000"/>
+      </a:accent4>
+      <a:accent5>
+        <a:srgbClr val="5B9BD5"/>
+      </a:accent5>
+      <a:accent6>
+        <a:srgbClr val="70AD47"/>
+      </a:accent6>
+      <a:hlink>
+        <a:srgbClr val="0563C1"/>
+      </a:hlink>
+      <a:folHlink>
+        <a:srgbClr val="954F72"/>
+      </a:folHlink>
+    </a:clrScheme>
+    <a:fontScheme name="Office">
+      <a:majorFont>
+        <a:latin typeface="Calibri Light" panose="020F0302020204030204"/>
+        <a:ea typeface=""/>
+        <a:cs typeface=""/>
+        <a:font script="Jpan" typeface="游ゴシック Light"/>
+        <a:font script="Hang" typeface="맑은 고딕"/>
+        <a:font script="Hans" typeface="等线 Light"/>
+        <a:font script="Hant" typeface="新細明體"/>
+        <a:font script="Arab" typeface="Times New Roman"/>
+        <a:font script="Hebr" typeface="Times New Roman"/>
+        <a:font script="Thai" typeface="Angsana New"/>
+        <a:font script="Ethi" typeface="Nyala"/>
+        <a:font script="Beng" typeface="Vrinda"/>
+        <a:font script="Gujr" typeface="Shruti"/>
+        <a:font script="Khmr" typeface="MoolBoran"/>
+        <a:font script="Knda" typeface="Tunga"/>
+        <a:font script="Guru" typeface="Raavi"/>
+        <a:font script="Cans" typeface="Euphemia"/>
+        <a:font script="Cher" typeface="Plantagenet Cherokee"/>
+        <a:font script="Yiii" typeface="Microsoft Yi Baiti"/>
+        <a:font script="Tibt" typeface="Microsoft Himalaya"/>
+        <a:font script="Thaa" typeface="MV Boli"/>
+        <a:font script="Deva" typeface="Mangal"/>
+        <a:font script="Telu" typeface="Gautami"/>
+        <a:font script="Taml" typeface="Latha"/>
+        <a:font script="Syrc" typeface="Estrangelo Edessa"/>
+        <a:font script="Orya" typeface="Kalinga"/>
+        <a:font script="Mlym" typeface="Kartika"/>
+        <a:font script="Laoo" typeface="DokChampa"/>
+        <a:font script="Sinh" typeface="Iskoola Pota"/>
+        <a:font script="Mong" typeface="Mongolian Baiti"/>
+        <a:font script="Viet" typeface="Times New Roman"/>
+        <a:font script="Uigh" typeface="Microsoft Uighur"/>
+        <a:font script="Geor" typeface="Sylfaen"/>
+        <a:font script="Armn" typeface="Arial"/>
+        <a:font script="Bugi" typeface="Leelawadee UI"/>
+        <a:font script="Bopo" typeface="Microsoft JhengHei"/>
+        <a:font script="Java" typeface="Javanese Text"/>
+        <a:font script="Lisu" typeface="Segoe UI"/>
+        <a:font script="Mymr" typeface="Myanmar Text"/>
+        <a:font script="Nkoo" typeface="Ebrima"/>
+        <a:font script="Olck" typeface="Nirmala UI"/>
+        <a:font script="Osma" typeface="Ebrima"/>
+        <a:font script="Phag" typeface="Phagspa"/>
+        <a:font script="Syrn" typeface="Estrangelo Edessa"/>
+        <a:font script="Syrj" typeface="Estrangelo Edessa"/>
+        <a:font script="Syre" typeface="Estrangelo Edessa"/>
+        <a:font script="Sora" typeface="Nirmala UI"/>
+        <a:font script="Tale" typeface="Microsoft Tai Le"/>
+        <a:font script="Talu" typeface="Microsoft New Tai Lue"/>
+        <a:font script="Tfng" typeface="Ebrima"/>
+      </a:majorFont>
+      <a:minorFont>
+        <a:latin typeface="Calibri" panose="020F0502020204030204"/>
+        <a:ea typeface=""/>
+        <a:cs typeface=""/>
+        <a:font script="Jpan" typeface="游ゴシック"/>
+        <a:font script="Hang" typeface="맑은 고딕"/>
+        <a:font script="Hans" typeface="等线"/>
+        <a:font script="Hant" typeface="新細明體"/>
+        <a:font script="Arab" typeface="Arial"/>
+        <a:font script="Hebr" typeface="Arial"/>
+        <a:font script="Thai" typeface="Cordia New"/>
+        <a:font script="Ethi" typeface="Nyala"/>
+        <a:font script="Beng" typeface="Vrinda"/>
+        <a:font script="Gujr" typeface="Shruti"/>
+        <a:font script="Khmr" typeface="DaunPenh"/>
+        <a:font script="Knda" typeface="Tunga"/>
+        <a:font script="Guru" typeface="Raavi"/>
+        <a:font script="Cans" typeface="Euphemia"/>
+        <a:font script="Cher" typeface="Plantagenet Cherokee"/>
+        <a:font script="Yiii" typeface="Microsoft Yi Baiti"/>
+        <a:font script="Tibt" typeface="Microsoft Himalaya"/>
+        <a:font script="Thaa" typeface="MV Boli"/>
+        <a:font script="Deva" typeface="Mangal"/>
+        <a:font script="Telu" typeface="Gautami"/>
+        <a:font script="Taml" typeface="Latha"/>
+        <a:font script="Syrc" typeface="Estrangelo Edessa"/>
+        <a:font script="Orya" typeface="Kalinga"/>
+        <a:font script="Mlym" typeface="Kartika"/>
+        <a:font script="Laoo" typeface="DokChampa"/>
+        <a:font script="Sinh" typeface="Iskoola Pota"/>
+        <a:font script="Mong" typeface="Mongolian Baiti"/>
+        <a:font script="Viet" typeface="Arial"/>
+        <a:font script="Uigh" typeface="Microsoft Uighur"/>
+        <a:font script="Geor" typeface="Sylfaen"/>
+        <a:font script="Armn" typeface="Arial"/>
+        <a:font script="Bugi" typeface="Leelawadee UI"/>
+        <a:font script="Bopo" typeface="Microsoft JhengHei"/>
+        <a:font script="Java" typeface="Javanese Text"/>
+        <a:font script="Lisu" typeface="Segoe UI"/>
+        <a:font script="Mymr" typeface="Myanmar Text"/>
+        <a:font script="Nkoo" typeface="Ebrima"/>
+        <a:font script="Olck" typeface="Nirmala UI"/>
+        <a:font script="Osma" typeface="Ebrima"/>
+        <a:font script="Phag" typeface="Phagspa"/>
+        <a:font script="Syrn" typeface="Estrangelo Edessa"/>
+        <a:font script="Syrj" typeface="Estrangelo Edessa"/>
+        <a:font script="Syre" typeface="Estrangelo Edessa"/>
+        <a:font script="Sora" typeface="Nirmala UI"/>
+        <a:font script="Tale" typeface="Microsoft Tai Le"/>
+        <a:font script="Talu" typeface="Microsoft New Tai Lue"/>
+        <a:font script="Tfng" typeface="Ebrima"/>
+      </a:minorFont>
+    </a:fontScheme>
+    <a:fmtScheme name="Office">
+      <a:fillStyleLst>
+        <a:solidFill>
+          <a:schemeClr val="phClr"/>
+        </a:solidFill>
+        <a:gradFill rotWithShape="1">
+          <a:gsLst>
+            <a:gs pos="0">
+              <a:schemeClr val="phClr">
+                <a:lumMod val="110000"/>
+                <a:satMod val="105000"/>
+                <a:tint val="67000"/>
+              </a:schemeClr>
+            </a:gs>
+            <a:gs pos="50000">
+              <a:schemeClr val="phClr">
+                <a:lumMod val="105000"/>
+                <a:satMod val="103000"/>
+                <a:tint val="73000"/>
+              </a:schemeClr>
+            </a:gs>
+            <a:gs pos="100000">
+              <a:schemeClr val="phClr">
+                <a:lumMod val="105000"/>
+                <a:satMod val="109000"/>
+                <a:tint val="81000"/>
+              </a:schemeClr>
+            </a:gs>
+          </a:gsLst>
+          <a:lin ang="5400000" scaled="0"/>
+        </a:gradFill>
+        <a:gradFill rotWithShape="1">
+          <a:gsLst>
+            <a:gs pos="0">
+              <a:schemeClr val="phClr">
+                <a:satMod val="103000"/>
+                <a:lumMod val="102000"/>
+                <a:tint val="94000"/>
+              </a:schemeClr>
+            </a:gs>
+            <a:gs pos="50000">
+              <a:schemeClr val="phClr">
+                <a:satMod val="110000"/>
+                <a:lumMod val="100000"/>
+                <a:shade val="100000"/>
+              </a:schemeClr>
+            </a:gs>
+            <a:gs pos="100000">
+              <a:schemeClr val="phClr">
+                <a:lumMod val="99000"/>
+                <a:satMod val="120000"/>
+                <a:shade val="78000"/>
+              </a:schemeClr>
+            </a:gs>
+          </a:gsLst>
+          <a:lin ang="5400000" scaled="0"/>
+        </a:gradFill>
+      </a:fillStyleLst>
+      <a:lnStyleLst>
+        <a:ln w="6350" cap="flat" cmpd="sng" algn="ctr">
+          <a:solidFill>
+            <a:schemeClr val="phClr"/>
+          </a:solidFill>
+          <a:prstDash val="solid"/>
+          <a:miter lim="800000"/>
+        </a:ln>
+        <a:ln w="12700" cap="flat" cmpd="sng" algn="ctr">
+          <a:solidFill>
+            <a:schemeClr val="phClr"/>
+          </a:solidFill>
+          <a:prstDash val="solid"/>
+          <a:miter lim="800000"/>
+        </a:ln>
+        <a:ln w="19050" cap="flat" cmpd="sng" algn="ctr">
+          <a:solidFill>
+            <a:schemeClr val="phClr"/>
+          </a:solidFill>
+          <a:prstDash val="solid"/>
+          <a:miter lim="800000"/>
+        </a:ln>
+      </a:lnStyleLst>
+      <a:effectStyleLst>
+        <a:effectStyle>
+          <a:effectLst/>
+        </a:effectStyle>
+        <a:effectStyle>
+          <a:effectLst/>
+        </a:effectStyle>
+        <a:effectStyle>
+          <a:effectLst>
+            <a:outerShdw blurRad="57150" dist="19050" dir="5400000" algn="ctr" rotWithShape="0">
+              <a:srgbClr val="000000">
+                <a:alpha val="63000"/>
+              </a:srgbClr>
+            </a:outerShdw>
+          </a:effectLst>
+        </a:effectStyle>
+      </a:effectStyleLst>
+      <a:bgFillStyleLst>
+        <a:solidFill>
+          <a:schemeClr val="phClr"/>
+        </a:solidFill>
+        <a:solidFill>
+          <a:schemeClr val="phClr">
+            <a:tint val="95000"/>
+            <a:satMod val="170000"/>
+          </a:schemeClr>
+        </a:solidFill>
+        <a:gradFill rotWithShape="1">
+          <a:gsLst>
+            <a:gs pos="0">
+              <a:schemeClr val="phClr">
+                <a:tint val="93000"/>
+                <a:satMod val="150000"/>
+                <a:shade val="98000"/>
+                <a:lumMod val="102000"/>
+              </a:schemeClr>
+            </a:gs>
+            <a:gs pos="50000">
+              <a:schemeClr val="phClr">
+                <a:tint val="98000"/>
+                <a:satMod val="130000"/>
+                <a:shade val="90000"/>
+                <a:lumMod val="103000"/>
+              </a:schemeClr>
+            </a:gs>
+            <a:gs pos="100000">
+              <a:schemeClr val="phClr">
+                <a:shade val="63000"/>
+                <a:satMod val="120000"/>
+              </a:schemeClr>
+            </a:gs>
+          </a:gsLst>
+          <a:lin ang="5400000" scaled="0"/>
+        </a:gradFill>
+      </a:bgFillStyleLst>
+    </a:fmtScheme>
+  </a:themeElements>
+  <a:objectDefaults/>
+  <a:extraClrSchemeLst/>
+  <a:extLst>
+    <a:ext uri="{05A4C25C-085E-4340-85A3-A5531E510DB2}">
+      <thm15:themeFamily xmlns:thm15="http://schemas.microsoft.com/office/thememl/2012/main" name="Office Theme" id="{62F939B6-93AF-4DB8-9C6B-D6C7DFDC589F}" vid="{4A3C46E8-61CC-4603-A589-7422A47A8E4A}"/>
+    </a:ext>
+  </a:extLst>
+</a:theme>
 </file>
</xml_diff>

<commit_message>
Work done by Fri Jul  1 14:19:31 PDT 2022
</commit_message>
<xml_diff>
--- a/docs/presentation-orig.pptx
+++ b/docs/presentation-orig.pptx
@@ -34,6 +34,9 @@
     <p:sldId id="282" r:id="rId28"/>
     <p:sldId id="283" r:id="rId29"/>
     <p:sldId id="284" r:id="rId30"/>
+    <p:sldId id="285" r:id="rId31"/>
+    <p:sldId id="286" r:id="rId32"/>
+    <p:sldId id="287" r:id="rId33"/>
   </p:sldIdLst>
   <p:sldSz cx="9144000" cy="5143500" type="screen16x9"/>
   <p:notesSz cx="6858000" cy="9144000"/>
@@ -4892,6 +4895,7 @@
               </a:rPr>
               <a:t>$$</a:t>
             </a:r>
+            <a:br/>
           </a:p>
         </p:txBody>
       </p:sp>
@@ -6072,7 +6076,7 @@
             </a:pPr>
             <a:r>
               <a:rPr/>
-              <a:t>Best feature: generate content dynamically</a:t>
+              <a:t>Creating PowerPoint slides</a:t>
             </a:r>
           </a:p>
         </p:txBody>
@@ -6084,7 +6088,7 @@
             <a:spLocks noGrp="1"/>
           </p:cNvSpPr>
           <p:nvPr>
-            <p:ph idx="1"/>
+            <p:ph idx="1" sz="half"/>
           </p:nvPr>
         </p:nvSpPr>
         <p:spPr/>
@@ -6097,7 +6101,27 @@
             </a:pPr>
             <a:r>
               <a:rPr/>
-              <a:t>Let’s say you’re presenting a project about population dynamics but you don’t know which world leaders are coming to the conference.</a:t>
+              <a:t>To generate a presentation from a </a:t>
+            </a:r>
+            <a:r>
+              <a:rPr>
+                <a:latin typeface="Consolas"/>
+              </a:rPr>
+              <a:t>.qmd</a:t>
+            </a:r>
+            <a:r>
+              <a:rPr/>
+              <a:t> file, add </a:t>
+            </a:r>
+            <a:r>
+              <a:rPr>
+                <a:latin typeface="Consolas"/>
+              </a:rPr>
+              <a:t>format: pptx</a:t>
+            </a:r>
+            <a:r>
+              <a:rPr/>
+              <a:t> to the YAML front-matter.</a:t>
             </a:r>
           </a:p>
           <a:p>
@@ -6106,7 +6130,45 @@
             </a:pPr>
             <a:r>
               <a:rPr/>
-              <a:t>On the presentation day, you learn that Belgium, China, Brazil, India, Japan and Nigeria are attending.</a:t>
+              <a:t>The part I liked the </a:t>
+            </a:r>
+            <a:r>
+              <a:rPr i="1"/>
+              <a:t>least</a:t>
+            </a:r>
+            <a:r>
+              <a:rPr/>
+              <a:t> is that Quarto will use the </a:t>
+            </a:r>
+            <a:r>
+              <a:rPr>
+                <a:hlinkClick r:id="rId2"/>
+              </a:rPr>
+              <a:t>pandoc PowerPoint rules</a:t>
+            </a:r>
+            <a:r>
+              <a:rPr/>
+              <a:t> to render the content from the </a:t>
+            </a:r>
+            <a:r>
+              <a:rPr>
+                <a:latin typeface="Consolas"/>
+              </a:rPr>
+              <a:t>.qmd</a:t>
+            </a:r>
+            <a:r>
+              <a:rPr/>
+              <a:t> into the </a:t>
+            </a:r>
+            <a:r>
+              <a:rPr>
+                <a:latin typeface="Consolas"/>
+              </a:rPr>
+              <a:t>.pptx</a:t>
+            </a:r>
+            <a:r>
+              <a:rPr/>
+              <a:t>.</a:t>
             </a:r>
           </a:p>
           <a:p>
@@ -6115,729 +6177,107 @@
             </a:pPr>
             <a:r>
               <a:rPr/>
-              <a:t>The next slides were generated using the code below:</a:t>
-            </a:r>
-          </a:p>
-          <a:p>
-            <a:pPr lvl="0" indent="0">
-              <a:buNone/>
-            </a:pPr>
-            <a:r>
-              <a:rPr>
-                <a:solidFill>
-                  <a:srgbClr val="003B4F"/>
-                </a:solidFill>
-                <a:latin typeface="Consolas"/>
-              </a:rPr>
-              <a:t>df_dr </a:t>
-            </a:r>
-            <a:r>
-              <a:rPr>
-                <a:solidFill>
-                  <a:srgbClr val="5E5E5E"/>
-                </a:solidFill>
-                <a:latin typeface="Consolas"/>
-              </a:rPr>
-              <a:t>=</a:t>
-            </a:r>
-            <a:r>
-              <a:rPr>
-                <a:solidFill>
-                  <a:srgbClr val="003B4F"/>
-                </a:solidFill>
-                <a:latin typeface="Consolas"/>
-              </a:rPr>
-              <a:t> pd.read_csv(</a:t>
-            </a:r>
-            <a:r>
-              <a:rPr>
-                <a:solidFill>
-                  <a:srgbClr val="20794D"/>
-                </a:solidFill>
-                <a:latin typeface="Consolas"/>
-              </a:rPr>
-              <a:t>"data/dr.csv.gz"</a:t>
-            </a:r>
-            <a:r>
-              <a:rPr>
-                <a:solidFill>
-                  <a:srgbClr val="003B4F"/>
-                </a:solidFill>
-                <a:latin typeface="Consolas"/>
-              </a:rPr>
-              <a:t>, compression</a:t>
-            </a:r>
-            <a:r>
-              <a:rPr>
-                <a:solidFill>
-                  <a:srgbClr val="5E5E5E"/>
-                </a:solidFill>
-                <a:latin typeface="Consolas"/>
-              </a:rPr>
-              <a:t>=</a:t>
-            </a:r>
-            <a:r>
-              <a:rPr>
-                <a:solidFill>
-                  <a:srgbClr val="20794D"/>
-                </a:solidFill>
-                <a:latin typeface="Consolas"/>
-              </a:rPr>
-              <a:t>"gzip"</a:t>
-            </a:r>
-            <a:r>
-              <a:rPr>
-                <a:solidFill>
-                  <a:srgbClr val="003B4F"/>
-                </a:solidFill>
-                <a:latin typeface="Consolas"/>
-              </a:rPr>
-              <a:t>)</a:t>
-            </a:r>
-            <a:br/>
-            <a:r>
-              <a:rPr>
-                <a:solidFill>
-                  <a:srgbClr val="003B4F"/>
-                </a:solidFill>
-                <a:latin typeface="Consolas"/>
-              </a:rPr>
-              <a:t>df_pop </a:t>
-            </a:r>
-            <a:r>
-              <a:rPr>
-                <a:solidFill>
-                  <a:srgbClr val="5E5E5E"/>
-                </a:solidFill>
-                <a:latin typeface="Consolas"/>
-              </a:rPr>
-              <a:t>=</a:t>
-            </a:r>
-            <a:r>
-              <a:rPr>
-                <a:solidFill>
-                  <a:srgbClr val="003B4F"/>
-                </a:solidFill>
-                <a:latin typeface="Consolas"/>
-              </a:rPr>
-              <a:t> pd.read_csv(</a:t>
-            </a:r>
-            <a:r>
-              <a:rPr>
-                <a:solidFill>
-                  <a:srgbClr val="20794D"/>
-                </a:solidFill>
-                <a:latin typeface="Consolas"/>
-              </a:rPr>
-              <a:t>"data/pop_brackets.csv.gz"</a:t>
-            </a:r>
-            <a:r>
-              <a:rPr>
-                <a:solidFill>
-                  <a:srgbClr val="003B4F"/>
-                </a:solidFill>
-                <a:latin typeface="Consolas"/>
-              </a:rPr>
-              <a:t>, compression</a:t>
-            </a:r>
-            <a:r>
-              <a:rPr>
-                <a:solidFill>
-                  <a:srgbClr val="5E5E5E"/>
-                </a:solidFill>
-                <a:latin typeface="Consolas"/>
-              </a:rPr>
-              <a:t>=</a:t>
-            </a:r>
-            <a:r>
-              <a:rPr>
-                <a:solidFill>
-                  <a:srgbClr val="20794D"/>
-                </a:solidFill>
-                <a:latin typeface="Consolas"/>
-              </a:rPr>
-              <a:t>"gzip"</a:t>
-            </a:r>
-            <a:r>
-              <a:rPr>
-                <a:solidFill>
-                  <a:srgbClr val="003B4F"/>
-                </a:solidFill>
-                <a:latin typeface="Consolas"/>
-              </a:rPr>
-              <a:t>)</a:t>
-            </a:r>
-            <a:br/>
-            <a:br/>
-            <a:r>
-              <a:rPr>
-                <a:solidFill>
-                  <a:srgbClr val="003B4F"/>
-                </a:solidFill>
-                <a:latin typeface="Consolas"/>
-              </a:rPr>
-              <a:t>years </a:t>
-            </a:r>
-            <a:r>
-              <a:rPr>
-                <a:solidFill>
-                  <a:srgbClr val="5E5E5E"/>
-                </a:solidFill>
-                <a:latin typeface="Consolas"/>
-              </a:rPr>
-              <a:t>=</a:t>
-            </a:r>
-            <a:r>
-              <a:rPr>
-                <a:solidFill>
-                  <a:srgbClr val="003B4F"/>
-                </a:solidFill>
-                <a:latin typeface="Consolas"/>
-              </a:rPr>
-              <a:t> [</a:t>
-            </a:r>
-            <a:r>
-              <a:rPr>
-                <a:solidFill>
-                  <a:srgbClr val="AD0000"/>
-                </a:solidFill>
-                <a:latin typeface="Consolas"/>
-              </a:rPr>
-              <a:t>2000</a:t>
-            </a:r>
-            <a:r>
-              <a:rPr>
-                <a:solidFill>
-                  <a:srgbClr val="003B4F"/>
-                </a:solidFill>
-                <a:latin typeface="Consolas"/>
-              </a:rPr>
-              <a:t>, </a:t>
-            </a:r>
-            <a:r>
-              <a:rPr>
-                <a:solidFill>
-                  <a:srgbClr val="AD0000"/>
-                </a:solidFill>
-                <a:latin typeface="Consolas"/>
-              </a:rPr>
-              <a:t>2025</a:t>
-            </a:r>
-            <a:r>
-              <a:rPr>
-                <a:solidFill>
-                  <a:srgbClr val="003B4F"/>
-                </a:solidFill>
-                <a:latin typeface="Consolas"/>
-              </a:rPr>
-              <a:t>, </a:t>
-            </a:r>
-            <a:r>
-              <a:rPr>
-                <a:solidFill>
-                  <a:srgbClr val="AD0000"/>
-                </a:solidFill>
-                <a:latin typeface="Consolas"/>
-              </a:rPr>
-              <a:t>2050</a:t>
-            </a:r>
-            <a:r>
-              <a:rPr>
-                <a:solidFill>
-                  <a:srgbClr val="003B4F"/>
-                </a:solidFill>
-                <a:latin typeface="Consolas"/>
-              </a:rPr>
-              <a:t>, </a:t>
-            </a:r>
-            <a:r>
-              <a:rPr>
-                <a:solidFill>
-                  <a:srgbClr val="AD0000"/>
-                </a:solidFill>
-                <a:latin typeface="Consolas"/>
-              </a:rPr>
-              <a:t>2075</a:t>
-            </a:r>
-            <a:r>
-              <a:rPr>
-                <a:solidFill>
-                  <a:srgbClr val="003B4F"/>
-                </a:solidFill>
-                <a:latin typeface="Consolas"/>
-              </a:rPr>
-              <a:t>, </a:t>
-            </a:r>
-            <a:r>
-              <a:rPr>
-                <a:solidFill>
-                  <a:srgbClr val="AD0000"/>
-                </a:solidFill>
-                <a:latin typeface="Consolas"/>
-              </a:rPr>
-              <a:t>2100</a:t>
-            </a:r>
-            <a:r>
-              <a:rPr>
-                <a:solidFill>
-                  <a:srgbClr val="003B4F"/>
-                </a:solidFill>
-                <a:latin typeface="Consolas"/>
-              </a:rPr>
-              <a:t>]</a:t>
-            </a:r>
-            <a:br/>
-            <a:r>
-              <a:rPr>
-                <a:solidFill>
-                  <a:srgbClr val="003B4F"/>
-                </a:solidFill>
-                <a:latin typeface="Consolas"/>
-              </a:rPr>
-              <a:t>regions </a:t>
-            </a:r>
-            <a:r>
-              <a:rPr>
-                <a:solidFill>
-                  <a:srgbClr val="5E5E5E"/>
-                </a:solidFill>
-                <a:latin typeface="Consolas"/>
-              </a:rPr>
-              <a:t>=</a:t>
-            </a:r>
-            <a:r>
-              <a:rPr>
-                <a:solidFill>
-                  <a:srgbClr val="003B4F"/>
-                </a:solidFill>
-                <a:latin typeface="Consolas"/>
-              </a:rPr>
-              <a:t> [</a:t>
-            </a:r>
-            <a:r>
-              <a:rPr>
-                <a:solidFill>
-                  <a:srgbClr val="20794D"/>
-                </a:solidFill>
-                <a:latin typeface="Consolas"/>
-              </a:rPr>
-              <a:t>"Belgium"</a:t>
-            </a:r>
-            <a:r>
-              <a:rPr>
-                <a:solidFill>
-                  <a:srgbClr val="003B4F"/>
-                </a:solidFill>
-                <a:latin typeface="Consolas"/>
-              </a:rPr>
-              <a:t>, </a:t>
-            </a:r>
-            <a:r>
-              <a:rPr>
-                <a:solidFill>
-                  <a:srgbClr val="20794D"/>
-                </a:solidFill>
-                <a:latin typeface="Consolas"/>
-              </a:rPr>
-              <a:t>"China"</a:t>
-            </a:r>
-            <a:r>
-              <a:rPr>
-                <a:solidFill>
-                  <a:srgbClr val="003B4F"/>
-                </a:solidFill>
-                <a:latin typeface="Consolas"/>
-              </a:rPr>
-              <a:t>, </a:t>
-            </a:r>
-            <a:r>
-              <a:rPr>
-                <a:solidFill>
-                  <a:srgbClr val="20794D"/>
-                </a:solidFill>
-                <a:latin typeface="Consolas"/>
-              </a:rPr>
-              <a:t>"Brazil"</a:t>
-            </a:r>
-            <a:r>
-              <a:rPr>
-                <a:solidFill>
-                  <a:srgbClr val="003B4F"/>
-                </a:solidFill>
-                <a:latin typeface="Consolas"/>
-              </a:rPr>
-              <a:t>, </a:t>
-            </a:r>
-            <a:r>
-              <a:rPr>
-                <a:solidFill>
-                  <a:srgbClr val="20794D"/>
-                </a:solidFill>
-                <a:latin typeface="Consolas"/>
-              </a:rPr>
-              <a:t>"India"</a:t>
-            </a:r>
-            <a:r>
-              <a:rPr>
-                <a:solidFill>
-                  <a:srgbClr val="003B4F"/>
-                </a:solidFill>
-                <a:latin typeface="Consolas"/>
-              </a:rPr>
-              <a:t>, </a:t>
-            </a:r>
-            <a:r>
-              <a:rPr>
-                <a:solidFill>
-                  <a:srgbClr val="20794D"/>
-                </a:solidFill>
-                <a:latin typeface="Consolas"/>
-              </a:rPr>
-              <a:t>"Japan"</a:t>
-            </a:r>
-            <a:r>
-              <a:rPr>
-                <a:solidFill>
-                  <a:srgbClr val="003B4F"/>
-                </a:solidFill>
-                <a:latin typeface="Consolas"/>
-              </a:rPr>
-              <a:t>, </a:t>
-            </a:r>
-            <a:r>
-              <a:rPr>
-                <a:solidFill>
-                  <a:srgbClr val="20794D"/>
-                </a:solidFill>
-                <a:latin typeface="Consolas"/>
-              </a:rPr>
-              <a:t>"Nigeria"</a:t>
-            </a:r>
-            <a:r>
-              <a:rPr>
-                <a:solidFill>
-                  <a:srgbClr val="003B4F"/>
-                </a:solidFill>
-                <a:latin typeface="Consolas"/>
-              </a:rPr>
-              <a:t>]</a:t>
-            </a:r>
-            <a:br/>
-            <a:br/>
-            <a:r>
-              <a:rPr>
-                <a:solidFill>
-                  <a:srgbClr val="003B4F"/>
-                </a:solidFill>
-                <a:latin typeface="Consolas"/>
-              </a:rPr>
-              <a:t>for name in regions:</a:t>
-            </a:r>
-            <a:br/>
-            <a:r>
-              <a:rPr>
-                <a:solidFill>
-                  <a:srgbClr val="003B4F"/>
-                </a:solidFill>
-                <a:latin typeface="Consolas"/>
-              </a:rPr>
-              <a:t>    display(Markdown(</a:t>
-            </a:r>
-            <a:r>
-              <a:rPr>
-                <a:solidFill>
-                  <a:srgbClr val="20794D"/>
-                </a:solidFill>
-                <a:latin typeface="Consolas"/>
-              </a:rPr>
-              <a:t>f"## Age and Population Pyramids for </a:t>
-            </a:r>
-            <a:r>
-              <a:rPr>
-                <a:solidFill>
-                  <a:srgbClr val="5E5E5E"/>
-                </a:solidFill>
-                <a:latin typeface="Consolas"/>
-              </a:rPr>
-              <a:t>{</a:t>
-            </a:r>
-            <a:r>
-              <a:rPr>
-                <a:solidFill>
-                  <a:srgbClr val="003B4F"/>
-                </a:solidFill>
-                <a:latin typeface="Consolas"/>
-              </a:rPr>
-              <a:t>name</a:t>
-            </a:r>
-            <a:r>
-              <a:rPr>
-                <a:solidFill>
-                  <a:srgbClr val="5E5E5E"/>
-                </a:solidFill>
-                <a:latin typeface="Consolas"/>
-              </a:rPr>
-              <a:t>}</a:t>
-            </a:r>
-            <a:r>
-              <a:rPr>
-                <a:solidFill>
-                  <a:srgbClr val="20794D"/>
-                </a:solidFill>
-                <a:latin typeface="Consolas"/>
-              </a:rPr>
-              <a:t>"</a:t>
-            </a:r>
-            <a:r>
-              <a:rPr>
-                <a:solidFill>
-                  <a:srgbClr val="003B4F"/>
-                </a:solidFill>
-                <a:latin typeface="Consolas"/>
-              </a:rPr>
-              <a:t>))</a:t>
-            </a:r>
-            <a:br/>
-            <a:r>
-              <a:rPr>
-                <a:solidFill>
-                  <a:srgbClr val="003B4F"/>
-                </a:solidFill>
-                <a:latin typeface="Consolas"/>
-              </a:rPr>
-              <a:t>    display(Markdown(</a:t>
-            </a:r>
-            <a:r>
-              <a:rPr>
-                <a:solidFill>
-                  <a:srgbClr val="20794D"/>
-                </a:solidFill>
-                <a:latin typeface="Consolas"/>
-              </a:rPr>
-              <a:t>f'&lt;div class="columns"&gt;'</a:t>
-            </a:r>
-            <a:r>
-              <a:rPr>
-                <a:solidFill>
-                  <a:srgbClr val="003B4F"/>
-                </a:solidFill>
-                <a:latin typeface="Consolas"/>
-              </a:rPr>
-              <a:t>))</a:t>
-            </a:r>
-            <a:br/>
-            <a:r>
-              <a:rPr>
-                <a:solidFill>
-                  <a:srgbClr val="003B4F"/>
-                </a:solidFill>
-                <a:latin typeface="Consolas"/>
-              </a:rPr>
-              <a:t>    display(Markdown(</a:t>
-            </a:r>
-            <a:r>
-              <a:rPr>
-                <a:solidFill>
-                  <a:srgbClr val="20794D"/>
-                </a:solidFill>
-                <a:latin typeface="Consolas"/>
-              </a:rPr>
-              <a:t>f'&lt;div class="column"&gt;'</a:t>
-            </a:r>
-            <a:r>
-              <a:rPr>
-                <a:solidFill>
-                  <a:srgbClr val="003B4F"/>
-                </a:solidFill>
-                <a:latin typeface="Consolas"/>
-              </a:rPr>
-              <a:t>))</a:t>
-            </a:r>
-            <a:br/>
-            <a:r>
-              <a:rPr>
-                <a:solidFill>
-                  <a:srgbClr val="003B4F"/>
-                </a:solidFill>
-                <a:latin typeface="Consolas"/>
-              </a:rPr>
-              <a:t>    plot_dependency_ratio(df_dr[df_dr.Location </a:t>
-            </a:r>
-            <a:r>
-              <a:rPr>
-                <a:solidFill>
-                  <a:srgbClr val="5E5E5E"/>
-                </a:solidFill>
-                <a:latin typeface="Consolas"/>
-              </a:rPr>
-              <a:t>==</a:t>
-            </a:r>
-            <a:r>
-              <a:rPr>
-                <a:solidFill>
-                  <a:srgbClr val="003B4F"/>
-                </a:solidFill>
-                <a:latin typeface="Consolas"/>
-              </a:rPr>
-              <a:t> name])</a:t>
-            </a:r>
-            <a:br/>
-            <a:r>
-              <a:rPr>
-                <a:solidFill>
-                  <a:srgbClr val="003B4F"/>
-                </a:solidFill>
-                <a:latin typeface="Consolas"/>
-              </a:rPr>
-              <a:t>    display(Markdown(</a:t>
-            </a:r>
-            <a:r>
-              <a:rPr>
-                <a:solidFill>
-                  <a:srgbClr val="20794D"/>
-                </a:solidFill>
-                <a:latin typeface="Consolas"/>
-              </a:rPr>
-              <a:t>f'&lt;/div&gt;'</a:t>
-            </a:r>
-            <a:r>
-              <a:rPr>
-                <a:solidFill>
-                  <a:srgbClr val="003B4F"/>
-                </a:solidFill>
-                <a:latin typeface="Consolas"/>
-              </a:rPr>
-              <a:t>))</a:t>
-            </a:r>
-            <a:br/>
-            <a:r>
-              <a:rPr>
-                <a:solidFill>
-                  <a:srgbClr val="003B4F"/>
-                </a:solidFill>
-                <a:latin typeface="Consolas"/>
-              </a:rPr>
-              <a:t>    display(Markdown(</a:t>
-            </a:r>
-            <a:r>
-              <a:rPr>
-                <a:solidFill>
-                  <a:srgbClr val="20794D"/>
-                </a:solidFill>
-                <a:latin typeface="Consolas"/>
-              </a:rPr>
-              <a:t>f'&lt;div class="column"&gt;'</a:t>
-            </a:r>
-            <a:r>
-              <a:rPr>
-                <a:solidFill>
-                  <a:srgbClr val="003B4F"/>
-                </a:solidFill>
-                <a:latin typeface="Consolas"/>
-              </a:rPr>
-              <a:t>))</a:t>
-            </a:r>
-            <a:br/>
-            <a:r>
-              <a:rPr>
-                <a:solidFill>
-                  <a:srgbClr val="003B4F"/>
-                </a:solidFill>
-                <a:latin typeface="Consolas"/>
-              </a:rPr>
-              <a:t>    plot_population_pyramid_series(df_pop[df_pop[</a:t>
-            </a:r>
-            <a:r>
-              <a:rPr>
-                <a:solidFill>
-                  <a:srgbClr val="20794D"/>
-                </a:solidFill>
-                <a:latin typeface="Consolas"/>
-              </a:rPr>
-              <a:t>"Location"</a:t>
-            </a:r>
-            <a:r>
-              <a:rPr>
-                <a:solidFill>
-                  <a:srgbClr val="003B4F"/>
-                </a:solidFill>
-                <a:latin typeface="Consolas"/>
-              </a:rPr>
-              <a:t>]</a:t>
-            </a:r>
-            <a:r>
-              <a:rPr>
-                <a:solidFill>
-                  <a:srgbClr val="5E5E5E"/>
-                </a:solidFill>
-                <a:latin typeface="Consolas"/>
-              </a:rPr>
-              <a:t>==</a:t>
-            </a:r>
-            <a:r>
-              <a:rPr>
-                <a:solidFill>
-                  <a:srgbClr val="003B4F"/>
-                </a:solidFill>
-                <a:latin typeface="Consolas"/>
-              </a:rPr>
-              <a:t>name], years)</a:t>
-            </a:r>
-            <a:br/>
-            <a:r>
-              <a:rPr>
-                <a:solidFill>
-                  <a:srgbClr val="003B4F"/>
-                </a:solidFill>
-                <a:latin typeface="Consolas"/>
-              </a:rPr>
-              <a:t>    display(Markdown(</a:t>
-            </a:r>
-            <a:r>
-              <a:rPr>
-                <a:solidFill>
-                  <a:srgbClr val="20794D"/>
-                </a:solidFill>
-                <a:latin typeface="Consolas"/>
-              </a:rPr>
-              <a:t>f'&lt;/div&gt;'</a:t>
-            </a:r>
-            <a:r>
-              <a:rPr>
-                <a:solidFill>
-                  <a:srgbClr val="003B4F"/>
-                </a:solidFill>
-                <a:latin typeface="Consolas"/>
-              </a:rPr>
-              <a:t>))</a:t>
-            </a:r>
-            <a:br/>
-            <a:r>
-              <a:rPr>
-                <a:solidFill>
-                  <a:srgbClr val="003B4F"/>
-                </a:solidFill>
-                <a:latin typeface="Consolas"/>
-              </a:rPr>
-              <a:t>    display(Markdown(</a:t>
-            </a:r>
-            <a:r>
-              <a:rPr>
-                <a:solidFill>
-                  <a:srgbClr val="20794D"/>
-                </a:solidFill>
-                <a:latin typeface="Consolas"/>
-              </a:rPr>
-              <a:t>f'&lt;/div&gt;'</a:t>
-            </a:r>
-            <a:r>
-              <a:rPr>
-                <a:solidFill>
-                  <a:srgbClr val="003B4F"/>
-                </a:solidFill>
-                <a:latin typeface="Consolas"/>
-              </a:rPr>
-              <a:t>))</a:t>
+              <a:t>The “pandoc rules” substantially limit the flexibility you would have in PowerPoint presentations. Quarto has better presentation support for </a:t>
+            </a:r>
+            <a:r>
+              <a:rPr>
+                <a:latin typeface="Consolas"/>
+              </a:rPr>
+              <a:t>revealjs</a:t>
+            </a:r>
+            <a:r>
+              <a:rPr/>
+              <a:t> and </a:t>
+            </a:r>
+            <a:r>
+              <a:rPr>
+                <a:latin typeface="Consolas"/>
+              </a:rPr>
+              <a:t>beamer</a:t>
+            </a:r>
+            <a:r>
+              <a:rPr/>
+              <a:t>.</a:t>
+            </a:r>
+          </a:p>
+        </p:txBody>
+      </p:sp>
+      <p:sp>
+        <p:nvSpPr>
+          <p:cNvPr id="4" name="Content Placeholder 3"/>
+          <p:cNvSpPr>
+            <a:spLocks noGrp="1"/>
+          </p:cNvSpPr>
+          <p:nvPr>
+            <p:ph idx="2" sz="half"/>
+          </p:nvPr>
+        </p:nvSpPr>
+        <p:spPr/>
+        <p:txBody>
+          <a:bodyPr/>
+          <a:lstStyle/>
+          <a:p>
+            <a:pPr lvl="0"/>
+            <a:r>
+              <a:rPr/>
+              <a:t>Quarto can use a template with (</a:t>
+            </a:r>
+            <a:r>
+              <a:rPr b="1"/>
+              <a:t>only</a:t>
+            </a:r>
+            <a:r>
+              <a:rPr/>
+              <a:t>) these layouts:</a:t>
+            </a:r>
+          </a:p>
+          <a:p>
+            <a:pPr lvl="1"/>
+            <a:r>
+              <a:rPr/>
+              <a:t>Title Slide</a:t>
+            </a:r>
+          </a:p>
+          <a:p>
+            <a:pPr lvl="1"/>
+            <a:r>
+              <a:rPr/>
+              <a:t>Title and Content</a:t>
+            </a:r>
+          </a:p>
+          <a:p>
+            <a:pPr lvl="1"/>
+            <a:r>
+              <a:rPr/>
+              <a:t>Section Header</a:t>
+            </a:r>
+          </a:p>
+          <a:p>
+            <a:pPr lvl="1"/>
+            <a:r>
+              <a:rPr/>
+              <a:t>Two Content</a:t>
+            </a:r>
+          </a:p>
+          <a:p>
+            <a:pPr lvl="1"/>
+            <a:r>
+              <a:rPr/>
+              <a:t>Comparison</a:t>
+            </a:r>
+          </a:p>
+          <a:p>
+            <a:pPr lvl="1"/>
+            <a:r>
+              <a:rPr/>
+              <a:t>Content with Caption</a:t>
+            </a:r>
+          </a:p>
+          <a:p>
+            <a:pPr lvl="1"/>
+            <a:r>
+              <a:rPr/>
+              <a:t>Blank</a:t>
             </a:r>
           </a:p>
         </p:txBody>
@@ -6848,6 +6288,1381 @@
 </file>
 
 <file path=ppt/slides/slide17.xml><?xml version="1.0" encoding="utf-8"?>
+<p:sld xmlns:a="http://schemas.openxmlformats.org/drawingml/2006/main" xmlns:r="http://schemas.openxmlformats.org/officeDocument/2006/relationships" xmlns:p="http://schemas.openxmlformats.org/presentationml/2006/main">
+  <p:cSld>
+    <p:spTree>
+      <p:nvGrpSpPr>
+        <p:cNvPr id="1" name=""/>
+        <p:cNvGrpSpPr/>
+        <p:nvPr/>
+      </p:nvGrpSpPr>
+      <p:grpSpPr>
+        <a:xfrm>
+          <a:off x="0" y="0"/>
+          <a:ext cx="0" cy="0"/>
+          <a:chOff x="0" y="0"/>
+          <a:chExt cx="0" cy="0"/>
+        </a:xfrm>
+      </p:grpSpPr>
+      <p:sp>
+        <p:nvSpPr>
+          <p:cNvPr id="2" name="Title 1"/>
+          <p:cNvSpPr>
+            <a:spLocks noGrp="1"/>
+          </p:cNvSpPr>
+          <p:nvPr>
+            <p:ph type="title"/>
+          </p:nvPr>
+        </p:nvSpPr>
+        <p:spPr/>
+        <p:txBody>
+          <a:bodyPr/>
+          <a:lstStyle/>
+          <a:p>
+            <a:pPr lvl="0" indent="0" marL="0">
+              <a:buNone/>
+            </a:pPr>
+            <a:r>
+              <a:rPr/>
+              <a:t>PowerPoint layout rules</a:t>
+            </a:r>
+          </a:p>
+        </p:txBody>
+      </p:sp>
+      <p:sp>
+        <p:nvSpPr>
+          <p:cNvPr id="3" name="Content Placeholder 2"/>
+          <p:cNvSpPr>
+            <a:spLocks noGrp="1"/>
+          </p:cNvSpPr>
+          <p:nvPr>
+            <p:ph idx="1"/>
+          </p:nvPr>
+        </p:nvSpPr>
+        <p:spPr/>
+        <p:txBody>
+          <a:bodyPr/>
+          <a:lstStyle/>
+          <a:p>
+            <a:pPr lvl="0" indent="0" marL="0">
+              <a:buNone/>
+            </a:pPr>
+            <a:r>
+              <a:rPr/>
+              <a:t>The rules are available at:  </a:t>
+            </a:r>
+            <a:r>
+              <a:rPr>
+                <a:hlinkClick r:id="rId2"/>
+              </a:rPr>
+              <a:t>https://pandoc.org/MANUAL.html#powerpoint-layout-choice</a:t>
+            </a:r>
+          </a:p>
+          <a:p>
+            <a:pPr lvl="0"/>
+            <a:r>
+              <a:rPr b="1"/>
+              <a:t>Title Slide:</a:t>
+            </a:r>
+            <a:r>
+              <a:rPr/>
+              <a:t> created from metadata fields like </a:t>
+            </a:r>
+            <a:r>
+              <a:rPr>
+                <a:latin typeface="Consolas"/>
+              </a:rPr>
+              <a:t>title</a:t>
+            </a:r>
+            <a:r>
+              <a:rPr/>
+              <a:t> and </a:t>
+            </a:r>
+            <a:r>
+              <a:rPr>
+                <a:latin typeface="Consolas"/>
+              </a:rPr>
+              <a:t>author</a:t>
+            </a:r>
+          </a:p>
+          <a:p>
+            <a:pPr lvl="0"/>
+            <a:r>
+              <a:rPr b="1"/>
+              <a:t>Section Header:</a:t>
+            </a:r>
+            <a:r>
+              <a:rPr/>
+              <a:t> created from the top-level markdown headings (for example, </a:t>
+            </a:r>
+            <a:r>
+              <a:rPr>
+                <a:latin typeface="Consolas"/>
+              </a:rPr>
+              <a:t>#</a:t>
+            </a:r>
+            <a:r>
+              <a:rPr/>
+              <a:t>)</a:t>
+            </a:r>
+          </a:p>
+          <a:p>
+            <a:pPr lvl="0"/>
+            <a:r>
+              <a:rPr b="1"/>
+              <a:t>Two Content:</a:t>
+            </a:r>
+            <a:r>
+              <a:rPr/>
+              <a:t> used when </a:t>
+            </a:r>
+            <a:r>
+              <a:rPr>
+                <a:latin typeface="Consolas"/>
+              </a:rPr>
+              <a:t>.md</a:t>
+            </a:r>
+            <a:r>
+              <a:rPr/>
+              <a:t> source contains </a:t>
+            </a:r>
+            <a:r>
+              <a:rPr>
+                <a:latin typeface="Consolas"/>
+              </a:rPr>
+              <a:t>.columns</a:t>
+            </a:r>
+            <a:r>
+              <a:rPr/>
+              <a:t> div (</a:t>
+            </a:r>
+            <a:r>
+              <a:rPr>
+                <a:latin typeface="Consolas"/>
+              </a:rPr>
+              <a:t>:::: {.columns}</a:t>
+            </a:r>
+            <a:r>
+              <a:rPr/>
+              <a:t>) and text content</a:t>
+            </a:r>
+          </a:p>
+          <a:p>
+            <a:pPr lvl="0"/>
+            <a:r>
+              <a:rPr b="1"/>
+              <a:t>Comparison:</a:t>
+            </a:r>
+            <a:r>
+              <a:rPr/>
+              <a:t> same as “Two Content”, but content of divs is not text</a:t>
+            </a:r>
+          </a:p>
+          <a:p>
+            <a:pPr lvl="0"/>
+            <a:r>
+              <a:rPr b="1"/>
+              <a:t>Blank:</a:t>
+            </a:r>
+            <a:r>
+              <a:rPr/>
+              <a:t> used for slides that have no displayable content (e.g. notes)</a:t>
+            </a:r>
+          </a:p>
+          <a:p>
+            <a:pPr lvl="0"/>
+            <a:r>
+              <a:rPr b="1"/>
+              <a:t>Content with Caption:</a:t>
+            </a:r>
+            <a:r>
+              <a:rPr/>
+              <a:t> used when content doesn’t have a </a:t>
+            </a:r>
+            <a:r>
+              <a:rPr>
+                <a:latin typeface="Consolas"/>
+              </a:rPr>
+              <a:t>columns</a:t>
+            </a:r>
+            <a:r>
+              <a:rPr/>
+              <a:t> div but has text </a:t>
+            </a:r>
+            <a:r>
+              <a:rPr b="1"/>
+              <a:t>and</a:t>
+            </a:r>
+            <a:r>
+              <a:rPr/>
+              <a:t> non-text content</a:t>
+            </a:r>
+          </a:p>
+          <a:p>
+            <a:pPr lvl="0"/>
+            <a:r>
+              <a:rPr b="1"/>
+              <a:t>Title and Content:</a:t>
+            </a:r>
+            <a:r>
+              <a:rPr/>
+              <a:t> whatever doesn’t fit the rules above.</a:t>
+            </a:r>
+          </a:p>
+        </p:txBody>
+      </p:sp>
+    </p:spTree>
+  </p:cSld>
+</p:sld>
+</file>
+
+<file path=ppt/slides/slide18.xml><?xml version="1.0" encoding="utf-8"?>
+<p:sld xmlns:a="http://schemas.openxmlformats.org/drawingml/2006/main" xmlns:r="http://schemas.openxmlformats.org/officeDocument/2006/relationships" xmlns:p="http://schemas.openxmlformats.org/presentationml/2006/main">
+  <p:cSld>
+    <p:spTree>
+      <p:nvGrpSpPr>
+        <p:cNvPr id="1" name=""/>
+        <p:cNvGrpSpPr/>
+        <p:nvPr/>
+      </p:nvGrpSpPr>
+      <p:grpSpPr>
+        <a:xfrm>
+          <a:off x="0" y="0"/>
+          <a:ext cx="0" cy="0"/>
+          <a:chOff x="0" y="0"/>
+          <a:chExt cx="0" cy="0"/>
+        </a:xfrm>
+      </p:grpSpPr>
+      <p:sp>
+        <p:nvSpPr>
+          <p:cNvPr id="2" name="Title 1"/>
+          <p:cNvSpPr>
+            <a:spLocks noGrp="1"/>
+          </p:cNvSpPr>
+          <p:nvPr>
+            <p:ph type="title"/>
+          </p:nvPr>
+        </p:nvSpPr>
+        <p:spPr/>
+        <p:txBody>
+          <a:bodyPr/>
+          <a:lstStyle/>
+          <a:p>
+            <a:pPr lvl="0" indent="0" marL="0">
+              <a:buNone/>
+            </a:pPr>
+            <a:r>
+              <a:rPr/>
+              <a:t>PowerPoint templates</a:t>
+            </a:r>
+          </a:p>
+        </p:txBody>
+      </p:sp>
+      <p:sp>
+        <p:nvSpPr>
+          <p:cNvPr id="3" name="Content Placeholder 2"/>
+          <p:cNvSpPr>
+            <a:spLocks noGrp="1"/>
+          </p:cNvSpPr>
+          <p:nvPr>
+            <p:ph idx="1"/>
+          </p:nvPr>
+        </p:nvSpPr>
+        <p:spPr/>
+        <p:txBody>
+          <a:bodyPr/>
+          <a:lstStyle/>
+          <a:p>
+            <a:pPr lvl="0" indent="0" marL="0">
+              <a:buNone/>
+            </a:pPr>
+            <a:r>
+              <a:rPr/>
+              <a:t>By adding a </a:t>
+            </a:r>
+            <a:r>
+              <a:rPr>
+                <a:latin typeface="Consolas"/>
+              </a:rPr>
+              <a:t>reference-doc</a:t>
+            </a:r>
+            <a:r>
+              <a:rPr/>
+              <a:t> entry to your YAML, you can tell Quarto (and pandoc) to use a file as a template for the format of your presentation.</a:t>
+            </a:r>
+          </a:p>
+          <a:p>
+            <a:pPr lvl="0" indent="0" marL="0">
+              <a:buNone/>
+            </a:pPr>
+            <a:r>
+              <a:rPr/>
+              <a:t>The “Slide Master” needs to contain layouts named as per the previous slide (e.g. “Comparison”).</a:t>
+            </a:r>
+          </a:p>
+          <a:p>
+            <a:pPr lvl="0" indent="0" marL="0">
+              <a:buNone/>
+            </a:pPr>
+            <a:r>
+              <a:rPr/>
+              <a:t>This allows you a lot of flexibility in the design of your slide deck, even if it is for just the small number of layouts that were listed in the previous slide.</a:t>
+            </a:r>
+          </a:p>
+          <a:p>
+            <a:pPr lvl="0" indent="0" marL="0">
+              <a:buNone/>
+            </a:pPr>
+            <a:r>
+              <a:rPr/>
+              <a:t>You can control fonts, add background images, page numbering, etc.</a:t>
+            </a:r>
+          </a:p>
+          <a:p>
+            <a:pPr lvl="0" indent="0">
+              <a:buNone/>
+            </a:pPr>
+            <a:r>
+              <a:rPr>
+                <a:solidFill>
+                  <a:srgbClr val="AD0000"/>
+                </a:solidFill>
+                <a:latin typeface="Consolas"/>
+              </a:rPr>
+              <a:t>---</a:t>
+            </a:r>
+            <a:br/>
+            <a:r>
+              <a:rPr>
+                <a:solidFill>
+                  <a:srgbClr val="4758AB"/>
+                </a:solidFill>
+                <a:latin typeface="Consolas"/>
+              </a:rPr>
+              <a:t>title</a:t>
+            </a:r>
+            <a:r>
+              <a:rPr>
+                <a:solidFill>
+                  <a:srgbClr val="003B4F"/>
+                </a:solidFill>
+                <a:latin typeface="Consolas"/>
+              </a:rPr>
+              <a:t>:</a:t>
+            </a:r>
+            <a:r>
+              <a:rPr>
+                <a:solidFill>
+                  <a:srgbClr val="657422"/>
+                </a:solidFill>
+                <a:latin typeface="Consolas"/>
+              </a:rPr>
+              <a:t> </a:t>
+            </a:r>
+            <a:r>
+              <a:rPr>
+                <a:solidFill>
+                  <a:srgbClr val="20794D"/>
+                </a:solidFill>
+                <a:latin typeface="Consolas"/>
+              </a:rPr>
+              <a:t>"Using Quarto for everything"</a:t>
+            </a:r>
+            <a:br/>
+            <a:r>
+              <a:rPr>
+                <a:solidFill>
+                  <a:srgbClr val="4758AB"/>
+                </a:solidFill>
+                <a:latin typeface="Consolas"/>
+              </a:rPr>
+              <a:t>format</a:t>
+            </a:r>
+            <a:r>
+              <a:rPr>
+                <a:solidFill>
+                  <a:srgbClr val="003B4F"/>
+                </a:solidFill>
+                <a:latin typeface="Consolas"/>
+              </a:rPr>
+              <a:t>:</a:t>
+            </a:r>
+            <a:r>
+              <a:rPr>
+                <a:solidFill>
+                  <a:srgbClr val="657422"/>
+                </a:solidFill>
+                <a:latin typeface="Consolas"/>
+              </a:rPr>
+              <a:t> pptx</a:t>
+            </a:r>
+            <a:br/>
+            <a:r>
+              <a:rPr>
+                <a:solidFill>
+                  <a:srgbClr val="4758AB"/>
+                </a:solidFill>
+                <a:latin typeface="Consolas"/>
+              </a:rPr>
+              <a:t>reference-doc</a:t>
+            </a:r>
+            <a:r>
+              <a:rPr>
+                <a:solidFill>
+                  <a:srgbClr val="003B4F"/>
+                </a:solidFill>
+                <a:latin typeface="Consolas"/>
+              </a:rPr>
+              <a:t>:</a:t>
+            </a:r>
+            <a:r>
+              <a:rPr>
+                <a:solidFill>
+                  <a:srgbClr val="657422"/>
+                </a:solidFill>
+                <a:latin typeface="Consolas"/>
+              </a:rPr>
+              <a:t> templates/template.pptx</a:t>
+            </a:r>
+            <a:br/>
+            <a:r>
+              <a:rPr>
+                <a:solidFill>
+                  <a:srgbClr val="4758AB"/>
+                </a:solidFill>
+                <a:latin typeface="Consolas"/>
+              </a:rPr>
+              <a:t>author</a:t>
+            </a:r>
+            <a:r>
+              <a:rPr>
+                <a:solidFill>
+                  <a:srgbClr val="003B4F"/>
+                </a:solidFill>
+                <a:latin typeface="Consolas"/>
+              </a:rPr>
+              <a:t>:</a:t>
+            </a:r>
+            <a:r>
+              <a:rPr>
+                <a:solidFill>
+                  <a:srgbClr val="657422"/>
+                </a:solidFill>
+                <a:latin typeface="Consolas"/>
+              </a:rPr>
+              <a:t> Lucas A. Meyer</a:t>
+            </a:r>
+            <a:br/>
+            <a:r>
+              <a:rPr>
+                <a:solidFill>
+                  <a:srgbClr val="4758AB"/>
+                </a:solidFill>
+                <a:latin typeface="Consolas"/>
+              </a:rPr>
+              <a:t>date</a:t>
+            </a:r>
+            <a:r>
+              <a:rPr>
+                <a:solidFill>
+                  <a:srgbClr val="003B4F"/>
+                </a:solidFill>
+                <a:latin typeface="Consolas"/>
+              </a:rPr>
+              <a:t>:</a:t>
+            </a:r>
+            <a:r>
+              <a:rPr>
+                <a:solidFill>
+                  <a:srgbClr val="657422"/>
+                </a:solidFill>
+                <a:latin typeface="Consolas"/>
+              </a:rPr>
+              <a:t> 2022-07-14</a:t>
+            </a:r>
+            <a:br/>
+            <a:r>
+              <a:rPr>
+                <a:solidFill>
+                  <a:srgbClr val="AD0000"/>
+                </a:solidFill>
+                <a:latin typeface="Consolas"/>
+              </a:rPr>
+              <a:t>---</a:t>
+            </a:r>
+          </a:p>
+        </p:txBody>
+      </p:sp>
+    </p:spTree>
+  </p:cSld>
+</p:sld>
+</file>
+
+<file path=ppt/slides/slide19.xml><?xml version="1.0" encoding="utf-8"?>
+<p:sld xmlns:a="http://schemas.openxmlformats.org/drawingml/2006/main" xmlns:r="http://schemas.openxmlformats.org/officeDocument/2006/relationships" xmlns:p="http://schemas.openxmlformats.org/presentationml/2006/main">
+  <p:cSld>
+    <p:spTree>
+      <p:nvGrpSpPr>
+        <p:cNvPr id="1" name=""/>
+        <p:cNvGrpSpPr/>
+        <p:nvPr/>
+      </p:nvGrpSpPr>
+      <p:grpSpPr>
+        <a:xfrm>
+          <a:off x="0" y="0"/>
+          <a:ext cx="0" cy="0"/>
+          <a:chOff x="0" y="0"/>
+          <a:chExt cx="0" cy="0"/>
+        </a:xfrm>
+      </p:grpSpPr>
+      <p:sp>
+        <p:nvSpPr>
+          <p:cNvPr id="2" name="Title 1"/>
+          <p:cNvSpPr>
+            <a:spLocks noGrp="1"/>
+          </p:cNvSpPr>
+          <p:nvPr>
+            <p:ph type="title"/>
+          </p:nvPr>
+        </p:nvSpPr>
+        <p:spPr/>
+        <p:txBody>
+          <a:bodyPr/>
+          <a:lstStyle/>
+          <a:p>
+            <a:pPr lvl="0" indent="0" marL="0">
+              <a:buNone/>
+            </a:pPr>
+            <a:r>
+              <a:rPr/>
+              <a:t>Best feature: generate content dynamically</a:t>
+            </a:r>
+          </a:p>
+        </p:txBody>
+      </p:sp>
+      <p:sp>
+        <p:nvSpPr>
+          <p:cNvPr id="3" name="Content Placeholder 2"/>
+          <p:cNvSpPr>
+            <a:spLocks noGrp="1"/>
+          </p:cNvSpPr>
+          <p:nvPr>
+            <p:ph idx="1"/>
+          </p:nvPr>
+        </p:nvSpPr>
+        <p:spPr/>
+        <p:txBody>
+          <a:bodyPr/>
+          <a:lstStyle/>
+          <a:p>
+            <a:pPr lvl="0" indent="0" marL="0">
+              <a:buNone/>
+            </a:pPr>
+            <a:r>
+              <a:rPr/>
+              <a:t>Let’s say you’re presenting a project about population dynamics but you don’t know which world leaders are coming to the conference.</a:t>
+            </a:r>
+          </a:p>
+          <a:p>
+            <a:pPr lvl="0" indent="0" marL="0">
+              <a:buNone/>
+            </a:pPr>
+            <a:r>
+              <a:rPr/>
+              <a:t>On the presentation day, you learn that Belgium, China, Brazil, India, Japan and Nigeria are attending.</a:t>
+            </a:r>
+          </a:p>
+          <a:p>
+            <a:pPr lvl="0" indent="0" marL="0">
+              <a:buNone/>
+            </a:pPr>
+            <a:r>
+              <a:rPr/>
+              <a:t>The next slides were generated using the code below:</a:t>
+            </a:r>
+          </a:p>
+          <a:p>
+            <a:pPr lvl="0" indent="0">
+              <a:buNone/>
+            </a:pPr>
+            <a:r>
+              <a:rPr>
+                <a:solidFill>
+                  <a:srgbClr val="003B4F"/>
+                </a:solidFill>
+                <a:latin typeface="Consolas"/>
+              </a:rPr>
+              <a:t>df_dr </a:t>
+            </a:r>
+            <a:r>
+              <a:rPr>
+                <a:solidFill>
+                  <a:srgbClr val="5E5E5E"/>
+                </a:solidFill>
+                <a:latin typeface="Consolas"/>
+              </a:rPr>
+              <a:t>=</a:t>
+            </a:r>
+            <a:r>
+              <a:rPr>
+                <a:solidFill>
+                  <a:srgbClr val="003B4F"/>
+                </a:solidFill>
+                <a:latin typeface="Consolas"/>
+              </a:rPr>
+              <a:t> pd.read_csv(</a:t>
+            </a:r>
+            <a:r>
+              <a:rPr>
+                <a:solidFill>
+                  <a:srgbClr val="20794D"/>
+                </a:solidFill>
+                <a:latin typeface="Consolas"/>
+              </a:rPr>
+              <a:t>"data/dr.csv.gz"</a:t>
+            </a:r>
+            <a:r>
+              <a:rPr>
+                <a:solidFill>
+                  <a:srgbClr val="003B4F"/>
+                </a:solidFill>
+                <a:latin typeface="Consolas"/>
+              </a:rPr>
+              <a:t>, compression</a:t>
+            </a:r>
+            <a:r>
+              <a:rPr>
+                <a:solidFill>
+                  <a:srgbClr val="5E5E5E"/>
+                </a:solidFill>
+                <a:latin typeface="Consolas"/>
+              </a:rPr>
+              <a:t>=</a:t>
+            </a:r>
+            <a:r>
+              <a:rPr>
+                <a:solidFill>
+                  <a:srgbClr val="20794D"/>
+                </a:solidFill>
+                <a:latin typeface="Consolas"/>
+              </a:rPr>
+              <a:t>"gzip"</a:t>
+            </a:r>
+            <a:r>
+              <a:rPr>
+                <a:solidFill>
+                  <a:srgbClr val="003B4F"/>
+                </a:solidFill>
+                <a:latin typeface="Consolas"/>
+              </a:rPr>
+              <a:t>)</a:t>
+            </a:r>
+            <a:br/>
+            <a:r>
+              <a:rPr>
+                <a:solidFill>
+                  <a:srgbClr val="003B4F"/>
+                </a:solidFill>
+                <a:latin typeface="Consolas"/>
+              </a:rPr>
+              <a:t>df_pop </a:t>
+            </a:r>
+            <a:r>
+              <a:rPr>
+                <a:solidFill>
+                  <a:srgbClr val="5E5E5E"/>
+                </a:solidFill>
+                <a:latin typeface="Consolas"/>
+              </a:rPr>
+              <a:t>=</a:t>
+            </a:r>
+            <a:r>
+              <a:rPr>
+                <a:solidFill>
+                  <a:srgbClr val="003B4F"/>
+                </a:solidFill>
+                <a:latin typeface="Consolas"/>
+              </a:rPr>
+              <a:t> pd.read_csv(</a:t>
+            </a:r>
+            <a:r>
+              <a:rPr>
+                <a:solidFill>
+                  <a:srgbClr val="20794D"/>
+                </a:solidFill>
+                <a:latin typeface="Consolas"/>
+              </a:rPr>
+              <a:t>"data/pop_brackets.csv.gz"</a:t>
+            </a:r>
+            <a:r>
+              <a:rPr>
+                <a:solidFill>
+                  <a:srgbClr val="003B4F"/>
+                </a:solidFill>
+                <a:latin typeface="Consolas"/>
+              </a:rPr>
+              <a:t>, compression</a:t>
+            </a:r>
+            <a:r>
+              <a:rPr>
+                <a:solidFill>
+                  <a:srgbClr val="5E5E5E"/>
+                </a:solidFill>
+                <a:latin typeface="Consolas"/>
+              </a:rPr>
+              <a:t>=</a:t>
+            </a:r>
+            <a:r>
+              <a:rPr>
+                <a:solidFill>
+                  <a:srgbClr val="20794D"/>
+                </a:solidFill>
+                <a:latin typeface="Consolas"/>
+              </a:rPr>
+              <a:t>"gzip"</a:t>
+            </a:r>
+            <a:r>
+              <a:rPr>
+                <a:solidFill>
+                  <a:srgbClr val="003B4F"/>
+                </a:solidFill>
+                <a:latin typeface="Consolas"/>
+              </a:rPr>
+              <a:t>)</a:t>
+            </a:r>
+            <a:br/>
+            <a:br/>
+            <a:r>
+              <a:rPr>
+                <a:solidFill>
+                  <a:srgbClr val="003B4F"/>
+                </a:solidFill>
+                <a:latin typeface="Consolas"/>
+              </a:rPr>
+              <a:t>years </a:t>
+            </a:r>
+            <a:r>
+              <a:rPr>
+                <a:solidFill>
+                  <a:srgbClr val="5E5E5E"/>
+                </a:solidFill>
+                <a:latin typeface="Consolas"/>
+              </a:rPr>
+              <a:t>=</a:t>
+            </a:r>
+            <a:r>
+              <a:rPr>
+                <a:solidFill>
+                  <a:srgbClr val="003B4F"/>
+                </a:solidFill>
+                <a:latin typeface="Consolas"/>
+              </a:rPr>
+              <a:t> [</a:t>
+            </a:r>
+            <a:r>
+              <a:rPr>
+                <a:solidFill>
+                  <a:srgbClr val="AD0000"/>
+                </a:solidFill>
+                <a:latin typeface="Consolas"/>
+              </a:rPr>
+              <a:t>2000</a:t>
+            </a:r>
+            <a:r>
+              <a:rPr>
+                <a:solidFill>
+                  <a:srgbClr val="003B4F"/>
+                </a:solidFill>
+                <a:latin typeface="Consolas"/>
+              </a:rPr>
+              <a:t>, </a:t>
+            </a:r>
+            <a:r>
+              <a:rPr>
+                <a:solidFill>
+                  <a:srgbClr val="AD0000"/>
+                </a:solidFill>
+                <a:latin typeface="Consolas"/>
+              </a:rPr>
+              <a:t>2025</a:t>
+            </a:r>
+            <a:r>
+              <a:rPr>
+                <a:solidFill>
+                  <a:srgbClr val="003B4F"/>
+                </a:solidFill>
+                <a:latin typeface="Consolas"/>
+              </a:rPr>
+              <a:t>, </a:t>
+            </a:r>
+            <a:r>
+              <a:rPr>
+                <a:solidFill>
+                  <a:srgbClr val="AD0000"/>
+                </a:solidFill>
+                <a:latin typeface="Consolas"/>
+              </a:rPr>
+              <a:t>2050</a:t>
+            </a:r>
+            <a:r>
+              <a:rPr>
+                <a:solidFill>
+                  <a:srgbClr val="003B4F"/>
+                </a:solidFill>
+                <a:latin typeface="Consolas"/>
+              </a:rPr>
+              <a:t>, </a:t>
+            </a:r>
+            <a:r>
+              <a:rPr>
+                <a:solidFill>
+                  <a:srgbClr val="AD0000"/>
+                </a:solidFill>
+                <a:latin typeface="Consolas"/>
+              </a:rPr>
+              <a:t>2075</a:t>
+            </a:r>
+            <a:r>
+              <a:rPr>
+                <a:solidFill>
+                  <a:srgbClr val="003B4F"/>
+                </a:solidFill>
+                <a:latin typeface="Consolas"/>
+              </a:rPr>
+              <a:t>, </a:t>
+            </a:r>
+            <a:r>
+              <a:rPr>
+                <a:solidFill>
+                  <a:srgbClr val="AD0000"/>
+                </a:solidFill>
+                <a:latin typeface="Consolas"/>
+              </a:rPr>
+              <a:t>2100</a:t>
+            </a:r>
+            <a:r>
+              <a:rPr>
+                <a:solidFill>
+                  <a:srgbClr val="003B4F"/>
+                </a:solidFill>
+                <a:latin typeface="Consolas"/>
+              </a:rPr>
+              <a:t>]</a:t>
+            </a:r>
+            <a:br/>
+            <a:r>
+              <a:rPr>
+                <a:solidFill>
+                  <a:srgbClr val="003B4F"/>
+                </a:solidFill>
+                <a:latin typeface="Consolas"/>
+              </a:rPr>
+              <a:t>regions </a:t>
+            </a:r>
+            <a:r>
+              <a:rPr>
+                <a:solidFill>
+                  <a:srgbClr val="5E5E5E"/>
+                </a:solidFill>
+                <a:latin typeface="Consolas"/>
+              </a:rPr>
+              <a:t>=</a:t>
+            </a:r>
+            <a:r>
+              <a:rPr>
+                <a:solidFill>
+                  <a:srgbClr val="003B4F"/>
+                </a:solidFill>
+                <a:latin typeface="Consolas"/>
+              </a:rPr>
+              <a:t> [</a:t>
+            </a:r>
+            <a:r>
+              <a:rPr>
+                <a:solidFill>
+                  <a:srgbClr val="20794D"/>
+                </a:solidFill>
+                <a:latin typeface="Consolas"/>
+              </a:rPr>
+              <a:t>"Belgium"</a:t>
+            </a:r>
+            <a:r>
+              <a:rPr>
+                <a:solidFill>
+                  <a:srgbClr val="003B4F"/>
+                </a:solidFill>
+                <a:latin typeface="Consolas"/>
+              </a:rPr>
+              <a:t>, </a:t>
+            </a:r>
+            <a:r>
+              <a:rPr>
+                <a:solidFill>
+                  <a:srgbClr val="20794D"/>
+                </a:solidFill>
+                <a:latin typeface="Consolas"/>
+              </a:rPr>
+              <a:t>"China"</a:t>
+            </a:r>
+            <a:r>
+              <a:rPr>
+                <a:solidFill>
+                  <a:srgbClr val="003B4F"/>
+                </a:solidFill>
+                <a:latin typeface="Consolas"/>
+              </a:rPr>
+              <a:t>, </a:t>
+            </a:r>
+            <a:r>
+              <a:rPr>
+                <a:solidFill>
+                  <a:srgbClr val="20794D"/>
+                </a:solidFill>
+                <a:latin typeface="Consolas"/>
+              </a:rPr>
+              <a:t>"Brazil"</a:t>
+            </a:r>
+            <a:r>
+              <a:rPr>
+                <a:solidFill>
+                  <a:srgbClr val="003B4F"/>
+                </a:solidFill>
+                <a:latin typeface="Consolas"/>
+              </a:rPr>
+              <a:t>, </a:t>
+            </a:r>
+            <a:r>
+              <a:rPr>
+                <a:solidFill>
+                  <a:srgbClr val="20794D"/>
+                </a:solidFill>
+                <a:latin typeface="Consolas"/>
+              </a:rPr>
+              <a:t>"India"</a:t>
+            </a:r>
+            <a:r>
+              <a:rPr>
+                <a:solidFill>
+                  <a:srgbClr val="003B4F"/>
+                </a:solidFill>
+                <a:latin typeface="Consolas"/>
+              </a:rPr>
+              <a:t>, </a:t>
+            </a:r>
+            <a:r>
+              <a:rPr>
+                <a:solidFill>
+                  <a:srgbClr val="20794D"/>
+                </a:solidFill>
+                <a:latin typeface="Consolas"/>
+              </a:rPr>
+              <a:t>"Japan"</a:t>
+            </a:r>
+            <a:r>
+              <a:rPr>
+                <a:solidFill>
+                  <a:srgbClr val="003B4F"/>
+                </a:solidFill>
+                <a:latin typeface="Consolas"/>
+              </a:rPr>
+              <a:t>, </a:t>
+            </a:r>
+            <a:r>
+              <a:rPr>
+                <a:solidFill>
+                  <a:srgbClr val="20794D"/>
+                </a:solidFill>
+                <a:latin typeface="Consolas"/>
+              </a:rPr>
+              <a:t>"Nigeria"</a:t>
+            </a:r>
+            <a:r>
+              <a:rPr>
+                <a:solidFill>
+                  <a:srgbClr val="003B4F"/>
+                </a:solidFill>
+                <a:latin typeface="Consolas"/>
+              </a:rPr>
+              <a:t>]</a:t>
+            </a:r>
+            <a:br/>
+            <a:br/>
+            <a:r>
+              <a:rPr>
+                <a:solidFill>
+                  <a:srgbClr val="003B4F"/>
+                </a:solidFill>
+                <a:latin typeface="Consolas"/>
+              </a:rPr>
+              <a:t>for name in regions:</a:t>
+            </a:r>
+            <a:br/>
+            <a:r>
+              <a:rPr>
+                <a:solidFill>
+                  <a:srgbClr val="003B4F"/>
+                </a:solidFill>
+                <a:latin typeface="Consolas"/>
+              </a:rPr>
+              <a:t>    display(Markdown(</a:t>
+            </a:r>
+            <a:r>
+              <a:rPr>
+                <a:solidFill>
+                  <a:srgbClr val="20794D"/>
+                </a:solidFill>
+                <a:latin typeface="Consolas"/>
+              </a:rPr>
+              <a:t>f"## Age and Population Pyramids for </a:t>
+            </a:r>
+            <a:r>
+              <a:rPr>
+                <a:solidFill>
+                  <a:srgbClr val="5E5E5E"/>
+                </a:solidFill>
+                <a:latin typeface="Consolas"/>
+              </a:rPr>
+              <a:t>{</a:t>
+            </a:r>
+            <a:r>
+              <a:rPr>
+                <a:solidFill>
+                  <a:srgbClr val="003B4F"/>
+                </a:solidFill>
+                <a:latin typeface="Consolas"/>
+              </a:rPr>
+              <a:t>name</a:t>
+            </a:r>
+            <a:r>
+              <a:rPr>
+                <a:solidFill>
+                  <a:srgbClr val="5E5E5E"/>
+                </a:solidFill>
+                <a:latin typeface="Consolas"/>
+              </a:rPr>
+              <a:t>}</a:t>
+            </a:r>
+            <a:r>
+              <a:rPr>
+                <a:solidFill>
+                  <a:srgbClr val="20794D"/>
+                </a:solidFill>
+                <a:latin typeface="Consolas"/>
+              </a:rPr>
+              <a:t>"</a:t>
+            </a:r>
+            <a:r>
+              <a:rPr>
+                <a:solidFill>
+                  <a:srgbClr val="003B4F"/>
+                </a:solidFill>
+                <a:latin typeface="Consolas"/>
+              </a:rPr>
+              <a:t>))</a:t>
+            </a:r>
+            <a:br/>
+            <a:r>
+              <a:rPr>
+                <a:solidFill>
+                  <a:srgbClr val="003B4F"/>
+                </a:solidFill>
+                <a:latin typeface="Consolas"/>
+              </a:rPr>
+              <a:t>    display(Markdown(</a:t>
+            </a:r>
+            <a:r>
+              <a:rPr>
+                <a:solidFill>
+                  <a:srgbClr val="20794D"/>
+                </a:solidFill>
+                <a:latin typeface="Consolas"/>
+              </a:rPr>
+              <a:t>f'&lt;div class="columns"&gt;'</a:t>
+            </a:r>
+            <a:r>
+              <a:rPr>
+                <a:solidFill>
+                  <a:srgbClr val="003B4F"/>
+                </a:solidFill>
+                <a:latin typeface="Consolas"/>
+              </a:rPr>
+              <a:t>))</a:t>
+            </a:r>
+            <a:br/>
+            <a:r>
+              <a:rPr>
+                <a:solidFill>
+                  <a:srgbClr val="003B4F"/>
+                </a:solidFill>
+                <a:latin typeface="Consolas"/>
+              </a:rPr>
+              <a:t>    display(Markdown(</a:t>
+            </a:r>
+            <a:r>
+              <a:rPr>
+                <a:solidFill>
+                  <a:srgbClr val="20794D"/>
+                </a:solidFill>
+                <a:latin typeface="Consolas"/>
+              </a:rPr>
+              <a:t>f'&lt;div class="column"&gt;'</a:t>
+            </a:r>
+            <a:r>
+              <a:rPr>
+                <a:solidFill>
+                  <a:srgbClr val="003B4F"/>
+                </a:solidFill>
+                <a:latin typeface="Consolas"/>
+              </a:rPr>
+              <a:t>))</a:t>
+            </a:r>
+            <a:br/>
+            <a:r>
+              <a:rPr>
+                <a:solidFill>
+                  <a:srgbClr val="003B4F"/>
+                </a:solidFill>
+                <a:latin typeface="Consolas"/>
+              </a:rPr>
+              <a:t>    plot_dependency_ratio(df_dr[df_dr.Location </a:t>
+            </a:r>
+            <a:r>
+              <a:rPr>
+                <a:solidFill>
+                  <a:srgbClr val="5E5E5E"/>
+                </a:solidFill>
+                <a:latin typeface="Consolas"/>
+              </a:rPr>
+              <a:t>==</a:t>
+            </a:r>
+            <a:r>
+              <a:rPr>
+                <a:solidFill>
+                  <a:srgbClr val="003B4F"/>
+                </a:solidFill>
+                <a:latin typeface="Consolas"/>
+              </a:rPr>
+              <a:t> name])</a:t>
+            </a:r>
+            <a:br/>
+            <a:r>
+              <a:rPr>
+                <a:solidFill>
+                  <a:srgbClr val="003B4F"/>
+                </a:solidFill>
+                <a:latin typeface="Consolas"/>
+              </a:rPr>
+              <a:t>    display(Markdown(</a:t>
+            </a:r>
+            <a:r>
+              <a:rPr>
+                <a:solidFill>
+                  <a:srgbClr val="20794D"/>
+                </a:solidFill>
+                <a:latin typeface="Consolas"/>
+              </a:rPr>
+              <a:t>f'&lt;/div&gt;'</a:t>
+            </a:r>
+            <a:r>
+              <a:rPr>
+                <a:solidFill>
+                  <a:srgbClr val="003B4F"/>
+                </a:solidFill>
+                <a:latin typeface="Consolas"/>
+              </a:rPr>
+              <a:t>))</a:t>
+            </a:r>
+            <a:br/>
+            <a:r>
+              <a:rPr>
+                <a:solidFill>
+                  <a:srgbClr val="003B4F"/>
+                </a:solidFill>
+                <a:latin typeface="Consolas"/>
+              </a:rPr>
+              <a:t>    display(Markdown(</a:t>
+            </a:r>
+            <a:r>
+              <a:rPr>
+                <a:solidFill>
+                  <a:srgbClr val="20794D"/>
+                </a:solidFill>
+                <a:latin typeface="Consolas"/>
+              </a:rPr>
+              <a:t>f'&lt;div class="column"&gt;'</a:t>
+            </a:r>
+            <a:r>
+              <a:rPr>
+                <a:solidFill>
+                  <a:srgbClr val="003B4F"/>
+                </a:solidFill>
+                <a:latin typeface="Consolas"/>
+              </a:rPr>
+              <a:t>))</a:t>
+            </a:r>
+            <a:br/>
+            <a:r>
+              <a:rPr>
+                <a:solidFill>
+                  <a:srgbClr val="003B4F"/>
+                </a:solidFill>
+                <a:latin typeface="Consolas"/>
+              </a:rPr>
+              <a:t>    plot_population_pyramid_series(df_pop[df_pop[</a:t>
+            </a:r>
+            <a:r>
+              <a:rPr>
+                <a:solidFill>
+                  <a:srgbClr val="20794D"/>
+                </a:solidFill>
+                <a:latin typeface="Consolas"/>
+              </a:rPr>
+              <a:t>"Location"</a:t>
+            </a:r>
+            <a:r>
+              <a:rPr>
+                <a:solidFill>
+                  <a:srgbClr val="003B4F"/>
+                </a:solidFill>
+                <a:latin typeface="Consolas"/>
+              </a:rPr>
+              <a:t>]</a:t>
+            </a:r>
+            <a:r>
+              <a:rPr>
+                <a:solidFill>
+                  <a:srgbClr val="5E5E5E"/>
+                </a:solidFill>
+                <a:latin typeface="Consolas"/>
+              </a:rPr>
+              <a:t>==</a:t>
+            </a:r>
+            <a:r>
+              <a:rPr>
+                <a:solidFill>
+                  <a:srgbClr val="003B4F"/>
+                </a:solidFill>
+                <a:latin typeface="Consolas"/>
+              </a:rPr>
+              <a:t>name], years)</a:t>
+            </a:r>
+            <a:br/>
+            <a:r>
+              <a:rPr>
+                <a:solidFill>
+                  <a:srgbClr val="003B4F"/>
+                </a:solidFill>
+                <a:latin typeface="Consolas"/>
+              </a:rPr>
+              <a:t>    display(Markdown(</a:t>
+            </a:r>
+            <a:r>
+              <a:rPr>
+                <a:solidFill>
+                  <a:srgbClr val="20794D"/>
+                </a:solidFill>
+                <a:latin typeface="Consolas"/>
+              </a:rPr>
+              <a:t>f'&lt;/div&gt;'</a:t>
+            </a:r>
+            <a:r>
+              <a:rPr>
+                <a:solidFill>
+                  <a:srgbClr val="003B4F"/>
+                </a:solidFill>
+                <a:latin typeface="Consolas"/>
+              </a:rPr>
+              <a:t>))</a:t>
+            </a:r>
+            <a:br/>
+            <a:r>
+              <a:rPr>
+                <a:solidFill>
+                  <a:srgbClr val="003B4F"/>
+                </a:solidFill>
+                <a:latin typeface="Consolas"/>
+              </a:rPr>
+              <a:t>    display(Markdown(</a:t>
+            </a:r>
+            <a:r>
+              <a:rPr>
+                <a:solidFill>
+                  <a:srgbClr val="20794D"/>
+                </a:solidFill>
+                <a:latin typeface="Consolas"/>
+              </a:rPr>
+              <a:t>f'&lt;/div&gt;'</a:t>
+            </a:r>
+            <a:r>
+              <a:rPr>
+                <a:solidFill>
+                  <a:srgbClr val="003B4F"/>
+                </a:solidFill>
+                <a:latin typeface="Consolas"/>
+              </a:rPr>
+              <a:t>))</a:t>
+            </a:r>
+          </a:p>
+        </p:txBody>
+      </p:sp>
+    </p:spTree>
+  </p:cSld>
+</p:sld>
+</file>
+
+<file path=ppt/slides/slide2.xml><?xml version="1.0" encoding="utf-8"?>
+<p:sld xmlns:a="http://schemas.openxmlformats.org/drawingml/2006/main" xmlns:r="http://schemas.openxmlformats.org/officeDocument/2006/relationships" xmlns:p="http://schemas.openxmlformats.org/presentationml/2006/main">
+  <p:cSld>
+    <p:spTree>
+      <p:nvGrpSpPr>
+        <p:cNvPr id="1" name=""/>
+        <p:cNvGrpSpPr/>
+        <p:nvPr/>
+      </p:nvGrpSpPr>
+      <p:grpSpPr>
+        <a:xfrm>
+          <a:off x="0" y="0"/>
+          <a:ext cx="0" cy="0"/>
+          <a:chOff x="0" y="0"/>
+          <a:chExt cx="0" cy="0"/>
+        </a:xfrm>
+      </p:grpSpPr>
+      <p:sp>
+        <p:nvSpPr>
+          <p:cNvPr id="2" name="Title 1"/>
+          <p:cNvSpPr>
+            <a:spLocks noGrp="1"/>
+          </p:cNvSpPr>
+          <p:nvPr>
+            <p:ph type="title"/>
+          </p:nvPr>
+        </p:nvSpPr>
+        <p:spPr>
+          <a:xfrm>
+            <a:off x="722313" y="3305176"/>
+            <a:ext cx="7772400" cy="1021556"/>
+          </a:xfrm>
+        </p:spPr>
+        <p:txBody>
+          <a:bodyPr/>
+          <a:lstStyle/>
+          <a:p>
+            <a:pPr lvl="0" indent="0" marL="0">
+              <a:buNone/>
+            </a:pPr>
+            <a:r>
+              <a:rPr/>
+              <a:t>Why Quarto</a:t>
+            </a:r>
+          </a:p>
+        </p:txBody>
+      </p:sp>
+    </p:spTree>
+  </p:cSld>
+</p:sld>
+</file>
+
+<file path=ppt/slides/slide20.xml><?xml version="1.0" encoding="utf-8"?>
 <p:sld xmlns:a="http://schemas.openxmlformats.org/drawingml/2006/main" xmlns:r="http://schemas.openxmlformats.org/officeDocument/2006/relationships" xmlns:p="http://schemas.openxmlformats.org/presentationml/2006/main">
   <p:cSld>
     <p:spTree>
@@ -6954,7 +7769,7 @@
 </p:sld>
 </file>
 
-<file path=ppt/slides/slide18.xml><?xml version="1.0" encoding="utf-8"?>
+<file path=ppt/slides/slide21.xml><?xml version="1.0" encoding="utf-8"?>
 <p:sld xmlns:a="http://schemas.openxmlformats.org/drawingml/2006/main" xmlns:r="http://schemas.openxmlformats.org/officeDocument/2006/relationships" xmlns:p="http://schemas.openxmlformats.org/presentationml/2006/main">
   <p:cSld>
     <p:spTree>
@@ -7061,7 +7876,7 @@
 </p:sld>
 </file>
 
-<file path=ppt/slides/slide19.xml><?xml version="1.0" encoding="utf-8"?>
+<file path=ppt/slides/slide22.xml><?xml version="1.0" encoding="utf-8"?>
 <p:sld xmlns:a="http://schemas.openxmlformats.org/drawingml/2006/main" xmlns:r="http://schemas.openxmlformats.org/officeDocument/2006/relationships" xmlns:p="http://schemas.openxmlformats.org/presentationml/2006/main">
   <p:cSld>
     <p:spTree>
@@ -7168,59 +7983,7 @@
 </p:sld>
 </file>
 
-<file path=ppt/slides/slide2.xml><?xml version="1.0" encoding="utf-8"?>
-<p:sld xmlns:a="http://schemas.openxmlformats.org/drawingml/2006/main" xmlns:r="http://schemas.openxmlformats.org/officeDocument/2006/relationships" xmlns:p="http://schemas.openxmlformats.org/presentationml/2006/main">
-  <p:cSld>
-    <p:spTree>
-      <p:nvGrpSpPr>
-        <p:cNvPr id="1" name=""/>
-        <p:cNvGrpSpPr/>
-        <p:nvPr/>
-      </p:nvGrpSpPr>
-      <p:grpSpPr>
-        <a:xfrm>
-          <a:off x="0" y="0"/>
-          <a:ext cx="0" cy="0"/>
-          <a:chOff x="0" y="0"/>
-          <a:chExt cx="0" cy="0"/>
-        </a:xfrm>
-      </p:grpSpPr>
-      <p:sp>
-        <p:nvSpPr>
-          <p:cNvPr id="2" name="Title 1"/>
-          <p:cNvSpPr>
-            <a:spLocks noGrp="1"/>
-          </p:cNvSpPr>
-          <p:nvPr>
-            <p:ph type="title"/>
-          </p:nvPr>
-        </p:nvSpPr>
-        <p:spPr>
-          <a:xfrm>
-            <a:off x="722313" y="3305176"/>
-            <a:ext cx="7772400" cy="1021556"/>
-          </a:xfrm>
-        </p:spPr>
-        <p:txBody>
-          <a:bodyPr/>
-          <a:lstStyle/>
-          <a:p>
-            <a:pPr lvl="0" indent="0" marL="0">
-              <a:buNone/>
-            </a:pPr>
-            <a:r>
-              <a:rPr/>
-              <a:t>Why Quarto</a:t>
-            </a:r>
-          </a:p>
-        </p:txBody>
-      </p:sp>
-    </p:spTree>
-  </p:cSld>
-</p:sld>
-</file>
-
-<file path=ppt/slides/slide20.xml><?xml version="1.0" encoding="utf-8"?>
+<file path=ppt/slides/slide23.xml><?xml version="1.0" encoding="utf-8"?>
 <p:sld xmlns:a="http://schemas.openxmlformats.org/drawingml/2006/main" xmlns:r="http://schemas.openxmlformats.org/officeDocument/2006/relationships" xmlns:p="http://schemas.openxmlformats.org/presentationml/2006/main">
   <p:cSld>
     <p:spTree>
@@ -7327,7 +8090,7 @@
 </p:sld>
 </file>
 
-<file path=ppt/slides/slide21.xml><?xml version="1.0" encoding="utf-8"?>
+<file path=ppt/slides/slide24.xml><?xml version="1.0" encoding="utf-8"?>
 <p:sld xmlns:a="http://schemas.openxmlformats.org/drawingml/2006/main" xmlns:r="http://schemas.openxmlformats.org/officeDocument/2006/relationships" xmlns:p="http://schemas.openxmlformats.org/presentationml/2006/main">
   <p:cSld>
     <p:spTree>
@@ -7434,7 +8197,7 @@
 </p:sld>
 </file>
 
-<file path=ppt/slides/slide22.xml><?xml version="1.0" encoding="utf-8"?>
+<file path=ppt/slides/slide25.xml><?xml version="1.0" encoding="utf-8"?>
 <p:sld xmlns:a="http://schemas.openxmlformats.org/drawingml/2006/main" xmlns:r="http://schemas.openxmlformats.org/officeDocument/2006/relationships" xmlns:p="http://schemas.openxmlformats.org/presentationml/2006/main">
   <p:cSld>
     <p:spTree>
@@ -7541,7 +8304,7 @@
 </p:sld>
 </file>
 
-<file path=ppt/slides/slide23.xml><?xml version="1.0" encoding="utf-8"?>
+<file path=ppt/slides/slide26.xml><?xml version="1.0" encoding="utf-8"?>
 <p:sld xmlns:a="http://schemas.openxmlformats.org/drawingml/2006/main" xmlns:r="http://schemas.openxmlformats.org/officeDocument/2006/relationships" xmlns:p="http://schemas.openxmlformats.org/presentationml/2006/main">
   <p:cSld>
     <p:spTree>
@@ -7593,7 +8356,7 @@
 </p:sld>
 </file>
 
-<file path=ppt/slides/slide24.xml><?xml version="1.0" encoding="utf-8"?>
+<file path=ppt/slides/slide27.xml><?xml version="1.0" encoding="utf-8"?>
 <p:sld xmlns:a="http://schemas.openxmlformats.org/drawingml/2006/main" xmlns:r="http://schemas.openxmlformats.org/officeDocument/2006/relationships" xmlns:p="http://schemas.openxmlformats.org/presentationml/2006/main">
   <p:cSld>
     <p:spTree>
@@ -7905,7 +8668,7 @@
 </p:sld>
 </file>
 
-<file path=ppt/slides/slide25.xml><?xml version="1.0" encoding="utf-8"?>
+<file path=ppt/slides/slide28.xml><?xml version="1.0" encoding="utf-8"?>
 <p:sld xmlns:a="http://schemas.openxmlformats.org/drawingml/2006/main" xmlns:r="http://schemas.openxmlformats.org/officeDocument/2006/relationships" xmlns:p="http://schemas.openxmlformats.org/presentationml/2006/main">
   <p:cSld>
     <p:spTree>
@@ -7982,182 +8745,6 @@
 </p:sld>
 </file>
 
-<file path=ppt/slides/slide26.xml><?xml version="1.0" encoding="utf-8"?>
-<p:sld xmlns:a="http://schemas.openxmlformats.org/drawingml/2006/main" xmlns:r="http://schemas.openxmlformats.org/officeDocument/2006/relationships" xmlns:p="http://schemas.openxmlformats.org/presentationml/2006/main">
-  <p:cSld>
-    <p:spTree>
-      <p:nvGrpSpPr>
-        <p:cNvPr id="1" name=""/>
-        <p:cNvGrpSpPr/>
-        <p:nvPr/>
-      </p:nvGrpSpPr>
-      <p:grpSpPr>
-        <a:xfrm>
-          <a:off x="0" y="0"/>
-          <a:ext cx="0" cy="0"/>
-          <a:chOff x="0" y="0"/>
-          <a:chExt cx="0" cy="0"/>
-        </a:xfrm>
-      </p:grpSpPr>
-      <p:sp>
-        <p:nvSpPr>
-          <p:cNvPr id="2" name="Title 1"/>
-          <p:cNvSpPr>
-            <a:spLocks noGrp="1"/>
-          </p:cNvSpPr>
-          <p:nvPr>
-            <p:ph type="title"/>
-          </p:nvPr>
-        </p:nvSpPr>
-        <p:spPr>
-          <a:xfrm>
-            <a:off x="722313" y="3305176"/>
-            <a:ext cx="7772400" cy="1021556"/>
-          </a:xfrm>
-        </p:spPr>
-        <p:txBody>
-          <a:bodyPr/>
-          <a:lstStyle/>
-          <a:p>
-            <a:pPr lvl="0" indent="0" marL="0">
-              <a:buNone/>
-            </a:pPr>
-            <a:r>
-              <a:rPr/>
-              <a:t>Articles</a:t>
-            </a:r>
-          </a:p>
-        </p:txBody>
-      </p:sp>
-    </p:spTree>
-  </p:cSld>
-</p:sld>
-</file>
-
-<file path=ppt/slides/slide27.xml><?xml version="1.0" encoding="utf-8"?>
-<p:sld xmlns:a="http://schemas.openxmlformats.org/drawingml/2006/main" xmlns:r="http://schemas.openxmlformats.org/officeDocument/2006/relationships" xmlns:p="http://schemas.openxmlformats.org/presentationml/2006/main">
-  <p:cSld>
-    <p:spTree>
-      <p:nvGrpSpPr>
-        <p:cNvPr id="1" name=""/>
-        <p:cNvGrpSpPr/>
-        <p:nvPr/>
-      </p:nvGrpSpPr>
-      <p:grpSpPr>
-        <a:xfrm>
-          <a:off x="0" y="0"/>
-          <a:ext cx="0" cy="0"/>
-          <a:chOff x="0" y="0"/>
-          <a:chExt cx="0" cy="0"/>
-        </a:xfrm>
-      </p:grpSpPr>
-      <p:sp>
-        <p:nvSpPr>
-          <p:cNvPr id="2" name="Title 1"/>
-          <p:cNvSpPr>
-            <a:spLocks noGrp="1"/>
-          </p:cNvSpPr>
-          <p:nvPr>
-            <p:ph type="title"/>
-          </p:nvPr>
-        </p:nvSpPr>
-        <p:spPr/>
-        <p:txBody>
-          <a:bodyPr/>
-          <a:lstStyle/>
-          <a:p>
-            <a:pPr lvl="0" indent="0" marL="0">
-              <a:buNone/>
-            </a:pPr>
-            <a:r>
-              <a:rPr/>
-              <a:t>Blah</a:t>
-            </a:r>
-          </a:p>
-        </p:txBody>
-      </p:sp>
-      <p:sp>
-        <p:nvSpPr>
-          <p:cNvPr id="3" name="Content Placeholder 2"/>
-          <p:cNvSpPr>
-            <a:spLocks noGrp="1"/>
-          </p:cNvSpPr>
-          <p:nvPr>
-            <p:ph idx="1"/>
-          </p:nvPr>
-        </p:nvSpPr>
-        <p:spPr/>
-        <p:txBody>
-          <a:bodyPr/>
-          <a:lstStyle/>
-          <a:p>
-            <a:pPr lvl="0" indent="0" marL="0">
-              <a:buNone/>
-            </a:pPr>
-            <a:r>
-              <a:rPr/>
-              <a:t>bleh blih</a:t>
-            </a:r>
-          </a:p>
-        </p:txBody>
-      </p:sp>
-    </p:spTree>
-  </p:cSld>
-</p:sld>
-</file>
-
-<file path=ppt/slides/slide28.xml><?xml version="1.0" encoding="utf-8"?>
-<p:sld xmlns:a="http://schemas.openxmlformats.org/drawingml/2006/main" xmlns:r="http://schemas.openxmlformats.org/officeDocument/2006/relationships" xmlns:p="http://schemas.openxmlformats.org/presentationml/2006/main">
-  <p:cSld>
-    <p:spTree>
-      <p:nvGrpSpPr>
-        <p:cNvPr id="1" name=""/>
-        <p:cNvGrpSpPr/>
-        <p:nvPr/>
-      </p:nvGrpSpPr>
-      <p:grpSpPr>
-        <a:xfrm>
-          <a:off x="0" y="0"/>
-          <a:ext cx="0" cy="0"/>
-          <a:chOff x="0" y="0"/>
-          <a:chExt cx="0" cy="0"/>
-        </a:xfrm>
-      </p:grpSpPr>
-      <p:sp>
-        <p:nvSpPr>
-          <p:cNvPr id="2" name="Title 1"/>
-          <p:cNvSpPr>
-            <a:spLocks noGrp="1"/>
-          </p:cNvSpPr>
-          <p:nvPr>
-            <p:ph type="title"/>
-          </p:nvPr>
-        </p:nvSpPr>
-        <p:spPr>
-          <a:xfrm>
-            <a:off x="722313" y="3305176"/>
-            <a:ext cx="7772400" cy="1021556"/>
-          </a:xfrm>
-        </p:spPr>
-        <p:txBody>
-          <a:bodyPr/>
-          <a:lstStyle/>
-          <a:p>
-            <a:pPr lvl="0" indent="0" marL="0">
-              <a:buNone/>
-            </a:pPr>
-            <a:r>
-              <a:rPr/>
-              <a:t>Projects</a:t>
-            </a:r>
-          </a:p>
-        </p:txBody>
-      </p:sp>
-    </p:spTree>
-  </p:cSld>
-</p:sld>
-</file>
-
 <file path=ppt/slides/slide29.xml><?xml version="1.0" encoding="utf-8"?>
 <p:sld xmlns:a="http://schemas.openxmlformats.org/drawingml/2006/main" xmlns:r="http://schemas.openxmlformats.org/officeDocument/2006/relationships" xmlns:p="http://schemas.openxmlformats.org/presentationml/2006/main">
   <p:cSld>
@@ -8185,7 +8772,12 @@
             <p:ph type="title"/>
           </p:nvPr>
         </p:nvSpPr>
-        <p:spPr/>
+        <p:spPr>
+          <a:xfrm>
+            <a:off x="722313" y="3305176"/>
+            <a:ext cx="7772400" cy="1021556"/>
+          </a:xfrm>
+        </p:spPr>
         <p:txBody>
           <a:bodyPr/>
           <a:lstStyle/>
@@ -8195,32 +8787,7 @@
             </a:pPr>
             <a:r>
               <a:rPr/>
-              <a:t>Blah</a:t>
-            </a:r>
-          </a:p>
-        </p:txBody>
-      </p:sp>
-      <p:sp>
-        <p:nvSpPr>
-          <p:cNvPr id="3" name="Content Placeholder 2"/>
-          <p:cNvSpPr>
-            <a:spLocks noGrp="1"/>
-          </p:cNvSpPr>
-          <p:nvPr>
-            <p:ph idx="1"/>
-          </p:nvPr>
-        </p:nvSpPr>
-        <p:spPr/>
-        <p:txBody>
-          <a:bodyPr/>
-          <a:lstStyle/>
-          <a:p>
-            <a:pPr lvl="0" indent="0" marL="0">
-              <a:buNone/>
-            </a:pPr>
-            <a:r>
-              <a:rPr/>
-              <a:t>Bleh - blih You can use Quarto to generate the whole shebang!</a:t>
+              <a:t>Articles</a:t>
             </a:r>
           </a:p>
         </p:txBody>
@@ -8838,6 +9405,202 @@
 </p:sld>
 </file>
 
+<file path=ppt/slides/slide30.xml><?xml version="1.0" encoding="utf-8"?>
+<p:sld xmlns:a="http://schemas.openxmlformats.org/drawingml/2006/main" xmlns:r="http://schemas.openxmlformats.org/officeDocument/2006/relationships" xmlns:p="http://schemas.openxmlformats.org/presentationml/2006/main">
+  <p:cSld>
+    <p:spTree>
+      <p:nvGrpSpPr>
+        <p:cNvPr id="1" name=""/>
+        <p:cNvGrpSpPr/>
+        <p:nvPr/>
+      </p:nvGrpSpPr>
+      <p:grpSpPr>
+        <a:xfrm>
+          <a:off x="0" y="0"/>
+          <a:ext cx="0" cy="0"/>
+          <a:chOff x="0" y="0"/>
+          <a:chExt cx="0" cy="0"/>
+        </a:xfrm>
+      </p:grpSpPr>
+      <p:sp>
+        <p:nvSpPr>
+          <p:cNvPr id="2" name="Title 1"/>
+          <p:cNvSpPr>
+            <a:spLocks noGrp="1"/>
+          </p:cNvSpPr>
+          <p:nvPr>
+            <p:ph type="title"/>
+          </p:nvPr>
+        </p:nvSpPr>
+        <p:spPr/>
+        <p:txBody>
+          <a:bodyPr/>
+          <a:lstStyle/>
+          <a:p>
+            <a:pPr lvl="0" indent="0" marL="0">
+              <a:buNone/>
+            </a:pPr>
+            <a:r>
+              <a:rPr/>
+              <a:t>Blah</a:t>
+            </a:r>
+          </a:p>
+        </p:txBody>
+      </p:sp>
+      <p:sp>
+        <p:nvSpPr>
+          <p:cNvPr id="3" name="Content Placeholder 2"/>
+          <p:cNvSpPr>
+            <a:spLocks noGrp="1"/>
+          </p:cNvSpPr>
+          <p:nvPr>
+            <p:ph idx="1"/>
+          </p:nvPr>
+        </p:nvSpPr>
+        <p:spPr/>
+        <p:txBody>
+          <a:bodyPr/>
+          <a:lstStyle/>
+          <a:p>
+            <a:pPr lvl="0" indent="0" marL="0">
+              <a:buNone/>
+            </a:pPr>
+            <a:r>
+              <a:rPr/>
+              <a:t>bleh blih</a:t>
+            </a:r>
+          </a:p>
+        </p:txBody>
+      </p:sp>
+    </p:spTree>
+  </p:cSld>
+</p:sld>
+</file>
+
+<file path=ppt/slides/slide31.xml><?xml version="1.0" encoding="utf-8"?>
+<p:sld xmlns:a="http://schemas.openxmlformats.org/drawingml/2006/main" xmlns:r="http://schemas.openxmlformats.org/officeDocument/2006/relationships" xmlns:p="http://schemas.openxmlformats.org/presentationml/2006/main">
+  <p:cSld>
+    <p:spTree>
+      <p:nvGrpSpPr>
+        <p:cNvPr id="1" name=""/>
+        <p:cNvGrpSpPr/>
+        <p:nvPr/>
+      </p:nvGrpSpPr>
+      <p:grpSpPr>
+        <a:xfrm>
+          <a:off x="0" y="0"/>
+          <a:ext cx="0" cy="0"/>
+          <a:chOff x="0" y="0"/>
+          <a:chExt cx="0" cy="0"/>
+        </a:xfrm>
+      </p:grpSpPr>
+      <p:sp>
+        <p:nvSpPr>
+          <p:cNvPr id="2" name="Title 1"/>
+          <p:cNvSpPr>
+            <a:spLocks noGrp="1"/>
+          </p:cNvSpPr>
+          <p:nvPr>
+            <p:ph type="title"/>
+          </p:nvPr>
+        </p:nvSpPr>
+        <p:spPr>
+          <a:xfrm>
+            <a:off x="722313" y="3305176"/>
+            <a:ext cx="7772400" cy="1021556"/>
+          </a:xfrm>
+        </p:spPr>
+        <p:txBody>
+          <a:bodyPr/>
+          <a:lstStyle/>
+          <a:p>
+            <a:pPr lvl="0" indent="0" marL="0">
+              <a:buNone/>
+            </a:pPr>
+            <a:r>
+              <a:rPr/>
+              <a:t>Projects</a:t>
+            </a:r>
+          </a:p>
+        </p:txBody>
+      </p:sp>
+    </p:spTree>
+  </p:cSld>
+</p:sld>
+</file>
+
+<file path=ppt/slides/slide32.xml><?xml version="1.0" encoding="utf-8"?>
+<p:sld xmlns:a="http://schemas.openxmlformats.org/drawingml/2006/main" xmlns:r="http://schemas.openxmlformats.org/officeDocument/2006/relationships" xmlns:p="http://schemas.openxmlformats.org/presentationml/2006/main">
+  <p:cSld>
+    <p:spTree>
+      <p:nvGrpSpPr>
+        <p:cNvPr id="1" name=""/>
+        <p:cNvGrpSpPr/>
+        <p:nvPr/>
+      </p:nvGrpSpPr>
+      <p:grpSpPr>
+        <a:xfrm>
+          <a:off x="0" y="0"/>
+          <a:ext cx="0" cy="0"/>
+          <a:chOff x="0" y="0"/>
+          <a:chExt cx="0" cy="0"/>
+        </a:xfrm>
+      </p:grpSpPr>
+      <p:sp>
+        <p:nvSpPr>
+          <p:cNvPr id="2" name="Title 1"/>
+          <p:cNvSpPr>
+            <a:spLocks noGrp="1"/>
+          </p:cNvSpPr>
+          <p:nvPr>
+            <p:ph type="title"/>
+          </p:nvPr>
+        </p:nvSpPr>
+        <p:spPr/>
+        <p:txBody>
+          <a:bodyPr/>
+          <a:lstStyle/>
+          <a:p>
+            <a:pPr lvl="0" indent="0" marL="0">
+              <a:buNone/>
+            </a:pPr>
+            <a:r>
+              <a:rPr/>
+              <a:t>Blah</a:t>
+            </a:r>
+          </a:p>
+        </p:txBody>
+      </p:sp>
+      <p:sp>
+        <p:nvSpPr>
+          <p:cNvPr id="3" name="Content Placeholder 2"/>
+          <p:cNvSpPr>
+            <a:spLocks noGrp="1"/>
+          </p:cNvSpPr>
+          <p:nvPr>
+            <p:ph idx="1"/>
+          </p:nvPr>
+        </p:nvSpPr>
+        <p:spPr/>
+        <p:txBody>
+          <a:bodyPr/>
+          <a:lstStyle/>
+          <a:p>
+            <a:pPr lvl="0" indent="0" marL="0">
+              <a:buNone/>
+            </a:pPr>
+            <a:r>
+              <a:rPr/>
+              <a:t>Bleh - blih You can use Quarto to generate the whole shebang!</a:t>
+            </a:r>
+          </a:p>
+        </p:txBody>
+      </p:sp>
+    </p:spTree>
+  </p:cSld>
+</p:sld>
+</file>
+
 <file path=ppt/slides/slide4.xml><?xml version="1.0" encoding="utf-8"?>
 <p:sld xmlns:a="http://schemas.openxmlformats.org/drawingml/2006/main" xmlns:r="http://schemas.openxmlformats.org/officeDocument/2006/relationships" xmlns:p="http://schemas.openxmlformats.org/presentationml/2006/main">
   <p:cSld>
@@ -9257,6 +10020,25 @@
                 <a:latin typeface="Consolas"/>
               </a:rPr>
               <a:t>R</a:t>
+            </a:r>
+          </a:p>
+          <a:p>
+            <a:pPr lvl="0" indent="0" marL="0">
+              <a:spcBef>
+                <a:spcPts val="3000"/>
+              </a:spcBef>
+              <a:buNone/>
+            </a:pPr>
+            <a:r>
+              <a:rPr b="1"/>
+              <a:t>Python notebooks</a:t>
+            </a:r>
+          </a:p>
+          <a:p>
+            <a:pPr lvl="0"/>
+            <a:r>
+              <a:rPr/>
+              <a:t>Great, with Pandoc</a:t>
             </a:r>
           </a:p>
         </p:txBody>

</xml_diff>

<commit_message>
Work done by Fri Jul  1 14:33:29 PDT 2022
</commit_message>
<xml_diff>
--- a/docs/presentation-orig.pptx
+++ b/docs/presentation-orig.pptx
@@ -4583,7 +4583,7 @@
                 </a:solidFill>
                 <a:latin typeface="Consolas"/>
               </a:rPr>
-              <a:t> sky</a:t>
+              <a:t> pulse</a:t>
             </a:r>
             <a:br/>
             <a:br/>
@@ -4640,7 +4640,7 @@
                 </a:solidFill>
                 <a:latin typeface="Consolas"/>
               </a:rPr>
-              <a:t> 2022-07-14</a:t>
+              <a:t> 2022-07-07</a:t>
             </a:r>
             <a:br/>
             <a:r>

</xml_diff>

<commit_message>
Work done by Fri Jul  1 15:16:58 PDT 2022
</commit_message>
<xml_diff>
--- a/docs/presentation-orig.pptx
+++ b/docs/presentation-orig.pptx
@@ -9762,7 +9762,17 @@
             </a:r>
             <a:r>
               <a:rPr/>
-              <a:t> (and LaTeX) run in a Windows computer circa 1998.</a:t>
+              <a:t> (and </a:t>
+            </a:r>
+            <a:r>
+              <a:rPr>
+                <a:latin typeface="Consolas"/>
+              </a:rPr>
+              <a:t>LaTeX</a:t>
+            </a:r>
+            <a:r>
+              <a:rPr/>
+              <a:t>) run in a Windows computer circa 1998.</a:t>
             </a:r>
           </a:p>
           <a:p>
@@ -9771,7 +9781,7 @@
             </a:pPr>
             <a:r>
               <a:rPr/>
-              <a:t>Jupyter notebooks implement that paradigm, as does Quarto. This makes it easier to publish content.</a:t>
+              <a:t>Jupyter implements the literate programming paradigm, but I haven’t seen the Markdown part gain a lot of traction.</a:t>
             </a:r>
           </a:p>
         </p:txBody>

</xml_diff>

<commit_message>
Work done by Fri Jul  1 15:47:07 PDT 2022
</commit_message>
<xml_diff>
--- a/docs/presentation-orig.pptx
+++ b/docs/presentation-orig.pptx
@@ -4702,213 +4702,16 @@
           </a:p>
         </p:txBody>
       </p:sp>
-      <p:sp>
-        <p:nvSpPr>
-          <p:cNvPr id="3" name="Content Placeholder 2"/>
-          <p:cNvSpPr>
-            <a:spLocks noGrp="1"/>
-          </p:cNvSpPr>
-          <p:nvPr>
-            <p:ph idx="1" sz="half"/>
-          </p:nvPr>
-        </p:nvSpPr>
-        <p:spPr/>
-        <p:txBody>
-          <a:bodyPr/>
-          <a:lstStyle/>
-          <a:p>
-            <a:pPr lvl="0" indent="0">
-              <a:buNone/>
-            </a:pPr>
-            <a:r>
-              <a:rPr>
-                <a:solidFill>
-                  <a:srgbClr val="4758AB"/>
-                </a:solidFill>
-                <a:latin typeface="Consolas"/>
-              </a:rPr>
-              <a:t>### Writing the main content</a:t>
-            </a:r>
-            <a:br/>
-            <a:br/>
-            <a:r>
-              <a:rPr>
-                <a:solidFill>
-                  <a:srgbClr val="003B4F"/>
-                </a:solidFill>
-                <a:latin typeface="Consolas"/>
-              </a:rPr>
-              <a:t>Most writing in Quarto is done in </a:t>
-            </a:r>
-            <a:r>
-              <a:rPr>
-                <a:solidFill>
-                  <a:srgbClr val="5E5E5E"/>
-                </a:solidFill>
-                <a:latin typeface="Consolas"/>
-              </a:rPr>
-              <a:t>[</a:t>
-            </a:r>
-            <a:r>
-              <a:rPr>
-                <a:solidFill>
-                  <a:srgbClr val="003B4F"/>
-                </a:solidFill>
-                <a:latin typeface="Consolas"/>
-              </a:rPr>
-              <a:t>Markdown</a:t>
-            </a:r>
-            <a:r>
-              <a:rPr>
-                <a:solidFill>
-                  <a:srgbClr val="5E5E5E"/>
-                </a:solidFill>
-                <a:latin typeface="Consolas"/>
-              </a:rPr>
-              <a:t>]</a:t>
-            </a:r>
-            <a:r>
-              <a:rPr>
-                <a:solidFill>
-                  <a:srgbClr val="003B4F"/>
-                </a:solidFill>
-                <a:latin typeface="Consolas"/>
-              </a:rPr>
-              <a:t>.</a:t>
-            </a:r>
-            <a:br/>
-            <a:br/>
-            <a:r>
-              <a:rPr>
-                <a:solidFill>
-                  <a:srgbClr val="003B4F"/>
-                </a:solidFill>
-                <a:latin typeface="Consolas"/>
-              </a:rPr>
-              <a:t>Quarto's Markdown supports everything I'm</a:t>
-            </a:r>
-            <a:br/>
-            <a:r>
-              <a:rPr>
-                <a:solidFill>
-                  <a:srgbClr val="003B4F"/>
-                </a:solidFill>
-                <a:latin typeface="Consolas"/>
-              </a:rPr>
-              <a:t>used to: figures, tables, bibliography, etc.</a:t>
-            </a:r>
-            <a:br/>
-            <a:br/>
-            <a:r>
-              <a:rPr>
-                <a:solidFill>
-                  <a:srgbClr val="003B4F"/>
-                </a:solidFill>
-                <a:latin typeface="Consolas"/>
-              </a:rPr>
-              <a:t>It also supports lots of extra features, like</a:t>
-            </a:r>
-            <a:br/>
-            <a:r>
-              <a:rPr>
-                <a:solidFill>
-                  <a:srgbClr val="003B4F"/>
-                </a:solidFill>
-                <a:latin typeface="Consolas"/>
-              </a:rPr>
-              <a:t>diagrams with </a:t>
-            </a:r>
-            <a:r>
-              <a:rPr>
-                <a:solidFill>
-                  <a:srgbClr val="5E5E5E"/>
-                </a:solidFill>
-                <a:latin typeface="Consolas"/>
-              </a:rPr>
-              <a:t>`mermaid`</a:t>
-            </a:r>
-            <a:r>
-              <a:rPr>
-                <a:solidFill>
-                  <a:srgbClr val="003B4F"/>
-                </a:solidFill>
-                <a:latin typeface="Consolas"/>
-              </a:rPr>
-              <a:t> and </a:t>
-            </a:r>
-            <a:r>
-              <a:rPr>
-                <a:solidFill>
-                  <a:srgbClr val="5E5E5E"/>
-                </a:solidFill>
-                <a:latin typeface="Consolas"/>
-              </a:rPr>
-              <a:t>`GraphViz`</a:t>
-            </a:r>
-            <a:r>
-              <a:rPr>
-                <a:solidFill>
-                  <a:srgbClr val="003B4F"/>
-                </a:solidFill>
-                <a:latin typeface="Consolas"/>
-              </a:rPr>
-              <a:t> and</a:t>
-            </a:r>
-            <a:br/>
-            <a:r>
-              <a:rPr>
-                <a:solidFill>
-                  <a:srgbClr val="003B4F"/>
-                </a:solidFill>
-                <a:latin typeface="Consolas"/>
-              </a:rPr>
-              <a:t>even LaTeX equations: </a:t>
-            </a:r>
-            <a:br/>
-            <a:br/>
-            <a:r>
-              <a:rPr>
-                <a:solidFill>
-                  <a:srgbClr val="003B4F"/>
-                </a:solidFill>
-                <a:latin typeface="Consolas"/>
-              </a:rPr>
-              <a:t>$$</a:t>
-            </a:r>
-            <a:br/>
-            <a:r>
-              <a:rPr>
-                <a:solidFill>
-                  <a:srgbClr val="003B4F"/>
-                </a:solidFill>
-                <a:latin typeface="Consolas"/>
-              </a:rPr>
-              <a:t>E = mc^2</a:t>
-            </a:r>
-            <a:br/>
-            <a:r>
-              <a:rPr>
-                <a:solidFill>
-                  <a:srgbClr val="003B4F"/>
-                </a:solidFill>
-                <a:latin typeface="Consolas"/>
-              </a:rPr>
-              <a:t>$$</a:t>
-            </a:r>
-            <a:br/>
-          </a:p>
-        </p:txBody>
-      </p:sp>
       <mc:AlternateContent xmlns:mc="http://schemas.openxmlformats.org/markup-compatibility/2006">
         <mc:Choice xmlns:a14="http://schemas.microsoft.com/office/drawing/2010/main" Requires="a14">
           <p:sp>
             <p:nvSpPr>
-              <p:cNvPr id="4" name="Content Placeholder 3"/>
+              <p:cNvPr id="3" name="Content Placeholder 2"/>
               <p:cNvSpPr>
                 <a:spLocks noGrp="1"/>
               </p:cNvSpPr>
               <p:nvPr>
-                <p:ph idx="2" sz="half"/>
+                <p:ph idx="1" sz="half"/>
               </p:nvPr>
             </p:nvSpPr>
             <p:spPr/>
@@ -5026,6 +4829,203 @@
           </p:sp>
         </mc:Choice>
       </mc:AlternateContent>
+      <p:sp>
+        <p:nvSpPr>
+          <p:cNvPr id="4" name="Content Placeholder 3"/>
+          <p:cNvSpPr>
+            <a:spLocks noGrp="1"/>
+          </p:cNvSpPr>
+          <p:nvPr>
+            <p:ph idx="2" sz="half"/>
+          </p:nvPr>
+        </p:nvSpPr>
+        <p:spPr/>
+        <p:txBody>
+          <a:bodyPr/>
+          <a:lstStyle/>
+          <a:p>
+            <a:pPr lvl="0" indent="0">
+              <a:buNone/>
+            </a:pPr>
+            <a:r>
+              <a:rPr>
+                <a:solidFill>
+                  <a:srgbClr val="4758AB"/>
+                </a:solidFill>
+                <a:latin typeface="Consolas"/>
+              </a:rPr>
+              <a:t>### Writing the main content</a:t>
+            </a:r>
+            <a:br/>
+            <a:br/>
+            <a:r>
+              <a:rPr>
+                <a:solidFill>
+                  <a:srgbClr val="003B4F"/>
+                </a:solidFill>
+                <a:latin typeface="Consolas"/>
+              </a:rPr>
+              <a:t>Most writing in Quarto is done in </a:t>
+            </a:r>
+            <a:r>
+              <a:rPr>
+                <a:solidFill>
+                  <a:srgbClr val="5E5E5E"/>
+                </a:solidFill>
+                <a:latin typeface="Consolas"/>
+              </a:rPr>
+              <a:t>[</a:t>
+            </a:r>
+            <a:r>
+              <a:rPr>
+                <a:solidFill>
+                  <a:srgbClr val="003B4F"/>
+                </a:solidFill>
+                <a:latin typeface="Consolas"/>
+              </a:rPr>
+              <a:t>Markdown</a:t>
+            </a:r>
+            <a:r>
+              <a:rPr>
+                <a:solidFill>
+                  <a:srgbClr val="5E5E5E"/>
+                </a:solidFill>
+                <a:latin typeface="Consolas"/>
+              </a:rPr>
+              <a:t>]</a:t>
+            </a:r>
+            <a:r>
+              <a:rPr>
+                <a:solidFill>
+                  <a:srgbClr val="003B4F"/>
+                </a:solidFill>
+                <a:latin typeface="Consolas"/>
+              </a:rPr>
+              <a:t>.</a:t>
+            </a:r>
+            <a:br/>
+            <a:br/>
+            <a:r>
+              <a:rPr>
+                <a:solidFill>
+                  <a:srgbClr val="003B4F"/>
+                </a:solidFill>
+                <a:latin typeface="Consolas"/>
+              </a:rPr>
+              <a:t>Quarto's Markdown supports everything I'm</a:t>
+            </a:r>
+            <a:br/>
+            <a:r>
+              <a:rPr>
+                <a:solidFill>
+                  <a:srgbClr val="003B4F"/>
+                </a:solidFill>
+                <a:latin typeface="Consolas"/>
+              </a:rPr>
+              <a:t>used to: figures, tables, bibliography, etc.</a:t>
+            </a:r>
+            <a:br/>
+            <a:br/>
+            <a:r>
+              <a:rPr>
+                <a:solidFill>
+                  <a:srgbClr val="003B4F"/>
+                </a:solidFill>
+                <a:latin typeface="Consolas"/>
+              </a:rPr>
+              <a:t>It also supports lots of extra features, like</a:t>
+            </a:r>
+            <a:br/>
+            <a:r>
+              <a:rPr>
+                <a:solidFill>
+                  <a:srgbClr val="003B4F"/>
+                </a:solidFill>
+                <a:latin typeface="Consolas"/>
+              </a:rPr>
+              <a:t>diagrams with </a:t>
+            </a:r>
+            <a:r>
+              <a:rPr>
+                <a:solidFill>
+                  <a:srgbClr val="5E5E5E"/>
+                </a:solidFill>
+                <a:latin typeface="Consolas"/>
+              </a:rPr>
+              <a:t>`mermaid`</a:t>
+            </a:r>
+            <a:r>
+              <a:rPr>
+                <a:solidFill>
+                  <a:srgbClr val="003B4F"/>
+                </a:solidFill>
+                <a:latin typeface="Consolas"/>
+              </a:rPr>
+              <a:t> and </a:t>
+            </a:r>
+            <a:r>
+              <a:rPr>
+                <a:solidFill>
+                  <a:srgbClr val="5E5E5E"/>
+                </a:solidFill>
+                <a:latin typeface="Consolas"/>
+              </a:rPr>
+              <a:t>`GraphViz`</a:t>
+            </a:r>
+            <a:r>
+              <a:rPr>
+                <a:solidFill>
+                  <a:srgbClr val="003B4F"/>
+                </a:solidFill>
+                <a:latin typeface="Consolas"/>
+              </a:rPr>
+              <a:t> and</a:t>
+            </a:r>
+            <a:br/>
+            <a:r>
+              <a:rPr>
+                <a:solidFill>
+                  <a:srgbClr val="003B4F"/>
+                </a:solidFill>
+                <a:latin typeface="Consolas"/>
+              </a:rPr>
+              <a:t>even LaTeX equations: </a:t>
+            </a:r>
+            <a:br/>
+            <a:br/>
+            <a:r>
+              <a:rPr>
+                <a:solidFill>
+                  <a:srgbClr val="003B4F"/>
+                </a:solidFill>
+                <a:latin typeface="Consolas"/>
+              </a:rPr>
+              <a:t>$$</a:t>
+            </a:r>
+            <a:br/>
+            <a:r>
+              <a:rPr>
+                <a:solidFill>
+                  <a:srgbClr val="003B4F"/>
+                </a:solidFill>
+                <a:latin typeface="Consolas"/>
+              </a:rPr>
+              <a:t>E = mc^2</a:t>
+            </a:r>
+            <a:br/>
+            <a:r>
+              <a:rPr>
+                <a:solidFill>
+                  <a:srgbClr val="003B4F"/>
+                </a:solidFill>
+                <a:latin typeface="Consolas"/>
+              </a:rPr>
+              <a:t>$$</a:t>
+            </a:r>
+            <a:br/>
+          </a:p>
+        </p:txBody>
+      </p:sp>
     </p:spTree>
   </p:cSld>
 </p:sld>
@@ -5557,7 +5557,7 @@
       </p:sp>
       <p:pic>
         <p:nvPicPr>
-          <p:cNvPr descr="presentation_files/figure-pptx/cell-9-output-1.png" id="0" name="Picture 1"/>
+          <p:cNvPr descr="presentation_files/figure-pptx/cell-5-output-1.png" id="0" name="Picture 1"/>
           <p:cNvPicPr>
             <a:picLocks noGrp="1" noChangeAspect="1"/>
           </p:cNvPicPr>
@@ -5699,247 +5699,6 @@
           <a:bodyPr/>
           <a:lstStyle/>
           <a:p>
-            <a:pPr lvl="0" indent="0">
-              <a:buNone/>
-            </a:pPr>
-            <a:r>
-              <a:rPr>
-                <a:solidFill>
-                  <a:srgbClr val="003B4F"/>
-                </a:solidFill>
-                <a:latin typeface="Consolas"/>
-              </a:rPr>
-              <a:t>To create slides, you create sections </a:t>
-            </a:r>
-            <a:br/>
-            <a:r>
-              <a:rPr>
-                <a:solidFill>
-                  <a:srgbClr val="003B4F"/>
-                </a:solidFill>
-                <a:latin typeface="Consolas"/>
-              </a:rPr>
-              <a:t>with </a:t>
-            </a:r>
-            <a:r>
-              <a:rPr>
-                <a:solidFill>
-                  <a:srgbClr val="5E5E5E"/>
-                </a:solidFill>
-                <a:latin typeface="Consolas"/>
-              </a:rPr>
-              <a:t>`#`</a:t>
-            </a:r>
-            <a:r>
-              <a:rPr>
-                <a:solidFill>
-                  <a:srgbClr val="003B4F"/>
-                </a:solidFill>
-                <a:latin typeface="Consolas"/>
-              </a:rPr>
-              <a:t>, titles with </a:t>
-            </a:r>
-            <a:r>
-              <a:rPr>
-                <a:solidFill>
-                  <a:srgbClr val="5E5E5E"/>
-                </a:solidFill>
-                <a:latin typeface="Consolas"/>
-              </a:rPr>
-              <a:t>`##`</a:t>
-            </a:r>
-            <a:r>
-              <a:rPr>
-                <a:solidFill>
-                  <a:srgbClr val="003B4F"/>
-                </a:solidFill>
-                <a:latin typeface="Consolas"/>
-              </a:rPr>
-              <a:t>, and bullets </a:t>
-            </a:r>
-            <a:br/>
-            <a:r>
-              <a:rPr>
-                <a:solidFill>
-                  <a:srgbClr val="003B4F"/>
-                </a:solidFill>
-                <a:latin typeface="Consolas"/>
-              </a:rPr>
-              <a:t>with </a:t>
-            </a:r>
-            <a:r>
-              <a:rPr>
-                <a:solidFill>
-                  <a:srgbClr val="5E5E5E"/>
-                </a:solidFill>
-                <a:latin typeface="Consolas"/>
-              </a:rPr>
-              <a:t>`-`</a:t>
-            </a:r>
-            <a:r>
-              <a:rPr>
-                <a:solidFill>
-                  <a:srgbClr val="003B4F"/>
-                </a:solidFill>
-                <a:latin typeface="Consolas"/>
-              </a:rPr>
-              <a:t>.</a:t>
-            </a:r>
-            <a:br/>
-            <a:br/>
-            <a:r>
-              <a:rPr>
-                <a:solidFill>
-                  <a:srgbClr val="003B4F"/>
-                </a:solidFill>
-                <a:latin typeface="Consolas"/>
-              </a:rPr>
-              <a:t>Quarto will render your content in slide form.</a:t>
-            </a:r>
-            <a:br/>
-            <a:br/>
-            <a:r>
-              <a:rPr>
-                <a:solidFill>
-                  <a:srgbClr val="4758AB"/>
-                </a:solidFill>
-                <a:latin typeface="Consolas"/>
-              </a:rPr>
-              <a:t>### Content types</a:t>
-            </a:r>
-            <a:br/>
-            <a:br/>
-            <a:r>
-              <a:rPr>
-                <a:solidFill>
-                  <a:srgbClr val="20794D"/>
-                </a:solidFill>
-                <a:latin typeface="Consolas"/>
-              </a:rPr>
-              <a:t>- </a:t>
-            </a:r>
-            <a:r>
-              <a:rPr>
-                <a:solidFill>
-                  <a:srgbClr val="003B4F"/>
-                </a:solidFill>
-                <a:latin typeface="Consolas"/>
-              </a:rPr>
-              <a:t>You can add several types of content</a:t>
-            </a:r>
-            <a:br/>
-            <a:r>
-              <a:rPr>
-                <a:solidFill>
-                  <a:srgbClr val="20794D"/>
-                </a:solidFill>
-                <a:latin typeface="Consolas"/>
-              </a:rPr>
-              <a:t>    - </a:t>
-            </a:r>
-            <a:r>
-              <a:rPr>
-                <a:solidFill>
-                  <a:srgbClr val="003B4F"/>
-                </a:solidFill>
-                <a:latin typeface="Consolas"/>
-              </a:rPr>
-              <a:t>code (use backticks)</a:t>
-            </a:r>
-            <a:br/>
-            <a:r>
-              <a:rPr>
-                <a:solidFill>
-                  <a:srgbClr val="20794D"/>
-                </a:solidFill>
-                <a:latin typeface="Consolas"/>
-              </a:rPr>
-              <a:t>    - </a:t>
-            </a:r>
-            <a:r>
-              <a:rPr>
-                <a:solidFill>
-                  <a:srgbClr val="003B4F"/>
-                </a:solidFill>
-                <a:latin typeface="Consolas"/>
-              </a:rPr>
-              <a:t>images</a:t>
-            </a:r>
-            <a:br/>
-            <a:r>
-              <a:rPr>
-                <a:solidFill>
-                  <a:srgbClr val="20794D"/>
-                </a:solidFill>
-                <a:latin typeface="Consolas"/>
-              </a:rPr>
-              <a:t>    - </a:t>
-            </a:r>
-            <a:r>
-              <a:rPr>
-                <a:solidFill>
-                  <a:srgbClr val="003B4F"/>
-                </a:solidFill>
-                <a:latin typeface="Consolas"/>
-              </a:rPr>
-              <a:t>diagrams</a:t>
-            </a:r>
-            <a:br/>
-            <a:r>
-              <a:rPr>
-                <a:solidFill>
-                  <a:srgbClr val="20794D"/>
-                </a:solidFill>
-                <a:latin typeface="Consolas"/>
-              </a:rPr>
-              <a:t>    - </a:t>
-            </a:r>
-            <a:r>
-              <a:rPr>
-                <a:solidFill>
-                  <a:srgbClr val="003B4F"/>
-                </a:solidFill>
-                <a:latin typeface="Consolas"/>
-              </a:rPr>
-              <a:t>tables</a:t>
-            </a:r>
-            <a:br/>
-            <a:r>
-              <a:rPr>
-                <a:solidFill>
-                  <a:srgbClr val="20794D"/>
-                </a:solidFill>
-                <a:latin typeface="Consolas"/>
-              </a:rPr>
-              <a:t>    - </a:t>
-            </a:r>
-            <a:r>
-              <a:rPr>
-                <a:solidFill>
-                  <a:srgbClr val="003B4F"/>
-                </a:solidFill>
-                <a:latin typeface="Consolas"/>
-              </a:rPr>
-              <a:t>etc.</a:t>
-            </a:r>
-          </a:p>
-        </p:txBody>
-      </p:sp>
-      <p:sp>
-        <p:nvSpPr>
-          <p:cNvPr id="4" name="Content Placeholder 3"/>
-          <p:cNvSpPr>
-            <a:spLocks noGrp="1"/>
-          </p:cNvSpPr>
-          <p:nvPr>
-            <p:ph idx="2" sz="half"/>
-          </p:nvPr>
-        </p:nvSpPr>
-        <p:spPr/>
-        <p:txBody>
-          <a:bodyPr/>
-          <a:lstStyle/>
-          <a:p>
             <a:pPr lvl="0" indent="0" marL="0">
               <a:buNone/>
             </a:pPr>
@@ -6029,6 +5788,247 @@
             <a:pPr lvl="1"/>
             <a:r>
               <a:rPr/>
+              <a:t>etc.</a:t>
+            </a:r>
+          </a:p>
+        </p:txBody>
+      </p:sp>
+      <p:sp>
+        <p:nvSpPr>
+          <p:cNvPr id="4" name="Content Placeholder 3"/>
+          <p:cNvSpPr>
+            <a:spLocks noGrp="1"/>
+          </p:cNvSpPr>
+          <p:nvPr>
+            <p:ph idx="2" sz="half"/>
+          </p:nvPr>
+        </p:nvSpPr>
+        <p:spPr/>
+        <p:txBody>
+          <a:bodyPr/>
+          <a:lstStyle/>
+          <a:p>
+            <a:pPr lvl="0" indent="0">
+              <a:buNone/>
+            </a:pPr>
+            <a:r>
+              <a:rPr>
+                <a:solidFill>
+                  <a:srgbClr val="003B4F"/>
+                </a:solidFill>
+                <a:latin typeface="Consolas"/>
+              </a:rPr>
+              <a:t>To create slides, you create sections </a:t>
+            </a:r>
+            <a:br/>
+            <a:r>
+              <a:rPr>
+                <a:solidFill>
+                  <a:srgbClr val="003B4F"/>
+                </a:solidFill>
+                <a:latin typeface="Consolas"/>
+              </a:rPr>
+              <a:t>with </a:t>
+            </a:r>
+            <a:r>
+              <a:rPr>
+                <a:solidFill>
+                  <a:srgbClr val="5E5E5E"/>
+                </a:solidFill>
+                <a:latin typeface="Consolas"/>
+              </a:rPr>
+              <a:t>`#`</a:t>
+            </a:r>
+            <a:r>
+              <a:rPr>
+                <a:solidFill>
+                  <a:srgbClr val="003B4F"/>
+                </a:solidFill>
+                <a:latin typeface="Consolas"/>
+              </a:rPr>
+              <a:t>, titles with </a:t>
+            </a:r>
+            <a:r>
+              <a:rPr>
+                <a:solidFill>
+                  <a:srgbClr val="5E5E5E"/>
+                </a:solidFill>
+                <a:latin typeface="Consolas"/>
+              </a:rPr>
+              <a:t>`##`</a:t>
+            </a:r>
+            <a:r>
+              <a:rPr>
+                <a:solidFill>
+                  <a:srgbClr val="003B4F"/>
+                </a:solidFill>
+                <a:latin typeface="Consolas"/>
+              </a:rPr>
+              <a:t>, and bullets </a:t>
+            </a:r>
+            <a:br/>
+            <a:r>
+              <a:rPr>
+                <a:solidFill>
+                  <a:srgbClr val="003B4F"/>
+                </a:solidFill>
+                <a:latin typeface="Consolas"/>
+              </a:rPr>
+              <a:t>with </a:t>
+            </a:r>
+            <a:r>
+              <a:rPr>
+                <a:solidFill>
+                  <a:srgbClr val="5E5E5E"/>
+                </a:solidFill>
+                <a:latin typeface="Consolas"/>
+              </a:rPr>
+              <a:t>`-`</a:t>
+            </a:r>
+            <a:r>
+              <a:rPr>
+                <a:solidFill>
+                  <a:srgbClr val="003B4F"/>
+                </a:solidFill>
+                <a:latin typeface="Consolas"/>
+              </a:rPr>
+              <a:t>.</a:t>
+            </a:r>
+            <a:br/>
+            <a:br/>
+            <a:r>
+              <a:rPr>
+                <a:solidFill>
+                  <a:srgbClr val="003B4F"/>
+                </a:solidFill>
+                <a:latin typeface="Consolas"/>
+              </a:rPr>
+              <a:t>Quarto will render your content in slide form.</a:t>
+            </a:r>
+            <a:br/>
+            <a:br/>
+            <a:r>
+              <a:rPr>
+                <a:solidFill>
+                  <a:srgbClr val="4758AB"/>
+                </a:solidFill>
+                <a:latin typeface="Consolas"/>
+              </a:rPr>
+              <a:t>### Content types</a:t>
+            </a:r>
+            <a:br/>
+            <a:br/>
+            <a:r>
+              <a:rPr>
+                <a:solidFill>
+                  <a:srgbClr val="20794D"/>
+                </a:solidFill>
+                <a:latin typeface="Consolas"/>
+              </a:rPr>
+              <a:t>- </a:t>
+            </a:r>
+            <a:r>
+              <a:rPr>
+                <a:solidFill>
+                  <a:srgbClr val="003B4F"/>
+                </a:solidFill>
+                <a:latin typeface="Consolas"/>
+              </a:rPr>
+              <a:t>You can add several types of content</a:t>
+            </a:r>
+            <a:br/>
+            <a:r>
+              <a:rPr>
+                <a:solidFill>
+                  <a:srgbClr val="20794D"/>
+                </a:solidFill>
+                <a:latin typeface="Consolas"/>
+              </a:rPr>
+              <a:t>    - </a:t>
+            </a:r>
+            <a:r>
+              <a:rPr>
+                <a:solidFill>
+                  <a:srgbClr val="003B4F"/>
+                </a:solidFill>
+                <a:latin typeface="Consolas"/>
+              </a:rPr>
+              <a:t>code (use backticks)</a:t>
+            </a:r>
+            <a:br/>
+            <a:r>
+              <a:rPr>
+                <a:solidFill>
+                  <a:srgbClr val="20794D"/>
+                </a:solidFill>
+                <a:latin typeface="Consolas"/>
+              </a:rPr>
+              <a:t>    - </a:t>
+            </a:r>
+            <a:r>
+              <a:rPr>
+                <a:solidFill>
+                  <a:srgbClr val="003B4F"/>
+                </a:solidFill>
+                <a:latin typeface="Consolas"/>
+              </a:rPr>
+              <a:t>images</a:t>
+            </a:r>
+            <a:br/>
+            <a:r>
+              <a:rPr>
+                <a:solidFill>
+                  <a:srgbClr val="20794D"/>
+                </a:solidFill>
+                <a:latin typeface="Consolas"/>
+              </a:rPr>
+              <a:t>    - </a:t>
+            </a:r>
+            <a:r>
+              <a:rPr>
+                <a:solidFill>
+                  <a:srgbClr val="003B4F"/>
+                </a:solidFill>
+                <a:latin typeface="Consolas"/>
+              </a:rPr>
+              <a:t>diagrams</a:t>
+            </a:r>
+            <a:br/>
+            <a:r>
+              <a:rPr>
+                <a:solidFill>
+                  <a:srgbClr val="20794D"/>
+                </a:solidFill>
+                <a:latin typeface="Consolas"/>
+              </a:rPr>
+              <a:t>    - </a:t>
+            </a:r>
+            <a:r>
+              <a:rPr>
+                <a:solidFill>
+                  <a:srgbClr val="003B4F"/>
+                </a:solidFill>
+                <a:latin typeface="Consolas"/>
+              </a:rPr>
+              <a:t>tables</a:t>
+            </a:r>
+            <a:br/>
+            <a:r>
+              <a:rPr>
+                <a:solidFill>
+                  <a:srgbClr val="20794D"/>
+                </a:solidFill>
+                <a:latin typeface="Consolas"/>
+              </a:rPr>
+              <a:t>    - </a:t>
+            </a:r>
+            <a:r>
+              <a:rPr>
+                <a:solidFill>
+                  <a:srgbClr val="003B4F"/>
+                </a:solidFill>
+                <a:latin typeface="Consolas"/>
+              </a:rPr>
               <a:t>etc.</a:t>
             </a:r>
           </a:p>
@@ -6878,7 +6878,7 @@
             </a:pPr>
             <a:r>
               <a:rPr/>
-              <a:t>The next slides were generated using the code below:</a:t>
+              <a:t>The next slides/sections were generated using the code below:</a:t>
             </a:r>
           </a:p>
           <a:p>
@@ -7706,7 +7706,7 @@
       </p:sp>
       <p:pic>
         <p:nvPicPr>
-          <p:cNvPr descr="presentation_files/figure-pptx/cell-10-output-4.png" id="0" name="Picture 1"/>
+          <p:cNvPr descr="presentation_files/figure-pptx/cell-6-output-4.png" id="0" name="Picture 1"/>
           <p:cNvPicPr>
             <a:picLocks noGrp="1" noChangeAspect="1"/>
           </p:cNvPicPr>
@@ -7736,7 +7736,7 @@
       </p:pic>
       <p:pic>
         <p:nvPicPr>
-          <p:cNvPr descr="presentation_files/figure-pptx/cell-10-output-7.png" id="0" name="Picture 1"/>
+          <p:cNvPr descr="presentation_files/figure-pptx/cell-6-output-7.png" id="0" name="Picture 1"/>
           <p:cNvPicPr>
             <a:picLocks noGrp="1" noChangeAspect="1"/>
           </p:cNvPicPr>
@@ -7813,7 +7813,7 @@
       </p:sp>
       <p:pic>
         <p:nvPicPr>
-          <p:cNvPr descr="presentation_files/figure-pptx/cell-10-output-13.png" id="0" name="Picture 1"/>
+          <p:cNvPr descr="presentation_files/figure-pptx/cell-6-output-13.png" id="0" name="Picture 1"/>
           <p:cNvPicPr>
             <a:picLocks noGrp="1" noChangeAspect="1"/>
           </p:cNvPicPr>
@@ -7843,7 +7843,7 @@
       </p:pic>
       <p:pic>
         <p:nvPicPr>
-          <p:cNvPr descr="presentation_files/figure-pptx/cell-10-output-16.png" id="0" name="Picture 1"/>
+          <p:cNvPr descr="presentation_files/figure-pptx/cell-6-output-16.png" id="0" name="Picture 1"/>
           <p:cNvPicPr>
             <a:picLocks noGrp="1" noChangeAspect="1"/>
           </p:cNvPicPr>
@@ -7920,7 +7920,7 @@
       </p:sp>
       <p:pic>
         <p:nvPicPr>
-          <p:cNvPr descr="presentation_files/figure-pptx/cell-10-output-22.png" id="0" name="Picture 1"/>
+          <p:cNvPr descr="presentation_files/figure-pptx/cell-6-output-22.png" id="0" name="Picture 1"/>
           <p:cNvPicPr>
             <a:picLocks noGrp="1" noChangeAspect="1"/>
           </p:cNvPicPr>
@@ -7950,7 +7950,7 @@
       </p:pic>
       <p:pic>
         <p:nvPicPr>
-          <p:cNvPr descr="presentation_files/figure-pptx/cell-10-output-25.png" id="0" name="Picture 1"/>
+          <p:cNvPr descr="presentation_files/figure-pptx/cell-6-output-25.png" id="0" name="Picture 1"/>
           <p:cNvPicPr>
             <a:picLocks noGrp="1" noChangeAspect="1"/>
           </p:cNvPicPr>
@@ -8027,7 +8027,7 @@
       </p:sp>
       <p:pic>
         <p:nvPicPr>
-          <p:cNvPr descr="presentation_files/figure-pptx/cell-10-output-31.png" id="0" name="Picture 1"/>
+          <p:cNvPr descr="presentation_files/figure-pptx/cell-6-output-31.png" id="0" name="Picture 1"/>
           <p:cNvPicPr>
             <a:picLocks noGrp="1" noChangeAspect="1"/>
           </p:cNvPicPr>
@@ -8057,7 +8057,7 @@
       </p:pic>
       <p:pic>
         <p:nvPicPr>
-          <p:cNvPr descr="presentation_files/figure-pptx/cell-10-output-34.png" id="0" name="Picture 1"/>
+          <p:cNvPr descr="presentation_files/figure-pptx/cell-6-output-34.png" id="0" name="Picture 1"/>
           <p:cNvPicPr>
             <a:picLocks noGrp="1" noChangeAspect="1"/>
           </p:cNvPicPr>
@@ -8134,7 +8134,7 @@
       </p:sp>
       <p:pic>
         <p:nvPicPr>
-          <p:cNvPr descr="presentation_files/figure-pptx/cell-10-output-40.png" id="0" name="Picture 1"/>
+          <p:cNvPr descr="presentation_files/figure-pptx/cell-6-output-40.png" id="0" name="Picture 1"/>
           <p:cNvPicPr>
             <a:picLocks noGrp="1" noChangeAspect="1"/>
           </p:cNvPicPr>
@@ -8164,7 +8164,7 @@
       </p:pic>
       <p:pic>
         <p:nvPicPr>
-          <p:cNvPr descr="presentation_files/figure-pptx/cell-10-output-43.png" id="0" name="Picture 1"/>
+          <p:cNvPr descr="presentation_files/figure-pptx/cell-6-output-43.png" id="0" name="Picture 1"/>
           <p:cNvPicPr>
             <a:picLocks noGrp="1" noChangeAspect="1"/>
           </p:cNvPicPr>
@@ -8241,7 +8241,7 @@
       </p:sp>
       <p:pic>
         <p:nvPicPr>
-          <p:cNvPr descr="presentation_files/figure-pptx/cell-10-output-49.png" id="0" name="Picture 1"/>
+          <p:cNvPr descr="presentation_files/figure-pptx/cell-6-output-49.png" id="0" name="Picture 1"/>
           <p:cNvPicPr>
             <a:picLocks noGrp="1" noChangeAspect="1"/>
           </p:cNvPicPr>
@@ -8271,7 +8271,7 @@
       </p:pic>
       <p:pic>
         <p:nvPicPr>
-          <p:cNvPr descr="presentation_files/figure-pptx/cell-10-output-52.png" id="0" name="Picture 1"/>
+          <p:cNvPr descr="presentation_files/figure-pptx/cell-6-output-52.png" id="0" name="Picture 1"/>
           <p:cNvPicPr>
             <a:picLocks noGrp="1" noChangeAspect="1"/>
           </p:cNvPicPr>
@@ -8914,6 +8914,18 @@
           <a:bodyPr/>
           <a:lstStyle/>
           <a:p>
+            <a:pPr lvl="0" indent="0" marL="0">
+              <a:spcBef>
+                <a:spcPts val="3000"/>
+              </a:spcBef>
+              <a:buNone/>
+            </a:pPr>
+            <a:r>
+              <a:rPr b="1"/>
+              <a:t>The Goal</a:t>
+            </a:r>
+          </a:p>
+          <a:p>
             <a:pPr lvl="0"/>
             <a:r>
               <a:rPr/>
@@ -8977,431 +8989,6 @@
       </p:sp>
     </p:spTree>
   </p:cSld>
-  <p:timing>
-    <p:tnLst>
-      <p:par>
-        <p:cTn id="1" dur="indefinite" restart="never" nodeType="tmRoot">
-          <p:childTnLst>
-            <p:seq concurrent="1" nextAc="seek">
-              <p:cTn id="2" dur="indefinite" nodeType="mainSeq">
-                <p:childTnLst>
-                  <p:par>
-                    <p:cTn id="3" fill="hold">
-                      <p:stCondLst>
-                        <p:cond delay="indefinite"/>
-                      </p:stCondLst>
-                      <p:childTnLst>
-                        <p:par>
-                          <p:cTn id="4" fill="hold">
-                            <p:stCondLst>
-                              <p:cond delay="0"/>
-                            </p:stCondLst>
-                            <p:childTnLst>
-                              <p:par>
-                                <p:cTn id="5" presetID="1" presetClass="entr" presetSubtype="0" fill="hold" grpId="0" nodeType="clickEffect">
-                                  <p:stCondLst>
-                                    <p:cond delay="0"/>
-                                  </p:stCondLst>
-                                  <p:childTnLst>
-                                    <p:set>
-                                      <p:cBhvr>
-                                        <p:cTn id="6" dur="1" fill="hold">
-                                          <p:stCondLst>
-                                            <p:cond delay="0"/>
-                                          </p:stCondLst>
-                                        </p:cTn>
-                                        <p:tgtEl>
-                                          <p:spTgt spid="4">
-                                            <p:txEl>
-                                              <p:pRg st="0" end="0"/>
-                                            </p:txEl>
-                                          </p:spTgt>
-                                        </p:tgtEl>
-                                        <p:attrNameLst>
-                                          <p:attrName>style.visibility</p:attrName>
-                                        </p:attrNameLst>
-                                      </p:cBhvr>
-                                      <p:to>
-                                        <p:strVal val="visible"/>
-                                      </p:to>
-                                    </p:set>
-                                  </p:childTnLst>
-                                </p:cTn>
-                              </p:par>
-                            </p:childTnLst>
-                          </p:cTn>
-                        </p:par>
-                      </p:childTnLst>
-                    </p:cTn>
-                  </p:par>
-                  <p:par>
-                    <p:cTn id="7" fill="hold">
-                      <p:stCondLst>
-                        <p:cond delay="indefinite"/>
-                      </p:stCondLst>
-                      <p:childTnLst>
-                        <p:par>
-                          <p:cTn id="8" fill="hold">
-                            <p:stCondLst>
-                              <p:cond delay="0"/>
-                            </p:stCondLst>
-                            <p:childTnLst>
-                              <p:par>
-                                <p:cTn id="9" presetID="1" presetClass="entr" presetSubtype="0" fill="hold" grpId="0" nodeType="clickEffect">
-                                  <p:stCondLst>
-                                    <p:cond delay="0"/>
-                                  </p:stCondLst>
-                                  <p:childTnLst>
-                                    <p:set>
-                                      <p:cBhvr>
-                                        <p:cTn id="10" dur="1" fill="hold">
-                                          <p:stCondLst>
-                                            <p:cond delay="0"/>
-                                          </p:stCondLst>
-                                        </p:cTn>
-                                        <p:tgtEl>
-                                          <p:spTgt spid="4">
-                                            <p:txEl>
-                                              <p:pRg st="1" end="1"/>
-                                            </p:txEl>
-                                          </p:spTgt>
-                                        </p:tgtEl>
-                                        <p:attrNameLst>
-                                          <p:attrName>style.visibility</p:attrName>
-                                        </p:attrNameLst>
-                                      </p:cBhvr>
-                                      <p:to>
-                                        <p:strVal val="visible"/>
-                                      </p:to>
-                                    </p:set>
-                                  </p:childTnLst>
-                                </p:cTn>
-                              </p:par>
-                            </p:childTnLst>
-                          </p:cTn>
-                        </p:par>
-                      </p:childTnLst>
-                    </p:cTn>
-                  </p:par>
-                  <p:par>
-                    <p:cTn id="11" fill="hold">
-                      <p:stCondLst>
-                        <p:cond delay="indefinite"/>
-                      </p:stCondLst>
-                      <p:childTnLst>
-                        <p:par>
-                          <p:cTn id="12" fill="hold">
-                            <p:stCondLst>
-                              <p:cond delay="0"/>
-                            </p:stCondLst>
-                            <p:childTnLst>
-                              <p:par>
-                                <p:cTn id="13" presetID="1" presetClass="entr" presetSubtype="0" fill="hold" grpId="0" nodeType="clickEffect">
-                                  <p:stCondLst>
-                                    <p:cond delay="0"/>
-                                  </p:stCondLst>
-                                  <p:childTnLst>
-                                    <p:set>
-                                      <p:cBhvr>
-                                        <p:cTn id="14" dur="1" fill="hold">
-                                          <p:stCondLst>
-                                            <p:cond delay="0"/>
-                                          </p:stCondLst>
-                                        </p:cTn>
-                                        <p:tgtEl>
-                                          <p:spTgt spid="4">
-                                            <p:txEl>
-                                              <p:pRg st="2" end="2"/>
-                                            </p:txEl>
-                                          </p:spTgt>
-                                        </p:tgtEl>
-                                        <p:attrNameLst>
-                                          <p:attrName>style.visibility</p:attrName>
-                                        </p:attrNameLst>
-                                      </p:cBhvr>
-                                      <p:to>
-                                        <p:strVal val="visible"/>
-                                      </p:to>
-                                    </p:set>
-                                  </p:childTnLst>
-                                </p:cTn>
-                              </p:par>
-                            </p:childTnLst>
-                          </p:cTn>
-                        </p:par>
-                      </p:childTnLst>
-                    </p:cTn>
-                  </p:par>
-                  <p:par>
-                    <p:cTn id="15" fill="hold">
-                      <p:stCondLst>
-                        <p:cond delay="indefinite"/>
-                      </p:stCondLst>
-                      <p:childTnLst>
-                        <p:par>
-                          <p:cTn id="16" fill="hold">
-                            <p:stCondLst>
-                              <p:cond delay="0"/>
-                            </p:stCondLst>
-                            <p:childTnLst>
-                              <p:par>
-                                <p:cTn id="17" presetID="1" presetClass="entr" presetSubtype="0" fill="hold" grpId="0" nodeType="clickEffect">
-                                  <p:stCondLst>
-                                    <p:cond delay="0"/>
-                                  </p:stCondLst>
-                                  <p:childTnLst>
-                                    <p:set>
-                                      <p:cBhvr>
-                                        <p:cTn id="18" dur="1" fill="hold">
-                                          <p:stCondLst>
-                                            <p:cond delay="0"/>
-                                          </p:stCondLst>
-                                        </p:cTn>
-                                        <p:tgtEl>
-                                          <p:spTgt spid="4">
-                                            <p:txEl>
-                                              <p:pRg st="3" end="3"/>
-                                            </p:txEl>
-                                          </p:spTgt>
-                                        </p:tgtEl>
-                                        <p:attrNameLst>
-                                          <p:attrName>style.visibility</p:attrName>
-                                        </p:attrNameLst>
-                                      </p:cBhvr>
-                                      <p:to>
-                                        <p:strVal val="visible"/>
-                                      </p:to>
-                                    </p:set>
-                                  </p:childTnLst>
-                                </p:cTn>
-                              </p:par>
-                            </p:childTnLst>
-                          </p:cTn>
-                        </p:par>
-                      </p:childTnLst>
-                    </p:cTn>
-                  </p:par>
-                  <p:par>
-                    <p:cTn id="19" fill="hold">
-                      <p:stCondLst>
-                        <p:cond delay="indefinite"/>
-                      </p:stCondLst>
-                      <p:childTnLst>
-                        <p:par>
-                          <p:cTn id="20" fill="hold">
-                            <p:stCondLst>
-                              <p:cond delay="0"/>
-                            </p:stCondLst>
-                            <p:childTnLst>
-                              <p:par>
-                                <p:cTn id="21" presetID="1" presetClass="entr" presetSubtype="0" fill="hold" grpId="0" nodeType="clickEffect">
-                                  <p:stCondLst>
-                                    <p:cond delay="0"/>
-                                  </p:stCondLst>
-                                  <p:childTnLst>
-                                    <p:set>
-                                      <p:cBhvr>
-                                        <p:cTn id="22" dur="1" fill="hold">
-                                          <p:stCondLst>
-                                            <p:cond delay="0"/>
-                                          </p:stCondLst>
-                                        </p:cTn>
-                                        <p:tgtEl>
-                                          <p:spTgt spid="4">
-                                            <p:txEl>
-                                              <p:pRg st="4" end="4"/>
-                                            </p:txEl>
-                                          </p:spTgt>
-                                        </p:tgtEl>
-                                        <p:attrNameLst>
-                                          <p:attrName>style.visibility</p:attrName>
-                                        </p:attrNameLst>
-                                      </p:cBhvr>
-                                      <p:to>
-                                        <p:strVal val="visible"/>
-                                      </p:to>
-                                    </p:set>
-                                  </p:childTnLst>
-                                </p:cTn>
-                              </p:par>
-                            </p:childTnLst>
-                          </p:cTn>
-                        </p:par>
-                      </p:childTnLst>
-                    </p:cTn>
-                  </p:par>
-                  <p:par>
-                    <p:cTn id="23" fill="hold">
-                      <p:stCondLst>
-                        <p:cond delay="indefinite"/>
-                      </p:stCondLst>
-                      <p:childTnLst>
-                        <p:par>
-                          <p:cTn id="24" fill="hold">
-                            <p:stCondLst>
-                              <p:cond delay="0"/>
-                            </p:stCondLst>
-                            <p:childTnLst>
-                              <p:par>
-                                <p:cTn id="25" presetID="1" presetClass="entr" presetSubtype="0" fill="hold" grpId="0" nodeType="clickEffect">
-                                  <p:stCondLst>
-                                    <p:cond delay="0"/>
-                                  </p:stCondLst>
-                                  <p:childTnLst>
-                                    <p:set>
-                                      <p:cBhvr>
-                                        <p:cTn id="26" dur="1" fill="hold">
-                                          <p:stCondLst>
-                                            <p:cond delay="0"/>
-                                          </p:stCondLst>
-                                        </p:cTn>
-                                        <p:tgtEl>
-                                          <p:spTgt spid="4">
-                                            <p:txEl>
-                                              <p:pRg st="5" end="5"/>
-                                            </p:txEl>
-                                          </p:spTgt>
-                                        </p:tgtEl>
-                                        <p:attrNameLst>
-                                          <p:attrName>style.visibility</p:attrName>
-                                        </p:attrNameLst>
-                                      </p:cBhvr>
-                                      <p:to>
-                                        <p:strVal val="visible"/>
-                                      </p:to>
-                                    </p:set>
-                                  </p:childTnLst>
-                                </p:cTn>
-                              </p:par>
-                            </p:childTnLst>
-                          </p:cTn>
-                        </p:par>
-                      </p:childTnLst>
-                    </p:cTn>
-                  </p:par>
-                  <p:par>
-                    <p:cTn id="27" fill="hold">
-                      <p:stCondLst>
-                        <p:cond delay="indefinite"/>
-                      </p:stCondLst>
-                      <p:childTnLst>
-                        <p:par>
-                          <p:cTn id="28" fill="hold">
-                            <p:stCondLst>
-                              <p:cond delay="0"/>
-                            </p:stCondLst>
-                            <p:childTnLst>
-                              <p:par>
-                                <p:cTn id="29" presetID="1" presetClass="entr" presetSubtype="0" fill="hold" grpId="0" nodeType="clickEffect">
-                                  <p:stCondLst>
-                                    <p:cond delay="0"/>
-                                  </p:stCondLst>
-                                  <p:childTnLst>
-                                    <p:set>
-                                      <p:cBhvr>
-                                        <p:cTn id="30" dur="1" fill="hold">
-                                          <p:stCondLst>
-                                            <p:cond delay="0"/>
-                                          </p:stCondLst>
-                                        </p:cTn>
-                                        <p:tgtEl>
-                                          <p:spTgt spid="4">
-                                            <p:txEl>
-                                              <p:pRg st="6" end="6"/>
-                                            </p:txEl>
-                                          </p:spTgt>
-                                        </p:tgtEl>
-                                        <p:attrNameLst>
-                                          <p:attrName>style.visibility</p:attrName>
-                                        </p:attrNameLst>
-                                      </p:cBhvr>
-                                      <p:to>
-                                        <p:strVal val="visible"/>
-                                      </p:to>
-                                    </p:set>
-                                  </p:childTnLst>
-                                </p:cTn>
-                              </p:par>
-                            </p:childTnLst>
-                          </p:cTn>
-                        </p:par>
-                      </p:childTnLst>
-                    </p:cTn>
-                  </p:par>
-                  <p:par>
-                    <p:cTn id="31" fill="hold">
-                      <p:stCondLst>
-                        <p:cond delay="indefinite"/>
-                      </p:stCondLst>
-                      <p:childTnLst>
-                        <p:par>
-                          <p:cTn id="32" fill="hold">
-                            <p:stCondLst>
-                              <p:cond delay="0"/>
-                            </p:stCondLst>
-                            <p:childTnLst>
-                              <p:par>
-                                <p:cTn id="33" presetID="1" presetClass="entr" presetSubtype="0" fill="hold" grpId="0" nodeType="clickEffect">
-                                  <p:stCondLst>
-                                    <p:cond delay="0"/>
-                                  </p:stCondLst>
-                                  <p:childTnLst>
-                                    <p:set>
-                                      <p:cBhvr>
-                                        <p:cTn id="34" dur="1" fill="hold">
-                                          <p:stCondLst>
-                                            <p:cond delay="0"/>
-                                          </p:stCondLst>
-                                        </p:cTn>
-                                        <p:tgtEl>
-                                          <p:spTgt spid="4">
-                                            <p:txEl>
-                                              <p:pRg st="7" end="7"/>
-                                            </p:txEl>
-                                          </p:spTgt>
-                                        </p:tgtEl>
-                                        <p:attrNameLst>
-                                          <p:attrName>style.visibility</p:attrName>
-                                        </p:attrNameLst>
-                                      </p:cBhvr>
-                                      <p:to>
-                                        <p:strVal val="visible"/>
-                                      </p:to>
-                                    </p:set>
-                                  </p:childTnLst>
-                                </p:cTn>
-                              </p:par>
-                            </p:childTnLst>
-                          </p:cTn>
-                        </p:par>
-                      </p:childTnLst>
-                    </p:cTn>
-                  </p:par>
-                </p:childTnLst>
-              </p:cTn>
-              <p:prevCondLst>
-                <p:cond evt="onPrev" delay="0">
-                  <p:tgtEl>
-                    <p:sldTgt/>
-                  </p:tgtEl>
-                </p:cond>
-              </p:prevCondLst>
-              <p:nextCondLst>
-                <p:cond evt="onNext" delay="0">
-                  <p:tgtEl>
-                    <p:sldTgt/>
-                  </p:tgtEl>
-                </p:cond>
-              </p:nextCondLst>
-            </p:seq>
-          </p:childTnLst>
-        </p:cTn>
-      </p:par>
-    </p:tnLst>
-    <p:bldLst>
-      <p:bldP spid="4" grpId="0" uiExpand="1" build="p"/>
-    </p:bldLst>
-  </p:timing>
 </p:sld>
 </file>
 
@@ -9643,6 +9230,89 @@
           </a:p>
         </p:txBody>
       </p:sp>
+      <p:sp>
+        <p:nvSpPr>
+          <p:cNvPr id="3" name="Content Placeholder 2"/>
+          <p:cNvSpPr>
+            <a:spLocks noGrp="1"/>
+          </p:cNvSpPr>
+          <p:nvPr>
+            <p:ph idx="1" sz="half"/>
+          </p:nvPr>
+        </p:nvSpPr>
+        <p:spPr/>
+        <p:txBody>
+          <a:bodyPr/>
+          <a:lstStyle/>
+          <a:p>
+            <a:pPr lvl="0" indent="0" marL="0">
+              <a:buNone/>
+            </a:pPr>
+            <a:r>
+              <a:rPr/>
+              <a:t>Donald E. Knuth proposed literate programming in a 1984 </a:t>
+            </a:r>
+            <a:r>
+              <a:rPr>
+                <a:hlinkClick r:id="rId2"/>
+              </a:rPr>
+              <a:t>article</a:t>
+            </a:r>
+            <a:r>
+              <a:rPr/>
+              <a:t>.</a:t>
+            </a:r>
+          </a:p>
+          <a:p>
+            <a:pPr lvl="0" indent="0" marL="0">
+              <a:buNone/>
+            </a:pPr>
+            <a:r>
+              <a:rPr/>
+              <a:t>One of my proudest tech moments was to make </a:t>
+            </a:r>
+            <a:r>
+              <a:rPr>
+                <a:latin typeface="Consolas"/>
+              </a:rPr>
+              <a:t>CWeave</a:t>
+            </a:r>
+            <a:r>
+              <a:rPr/>
+              <a:t> and </a:t>
+            </a:r>
+            <a:r>
+              <a:rPr>
+                <a:latin typeface="Consolas"/>
+              </a:rPr>
+              <a:t>CWeb</a:t>
+            </a:r>
+            <a:r>
+              <a:rPr/>
+              <a:t> (and </a:t>
+            </a:r>
+            <a:r>
+              <a:rPr>
+                <a:latin typeface="Consolas"/>
+              </a:rPr>
+              <a:t>LaTeX</a:t>
+            </a:r>
+            <a:r>
+              <a:rPr/>
+              <a:t>) run in a Windows computer circa 1998.</a:t>
+            </a:r>
+          </a:p>
+          <a:p>
+            <a:pPr lvl="0" indent="0" marL="0">
+              <a:buNone/>
+            </a:pPr>
+            <a:r>
+              <a:rPr/>
+              <a:t>Jupyter implements the literate programming paradigm, but I haven’t seen the Markdown part gain a lot of traction.</a:t>
+            </a:r>
+          </a:p>
+        </p:txBody>
+      </p:sp>
       <p:pic>
         <p:nvPicPr>
           <p:cNvPr descr="fig:  images/literate-programming.jpg" id="0" name="Picture 1"/>
@@ -9652,14 +9322,14 @@
           <p:nvPr/>
         </p:nvPicPr>
         <p:blipFill>
-          <a:blip r:embed="rId2"/>
+          <a:blip r:embed="rId3"/>
           <a:stretch>
             <a:fillRect/>
           </a:stretch>
         </p:blipFill>
         <p:spPr bwMode="auto">
           <a:xfrm>
-            <a:off x="1511300" y="1193800"/>
+            <a:off x="5702300" y="1193800"/>
             <a:ext cx="1917700" cy="2882900"/>
           </a:xfrm>
           <a:prstGeom prst="rect">
@@ -9681,7 +9351,7 @@
         </p:nvSpPr>
         <p:spPr>
           <a:xfrm>
-            <a:off x="457200" y="4076700"/>
+            <a:off x="4648200" y="4076700"/>
             <a:ext cx="4038600" cy="508000"/>
           </a:xfrm>
           <a:prstGeom prst="rect">
@@ -9699,89 +9369,6 @@
             <a:r>
               <a:rPr/>
               <a:t>Donald Knuth’s Literate Programming</a:t>
-            </a:r>
-          </a:p>
-        </p:txBody>
-      </p:sp>
-      <p:sp>
-        <p:nvSpPr>
-          <p:cNvPr id="4" name="Content Placeholder 3"/>
-          <p:cNvSpPr>
-            <a:spLocks noGrp="1"/>
-          </p:cNvSpPr>
-          <p:nvPr>
-            <p:ph idx="2" sz="half"/>
-          </p:nvPr>
-        </p:nvSpPr>
-        <p:spPr/>
-        <p:txBody>
-          <a:bodyPr/>
-          <a:lstStyle/>
-          <a:p>
-            <a:pPr lvl="0" indent="0" marL="0">
-              <a:buNone/>
-            </a:pPr>
-            <a:r>
-              <a:rPr/>
-              <a:t>Donald E. Knuth proposed literate programming in a 1984 </a:t>
-            </a:r>
-            <a:r>
-              <a:rPr>
-                <a:hlinkClick r:id="rId3"/>
-              </a:rPr>
-              <a:t>article</a:t>
-            </a:r>
-            <a:r>
-              <a:rPr/>
-              <a:t>.</a:t>
-            </a:r>
-          </a:p>
-          <a:p>
-            <a:pPr lvl="0" indent="0" marL="0">
-              <a:buNone/>
-            </a:pPr>
-            <a:r>
-              <a:rPr/>
-              <a:t>One of my proudest tech moments was to make </a:t>
-            </a:r>
-            <a:r>
-              <a:rPr>
-                <a:latin typeface="Consolas"/>
-              </a:rPr>
-              <a:t>CWeave</a:t>
-            </a:r>
-            <a:r>
-              <a:rPr/>
-              <a:t> and </a:t>
-            </a:r>
-            <a:r>
-              <a:rPr>
-                <a:latin typeface="Consolas"/>
-              </a:rPr>
-              <a:t>CWeb</a:t>
-            </a:r>
-            <a:r>
-              <a:rPr/>
-              <a:t> (and </a:t>
-            </a:r>
-            <a:r>
-              <a:rPr>
-                <a:latin typeface="Consolas"/>
-              </a:rPr>
-              <a:t>LaTeX</a:t>
-            </a:r>
-            <a:r>
-              <a:rPr/>
-              <a:t>) run in a Windows computer circa 1998.</a:t>
-            </a:r>
-          </a:p>
-          <a:p>
-            <a:pPr lvl="0" indent="0" marL="0">
-              <a:buNone/>
-            </a:pPr>
-            <a:r>
-              <a:rPr/>
-              <a:t>Jupyter implements the literate programming paradigm, but I haven’t seen the Markdown part gain a lot of traction.</a:t>
             </a:r>
           </a:p>
         </p:txBody>
@@ -9828,7 +9415,7 @@
             </a:pPr>
             <a:r>
               <a:rPr/>
-              <a:t>In the last 20 years, I tried many tools…</a:t>
+              <a:t>I tried many tools for Literate Programming</a:t>
             </a:r>
           </a:p>
         </p:txBody>

</xml_diff>

<commit_message>
Work done by Fri Jul  1 16:24:31 PDT 2022
</commit_message>
<xml_diff>
--- a/docs/presentation-orig.pptx
+++ b/docs/presentation-orig.pptx
@@ -8346,7 +8346,7 @@
             </a:pPr>
             <a:r>
               <a:rPr/>
-              <a:t>Websites</a:t>
+              <a:t>Generating a website</a:t>
             </a:r>
           </a:p>
         </p:txBody>
@@ -8393,7 +8393,7 @@
             </a:pPr>
             <a:r>
               <a:rPr/>
-              <a:t>What I get by just changing the format in YAML</a:t>
+              <a:t>What I could get by just changing the format in YAML</a:t>
             </a:r>
           </a:p>
         </p:txBody>
@@ -8632,15 +8632,6 @@
             <a:pPr lvl="0" indent="0" marL="0">
               <a:buNone/>
             </a:pPr>
-          </a:p>
-          <a:p>
-            <a:pPr lvl="0" indent="0" marL="0">
-              <a:buNone/>
-            </a:pPr>
-            <a:r>
-              <a:rPr/>
-              <a:t>To avoid overwriting the slides, I’m generating a new file for the website.</a:t>
-            </a:r>
           </a:p>
           <a:p>
             <a:pPr lvl="0" indent="0" marL="0">
@@ -8705,7 +8696,7 @@
             </a:pPr>
             <a:r>
               <a:rPr/>
-              <a:t>Render presentation as a website</a:t>
+              <a:t>Screenshot of website</a:t>
             </a:r>
           </a:p>
         </p:txBody>
@@ -8726,8 +8717,8 @@
         </p:blipFill>
         <p:spPr bwMode="auto">
           <a:xfrm>
-            <a:off x="2273300" y="1193800"/>
-            <a:ext cx="4597400" cy="3390900"/>
+            <a:off x="3048000" y="1193800"/>
+            <a:ext cx="3060700" cy="3390900"/>
           </a:xfrm>
           <a:prstGeom prst="rect">
             <a:avLst/>
@@ -8839,6 +8830,103 @@
           </a:p>
         </p:txBody>
       </p:sp>
+      <p:sp>
+        <p:nvSpPr>
+          <p:cNvPr id="3" name="Content Placeholder 2"/>
+          <p:cNvSpPr>
+            <a:spLocks noGrp="1"/>
+          </p:cNvSpPr>
+          <p:nvPr>
+            <p:ph idx="1" sz="half"/>
+          </p:nvPr>
+        </p:nvSpPr>
+        <p:spPr/>
+        <p:txBody>
+          <a:bodyPr/>
+          <a:lstStyle/>
+          <a:p>
+            <a:pPr lvl="0" indent="0" marL="0">
+              <a:buNone/>
+            </a:pPr>
+            <a:r>
+              <a:rPr/>
+              <a:t>The value of content stuck in my computer is near zero. Putting content out in the world increases its value substantially.</a:t>
+            </a:r>
+          </a:p>
+          <a:p>
+            <a:pPr lvl="0" indent="0" marL="0">
+              <a:spcBef>
+                <a:spcPts val="3000"/>
+              </a:spcBef>
+              <a:buNone/>
+            </a:pPr>
+            <a:r>
+              <a:rPr b="1"/>
+              <a:t>Goal</a:t>
+            </a:r>
+          </a:p>
+          <a:p>
+            <a:pPr lvl="0"/>
+            <a:r>
+              <a:rPr/>
+              <a:t>Move good content out of my computer </a:t>
+            </a:r>
+            <a:r>
+              <a:rPr b="1"/>
+              <a:t>as fast as possible</a:t>
+            </a:r>
+          </a:p>
+          <a:p>
+            <a:pPr lvl="0"/>
+            <a:r>
+              <a:rPr/>
+              <a:t>Reproducible</a:t>
+            </a:r>
+          </a:p>
+          <a:p>
+            <a:pPr lvl="0"/>
+            <a:r>
+              <a:rPr/>
+              <a:t>Git-based collaboration</a:t>
+            </a:r>
+          </a:p>
+          <a:p>
+            <a:pPr lvl="0"/>
+            <a:r>
+              <a:rPr/>
+              <a:t>Write once, generate:</a:t>
+            </a:r>
+          </a:p>
+          <a:p>
+            <a:pPr lvl="1"/>
+            <a:r>
+              <a:rPr/>
+              <a:t>Code</a:t>
+            </a:r>
+          </a:p>
+          <a:p>
+            <a:pPr lvl="1"/>
+            <a:r>
+              <a:rPr/>
+              <a:t>Paper</a:t>
+            </a:r>
+          </a:p>
+          <a:p>
+            <a:pPr lvl="1"/>
+            <a:r>
+              <a:rPr/>
+              <a:t>PowerPoint</a:t>
+            </a:r>
+          </a:p>
+          <a:p>
+            <a:pPr lvl="1"/>
+            <a:r>
+              <a:rPr/>
+              <a:t>Site/documentation</a:t>
+            </a:r>
+          </a:p>
+        </p:txBody>
+      </p:sp>
       <p:pic>
         <p:nvPicPr>
           <p:cNvPr descr="fig:  images/content-value-chain.jpg" id="0" name="Picture 1"/>
@@ -8855,7 +8943,7 @@
         </p:blipFill>
         <p:spPr bwMode="auto">
           <a:xfrm>
-            <a:off x="558800" y="1193800"/>
+            <a:off x="4749800" y="1193800"/>
             <a:ext cx="3835400" cy="2882900"/>
           </a:xfrm>
           <a:prstGeom prst="rect">
@@ -8877,7 +8965,7 @@
         </p:nvSpPr>
         <p:spPr>
           <a:xfrm>
-            <a:off x="457200" y="4076700"/>
+            <a:off x="4648200" y="4076700"/>
             <a:ext cx="4038600" cy="508000"/>
           </a:xfrm>
           <a:prstGeom prst="rect">
@@ -8895,94 +8983,6 @@
             <a:r>
               <a:rPr/>
               <a:t>The content value chain from David Robinson’s (@drrob) Tweet</a:t>
-            </a:r>
-          </a:p>
-        </p:txBody>
-      </p:sp>
-      <p:sp>
-        <p:nvSpPr>
-          <p:cNvPr id="4" name="Content Placeholder 3"/>
-          <p:cNvSpPr>
-            <a:spLocks noGrp="1"/>
-          </p:cNvSpPr>
-          <p:nvPr>
-            <p:ph idx="2" sz="half"/>
-          </p:nvPr>
-        </p:nvSpPr>
-        <p:spPr/>
-        <p:txBody>
-          <a:bodyPr/>
-          <a:lstStyle/>
-          <a:p>
-            <a:pPr lvl="0" indent="0" marL="0">
-              <a:spcBef>
-                <a:spcPts val="3000"/>
-              </a:spcBef>
-              <a:buNone/>
-            </a:pPr>
-            <a:r>
-              <a:rPr b="1"/>
-              <a:t>The Goal</a:t>
-            </a:r>
-          </a:p>
-          <a:p>
-            <a:pPr lvl="0"/>
-            <a:r>
-              <a:rPr/>
-              <a:t>Move content out of my computer </a:t>
-            </a:r>
-            <a:r>
-              <a:rPr b="1"/>
-              <a:t>as fast as possible</a:t>
-            </a:r>
-          </a:p>
-          <a:p>
-            <a:pPr lvl="0"/>
-            <a:r>
-              <a:rPr/>
-              <a:t>Reproducible</a:t>
-            </a:r>
-          </a:p>
-          <a:p>
-            <a:pPr lvl="0"/>
-            <a:r>
-              <a:rPr/>
-              <a:t>Git-based collaboration</a:t>
-            </a:r>
-          </a:p>
-          <a:p>
-            <a:pPr lvl="0"/>
-            <a:r>
-              <a:rPr/>
-              <a:t>Write once, generate:</a:t>
-            </a:r>
-          </a:p>
-          <a:p>
-            <a:pPr lvl="1"/>
-            <a:r>
-              <a:rPr/>
-              <a:t>Code</a:t>
-            </a:r>
-          </a:p>
-          <a:p>
-            <a:pPr lvl="1"/>
-            <a:r>
-              <a:rPr/>
-              <a:t>Paper</a:t>
-            </a:r>
-          </a:p>
-          <a:p>
-            <a:pPr lvl="1"/>
-            <a:r>
-              <a:rPr/>
-              <a:t>PowerPoint</a:t>
-            </a:r>
-          </a:p>
-          <a:p>
-            <a:pPr lvl="1"/>
-            <a:r>
-              <a:rPr/>
-              <a:t>Site/documentation</a:t>
             </a:r>
           </a:p>
         </p:txBody>

</xml_diff>

<commit_message>
Work done by Fri Jul  1 17:08:43 PDT 2022
</commit_message>
<xml_diff>
--- a/docs/presentation-orig.pptx
+++ b/docs/presentation-orig.pptx
@@ -37,6 +37,10 @@
     <p:sldId id="285" r:id="rId31"/>
     <p:sldId id="286" r:id="rId32"/>
     <p:sldId id="287" r:id="rId33"/>
+    <p:sldId id="288" r:id="rId34"/>
+    <p:sldId id="289" r:id="rId35"/>
+    <p:sldId id="290" r:id="rId36"/>
+    <p:sldId id="291" r:id="rId37"/>
   </p:sldIdLst>
   <p:sldSz cx="9144000" cy="5143500" type="screen16x9"/>
   <p:notesSz cx="6858000" cy="9144000"/>
@@ -8639,17 +8643,27 @@
             </a:pPr>
             <a:r>
               <a:rPr/>
-              <a:t>You can see the result </a:t>
+              <a:t>Adding or changing the format to </a:t>
+            </a:r>
+            <a:r>
+              <a:rPr>
+                <a:latin typeface="Consolas"/>
+              </a:rPr>
+              <a:t>html</a:t>
+            </a:r>
+            <a:r>
+              <a:rPr/>
+              <a:t> will create a </a:t>
             </a:r>
             <a:r>
               <a:rPr>
                 <a:hlinkClick r:id="rId2"/>
               </a:rPr>
-              <a:t>here</a:t>
-            </a:r>
-            <a:r>
-              <a:rPr/>
-              <a:t>, and a screenshot in the next slide.</a:t>
+              <a:t>website</a:t>
+            </a:r>
+            <a:r>
+              <a:rPr/>
+              <a:t>.</a:t>
             </a:r>
           </a:p>
         </p:txBody>
@@ -8778,7 +8792,7 @@
             </a:pPr>
             <a:r>
               <a:rPr/>
-              <a:t>Articles</a:t>
+              <a:t>Scholarly articles</a:t>
             </a:r>
           </a:p>
         </p:txBody>
@@ -9029,7 +9043,7 @@
             </a:pPr>
             <a:r>
               <a:rPr/>
-              <a:t>Blah</a:t>
+              <a:t>Generating a scholarly article</a:t>
             </a:r>
           </a:p>
         </p:txBody>
@@ -9054,7 +9068,43 @@
             </a:pPr>
             <a:r>
               <a:rPr/>
-              <a:t>bleh blih</a:t>
+              <a:t>I reused some of the content of this presentation to create two scholarly-looking articles. The purpose of the articles is just to show how easy it is to generate them with Quarto, they don’t contain original research.</a:t>
+            </a:r>
+          </a:p>
+          <a:p>
+            <a:pPr lvl="0" indent="0" marL="0">
+              <a:buNone/>
+            </a:pPr>
+            <a:r>
+              <a:rPr/>
+              <a:t>The relevant files are:</a:t>
+            </a:r>
+          </a:p>
+          <a:p>
+            <a:pPr lvl="0"/>
+            <a:r>
+              <a:rPr>
+                <a:hlinkClick r:id="rId2"/>
+              </a:rPr>
+              <a:t>Quarto source file</a:t>
+            </a:r>
+          </a:p>
+          <a:p>
+            <a:pPr lvl="0"/>
+            <a:r>
+              <a:rPr>
+                <a:hlinkClick r:id="rId3"/>
+              </a:rPr>
+              <a:t>Microsoft Word output</a:t>
+            </a:r>
+          </a:p>
+          <a:p>
+            <a:pPr lvl="0"/>
+            <a:r>
+              <a:rPr>
+                <a:hlinkClick r:id="rId4"/>
+              </a:rPr>
+              <a:t>LaTeX PDF output</a:t>
             </a:r>
           </a:p>
         </p:txBody>
@@ -9091,22 +9141,137 @@
             <p:ph type="title"/>
           </p:nvPr>
         </p:nvSpPr>
+        <p:spPr/>
+        <p:txBody>
+          <a:bodyPr/>
+          <a:lstStyle/>
+          <a:p>
+            <a:pPr lvl="0" indent="0" marL="0">
+              <a:buNone/>
+            </a:pPr>
+            <a:r>
+              <a:rPr/>
+              <a:t>Scholarly article screenshots</a:t>
+            </a:r>
+          </a:p>
+        </p:txBody>
+      </p:sp>
+      <p:pic>
+        <p:nvPicPr>
+          <p:cNvPr descr="fig:  images/pdf-screenshot.png" id="0" name="Picture 1"/>
+          <p:cNvPicPr>
+            <a:picLocks noGrp="1" noChangeAspect="1"/>
+          </p:cNvPicPr>
+          <p:nvPr/>
+        </p:nvPicPr>
+        <p:blipFill>
+          <a:blip r:embed="rId2"/>
+          <a:stretch>
+            <a:fillRect/>
+          </a:stretch>
+        </p:blipFill>
+        <p:spPr bwMode="auto">
+          <a:xfrm>
+            <a:off x="1257300" y="1193800"/>
+            <a:ext cx="2438400" cy="2882900"/>
+          </a:xfrm>
+          <a:prstGeom prst="rect">
+            <a:avLst/>
+          </a:prstGeom>
+          <a:noFill/>
+          <a:ln w="9525">
+            <a:noFill/>
+            <a:headEnd/>
+            <a:tailEnd/>
+          </a:ln>
+        </p:spPr>
+      </p:pic>
+      <p:sp>
+        <p:nvSpPr>
+          <p:cNvPr id="1" name="TextBox 3"/>
+          <p:cNvSpPr txBox="1"/>
+          <p:nvPr/>
+        </p:nvSpPr>
         <p:spPr>
           <a:xfrm>
-            <a:off x="722313" y="3305176"/>
-            <a:ext cx="7772400" cy="1021556"/>
+            <a:off x="457200" y="4076700"/>
+            <a:ext cx="4038600" cy="508000"/>
           </a:xfrm>
+          <a:prstGeom prst="rect">
+            <a:avLst/>
+          </a:prstGeom>
+          <a:noFill/>
         </p:spPr>
         <p:txBody>
           <a:bodyPr/>
           <a:lstStyle/>
           <a:p>
-            <a:pPr lvl="0" indent="0" marL="0">
+            <a:pPr lvl="0" indent="0" marL="0" algn="ctr">
               <a:buNone/>
             </a:pPr>
             <a:r>
               <a:rPr/>
-              <a:t>Projects</a:t>
+              <a:t>PDF version of the article</a:t>
+            </a:r>
+          </a:p>
+        </p:txBody>
+      </p:sp>
+      <p:pic>
+        <p:nvPicPr>
+          <p:cNvPr descr="fig:  images/word-screenshot.png" id="0" name="Picture 1"/>
+          <p:cNvPicPr>
+            <a:picLocks noGrp="1" noChangeAspect="1"/>
+          </p:cNvPicPr>
+          <p:nvPr/>
+        </p:nvPicPr>
+        <p:blipFill>
+          <a:blip r:embed="rId3"/>
+          <a:stretch>
+            <a:fillRect/>
+          </a:stretch>
+        </p:blipFill>
+        <p:spPr bwMode="auto">
+          <a:xfrm>
+            <a:off x="5194300" y="1193800"/>
+            <a:ext cx="2946400" cy="2882900"/>
+          </a:xfrm>
+          <a:prstGeom prst="rect">
+            <a:avLst/>
+          </a:prstGeom>
+          <a:noFill/>
+          <a:ln w="9525">
+            <a:noFill/>
+            <a:headEnd/>
+            <a:tailEnd/>
+          </a:ln>
+        </p:spPr>
+      </p:pic>
+      <p:sp>
+        <p:nvSpPr>
+          <p:cNvPr id="1" name="TextBox 3"/>
+          <p:cNvSpPr txBox="1"/>
+          <p:nvPr/>
+        </p:nvSpPr>
+        <p:spPr>
+          <a:xfrm>
+            <a:off x="4648200" y="4076700"/>
+            <a:ext cx="4038600" cy="508000"/>
+          </a:xfrm>
+          <a:prstGeom prst="rect">
+            <a:avLst/>
+          </a:prstGeom>
+          <a:noFill/>
+        </p:spPr>
+        <p:txBody>
+          <a:bodyPr/>
+          <a:lstStyle/>
+          <a:p>
+            <a:pPr lvl="0" indent="0" marL="0" algn="ctr">
+              <a:buNone/>
+            </a:pPr>
+            <a:r>
+              <a:rPr/>
+              <a:t>Microsoft Word version of the article</a:t>
             </a:r>
           </a:p>
         </p:txBody>
@@ -9153,7 +9318,7 @@
             </a:pPr>
             <a:r>
               <a:rPr/>
-              <a:t>Blah</a:t>
+              <a:t>Citations and Footnotes</a:t>
             </a:r>
           </a:p>
         </p:txBody>
@@ -9178,7 +9343,465 @@
             </a:pPr>
             <a:r>
               <a:rPr/>
-              <a:t>Bleh - blih You can use Quarto to generate the whole shebang!</a:t>
+              <a:t>It’s very easy to use citations in Quarto. All you need is a BibTex file with your citations, for example, </a:t>
+            </a:r>
+            <a:r>
+              <a:rPr>
+                <a:latin typeface="Consolas"/>
+              </a:rPr>
+              <a:t>bibliography.bib</a:t>
+            </a:r>
+            <a:r>
+              <a:rPr/>
+              <a:t>, and to add </a:t>
+            </a:r>
+            <a:r>
+              <a:rPr>
+                <a:latin typeface="Consolas"/>
+              </a:rPr>
+              <a:t>bibliography: references.bib</a:t>
+            </a:r>
+            <a:r>
+              <a:rPr/>
+              <a:t> to the YAML front-matter of your document. You can then refer to the bibliography by simply adding the appropriate </a:t>
+            </a:r>
+            <a:r>
+              <a:rPr>
+                <a:latin typeface="Consolas"/>
+              </a:rPr>
+              <a:t>[@citation-name]</a:t>
+            </a:r>
+            <a:r>
+              <a:rPr/>
+              <a:t> in your text.</a:t>
+            </a:r>
+          </a:p>
+          <a:p>
+            <a:pPr lvl="0" indent="0" marL="0">
+              <a:buNone/>
+            </a:pPr>
+            <a:r>
+              <a:rPr/>
+              <a:t>Generating footnotes is also easy, using </a:t>
+            </a:r>
+            <a:r>
+              <a:rPr>
+                <a:latin typeface="Consolas"/>
+              </a:rPr>
+              <a:t>[^ref]</a:t>
+            </a:r>
+            <a:r>
+              <a:rPr/>
+              <a:t> links to a footnote, and </a:t>
+            </a:r>
+            <a:r>
+              <a:rPr>
+                <a:latin typeface="Consolas"/>
+              </a:rPr>
+              <a:t>[^ref: content of the footnote]</a:t>
+            </a:r>
+            <a:r>
+              <a:rPr/>
+              <a:t> generates its content</a:t>
+            </a:r>
+            <a:r>
+              <a:rPr baseline="30000">
+                <a:hlinkClick r:id="rId2" action="ppaction://hlinksldjump"/>
+              </a:rPr>
+              <a:t>1</a:t>
+            </a:r>
+            <a:r>
+              <a:rPr/>
+              <a:t>.</a:t>
+            </a:r>
+          </a:p>
+        </p:txBody>
+      </p:sp>
+    </p:spTree>
+  </p:cSld>
+</p:sld>
+</file>
+
+<file path=ppt/slides/slide33.xml><?xml version="1.0" encoding="utf-8"?>
+<p:sld xmlns:a="http://schemas.openxmlformats.org/drawingml/2006/main" xmlns:r="http://schemas.openxmlformats.org/officeDocument/2006/relationships" xmlns:p="http://schemas.openxmlformats.org/presentationml/2006/main">
+  <p:cSld>
+    <p:spTree>
+      <p:nvGrpSpPr>
+        <p:cNvPr id="1" name=""/>
+        <p:cNvGrpSpPr/>
+        <p:nvPr/>
+      </p:nvGrpSpPr>
+      <p:grpSpPr>
+        <a:xfrm>
+          <a:off x="0" y="0"/>
+          <a:ext cx="0" cy="0"/>
+          <a:chOff x="0" y="0"/>
+          <a:chExt cx="0" cy="0"/>
+        </a:xfrm>
+      </p:grpSpPr>
+      <p:sp>
+        <p:nvSpPr>
+          <p:cNvPr id="2" name="Title 1"/>
+          <p:cNvSpPr>
+            <a:spLocks noGrp="1"/>
+          </p:cNvSpPr>
+          <p:nvPr>
+            <p:ph type="title"/>
+          </p:nvPr>
+        </p:nvSpPr>
+        <p:spPr>
+          <a:xfrm>
+            <a:off x="722313" y="3305176"/>
+            <a:ext cx="7772400" cy="1021556"/>
+          </a:xfrm>
+        </p:spPr>
+        <p:txBody>
+          <a:bodyPr/>
+          <a:lstStyle/>
+          <a:p>
+            <a:pPr lvl="0" indent="0" marL="0">
+              <a:buNone/>
+            </a:pPr>
+            <a:r>
+              <a:rPr/>
+              <a:t>When is Quarto worthwhile</a:t>
+            </a:r>
+          </a:p>
+        </p:txBody>
+      </p:sp>
+    </p:spTree>
+  </p:cSld>
+</p:sld>
+</file>
+
+<file path=ppt/slides/slide34.xml><?xml version="1.0" encoding="utf-8"?>
+<p:sld xmlns:a="http://schemas.openxmlformats.org/drawingml/2006/main" xmlns:r="http://schemas.openxmlformats.org/officeDocument/2006/relationships" xmlns:p="http://schemas.openxmlformats.org/presentationml/2006/main">
+  <p:cSld>
+    <p:spTree>
+      <p:nvGrpSpPr>
+        <p:cNvPr id="1" name=""/>
+        <p:cNvGrpSpPr/>
+        <p:nvPr/>
+      </p:nvGrpSpPr>
+      <p:grpSpPr>
+        <a:xfrm>
+          <a:off x="0" y="0"/>
+          <a:ext cx="0" cy="0"/>
+          <a:chOff x="0" y="0"/>
+          <a:chExt cx="0" cy="0"/>
+        </a:xfrm>
+      </p:grpSpPr>
+      <p:sp>
+        <p:nvSpPr>
+          <p:cNvPr id="2" name="Title 1"/>
+          <p:cNvSpPr>
+            <a:spLocks noGrp="1"/>
+          </p:cNvSpPr>
+          <p:nvPr>
+            <p:ph type="title"/>
+          </p:nvPr>
+        </p:nvSpPr>
+        <p:spPr/>
+        <p:txBody>
+          <a:bodyPr/>
+          <a:lstStyle/>
+          <a:p>
+            <a:pPr lvl="0" indent="0" marL="0">
+              <a:buNone/>
+            </a:pPr>
+            <a:r>
+              <a:rPr/>
+              <a:t>Using Quarto Everywhere?</a:t>
+            </a:r>
+          </a:p>
+        </p:txBody>
+      </p:sp>
+      <p:sp>
+        <p:nvSpPr>
+          <p:cNvPr id="3" name="Content Placeholder 2"/>
+          <p:cNvSpPr>
+            <a:spLocks noGrp="1"/>
+          </p:cNvSpPr>
+          <p:nvPr>
+            <p:ph idx="1"/>
+          </p:nvPr>
+        </p:nvSpPr>
+        <p:spPr/>
+        <p:txBody>
+          <a:bodyPr/>
+          <a:lstStyle/>
+          <a:p>
+            <a:pPr lvl="0" indent="0" marL="0">
+              <a:buNone/>
+            </a:pPr>
+            <a:r>
+              <a:rPr/>
+              <a:t>::::{.columns} :::{.column}</a:t>
+            </a:r>
+          </a:p>
+          <a:p>
+            <a:pPr lvl="0" indent="0" marL="0">
+              <a:buNone/>
+            </a:pPr>
+            <a:r>
+              <a:rPr/>
+              <a:t>I have been using Quarto a lot lately. Here’s my current (July 2022) take on when it’s worthwile.</a:t>
+            </a:r>
+          </a:p>
+          <a:p>
+            <a:pPr lvl="0" indent="0" marL="0">
+              <a:spcBef>
+                <a:spcPts val="3000"/>
+              </a:spcBef>
+              <a:buNone/>
+            </a:pPr>
+            <a:r>
+              <a:rPr b="1"/>
+              <a:t>Blog: excellent</a:t>
+            </a:r>
+          </a:p>
+          <a:p>
+            <a:pPr lvl="0" indent="0" marL="0">
+              <a:buNone/>
+            </a:pPr>
+            <a:r>
+              <a:rPr/>
+              <a:t>I wanted to have a Python-based blog for a long time, and Quarto delivers it well. Now I can automate my blog to tweet and post to LinkedIn when I write new articles.</a:t>
+            </a:r>
+          </a:p>
+          <a:p>
+            <a:pPr lvl="0" indent="0" marL="0">
+              <a:spcBef>
+                <a:spcPts val="3000"/>
+              </a:spcBef>
+              <a:buNone/>
+            </a:pPr>
+            <a:r>
+              <a:rPr b="1"/>
+              <a:t>Python notebook: excellent</a:t>
+            </a:r>
+          </a:p>
+          <a:p>
+            <a:pPr lvl="0" indent="0" marL="0">
+              <a:buNone/>
+            </a:pPr>
+            <a:r>
+              <a:rPr/>
+              <a:t>If I would be doing something in a Python notebook, I don’t lose anything by doing it on Quarto, and the extra work is very small.</a:t>
+            </a:r>
+          </a:p>
+          <a:p>
+            <a:pPr lvl="0" indent="0" marL="0">
+              <a:buNone/>
+            </a:pPr>
+            <a:r>
+              <a:rPr/>
+              <a:t>::: :::{.column}</a:t>
+            </a:r>
+          </a:p>
+          <a:p>
+            <a:pPr lvl="0" indent="0" marL="0">
+              <a:spcBef>
+                <a:spcPts val="3000"/>
+              </a:spcBef>
+              <a:buNone/>
+            </a:pPr>
+            <a:r>
+              <a:rPr b="1"/>
+              <a:t>Writing articles: unsure</a:t>
+            </a:r>
+          </a:p>
+          <a:p>
+            <a:pPr lvl="0" indent="0" marL="0">
+              <a:buNone/>
+            </a:pPr>
+            <a:r>
+              <a:rPr/>
+              <a:t>I think Quarto is more helpful for a team that uses Git </a:t>
+            </a:r>
+            <a:r>
+              <a:rPr b="1"/>
+              <a:t>with</a:t>
+            </a:r>
+            <a:r>
+              <a:rPr/>
+              <a:t> Python notebooks or LaTeX to write articles. Microsoft Word collaboration through SharePoint and Teams is easier than Git and Quarto… but it’s not reproducible.</a:t>
+            </a:r>
+          </a:p>
+          <a:p>
+            <a:pPr lvl="0" indent="0" marL="0">
+              <a:spcBef>
+                <a:spcPts val="3000"/>
+              </a:spcBef>
+              <a:buNone/>
+            </a:pPr>
+            <a:r>
+              <a:rPr b="1"/>
+              <a:t>Presentations: probably not</a:t>
+            </a:r>
+          </a:p>
+          <a:p>
+            <a:pPr lvl="0" indent="0" marL="0">
+              <a:buNone/>
+            </a:pPr>
+            <a:r>
+              <a:rPr/>
+              <a:t>The best case for generating a presentation with Quarto are when you need to generate </a:t>
+            </a:r>
+            <a:r>
+              <a:rPr i="1"/>
+              <a:t>a lot</a:t>
+            </a:r>
+            <a:r>
+              <a:rPr/>
+              <a:t> of dynamic content. Other cases:</a:t>
+            </a:r>
+          </a:p>
+          <a:p>
+            <a:pPr lvl="0"/>
+            <a:r>
+              <a:rPr/>
+              <a:t>Reproducibility</a:t>
+            </a:r>
+          </a:p>
+          <a:p>
+            <a:pPr lvl="0"/>
+            <a:r>
+              <a:rPr/>
+              <a:t>Collaborators used to Git/Beamer</a:t>
+            </a:r>
+          </a:p>
+          <a:p>
+            <a:pPr lvl="0" indent="0" marL="0">
+              <a:buNone/>
+            </a:pPr>
+            <a:r>
+              <a:rPr/>
+              <a:t>::: ::::{.columns}</a:t>
+            </a:r>
+          </a:p>
+        </p:txBody>
+      </p:sp>
+    </p:spTree>
+  </p:cSld>
+</p:sld>
+</file>
+
+<file path=ppt/slides/slide35.xml><?xml version="1.0" encoding="utf-8"?>
+<p:sld xmlns:a="http://schemas.openxmlformats.org/drawingml/2006/main" xmlns:r="http://schemas.openxmlformats.org/officeDocument/2006/relationships" xmlns:p="http://schemas.openxmlformats.org/presentationml/2006/main">
+  <p:cSld>
+    <p:spTree>
+      <p:nvGrpSpPr>
+        <p:cNvPr id="1" name=""/>
+        <p:cNvGrpSpPr/>
+        <p:nvPr/>
+      </p:nvGrpSpPr>
+      <p:grpSpPr>
+        <a:xfrm>
+          <a:off x="0" y="0"/>
+          <a:ext cx="0" cy="0"/>
+          <a:chOff x="0" y="0"/>
+          <a:chExt cx="0" cy="0"/>
+        </a:xfrm>
+      </p:grpSpPr>
+      <p:sp>
+        <p:nvSpPr>
+          <p:cNvPr id="2" name="Title 1"/>
+          <p:cNvSpPr>
+            <a:spLocks noGrp="1"/>
+          </p:cNvSpPr>
+          <p:nvPr>
+            <p:ph type="title"/>
+          </p:nvPr>
+        </p:nvSpPr>
+        <p:spPr>
+          <a:xfrm>
+            <a:off x="722313" y="3305176"/>
+            <a:ext cx="7772400" cy="1021556"/>
+          </a:xfrm>
+        </p:spPr>
+        <p:txBody>
+          <a:bodyPr/>
+          <a:lstStyle/>
+          <a:p>
+            <a:pPr lvl="0" indent="0" marL="0">
+              <a:buNone/>
+            </a:pPr>
+            <a:r>
+              <a:rPr/>
+              <a:t>THANK YOU</a:t>
+            </a:r>
+          </a:p>
+        </p:txBody>
+      </p:sp>
+    </p:spTree>
+  </p:cSld>
+</p:sld>
+</file>
+
+<file path=ppt/slides/slide36.xml><?xml version="1.0" encoding="utf-8"?>
+<p:sld xmlns:a="http://schemas.openxmlformats.org/drawingml/2006/main" xmlns:r="http://schemas.openxmlformats.org/officeDocument/2006/relationships" xmlns:p="http://schemas.openxmlformats.org/presentationml/2006/main">
+  <p:cSld>
+    <p:spTree>
+      <p:nvGrpSpPr>
+        <p:cNvPr id="1" name=""/>
+        <p:cNvGrpSpPr/>
+        <p:nvPr/>
+      </p:nvGrpSpPr>
+      <p:grpSpPr>
+        <a:xfrm>
+          <a:off x="0" y="0"/>
+          <a:ext cx="0" cy="0"/>
+          <a:chOff x="0" y="0"/>
+          <a:chExt cx="0" cy="0"/>
+        </a:xfrm>
+      </p:grpSpPr>
+      <p:sp>
+        <p:nvSpPr>
+          <p:cNvPr id="2" name="Title 1"/>
+          <p:cNvSpPr>
+            <a:spLocks noGrp="1"/>
+          </p:cNvSpPr>
+          <p:nvPr>
+            <p:ph type="title"/>
+          </p:nvPr>
+        </p:nvSpPr>
+        <p:spPr/>
+        <p:txBody>
+          <a:bodyPr/>
+          <a:lstStyle/>
+          <a:p>
+            <a:pPr lvl="0" indent="0" marL="0">
+              <a:buNone/>
+            </a:pPr>
+            <a:r>
+              <a:rPr/>
+              <a:t>Notes</a:t>
+            </a:r>
+          </a:p>
+        </p:txBody>
+      </p:sp>
+      <p:sp>
+        <p:nvSpPr>
+          <p:cNvPr id="3" name="Content Placeholder 2"/>
+          <p:cNvSpPr>
+            <a:spLocks noGrp="1"/>
+          </p:cNvSpPr>
+          <p:nvPr>
+            <p:ph idx="1"/>
+          </p:nvPr>
+        </p:nvSpPr>
+        <p:spPr/>
+        <p:txBody>
+          <a:bodyPr/>
+          <a:lstStyle/>
+          <a:p>
+            <a:pPr lvl="0" indent="0" marL="0">
+              <a:buNone/>
+            </a:pPr>
+            <a:r>
+              <a:rPr sz="1800"/>
+              <a:t>1. You can use footnotes in presentations and websites, too</a:t>
             </a:r>
           </a:p>
         </p:txBody>

</xml_diff>

<commit_message>
Work done by Fri Jul  1 17:13:46 PDT 2022
</commit_message>
<xml_diff>
--- a/docs/presentation-orig.pptx
+++ b/docs/presentation-orig.pptx
@@ -361,7 +361,7 @@
             <a:fld id="{241EB5C9-1307-BA42-ABA2-0BC069CD8E7F}" type="datetimeFigureOut">
               <a:rPr lang="en-US" smtClean="0"/>
               <a:pPr/>
-              <a:t>6/15/2022</a:t>
+              <a:t>7/1/2022</a:t>
             </a:fld>
             <a:endParaRPr lang="en-US"/>
           </a:p>
@@ -708,7 +708,7 @@
           <a:p>
             <a:fld id="{241EB5C9-1307-BA42-ABA2-0BC069CD8E7F}" type="datetimeFigureOut">
               <a:rPr lang="en-US" smtClean="0"/>
-              <a:t>6/15/2022</a:t>
+              <a:t>7/1/2022</a:t>
             </a:fld>
             <a:endParaRPr lang="en-US"/>
           </a:p>
@@ -884,7 +884,7 @@
           <a:p>
             <a:fld id="{241EB5C9-1307-BA42-ABA2-0BC069CD8E7F}" type="datetimeFigureOut">
               <a:rPr lang="en-US" smtClean="0"/>
-              <a:t>6/15/2022</a:t>
+              <a:t>7/1/2022</a:t>
             </a:fld>
             <a:endParaRPr lang="en-US"/>
           </a:p>
@@ -1070,7 +1070,7 @@
           <a:p>
             <a:fld id="{241EB5C9-1307-BA42-ABA2-0BC069CD8E7F}" type="datetimeFigureOut">
               <a:rPr lang="en-US" smtClean="0"/>
-              <a:t>6/15/2022</a:t>
+              <a:t>7/1/2022</a:t>
             </a:fld>
             <a:endParaRPr lang="en-US"/>
           </a:p>
@@ -1294,7 +1294,7 @@
             <a:fld id="{241EB5C9-1307-BA42-ABA2-0BC069CD8E7F}" type="datetimeFigureOut">
               <a:rPr lang="en-US" smtClean="0"/>
               <a:pPr/>
-              <a:t>6/15/2022</a:t>
+              <a:t>7/1/2022</a:t>
             </a:fld>
             <a:endParaRPr lang="en-US"/>
           </a:p>
@@ -1617,7 +1617,7 @@
           <a:p>
             <a:fld id="{241EB5C9-1307-BA42-ABA2-0BC069CD8E7F}" type="datetimeFigureOut">
               <a:rPr lang="en-US" smtClean="0"/>
-              <a:t>6/15/2022</a:t>
+              <a:t>7/1/2022</a:t>
             </a:fld>
             <a:endParaRPr lang="en-US"/>
           </a:p>
@@ -2063,7 +2063,7 @@
             <a:fld id="{241EB5C9-1307-BA42-ABA2-0BC069CD8E7F}" type="datetimeFigureOut">
               <a:rPr lang="en-US" smtClean="0"/>
               <a:pPr/>
-              <a:t>6/15/2022</a:t>
+              <a:t>7/1/2022</a:t>
             </a:fld>
             <a:endParaRPr lang="en-US"/>
           </a:p>
@@ -2552,7 +2552,7 @@
             <a:fld id="{241EB5C9-1307-BA42-ABA2-0BC069CD8E7F}" type="datetimeFigureOut">
               <a:rPr lang="en-US" smtClean="0"/>
               <a:pPr/>
-              <a:t>6/15/2022</a:t>
+              <a:t>7/1/2022</a:t>
             </a:fld>
             <a:endParaRPr lang="en-US"/>
           </a:p>
@@ -2692,7 +2692,7 @@
           <a:p>
             <a:fld id="{241EB5C9-1307-BA42-ABA2-0BC069CD8E7F}" type="datetimeFigureOut">
               <a:rPr lang="en-US" smtClean="0"/>
-              <a:t>6/15/2022</a:t>
+              <a:t>7/1/2022</a:t>
             </a:fld>
             <a:endParaRPr lang="en-US"/>
           </a:p>
@@ -2795,7 +2795,7 @@
           <a:p>
             <a:fld id="{241EB5C9-1307-BA42-ABA2-0BC069CD8E7F}" type="datetimeFigureOut">
               <a:rPr lang="en-US" smtClean="0"/>
-              <a:t>6/15/2022</a:t>
+              <a:t>7/1/2022</a:t>
             </a:fld>
             <a:endParaRPr lang="en-US"/>
           </a:p>
@@ -3078,7 +3078,7 @@
           <a:p>
             <a:fld id="{241EB5C9-1307-BA42-ABA2-0BC069CD8E7F}" type="datetimeFigureOut">
               <a:rPr lang="en-US" smtClean="0"/>
-              <a:t>6/15/2022</a:t>
+              <a:t>7/1/2022</a:t>
             </a:fld>
             <a:endParaRPr lang="en-US"/>
           </a:p>
@@ -3260,7 +3260,7 @@
             <a:fld id="{241EB5C9-1307-BA42-ABA2-0BC069CD8E7F}" type="datetimeFigureOut">
               <a:rPr lang="en-US" smtClean="0"/>
               <a:pPr/>
-              <a:t>6/15/2022</a:t>
+              <a:t>7/1/2022</a:t>
             </a:fld>
             <a:endParaRPr lang="en-US"/>
           </a:p>
@@ -3641,7 +3641,7 @@
           <a:p>
             <a:fld id="{241EB5C9-1307-BA42-ABA2-0BC069CD8E7F}" type="datetimeFigureOut">
               <a:rPr lang="en-US" smtClean="0"/>
-              <a:t>6/15/2022</a:t>
+              <a:t>7/1/2022</a:t>
             </a:fld>
             <a:endParaRPr lang="en-US"/>
           </a:p>
@@ -3750,7 +3750,7 @@
           <a:spcPct val="0"/>
         </a:spcBef>
         <a:buNone/>
-        <a:defRPr kern="1200" sz="3300">
+        <a:defRPr kern="1200" sz="2800">
           <a:solidFill>
             <a:schemeClr val="tx1"/>
           </a:solidFill>
@@ -3767,7 +3767,7 @@
         </a:spcBef>
         <a:buFont typeface="Arial"/>
         <a:buChar char="•"/>
-        <a:defRPr kern="1200" sz="2400">
+        <a:defRPr kern="1200" sz="1800">
           <a:solidFill>
             <a:schemeClr val="tx1"/>
           </a:solidFill>
@@ -3782,7 +3782,7 @@
         </a:spcBef>
         <a:buFont typeface="Arial"/>
         <a:buChar char="–"/>
-        <a:defRPr kern="1200" sz="2100">
+        <a:defRPr kern="1200" sz="1800">
           <a:solidFill>
             <a:schemeClr val="tx1"/>
           </a:solidFill>
@@ -3797,7 +3797,7 @@
         </a:spcBef>
         <a:buFont typeface="Arial"/>
         <a:buChar char="•"/>
-        <a:defRPr kern="1200" sz="1800">
+        <a:defRPr kern="1200" sz="1400">
           <a:solidFill>
             <a:schemeClr val="tx1"/>
           </a:solidFill>
@@ -3812,7 +3812,7 @@
         </a:spcBef>
         <a:buFont typeface="Arial"/>
         <a:buChar char="–"/>
-        <a:defRPr kern="1200" sz="1500">
+        <a:defRPr kern="1200" sz="1200">
           <a:solidFill>
             <a:schemeClr val="tx1"/>
           </a:solidFill>
@@ -3827,7 +3827,7 @@
         </a:spcBef>
         <a:buFont typeface="Arial"/>
         <a:buChar char="»"/>
-        <a:defRPr kern="1200" sz="1500">
+        <a:defRPr kern="1200" sz="1200">
           <a:solidFill>
             <a:schemeClr val="tx1"/>
           </a:solidFill>

</xml_diff>

<commit_message>
Work done by Fri Jul  1 17:22:00 PDT 2022
</commit_message>
<xml_diff>
--- a/docs/presentation-orig.pptx
+++ b/docs/presentation-orig.pptx
@@ -41,6 +41,8 @@
     <p:sldId id="289" r:id="rId35"/>
     <p:sldId id="290" r:id="rId36"/>
     <p:sldId id="291" r:id="rId37"/>
+    <p:sldId id="292" r:id="rId38"/>
+    <p:sldId id="293" r:id="rId39"/>
   </p:sldIdLst>
   <p:sldSz cx="9144000" cy="5143500" type="screen16x9"/>
   <p:notesSz cx="6858000" cy="9144000"/>
@@ -6882,729 +6884,7 @@
             </a:pPr>
             <a:r>
               <a:rPr/>
-              <a:t>The next slides/sections were generated using the code below:</a:t>
-            </a:r>
-          </a:p>
-          <a:p>
-            <a:pPr lvl="0" indent="0">
-              <a:buNone/>
-            </a:pPr>
-            <a:r>
-              <a:rPr>
-                <a:solidFill>
-                  <a:srgbClr val="003B4F"/>
-                </a:solidFill>
-                <a:latin typeface="Consolas"/>
-              </a:rPr>
-              <a:t>df_dr </a:t>
-            </a:r>
-            <a:r>
-              <a:rPr>
-                <a:solidFill>
-                  <a:srgbClr val="5E5E5E"/>
-                </a:solidFill>
-                <a:latin typeface="Consolas"/>
-              </a:rPr>
-              <a:t>=</a:t>
-            </a:r>
-            <a:r>
-              <a:rPr>
-                <a:solidFill>
-                  <a:srgbClr val="003B4F"/>
-                </a:solidFill>
-                <a:latin typeface="Consolas"/>
-              </a:rPr>
-              <a:t> pd.read_csv(</a:t>
-            </a:r>
-            <a:r>
-              <a:rPr>
-                <a:solidFill>
-                  <a:srgbClr val="20794D"/>
-                </a:solidFill>
-                <a:latin typeface="Consolas"/>
-              </a:rPr>
-              <a:t>"data/dr.csv.gz"</a:t>
-            </a:r>
-            <a:r>
-              <a:rPr>
-                <a:solidFill>
-                  <a:srgbClr val="003B4F"/>
-                </a:solidFill>
-                <a:latin typeface="Consolas"/>
-              </a:rPr>
-              <a:t>, compression</a:t>
-            </a:r>
-            <a:r>
-              <a:rPr>
-                <a:solidFill>
-                  <a:srgbClr val="5E5E5E"/>
-                </a:solidFill>
-                <a:latin typeface="Consolas"/>
-              </a:rPr>
-              <a:t>=</a:t>
-            </a:r>
-            <a:r>
-              <a:rPr>
-                <a:solidFill>
-                  <a:srgbClr val="20794D"/>
-                </a:solidFill>
-                <a:latin typeface="Consolas"/>
-              </a:rPr>
-              <a:t>"gzip"</a:t>
-            </a:r>
-            <a:r>
-              <a:rPr>
-                <a:solidFill>
-                  <a:srgbClr val="003B4F"/>
-                </a:solidFill>
-                <a:latin typeface="Consolas"/>
-              </a:rPr>
-              <a:t>)</a:t>
-            </a:r>
-            <a:br/>
-            <a:r>
-              <a:rPr>
-                <a:solidFill>
-                  <a:srgbClr val="003B4F"/>
-                </a:solidFill>
-                <a:latin typeface="Consolas"/>
-              </a:rPr>
-              <a:t>df_pop </a:t>
-            </a:r>
-            <a:r>
-              <a:rPr>
-                <a:solidFill>
-                  <a:srgbClr val="5E5E5E"/>
-                </a:solidFill>
-                <a:latin typeface="Consolas"/>
-              </a:rPr>
-              <a:t>=</a:t>
-            </a:r>
-            <a:r>
-              <a:rPr>
-                <a:solidFill>
-                  <a:srgbClr val="003B4F"/>
-                </a:solidFill>
-                <a:latin typeface="Consolas"/>
-              </a:rPr>
-              <a:t> pd.read_csv(</a:t>
-            </a:r>
-            <a:r>
-              <a:rPr>
-                <a:solidFill>
-                  <a:srgbClr val="20794D"/>
-                </a:solidFill>
-                <a:latin typeface="Consolas"/>
-              </a:rPr>
-              <a:t>"data/pop_brackets.csv.gz"</a:t>
-            </a:r>
-            <a:r>
-              <a:rPr>
-                <a:solidFill>
-                  <a:srgbClr val="003B4F"/>
-                </a:solidFill>
-                <a:latin typeface="Consolas"/>
-              </a:rPr>
-              <a:t>, compression</a:t>
-            </a:r>
-            <a:r>
-              <a:rPr>
-                <a:solidFill>
-                  <a:srgbClr val="5E5E5E"/>
-                </a:solidFill>
-                <a:latin typeface="Consolas"/>
-              </a:rPr>
-              <a:t>=</a:t>
-            </a:r>
-            <a:r>
-              <a:rPr>
-                <a:solidFill>
-                  <a:srgbClr val="20794D"/>
-                </a:solidFill>
-                <a:latin typeface="Consolas"/>
-              </a:rPr>
-              <a:t>"gzip"</a:t>
-            </a:r>
-            <a:r>
-              <a:rPr>
-                <a:solidFill>
-                  <a:srgbClr val="003B4F"/>
-                </a:solidFill>
-                <a:latin typeface="Consolas"/>
-              </a:rPr>
-              <a:t>)</a:t>
-            </a:r>
-            <a:br/>
-            <a:br/>
-            <a:r>
-              <a:rPr>
-                <a:solidFill>
-                  <a:srgbClr val="003B4F"/>
-                </a:solidFill>
-                <a:latin typeface="Consolas"/>
-              </a:rPr>
-              <a:t>years </a:t>
-            </a:r>
-            <a:r>
-              <a:rPr>
-                <a:solidFill>
-                  <a:srgbClr val="5E5E5E"/>
-                </a:solidFill>
-                <a:latin typeface="Consolas"/>
-              </a:rPr>
-              <a:t>=</a:t>
-            </a:r>
-            <a:r>
-              <a:rPr>
-                <a:solidFill>
-                  <a:srgbClr val="003B4F"/>
-                </a:solidFill>
-                <a:latin typeface="Consolas"/>
-              </a:rPr>
-              <a:t> [</a:t>
-            </a:r>
-            <a:r>
-              <a:rPr>
-                <a:solidFill>
-                  <a:srgbClr val="AD0000"/>
-                </a:solidFill>
-                <a:latin typeface="Consolas"/>
-              </a:rPr>
-              <a:t>2000</a:t>
-            </a:r>
-            <a:r>
-              <a:rPr>
-                <a:solidFill>
-                  <a:srgbClr val="003B4F"/>
-                </a:solidFill>
-                <a:latin typeface="Consolas"/>
-              </a:rPr>
-              <a:t>, </a:t>
-            </a:r>
-            <a:r>
-              <a:rPr>
-                <a:solidFill>
-                  <a:srgbClr val="AD0000"/>
-                </a:solidFill>
-                <a:latin typeface="Consolas"/>
-              </a:rPr>
-              <a:t>2025</a:t>
-            </a:r>
-            <a:r>
-              <a:rPr>
-                <a:solidFill>
-                  <a:srgbClr val="003B4F"/>
-                </a:solidFill>
-                <a:latin typeface="Consolas"/>
-              </a:rPr>
-              <a:t>, </a:t>
-            </a:r>
-            <a:r>
-              <a:rPr>
-                <a:solidFill>
-                  <a:srgbClr val="AD0000"/>
-                </a:solidFill>
-                <a:latin typeface="Consolas"/>
-              </a:rPr>
-              <a:t>2050</a:t>
-            </a:r>
-            <a:r>
-              <a:rPr>
-                <a:solidFill>
-                  <a:srgbClr val="003B4F"/>
-                </a:solidFill>
-                <a:latin typeface="Consolas"/>
-              </a:rPr>
-              <a:t>, </a:t>
-            </a:r>
-            <a:r>
-              <a:rPr>
-                <a:solidFill>
-                  <a:srgbClr val="AD0000"/>
-                </a:solidFill>
-                <a:latin typeface="Consolas"/>
-              </a:rPr>
-              <a:t>2075</a:t>
-            </a:r>
-            <a:r>
-              <a:rPr>
-                <a:solidFill>
-                  <a:srgbClr val="003B4F"/>
-                </a:solidFill>
-                <a:latin typeface="Consolas"/>
-              </a:rPr>
-              <a:t>, </a:t>
-            </a:r>
-            <a:r>
-              <a:rPr>
-                <a:solidFill>
-                  <a:srgbClr val="AD0000"/>
-                </a:solidFill>
-                <a:latin typeface="Consolas"/>
-              </a:rPr>
-              <a:t>2100</a:t>
-            </a:r>
-            <a:r>
-              <a:rPr>
-                <a:solidFill>
-                  <a:srgbClr val="003B4F"/>
-                </a:solidFill>
-                <a:latin typeface="Consolas"/>
-              </a:rPr>
-              <a:t>]</a:t>
-            </a:r>
-            <a:br/>
-            <a:r>
-              <a:rPr>
-                <a:solidFill>
-                  <a:srgbClr val="003B4F"/>
-                </a:solidFill>
-                <a:latin typeface="Consolas"/>
-              </a:rPr>
-              <a:t>regions </a:t>
-            </a:r>
-            <a:r>
-              <a:rPr>
-                <a:solidFill>
-                  <a:srgbClr val="5E5E5E"/>
-                </a:solidFill>
-                <a:latin typeface="Consolas"/>
-              </a:rPr>
-              <a:t>=</a:t>
-            </a:r>
-            <a:r>
-              <a:rPr>
-                <a:solidFill>
-                  <a:srgbClr val="003B4F"/>
-                </a:solidFill>
-                <a:latin typeface="Consolas"/>
-              </a:rPr>
-              <a:t> [</a:t>
-            </a:r>
-            <a:r>
-              <a:rPr>
-                <a:solidFill>
-                  <a:srgbClr val="20794D"/>
-                </a:solidFill>
-                <a:latin typeface="Consolas"/>
-              </a:rPr>
-              <a:t>"Belgium"</a:t>
-            </a:r>
-            <a:r>
-              <a:rPr>
-                <a:solidFill>
-                  <a:srgbClr val="003B4F"/>
-                </a:solidFill>
-                <a:latin typeface="Consolas"/>
-              </a:rPr>
-              <a:t>, </a:t>
-            </a:r>
-            <a:r>
-              <a:rPr>
-                <a:solidFill>
-                  <a:srgbClr val="20794D"/>
-                </a:solidFill>
-                <a:latin typeface="Consolas"/>
-              </a:rPr>
-              <a:t>"China"</a:t>
-            </a:r>
-            <a:r>
-              <a:rPr>
-                <a:solidFill>
-                  <a:srgbClr val="003B4F"/>
-                </a:solidFill>
-                <a:latin typeface="Consolas"/>
-              </a:rPr>
-              <a:t>, </a:t>
-            </a:r>
-            <a:r>
-              <a:rPr>
-                <a:solidFill>
-                  <a:srgbClr val="20794D"/>
-                </a:solidFill>
-                <a:latin typeface="Consolas"/>
-              </a:rPr>
-              <a:t>"Brazil"</a:t>
-            </a:r>
-            <a:r>
-              <a:rPr>
-                <a:solidFill>
-                  <a:srgbClr val="003B4F"/>
-                </a:solidFill>
-                <a:latin typeface="Consolas"/>
-              </a:rPr>
-              <a:t>, </a:t>
-            </a:r>
-            <a:r>
-              <a:rPr>
-                <a:solidFill>
-                  <a:srgbClr val="20794D"/>
-                </a:solidFill>
-                <a:latin typeface="Consolas"/>
-              </a:rPr>
-              <a:t>"India"</a:t>
-            </a:r>
-            <a:r>
-              <a:rPr>
-                <a:solidFill>
-                  <a:srgbClr val="003B4F"/>
-                </a:solidFill>
-                <a:latin typeface="Consolas"/>
-              </a:rPr>
-              <a:t>, </a:t>
-            </a:r>
-            <a:r>
-              <a:rPr>
-                <a:solidFill>
-                  <a:srgbClr val="20794D"/>
-                </a:solidFill>
-                <a:latin typeface="Consolas"/>
-              </a:rPr>
-              <a:t>"Japan"</a:t>
-            </a:r>
-            <a:r>
-              <a:rPr>
-                <a:solidFill>
-                  <a:srgbClr val="003B4F"/>
-                </a:solidFill>
-                <a:latin typeface="Consolas"/>
-              </a:rPr>
-              <a:t>, </a:t>
-            </a:r>
-            <a:r>
-              <a:rPr>
-                <a:solidFill>
-                  <a:srgbClr val="20794D"/>
-                </a:solidFill>
-                <a:latin typeface="Consolas"/>
-              </a:rPr>
-              <a:t>"Nigeria"</a:t>
-            </a:r>
-            <a:r>
-              <a:rPr>
-                <a:solidFill>
-                  <a:srgbClr val="003B4F"/>
-                </a:solidFill>
-                <a:latin typeface="Consolas"/>
-              </a:rPr>
-              <a:t>]</a:t>
-            </a:r>
-            <a:br/>
-            <a:br/>
-            <a:r>
-              <a:rPr>
-                <a:solidFill>
-                  <a:srgbClr val="003B4F"/>
-                </a:solidFill>
-                <a:latin typeface="Consolas"/>
-              </a:rPr>
-              <a:t>for name in regions:</a:t>
-            </a:r>
-            <a:br/>
-            <a:r>
-              <a:rPr>
-                <a:solidFill>
-                  <a:srgbClr val="003B4F"/>
-                </a:solidFill>
-                <a:latin typeface="Consolas"/>
-              </a:rPr>
-              <a:t>    display(Markdown(</a:t>
-            </a:r>
-            <a:r>
-              <a:rPr>
-                <a:solidFill>
-                  <a:srgbClr val="20794D"/>
-                </a:solidFill>
-                <a:latin typeface="Consolas"/>
-              </a:rPr>
-              <a:t>f"## Age and Population Pyramids for </a:t>
-            </a:r>
-            <a:r>
-              <a:rPr>
-                <a:solidFill>
-                  <a:srgbClr val="5E5E5E"/>
-                </a:solidFill>
-                <a:latin typeface="Consolas"/>
-              </a:rPr>
-              <a:t>{</a:t>
-            </a:r>
-            <a:r>
-              <a:rPr>
-                <a:solidFill>
-                  <a:srgbClr val="003B4F"/>
-                </a:solidFill>
-                <a:latin typeface="Consolas"/>
-              </a:rPr>
-              <a:t>name</a:t>
-            </a:r>
-            <a:r>
-              <a:rPr>
-                <a:solidFill>
-                  <a:srgbClr val="5E5E5E"/>
-                </a:solidFill>
-                <a:latin typeface="Consolas"/>
-              </a:rPr>
-              <a:t>}</a:t>
-            </a:r>
-            <a:r>
-              <a:rPr>
-                <a:solidFill>
-                  <a:srgbClr val="20794D"/>
-                </a:solidFill>
-                <a:latin typeface="Consolas"/>
-              </a:rPr>
-              <a:t>"</a:t>
-            </a:r>
-            <a:r>
-              <a:rPr>
-                <a:solidFill>
-                  <a:srgbClr val="003B4F"/>
-                </a:solidFill>
-                <a:latin typeface="Consolas"/>
-              </a:rPr>
-              <a:t>))</a:t>
-            </a:r>
-            <a:br/>
-            <a:r>
-              <a:rPr>
-                <a:solidFill>
-                  <a:srgbClr val="003B4F"/>
-                </a:solidFill>
-                <a:latin typeface="Consolas"/>
-              </a:rPr>
-              <a:t>    display(Markdown(</a:t>
-            </a:r>
-            <a:r>
-              <a:rPr>
-                <a:solidFill>
-                  <a:srgbClr val="20794D"/>
-                </a:solidFill>
-                <a:latin typeface="Consolas"/>
-              </a:rPr>
-              <a:t>f'&lt;div class="columns"&gt;'</a:t>
-            </a:r>
-            <a:r>
-              <a:rPr>
-                <a:solidFill>
-                  <a:srgbClr val="003B4F"/>
-                </a:solidFill>
-                <a:latin typeface="Consolas"/>
-              </a:rPr>
-              <a:t>))</a:t>
-            </a:r>
-            <a:br/>
-            <a:r>
-              <a:rPr>
-                <a:solidFill>
-                  <a:srgbClr val="003B4F"/>
-                </a:solidFill>
-                <a:latin typeface="Consolas"/>
-              </a:rPr>
-              <a:t>    display(Markdown(</a:t>
-            </a:r>
-            <a:r>
-              <a:rPr>
-                <a:solidFill>
-                  <a:srgbClr val="20794D"/>
-                </a:solidFill>
-                <a:latin typeface="Consolas"/>
-              </a:rPr>
-              <a:t>f'&lt;div class="column"&gt;'</a:t>
-            </a:r>
-            <a:r>
-              <a:rPr>
-                <a:solidFill>
-                  <a:srgbClr val="003B4F"/>
-                </a:solidFill>
-                <a:latin typeface="Consolas"/>
-              </a:rPr>
-              <a:t>))</a:t>
-            </a:r>
-            <a:br/>
-            <a:r>
-              <a:rPr>
-                <a:solidFill>
-                  <a:srgbClr val="003B4F"/>
-                </a:solidFill>
-                <a:latin typeface="Consolas"/>
-              </a:rPr>
-              <a:t>    plot_dependency_ratio(df_dr[df_dr.Location </a:t>
-            </a:r>
-            <a:r>
-              <a:rPr>
-                <a:solidFill>
-                  <a:srgbClr val="5E5E5E"/>
-                </a:solidFill>
-                <a:latin typeface="Consolas"/>
-              </a:rPr>
-              <a:t>==</a:t>
-            </a:r>
-            <a:r>
-              <a:rPr>
-                <a:solidFill>
-                  <a:srgbClr val="003B4F"/>
-                </a:solidFill>
-                <a:latin typeface="Consolas"/>
-              </a:rPr>
-              <a:t> name])</a:t>
-            </a:r>
-            <a:br/>
-            <a:r>
-              <a:rPr>
-                <a:solidFill>
-                  <a:srgbClr val="003B4F"/>
-                </a:solidFill>
-                <a:latin typeface="Consolas"/>
-              </a:rPr>
-              <a:t>    display(Markdown(</a:t>
-            </a:r>
-            <a:r>
-              <a:rPr>
-                <a:solidFill>
-                  <a:srgbClr val="20794D"/>
-                </a:solidFill>
-                <a:latin typeface="Consolas"/>
-              </a:rPr>
-              <a:t>f'&lt;/div&gt;'</a:t>
-            </a:r>
-            <a:r>
-              <a:rPr>
-                <a:solidFill>
-                  <a:srgbClr val="003B4F"/>
-                </a:solidFill>
-                <a:latin typeface="Consolas"/>
-              </a:rPr>
-              <a:t>))</a:t>
-            </a:r>
-            <a:br/>
-            <a:r>
-              <a:rPr>
-                <a:solidFill>
-                  <a:srgbClr val="003B4F"/>
-                </a:solidFill>
-                <a:latin typeface="Consolas"/>
-              </a:rPr>
-              <a:t>    display(Markdown(</a:t>
-            </a:r>
-            <a:r>
-              <a:rPr>
-                <a:solidFill>
-                  <a:srgbClr val="20794D"/>
-                </a:solidFill>
-                <a:latin typeface="Consolas"/>
-              </a:rPr>
-              <a:t>f'&lt;div class="column"&gt;'</a:t>
-            </a:r>
-            <a:r>
-              <a:rPr>
-                <a:solidFill>
-                  <a:srgbClr val="003B4F"/>
-                </a:solidFill>
-                <a:latin typeface="Consolas"/>
-              </a:rPr>
-              <a:t>))</a:t>
-            </a:r>
-            <a:br/>
-            <a:r>
-              <a:rPr>
-                <a:solidFill>
-                  <a:srgbClr val="003B4F"/>
-                </a:solidFill>
-                <a:latin typeface="Consolas"/>
-              </a:rPr>
-              <a:t>    plot_population_pyramid_series(df_pop[df_pop[</a:t>
-            </a:r>
-            <a:r>
-              <a:rPr>
-                <a:solidFill>
-                  <a:srgbClr val="20794D"/>
-                </a:solidFill>
-                <a:latin typeface="Consolas"/>
-              </a:rPr>
-              <a:t>"Location"</a:t>
-            </a:r>
-            <a:r>
-              <a:rPr>
-                <a:solidFill>
-                  <a:srgbClr val="003B4F"/>
-                </a:solidFill>
-                <a:latin typeface="Consolas"/>
-              </a:rPr>
-              <a:t>]</a:t>
-            </a:r>
-            <a:r>
-              <a:rPr>
-                <a:solidFill>
-                  <a:srgbClr val="5E5E5E"/>
-                </a:solidFill>
-                <a:latin typeface="Consolas"/>
-              </a:rPr>
-              <a:t>==</a:t>
-            </a:r>
-            <a:r>
-              <a:rPr>
-                <a:solidFill>
-                  <a:srgbClr val="003B4F"/>
-                </a:solidFill>
-                <a:latin typeface="Consolas"/>
-              </a:rPr>
-              <a:t>name], years)</a:t>
-            </a:r>
-            <a:br/>
-            <a:r>
-              <a:rPr>
-                <a:solidFill>
-                  <a:srgbClr val="003B4F"/>
-                </a:solidFill>
-                <a:latin typeface="Consolas"/>
-              </a:rPr>
-              <a:t>    display(Markdown(</a:t>
-            </a:r>
-            <a:r>
-              <a:rPr>
-                <a:solidFill>
-                  <a:srgbClr val="20794D"/>
-                </a:solidFill>
-                <a:latin typeface="Consolas"/>
-              </a:rPr>
-              <a:t>f'&lt;/div&gt;'</a:t>
-            </a:r>
-            <a:r>
-              <a:rPr>
-                <a:solidFill>
-                  <a:srgbClr val="003B4F"/>
-                </a:solidFill>
-                <a:latin typeface="Consolas"/>
-              </a:rPr>
-              <a:t>))</a:t>
-            </a:r>
-            <a:br/>
-            <a:r>
-              <a:rPr>
-                <a:solidFill>
-                  <a:srgbClr val="003B4F"/>
-                </a:solidFill>
-                <a:latin typeface="Consolas"/>
-              </a:rPr>
-              <a:t>    display(Markdown(</a:t>
-            </a:r>
-            <a:r>
-              <a:rPr>
-                <a:solidFill>
-                  <a:srgbClr val="20794D"/>
-                </a:solidFill>
-                <a:latin typeface="Consolas"/>
-              </a:rPr>
-              <a:t>f'&lt;/div&gt;'</a:t>
-            </a:r>
-            <a:r>
-              <a:rPr>
-                <a:solidFill>
-                  <a:srgbClr val="003B4F"/>
-                </a:solidFill>
-                <a:latin typeface="Consolas"/>
-              </a:rPr>
-              <a:t>))</a:t>
+              <a:t>You can use Python or R to automatically generate slides.</a:t>
             </a:r>
           </a:p>
         </p:txBody>
@@ -7667,6 +6947,800 @@
 </file>
 
 <file path=ppt/slides/slide20.xml><?xml version="1.0" encoding="utf-8"?>
+<p:sld xmlns:a="http://schemas.openxmlformats.org/drawingml/2006/main" xmlns:r="http://schemas.openxmlformats.org/officeDocument/2006/relationships" xmlns:p="http://schemas.openxmlformats.org/presentationml/2006/main">
+  <p:cSld>
+    <p:spTree>
+      <p:nvGrpSpPr>
+        <p:cNvPr id="1" name=""/>
+        <p:cNvGrpSpPr/>
+        <p:nvPr/>
+      </p:nvGrpSpPr>
+      <p:grpSpPr>
+        <a:xfrm>
+          <a:off x="0" y="0"/>
+          <a:ext cx="0" cy="0"/>
+          <a:chOff x="0" y="0"/>
+          <a:chExt cx="0" cy="0"/>
+        </a:xfrm>
+      </p:grpSpPr>
+      <p:sp>
+        <p:nvSpPr>
+          <p:cNvPr id="2" name="Title 1"/>
+          <p:cNvSpPr>
+            <a:spLocks noGrp="1"/>
+          </p:cNvSpPr>
+          <p:nvPr>
+            <p:ph type="title"/>
+          </p:nvPr>
+        </p:nvSpPr>
+        <p:spPr/>
+        <p:txBody>
+          <a:bodyPr/>
+          <a:lstStyle/>
+          <a:p>
+            <a:pPr lvl="0" indent="0" marL="0">
+              <a:buNone/>
+            </a:pPr>
+            <a:r>
+              <a:rPr/>
+              <a:t>Generating slides with Python</a:t>
+            </a:r>
+          </a:p>
+        </p:txBody>
+      </p:sp>
+      <p:sp>
+        <p:nvSpPr>
+          <p:cNvPr id="3" name="Content Placeholder 2"/>
+          <p:cNvSpPr>
+            <a:spLocks noGrp="1"/>
+          </p:cNvSpPr>
+          <p:nvPr>
+            <p:ph idx="1"/>
+          </p:nvPr>
+        </p:nvSpPr>
+        <p:spPr/>
+        <p:txBody>
+          <a:bodyPr/>
+          <a:lstStyle/>
+          <a:p>
+            <a:pPr lvl="0" indent="0" marL="0">
+              <a:buNone/>
+            </a:pPr>
+            <a:r>
+              <a:rPr/>
+              <a:t>The next slides/sections were generated using the code below:</a:t>
+            </a:r>
+          </a:p>
+          <a:p>
+            <a:pPr lvl="0" indent="0">
+              <a:buNone/>
+            </a:pPr>
+            <a:r>
+              <a:rPr>
+                <a:solidFill>
+                  <a:srgbClr val="003B4F"/>
+                </a:solidFill>
+                <a:latin typeface="Consolas"/>
+              </a:rPr>
+              <a:t>df_dr </a:t>
+            </a:r>
+            <a:r>
+              <a:rPr>
+                <a:solidFill>
+                  <a:srgbClr val="5E5E5E"/>
+                </a:solidFill>
+                <a:latin typeface="Consolas"/>
+              </a:rPr>
+              <a:t>=</a:t>
+            </a:r>
+            <a:r>
+              <a:rPr>
+                <a:solidFill>
+                  <a:srgbClr val="003B4F"/>
+                </a:solidFill>
+                <a:latin typeface="Consolas"/>
+              </a:rPr>
+              <a:t> pd.read_csv(</a:t>
+            </a:r>
+            <a:r>
+              <a:rPr>
+                <a:solidFill>
+                  <a:srgbClr val="20794D"/>
+                </a:solidFill>
+                <a:latin typeface="Consolas"/>
+              </a:rPr>
+              <a:t>"data/dr.csv.gz"</a:t>
+            </a:r>
+            <a:r>
+              <a:rPr>
+                <a:solidFill>
+                  <a:srgbClr val="003B4F"/>
+                </a:solidFill>
+                <a:latin typeface="Consolas"/>
+              </a:rPr>
+              <a:t>, compression</a:t>
+            </a:r>
+            <a:r>
+              <a:rPr>
+                <a:solidFill>
+                  <a:srgbClr val="5E5E5E"/>
+                </a:solidFill>
+                <a:latin typeface="Consolas"/>
+              </a:rPr>
+              <a:t>=</a:t>
+            </a:r>
+            <a:r>
+              <a:rPr>
+                <a:solidFill>
+                  <a:srgbClr val="20794D"/>
+                </a:solidFill>
+                <a:latin typeface="Consolas"/>
+              </a:rPr>
+              <a:t>"gzip"</a:t>
+            </a:r>
+            <a:r>
+              <a:rPr>
+                <a:solidFill>
+                  <a:srgbClr val="003B4F"/>
+                </a:solidFill>
+                <a:latin typeface="Consolas"/>
+              </a:rPr>
+              <a:t>)</a:t>
+            </a:r>
+            <a:br/>
+            <a:r>
+              <a:rPr>
+                <a:solidFill>
+                  <a:srgbClr val="003B4F"/>
+                </a:solidFill>
+                <a:latin typeface="Consolas"/>
+              </a:rPr>
+              <a:t>df_pop </a:t>
+            </a:r>
+            <a:r>
+              <a:rPr>
+                <a:solidFill>
+                  <a:srgbClr val="5E5E5E"/>
+                </a:solidFill>
+                <a:latin typeface="Consolas"/>
+              </a:rPr>
+              <a:t>=</a:t>
+            </a:r>
+            <a:r>
+              <a:rPr>
+                <a:solidFill>
+                  <a:srgbClr val="003B4F"/>
+                </a:solidFill>
+                <a:latin typeface="Consolas"/>
+              </a:rPr>
+              <a:t> pd.read_csv(</a:t>
+            </a:r>
+            <a:r>
+              <a:rPr>
+                <a:solidFill>
+                  <a:srgbClr val="20794D"/>
+                </a:solidFill>
+                <a:latin typeface="Consolas"/>
+              </a:rPr>
+              <a:t>"data/pop_brackets.csv.gz"</a:t>
+            </a:r>
+            <a:r>
+              <a:rPr>
+                <a:solidFill>
+                  <a:srgbClr val="003B4F"/>
+                </a:solidFill>
+                <a:latin typeface="Consolas"/>
+              </a:rPr>
+              <a:t>, compression</a:t>
+            </a:r>
+            <a:r>
+              <a:rPr>
+                <a:solidFill>
+                  <a:srgbClr val="5E5E5E"/>
+                </a:solidFill>
+                <a:latin typeface="Consolas"/>
+              </a:rPr>
+              <a:t>=</a:t>
+            </a:r>
+            <a:r>
+              <a:rPr>
+                <a:solidFill>
+                  <a:srgbClr val="20794D"/>
+                </a:solidFill>
+                <a:latin typeface="Consolas"/>
+              </a:rPr>
+              <a:t>"gzip"</a:t>
+            </a:r>
+            <a:r>
+              <a:rPr>
+                <a:solidFill>
+                  <a:srgbClr val="003B4F"/>
+                </a:solidFill>
+                <a:latin typeface="Consolas"/>
+              </a:rPr>
+              <a:t>)</a:t>
+            </a:r>
+            <a:br/>
+            <a:br/>
+            <a:r>
+              <a:rPr>
+                <a:solidFill>
+                  <a:srgbClr val="003B4F"/>
+                </a:solidFill>
+                <a:latin typeface="Consolas"/>
+              </a:rPr>
+              <a:t>years </a:t>
+            </a:r>
+            <a:r>
+              <a:rPr>
+                <a:solidFill>
+                  <a:srgbClr val="5E5E5E"/>
+                </a:solidFill>
+                <a:latin typeface="Consolas"/>
+              </a:rPr>
+              <a:t>=</a:t>
+            </a:r>
+            <a:r>
+              <a:rPr>
+                <a:solidFill>
+                  <a:srgbClr val="003B4F"/>
+                </a:solidFill>
+                <a:latin typeface="Consolas"/>
+              </a:rPr>
+              <a:t> [</a:t>
+            </a:r>
+            <a:r>
+              <a:rPr>
+                <a:solidFill>
+                  <a:srgbClr val="AD0000"/>
+                </a:solidFill>
+                <a:latin typeface="Consolas"/>
+              </a:rPr>
+              <a:t>2000</a:t>
+            </a:r>
+            <a:r>
+              <a:rPr>
+                <a:solidFill>
+                  <a:srgbClr val="003B4F"/>
+                </a:solidFill>
+                <a:latin typeface="Consolas"/>
+              </a:rPr>
+              <a:t>, </a:t>
+            </a:r>
+            <a:r>
+              <a:rPr>
+                <a:solidFill>
+                  <a:srgbClr val="AD0000"/>
+                </a:solidFill>
+                <a:latin typeface="Consolas"/>
+              </a:rPr>
+              <a:t>2025</a:t>
+            </a:r>
+            <a:r>
+              <a:rPr>
+                <a:solidFill>
+                  <a:srgbClr val="003B4F"/>
+                </a:solidFill>
+                <a:latin typeface="Consolas"/>
+              </a:rPr>
+              <a:t>, </a:t>
+            </a:r>
+            <a:r>
+              <a:rPr>
+                <a:solidFill>
+                  <a:srgbClr val="AD0000"/>
+                </a:solidFill>
+                <a:latin typeface="Consolas"/>
+              </a:rPr>
+              <a:t>2050</a:t>
+            </a:r>
+            <a:r>
+              <a:rPr>
+                <a:solidFill>
+                  <a:srgbClr val="003B4F"/>
+                </a:solidFill>
+                <a:latin typeface="Consolas"/>
+              </a:rPr>
+              <a:t>, </a:t>
+            </a:r>
+            <a:r>
+              <a:rPr>
+                <a:solidFill>
+                  <a:srgbClr val="AD0000"/>
+                </a:solidFill>
+                <a:latin typeface="Consolas"/>
+              </a:rPr>
+              <a:t>2075</a:t>
+            </a:r>
+            <a:r>
+              <a:rPr>
+                <a:solidFill>
+                  <a:srgbClr val="003B4F"/>
+                </a:solidFill>
+                <a:latin typeface="Consolas"/>
+              </a:rPr>
+              <a:t>, </a:t>
+            </a:r>
+            <a:r>
+              <a:rPr>
+                <a:solidFill>
+                  <a:srgbClr val="AD0000"/>
+                </a:solidFill>
+                <a:latin typeface="Consolas"/>
+              </a:rPr>
+              <a:t>2100</a:t>
+            </a:r>
+            <a:r>
+              <a:rPr>
+                <a:solidFill>
+                  <a:srgbClr val="003B4F"/>
+                </a:solidFill>
+                <a:latin typeface="Consolas"/>
+              </a:rPr>
+              <a:t>]</a:t>
+            </a:r>
+            <a:br/>
+            <a:r>
+              <a:rPr>
+                <a:solidFill>
+                  <a:srgbClr val="003B4F"/>
+                </a:solidFill>
+                <a:latin typeface="Consolas"/>
+              </a:rPr>
+              <a:t>regions </a:t>
+            </a:r>
+            <a:r>
+              <a:rPr>
+                <a:solidFill>
+                  <a:srgbClr val="5E5E5E"/>
+                </a:solidFill>
+                <a:latin typeface="Consolas"/>
+              </a:rPr>
+              <a:t>=</a:t>
+            </a:r>
+            <a:r>
+              <a:rPr>
+                <a:solidFill>
+                  <a:srgbClr val="003B4F"/>
+                </a:solidFill>
+                <a:latin typeface="Consolas"/>
+              </a:rPr>
+              <a:t> [</a:t>
+            </a:r>
+            <a:r>
+              <a:rPr>
+                <a:solidFill>
+                  <a:srgbClr val="20794D"/>
+                </a:solidFill>
+                <a:latin typeface="Consolas"/>
+              </a:rPr>
+              <a:t>"Belgium"</a:t>
+            </a:r>
+            <a:r>
+              <a:rPr>
+                <a:solidFill>
+                  <a:srgbClr val="003B4F"/>
+                </a:solidFill>
+                <a:latin typeface="Consolas"/>
+              </a:rPr>
+              <a:t>, </a:t>
+            </a:r>
+            <a:r>
+              <a:rPr>
+                <a:solidFill>
+                  <a:srgbClr val="20794D"/>
+                </a:solidFill>
+                <a:latin typeface="Consolas"/>
+              </a:rPr>
+              <a:t>"China"</a:t>
+            </a:r>
+            <a:r>
+              <a:rPr>
+                <a:solidFill>
+                  <a:srgbClr val="003B4F"/>
+                </a:solidFill>
+                <a:latin typeface="Consolas"/>
+              </a:rPr>
+              <a:t>, </a:t>
+            </a:r>
+            <a:r>
+              <a:rPr>
+                <a:solidFill>
+                  <a:srgbClr val="20794D"/>
+                </a:solidFill>
+                <a:latin typeface="Consolas"/>
+              </a:rPr>
+              <a:t>"Brazil"</a:t>
+            </a:r>
+            <a:r>
+              <a:rPr>
+                <a:solidFill>
+                  <a:srgbClr val="003B4F"/>
+                </a:solidFill>
+                <a:latin typeface="Consolas"/>
+              </a:rPr>
+              <a:t>, </a:t>
+            </a:r>
+            <a:r>
+              <a:rPr>
+                <a:solidFill>
+                  <a:srgbClr val="20794D"/>
+                </a:solidFill>
+                <a:latin typeface="Consolas"/>
+              </a:rPr>
+              <a:t>"India"</a:t>
+            </a:r>
+            <a:r>
+              <a:rPr>
+                <a:solidFill>
+                  <a:srgbClr val="003B4F"/>
+                </a:solidFill>
+                <a:latin typeface="Consolas"/>
+              </a:rPr>
+              <a:t>, </a:t>
+            </a:r>
+            <a:r>
+              <a:rPr>
+                <a:solidFill>
+                  <a:srgbClr val="20794D"/>
+                </a:solidFill>
+                <a:latin typeface="Consolas"/>
+              </a:rPr>
+              <a:t>"Japan"</a:t>
+            </a:r>
+            <a:r>
+              <a:rPr>
+                <a:solidFill>
+                  <a:srgbClr val="003B4F"/>
+                </a:solidFill>
+                <a:latin typeface="Consolas"/>
+              </a:rPr>
+              <a:t>, </a:t>
+            </a:r>
+            <a:r>
+              <a:rPr>
+                <a:solidFill>
+                  <a:srgbClr val="20794D"/>
+                </a:solidFill>
+                <a:latin typeface="Consolas"/>
+              </a:rPr>
+              <a:t>"Nigeria"</a:t>
+            </a:r>
+            <a:r>
+              <a:rPr>
+                <a:solidFill>
+                  <a:srgbClr val="003B4F"/>
+                </a:solidFill>
+                <a:latin typeface="Consolas"/>
+              </a:rPr>
+              <a:t>]</a:t>
+            </a:r>
+            <a:br/>
+            <a:br/>
+            <a:r>
+              <a:rPr>
+                <a:solidFill>
+                  <a:srgbClr val="003B4F"/>
+                </a:solidFill>
+                <a:latin typeface="Consolas"/>
+              </a:rPr>
+              <a:t>for name in regions:</a:t>
+            </a:r>
+            <a:br/>
+            <a:r>
+              <a:rPr>
+                <a:solidFill>
+                  <a:srgbClr val="003B4F"/>
+                </a:solidFill>
+                <a:latin typeface="Consolas"/>
+              </a:rPr>
+              <a:t>    display(Markdown(</a:t>
+            </a:r>
+            <a:r>
+              <a:rPr>
+                <a:solidFill>
+                  <a:srgbClr val="20794D"/>
+                </a:solidFill>
+                <a:latin typeface="Consolas"/>
+              </a:rPr>
+              <a:t>f"## Age and Population Pyramids for </a:t>
+            </a:r>
+            <a:r>
+              <a:rPr>
+                <a:solidFill>
+                  <a:srgbClr val="5E5E5E"/>
+                </a:solidFill>
+                <a:latin typeface="Consolas"/>
+              </a:rPr>
+              <a:t>{</a:t>
+            </a:r>
+            <a:r>
+              <a:rPr>
+                <a:solidFill>
+                  <a:srgbClr val="003B4F"/>
+                </a:solidFill>
+                <a:latin typeface="Consolas"/>
+              </a:rPr>
+              <a:t>name</a:t>
+            </a:r>
+            <a:r>
+              <a:rPr>
+                <a:solidFill>
+                  <a:srgbClr val="5E5E5E"/>
+                </a:solidFill>
+                <a:latin typeface="Consolas"/>
+              </a:rPr>
+              <a:t>}</a:t>
+            </a:r>
+            <a:r>
+              <a:rPr>
+                <a:solidFill>
+                  <a:srgbClr val="20794D"/>
+                </a:solidFill>
+                <a:latin typeface="Consolas"/>
+              </a:rPr>
+              <a:t>"</a:t>
+            </a:r>
+            <a:r>
+              <a:rPr>
+                <a:solidFill>
+                  <a:srgbClr val="003B4F"/>
+                </a:solidFill>
+                <a:latin typeface="Consolas"/>
+              </a:rPr>
+              <a:t>))</a:t>
+            </a:r>
+            <a:br/>
+            <a:r>
+              <a:rPr>
+                <a:solidFill>
+                  <a:srgbClr val="003B4F"/>
+                </a:solidFill>
+                <a:latin typeface="Consolas"/>
+              </a:rPr>
+              <a:t>    display(Markdown(</a:t>
+            </a:r>
+            <a:r>
+              <a:rPr>
+                <a:solidFill>
+                  <a:srgbClr val="20794D"/>
+                </a:solidFill>
+                <a:latin typeface="Consolas"/>
+              </a:rPr>
+              <a:t>f'&lt;div class="columns"&gt;'</a:t>
+            </a:r>
+            <a:r>
+              <a:rPr>
+                <a:solidFill>
+                  <a:srgbClr val="003B4F"/>
+                </a:solidFill>
+                <a:latin typeface="Consolas"/>
+              </a:rPr>
+              <a:t>))</a:t>
+            </a:r>
+            <a:br/>
+            <a:r>
+              <a:rPr>
+                <a:solidFill>
+                  <a:srgbClr val="003B4F"/>
+                </a:solidFill>
+                <a:latin typeface="Consolas"/>
+              </a:rPr>
+              <a:t>    display(Markdown(</a:t>
+            </a:r>
+            <a:r>
+              <a:rPr>
+                <a:solidFill>
+                  <a:srgbClr val="20794D"/>
+                </a:solidFill>
+                <a:latin typeface="Consolas"/>
+              </a:rPr>
+              <a:t>f'&lt;div class="column"&gt;'</a:t>
+            </a:r>
+            <a:r>
+              <a:rPr>
+                <a:solidFill>
+                  <a:srgbClr val="003B4F"/>
+                </a:solidFill>
+                <a:latin typeface="Consolas"/>
+              </a:rPr>
+              <a:t>))</a:t>
+            </a:r>
+            <a:br/>
+            <a:r>
+              <a:rPr>
+                <a:solidFill>
+                  <a:srgbClr val="003B4F"/>
+                </a:solidFill>
+                <a:latin typeface="Consolas"/>
+              </a:rPr>
+              <a:t>    plot_dependency_ratio(df_dr[df_dr.Location </a:t>
+            </a:r>
+            <a:r>
+              <a:rPr>
+                <a:solidFill>
+                  <a:srgbClr val="5E5E5E"/>
+                </a:solidFill>
+                <a:latin typeface="Consolas"/>
+              </a:rPr>
+              <a:t>==</a:t>
+            </a:r>
+            <a:r>
+              <a:rPr>
+                <a:solidFill>
+                  <a:srgbClr val="003B4F"/>
+                </a:solidFill>
+                <a:latin typeface="Consolas"/>
+              </a:rPr>
+              <a:t> name])</a:t>
+            </a:r>
+            <a:br/>
+            <a:r>
+              <a:rPr>
+                <a:solidFill>
+                  <a:srgbClr val="003B4F"/>
+                </a:solidFill>
+                <a:latin typeface="Consolas"/>
+              </a:rPr>
+              <a:t>    display(Markdown(</a:t>
+            </a:r>
+            <a:r>
+              <a:rPr>
+                <a:solidFill>
+                  <a:srgbClr val="20794D"/>
+                </a:solidFill>
+                <a:latin typeface="Consolas"/>
+              </a:rPr>
+              <a:t>f'&lt;/div&gt;'</a:t>
+            </a:r>
+            <a:r>
+              <a:rPr>
+                <a:solidFill>
+                  <a:srgbClr val="003B4F"/>
+                </a:solidFill>
+                <a:latin typeface="Consolas"/>
+              </a:rPr>
+              <a:t>))</a:t>
+            </a:r>
+            <a:br/>
+            <a:r>
+              <a:rPr>
+                <a:solidFill>
+                  <a:srgbClr val="003B4F"/>
+                </a:solidFill>
+                <a:latin typeface="Consolas"/>
+              </a:rPr>
+              <a:t>    display(Markdown(</a:t>
+            </a:r>
+            <a:r>
+              <a:rPr>
+                <a:solidFill>
+                  <a:srgbClr val="20794D"/>
+                </a:solidFill>
+                <a:latin typeface="Consolas"/>
+              </a:rPr>
+              <a:t>f'&lt;div class="column"&gt;'</a:t>
+            </a:r>
+            <a:r>
+              <a:rPr>
+                <a:solidFill>
+                  <a:srgbClr val="003B4F"/>
+                </a:solidFill>
+                <a:latin typeface="Consolas"/>
+              </a:rPr>
+              <a:t>))</a:t>
+            </a:r>
+            <a:br/>
+            <a:r>
+              <a:rPr>
+                <a:solidFill>
+                  <a:srgbClr val="003B4F"/>
+                </a:solidFill>
+                <a:latin typeface="Consolas"/>
+              </a:rPr>
+              <a:t>    plot_population_pyramid_series(df_pop[df_pop[</a:t>
+            </a:r>
+            <a:r>
+              <a:rPr>
+                <a:solidFill>
+                  <a:srgbClr val="20794D"/>
+                </a:solidFill>
+                <a:latin typeface="Consolas"/>
+              </a:rPr>
+              <a:t>"Location"</a:t>
+            </a:r>
+            <a:r>
+              <a:rPr>
+                <a:solidFill>
+                  <a:srgbClr val="003B4F"/>
+                </a:solidFill>
+                <a:latin typeface="Consolas"/>
+              </a:rPr>
+              <a:t>]</a:t>
+            </a:r>
+            <a:r>
+              <a:rPr>
+                <a:solidFill>
+                  <a:srgbClr val="5E5E5E"/>
+                </a:solidFill>
+                <a:latin typeface="Consolas"/>
+              </a:rPr>
+              <a:t>==</a:t>
+            </a:r>
+            <a:r>
+              <a:rPr>
+                <a:solidFill>
+                  <a:srgbClr val="003B4F"/>
+                </a:solidFill>
+                <a:latin typeface="Consolas"/>
+              </a:rPr>
+              <a:t>name], years)</a:t>
+            </a:r>
+            <a:br/>
+            <a:r>
+              <a:rPr>
+                <a:solidFill>
+                  <a:srgbClr val="003B4F"/>
+                </a:solidFill>
+                <a:latin typeface="Consolas"/>
+              </a:rPr>
+              <a:t>    display(Markdown(</a:t>
+            </a:r>
+            <a:r>
+              <a:rPr>
+                <a:solidFill>
+                  <a:srgbClr val="20794D"/>
+                </a:solidFill>
+                <a:latin typeface="Consolas"/>
+              </a:rPr>
+              <a:t>f'&lt;/div&gt;'</a:t>
+            </a:r>
+            <a:r>
+              <a:rPr>
+                <a:solidFill>
+                  <a:srgbClr val="003B4F"/>
+                </a:solidFill>
+                <a:latin typeface="Consolas"/>
+              </a:rPr>
+              <a:t>))</a:t>
+            </a:r>
+            <a:br/>
+            <a:r>
+              <a:rPr>
+                <a:solidFill>
+                  <a:srgbClr val="003B4F"/>
+                </a:solidFill>
+                <a:latin typeface="Consolas"/>
+              </a:rPr>
+              <a:t>    display(Markdown(</a:t>
+            </a:r>
+            <a:r>
+              <a:rPr>
+                <a:solidFill>
+                  <a:srgbClr val="20794D"/>
+                </a:solidFill>
+                <a:latin typeface="Consolas"/>
+              </a:rPr>
+              <a:t>f'&lt;/div&gt;'</a:t>
+            </a:r>
+            <a:r>
+              <a:rPr>
+                <a:solidFill>
+                  <a:srgbClr val="003B4F"/>
+                </a:solidFill>
+                <a:latin typeface="Consolas"/>
+              </a:rPr>
+              <a:t>))</a:t>
+            </a:r>
+          </a:p>
+        </p:txBody>
+      </p:sp>
+    </p:spTree>
+  </p:cSld>
+</p:sld>
+</file>
+
+<file path=ppt/slides/slide21.xml><?xml version="1.0" encoding="utf-8"?>
 <p:sld xmlns:a="http://schemas.openxmlformats.org/drawingml/2006/main" xmlns:r="http://schemas.openxmlformats.org/officeDocument/2006/relationships" xmlns:p="http://schemas.openxmlformats.org/presentationml/2006/main">
   <p:cSld>
     <p:spTree>
@@ -7773,7 +7847,7 @@
 </p:sld>
 </file>
 
-<file path=ppt/slides/slide21.xml><?xml version="1.0" encoding="utf-8"?>
+<file path=ppt/slides/slide22.xml><?xml version="1.0" encoding="utf-8"?>
 <p:sld xmlns:a="http://schemas.openxmlformats.org/drawingml/2006/main" xmlns:r="http://schemas.openxmlformats.org/officeDocument/2006/relationships" xmlns:p="http://schemas.openxmlformats.org/presentationml/2006/main">
   <p:cSld>
     <p:spTree>
@@ -7880,7 +7954,7 @@
 </p:sld>
 </file>
 
-<file path=ppt/slides/slide22.xml><?xml version="1.0" encoding="utf-8"?>
+<file path=ppt/slides/slide23.xml><?xml version="1.0" encoding="utf-8"?>
 <p:sld xmlns:a="http://schemas.openxmlformats.org/drawingml/2006/main" xmlns:r="http://schemas.openxmlformats.org/officeDocument/2006/relationships" xmlns:p="http://schemas.openxmlformats.org/presentationml/2006/main">
   <p:cSld>
     <p:spTree>
@@ -7987,7 +8061,7 @@
 </p:sld>
 </file>
 
-<file path=ppt/slides/slide23.xml><?xml version="1.0" encoding="utf-8"?>
+<file path=ppt/slides/slide24.xml><?xml version="1.0" encoding="utf-8"?>
 <p:sld xmlns:a="http://schemas.openxmlformats.org/drawingml/2006/main" xmlns:r="http://schemas.openxmlformats.org/officeDocument/2006/relationships" xmlns:p="http://schemas.openxmlformats.org/presentationml/2006/main">
   <p:cSld>
     <p:spTree>
@@ -8094,7 +8168,7 @@
 </p:sld>
 </file>
 
-<file path=ppt/slides/slide24.xml><?xml version="1.0" encoding="utf-8"?>
+<file path=ppt/slides/slide25.xml><?xml version="1.0" encoding="utf-8"?>
 <p:sld xmlns:a="http://schemas.openxmlformats.org/drawingml/2006/main" xmlns:r="http://schemas.openxmlformats.org/officeDocument/2006/relationships" xmlns:p="http://schemas.openxmlformats.org/presentationml/2006/main">
   <p:cSld>
     <p:spTree>
@@ -8201,7 +8275,7 @@
 </p:sld>
 </file>
 
-<file path=ppt/slides/slide25.xml><?xml version="1.0" encoding="utf-8"?>
+<file path=ppt/slides/slide26.xml><?xml version="1.0" encoding="utf-8"?>
 <p:sld xmlns:a="http://schemas.openxmlformats.org/drawingml/2006/main" xmlns:r="http://schemas.openxmlformats.org/officeDocument/2006/relationships" xmlns:p="http://schemas.openxmlformats.org/presentationml/2006/main">
   <p:cSld>
     <p:spTree>
@@ -8308,58 +8382,6 @@
 </p:sld>
 </file>
 
-<file path=ppt/slides/slide26.xml><?xml version="1.0" encoding="utf-8"?>
-<p:sld xmlns:a="http://schemas.openxmlformats.org/drawingml/2006/main" xmlns:r="http://schemas.openxmlformats.org/officeDocument/2006/relationships" xmlns:p="http://schemas.openxmlformats.org/presentationml/2006/main">
-  <p:cSld>
-    <p:spTree>
-      <p:nvGrpSpPr>
-        <p:cNvPr id="1" name=""/>
-        <p:cNvGrpSpPr/>
-        <p:nvPr/>
-      </p:nvGrpSpPr>
-      <p:grpSpPr>
-        <a:xfrm>
-          <a:off x="0" y="0"/>
-          <a:ext cx="0" cy="0"/>
-          <a:chOff x="0" y="0"/>
-          <a:chExt cx="0" cy="0"/>
-        </a:xfrm>
-      </p:grpSpPr>
-      <p:sp>
-        <p:nvSpPr>
-          <p:cNvPr id="2" name="Title 1"/>
-          <p:cNvSpPr>
-            <a:spLocks noGrp="1"/>
-          </p:cNvSpPr>
-          <p:nvPr>
-            <p:ph type="title"/>
-          </p:nvPr>
-        </p:nvSpPr>
-        <p:spPr>
-          <a:xfrm>
-            <a:off x="722313" y="3305176"/>
-            <a:ext cx="7772400" cy="1021556"/>
-          </a:xfrm>
-        </p:spPr>
-        <p:txBody>
-          <a:bodyPr/>
-          <a:lstStyle/>
-          <a:p>
-            <a:pPr lvl="0" indent="0" marL="0">
-              <a:buNone/>
-            </a:pPr>
-            <a:r>
-              <a:rPr/>
-              <a:t>Generating a website</a:t>
-            </a:r>
-          </a:p>
-        </p:txBody>
-      </p:sp>
-    </p:spTree>
-  </p:cSld>
-</p:sld>
-</file>
-
 <file path=ppt/slides/slide27.xml><?xml version="1.0" encoding="utf-8"?>
 <p:sld xmlns:a="http://schemas.openxmlformats.org/drawingml/2006/main" xmlns:r="http://schemas.openxmlformats.org/officeDocument/2006/relationships" xmlns:p="http://schemas.openxmlformats.org/presentationml/2006/main">
   <p:cSld>
@@ -8387,7 +8409,12 @@
             <p:ph type="title"/>
           </p:nvPr>
         </p:nvSpPr>
-        <p:spPr/>
+        <p:spPr>
+          <a:xfrm>
+            <a:off x="722313" y="3305176"/>
+            <a:ext cx="7772400" cy="1021556"/>
+          </a:xfrm>
+        </p:spPr>
         <p:txBody>
           <a:bodyPr/>
           <a:lstStyle/>
@@ -8397,273 +8424,7 @@
             </a:pPr>
             <a:r>
               <a:rPr/>
-              <a:t>What I could get by just changing the format in YAML</a:t>
-            </a:r>
-          </a:p>
-        </p:txBody>
-      </p:sp>
-      <p:sp>
-        <p:nvSpPr>
-          <p:cNvPr id="3" name="Content Placeholder 2"/>
-          <p:cNvSpPr>
-            <a:spLocks noGrp="1"/>
-          </p:cNvSpPr>
-          <p:nvPr>
-            <p:ph idx="1"/>
-          </p:nvPr>
-        </p:nvSpPr>
-        <p:spPr/>
-        <p:txBody>
-          <a:bodyPr/>
-          <a:lstStyle/>
-          <a:p>
-            <a:pPr lvl="0" indent="0">
-              <a:buNone/>
-            </a:pPr>
-            <a:r>
-              <a:rPr>
-                <a:solidFill>
-                  <a:srgbClr val="AD0000"/>
-                </a:solidFill>
-                <a:latin typeface="Consolas"/>
-              </a:rPr>
-              <a:t>---</a:t>
-            </a:r>
-            <a:br/>
-            <a:r>
-              <a:rPr>
-                <a:solidFill>
-                  <a:srgbClr val="4758AB"/>
-                </a:solidFill>
-                <a:latin typeface="Consolas"/>
-              </a:rPr>
-              <a:t>title</a:t>
-            </a:r>
-            <a:r>
-              <a:rPr>
-                <a:solidFill>
-                  <a:srgbClr val="003B4F"/>
-                </a:solidFill>
-                <a:latin typeface="Consolas"/>
-              </a:rPr>
-              <a:t>:</a:t>
-            </a:r>
-            <a:r>
-              <a:rPr>
-                <a:solidFill>
-                  <a:srgbClr val="657422"/>
-                </a:solidFill>
-                <a:latin typeface="Consolas"/>
-              </a:rPr>
-              <a:t> </a:t>
-            </a:r>
-            <a:r>
-              <a:rPr>
-                <a:solidFill>
-                  <a:srgbClr val="20794D"/>
-                </a:solidFill>
-                <a:latin typeface="Consolas"/>
-              </a:rPr>
-              <a:t>"Using Quarto for everything"</a:t>
-            </a:r>
-            <a:br/>
-            <a:r>
-              <a:rPr>
-                <a:solidFill>
-                  <a:srgbClr val="4758AB"/>
-                </a:solidFill>
-                <a:latin typeface="Consolas"/>
-              </a:rPr>
-              <a:t>format</a:t>
-            </a:r>
-            <a:r>
-              <a:rPr>
-                <a:solidFill>
-                  <a:srgbClr val="003B4F"/>
-                </a:solidFill>
-                <a:latin typeface="Consolas"/>
-              </a:rPr>
-              <a:t>:</a:t>
-            </a:r>
-            <a:r>
-              <a:rPr>
-                <a:solidFill>
-                  <a:srgbClr val="657422"/>
-                </a:solidFill>
-                <a:latin typeface="Consolas"/>
-              </a:rPr>
-              <a:t> html</a:t>
-            </a:r>
-            <a:br/>
-            <a:r>
-              <a:rPr>
-                <a:solidFill>
-                  <a:srgbClr val="5E5E5E"/>
-                </a:solidFill>
-                <a:latin typeface="Consolas"/>
-              </a:rPr>
-              <a:t>    # revealjs:</a:t>
-            </a:r>
-            <a:br/>
-            <a:r>
-              <a:rPr>
-                <a:solidFill>
-                  <a:srgbClr val="5E5E5E"/>
-                </a:solidFill>
-                <a:latin typeface="Consolas"/>
-              </a:rPr>
-              <a:t>    #     incremental: false</a:t>
-            </a:r>
-            <a:br/>
-            <a:r>
-              <a:rPr>
-                <a:solidFill>
-                  <a:srgbClr val="5E5E5E"/>
-                </a:solidFill>
-                <a:latin typeface="Consolas"/>
-              </a:rPr>
-              <a:t>    #     theme: [simple, revealjs-customizations.scss]</a:t>
-            </a:r>
-            <a:br/>
-            <a:r>
-              <a:rPr>
-                <a:solidFill>
-                  <a:srgbClr val="5E5E5E"/>
-                </a:solidFill>
-                <a:latin typeface="Consolas"/>
-              </a:rPr>
-              <a:t>    #     title-slide-attributes:</a:t>
-            </a:r>
-            <a:br/>
-            <a:r>
-              <a:rPr>
-                <a:solidFill>
-                  <a:srgbClr val="5E5E5E"/>
-                </a:solidFill>
-                <a:latin typeface="Consolas"/>
-              </a:rPr>
-              <a:t>    #         data-background-image: images/data-viz-bg.jpg</a:t>
-            </a:r>
-            <a:br/>
-            <a:r>
-              <a:rPr>
-                <a:solidFill>
-                  <a:srgbClr val="5E5E5E"/>
-                </a:solidFill>
-                <a:latin typeface="Consolas"/>
-              </a:rPr>
-              <a:t>    #         data-background-size: contain</a:t>
-            </a:r>
-            <a:br/>
-            <a:r>
-              <a:rPr>
-                <a:solidFill>
-                  <a:srgbClr val="5E5E5E"/>
-                </a:solidFill>
-                <a:latin typeface="Consolas"/>
-              </a:rPr>
-              <a:t>    #         data-background-position: right</a:t>
-            </a:r>
-            <a:br/>
-            <a:br/>
-            <a:r>
-              <a:rPr>
-                <a:solidFill>
-                  <a:srgbClr val="4758AB"/>
-                </a:solidFill>
-                <a:latin typeface="Consolas"/>
-              </a:rPr>
-              <a:t>author</a:t>
-            </a:r>
-            <a:r>
-              <a:rPr>
-                <a:solidFill>
-                  <a:srgbClr val="003B4F"/>
-                </a:solidFill>
-                <a:latin typeface="Consolas"/>
-              </a:rPr>
-              <a:t>:</a:t>
-            </a:r>
-            <a:r>
-              <a:rPr>
-                <a:solidFill>
-                  <a:srgbClr val="657422"/>
-                </a:solidFill>
-                <a:latin typeface="Consolas"/>
-              </a:rPr>
-              <a:t> Lucas A. Meyer</a:t>
-            </a:r>
-            <a:br/>
-            <a:r>
-              <a:rPr>
-                <a:solidFill>
-                  <a:srgbClr val="4758AB"/>
-                </a:solidFill>
-                <a:latin typeface="Consolas"/>
-              </a:rPr>
-              <a:t>date</a:t>
-            </a:r>
-            <a:r>
-              <a:rPr>
-                <a:solidFill>
-                  <a:srgbClr val="003B4F"/>
-                </a:solidFill>
-                <a:latin typeface="Consolas"/>
-              </a:rPr>
-              <a:t>:</a:t>
-            </a:r>
-            <a:r>
-              <a:rPr>
-                <a:solidFill>
-                  <a:srgbClr val="657422"/>
-                </a:solidFill>
-                <a:latin typeface="Consolas"/>
-              </a:rPr>
-              <a:t> 2022-07-14</a:t>
-            </a:r>
-            <a:br/>
-            <a:r>
-              <a:rPr>
-                <a:solidFill>
-                  <a:srgbClr val="AD0000"/>
-                </a:solidFill>
-                <a:latin typeface="Consolas"/>
-              </a:rPr>
-              <a:t>---</a:t>
-            </a:r>
-          </a:p>
-          <a:p>
-            <a:pPr lvl="0" indent="0" marL="0">
-              <a:buNone/>
-            </a:pPr>
-          </a:p>
-          <a:p>
-            <a:pPr lvl="0" indent="0" marL="0">
-              <a:buNone/>
-            </a:pPr>
-            <a:r>
-              <a:rPr/>
-              <a:t>Adding or changing the format to </a:t>
-            </a:r>
-            <a:r>
-              <a:rPr>
-                <a:latin typeface="Consolas"/>
-              </a:rPr>
-              <a:t>html</a:t>
-            </a:r>
-            <a:r>
-              <a:rPr/>
-              <a:t> will create a </a:t>
-            </a:r>
-            <a:r>
-              <a:rPr>
-                <a:hlinkClick r:id="rId2"/>
-              </a:rPr>
-              <a:t>website</a:t>
-            </a:r>
-            <a:r>
-              <a:rPr/>
-              <a:t>.</a:t>
+              <a:t>Generating a website</a:t>
             </a:r>
           </a:p>
         </p:txBody>
@@ -8674,6 +8435,319 @@
 </file>
 
 <file path=ppt/slides/slide28.xml><?xml version="1.0" encoding="utf-8"?>
+<p:sld xmlns:a="http://schemas.openxmlformats.org/drawingml/2006/main" xmlns:r="http://schemas.openxmlformats.org/officeDocument/2006/relationships" xmlns:p="http://schemas.openxmlformats.org/presentationml/2006/main">
+  <p:cSld>
+    <p:spTree>
+      <p:nvGrpSpPr>
+        <p:cNvPr id="1" name=""/>
+        <p:cNvGrpSpPr/>
+        <p:nvPr/>
+      </p:nvGrpSpPr>
+      <p:grpSpPr>
+        <a:xfrm>
+          <a:off x="0" y="0"/>
+          <a:ext cx="0" cy="0"/>
+          <a:chOff x="0" y="0"/>
+          <a:chExt cx="0" cy="0"/>
+        </a:xfrm>
+      </p:grpSpPr>
+      <p:sp>
+        <p:nvSpPr>
+          <p:cNvPr id="2" name="Title 1"/>
+          <p:cNvSpPr>
+            <a:spLocks noGrp="1"/>
+          </p:cNvSpPr>
+          <p:nvPr>
+            <p:ph type="title"/>
+          </p:nvPr>
+        </p:nvSpPr>
+        <p:spPr/>
+        <p:txBody>
+          <a:bodyPr/>
+          <a:lstStyle/>
+          <a:p>
+            <a:pPr lvl="0" indent="0" marL="0">
+              <a:buNone/>
+            </a:pPr>
+            <a:r>
+              <a:rPr/>
+              <a:t>What I could get by just changing the format in YAML</a:t>
+            </a:r>
+          </a:p>
+        </p:txBody>
+      </p:sp>
+      <p:sp>
+        <p:nvSpPr>
+          <p:cNvPr id="3" name="Content Placeholder 2"/>
+          <p:cNvSpPr>
+            <a:spLocks noGrp="1"/>
+          </p:cNvSpPr>
+          <p:nvPr>
+            <p:ph idx="1"/>
+          </p:nvPr>
+        </p:nvSpPr>
+        <p:spPr/>
+        <p:txBody>
+          <a:bodyPr/>
+          <a:lstStyle/>
+          <a:p>
+            <a:pPr lvl="0" indent="0">
+              <a:buNone/>
+            </a:pPr>
+            <a:r>
+              <a:rPr>
+                <a:solidFill>
+                  <a:srgbClr val="AD0000"/>
+                </a:solidFill>
+                <a:latin typeface="Consolas"/>
+              </a:rPr>
+              <a:t>---</a:t>
+            </a:r>
+            <a:br/>
+            <a:r>
+              <a:rPr>
+                <a:solidFill>
+                  <a:srgbClr val="4758AB"/>
+                </a:solidFill>
+                <a:latin typeface="Consolas"/>
+              </a:rPr>
+              <a:t>title</a:t>
+            </a:r>
+            <a:r>
+              <a:rPr>
+                <a:solidFill>
+                  <a:srgbClr val="003B4F"/>
+                </a:solidFill>
+                <a:latin typeface="Consolas"/>
+              </a:rPr>
+              <a:t>:</a:t>
+            </a:r>
+            <a:r>
+              <a:rPr>
+                <a:solidFill>
+                  <a:srgbClr val="657422"/>
+                </a:solidFill>
+                <a:latin typeface="Consolas"/>
+              </a:rPr>
+              <a:t> </a:t>
+            </a:r>
+            <a:r>
+              <a:rPr>
+                <a:solidFill>
+                  <a:srgbClr val="20794D"/>
+                </a:solidFill>
+                <a:latin typeface="Consolas"/>
+              </a:rPr>
+              <a:t>"Using Quarto for everything"</a:t>
+            </a:r>
+            <a:br/>
+            <a:r>
+              <a:rPr>
+                <a:solidFill>
+                  <a:srgbClr val="4758AB"/>
+                </a:solidFill>
+                <a:latin typeface="Consolas"/>
+              </a:rPr>
+              <a:t>format</a:t>
+            </a:r>
+            <a:r>
+              <a:rPr>
+                <a:solidFill>
+                  <a:srgbClr val="003B4F"/>
+                </a:solidFill>
+                <a:latin typeface="Consolas"/>
+              </a:rPr>
+              <a:t>:</a:t>
+            </a:r>
+            <a:r>
+              <a:rPr>
+                <a:solidFill>
+                  <a:srgbClr val="657422"/>
+                </a:solidFill>
+                <a:latin typeface="Consolas"/>
+              </a:rPr>
+              <a:t> html</a:t>
+            </a:r>
+            <a:br/>
+            <a:r>
+              <a:rPr>
+                <a:solidFill>
+                  <a:srgbClr val="5E5E5E"/>
+                </a:solidFill>
+                <a:latin typeface="Consolas"/>
+              </a:rPr>
+              <a:t>    # revealjs:</a:t>
+            </a:r>
+            <a:br/>
+            <a:r>
+              <a:rPr>
+                <a:solidFill>
+                  <a:srgbClr val="5E5E5E"/>
+                </a:solidFill>
+                <a:latin typeface="Consolas"/>
+              </a:rPr>
+              <a:t>    #     incremental: false</a:t>
+            </a:r>
+            <a:br/>
+            <a:r>
+              <a:rPr>
+                <a:solidFill>
+                  <a:srgbClr val="5E5E5E"/>
+                </a:solidFill>
+                <a:latin typeface="Consolas"/>
+              </a:rPr>
+              <a:t>    #     theme: [simple, revealjs-customizations.scss]</a:t>
+            </a:r>
+            <a:br/>
+            <a:r>
+              <a:rPr>
+                <a:solidFill>
+                  <a:srgbClr val="5E5E5E"/>
+                </a:solidFill>
+                <a:latin typeface="Consolas"/>
+              </a:rPr>
+              <a:t>    #     title-slide-attributes:</a:t>
+            </a:r>
+            <a:br/>
+            <a:r>
+              <a:rPr>
+                <a:solidFill>
+                  <a:srgbClr val="5E5E5E"/>
+                </a:solidFill>
+                <a:latin typeface="Consolas"/>
+              </a:rPr>
+              <a:t>    #         data-background-image: images/data-viz-bg.jpg</a:t>
+            </a:r>
+            <a:br/>
+            <a:r>
+              <a:rPr>
+                <a:solidFill>
+                  <a:srgbClr val="5E5E5E"/>
+                </a:solidFill>
+                <a:latin typeface="Consolas"/>
+              </a:rPr>
+              <a:t>    #         data-background-size: contain</a:t>
+            </a:r>
+            <a:br/>
+            <a:r>
+              <a:rPr>
+                <a:solidFill>
+                  <a:srgbClr val="5E5E5E"/>
+                </a:solidFill>
+                <a:latin typeface="Consolas"/>
+              </a:rPr>
+              <a:t>    #         data-background-position: right</a:t>
+            </a:r>
+            <a:br/>
+            <a:br/>
+            <a:r>
+              <a:rPr>
+                <a:solidFill>
+                  <a:srgbClr val="4758AB"/>
+                </a:solidFill>
+                <a:latin typeface="Consolas"/>
+              </a:rPr>
+              <a:t>author</a:t>
+            </a:r>
+            <a:r>
+              <a:rPr>
+                <a:solidFill>
+                  <a:srgbClr val="003B4F"/>
+                </a:solidFill>
+                <a:latin typeface="Consolas"/>
+              </a:rPr>
+              <a:t>:</a:t>
+            </a:r>
+            <a:r>
+              <a:rPr>
+                <a:solidFill>
+                  <a:srgbClr val="657422"/>
+                </a:solidFill>
+                <a:latin typeface="Consolas"/>
+              </a:rPr>
+              <a:t> Lucas A. Meyer</a:t>
+            </a:r>
+            <a:br/>
+            <a:r>
+              <a:rPr>
+                <a:solidFill>
+                  <a:srgbClr val="4758AB"/>
+                </a:solidFill>
+                <a:latin typeface="Consolas"/>
+              </a:rPr>
+              <a:t>date</a:t>
+            </a:r>
+            <a:r>
+              <a:rPr>
+                <a:solidFill>
+                  <a:srgbClr val="003B4F"/>
+                </a:solidFill>
+                <a:latin typeface="Consolas"/>
+              </a:rPr>
+              <a:t>:</a:t>
+            </a:r>
+            <a:r>
+              <a:rPr>
+                <a:solidFill>
+                  <a:srgbClr val="657422"/>
+                </a:solidFill>
+                <a:latin typeface="Consolas"/>
+              </a:rPr>
+              <a:t> 2022-07-14</a:t>
+            </a:r>
+            <a:br/>
+            <a:r>
+              <a:rPr>
+                <a:solidFill>
+                  <a:srgbClr val="AD0000"/>
+                </a:solidFill>
+                <a:latin typeface="Consolas"/>
+              </a:rPr>
+              <a:t>---</a:t>
+            </a:r>
+          </a:p>
+          <a:p>
+            <a:pPr lvl="0" indent="0" marL="0">
+              <a:buNone/>
+            </a:pPr>
+          </a:p>
+          <a:p>
+            <a:pPr lvl="0" indent="0" marL="0">
+              <a:buNone/>
+            </a:pPr>
+            <a:r>
+              <a:rPr/>
+              <a:t>Adding or changing the format to </a:t>
+            </a:r>
+            <a:r>
+              <a:rPr>
+                <a:latin typeface="Consolas"/>
+              </a:rPr>
+              <a:t>html</a:t>
+            </a:r>
+            <a:r>
+              <a:rPr/>
+              <a:t> will create a </a:t>
+            </a:r>
+            <a:r>
+              <a:rPr>
+                <a:hlinkClick r:id="rId2"/>
+              </a:rPr>
+              <a:t>website</a:t>
+            </a:r>
+            <a:r>
+              <a:rPr/>
+              <a:t>.</a:t>
+            </a:r>
+          </a:p>
+        </p:txBody>
+      </p:sp>
+    </p:spTree>
+  </p:cSld>
+</p:sld>
+</file>
+
+<file path=ppt/slides/slide29.xml><?xml version="1.0" encoding="utf-8"?>
 <p:sld xmlns:a="http://schemas.openxmlformats.org/drawingml/2006/main" xmlns:r="http://schemas.openxmlformats.org/officeDocument/2006/relationships" xmlns:p="http://schemas.openxmlformats.org/presentationml/2006/main">
   <p:cSld>
     <p:spTree>
@@ -8750,58 +8824,6 @@
 </p:sld>
 </file>
 
-<file path=ppt/slides/slide29.xml><?xml version="1.0" encoding="utf-8"?>
-<p:sld xmlns:a="http://schemas.openxmlformats.org/drawingml/2006/main" xmlns:r="http://schemas.openxmlformats.org/officeDocument/2006/relationships" xmlns:p="http://schemas.openxmlformats.org/presentationml/2006/main">
-  <p:cSld>
-    <p:spTree>
-      <p:nvGrpSpPr>
-        <p:cNvPr id="1" name=""/>
-        <p:cNvGrpSpPr/>
-        <p:nvPr/>
-      </p:nvGrpSpPr>
-      <p:grpSpPr>
-        <a:xfrm>
-          <a:off x="0" y="0"/>
-          <a:ext cx="0" cy="0"/>
-          <a:chOff x="0" y="0"/>
-          <a:chExt cx="0" cy="0"/>
-        </a:xfrm>
-      </p:grpSpPr>
-      <p:sp>
-        <p:nvSpPr>
-          <p:cNvPr id="2" name="Title 1"/>
-          <p:cNvSpPr>
-            <a:spLocks noGrp="1"/>
-          </p:cNvSpPr>
-          <p:nvPr>
-            <p:ph type="title"/>
-          </p:nvPr>
-        </p:nvSpPr>
-        <p:spPr>
-          <a:xfrm>
-            <a:off x="722313" y="3305176"/>
-            <a:ext cx="7772400" cy="1021556"/>
-          </a:xfrm>
-        </p:spPr>
-        <p:txBody>
-          <a:bodyPr/>
-          <a:lstStyle/>
-          <a:p>
-            <a:pPr lvl="0" indent="0" marL="0">
-              <a:buNone/>
-            </a:pPr>
-            <a:r>
-              <a:rPr/>
-              <a:t>Scholarly articles</a:t>
-            </a:r>
-          </a:p>
-        </p:txBody>
-      </p:sp>
-    </p:spTree>
-  </p:cSld>
-</p:sld>
-</file>
-
 <file path=ppt/slides/slide3.xml><?xml version="1.0" encoding="utf-8"?>
 <p:sld xmlns:a="http://schemas.openxmlformats.org/drawingml/2006/main" xmlns:r="http://schemas.openxmlformats.org/officeDocument/2006/relationships" xmlns:p="http://schemas.openxmlformats.org/presentationml/2006/main">
   <p:cSld>
@@ -8864,7 +8886,7 @@
             </a:pPr>
             <a:r>
               <a:rPr/>
-              <a:t>The value of content stuck in my computer is near zero. Putting content out in the world increases its value substantially.</a:t>
+              <a:t>Content stuck in my computer is nearly worthless.</a:t>
             </a:r>
           </a:p>
           <a:p>
@@ -9033,7 +9055,12 @@
             <p:ph type="title"/>
           </p:nvPr>
         </p:nvSpPr>
-        <p:spPr/>
+        <p:spPr>
+          <a:xfrm>
+            <a:off x="722313" y="3305176"/>
+            <a:ext cx="7772400" cy="1021556"/>
+          </a:xfrm>
+        </p:spPr>
         <p:txBody>
           <a:bodyPr/>
           <a:lstStyle/>
@@ -9043,68 +9070,7 @@
             </a:pPr>
             <a:r>
               <a:rPr/>
-              <a:t>Generating a scholarly article</a:t>
-            </a:r>
-          </a:p>
-        </p:txBody>
-      </p:sp>
-      <p:sp>
-        <p:nvSpPr>
-          <p:cNvPr id="3" name="Content Placeholder 2"/>
-          <p:cNvSpPr>
-            <a:spLocks noGrp="1"/>
-          </p:cNvSpPr>
-          <p:nvPr>
-            <p:ph idx="1"/>
-          </p:nvPr>
-        </p:nvSpPr>
-        <p:spPr/>
-        <p:txBody>
-          <a:bodyPr/>
-          <a:lstStyle/>
-          <a:p>
-            <a:pPr lvl="0" indent="0" marL="0">
-              <a:buNone/>
-            </a:pPr>
-            <a:r>
-              <a:rPr/>
-              <a:t>I reused some of the content of this presentation to create two scholarly-looking articles. The purpose of the articles is just to show how easy it is to generate them with Quarto, they don’t contain original research.</a:t>
-            </a:r>
-          </a:p>
-          <a:p>
-            <a:pPr lvl="0" indent="0" marL="0">
-              <a:buNone/>
-            </a:pPr>
-            <a:r>
-              <a:rPr/>
-              <a:t>The relevant files are:</a:t>
-            </a:r>
-          </a:p>
-          <a:p>
-            <a:pPr lvl="0"/>
-            <a:r>
-              <a:rPr>
-                <a:hlinkClick r:id="rId2"/>
-              </a:rPr>
-              <a:t>Quarto source file</a:t>
-            </a:r>
-          </a:p>
-          <a:p>
-            <a:pPr lvl="0"/>
-            <a:r>
-              <a:rPr>
-                <a:hlinkClick r:id="rId3"/>
-              </a:rPr>
-              <a:t>Microsoft Word output</a:t>
-            </a:r>
-          </a:p>
-          <a:p>
-            <a:pPr lvl="0"/>
-            <a:r>
-              <a:rPr>
-                <a:hlinkClick r:id="rId4"/>
-              </a:rPr>
-              <a:t>LaTeX PDF output</a:t>
+              <a:t>Scholarly articles</a:t>
             </a:r>
           </a:p>
         </p:txBody>
@@ -9115,6 +9081,114 @@
 </file>
 
 <file path=ppt/slides/slide31.xml><?xml version="1.0" encoding="utf-8"?>
+<p:sld xmlns:a="http://schemas.openxmlformats.org/drawingml/2006/main" xmlns:r="http://schemas.openxmlformats.org/officeDocument/2006/relationships" xmlns:p="http://schemas.openxmlformats.org/presentationml/2006/main">
+  <p:cSld>
+    <p:spTree>
+      <p:nvGrpSpPr>
+        <p:cNvPr id="1" name=""/>
+        <p:cNvGrpSpPr/>
+        <p:nvPr/>
+      </p:nvGrpSpPr>
+      <p:grpSpPr>
+        <a:xfrm>
+          <a:off x="0" y="0"/>
+          <a:ext cx="0" cy="0"/>
+          <a:chOff x="0" y="0"/>
+          <a:chExt cx="0" cy="0"/>
+        </a:xfrm>
+      </p:grpSpPr>
+      <p:sp>
+        <p:nvSpPr>
+          <p:cNvPr id="2" name="Title 1"/>
+          <p:cNvSpPr>
+            <a:spLocks noGrp="1"/>
+          </p:cNvSpPr>
+          <p:nvPr>
+            <p:ph type="title"/>
+          </p:nvPr>
+        </p:nvSpPr>
+        <p:spPr/>
+        <p:txBody>
+          <a:bodyPr/>
+          <a:lstStyle/>
+          <a:p>
+            <a:pPr lvl="0" indent="0" marL="0">
+              <a:buNone/>
+            </a:pPr>
+            <a:r>
+              <a:rPr/>
+              <a:t>Generating a scholarly article</a:t>
+            </a:r>
+          </a:p>
+        </p:txBody>
+      </p:sp>
+      <p:sp>
+        <p:nvSpPr>
+          <p:cNvPr id="3" name="Content Placeholder 2"/>
+          <p:cNvSpPr>
+            <a:spLocks noGrp="1"/>
+          </p:cNvSpPr>
+          <p:nvPr>
+            <p:ph idx="1"/>
+          </p:nvPr>
+        </p:nvSpPr>
+        <p:spPr/>
+        <p:txBody>
+          <a:bodyPr/>
+          <a:lstStyle/>
+          <a:p>
+            <a:pPr lvl="0" indent="0" marL="0">
+              <a:buNone/>
+            </a:pPr>
+            <a:r>
+              <a:rPr/>
+              <a:t>I reused some of the content of this presentation to create two scholarly-looking articles. The purpose of the articles is just to show how easy it is to generate them with Quarto, they don’t contain original research.</a:t>
+            </a:r>
+          </a:p>
+          <a:p>
+            <a:pPr lvl="0" indent="0" marL="0">
+              <a:buNone/>
+            </a:pPr>
+            <a:r>
+              <a:rPr/>
+              <a:t>The relevant files are:</a:t>
+            </a:r>
+          </a:p>
+          <a:p>
+            <a:pPr lvl="0"/>
+            <a:r>
+              <a:rPr>
+                <a:hlinkClick r:id="rId2"/>
+              </a:rPr>
+              <a:t>Quarto source file</a:t>
+            </a:r>
+          </a:p>
+          <a:p>
+            <a:pPr lvl="0"/>
+            <a:r>
+              <a:rPr>
+                <a:hlinkClick r:id="rId3"/>
+              </a:rPr>
+              <a:t>Microsoft Word output</a:t>
+            </a:r>
+          </a:p>
+          <a:p>
+            <a:pPr lvl="0"/>
+            <a:r>
+              <a:rPr>
+                <a:hlinkClick r:id="rId4"/>
+              </a:rPr>
+              <a:t>LaTeX PDF output</a:t>
+            </a:r>
+          </a:p>
+        </p:txBody>
+      </p:sp>
+    </p:spTree>
+  </p:cSld>
+</p:sld>
+</file>
+
+<file path=ppt/slides/slide32.xml><?xml version="1.0" encoding="utf-8"?>
 <p:sld xmlns:a="http://schemas.openxmlformats.org/drawingml/2006/main" xmlns:r="http://schemas.openxmlformats.org/officeDocument/2006/relationships" xmlns:p="http://schemas.openxmlformats.org/presentationml/2006/main">
   <p:cSld>
     <p:spTree>
@@ -9281,147 +9355,6 @@
 </p:sld>
 </file>
 
-<file path=ppt/slides/slide32.xml><?xml version="1.0" encoding="utf-8"?>
-<p:sld xmlns:a="http://schemas.openxmlformats.org/drawingml/2006/main" xmlns:r="http://schemas.openxmlformats.org/officeDocument/2006/relationships" xmlns:p="http://schemas.openxmlformats.org/presentationml/2006/main">
-  <p:cSld>
-    <p:spTree>
-      <p:nvGrpSpPr>
-        <p:cNvPr id="1" name=""/>
-        <p:cNvGrpSpPr/>
-        <p:nvPr/>
-      </p:nvGrpSpPr>
-      <p:grpSpPr>
-        <a:xfrm>
-          <a:off x="0" y="0"/>
-          <a:ext cx="0" cy="0"/>
-          <a:chOff x="0" y="0"/>
-          <a:chExt cx="0" cy="0"/>
-        </a:xfrm>
-      </p:grpSpPr>
-      <p:sp>
-        <p:nvSpPr>
-          <p:cNvPr id="2" name="Title 1"/>
-          <p:cNvSpPr>
-            <a:spLocks noGrp="1"/>
-          </p:cNvSpPr>
-          <p:nvPr>
-            <p:ph type="title"/>
-          </p:nvPr>
-        </p:nvSpPr>
-        <p:spPr/>
-        <p:txBody>
-          <a:bodyPr/>
-          <a:lstStyle/>
-          <a:p>
-            <a:pPr lvl="0" indent="0" marL="0">
-              <a:buNone/>
-            </a:pPr>
-            <a:r>
-              <a:rPr/>
-              <a:t>Citations and Footnotes</a:t>
-            </a:r>
-          </a:p>
-        </p:txBody>
-      </p:sp>
-      <p:sp>
-        <p:nvSpPr>
-          <p:cNvPr id="3" name="Content Placeholder 2"/>
-          <p:cNvSpPr>
-            <a:spLocks noGrp="1"/>
-          </p:cNvSpPr>
-          <p:nvPr>
-            <p:ph idx="1"/>
-          </p:nvPr>
-        </p:nvSpPr>
-        <p:spPr/>
-        <p:txBody>
-          <a:bodyPr/>
-          <a:lstStyle/>
-          <a:p>
-            <a:pPr lvl="0" indent="0" marL="0">
-              <a:buNone/>
-            </a:pPr>
-            <a:r>
-              <a:rPr/>
-              <a:t>It’s very easy to use citations in Quarto. All you need is a BibTex file with your citations, for example, </a:t>
-            </a:r>
-            <a:r>
-              <a:rPr>
-                <a:latin typeface="Consolas"/>
-              </a:rPr>
-              <a:t>bibliography.bib</a:t>
-            </a:r>
-            <a:r>
-              <a:rPr/>
-              <a:t>, and to add </a:t>
-            </a:r>
-            <a:r>
-              <a:rPr>
-                <a:latin typeface="Consolas"/>
-              </a:rPr>
-              <a:t>bibliography: references.bib</a:t>
-            </a:r>
-            <a:r>
-              <a:rPr/>
-              <a:t> to the YAML front-matter of your document. You can then refer to the bibliography by simply adding the appropriate </a:t>
-            </a:r>
-            <a:r>
-              <a:rPr>
-                <a:latin typeface="Consolas"/>
-              </a:rPr>
-              <a:t>[@citation-name]</a:t>
-            </a:r>
-            <a:r>
-              <a:rPr/>
-              <a:t> in your text.</a:t>
-            </a:r>
-          </a:p>
-          <a:p>
-            <a:pPr lvl="0" indent="0" marL="0">
-              <a:buNone/>
-            </a:pPr>
-            <a:r>
-              <a:rPr/>
-              <a:t>Generating footnotes is also easy, using </a:t>
-            </a:r>
-            <a:r>
-              <a:rPr>
-                <a:latin typeface="Consolas"/>
-              </a:rPr>
-              <a:t>[^ref]</a:t>
-            </a:r>
-            <a:r>
-              <a:rPr/>
-              <a:t> links to a footnote, and </a:t>
-            </a:r>
-            <a:r>
-              <a:rPr>
-                <a:latin typeface="Consolas"/>
-              </a:rPr>
-              <a:t>[^ref: content of the footnote]</a:t>
-            </a:r>
-            <a:r>
-              <a:rPr/>
-              <a:t> generates its content</a:t>
-            </a:r>
-            <a:r>
-              <a:rPr baseline="30000">
-                <a:hlinkClick r:id="rId2" action="ppaction://hlinksldjump"/>
-              </a:rPr>
-              <a:t>1</a:t>
-            </a:r>
-            <a:r>
-              <a:rPr/>
-              <a:t>.</a:t>
-            </a:r>
-          </a:p>
-        </p:txBody>
-      </p:sp>
-    </p:spTree>
-  </p:cSld>
-</p:sld>
-</file>
-
 <file path=ppt/slides/slide33.xml><?xml version="1.0" encoding="utf-8"?>
 <p:sld xmlns:a="http://schemas.openxmlformats.org/drawingml/2006/main" xmlns:r="http://schemas.openxmlformats.org/officeDocument/2006/relationships" xmlns:p="http://schemas.openxmlformats.org/presentationml/2006/main">
   <p:cSld>
@@ -9449,12 +9382,7 @@
             <p:ph type="title"/>
           </p:nvPr>
         </p:nvSpPr>
-        <p:spPr>
-          <a:xfrm>
-            <a:off x="722313" y="3305176"/>
-            <a:ext cx="7772400" cy="1021556"/>
-          </a:xfrm>
-        </p:spPr>
+        <p:spPr/>
         <p:txBody>
           <a:bodyPr/>
           <a:lstStyle/>
@@ -9464,7 +9392,101 @@
             </a:pPr>
             <a:r>
               <a:rPr/>
-              <a:t>When is Quarto worthwhile</a:t>
+              <a:t>Citations and Footnotes</a:t>
+            </a:r>
+          </a:p>
+        </p:txBody>
+      </p:sp>
+      <p:sp>
+        <p:nvSpPr>
+          <p:cNvPr id="3" name="Content Placeholder 2"/>
+          <p:cNvSpPr>
+            <a:spLocks noGrp="1"/>
+          </p:cNvSpPr>
+          <p:nvPr>
+            <p:ph idx="1"/>
+          </p:nvPr>
+        </p:nvSpPr>
+        <p:spPr/>
+        <p:txBody>
+          <a:bodyPr/>
+          <a:lstStyle/>
+          <a:p>
+            <a:pPr lvl="0" indent="0" marL="0">
+              <a:buNone/>
+            </a:pPr>
+            <a:r>
+              <a:rPr/>
+              <a:t>It’s very easy to use citations in Quarto. All you need is a BibTex file with your citations, for example, </a:t>
+            </a:r>
+            <a:r>
+              <a:rPr>
+                <a:latin typeface="Consolas"/>
+              </a:rPr>
+              <a:t>bibliography.bib</a:t>
+            </a:r>
+            <a:r>
+              <a:rPr/>
+              <a:t>, and to add </a:t>
+            </a:r>
+            <a:r>
+              <a:rPr>
+                <a:latin typeface="Consolas"/>
+              </a:rPr>
+              <a:t>bibliography: references.bib</a:t>
+            </a:r>
+            <a:r>
+              <a:rPr/>
+              <a:t> to the YAML front-matter of your document. You can then refer to the bibliography by simply adding the appropriate </a:t>
+            </a:r>
+            <a:r>
+              <a:rPr>
+                <a:latin typeface="Consolas"/>
+              </a:rPr>
+              <a:t>[@citation-name]</a:t>
+            </a:r>
+            <a:r>
+              <a:rPr/>
+              <a:t> in your text.</a:t>
+            </a:r>
+          </a:p>
+          <a:p>
+            <a:pPr lvl="0" indent="0" marL="0">
+              <a:buNone/>
+            </a:pPr>
+            <a:r>
+              <a:rPr/>
+              <a:t>Generating footnotes is also easy, using </a:t>
+            </a:r>
+            <a:r>
+              <a:rPr>
+                <a:latin typeface="Consolas"/>
+              </a:rPr>
+              <a:t>[^ref]</a:t>
+            </a:r>
+            <a:r>
+              <a:rPr/>
+              <a:t> links to a footnote, and </a:t>
+            </a:r>
+            <a:r>
+              <a:rPr>
+                <a:latin typeface="Consolas"/>
+              </a:rPr>
+              <a:t>[^ref: content of the footnote]</a:t>
+            </a:r>
+            <a:r>
+              <a:rPr/>
+              <a:t> generates its content</a:t>
+            </a:r>
+            <a:r>
+              <a:rPr baseline="30000">
+                <a:hlinkClick r:id="rId2" action="ppaction://hlinksldjump"/>
+              </a:rPr>
+              <a:t>1</a:t>
+            </a:r>
+            <a:r>
+              <a:rPr/>
+              <a:t>.</a:t>
             </a:r>
           </a:p>
         </p:txBody>
@@ -9501,7 +9523,12 @@
             <p:ph type="title"/>
           </p:nvPr>
         </p:nvSpPr>
-        <p:spPr/>
+        <p:spPr>
+          <a:xfrm>
+            <a:off x="722313" y="3305176"/>
+            <a:ext cx="7772400" cy="1021556"/>
+          </a:xfrm>
+        </p:spPr>
         <p:txBody>
           <a:bodyPr/>
           <a:lstStyle/>
@@ -9511,173 +9538,7 @@
             </a:pPr>
             <a:r>
               <a:rPr/>
-              <a:t>Using Quarto Everywhere?</a:t>
-            </a:r>
-          </a:p>
-        </p:txBody>
-      </p:sp>
-      <p:sp>
-        <p:nvSpPr>
-          <p:cNvPr id="3" name="Content Placeholder 2"/>
-          <p:cNvSpPr>
-            <a:spLocks noGrp="1"/>
-          </p:cNvSpPr>
-          <p:nvPr>
-            <p:ph idx="1"/>
-          </p:nvPr>
-        </p:nvSpPr>
-        <p:spPr/>
-        <p:txBody>
-          <a:bodyPr/>
-          <a:lstStyle/>
-          <a:p>
-            <a:pPr lvl="0" indent="0" marL="0">
-              <a:buNone/>
-            </a:pPr>
-            <a:r>
-              <a:rPr/>
-              <a:t>::::{.columns} :::{.column}</a:t>
-            </a:r>
-          </a:p>
-          <a:p>
-            <a:pPr lvl="0" indent="0" marL="0">
-              <a:buNone/>
-            </a:pPr>
-            <a:r>
-              <a:rPr/>
-              <a:t>I have been using Quarto a lot lately. Here’s my current (July 2022) take on when it’s worthwile.</a:t>
-            </a:r>
-          </a:p>
-          <a:p>
-            <a:pPr lvl="0" indent="0" marL="0">
-              <a:spcBef>
-                <a:spcPts val="3000"/>
-              </a:spcBef>
-              <a:buNone/>
-            </a:pPr>
-            <a:r>
-              <a:rPr b="1"/>
-              <a:t>Blog: excellent</a:t>
-            </a:r>
-          </a:p>
-          <a:p>
-            <a:pPr lvl="0" indent="0" marL="0">
-              <a:buNone/>
-            </a:pPr>
-            <a:r>
-              <a:rPr/>
-              <a:t>I wanted to have a Python-based blog for a long time, and Quarto delivers it well. Now I can automate my blog to tweet and post to LinkedIn when I write new articles.</a:t>
-            </a:r>
-          </a:p>
-          <a:p>
-            <a:pPr lvl="0" indent="0" marL="0">
-              <a:spcBef>
-                <a:spcPts val="3000"/>
-              </a:spcBef>
-              <a:buNone/>
-            </a:pPr>
-            <a:r>
-              <a:rPr b="1"/>
-              <a:t>Python notebook: excellent</a:t>
-            </a:r>
-          </a:p>
-          <a:p>
-            <a:pPr lvl="0" indent="0" marL="0">
-              <a:buNone/>
-            </a:pPr>
-            <a:r>
-              <a:rPr/>
-              <a:t>If I would be doing something in a Python notebook, I don’t lose anything by doing it on Quarto, and the extra work is very small.</a:t>
-            </a:r>
-          </a:p>
-          <a:p>
-            <a:pPr lvl="0" indent="0" marL="0">
-              <a:buNone/>
-            </a:pPr>
-            <a:r>
-              <a:rPr/>
-              <a:t>::: :::{.column}</a:t>
-            </a:r>
-          </a:p>
-          <a:p>
-            <a:pPr lvl="0" indent="0" marL="0">
-              <a:spcBef>
-                <a:spcPts val="3000"/>
-              </a:spcBef>
-              <a:buNone/>
-            </a:pPr>
-            <a:r>
-              <a:rPr b="1"/>
-              <a:t>Writing articles: unsure</a:t>
-            </a:r>
-          </a:p>
-          <a:p>
-            <a:pPr lvl="0" indent="0" marL="0">
-              <a:buNone/>
-            </a:pPr>
-            <a:r>
-              <a:rPr/>
-              <a:t>I think Quarto is more helpful for a team that uses Git </a:t>
-            </a:r>
-            <a:r>
-              <a:rPr b="1"/>
-              <a:t>with</a:t>
-            </a:r>
-            <a:r>
-              <a:rPr/>
-              <a:t> Python notebooks or LaTeX to write articles. Microsoft Word collaboration through SharePoint and Teams is easier than Git and Quarto… but it’s not reproducible.</a:t>
-            </a:r>
-          </a:p>
-          <a:p>
-            <a:pPr lvl="0" indent="0" marL="0">
-              <a:spcBef>
-                <a:spcPts val="3000"/>
-              </a:spcBef>
-              <a:buNone/>
-            </a:pPr>
-            <a:r>
-              <a:rPr b="1"/>
-              <a:t>Presentations: probably not</a:t>
-            </a:r>
-          </a:p>
-          <a:p>
-            <a:pPr lvl="0" indent="0" marL="0">
-              <a:buNone/>
-            </a:pPr>
-            <a:r>
-              <a:rPr/>
-              <a:t>The best case for generating a presentation with Quarto are when you need to generate </a:t>
-            </a:r>
-            <a:r>
-              <a:rPr i="1"/>
-              <a:t>a lot</a:t>
-            </a:r>
-            <a:r>
-              <a:rPr/>
-              <a:t> of dynamic content. Other cases:</a:t>
-            </a:r>
-          </a:p>
-          <a:p>
-            <a:pPr lvl="0"/>
-            <a:r>
-              <a:rPr/>
-              <a:t>Reproducibility</a:t>
-            </a:r>
-          </a:p>
-          <a:p>
-            <a:pPr lvl="0"/>
-            <a:r>
-              <a:rPr/>
-              <a:t>Collaborators used to Git/Beamer</a:t>
-            </a:r>
-          </a:p>
-          <a:p>
-            <a:pPr lvl="0" indent="0" marL="0">
-              <a:buNone/>
-            </a:pPr>
-            <a:r>
-              <a:rPr/>
-              <a:t>::: ::::{.columns}</a:t>
+              <a:t>When is Quarto worthwhile</a:t>
             </a:r>
           </a:p>
         </p:txBody>
@@ -9714,6 +9575,266 @@
             <p:ph type="title"/>
           </p:nvPr>
         </p:nvSpPr>
+        <p:spPr/>
+        <p:txBody>
+          <a:bodyPr/>
+          <a:lstStyle/>
+          <a:p>
+            <a:pPr lvl="0" indent="0" marL="0">
+              <a:buNone/>
+            </a:pPr>
+            <a:r>
+              <a:rPr/>
+              <a:t>Using Quarto Everywhere?</a:t>
+            </a:r>
+          </a:p>
+        </p:txBody>
+      </p:sp>
+      <p:sp>
+        <p:nvSpPr>
+          <p:cNvPr id="3" name="Content Placeholder 2"/>
+          <p:cNvSpPr>
+            <a:spLocks noGrp="1"/>
+          </p:cNvSpPr>
+          <p:nvPr>
+            <p:ph idx="1"/>
+          </p:nvPr>
+        </p:nvSpPr>
+        <p:spPr/>
+        <p:txBody>
+          <a:bodyPr/>
+          <a:lstStyle/>
+          <a:p>
+            <a:pPr lvl="0" indent="0" marL="0">
+              <a:buNone/>
+            </a:pPr>
+            <a:r>
+              <a:rPr/>
+              <a:t>:::: {.columns} ::: {.column}</a:t>
+            </a:r>
+          </a:p>
+          <a:p>
+            <a:pPr lvl="0" indent="0" marL="0">
+              <a:buNone/>
+            </a:pPr>
+            <a:r>
+              <a:rPr/>
+              <a:t>I have been using Quarto a lot lately. Here’s my current (July 2022) take on when it’s worthwile.</a:t>
+            </a:r>
+          </a:p>
+          <a:p>
+            <a:pPr lvl="0" indent="0" marL="0">
+              <a:spcBef>
+                <a:spcPts val="3000"/>
+              </a:spcBef>
+              <a:buNone/>
+            </a:pPr>
+            <a:r>
+              <a:rPr b="1"/>
+              <a:t>Blog: excellent</a:t>
+            </a:r>
+          </a:p>
+          <a:p>
+            <a:pPr lvl="0" indent="0" marL="0">
+              <a:buNone/>
+            </a:pPr>
+            <a:r>
+              <a:rPr/>
+              <a:t>I wanted to have a Python-based blog for a long time, and Quarto delivers it well. Now I can automate my blog to tweet and post to LinkedIn when I write new articles.</a:t>
+            </a:r>
+          </a:p>
+          <a:p>
+            <a:pPr lvl="0" indent="0" marL="0">
+              <a:spcBef>
+                <a:spcPts val="3000"/>
+              </a:spcBef>
+              <a:buNone/>
+            </a:pPr>
+            <a:r>
+              <a:rPr b="1"/>
+              <a:t>Python notebook: excellent</a:t>
+            </a:r>
+          </a:p>
+          <a:p>
+            <a:pPr lvl="0" indent="0" marL="0">
+              <a:buNone/>
+            </a:pPr>
+            <a:r>
+              <a:rPr/>
+              <a:t>If I would be doing something in a Python notebook, I don’t lose anything by doing it on Quarto, and the extra work is very small.</a:t>
+            </a:r>
+          </a:p>
+          <a:p>
+            <a:pPr lvl="0" indent="0" marL="0">
+              <a:buNone/>
+            </a:pPr>
+            <a:r>
+              <a:rPr/>
+              <a:t>::: ::: {.column}</a:t>
+            </a:r>
+          </a:p>
+          <a:p>
+            <a:pPr lvl="0" indent="0" marL="0">
+              <a:spcBef>
+                <a:spcPts val="3000"/>
+              </a:spcBef>
+              <a:buNone/>
+            </a:pPr>
+            <a:r>
+              <a:rPr b="1"/>
+              <a:t>Writing articles: unsure</a:t>
+            </a:r>
+          </a:p>
+          <a:p>
+            <a:pPr lvl="0" indent="0" marL="0">
+              <a:buNone/>
+            </a:pPr>
+            <a:r>
+              <a:rPr/>
+              <a:t>I think Quarto is more helpful for a team that uses Git </a:t>
+            </a:r>
+            <a:r>
+              <a:rPr b="1"/>
+              <a:t>with</a:t>
+            </a:r>
+            <a:r>
+              <a:rPr/>
+              <a:t> Python notebooks or LaTeX to write articles. Microsoft Word collaboration through SharePoint and Teams is easier than Git and Quarto… but it’s not reproducible.</a:t>
+            </a:r>
+          </a:p>
+          <a:p>
+            <a:pPr lvl="0" indent="0" marL="0">
+              <a:spcBef>
+                <a:spcPts val="3000"/>
+              </a:spcBef>
+              <a:buNone/>
+            </a:pPr>
+            <a:r>
+              <a:rPr b="1"/>
+              <a:t>Presentations: probably not</a:t>
+            </a:r>
+          </a:p>
+          <a:p>
+            <a:pPr lvl="0" indent="0" marL="0">
+              <a:buNone/>
+            </a:pPr>
+            <a:r>
+              <a:rPr/>
+              <a:t>The best case for generating a presentation with Quarto are when you need to generate </a:t>
+            </a:r>
+            <a:r>
+              <a:rPr i="1"/>
+              <a:t>a lot</a:t>
+            </a:r>
+            <a:r>
+              <a:rPr/>
+              <a:t> of dynamic content. Other cases:</a:t>
+            </a:r>
+          </a:p>
+          <a:p>
+            <a:pPr lvl="0"/>
+            <a:r>
+              <a:rPr/>
+              <a:t>Reproducibility</a:t>
+            </a:r>
+          </a:p>
+          <a:p>
+            <a:pPr lvl="0"/>
+            <a:r>
+              <a:rPr/>
+              <a:t>Collaborators used to Git/Beamer</a:t>
+            </a:r>
+          </a:p>
+          <a:p>
+            <a:pPr lvl="0" indent="0" marL="0">
+              <a:buNone/>
+            </a:pPr>
+            <a:r>
+              <a:rPr/>
+              <a:t>::: :::: {.columns}</a:t>
+            </a:r>
+          </a:p>
+        </p:txBody>
+      </p:sp>
+    </p:spTree>
+  </p:cSld>
+</p:sld>
+</file>
+
+<file path=ppt/slides/slide36.xml><?xml version="1.0" encoding="utf-8"?>
+<p:sld xmlns:a="http://schemas.openxmlformats.org/drawingml/2006/main" xmlns:r="http://schemas.openxmlformats.org/officeDocument/2006/relationships" xmlns:p="http://schemas.openxmlformats.org/presentationml/2006/main">
+  <p:cSld>
+    <p:spTree>
+      <p:nvGrpSpPr>
+        <p:cNvPr id="1" name=""/>
+        <p:cNvGrpSpPr/>
+        <p:nvPr/>
+      </p:nvGrpSpPr>
+      <p:grpSpPr>
+        <a:xfrm>
+          <a:off x="0" y="0"/>
+          <a:ext cx="0" cy="0"/>
+          <a:chOff x="0" y="0"/>
+          <a:chExt cx="0" cy="0"/>
+        </a:xfrm>
+      </p:grpSpPr>
+      <p:sp>
+        <p:nvSpPr>
+          <p:cNvPr id="2" name="Title 1"/>
+          <p:cNvSpPr>
+            <a:spLocks noGrp="1"/>
+          </p:cNvSpPr>
+          <p:nvPr>
+            <p:ph type="title"/>
+          </p:nvPr>
+        </p:nvSpPr>
+        <p:spPr/>
+        <p:txBody>
+          <a:bodyPr/>
+          <a:lstStyle/>
+          <a:p>
+            <a:pPr lvl="0" indent="0" marL="0">
+              <a:buNone/>
+            </a:pPr>
+            <a:r>
+              <a:rPr/>
+              <a:t>References</a:t>
+            </a:r>
+          </a:p>
+        </p:txBody>
+      </p:sp>
+    </p:spTree>
+  </p:cSld>
+</p:sld>
+</file>
+
+<file path=ppt/slides/slide37.xml><?xml version="1.0" encoding="utf-8"?>
+<p:sld xmlns:a="http://schemas.openxmlformats.org/drawingml/2006/main" xmlns:r="http://schemas.openxmlformats.org/officeDocument/2006/relationships" xmlns:p="http://schemas.openxmlformats.org/presentationml/2006/main">
+  <p:cSld>
+    <p:spTree>
+      <p:nvGrpSpPr>
+        <p:cNvPr id="1" name=""/>
+        <p:cNvGrpSpPr/>
+        <p:nvPr/>
+      </p:nvGrpSpPr>
+      <p:grpSpPr>
+        <a:xfrm>
+          <a:off x="0" y="0"/>
+          <a:ext cx="0" cy="0"/>
+          <a:chOff x="0" y="0"/>
+          <a:chExt cx="0" cy="0"/>
+        </a:xfrm>
+      </p:grpSpPr>
+      <p:sp>
+        <p:nvSpPr>
+          <p:cNvPr id="2" name="Title 1"/>
+          <p:cNvSpPr>
+            <a:spLocks noGrp="1"/>
+          </p:cNvSpPr>
+          <p:nvPr>
+            <p:ph type="title"/>
+          </p:nvPr>
+        </p:nvSpPr>
         <p:spPr>
           <a:xfrm>
             <a:off x="722313" y="3305176"/>
@@ -9739,7 +9860,7 @@
 </p:sld>
 </file>
 
-<file path=ppt/slides/slide36.xml><?xml version="1.0" encoding="utf-8"?>
+<file path=ppt/slides/slide38.xml><?xml version="1.0" encoding="utf-8"?>
 <p:sld xmlns:a="http://schemas.openxmlformats.org/drawingml/2006/main" xmlns:r="http://schemas.openxmlformats.org/officeDocument/2006/relationships" xmlns:p="http://schemas.openxmlformats.org/presentationml/2006/main">
   <p:cSld>
     <p:spTree>

</xml_diff>

<commit_message>
Work done by Fri Jul  1 17:32:01 PDT 2022
</commit_message>
<xml_diff>
--- a/docs/presentation-orig.pptx
+++ b/docs/presentation-orig.pptx
@@ -9447,7 +9447,57 @@
             </a:r>
             <a:r>
               <a:rPr/>
-              <a:t> in your text.</a:t>
+              <a:t> in your text. For example, if my BibTex file contains a </a:t>
+            </a:r>
+            <a:r>
+              <a:rPr>
+                <a:latin typeface="Consolas"/>
+              </a:rPr>
+              <a:t>diamond97</a:t>
+            </a:r>
+            <a:r>
+              <a:rPr/>
+              <a:t> and a </a:t>
+            </a:r>
+            <a:r>
+              <a:rPr>
+                <a:latin typeface="Consolas"/>
+              </a:rPr>
+              <a:t>diamond11</a:t>
+            </a:r>
+            <a:r>
+              <a:rPr/>
+              <a:t> citation for Jared Diamond’s books, I can cite them by writing </a:t>
+            </a:r>
+            <a:r>
+              <a:rPr>
+                <a:latin typeface="Consolas"/>
+              </a:rPr>
+              <a:t>[@diamond97]</a:t>
+            </a:r>
+            <a:r>
+              <a:rPr/>
+              <a:t> and </a:t>
+            </a:r>
+            <a:r>
+              <a:rPr>
+                <a:latin typeface="Consolas"/>
+              </a:rPr>
+              <a:t>[@diamond11]</a:t>
+            </a:r>
+            <a:r>
+              <a:rPr/>
+              <a:t>. I can then cite _Guns, Germs and Steel [@diamon97] and Collapse [@diamond11]. All </a:t>
+            </a:r>
+            <a:r>
+              <a:rPr>
+                <a:hlinkClick r:id="rId2"/>
+              </a:rPr>
+              <a:t>Citation Style Language</a:t>
+            </a:r>
+            <a:r>
+              <a:rPr/>
+              <a:t> formats are supported.</a:t>
             </a:r>
           </a:p>
           <a:p>
@@ -9480,7 +9530,7 @@
             </a:r>
             <a:r>
               <a:rPr baseline="30000">
-                <a:hlinkClick r:id="rId2" action="ppaction://hlinksldjump"/>
+                <a:hlinkClick r:id="rId3" action="ppaction://hlinksldjump"/>
               </a:rPr>
               <a:t>1</a:t>
             </a:r>
@@ -9597,22 +9647,13 @@
             <a:spLocks noGrp="1"/>
           </p:cNvSpPr>
           <p:nvPr>
-            <p:ph idx="1"/>
+            <p:ph idx="1" sz="half"/>
           </p:nvPr>
         </p:nvSpPr>
         <p:spPr/>
         <p:txBody>
           <a:bodyPr/>
           <a:lstStyle/>
-          <a:p>
-            <a:pPr lvl="0" indent="0" marL="0">
-              <a:buNone/>
-            </a:pPr>
-            <a:r>
-              <a:rPr/>
-              <a:t>:::: {.columns} ::: {.column}</a:t>
-            </a:r>
-          </a:p>
           <a:p>
             <a:pPr lvl="0" indent="0" marL="0">
               <a:buNone/>
@@ -9664,15 +9705,22 @@
               <a:t>If I would be doing something in a Python notebook, I don’t lose anything by doing it on Quarto, and the extra work is very small.</a:t>
             </a:r>
           </a:p>
-          <a:p>
-            <a:pPr lvl="0" indent="0" marL="0">
-              <a:buNone/>
-            </a:pPr>
-            <a:r>
-              <a:rPr/>
-              <a:t>::: ::: {.column}</a:t>
-            </a:r>
-          </a:p>
+        </p:txBody>
+      </p:sp>
+      <p:sp>
+        <p:nvSpPr>
+          <p:cNvPr id="4" name="Content Placeholder 3"/>
+          <p:cNvSpPr>
+            <a:spLocks noGrp="1"/>
+          </p:cNvSpPr>
+          <p:nvPr>
+            <p:ph idx="2" sz="half"/>
+          </p:nvPr>
+        </p:nvSpPr>
+        <p:spPr/>
+        <p:txBody>
+          <a:bodyPr/>
+          <a:lstStyle/>
           <a:p>
             <a:pPr lvl="0" indent="0" marL="0">
               <a:spcBef>
@@ -9743,15 +9791,6 @@
             <a:r>
               <a:rPr/>
               <a:t>Collaborators used to Git/Beamer</a:t>
-            </a:r>
-          </a:p>
-          <a:p>
-            <a:pPr lvl="0" indent="0" marL="0">
-              <a:buNone/>
-            </a:pPr>
-            <a:r>
-              <a:rPr/>
-              <a:t>::: :::: {.columns}</a:t>
             </a:r>
           </a:p>
         </p:txBody>

</xml_diff>

<commit_message>
Work done by Fri Jul  1 17:41:52 PDT 2022
</commit_message>
<xml_diff>
--- a/docs/presentation-orig.pptx
+++ b/docs/presentation-orig.pptx
@@ -9447,7 +9447,16 @@
             </a:r>
             <a:r>
               <a:rPr/>
-              <a:t> in your text. For example, if my BibTex file contains a </a:t>
+              <a:t> in your text.</a:t>
+            </a:r>
+          </a:p>
+          <a:p>
+            <a:pPr lvl="0" indent="0" marL="0">
+              <a:buNone/>
+            </a:pPr>
+            <a:r>
+              <a:rPr/>
+              <a:t>For example, if my BibTex file contains a </a:t>
             </a:r>
             <a:r>
               <a:rPr>
@@ -9487,7 +9496,23 @@
             </a:r>
             <a:r>
               <a:rPr/>
-              <a:t>. I can then cite _Guns, Germs and Steel [@diamon97] and Collapse [@diamond11]. All </a:t>
+              <a:t>. I can then cite </a:t>
+            </a:r>
+            <a:r>
+              <a:rPr i="1"/>
+              <a:t>Guns, Germs and Steel</a:t>
+            </a:r>
+            <a:r>
+              <a:rPr/>
+              <a:t> [@diamon97] and </a:t>
+            </a:r>
+            <a:r>
+              <a:rPr i="1"/>
+              <a:t>Collapse</a:t>
+            </a:r>
+            <a:r>
+              <a:rPr/>
+              <a:t> [@diamond11]. All </a:t>
             </a:r>
             <a:r>
               <a:rPr>

</xml_diff>

<commit_message>
Work done by Fri Jul  1 17:55:24 PDT 2022
</commit_message>
<xml_diff>
--- a/docs/presentation-orig.pptx
+++ b/docs/presentation-orig.pptx
@@ -42,7 +42,6 @@
     <p:sldId id="290" r:id="rId36"/>
     <p:sldId id="291" r:id="rId37"/>
     <p:sldId id="292" r:id="rId38"/>
-    <p:sldId id="293" r:id="rId39"/>
   </p:sldIdLst>
   <p:sldSz cx="9144000" cy="5143500" type="screen16x9"/>
   <p:notesSz cx="6858000" cy="9144000"/>
@@ -9417,7 +9416,16 @@
             </a:pPr>
             <a:r>
               <a:rPr/>
-              <a:t>It’s very easy to use citations in Quarto. All you need is a BibTex file with your citations, for example, </a:t>
+              <a:t>Citations don’t work on presentations, but are easy to add to documents.</a:t>
+            </a:r>
+          </a:p>
+          <a:p>
+            <a:pPr lvl="0" indent="0" marL="0">
+              <a:buNone/>
+            </a:pPr>
+            <a:r>
+              <a:rPr/>
+              <a:t>You need a BibTex file, e.g., </a:t>
             </a:r>
             <a:r>
               <a:rPr>
@@ -9427,7 +9435,7 @@
             </a:r>
             <a:r>
               <a:rPr/>
-              <a:t>, and to add </a:t>
+              <a:t>, and a reference to it </a:t>
             </a:r>
             <a:r>
               <a:rPr>
@@ -9437,7 +9445,26 @@
             </a:r>
             <a:r>
               <a:rPr/>
-              <a:t> to the YAML front-matter of your document. You can then refer to the bibliography by simply adding the appropriate </a:t>
+              <a:t> to the YAML front-matter. Quarto supports any </a:t>
+            </a:r>
+            <a:r>
+              <a:rPr>
+                <a:hlinkClick r:id="rId2"/>
+              </a:rPr>
+              <a:t>Citation Style Language</a:t>
+            </a:r>
+            <a:r>
+              <a:rPr/>
+              <a:t>.</a:t>
+            </a:r>
+          </a:p>
+          <a:p>
+            <a:pPr lvl="0" indent="0" marL="0">
+              <a:buNone/>
+            </a:pPr>
+            <a:r>
+              <a:rPr/>
+              <a:t>You can cite by using </a:t>
             </a:r>
             <a:r>
               <a:rPr>
@@ -9447,7 +9474,37 @@
             </a:r>
             <a:r>
               <a:rPr/>
-              <a:t> in your text.</a:t>
+              <a:t> in your text. Please check the </a:t>
+            </a:r>
+            <a:r>
+              <a:rPr>
+                <a:hlinkClick r:id="rId3"/>
+              </a:rPr>
+              <a:t>article .qmd source</a:t>
+            </a:r>
+            <a:r>
+              <a:rPr/>
+              <a:t> and the </a:t>
+            </a:r>
+            <a:r>
+              <a:rPr>
+                <a:hlinkClick r:id="rId4"/>
+              </a:rPr>
+              <a:t>PDF</a:t>
+            </a:r>
+            <a:r>
+              <a:rPr/>
+              <a:t> and </a:t>
+            </a:r>
+            <a:r>
+              <a:rPr>
+                <a:hlinkClick r:id="rId5"/>
+              </a:rPr>
+              <a:t>DOCX</a:t>
+            </a:r>
+            <a:r>
+              <a:rPr/>
+              <a:t> outputs.</a:t>
             </a:r>
           </a:p>
           <a:p>
@@ -9456,82 +9513,7 @@
             </a:pPr>
             <a:r>
               <a:rPr/>
-              <a:t>For example, if my BibTex file contains a </a:t>
-            </a:r>
-            <a:r>
-              <a:rPr>
-                <a:latin typeface="Consolas"/>
-              </a:rPr>
-              <a:t>diamond97</a:t>
-            </a:r>
-            <a:r>
-              <a:rPr/>
-              <a:t> and a </a:t>
-            </a:r>
-            <a:r>
-              <a:rPr>
-                <a:latin typeface="Consolas"/>
-              </a:rPr>
-              <a:t>diamond11</a:t>
-            </a:r>
-            <a:r>
-              <a:rPr/>
-              <a:t> citation for Jared Diamond’s books, I can cite them by writing </a:t>
-            </a:r>
-            <a:r>
-              <a:rPr>
-                <a:latin typeface="Consolas"/>
-              </a:rPr>
-              <a:t>[@diamond97]</a:t>
-            </a:r>
-            <a:r>
-              <a:rPr/>
-              <a:t> and </a:t>
-            </a:r>
-            <a:r>
-              <a:rPr>
-                <a:latin typeface="Consolas"/>
-              </a:rPr>
-              <a:t>[@diamond11]</a:t>
-            </a:r>
-            <a:r>
-              <a:rPr/>
-              <a:t>. I can then cite </a:t>
-            </a:r>
-            <a:r>
-              <a:rPr i="1"/>
-              <a:t>Guns, Germs and Steel</a:t>
-            </a:r>
-            <a:r>
-              <a:rPr/>
-              <a:t> [@diamon97] and </a:t>
-            </a:r>
-            <a:r>
-              <a:rPr i="1"/>
-              <a:t>Collapse</a:t>
-            </a:r>
-            <a:r>
-              <a:rPr/>
-              <a:t> [@diamond11]. All </a:t>
-            </a:r>
-            <a:r>
-              <a:rPr>
-                <a:hlinkClick r:id="rId2"/>
-              </a:rPr>
-              <a:t>Citation Style Language</a:t>
-            </a:r>
-            <a:r>
-              <a:rPr/>
-              <a:t> formats are supported.</a:t>
-            </a:r>
-          </a:p>
-          <a:p>
-            <a:pPr lvl="0" indent="0" marL="0">
-              <a:buNone/>
-            </a:pPr>
-            <a:r>
-              <a:rPr/>
-              <a:t>Generating footnotes is also easy, using </a:t>
+              <a:t>Generating footnotes is also easy. Using </a:t>
             </a:r>
             <a:r>
               <a:rPr>
@@ -9555,7 +9537,7 @@
             </a:r>
             <a:r>
               <a:rPr baseline="30000">
-                <a:hlinkClick r:id="rId3" action="ppaction://hlinksldjump"/>
+                <a:hlinkClick r:id="rId6" action="ppaction://hlinksldjump"/>
               </a:rPr>
               <a:t>1</a:t>
             </a:r>
@@ -9613,7 +9595,7 @@
             </a:pPr>
             <a:r>
               <a:rPr/>
-              <a:t>When is Quarto worthwhile</a:t>
+              <a:t>Should I use Quarto?</a:t>
             </a:r>
           </a:p>
         </p:txBody>
@@ -9660,7 +9642,7 @@
             </a:pPr>
             <a:r>
               <a:rPr/>
-              <a:t>Using Quarto Everywhere?</a:t>
+              <a:t>Where I think Quarto is good (July 2022)</a:t>
             </a:r>
           </a:p>
         </p:txBody>
@@ -9679,15 +9661,6 @@
         <p:txBody>
           <a:bodyPr/>
           <a:lstStyle/>
-          <a:p>
-            <a:pPr lvl="0" indent="0" marL="0">
-              <a:buNone/>
-            </a:pPr>
-            <a:r>
-              <a:rPr/>
-              <a:t>I have been using Quarto a lot lately. Here’s my current (July 2022) take on when it’s worthwile.</a:t>
-            </a:r>
-          </a:p>
           <a:p>
             <a:pPr lvl="0" indent="0" marL="0">
               <a:spcBef>
@@ -9697,7 +9670,7 @@
             </a:pPr>
             <a:r>
               <a:rPr b="1"/>
-              <a:t>Blog: excellent</a:t>
+              <a:t>Writing articles: unsure</a:t>
             </a:r>
           </a:p>
           <a:p>
@@ -9706,7 +9679,15 @@
             </a:pPr>
             <a:r>
               <a:rPr/>
-              <a:t>I wanted to have a Python-based blog for a long time, and Quarto delivers it well. Now I can automate my blog to tweet and post to LinkedIn when I write new articles.</a:t>
+              <a:t>I think Quarto is more helpful for a team that uses Git </a:t>
+            </a:r>
+            <a:r>
+              <a:rPr b="1"/>
+              <a:t>with</a:t>
+            </a:r>
+            <a:r>
+              <a:rPr/>
+              <a:t> Python notebooks or LaTeX to write articles. Microsoft Word collaboration through SharePoint and Teams is easier than Git and Quarto… but it’s not reproducible.</a:t>
             </a:r>
           </a:p>
           <a:p>
@@ -9718,7 +9699,7 @@
             </a:pPr>
             <a:r>
               <a:rPr b="1"/>
-              <a:t>Python notebook: excellent</a:t>
+              <a:t>Blog: excellent</a:t>
             </a:r>
           </a:p>
           <a:p>
@@ -9727,7 +9708,7 @@
             </a:pPr>
             <a:r>
               <a:rPr/>
-              <a:t>If I would be doing something in a Python notebook, I don’t lose anything by doing it on Quarto, and the extra work is very small.</a:t>
+              <a:t>Quarto allows me to have a scriptable, Python-based blog. I can automate my blog to tweet and post to LinkedIn when I write new articles.</a:t>
             </a:r>
           </a:p>
         </p:txBody>
@@ -9755,7 +9736,7 @@
             </a:pPr>
             <a:r>
               <a:rPr b="1"/>
-              <a:t>Writing articles: unsure</a:t>
+              <a:t>Python notebook: excellent</a:t>
             </a:r>
           </a:p>
           <a:p>
@@ -9764,15 +9745,7 @@
             </a:pPr>
             <a:r>
               <a:rPr/>
-              <a:t>I think Quarto is more helpful for a team that uses Git </a:t>
-            </a:r>
-            <a:r>
-              <a:rPr b="1"/>
-              <a:t>with</a:t>
-            </a:r>
-            <a:r>
-              <a:rPr/>
-              <a:t> Python notebooks or LaTeX to write articles. Microsoft Word collaboration through SharePoint and Teams is easier than Git and Quarto… but it’s not reproducible.</a:t>
+              <a:t>Quarto adds to Python notebooks without detracting anything. All it’s needed is a few YAML lines.</a:t>
             </a:r>
           </a:p>
           <a:p>
@@ -9784,31 +9757,25 @@
             </a:pPr>
             <a:r>
               <a:rPr b="1"/>
-              <a:t>Presentations: probably not</a:t>
-            </a:r>
-          </a:p>
-          <a:p>
-            <a:pPr lvl="0" indent="0" marL="0">
-              <a:buNone/>
-            </a:pPr>
-            <a:r>
-              <a:rPr/>
-              <a:t>The best case for generating a presentation with Quarto are when you need to generate </a:t>
-            </a:r>
+              <a:t>Presentations: only if you have</a:t>
+            </a:r>
+          </a:p>
+          <a:p>
+            <a:pPr lvl="0"/>
             <a:r>
               <a:rPr i="1"/>
               <a:t>a lot</a:t>
             </a:r>
             <a:r>
               <a:rPr/>
-              <a:t> of dynamic content. Other cases:</a:t>
+              <a:t> of dynamic content</a:t>
             </a:r>
           </a:p>
           <a:p>
             <a:pPr lvl="0"/>
             <a:r>
               <a:rPr/>
-              <a:t>Reproducibility</a:t>
+              <a:t>Reproducibility needs</a:t>
             </a:r>
           </a:p>
           <a:p>
@@ -9852,7 +9819,12 @@
             <p:ph type="title"/>
           </p:nvPr>
         </p:nvSpPr>
-        <p:spPr/>
+        <p:spPr>
+          <a:xfrm>
+            <a:off x="722313" y="3305176"/>
+            <a:ext cx="7772400" cy="1021556"/>
+          </a:xfrm>
+        </p:spPr>
         <p:txBody>
           <a:bodyPr/>
           <a:lstStyle/>
@@ -9862,7 +9834,7 @@
             </a:pPr>
             <a:r>
               <a:rPr/>
-              <a:t>References</a:t>
+              <a:t>THANK YOU</a:t>
             </a:r>
           </a:p>
         </p:txBody>
@@ -9873,58 +9845,6 @@
 </file>
 
 <file path=ppt/slides/slide37.xml><?xml version="1.0" encoding="utf-8"?>
-<p:sld xmlns:a="http://schemas.openxmlformats.org/drawingml/2006/main" xmlns:r="http://schemas.openxmlformats.org/officeDocument/2006/relationships" xmlns:p="http://schemas.openxmlformats.org/presentationml/2006/main">
-  <p:cSld>
-    <p:spTree>
-      <p:nvGrpSpPr>
-        <p:cNvPr id="1" name=""/>
-        <p:cNvGrpSpPr/>
-        <p:nvPr/>
-      </p:nvGrpSpPr>
-      <p:grpSpPr>
-        <a:xfrm>
-          <a:off x="0" y="0"/>
-          <a:ext cx="0" cy="0"/>
-          <a:chOff x="0" y="0"/>
-          <a:chExt cx="0" cy="0"/>
-        </a:xfrm>
-      </p:grpSpPr>
-      <p:sp>
-        <p:nvSpPr>
-          <p:cNvPr id="2" name="Title 1"/>
-          <p:cNvSpPr>
-            <a:spLocks noGrp="1"/>
-          </p:cNvSpPr>
-          <p:nvPr>
-            <p:ph type="title"/>
-          </p:nvPr>
-        </p:nvSpPr>
-        <p:spPr>
-          <a:xfrm>
-            <a:off x="722313" y="3305176"/>
-            <a:ext cx="7772400" cy="1021556"/>
-          </a:xfrm>
-        </p:spPr>
-        <p:txBody>
-          <a:bodyPr/>
-          <a:lstStyle/>
-          <a:p>
-            <a:pPr lvl="0" indent="0" marL="0">
-              <a:buNone/>
-            </a:pPr>
-            <a:r>
-              <a:rPr/>
-              <a:t>THANK YOU</a:t>
-            </a:r>
-          </a:p>
-        </p:txBody>
-      </p:sp>
-    </p:spTree>
-  </p:cSld>
-</p:sld>
-</file>
-
-<file path=ppt/slides/slide38.xml><?xml version="1.0" encoding="utf-8"?>
 <p:sld xmlns:a="http://schemas.openxmlformats.org/drawingml/2006/main" xmlns:r="http://schemas.openxmlformats.org/officeDocument/2006/relationships" xmlns:p="http://schemas.openxmlformats.org/presentationml/2006/main">
   <p:cSld>
     <p:spTree>

</xml_diff>

<commit_message>
Work done by Fri Jul  1 18:00:37 PDT 2022
</commit_message>
<xml_diff>
--- a/docs/presentation-orig.pptx
+++ b/docs/presentation-orig.pptx
@@ -9699,7 +9699,7 @@
             </a:pPr>
             <a:r>
               <a:rPr b="1"/>
-              <a:t>Blog: excellent</a:t>
+              <a:t>Python notebook: excellent</a:t>
             </a:r>
           </a:p>
           <a:p>
@@ -9708,7 +9708,7 @@
             </a:pPr>
             <a:r>
               <a:rPr/>
-              <a:t>Quarto allows me to have a scriptable, Python-based blog. I can automate my blog to tweet and post to LinkedIn when I write new articles.</a:t>
+              <a:t>Quarto adds to Python notebooks without detracting anything. All you need are a few YAML lines.</a:t>
             </a:r>
           </a:p>
         </p:txBody>
@@ -9736,7 +9736,7 @@
             </a:pPr>
             <a:r>
               <a:rPr b="1"/>
-              <a:t>Python notebook: excellent</a:t>
+              <a:t>Blog: excellent</a:t>
             </a:r>
           </a:p>
           <a:p>
@@ -9745,7 +9745,7 @@
             </a:pPr>
             <a:r>
               <a:rPr/>
-              <a:t>Quarto adds to Python notebooks without detracting anything. All it’s needed is a few YAML lines.</a:t>
+              <a:t>Quarto allows me to have a scriptable, Python-based blog. I can automate my blog to tweet and post to LinkedIn when I write new articles.</a:t>
             </a:r>
           </a:p>
           <a:p>
@@ -9757,7 +9757,16 @@
             </a:pPr>
             <a:r>
               <a:rPr b="1"/>
-              <a:t>Presentations: only if you have</a:t>
+              <a:t>Presentations: unsure</a:t>
+            </a:r>
+          </a:p>
+          <a:p>
+            <a:pPr lvl="0" indent="0" marL="0">
+              <a:buNone/>
+            </a:pPr>
+            <a:r>
+              <a:rPr/>
+              <a:t>Only if you have</a:t>
             </a:r>
           </a:p>
           <a:p>

</xml_diff>

<commit_message>
Work done by Fri Jul  1 18:02:56 PDT 2022
</commit_message>
<xml_diff>
--- a/docs/presentation-orig.pptx
+++ b/docs/presentation-orig.pptx
@@ -9670,7 +9670,7 @@
             </a:pPr>
             <a:r>
               <a:rPr b="1"/>
-              <a:t>Writing articles: unsure</a:t>
+              <a:t>Articles: maybe yes</a:t>
             </a:r>
           </a:p>
           <a:p>
@@ -9679,7 +9679,7 @@
             </a:pPr>
             <a:r>
               <a:rPr/>
-              <a:t>I think Quarto is more helpful for a team that uses Git </a:t>
+              <a:t>I think Quarto is more helpful for a team that already uses Git </a:t>
             </a:r>
             <a:r>
               <a:rPr b="1"/>
@@ -9757,7 +9757,7 @@
             </a:pPr>
             <a:r>
               <a:rPr b="1"/>
-              <a:t>Presentations: unsure</a:t>
+              <a:t>Presentations: maybe not</a:t>
             </a:r>
           </a:p>
           <a:p>

</xml_diff>

<commit_message>
Work done by Fri Jul  1 18:07:35 PDT 2022
</commit_message>
<xml_diff>
--- a/docs/presentation-orig.pptx
+++ b/docs/presentation-orig.pptx
@@ -8804,8 +8804,8 @@
         </p:blipFill>
         <p:spPr bwMode="auto">
           <a:xfrm>
-            <a:off x="3048000" y="1193800"/>
-            <a:ext cx="3060700" cy="3390900"/>
+            <a:off x="3009900" y="1193800"/>
+            <a:ext cx="3136900" cy="3390900"/>
           </a:xfrm>
           <a:prstGeom prst="rect">
             <a:avLst/>

</xml_diff>

<commit_message>
Work done by Fri Jul  1 18:26:32 PDT 2022
</commit_message>
<xml_diff>
--- a/docs/presentation-orig.pptx
+++ b/docs/presentation-orig.pptx
@@ -44,6 +44,8 @@
     <p:sldId id="292" r:id="rId38"/>
     <p:sldId id="293" r:id="rId39"/>
     <p:sldId id="294" r:id="rId40"/>
+    <p:sldId id="295" r:id="rId41"/>
+    <p:sldId id="296" r:id="rId42"/>
   </p:sldIdLst>
   <p:sldSz cx="9144000" cy="5143500" type="screen16x9"/>
   <p:notesSz cx="6858000" cy="9144000"/>
@@ -4150,7 +4152,7 @@
             </a:pPr>
             <a:r>
               <a:rPr/>
-              <a:t>Quarto basics</a:t>
+              <a:t>Using Quarto</a:t>
             </a:r>
           </a:p>
         </p:txBody>
@@ -10380,7 +10382,7 @@
             </a:pPr>
             <a:r>
               <a:rPr/>
-              <a:t>Should I use Quarto?</a:t>
+              <a:t>Books in Quarto</a:t>
             </a:r>
           </a:p>
         </p:txBody>
@@ -10427,7 +10429,7 @@
             </a:pPr>
             <a:r>
               <a:rPr/>
-              <a:t>Where I think Quarto is good (July 2022)</a:t>
+              <a:t>Books in Quarto</a:t>
             </a:r>
           </a:p>
         </p:txBody>
@@ -10439,7 +10441,7 @@
             <a:spLocks noGrp="1"/>
           </p:cNvSpPr>
           <p:nvPr>
-            <p:ph idx="1" sz="half"/>
+            <p:ph idx="1"/>
           </p:nvPr>
         </p:nvSpPr>
         <p:spPr/>
@@ -10448,135 +10450,11 @@
           <a:lstStyle/>
           <a:p>
             <a:pPr lvl="0" indent="0" marL="0">
-              <a:spcBef>
-                <a:spcPts val="3000"/>
-              </a:spcBef>
               <a:buNone/>
             </a:pPr>
             <a:r>
-              <a:rPr b="1"/>
-              <a:t>Articles: maybe yes</a:t>
-            </a:r>
-          </a:p>
-          <a:p>
-            <a:pPr lvl="0" indent="0" marL="0">
-              <a:buNone/>
-            </a:pPr>
-            <a:r>
-              <a:rPr/>
-              <a:t>I think Quarto is more helpful for a team that already uses Git </a:t>
-            </a:r>
-            <a:r>
-              <a:rPr b="1"/>
-              <a:t>with</a:t>
-            </a:r>
-            <a:r>
-              <a:rPr/>
-              <a:t> Python notebooks or LaTeX to write articles. Microsoft Word collaboration through SharePoint and Teams is easier than Git and Quarto… but it’s not reproducible.</a:t>
-            </a:r>
-          </a:p>
-          <a:p>
-            <a:pPr lvl="0" indent="0" marL="0">
-              <a:spcBef>
-                <a:spcPts val="3000"/>
-              </a:spcBef>
-              <a:buNone/>
-            </a:pPr>
-            <a:r>
-              <a:rPr b="1"/>
-              <a:t>Python notebook: excellent</a:t>
-            </a:r>
-          </a:p>
-          <a:p>
-            <a:pPr lvl="0" indent="0" marL="0">
-              <a:buNone/>
-            </a:pPr>
-            <a:r>
-              <a:rPr/>
-              <a:t>Quarto adds to Python notebooks without detracting anything. All you need are a few YAML lines.</a:t>
-            </a:r>
-          </a:p>
-        </p:txBody>
-      </p:sp>
-      <p:sp>
-        <p:nvSpPr>
-          <p:cNvPr id="4" name="Content Placeholder 3"/>
-          <p:cNvSpPr>
-            <a:spLocks noGrp="1"/>
-          </p:cNvSpPr>
-          <p:nvPr>
-            <p:ph idx="2" sz="half"/>
-          </p:nvPr>
-        </p:nvSpPr>
-        <p:spPr/>
-        <p:txBody>
-          <a:bodyPr/>
-          <a:lstStyle/>
-          <a:p>
-            <a:pPr lvl="0" indent="0" marL="0">
-              <a:spcBef>
-                <a:spcPts val="3000"/>
-              </a:spcBef>
-              <a:buNone/>
-            </a:pPr>
-            <a:r>
-              <a:rPr b="1"/>
-              <a:t>Blog: excellent</a:t>
-            </a:r>
-          </a:p>
-          <a:p>
-            <a:pPr lvl="0" indent="0" marL="0">
-              <a:buNone/>
-            </a:pPr>
-            <a:r>
-              <a:rPr/>
-              <a:t>Quarto allows me to have a scriptable, Python-based blog. I can automate my blog to tweet and post to LinkedIn when I write new articles.</a:t>
-            </a:r>
-          </a:p>
-          <a:p>
-            <a:pPr lvl="0" indent="0" marL="0">
-              <a:spcBef>
-                <a:spcPts val="3000"/>
-              </a:spcBef>
-              <a:buNone/>
-            </a:pPr>
-            <a:r>
-              <a:rPr b="1"/>
-              <a:t>Presentations: maybe not</a:t>
-            </a:r>
-          </a:p>
-          <a:p>
-            <a:pPr lvl="0" indent="0" marL="0">
-              <a:buNone/>
-            </a:pPr>
-            <a:r>
-              <a:rPr/>
-              <a:t>Only if you have</a:t>
-            </a:r>
-          </a:p>
-          <a:p>
-            <a:pPr lvl="0"/>
-            <a:r>
-              <a:rPr i="1"/>
-              <a:t>a lot</a:t>
-            </a:r>
-            <a:r>
-              <a:rPr/>
-              <a:t> of dynamic content</a:t>
-            </a:r>
-          </a:p>
-          <a:p>
-            <a:pPr lvl="0"/>
-            <a:r>
-              <a:rPr/>
-              <a:t>Reproducibility needs</a:t>
-            </a:r>
-          </a:p>
-          <a:p>
-            <a:pPr lvl="0"/>
-            <a:r>
-              <a:rPr/>
-              <a:t>Collaborators used to Git/Beamer</a:t>
+              <a:rPr/>
+              <a:t>Here are few books that have been recently written with Quarto:</a:t>
             </a:r>
           </a:p>
         </p:txBody>
@@ -10628,7 +10506,7 @@
             </a:pPr>
             <a:r>
               <a:rPr/>
-              <a:t>THANK YOU</a:t>
+              <a:t>Should I use Quarto?</a:t>
             </a:r>
           </a:p>
         </p:txBody>
@@ -10675,7 +10553,7 @@
             </a:pPr>
             <a:r>
               <a:rPr/>
-              <a:t>Notes</a:t>
+              <a:t>Where I think Quarto is good (July 2022)</a:t>
             </a:r>
           </a:p>
         </p:txBody>
@@ -10687,7 +10565,7 @@
             <a:spLocks noGrp="1"/>
           </p:cNvSpPr>
           <p:nvPr>
-            <p:ph idx="1"/>
+            <p:ph idx="1" sz="half"/>
           </p:nvPr>
         </p:nvSpPr>
         <p:spPr/>
@@ -10696,11 +10574,135 @@
           <a:lstStyle/>
           <a:p>
             <a:pPr lvl="0" indent="0" marL="0">
+              <a:spcBef>
+                <a:spcPts val="3000"/>
+              </a:spcBef>
               <a:buNone/>
             </a:pPr>
             <a:r>
-              <a:rPr sz="1800"/>
-              <a:t>1. You can use footnotes in presentations and websites, too</a:t>
+              <a:rPr b="1"/>
+              <a:t>Articles: maybe yes</a:t>
+            </a:r>
+          </a:p>
+          <a:p>
+            <a:pPr lvl="0" indent="0" marL="0">
+              <a:buNone/>
+            </a:pPr>
+            <a:r>
+              <a:rPr/>
+              <a:t>I think Quarto is more helpful for a team that already uses Git </a:t>
+            </a:r>
+            <a:r>
+              <a:rPr b="1"/>
+              <a:t>with</a:t>
+            </a:r>
+            <a:r>
+              <a:rPr/>
+              <a:t> Python notebooks or LaTeX to write articles. Microsoft Word collaboration through SharePoint and Teams is easier than Git and Quarto… but it’s not reproducible.</a:t>
+            </a:r>
+          </a:p>
+          <a:p>
+            <a:pPr lvl="0" indent="0" marL="0">
+              <a:spcBef>
+                <a:spcPts val="3000"/>
+              </a:spcBef>
+              <a:buNone/>
+            </a:pPr>
+            <a:r>
+              <a:rPr b="1"/>
+              <a:t>Python notebook: excellent</a:t>
+            </a:r>
+          </a:p>
+          <a:p>
+            <a:pPr lvl="0" indent="0" marL="0">
+              <a:buNone/>
+            </a:pPr>
+            <a:r>
+              <a:rPr/>
+              <a:t>Quarto adds to Python notebooks without detracting anything. All you need are a few YAML lines.</a:t>
+            </a:r>
+          </a:p>
+        </p:txBody>
+      </p:sp>
+      <p:sp>
+        <p:nvSpPr>
+          <p:cNvPr id="4" name="Content Placeholder 3"/>
+          <p:cNvSpPr>
+            <a:spLocks noGrp="1"/>
+          </p:cNvSpPr>
+          <p:nvPr>
+            <p:ph idx="2" sz="half"/>
+          </p:nvPr>
+        </p:nvSpPr>
+        <p:spPr/>
+        <p:txBody>
+          <a:bodyPr/>
+          <a:lstStyle/>
+          <a:p>
+            <a:pPr lvl="0" indent="0" marL="0">
+              <a:spcBef>
+                <a:spcPts val="3000"/>
+              </a:spcBef>
+              <a:buNone/>
+            </a:pPr>
+            <a:r>
+              <a:rPr b="1"/>
+              <a:t>Blog: excellent</a:t>
+            </a:r>
+          </a:p>
+          <a:p>
+            <a:pPr lvl="0" indent="0" marL="0">
+              <a:buNone/>
+            </a:pPr>
+            <a:r>
+              <a:rPr/>
+              <a:t>Quarto allows me to have a scriptable, Python-based blog. I can automate my blog to tweet and post to LinkedIn when I write new articles.</a:t>
+            </a:r>
+          </a:p>
+          <a:p>
+            <a:pPr lvl="0" indent="0" marL="0">
+              <a:spcBef>
+                <a:spcPts val="3000"/>
+              </a:spcBef>
+              <a:buNone/>
+            </a:pPr>
+            <a:r>
+              <a:rPr b="1"/>
+              <a:t>Presentations: maybe not</a:t>
+            </a:r>
+          </a:p>
+          <a:p>
+            <a:pPr lvl="0" indent="0" marL="0">
+              <a:buNone/>
+            </a:pPr>
+            <a:r>
+              <a:rPr/>
+              <a:t>Only if you have</a:t>
+            </a:r>
+          </a:p>
+          <a:p>
+            <a:pPr lvl="0"/>
+            <a:r>
+              <a:rPr i="1"/>
+              <a:t>a lot</a:t>
+            </a:r>
+            <a:r>
+              <a:rPr/>
+              <a:t> of dynamic content</a:t>
+            </a:r>
+          </a:p>
+          <a:p>
+            <a:pPr lvl="0"/>
+            <a:r>
+              <a:rPr/>
+              <a:t>Reproducibility needs</a:t>
+            </a:r>
+          </a:p>
+          <a:p>
+            <a:pPr lvl="0"/>
+            <a:r>
+              <a:rPr/>
+              <a:t>Collaborators used to Git/Beamer</a:t>
             </a:r>
           </a:p>
         </p:txBody>
@@ -10891,6 +10893,130 @@
             <a:r>
               <a:rPr/>
               <a:t>Donald Knuth’s Literate Programming</a:t>
+            </a:r>
+          </a:p>
+        </p:txBody>
+      </p:sp>
+    </p:spTree>
+  </p:cSld>
+</p:sld>
+</file>
+
+<file path=ppt/slides/slide40.xml><?xml version="1.0" encoding="utf-8"?>
+<p:sld xmlns:a="http://schemas.openxmlformats.org/drawingml/2006/main" xmlns:r="http://schemas.openxmlformats.org/officeDocument/2006/relationships" xmlns:p="http://schemas.openxmlformats.org/presentationml/2006/main">
+  <p:cSld>
+    <p:spTree>
+      <p:nvGrpSpPr>
+        <p:cNvPr id="1" name=""/>
+        <p:cNvGrpSpPr/>
+        <p:nvPr/>
+      </p:nvGrpSpPr>
+      <p:grpSpPr>
+        <a:xfrm>
+          <a:off x="0" y="0"/>
+          <a:ext cx="0" cy="0"/>
+          <a:chOff x="0" y="0"/>
+          <a:chExt cx="0" cy="0"/>
+        </a:xfrm>
+      </p:grpSpPr>
+      <p:sp>
+        <p:nvSpPr>
+          <p:cNvPr id="2" name="Title 1"/>
+          <p:cNvSpPr>
+            <a:spLocks noGrp="1"/>
+          </p:cNvSpPr>
+          <p:nvPr>
+            <p:ph type="title"/>
+          </p:nvPr>
+        </p:nvSpPr>
+        <p:spPr>
+          <a:xfrm>
+            <a:off x="722313" y="3305176"/>
+            <a:ext cx="7772400" cy="1021556"/>
+          </a:xfrm>
+        </p:spPr>
+        <p:txBody>
+          <a:bodyPr/>
+          <a:lstStyle/>
+          <a:p>
+            <a:pPr lvl="0" indent="0" marL="0">
+              <a:buNone/>
+            </a:pPr>
+            <a:r>
+              <a:rPr/>
+              <a:t>THANK YOU</a:t>
+            </a:r>
+          </a:p>
+        </p:txBody>
+      </p:sp>
+    </p:spTree>
+  </p:cSld>
+</p:sld>
+</file>
+
+<file path=ppt/slides/slide41.xml><?xml version="1.0" encoding="utf-8"?>
+<p:sld xmlns:a="http://schemas.openxmlformats.org/drawingml/2006/main" xmlns:r="http://schemas.openxmlformats.org/officeDocument/2006/relationships" xmlns:p="http://schemas.openxmlformats.org/presentationml/2006/main">
+  <p:cSld>
+    <p:spTree>
+      <p:nvGrpSpPr>
+        <p:cNvPr id="1" name=""/>
+        <p:cNvGrpSpPr/>
+        <p:nvPr/>
+      </p:nvGrpSpPr>
+      <p:grpSpPr>
+        <a:xfrm>
+          <a:off x="0" y="0"/>
+          <a:ext cx="0" cy="0"/>
+          <a:chOff x="0" y="0"/>
+          <a:chExt cx="0" cy="0"/>
+        </a:xfrm>
+      </p:grpSpPr>
+      <p:sp>
+        <p:nvSpPr>
+          <p:cNvPr id="2" name="Title 1"/>
+          <p:cNvSpPr>
+            <a:spLocks noGrp="1"/>
+          </p:cNvSpPr>
+          <p:nvPr>
+            <p:ph type="title"/>
+          </p:nvPr>
+        </p:nvSpPr>
+        <p:spPr/>
+        <p:txBody>
+          <a:bodyPr/>
+          <a:lstStyle/>
+          <a:p>
+            <a:pPr lvl="0" indent="0" marL="0">
+              <a:buNone/>
+            </a:pPr>
+            <a:r>
+              <a:rPr/>
+              <a:t>Notes</a:t>
+            </a:r>
+          </a:p>
+        </p:txBody>
+      </p:sp>
+      <p:sp>
+        <p:nvSpPr>
+          <p:cNvPr id="3" name="Content Placeholder 2"/>
+          <p:cNvSpPr>
+            <a:spLocks noGrp="1"/>
+          </p:cNvSpPr>
+          <p:nvPr>
+            <p:ph idx="1"/>
+          </p:nvPr>
+        </p:nvSpPr>
+        <p:spPr/>
+        <p:txBody>
+          <a:bodyPr/>
+          <a:lstStyle/>
+          <a:p>
+            <a:pPr lvl="0" indent="0" marL="0">
+              <a:buNone/>
+            </a:pPr>
+            <a:r>
+              <a:rPr sz="1800"/>
+              <a:t>1. You can use footnotes in presentations and websites, too</a:t>
             </a:r>
           </a:p>
         </p:txBody>

</xml_diff>

<commit_message>
Work done by Sun Jul  3 19:42:49 PDT 2022
</commit_message>
<xml_diff>
--- a/docs/presentation-orig.pptx
+++ b/docs/presentation-orig.pptx
@@ -10440,7 +10440,7 @@
               <a:rPr baseline="30000">
                 <a:hlinkClick r:id="rId6" action="ppaction://hlinksldjump"/>
               </a:rPr>
-              <a:t>1</a:t>
+              <a:t>2</a:t>
             </a:r>
             <a:r>
               <a:rPr/>
@@ -11130,7 +11130,16 @@
             </a:pPr>
             <a:r>
               <a:rPr sz="1800"/>
-              <a:t>1. You can use footnotes in presentations and websites, too</a:t>
+              <a:t>1. you can also add the YAML as raw content in the first cell of an .ipynb file</a:t>
+            </a:r>
+          </a:p>
+          <a:p>
+            <a:pPr lvl="0" indent="0" marL="0">
+              <a:buNone/>
+            </a:pPr>
+            <a:r>
+              <a:rPr sz="1800"/>
+              <a:t>2. You can use footnotes in presentations and websites, too</a:t>
             </a:r>
           </a:p>
         </p:txBody>
@@ -11503,7 +11512,7 @@
             </a:pPr>
             <a:r>
               <a:rPr/>
-              <a:t>The earliest known European printed book (Gutemberg, c.1452), the Sibyllenbuch, is a quarto.</a:t>
+              <a:t>The earliest known European printed book, the Sibyllenbuch (Gutemberg, c.1452), was done in the quarto format, as were many of Shakespeare’s plays.</a:t>
             </a:r>
           </a:p>
         </p:txBody>
@@ -11528,7 +11537,7 @@
             </a:pPr>
             <a:r>
               <a:rPr/>
-              <a:t>With Quarto:</a:t>
+              <a:t>With Quarto, you can:</a:t>
             </a:r>
           </a:p>
           <a:p>
@@ -11549,14 +11558,14 @@
             <a:pPr lvl="0"/>
             <a:r>
               <a:rPr/>
-              <a:t>Output articles, presentations, websites</a:t>
+              <a:t>Output articles, presentations, interactive websites…</a:t>
             </a:r>
           </a:p>
           <a:p>
             <a:pPr lvl="0"/>
             <a:r>
               <a:rPr/>
-              <a:t>Great integration with VSCode</a:t>
+              <a:t>Work with Jupyter Lab or VSCode</a:t>
             </a:r>
           </a:p>
           <a:p>
@@ -11565,7 +11574,7 @@
             </a:pPr>
             <a:r>
               <a:rPr/>
-              <a:t>Ypu can </a:t>
+              <a:t>You can </a:t>
             </a:r>
             <a:r>
               <a:rPr>
@@ -11720,7 +11729,16 @@
             </a:r>
             <a:r>
               <a:rPr/>
-              <a:t> use Python through Jupyter notebooks, and one can use </a:t>
+              <a:t> use Python through Jupyter notebooks.</a:t>
+            </a:r>
+          </a:p>
+          <a:p>
+            <a:pPr lvl="0" indent="0" marL="0">
+              <a:buNone/>
+            </a:pPr>
+            <a:r>
+              <a:rPr/>
+              <a:t>With some scripting, you can use </a:t>
             </a:r>
             <a:r>
               <a:rPr>
@@ -11731,7 +11749,16 @@
             </a:r>
             <a:r>
               <a:rPr/>
-              <a:t> to generate papers and PowerPoint, but it can be complicated.</a:t>
+              <a:t> to generate papers, HTML, PowerPoint, etc.</a:t>
+            </a:r>
+          </a:p>
+          <a:p>
+            <a:pPr lvl="0" indent="0" marL="0">
+              <a:buNone/>
+            </a:pPr>
+            <a:r>
+              <a:rPr/>
+              <a:t>You just need to learn Pandoc.</a:t>
             </a:r>
           </a:p>
         </p:txBody>
@@ -11819,7 +11846,7 @@
             </a:pPr>
             <a:r>
               <a:rPr/>
-              <a:t>Quarto for Python, in a nutshell</a:t>
+              <a:t>Quarto in Python, in a nutshell</a:t>
             </a:r>
           </a:p>
         </p:txBody>
@@ -11844,7 +11871,17 @@
             </a:pPr>
             <a:r>
               <a:rPr/>
-              <a:t>In Quarto’s </a:t>
+              <a:t>All you need to use Quarto is to add some YAML (mostly Pandoc configurations) to your </a:t>
+            </a:r>
+            <a:r>
+              <a:rPr>
+                <a:latin typeface="Consolas"/>
+              </a:rPr>
+              <a:t>.ipynb</a:t>
+            </a:r>
+            <a:r>
+              <a:rPr/>
+              <a:t> files: that’s a </a:t>
             </a:r>
             <a:r>
               <a:rPr>
@@ -11854,47 +11891,36 @@
             </a:r>
             <a:r>
               <a:rPr/>
-              <a:t> files, you write Markdown and code, just like </a:t>
-            </a:r>
-            <a:r>
-              <a:rPr>
-                <a:latin typeface="Consolas"/>
-              </a:rPr>
-              <a:t>.ipynb</a:t>
-            </a:r>
-            <a:r>
-              <a:rPr/>
-              <a:t>. Add some </a:t>
-            </a:r>
-            <a:r>
-              <a:rPr>
-                <a:latin typeface="Consolas"/>
-              </a:rPr>
-              <a:t>YAML</a:t>
-            </a:r>
-            <a:r>
-              <a:rPr/>
-              <a:t> configuration and Quarto does the intermediate steps. It integrates well with VSCode and Jupyter. Once you create your Quarto </a:t>
-            </a:r>
-            <a:r>
-              <a:rPr>
-                <a:latin typeface="Consolas"/>
-              </a:rPr>
-              <a:t>.qmd</a:t>
-            </a:r>
-            <a:r>
-              <a:rPr/>
-              <a:t> file, just render it with </a:t>
-            </a:r>
-            <a:r>
-              <a:rPr>
-                <a:latin typeface="Consolas"/>
-              </a:rPr>
-              <a:t>quarto render file.qmd</a:t>
-            </a:r>
-            <a:r>
-              <a:rPr/>
-              <a:t>.</a:t>
+              <a:t> file</a:t>
+            </a:r>
+            <a:r>
+              <a:rPr baseline="30000">
+                <a:hlinkClick r:id="rId2" action="ppaction://hlinksldjump"/>
+              </a:rPr>
+              <a:t>1</a:t>
+            </a:r>
+            <a:r>
+              <a:rPr/>
+              <a:t>. This keeps the configuration and content in the same file.</a:t>
+            </a:r>
+          </a:p>
+          <a:p>
+            <a:pPr lvl="0" indent="0" marL="0">
+              <a:buNone/>
+            </a:pPr>
+            <a:r>
+              <a:rPr/>
+              <a:t>You can then render the outputs using </a:t>
+            </a:r>
+            <a:r>
+              <a:rPr>
+                <a:latin typeface="Consolas"/>
+              </a:rPr>
+              <a:t>quarto render &lt;file.qmd&gt;</a:t>
+            </a:r>
+            <a:r>
+              <a:rPr/>
+              <a:t> in the command line.</a:t>
             </a:r>
           </a:p>
         </p:txBody>
@@ -11908,7 +11934,7 @@
           <p:nvPr/>
         </p:nvPicPr>
         <p:blipFill>
-          <a:blip r:embed="rId2"/>
+          <a:blip r:embed="rId3"/>
           <a:stretch>
             <a:fillRect/>
           </a:stretch>

</xml_diff>

<commit_message>
Work done by Sun Jul  3 20:55:50 PDT 2022
</commit_message>
<xml_diff>
--- a/docs/presentation-orig.pptx
+++ b/docs/presentation-orig.pptx
@@ -47,6 +47,7 @@
     <p:sldId id="295" r:id="rId41"/>
     <p:sldId id="296" r:id="rId42"/>
     <p:sldId id="297" r:id="rId43"/>
+    <p:sldId id="298" r:id="rId44"/>
   </p:sldIdLst>
   <p:sldSz cx="9144000" cy="5143500" type="screen16x9"/>
   <p:notesSz cx="6858000" cy="9144000"/>
@@ -5778,264 +5779,357 @@
           </a:p>
         </p:txBody>
       </p:sp>
-      <p:sp>
-        <p:nvSpPr>
-          <p:cNvPr id="3" name="Content Placeholder 2"/>
-          <p:cNvSpPr>
-            <a:spLocks noGrp="1"/>
-          </p:cNvSpPr>
-          <p:nvPr>
-            <p:ph idx="1" sz="half"/>
-          </p:nvPr>
-        </p:nvSpPr>
-        <p:spPr/>
-        <p:txBody>
-          <a:bodyPr/>
-          <a:lstStyle/>
-          <a:p>
-            <a:pPr lvl="0" indent="0">
-              <a:buNone/>
-            </a:pPr>
-            <a:r>
-              <a:rPr>
-                <a:solidFill>
-                  <a:srgbClr val="5E5E5E"/>
-                </a:solidFill>
-                <a:latin typeface="Consolas"/>
-              </a:rPr>
-              <a:t># Load the data</a:t>
-            </a:r>
-            <a:br/>
-            <a:r>
-              <a:rPr>
-                <a:solidFill>
-                  <a:srgbClr val="003B4F"/>
-                </a:solidFill>
-                <a:latin typeface="Consolas"/>
-              </a:rPr>
-              <a:t>df_wage </a:t>
-            </a:r>
-            <a:r>
-              <a:rPr>
-                <a:solidFill>
-                  <a:srgbClr val="5E5E5E"/>
-                </a:solidFill>
-                <a:latin typeface="Consolas"/>
-              </a:rPr>
-              <a:t>=</a:t>
-            </a:r>
-            <a:r>
-              <a:rPr>
-                <a:solidFill>
-                  <a:srgbClr val="003B4F"/>
-                </a:solidFill>
-                <a:latin typeface="Consolas"/>
-              </a:rPr>
-              <a:t> pd.read_csv(</a:t>
-            </a:r>
-            <a:r>
-              <a:rPr>
-                <a:solidFill>
-                  <a:srgbClr val="20794D"/>
-                </a:solidFill>
-                <a:latin typeface="Consolas"/>
-              </a:rPr>
-              <a:t>"data/wage1.csv"</a:t>
-            </a:r>
-            <a:r>
-              <a:rPr>
-                <a:solidFill>
-                  <a:srgbClr val="003B4F"/>
-                </a:solidFill>
-                <a:latin typeface="Consolas"/>
-              </a:rPr>
-              <a:t>)</a:t>
-            </a:r>
-            <a:br/>
-            <a:br/>
-            <a:r>
-              <a:rPr>
-                <a:solidFill>
-                  <a:srgbClr val="5E5E5E"/>
-                </a:solidFill>
-                <a:latin typeface="Consolas"/>
-              </a:rPr>
-              <a:t># Create an OLS model using the R syntax - assumes an intercept</a:t>
-            </a:r>
-            <a:br/>
-            <a:r>
-              <a:rPr>
-                <a:solidFill>
-                  <a:srgbClr val="003B4F"/>
-                </a:solidFill>
-                <a:latin typeface="Consolas"/>
-              </a:rPr>
-              <a:t>mod </a:t>
-            </a:r>
-            <a:r>
-              <a:rPr>
-                <a:solidFill>
-                  <a:srgbClr val="5E5E5E"/>
-                </a:solidFill>
-                <a:latin typeface="Consolas"/>
-              </a:rPr>
-              <a:t>=</a:t>
-            </a:r>
-            <a:r>
-              <a:rPr>
-                <a:solidFill>
-                  <a:srgbClr val="003B4F"/>
-                </a:solidFill>
-                <a:latin typeface="Consolas"/>
-              </a:rPr>
-              <a:t> smf.ols(formula</a:t>
-            </a:r>
-            <a:r>
-              <a:rPr>
-                <a:solidFill>
-                  <a:srgbClr val="5E5E5E"/>
-                </a:solidFill>
-                <a:latin typeface="Consolas"/>
-              </a:rPr>
-              <a:t>=</a:t>
-            </a:r>
-            <a:r>
-              <a:rPr>
-                <a:solidFill>
-                  <a:srgbClr val="20794D"/>
-                </a:solidFill>
-                <a:latin typeface="Consolas"/>
-              </a:rPr>
-              <a:t>"wage ~ educ"</a:t>
-            </a:r>
-            <a:r>
-              <a:rPr>
-                <a:solidFill>
-                  <a:srgbClr val="003B4F"/>
-                </a:solidFill>
-                <a:latin typeface="Consolas"/>
-              </a:rPr>
-              <a:t>,</a:t>
-            </a:r>
-            <a:br/>
-            <a:r>
-              <a:rPr>
-                <a:solidFill>
-                  <a:srgbClr val="003B4F"/>
-                </a:solidFill>
-                <a:latin typeface="Consolas"/>
-              </a:rPr>
-              <a:t>              data</a:t>
-            </a:r>
-            <a:r>
-              <a:rPr>
-                <a:solidFill>
-                  <a:srgbClr val="5E5E5E"/>
-                </a:solidFill>
-                <a:latin typeface="Consolas"/>
-              </a:rPr>
-              <a:t>=</a:t>
-            </a:r>
-            <a:r>
-              <a:rPr>
-                <a:solidFill>
-                  <a:srgbClr val="003B4F"/>
-                </a:solidFill>
-                <a:latin typeface="Consolas"/>
-              </a:rPr>
-              <a:t>df_wage)</a:t>
-            </a:r>
-            <a:br/>
-            <a:br/>
-            <a:r>
-              <a:rPr>
-                <a:solidFill>
-                  <a:srgbClr val="5E5E5E"/>
-                </a:solidFill>
-                <a:latin typeface="Consolas"/>
-              </a:rPr>
-              <a:t># Fit the model</a:t>
-            </a:r>
-            <a:br/>
-            <a:r>
-              <a:rPr>
-                <a:solidFill>
-                  <a:srgbClr val="003B4F"/>
-                </a:solidFill>
-                <a:latin typeface="Consolas"/>
-              </a:rPr>
-              <a:t>res </a:t>
-            </a:r>
-            <a:r>
-              <a:rPr>
-                <a:solidFill>
-                  <a:srgbClr val="5E5E5E"/>
-                </a:solidFill>
-                <a:latin typeface="Consolas"/>
-              </a:rPr>
-              <a:t>=</a:t>
-            </a:r>
-            <a:r>
-              <a:rPr>
-                <a:solidFill>
-                  <a:srgbClr val="003B4F"/>
-                </a:solidFill>
-                <a:latin typeface="Consolas"/>
-              </a:rPr>
-              <a:t> mod.fit()</a:t>
-            </a:r>
-            <a:br/>
-            <a:br/>
-            <a:r>
-              <a:rPr>
-                <a:solidFill>
-                  <a:srgbClr val="5E5E5E"/>
-                </a:solidFill>
-                <a:latin typeface="Consolas"/>
-              </a:rPr>
-              <a:t># Show the results</a:t>
-            </a:r>
-            <a:br/>
-            <a:r>
-              <a:rPr>
-                <a:solidFill>
-                  <a:srgbClr val="003B4F"/>
-                </a:solidFill>
-                <a:latin typeface="Consolas"/>
-              </a:rPr>
-              <a:t>display(Markdown(md(res.summary().</a:t>
-            </a:r>
-            <a:br/>
-            <a:r>
-              <a:rPr>
-                <a:solidFill>
-                  <a:srgbClr val="003B4F"/>
-                </a:solidFill>
-                <a:latin typeface="Consolas"/>
-              </a:rPr>
-              <a:t>        tables[</a:t>
-            </a:r>
-            <a:r>
-              <a:rPr>
-                <a:solidFill>
-                  <a:srgbClr val="AD0000"/>
-                </a:solidFill>
-                <a:latin typeface="Consolas"/>
-              </a:rPr>
-              <a:t>1</a:t>
-            </a:r>
-            <a:r>
-              <a:rPr>
-                <a:solidFill>
-                  <a:srgbClr val="003B4F"/>
-                </a:solidFill>
-                <a:latin typeface="Consolas"/>
-              </a:rPr>
-              <a:t>].as_html())))</a:t>
-            </a:r>
-          </a:p>
-        </p:txBody>
-      </p:sp>
+      <mc:AlternateContent xmlns:mc="http://schemas.openxmlformats.org/markup-compatibility/2006">
+        <mc:Choice xmlns:a14="http://schemas.microsoft.com/office/drawing/2010/main" Requires="a14">
+          <p:sp>
+            <p:nvSpPr>
+              <p:cNvPr id="3" name="Content Placeholder 2"/>
+              <p:cNvSpPr>
+                <a:spLocks noGrp="1"/>
+              </p:cNvSpPr>
+              <p:nvPr>
+                <p:ph idx="1" sz="half"/>
+              </p:nvPr>
+            </p:nvSpPr>
+            <p:spPr/>
+            <p:txBody>
+              <a:bodyPr/>
+              <a:lstStyle/>
+              <a:p>
+                <a:pPr lvl="0" indent="0" marL="0">
+                  <a:buNone/>
+                </a:pPr>
+                <a:r>
+                  <a:rPr/>
+                  <a:t>Here’s an example of the first regression in Wooldridge’s Introductory Econometrics book:</a:t>
+                </a:r>
+              </a:p>
+              <a:p>
+                <a:pPr lvl="0" indent="0" marL="0">
+                  <a:buNone/>
+                </a:pPr>
+                <a14:m>
+                  <m:oMathPara xmlns:m="http://schemas.openxmlformats.org/officeDocument/2006/math">
+                    <m:oMathParaPr>
+                      <m:jc m:val="center"/>
+                    </m:oMathParaPr>
+                    <m:oMath>
+                      <m:r>
+                        <m:rPr>
+                          <m:nor/>
+                          <m:sty m:val="p"/>
+                        </m:rPr>
+                        <m:t>wage</m:t>
+                      </m:r>
+                      <m:r>
+                        <m:rPr>
+                          <m:sty m:val="p"/>
+                        </m:rPr>
+                        <m:t>=</m:t>
+                      </m:r>
+                      <m:r>
+                        <m:t>α</m:t>
+                      </m:r>
+                      <m:r>
+                        <m:rPr>
+                          <m:sty m:val="p"/>
+                        </m:rPr>
+                        <m:t>+</m:t>
+                      </m:r>
+                      <m:sSub>
+                        <m:e>
+                          <m:r>
+                            <m:t>β</m:t>
+                          </m:r>
+                        </m:e>
+                        <m:sub>
+                          <m:r>
+                            <m:t>1</m:t>
+                          </m:r>
+                        </m:sub>
+                      </m:sSub>
+                      <m:r>
+                        <m:rPr>
+                          <m:sty m:val="p"/>
+                        </m:rPr>
+                        <m:t>×</m:t>
+                      </m:r>
+                      <m:r>
+                        <m:rPr>
+                          <m:nor/>
+                          <m:sty m:val="p"/>
+                        </m:rPr>
+                        <m:t>educ</m:t>
+                      </m:r>
+                      <m:r>
+                        <m:rPr>
+                          <m:sty m:val="p"/>
+                        </m:rPr>
+                        <m:t>+</m:t>
+                      </m:r>
+                      <m:r>
+                        <m:t>ϵ</m:t>
+                      </m:r>
+                    </m:oMath>
+                  </m:oMathPara>
+                </a14:m>
+              </a:p>
+              <a:p>
+                <a:pPr lvl="0" indent="0">
+                  <a:buNone/>
+                </a:pPr>
+                <a:r>
+                  <a:rPr>
+                    <a:solidFill>
+                      <a:srgbClr val="5E5E5E"/>
+                    </a:solidFill>
+                    <a:latin typeface="Consolas"/>
+                  </a:rPr>
+                  <a:t># Load the data</a:t>
+                </a:r>
+                <a:br/>
+                <a:r>
+                  <a:rPr>
+                    <a:solidFill>
+                      <a:srgbClr val="003B4F"/>
+                    </a:solidFill>
+                    <a:latin typeface="Consolas"/>
+                  </a:rPr>
+                  <a:t>df_wage </a:t>
+                </a:r>
+                <a:r>
+                  <a:rPr>
+                    <a:solidFill>
+                      <a:srgbClr val="5E5E5E"/>
+                    </a:solidFill>
+                    <a:latin typeface="Consolas"/>
+                  </a:rPr>
+                  <a:t>=</a:t>
+                </a:r>
+                <a:r>
+                  <a:rPr>
+                    <a:solidFill>
+                      <a:srgbClr val="003B4F"/>
+                    </a:solidFill>
+                    <a:latin typeface="Consolas"/>
+                  </a:rPr>
+                  <a:t> pd.read_csv(</a:t>
+                </a:r>
+                <a:r>
+                  <a:rPr>
+                    <a:solidFill>
+                      <a:srgbClr val="20794D"/>
+                    </a:solidFill>
+                    <a:latin typeface="Consolas"/>
+                  </a:rPr>
+                  <a:t>"data/wage1.csv"</a:t>
+                </a:r>
+                <a:r>
+                  <a:rPr>
+                    <a:solidFill>
+                      <a:srgbClr val="003B4F"/>
+                    </a:solidFill>
+                    <a:latin typeface="Consolas"/>
+                  </a:rPr>
+                  <a:t>)</a:t>
+                </a:r>
+                <a:br/>
+                <a:br/>
+                <a:r>
+                  <a:rPr>
+                    <a:solidFill>
+                      <a:srgbClr val="5E5E5E"/>
+                    </a:solidFill>
+                    <a:latin typeface="Consolas"/>
+                  </a:rPr>
+                  <a:t># Create an OLS model using </a:t>
+                </a:r>
+                <a:br/>
+                <a:r>
+                  <a:rPr>
+                    <a:solidFill>
+                      <a:srgbClr val="5E5E5E"/>
+                    </a:solidFill>
+                    <a:latin typeface="Consolas"/>
+                  </a:rPr>
+                  <a:t># the R syntax - assumes an intercept</a:t>
+                </a:r>
+                <a:br/>
+                <a:r>
+                  <a:rPr>
+                    <a:solidFill>
+                      <a:srgbClr val="003B4F"/>
+                    </a:solidFill>
+                    <a:latin typeface="Consolas"/>
+                  </a:rPr>
+                  <a:t>mod </a:t>
+                </a:r>
+                <a:r>
+                  <a:rPr>
+                    <a:solidFill>
+                      <a:srgbClr val="5E5E5E"/>
+                    </a:solidFill>
+                    <a:latin typeface="Consolas"/>
+                  </a:rPr>
+                  <a:t>=</a:t>
+                </a:r>
+                <a:r>
+                  <a:rPr>
+                    <a:solidFill>
+                      <a:srgbClr val="003B4F"/>
+                    </a:solidFill>
+                    <a:latin typeface="Consolas"/>
+                  </a:rPr>
+                  <a:t> smf.ols(formula</a:t>
+                </a:r>
+                <a:r>
+                  <a:rPr>
+                    <a:solidFill>
+                      <a:srgbClr val="5E5E5E"/>
+                    </a:solidFill>
+                    <a:latin typeface="Consolas"/>
+                  </a:rPr>
+                  <a:t>=</a:t>
+                </a:r>
+                <a:r>
+                  <a:rPr>
+                    <a:solidFill>
+                      <a:srgbClr val="20794D"/>
+                    </a:solidFill>
+                    <a:latin typeface="Consolas"/>
+                  </a:rPr>
+                  <a:t>"wage ~ educ"</a:t>
+                </a:r>
+                <a:r>
+                  <a:rPr>
+                    <a:solidFill>
+                      <a:srgbClr val="003B4F"/>
+                    </a:solidFill>
+                    <a:latin typeface="Consolas"/>
+                  </a:rPr>
+                  <a:t>,</a:t>
+                </a:r>
+                <a:br/>
+                <a:r>
+                  <a:rPr>
+                    <a:solidFill>
+                      <a:srgbClr val="003B4F"/>
+                    </a:solidFill>
+                    <a:latin typeface="Consolas"/>
+                  </a:rPr>
+                  <a:t>              data</a:t>
+                </a:r>
+                <a:r>
+                  <a:rPr>
+                    <a:solidFill>
+                      <a:srgbClr val="5E5E5E"/>
+                    </a:solidFill>
+                    <a:latin typeface="Consolas"/>
+                  </a:rPr>
+                  <a:t>=</a:t>
+                </a:r>
+                <a:r>
+                  <a:rPr>
+                    <a:solidFill>
+                      <a:srgbClr val="003B4F"/>
+                    </a:solidFill>
+                    <a:latin typeface="Consolas"/>
+                  </a:rPr>
+                  <a:t>df_wage)</a:t>
+                </a:r>
+                <a:br/>
+                <a:br/>
+                <a:r>
+                  <a:rPr>
+                    <a:solidFill>
+                      <a:srgbClr val="5E5E5E"/>
+                    </a:solidFill>
+                    <a:latin typeface="Consolas"/>
+                  </a:rPr>
+                  <a:t># Fit the model</a:t>
+                </a:r>
+                <a:br/>
+                <a:r>
+                  <a:rPr>
+                    <a:solidFill>
+                      <a:srgbClr val="003B4F"/>
+                    </a:solidFill>
+                    <a:latin typeface="Consolas"/>
+                  </a:rPr>
+                  <a:t>res </a:t>
+                </a:r>
+                <a:r>
+                  <a:rPr>
+                    <a:solidFill>
+                      <a:srgbClr val="5E5E5E"/>
+                    </a:solidFill>
+                    <a:latin typeface="Consolas"/>
+                  </a:rPr>
+                  <a:t>=</a:t>
+                </a:r>
+                <a:r>
+                  <a:rPr>
+                    <a:solidFill>
+                      <a:srgbClr val="003B4F"/>
+                    </a:solidFill>
+                    <a:latin typeface="Consolas"/>
+                  </a:rPr>
+                  <a:t> mod.fit()</a:t>
+                </a:r>
+                <a:br/>
+                <a:br/>
+                <a:r>
+                  <a:rPr>
+                    <a:solidFill>
+                      <a:srgbClr val="5E5E5E"/>
+                    </a:solidFill>
+                    <a:latin typeface="Consolas"/>
+                  </a:rPr>
+                  <a:t># Show the results</a:t>
+                </a:r>
+                <a:br/>
+                <a:r>
+                  <a:rPr>
+                    <a:solidFill>
+                      <a:srgbClr val="003B4F"/>
+                    </a:solidFill>
+                    <a:latin typeface="Consolas"/>
+                  </a:rPr>
+                  <a:t>display(Markdown(md(res.summary().</a:t>
+                </a:r>
+                <a:br/>
+                <a:r>
+                  <a:rPr>
+                    <a:solidFill>
+                      <a:srgbClr val="003B4F"/>
+                    </a:solidFill>
+                    <a:latin typeface="Consolas"/>
+                  </a:rPr>
+                  <a:t>        tables[</a:t>
+                </a:r>
+                <a:r>
+                  <a:rPr>
+                    <a:solidFill>
+                      <a:srgbClr val="AD0000"/>
+                    </a:solidFill>
+                    <a:latin typeface="Consolas"/>
+                  </a:rPr>
+                  <a:t>1</a:t>
+                </a:r>
+                <a:r>
+                  <a:rPr>
+                    <a:solidFill>
+                      <a:srgbClr val="003B4F"/>
+                    </a:solidFill>
+                    <a:latin typeface="Consolas"/>
+                  </a:rPr>
+                  <a:t>].as_markdown())))</a:t>
+                </a:r>
+              </a:p>
+            </p:txBody>
+          </p:sp>
+        </mc:Choice>
+      </mc:AlternateContent>
       <p:graphicFrame>
         <p:nvGraphicFramePr>
           <p:cNvPr id="6" name="Content Placeholder 5"/>
@@ -10970,6 +11064,202 @@
             <p:ph type="title"/>
           </p:nvPr>
         </p:nvSpPr>
+        <p:spPr/>
+        <p:txBody>
+          <a:bodyPr/>
+          <a:lstStyle/>
+          <a:p>
+            <a:pPr lvl="0" indent="0" marL="0">
+              <a:buNone/>
+            </a:pPr>
+            <a:r>
+              <a:rPr/>
+              <a:t>Where I think Quarto is good (July 2022)</a:t>
+            </a:r>
+          </a:p>
+        </p:txBody>
+      </p:sp>
+      <p:sp>
+        <p:nvSpPr>
+          <p:cNvPr id="3" name="Content Placeholder 2"/>
+          <p:cNvSpPr>
+            <a:spLocks noGrp="1"/>
+          </p:cNvSpPr>
+          <p:nvPr>
+            <p:ph idx="1" sz="half"/>
+          </p:nvPr>
+        </p:nvSpPr>
+        <p:spPr/>
+        <p:txBody>
+          <a:bodyPr/>
+          <a:lstStyle/>
+          <a:p>
+            <a:pPr lvl="0" indent="0" marL="0">
+              <a:spcBef>
+                <a:spcPts val="3000"/>
+              </a:spcBef>
+              <a:buNone/>
+            </a:pPr>
+            <a:r>
+              <a:rPr b="1"/>
+              <a:t>Articles: maybe yes</a:t>
+            </a:r>
+          </a:p>
+          <a:p>
+            <a:pPr lvl="0" indent="0" marL="0">
+              <a:buNone/>
+            </a:pPr>
+            <a:r>
+              <a:rPr/>
+              <a:t>I think Quarto is more helpful for a team that already uses Git </a:t>
+            </a:r>
+            <a:r>
+              <a:rPr b="1"/>
+              <a:t>with</a:t>
+            </a:r>
+            <a:r>
+              <a:rPr/>
+              <a:t> Python notebooks or LaTeX to write articles. Microsoft Word collaboration through SharePoint and Teams is easier than Git and Quarto… but it’s not reproducible.</a:t>
+            </a:r>
+          </a:p>
+          <a:p>
+            <a:pPr lvl="0" indent="0" marL="0">
+              <a:spcBef>
+                <a:spcPts val="3000"/>
+              </a:spcBef>
+              <a:buNone/>
+            </a:pPr>
+            <a:r>
+              <a:rPr b="1"/>
+              <a:t>Python notebook: excellent</a:t>
+            </a:r>
+          </a:p>
+          <a:p>
+            <a:pPr lvl="0" indent="0" marL="0">
+              <a:buNone/>
+            </a:pPr>
+            <a:r>
+              <a:rPr/>
+              <a:t>Quarto adds to Python notebooks without detracting anything. All you need are a few YAML lines.</a:t>
+            </a:r>
+          </a:p>
+        </p:txBody>
+      </p:sp>
+      <p:sp>
+        <p:nvSpPr>
+          <p:cNvPr id="4" name="Content Placeholder 3"/>
+          <p:cNvSpPr>
+            <a:spLocks noGrp="1"/>
+          </p:cNvSpPr>
+          <p:nvPr>
+            <p:ph idx="2" sz="half"/>
+          </p:nvPr>
+        </p:nvSpPr>
+        <p:spPr/>
+        <p:txBody>
+          <a:bodyPr/>
+          <a:lstStyle/>
+          <a:p>
+            <a:pPr lvl="0" indent="0" marL="0">
+              <a:spcBef>
+                <a:spcPts val="3000"/>
+              </a:spcBef>
+              <a:buNone/>
+            </a:pPr>
+            <a:r>
+              <a:rPr b="1"/>
+              <a:t>Blog: excellent</a:t>
+            </a:r>
+          </a:p>
+          <a:p>
+            <a:pPr lvl="0" indent="0" marL="0">
+              <a:buNone/>
+            </a:pPr>
+            <a:r>
+              <a:rPr/>
+              <a:t>Quarto allows me to have a scriptable, Python-based blog. I can automate my blog to tweet and post to LinkedIn when I write new articles.</a:t>
+            </a:r>
+          </a:p>
+          <a:p>
+            <a:pPr lvl="0" indent="0" marL="0">
+              <a:spcBef>
+                <a:spcPts val="3000"/>
+              </a:spcBef>
+              <a:buNone/>
+            </a:pPr>
+            <a:r>
+              <a:rPr b="1"/>
+              <a:t>Presentations: maybe not</a:t>
+            </a:r>
+          </a:p>
+          <a:p>
+            <a:pPr lvl="0" indent="0" marL="0">
+              <a:buNone/>
+            </a:pPr>
+            <a:r>
+              <a:rPr/>
+              <a:t>Only if you have</a:t>
+            </a:r>
+          </a:p>
+          <a:p>
+            <a:pPr lvl="0"/>
+            <a:r>
+              <a:rPr i="1"/>
+              <a:t>a lot</a:t>
+            </a:r>
+            <a:r>
+              <a:rPr/>
+              <a:t> of dynamic content</a:t>
+            </a:r>
+          </a:p>
+          <a:p>
+            <a:pPr lvl="0"/>
+            <a:r>
+              <a:rPr/>
+              <a:t>Reproducibility needs</a:t>
+            </a:r>
+          </a:p>
+          <a:p>
+            <a:pPr lvl="0"/>
+            <a:r>
+              <a:rPr/>
+              <a:t>Collaborators used to Git/Beamer</a:t>
+            </a:r>
+          </a:p>
+        </p:txBody>
+      </p:sp>
+    </p:spTree>
+  </p:cSld>
+</p:sld>
+</file>
+
+<file path=ppt/slides/slide42.xml><?xml version="1.0" encoding="utf-8"?>
+<p:sld xmlns:a="http://schemas.openxmlformats.org/drawingml/2006/main" xmlns:r="http://schemas.openxmlformats.org/officeDocument/2006/relationships" xmlns:p="http://schemas.openxmlformats.org/presentationml/2006/main">
+  <p:cSld>
+    <p:spTree>
+      <p:nvGrpSpPr>
+        <p:cNvPr id="1" name=""/>
+        <p:cNvGrpSpPr/>
+        <p:nvPr/>
+      </p:nvGrpSpPr>
+      <p:grpSpPr>
+        <a:xfrm>
+          <a:off x="0" y="0"/>
+          <a:ext cx="0" cy="0"/>
+          <a:chOff x="0" y="0"/>
+          <a:chExt cx="0" cy="0"/>
+        </a:xfrm>
+      </p:grpSpPr>
+      <p:sp>
+        <p:nvSpPr>
+          <p:cNvPr id="2" name="Title 1"/>
+          <p:cNvSpPr>
+            <a:spLocks noGrp="1"/>
+          </p:cNvSpPr>
+          <p:nvPr>
+            <p:ph type="title"/>
+          </p:nvPr>
+        </p:nvSpPr>
         <p:spPr>
           <a:xfrm>
             <a:off x="722313" y="3305176"/>
@@ -10995,7 +11285,7 @@
 </p:sld>
 </file>
 
-<file path=ppt/slides/slide42.xml><?xml version="1.0" encoding="utf-8"?>
+<file path=ppt/slides/slide43.xml><?xml version="1.0" encoding="utf-8"?>
 <p:sld xmlns:a="http://schemas.openxmlformats.org/drawingml/2006/main" xmlns:r="http://schemas.openxmlformats.org/officeDocument/2006/relationships" xmlns:p="http://schemas.openxmlformats.org/presentationml/2006/main">
   <p:cSld>
     <p:spTree>

</xml_diff>

<commit_message>
Work done by Sun Jul  3 21:24:29 PDT 2022
</commit_message>
<xml_diff>
--- a/docs/presentation-orig.pptx
+++ b/docs/presentation-orig.pptx
@@ -4045,7 +4045,7 @@
             </a:pPr>
             <a:r>
               <a:rPr/>
-              <a:t>Using Quarto for everything</a:t>
+              <a:t>Using Quarto with Python</a:t>
             </a:r>
           </a:p>
         </p:txBody>
@@ -6130,348 +6130,35 @@
           </p:sp>
         </mc:Choice>
       </mc:AlternateContent>
-      <p:graphicFrame>
-        <p:nvGraphicFramePr>
-          <p:cNvPr id="6" name="Content Placeholder 5"/>
-          <p:cNvGraphicFramePr>
-            <a:graphicFrameLocks noGrp="1"/>
-          </p:cNvGraphicFramePr>
-          <p:nvPr>
-            <p:ph idx="1"/>
-          </p:nvPr>
-        </p:nvGraphicFramePr>
-        <p:xfrm>
-          <a:off x="4648200" y="1193800"/>
-          <a:ext cx="4038600" cy="3390900"/>
-        </p:xfrm>
-        <a:graphic>
-          <a:graphicData uri="http://schemas.openxmlformats.org/drawingml/2006/table">
-            <a:tbl>
-              <a:tblPr firstRow="0" bandRow="1">
-                <a:tableStyleId>{5C22544A-7EE6-4342-B048-85BDC9FD1C3A}</a:tableStyleId>
-              </a:tblPr>
-              <a:tblGrid>
-                <a:gridCol w="571500"/>
-                <a:gridCol w="571500"/>
-                <a:gridCol w="571500"/>
-                <a:gridCol w="571500"/>
-                <a:gridCol w="571500"/>
-                <a:gridCol w="571500"/>
-                <a:gridCol w="571500"/>
-              </a:tblGrid>
-              <a:tr h="0">
-                <a:tc>
-                  <a:txBody>
-                    <a:bodyPr/>
-                    <a:lstStyle/>
-                    <a:p>
-                      <a:endParaRPr/>
-                    </a:p>
-                  </a:txBody>
-                </a:tc>
-                <a:tc>
-                  <a:txBody>
-                    <a:bodyPr/>
-                    <a:lstStyle/>
-                    <a:p>
-                      <a:pPr lvl="0" indent="0" marL="0">
-                        <a:buNone/>
-                      </a:pPr>
-                      <a:r>
-                        <a:rPr/>
-                        <a:t>coef</a:t>
-                      </a:r>
-                    </a:p>
-                  </a:txBody>
-                </a:tc>
-                <a:tc>
-                  <a:txBody>
-                    <a:bodyPr/>
-                    <a:lstStyle/>
-                    <a:p>
-                      <a:pPr lvl="0" indent="0" marL="0">
-                        <a:buNone/>
-                      </a:pPr>
-                      <a:r>
-                        <a:rPr/>
-                        <a:t>std err</a:t>
-                      </a:r>
-                    </a:p>
-                  </a:txBody>
-                </a:tc>
-                <a:tc>
-                  <a:txBody>
-                    <a:bodyPr/>
-                    <a:lstStyle/>
-                    <a:p>
-                      <a:pPr lvl="0" indent="0" marL="0">
-                        <a:buNone/>
-                      </a:pPr>
-                      <a:r>
-                        <a:rPr/>
-                        <a:t>t</a:t>
-                      </a:r>
-                    </a:p>
-                  </a:txBody>
-                </a:tc>
-                <a:tc>
-                  <a:txBody>
-                    <a:bodyPr/>
-                    <a:lstStyle/>
-                    <a:p>
-                      <a:pPr lvl="0" indent="0" marL="0">
-                        <a:buNone/>
-                      </a:pPr>
-                      <a:r>
-                        <a:rPr/>
-                        <a:t>P&gt;</a:t>
-                      </a:r>
-                    </a:p>
-                  </a:txBody>
-                </a:tc>
-                <a:tc>
-                  <a:txBody>
-                    <a:bodyPr/>
-                    <a:lstStyle/>
-                    <a:p>
-                      <a:pPr lvl="0" indent="0" marL="0">
-                        <a:buNone/>
-                      </a:pPr>
-                      <a:r>
-                        <a:rPr/>
-                        <a:t>t</a:t>
-                      </a:r>
-                    </a:p>
-                  </a:txBody>
-                </a:tc>
-                <a:tc>
-                  <a:txBody>
-                    <a:bodyPr/>
-                    <a:lstStyle/>
-                    <a:p>
-                      <a:endParaRPr/>
-                    </a:p>
-                  </a:txBody>
-                </a:tc>
-              </a:tr>
-              <a:tr h="0">
-                <a:tc>
-                  <a:txBody>
-                    <a:bodyPr/>
-                    <a:lstStyle/>
-                    <a:p>
-                      <a:pPr lvl="0" indent="0" marL="0">
-                        <a:buNone/>
-                      </a:pPr>
-                      <a:r>
-                        <a:rPr/>
-                        <a:t>Intercept</a:t>
-                      </a:r>
-                    </a:p>
-                  </a:txBody>
-                </a:tc>
-                <a:tc>
-                  <a:txBody>
-                    <a:bodyPr/>
-                    <a:lstStyle/>
-                    <a:p>
-                      <a:pPr lvl="0" indent="0" marL="0">
-                        <a:buNone/>
-                      </a:pPr>
-                      <a:r>
-                        <a:rPr/>
-                        <a:t>-0.9049</a:t>
-                      </a:r>
-                    </a:p>
-                  </a:txBody>
-                </a:tc>
-                <a:tc>
-                  <a:txBody>
-                    <a:bodyPr/>
-                    <a:lstStyle/>
-                    <a:p>
-                      <a:pPr lvl="0" indent="0" marL="0">
-                        <a:buNone/>
-                      </a:pPr>
-                      <a:r>
-                        <a:rPr/>
-                        <a:t>0.685</a:t>
-                      </a:r>
-                    </a:p>
-                  </a:txBody>
-                </a:tc>
-                <a:tc>
-                  <a:txBody>
-                    <a:bodyPr/>
-                    <a:lstStyle/>
-                    <a:p>
-                      <a:pPr lvl="0" indent="0" marL="0">
-                        <a:buNone/>
-                      </a:pPr>
-                      <a:r>
-                        <a:rPr/>
-                        <a:t>-1.321</a:t>
-                      </a:r>
-                    </a:p>
-                  </a:txBody>
-                </a:tc>
-                <a:tc>
-                  <a:txBody>
-                    <a:bodyPr/>
-                    <a:lstStyle/>
-                    <a:p>
-                      <a:pPr lvl="0" indent="0" marL="0">
-                        <a:buNone/>
-                      </a:pPr>
-                      <a:r>
-                        <a:rPr/>
-                        <a:t>0.187</a:t>
-                      </a:r>
-                    </a:p>
-                  </a:txBody>
-                </a:tc>
-                <a:tc>
-                  <a:txBody>
-                    <a:bodyPr/>
-                    <a:lstStyle/>
-                    <a:p>
-                      <a:pPr lvl="0" indent="0" marL="0">
-                        <a:buNone/>
-                      </a:pPr>
-                      <a:r>
-                        <a:rPr/>
-                        <a:t>-2.250</a:t>
-                      </a:r>
-                    </a:p>
-                  </a:txBody>
-                </a:tc>
-                <a:tc>
-                  <a:txBody>
-                    <a:bodyPr/>
-                    <a:lstStyle/>
-                    <a:p>
-                      <a:pPr lvl="0" indent="0" marL="0">
-                        <a:buNone/>
-                      </a:pPr>
-                      <a:r>
-                        <a:rPr/>
-                        <a:t>0.441</a:t>
-                      </a:r>
-                    </a:p>
-                  </a:txBody>
-                </a:tc>
-              </a:tr>
-              <a:tr h="0">
-                <a:tc>
-                  <a:txBody>
-                    <a:bodyPr/>
-                    <a:lstStyle/>
-                    <a:p>
-                      <a:pPr lvl="0" indent="0" marL="0">
-                        <a:buNone/>
-                      </a:pPr>
-                      <a:r>
-                        <a:rPr/>
-                        <a:t>educ</a:t>
-                      </a:r>
-                    </a:p>
-                  </a:txBody>
-                </a:tc>
-                <a:tc>
-                  <a:txBody>
-                    <a:bodyPr/>
-                    <a:lstStyle/>
-                    <a:p>
-                      <a:pPr lvl="0" indent="0" marL="0">
-                        <a:buNone/>
-                      </a:pPr>
-                      <a:r>
-                        <a:rPr/>
-                        <a:t>0.5414</a:t>
-                      </a:r>
-                    </a:p>
-                  </a:txBody>
-                </a:tc>
-                <a:tc>
-                  <a:txBody>
-                    <a:bodyPr/>
-                    <a:lstStyle/>
-                    <a:p>
-                      <a:pPr lvl="0" indent="0" marL="0">
-                        <a:buNone/>
-                      </a:pPr>
-                      <a:r>
-                        <a:rPr/>
-                        <a:t>0.053</a:t>
-                      </a:r>
-                    </a:p>
-                  </a:txBody>
-                </a:tc>
-                <a:tc>
-                  <a:txBody>
-                    <a:bodyPr/>
-                    <a:lstStyle/>
-                    <a:p>
-                      <a:pPr lvl="0" indent="0" marL="0">
-                        <a:buNone/>
-                      </a:pPr>
-                      <a:r>
-                        <a:rPr/>
-                        <a:t>10.167</a:t>
-                      </a:r>
-                    </a:p>
-                  </a:txBody>
-                </a:tc>
-                <a:tc>
-                  <a:txBody>
-                    <a:bodyPr/>
-                    <a:lstStyle/>
-                    <a:p>
-                      <a:pPr lvl="0" indent="0" marL="0">
-                        <a:buNone/>
-                      </a:pPr>
-                      <a:r>
-                        <a:rPr/>
-                        <a:t>0.000</a:t>
-                      </a:r>
-                    </a:p>
-                  </a:txBody>
-                </a:tc>
-                <a:tc>
-                  <a:txBody>
-                    <a:bodyPr/>
-                    <a:lstStyle/>
-                    <a:p>
-                      <a:pPr lvl="0" indent="0" marL="0">
-                        <a:buNone/>
-                      </a:pPr>
-                      <a:r>
-                        <a:rPr/>
-                        <a:t>0.437</a:t>
-                      </a:r>
-                    </a:p>
-                  </a:txBody>
-                </a:tc>
-                <a:tc>
-                  <a:txBody>
-                    <a:bodyPr/>
-                    <a:lstStyle/>
-                    <a:p>
-                      <a:pPr lvl="0" indent="0" marL="0">
-                        <a:buNone/>
-                      </a:pPr>
-                      <a:r>
-                        <a:rPr/>
-                        <a:t>0.646</a:t>
-                      </a:r>
-                    </a:p>
-                  </a:txBody>
-                </a:tc>
-              </a:tr>
-            </a:tbl>
-          </a:graphicData>
-        </a:graphic>
-      </p:graphicFrame>
+      <p:sp>
+        <p:nvSpPr>
+          <p:cNvPr id="4" name="Content Placeholder 3"/>
+          <p:cNvSpPr>
+            <a:spLocks noGrp="1"/>
+          </p:cNvSpPr>
+          <p:nvPr>
+            <p:ph idx="2" sz="half"/>
+          </p:nvPr>
+        </p:nvSpPr>
+        <p:spPr/>
+        <p:txBody>
+          <a:bodyPr/>
+          <a:lstStyle/>
+          <a:p>
+            <a:pPr lvl="0" indent="0">
+              <a:buNone/>
+            </a:pPr>
+            <a:r>
+              <a:rPr>
+                <a:latin typeface="Consolas"/>
+              </a:rPr>
+              <a:t>     coef  std err       t  P&gt;|t|
+0 -0.9049    0.685  -1.321  0.187
+1  0.5414    0.053  10.167  0.000</a:t>
+            </a:r>
+          </a:p>
+        </p:txBody>
+      </p:sp>
     </p:spTree>
   </p:cSld>
 </p:sld>

</xml_diff>

<commit_message>
Work done by Sun Jul  3 21:50:32 PDT 2022
</commit_message>
<xml_diff>
--- a/docs/presentation-orig.pptx
+++ b/docs/presentation-orig.pptx
@@ -4226,37 +4226,7 @@
             </a:pPr>
             <a:r>
               <a:rPr/>
-              <a:t>Whether you use Quarto from </a:t>
-            </a:r>
-            <a:r>
-              <a:rPr>
-                <a:latin typeface="Consolas"/>
-              </a:rPr>
-              <a:t>.qmd</a:t>
-            </a:r>
-            <a:r>
-              <a:rPr/>
-              <a:t>, </a:t>
-            </a:r>
-            <a:r>
-              <a:rPr>
-                <a:latin typeface="Consolas"/>
-              </a:rPr>
-              <a:t>.ipynb</a:t>
-            </a:r>
-            <a:r>
-              <a:rPr/>
-              <a:t>, or </a:t>
-            </a:r>
-            <a:r>
-              <a:rPr>
-                <a:latin typeface="Consolas"/>
-              </a:rPr>
-              <a:t>.Rmd</a:t>
-            </a:r>
-            <a:r>
-              <a:rPr/>
-              <a:t> files, you always start with a YAML front-matter file.</a:t>
+              <a:t>Quarto files always start with a YAML front-matter.</a:t>
             </a:r>
           </a:p>
           <a:p>
@@ -4390,7 +4360,7 @@
                 </a:solidFill>
                 <a:latin typeface="Consolas"/>
               </a:rPr>
-              <a:t>"Using Quarto for everything"</a:t>
+              <a:t>"Quarto with Python"</a:t>
             </a:r>
             <a:br/>
             <a:r>
@@ -4428,6 +4398,34 @@
                 </a:solidFill>
                 <a:latin typeface="Consolas"/>
               </a:rPr>
+              <a:t>  </a:t>
+            </a:r>
+            <a:r>
+              <a:rPr>
+                <a:solidFill>
+                  <a:srgbClr val="4758AB"/>
+                </a:solidFill>
+                <a:latin typeface="Consolas"/>
+              </a:rPr>
+              <a:t>pptx</a:t>
+            </a:r>
+            <a:r>
+              <a:rPr>
+                <a:solidFill>
+                  <a:srgbClr val="003B4F"/>
+                </a:solidFill>
+                <a:latin typeface="Consolas"/>
+              </a:rPr>
+              <a:t>:</a:t>
+            </a:r>
+            <a:br/>
+            <a:r>
+              <a:rPr>
+                <a:solidFill>
+                  <a:srgbClr val="657422"/>
+                </a:solidFill>
+                <a:latin typeface="Consolas"/>
+              </a:rPr>
               <a:t>    </a:t>
             </a:r>
             <a:r>
@@ -4437,7 +4435,7 @@
                 </a:solidFill>
                 <a:latin typeface="Consolas"/>
               </a:rPr>
-              <a:t>pptx</a:t>
+              <a:t>reference-doc</a:t>
             </a:r>
             <a:r>
               <a:rPr>
@@ -4448,6 +4446,15 @@
               </a:rPr>
               <a:t>:</a:t>
             </a:r>
+            <a:r>
+              <a:rPr>
+                <a:solidFill>
+                  <a:srgbClr val="657422"/>
+                </a:solidFill>
+                <a:latin typeface="Consolas"/>
+              </a:rPr>
+              <a:t> templates/template.pptx</a:t>
+            </a:r>
             <a:br/>
             <a:r>
               <a:rPr>
@@ -4456,7 +4463,7 @@
                 </a:solidFill>
                 <a:latin typeface="Consolas"/>
               </a:rPr>
-              <a:t>        </a:t>
+              <a:t>  </a:t>
             </a:r>
             <a:r>
               <a:rPr>
@@ -4465,7 +4472,7 @@
                 </a:solidFill>
                 <a:latin typeface="Consolas"/>
               </a:rPr>
-              <a:t>reference-doc</a:t>
+              <a:t>revealjs</a:t>
             </a:r>
             <a:r>
               <a:rPr>
@@ -4476,6 +4483,7 @@
               </a:rPr>
               <a:t>:</a:t>
             </a:r>
+            <a:br/>
             <a:r>
               <a:rPr>
                 <a:solidFill>
@@ -4483,7 +4491,43 @@
                 </a:solidFill>
                 <a:latin typeface="Consolas"/>
               </a:rPr>
-              <a:t> templates/template.pptx</a:t>
+              <a:t>    </a:t>
+            </a:r>
+            <a:r>
+              <a:rPr>
+                <a:solidFill>
+                  <a:srgbClr val="4758AB"/>
+                </a:solidFill>
+                <a:latin typeface="Consolas"/>
+              </a:rPr>
+              <a:t>incremental</a:t>
+            </a:r>
+            <a:r>
+              <a:rPr>
+                <a:solidFill>
+                  <a:srgbClr val="003B4F"/>
+                </a:solidFill>
+                <a:latin typeface="Consolas"/>
+              </a:rPr>
+              <a:t>:</a:t>
+            </a:r>
+            <a:r>
+              <a:rPr>
+                <a:solidFill>
+                  <a:srgbClr val="657422"/>
+                </a:solidFill>
+                <a:latin typeface="Consolas"/>
+              </a:rPr>
+              <a:t> </a:t>
+            </a:r>
+            <a:r>
+              <a:rPr>
+                <a:solidFill>
+                  <a:srgbClr val="20794D"/>
+                </a:solidFill>
+                <a:latin typeface="Consolas"/>
+              </a:rPr>
+              <a:t>false</a:t>
             </a:r>
             <a:br/>
             <a:r>
@@ -4494,80 +4538,6 @@
                 <a:latin typeface="Consolas"/>
               </a:rPr>
               <a:t>    </a:t>
-            </a:r>
-            <a:r>
-              <a:rPr>
-                <a:solidFill>
-                  <a:srgbClr val="4758AB"/>
-                </a:solidFill>
-                <a:latin typeface="Consolas"/>
-              </a:rPr>
-              <a:t>revealjs</a:t>
-            </a:r>
-            <a:r>
-              <a:rPr>
-                <a:solidFill>
-                  <a:srgbClr val="003B4F"/>
-                </a:solidFill>
-                <a:latin typeface="Consolas"/>
-              </a:rPr>
-              <a:t>:</a:t>
-            </a:r>
-            <a:br/>
-            <a:r>
-              <a:rPr>
-                <a:solidFill>
-                  <a:srgbClr val="657422"/>
-                </a:solidFill>
-                <a:latin typeface="Consolas"/>
-              </a:rPr>
-              <a:t>        </a:t>
-            </a:r>
-            <a:r>
-              <a:rPr>
-                <a:solidFill>
-                  <a:srgbClr val="4758AB"/>
-                </a:solidFill>
-                <a:latin typeface="Consolas"/>
-              </a:rPr>
-              <a:t>incremental</a:t>
-            </a:r>
-            <a:r>
-              <a:rPr>
-                <a:solidFill>
-                  <a:srgbClr val="003B4F"/>
-                </a:solidFill>
-                <a:latin typeface="Consolas"/>
-              </a:rPr>
-              <a:t>:</a:t>
-            </a:r>
-            <a:r>
-              <a:rPr>
-                <a:solidFill>
-                  <a:srgbClr val="657422"/>
-                </a:solidFill>
-                <a:latin typeface="Consolas"/>
-              </a:rPr>
-              <a:t> </a:t>
-            </a:r>
-            <a:r>
-              <a:rPr>
-                <a:solidFill>
-                  <a:srgbClr val="20794D"/>
-                </a:solidFill>
-                <a:latin typeface="Consolas"/>
-              </a:rPr>
-              <a:t>false</a:t>
-            </a:r>
-            <a:br/>
-            <a:r>
-              <a:rPr>
-                <a:solidFill>
-                  <a:srgbClr val="657422"/>
-                </a:solidFill>
-                <a:latin typeface="Consolas"/>
-              </a:rPr>
-              <a:t>        </a:t>
             </a:r>
             <a:r>
               <a:rPr>
@@ -4738,7 +4708,7 @@
                 </a:pPr>
                 <a:r>
                   <a:rPr b="1"/>
-                  <a:t>Writing the main content</a:t>
+                  <a:t>Writing content</a:t>
                 </a:r>
               </a:p>
               <a:p>
@@ -4747,7 +4717,7 @@
                 </a:pPr>
                 <a:r>
                   <a:rPr/>
-                  <a:t>Most writing in Quarto is done in </a:t>
+                  <a:t>Write content in </a:t>
                 </a:r>
                 <a:r>
                   <a:rPr>
@@ -4766,7 +4736,7 @@
                 </a:pPr>
                 <a:r>
                   <a:rPr/>
-                  <a:t>Quarto’s Markdown supports everything I’m used to: figures, tables, bibliography, etc.</a:t>
+                  <a:t>Quarto’s Markdown supports everything figures, tables, bibliography, etc.</a:t>
                 </a:r>
               </a:p>
               <a:p>
@@ -4795,7 +4765,7 @@
                 </a:r>
                 <a:r>
                   <a:rPr/>
-                  <a:t> and even LaTeX equations:</a:t>
+                  <a:t>, and even LaTeX equations:</a:t>
                 </a:r>
               </a:p>
               <a:p>
@@ -4865,7 +4835,7 @@
                 </a:solidFill>
                 <a:latin typeface="Consolas"/>
               </a:rPr>
-              <a:t>### Writing the main content</a:t>
+              <a:t>### Writing content</a:t>
             </a:r>
             <a:br/>
             <a:br/>
@@ -4876,7 +4846,7 @@
                 </a:solidFill>
                 <a:latin typeface="Consolas"/>
               </a:rPr>
-              <a:t>Most writing in Quarto is done in </a:t>
+              <a:t>Write content in </a:t>
             </a:r>
             <a:r>
               <a:rPr>
@@ -4944,7 +4914,7 @@
                 </a:solidFill>
                 <a:latin typeface="Consolas"/>
               </a:rPr>
-              <a:t>It also supports lots of extra features, like</a:t>
+              <a:t>It also supports lots of extra features, </a:t>
             </a:r>
             <a:br/>
             <a:r>
@@ -4954,7 +4924,7 @@
                 </a:solidFill>
                 <a:latin typeface="Consolas"/>
               </a:rPr>
-              <a:t>diagrams with </a:t>
+              <a:t>like diagrams with </a:t>
             </a:r>
             <a:r>
               <a:rPr>
@@ -4974,6 +4944,7 @@
               </a:rPr>
               <a:t> and </a:t>
             </a:r>
+            <a:br/>
             <a:r>
               <a:rPr>
                 <a:solidFill>
@@ -4990,17 +4961,7 @@
                 </a:solidFill>
                 <a:latin typeface="Consolas"/>
               </a:rPr>
-              <a:t> and</a:t>
-            </a:r>
-            <a:br/>
-            <a:r>
-              <a:rPr>
-                <a:solidFill>
-                  <a:srgbClr val="003B4F"/>
-                </a:solidFill>
-                <a:latin typeface="Consolas"/>
-              </a:rPr>
-              <a:t>even LaTeX equations: </a:t>
+              <a:t>, and even LaTeX equations: </a:t>
             </a:r>
             <a:br/>
             <a:br/>
@@ -5693,7 +5654,7 @@
               <a:rPr>
                 <a:latin typeface="Consolas"/>
               </a:rPr>
-              <a:t>flowchart LR
+              <a:t>flowchart UD
 A[Hard] --&gt;|Text| B(Round)
 B --&gt; C{Decision}
 C --&gt;|One| D[Result 1]
@@ -5718,8 +5679,8 @@
         </p:blipFill>
         <p:spPr bwMode="auto">
           <a:xfrm>
-            <a:off x="4648200" y="2362200"/>
-            <a:ext cx="4038600" cy="1054100"/>
+            <a:off x="4648200" y="2387600"/>
+            <a:ext cx="4038600" cy="1016000"/>
           </a:xfrm>
           <a:prstGeom prst="rect">
             <a:avLst/>
@@ -6123,42 +6084,274 @@
                     </a:solidFill>
                     <a:latin typeface="Consolas"/>
                   </a:rPr>
-                  <a:t>].as_markdown())))</a:t>
+                  <a:t>].as_html())))</a:t>
                 </a:r>
               </a:p>
             </p:txBody>
           </p:sp>
         </mc:Choice>
       </mc:AlternateContent>
-      <p:sp>
-        <p:nvSpPr>
-          <p:cNvPr id="4" name="Content Placeholder 3"/>
-          <p:cNvSpPr>
-            <a:spLocks noGrp="1"/>
-          </p:cNvSpPr>
-          <p:nvPr>
-            <p:ph idx="2" sz="half"/>
-          </p:nvPr>
-        </p:nvSpPr>
-        <p:spPr/>
-        <p:txBody>
-          <a:bodyPr/>
-          <a:lstStyle/>
-          <a:p>
-            <a:pPr lvl="0" indent="0">
-              <a:buNone/>
-            </a:pPr>
-            <a:r>
-              <a:rPr>
-                <a:latin typeface="Consolas"/>
-              </a:rPr>
-              <a:t>     coef  std err       t  P&gt;|t|
-0 -0.9049    0.685  -1.321  0.187
-1  0.5414    0.053  10.167  0.000</a:t>
-            </a:r>
-          </a:p>
-        </p:txBody>
-      </p:sp>
+      <p:graphicFrame>
+        <p:nvGraphicFramePr>
+          <p:cNvPr id="6" name="Content Placeholder 5"/>
+          <p:cNvGraphicFramePr>
+            <a:graphicFrameLocks noGrp="1"/>
+          </p:cNvGraphicFramePr>
+          <p:nvPr>
+            <p:ph idx="1"/>
+          </p:nvPr>
+        </p:nvGraphicFramePr>
+        <p:xfrm>
+          <a:off x="4648200" y="1193800"/>
+          <a:ext cx="4038600" cy="3390900"/>
+        </p:xfrm>
+        <a:graphic>
+          <a:graphicData uri="http://schemas.openxmlformats.org/drawingml/2006/table">
+            <a:tbl>
+              <a:tblPr firstRow="1" bandRow="1">
+                <a:tableStyleId>{5C22544A-7EE6-4342-B048-85BDC9FD1C3A}</a:tableStyleId>
+              </a:tblPr>
+              <a:tblGrid>
+                <a:gridCol w="800100"/>
+                <a:gridCol w="800100"/>
+                <a:gridCol w="800100"/>
+                <a:gridCol w="800100"/>
+                <a:gridCol w="800100"/>
+              </a:tblGrid>
+              <a:tr h="0">
+                <a:tc>
+                  <a:txBody>
+                    <a:bodyPr/>
+                    <a:lstStyle/>
+                    <a:p>
+                      <a:endParaRPr/>
+                    </a:p>
+                  </a:txBody>
+                  <a:tcPr/>
+                </a:tc>
+                <a:tc>
+                  <a:txBody>
+                    <a:bodyPr/>
+                    <a:lstStyle/>
+                    <a:p>
+                      <a:pPr lvl="0" indent="0" marL="0" algn="r">
+                        <a:buNone/>
+                      </a:pPr>
+                      <a:r>
+                        <a:rPr/>
+                        <a:t>coef</a:t>
+                      </a:r>
+                    </a:p>
+                  </a:txBody>
+                  <a:tcPr/>
+                </a:tc>
+                <a:tc>
+                  <a:txBody>
+                    <a:bodyPr/>
+                    <a:lstStyle/>
+                    <a:p>
+                      <a:pPr lvl="0" indent="0" marL="0" algn="r">
+                        <a:buNone/>
+                      </a:pPr>
+                      <a:r>
+                        <a:rPr/>
+                        <a:t>std err</a:t>
+                      </a:r>
+                    </a:p>
+                  </a:txBody>
+                  <a:tcPr/>
+                </a:tc>
+                <a:tc>
+                  <a:txBody>
+                    <a:bodyPr/>
+                    <a:lstStyle/>
+                    <a:p>
+                      <a:pPr lvl="0" indent="0" marL="0" algn="r">
+                        <a:buNone/>
+                      </a:pPr>
+                      <a:r>
+                        <a:rPr/>
+                        <a:t>t</a:t>
+                      </a:r>
+                    </a:p>
+                  </a:txBody>
+                  <a:tcPr/>
+                </a:tc>
+                <a:tc>
+                  <a:txBody>
+                    <a:bodyPr/>
+                    <a:lstStyle/>
+                    <a:p>
+                      <a:pPr lvl="0" indent="0" marL="0" algn="r">
+                        <a:buNone/>
+                      </a:pPr>
+                      <a:r>
+                        <a:rPr/>
+                        <a:t>P&gt;</a:t>
+                      </a:r>
+                    </a:p>
+                  </a:txBody>
+                  <a:tcPr/>
+                </a:tc>
+              </a:tr>
+              <a:tr h="0">
+                <a:tc>
+                  <a:txBody>
+                    <a:bodyPr/>
+                    <a:lstStyle/>
+                    <a:p>
+                      <a:pPr lvl="0" indent="0" marL="0" algn="r">
+                        <a:buNone/>
+                      </a:pPr>
+                      <a:r>
+                        <a:rPr/>
+                        <a:t>0</a:t>
+                      </a:r>
+                    </a:p>
+                  </a:txBody>
+                </a:tc>
+                <a:tc>
+                  <a:txBody>
+                    <a:bodyPr/>
+                    <a:lstStyle/>
+                    <a:p>
+                      <a:pPr lvl="0" indent="0" marL="0" algn="r">
+                        <a:buNone/>
+                      </a:pPr>
+                      <a:r>
+                        <a:rPr/>
+                        <a:t>-0.9049</a:t>
+                      </a:r>
+                    </a:p>
+                  </a:txBody>
+                </a:tc>
+                <a:tc>
+                  <a:txBody>
+                    <a:bodyPr/>
+                    <a:lstStyle/>
+                    <a:p>
+                      <a:pPr lvl="0" indent="0" marL="0" algn="r">
+                        <a:buNone/>
+                      </a:pPr>
+                      <a:r>
+                        <a:rPr/>
+                        <a:t>0.685</a:t>
+                      </a:r>
+                    </a:p>
+                  </a:txBody>
+                </a:tc>
+                <a:tc>
+                  <a:txBody>
+                    <a:bodyPr/>
+                    <a:lstStyle/>
+                    <a:p>
+                      <a:pPr lvl="0" indent="0" marL="0" algn="r">
+                        <a:buNone/>
+                      </a:pPr>
+                      <a:r>
+                        <a:rPr/>
+                        <a:t>-1.321</a:t>
+                      </a:r>
+                    </a:p>
+                  </a:txBody>
+                </a:tc>
+                <a:tc>
+                  <a:txBody>
+                    <a:bodyPr/>
+                    <a:lstStyle/>
+                    <a:p>
+                      <a:pPr lvl="0" indent="0" marL="0" algn="r">
+                        <a:buNone/>
+                      </a:pPr>
+                      <a:r>
+                        <a:rPr/>
+                        <a:t>0.187</a:t>
+                      </a:r>
+                    </a:p>
+                  </a:txBody>
+                </a:tc>
+              </a:tr>
+              <a:tr h="0">
+                <a:tc>
+                  <a:txBody>
+                    <a:bodyPr/>
+                    <a:lstStyle/>
+                    <a:p>
+                      <a:pPr lvl="0" indent="0" marL="0" algn="r">
+                        <a:buNone/>
+                      </a:pPr>
+                      <a:r>
+                        <a:rPr/>
+                        <a:t>1</a:t>
+                      </a:r>
+                    </a:p>
+                  </a:txBody>
+                </a:tc>
+                <a:tc>
+                  <a:txBody>
+                    <a:bodyPr/>
+                    <a:lstStyle/>
+                    <a:p>
+                      <a:pPr lvl="0" indent="0" marL="0" algn="r">
+                        <a:buNone/>
+                      </a:pPr>
+                      <a:r>
+                        <a:rPr/>
+                        <a:t>0.5414</a:t>
+                      </a:r>
+                    </a:p>
+                  </a:txBody>
+                </a:tc>
+                <a:tc>
+                  <a:txBody>
+                    <a:bodyPr/>
+                    <a:lstStyle/>
+                    <a:p>
+                      <a:pPr lvl="0" indent="0" marL="0" algn="r">
+                        <a:buNone/>
+                      </a:pPr>
+                      <a:r>
+                        <a:rPr/>
+                        <a:t>0.053</a:t>
+                      </a:r>
+                    </a:p>
+                  </a:txBody>
+                </a:tc>
+                <a:tc>
+                  <a:txBody>
+                    <a:bodyPr/>
+                    <a:lstStyle/>
+                    <a:p>
+                      <a:pPr lvl="0" indent="0" marL="0" algn="r">
+                        <a:buNone/>
+                      </a:pPr>
+                      <a:r>
+                        <a:rPr/>
+                        <a:t>10.167</a:t>
+                      </a:r>
+                    </a:p>
+                  </a:txBody>
+                </a:tc>
+                <a:tc>
+                  <a:txBody>
+                    <a:bodyPr/>
+                    <a:lstStyle/>
+                    <a:p>
+                      <a:pPr lvl="0" indent="0" marL="0" algn="r">
+                        <a:buNone/>
+                      </a:pPr>
+                      <a:r>
+                        <a:rPr/>
+                        <a:t>0</a:t>
+                      </a:r>
+                    </a:p>
+                  </a:txBody>
+                </a:tc>
+              </a:tr>
+            </a:tbl>
+          </a:graphicData>
+        </a:graphic>
+      </p:graphicFrame>
     </p:spTree>
   </p:cSld>
 </p:sld>
@@ -10112,7 +10305,7 @@
               <a:rPr baseline="30000">
                 <a:hlinkClick r:id="rId6" action="ppaction://hlinksldjump"/>
               </a:rPr>
-              <a:t>2</a:t>
+              <a:t>1</a:t>
             </a:r>
             <a:r>
               <a:rPr/>
@@ -10602,7 +10795,7 @@
             </a:pPr>
             <a:r>
               <a:rPr/>
-              <a:t>Jupyter implements the literate programming paradigm, but I haven’t seen the Markdown part gain a lot of traction.</a:t>
+              <a:t>Jupyter implements the literate programming paradigm, but generating high-quality output requires additional tools.</a:t>
             </a:r>
           </a:p>
         </p:txBody>
@@ -10662,7 +10855,7 @@
             </a:pPr>
             <a:r>
               <a:rPr/>
-              <a:t>Donald Knuth’s Literate Programming</a:t>
+              <a:t>Donald Knuth’s Literate Programming book</a:t>
             </a:r>
           </a:p>
         </p:txBody>
@@ -11034,16 +11227,7 @@
             </a:pPr>
             <a:r>
               <a:rPr sz="1800"/>
-              <a:t>1. you can also add the YAML as raw content in the first cell of an .ipynb file</a:t>
-            </a:r>
-          </a:p>
-          <a:p>
-            <a:pPr lvl="0" indent="0" marL="0">
-              <a:buNone/>
-            </a:pPr>
-            <a:r>
-              <a:rPr sz="1800"/>
-              <a:t>2. You can use footnotes in presentations and websites, too</a:t>
+              <a:t>1. You can use footnotes in presentations and websites, too</a:t>
             </a:r>
           </a:p>
         </p:txBody>
@@ -11125,21 +11309,21 @@
             <a:pPr lvl="0"/>
             <a:r>
               <a:rPr/>
-              <a:t>Great for PDFs… Ok, Beamer!</a:t>
+              <a:t>Great for PDFs… Beamer for slides</a:t>
             </a:r>
           </a:p>
           <a:p>
             <a:pPr lvl="0"/>
             <a:r>
               <a:rPr/>
-              <a:t>Website generation is not great</a:t>
+              <a:t>Not great for websites</a:t>
             </a:r>
           </a:p>
           <a:p>
             <a:pPr lvl="0"/>
             <a:r>
               <a:rPr/>
-              <a:t>Dynamic content requires Latex programming</a:t>
+              <a:t>Dynamic content: coding Latex</a:t>
             </a:r>
           </a:p>
           <a:p>
@@ -11221,7 +11405,7 @@
             </a:pPr>
             <a:r>
               <a:rPr b="1"/>
-              <a:t>Jekyll</a:t>
+              <a:t>Jekyll / Github Pages</a:t>
             </a:r>
           </a:p>
           <a:p>
@@ -11235,7 +11419,7 @@
             <a:pPr lvl="0"/>
             <a:r>
               <a:rPr/>
-              <a:t>Not great for PPT, papers</a:t>
+              <a:t>Not great for slides, papers</a:t>
             </a:r>
           </a:p>
           <a:p>
@@ -11247,51 +11431,14 @@
             </a:pPr>
             <a:r>
               <a:rPr b="1"/>
-              <a:t>RMarkdown</a:t>
+              <a:t>Python notebooks</a:t>
             </a:r>
           </a:p>
           <a:p>
             <a:pPr lvl="0"/>
             <a:r>
               <a:rPr/>
-              <a:t>Great PDFs</a:t>
-            </a:r>
-          </a:p>
-          <a:p>
-            <a:pPr lvl="0"/>
-            <a:r>
-              <a:rPr/>
-              <a:t>Mostly good presentations</a:t>
-            </a:r>
-          </a:p>
-          <a:p>
-            <a:pPr lvl="0"/>
-            <a:r>
-              <a:rPr/>
-              <a:t>Hugo and </a:t>
-            </a:r>
-            <a:r>
-              <a:rPr>
-                <a:latin typeface="Consolas"/>
-              </a:rPr>
-              <a:t>blogdown</a:t>
-            </a:r>
-            <a:r>
-              <a:rPr/>
-              <a:t> work well</a:t>
-            </a:r>
-          </a:p>
-          <a:p>
-            <a:pPr lvl="0"/>
-            <a:r>
-              <a:rPr/>
-              <a:t>Heavily dependent on R </a:t>
-            </a:r>
-            <a:r>
-              <a:rPr>
-                <a:latin typeface="Consolas"/>
-              </a:rPr>
-              <a:t>R</a:t>
+              <a:t>Great, with Pandoc</a:t>
             </a:r>
           </a:p>
           <a:p>
@@ -11303,14 +11450,28 @@
             </a:pPr>
             <a:r>
               <a:rPr b="1"/>
-              <a:t>Python notebooks</a:t>
+              <a:t>RMarkdown</a:t>
             </a:r>
           </a:p>
           <a:p>
             <a:pPr lvl="0"/>
             <a:r>
               <a:rPr/>
-              <a:t>Great, with Pandoc</a:t>
+              <a:t>Great for everything</a:t>
+            </a:r>
+          </a:p>
+          <a:p>
+            <a:pPr lvl="0"/>
+            <a:r>
+              <a:rPr/>
+              <a:t>Heavily dependent on R</a:t>
+            </a:r>
+          </a:p>
+          <a:p>
+            <a:pPr lvl="0"/>
+            <a:r>
+              <a:rPr/>
+              <a:t>New features in Quarto</a:t>
             </a:r>
           </a:p>
         </p:txBody>
@@ -11795,17 +11956,7 @@
             </a:r>
             <a:r>
               <a:rPr/>
-              <a:t> file</a:t>
-            </a:r>
-            <a:r>
-              <a:rPr baseline="30000">
-                <a:hlinkClick r:id="rId2" action="ppaction://hlinksldjump"/>
-              </a:rPr>
-              <a:t>1</a:t>
-            </a:r>
-            <a:r>
-              <a:rPr/>
-              <a:t>. This keeps the configuration and content in the same file.</a:t>
+              <a:t> file. This keeps the configuration and content in the same file.</a:t>
             </a:r>
           </a:p>
           <a:p>
@@ -11838,7 +11989,7 @@
           <p:nvPr/>
         </p:nvPicPr>
         <p:blipFill>
-          <a:blip r:embed="rId3"/>
+          <a:blip r:embed="rId2"/>
           <a:stretch>
             <a:fillRect/>
           </a:stretch>

</xml_diff>

<commit_message>
Work done by Sun Jul  3 21:52:43 PDT 2022
</commit_message>
<xml_diff>
--- a/docs/presentation-orig.pptx
+++ b/docs/presentation-orig.pptx
@@ -5654,7 +5654,7 @@
               <a:rPr>
                 <a:latin typeface="Consolas"/>
               </a:rPr>
-              <a:t>flowchart UD
+              <a:t>flowchart TD
 A[Hard] --&gt;|Text| B(Round)
 B --&gt; C{Decision}
 C --&gt;|One| D[Result 1]
@@ -5679,8 +5679,8 @@
         </p:blipFill>
         <p:spPr bwMode="auto">
           <a:xfrm>
-            <a:off x="4648200" y="2387600"/>
-            <a:ext cx="4038600" cy="1016000"/>
+            <a:off x="5816600" y="1193800"/>
+            <a:ext cx="1714500" cy="3390900"/>
           </a:xfrm>
           <a:prstGeom prst="rect">
             <a:avLst/>

</xml_diff>

<commit_message>
Work done by Sun Jul  3 21:58:55 PDT 2022
</commit_message>
<xml_diff>
--- a/docs/presentation-orig.pptx
+++ b/docs/presentation-orig.pptx
@@ -5643,7 +5643,7 @@
             </a:pPr>
             <a:r>
               <a:rPr/>
-              <a:t>Here’s the first example from Mermaid’s website. The diagrams in previous sections were created with mermaid.</a:t>
+              <a:t>The diagram in this and in previous sections were created with mermaid.</a:t>
             </a:r>
           </a:p>
           <a:p>
@@ -10737,6 +10737,15 @@
             </a:pPr>
             <a:r>
               <a:rPr/>
+              <a:t>Literate programming can help create high-quality reproducible, documented, code.</a:t>
+            </a:r>
+          </a:p>
+          <a:p>
+            <a:pPr lvl="0" indent="0" marL="0">
+              <a:buNone/>
+            </a:pPr>
+            <a:r>
+              <a:rPr/>
               <a:t>Donald E. Knuth proposed literate programming in a 1984 </a:t>
             </a:r>
             <a:r>
@@ -10748,45 +10757,6 @@
             <a:r>
               <a:rPr/>
               <a:t>.</a:t>
-            </a:r>
-          </a:p>
-          <a:p>
-            <a:pPr lvl="0" indent="0" marL="0">
-              <a:buNone/>
-            </a:pPr>
-            <a:r>
-              <a:rPr/>
-              <a:t>One of my proudest tech moments was to make </a:t>
-            </a:r>
-            <a:r>
-              <a:rPr>
-                <a:latin typeface="Consolas"/>
-              </a:rPr>
-              <a:t>CWeave</a:t>
-            </a:r>
-            <a:r>
-              <a:rPr/>
-              <a:t> and </a:t>
-            </a:r>
-            <a:r>
-              <a:rPr>
-                <a:latin typeface="Consolas"/>
-              </a:rPr>
-              <a:t>CWeb</a:t>
-            </a:r>
-            <a:r>
-              <a:rPr/>
-              <a:t> (and </a:t>
-            </a:r>
-            <a:r>
-              <a:rPr>
-                <a:latin typeface="Consolas"/>
-              </a:rPr>
-              <a:t>LaTeX</a:t>
-            </a:r>
-            <a:r>
-              <a:rPr/>
-              <a:t>) run in a Windows computer circa 1998.</a:t>
             </a:r>
           </a:p>
           <a:p>

</xml_diff>

<commit_message>
Work done by Sun Jul  3 22:00:25 PDT 2022
</commit_message>
<xml_diff>
--- a/docs/presentation-orig.pptx
+++ b/docs/presentation-orig.pptx
@@ -6112,23 +6112,12 @@
                 <a:tableStyleId>{5C22544A-7EE6-4342-B048-85BDC9FD1C3A}</a:tableStyleId>
               </a:tblPr>
               <a:tblGrid>
-                <a:gridCol w="800100"/>
-                <a:gridCol w="800100"/>
-                <a:gridCol w="800100"/>
-                <a:gridCol w="800100"/>
-                <a:gridCol w="800100"/>
+                <a:gridCol w="1003300"/>
+                <a:gridCol w="1003300"/>
+                <a:gridCol w="1003300"/>
+                <a:gridCol w="1003300"/>
               </a:tblGrid>
               <a:tr h="0">
-                <a:tc>
-                  <a:txBody>
-                    <a:bodyPr/>
-                    <a:lstStyle/>
-                    <a:p>
-                      <a:endParaRPr/>
-                    </a:p>
-                  </a:txBody>
-                  <a:tcPr/>
-                </a:tc>
                 <a:tc>
                   <a:txBody>
                     <a:bodyPr/>
@@ -6205,21 +6194,6 @@
                       </a:pPr>
                       <a:r>
                         <a:rPr/>
-                        <a:t>0</a:t>
-                      </a:r>
-                    </a:p>
-                  </a:txBody>
-                </a:tc>
-                <a:tc>
-                  <a:txBody>
-                    <a:bodyPr/>
-                    <a:lstStyle/>
-                    <a:p>
-                      <a:pPr lvl="0" indent="0" marL="0" algn="r">
-                        <a:buNone/>
-                      </a:pPr>
-                      <a:r>
-                        <a:rPr/>
                         <a:t>-0.9049</a:t>
                       </a:r>
                     </a:p>
@@ -6272,21 +6246,6 @@
                 </a:tc>
               </a:tr>
               <a:tr h="0">
-                <a:tc>
-                  <a:txBody>
-                    <a:bodyPr/>
-                    <a:lstStyle/>
-                    <a:p>
-                      <a:pPr lvl="0" indent="0" marL="0" algn="r">
-                        <a:buNone/>
-                      </a:pPr>
-                      <a:r>
-                        <a:rPr/>
-                        <a:t>1</a:t>
-                      </a:r>
-                    </a:p>
-                  </a:txBody>
-                </a:tc>
                 <a:tc>
                   <a:txBody>
                     <a:bodyPr/>

</xml_diff>

<commit_message>
Work done by Sun Jul  3 22:02:57 PDT 2022
</commit_message>
<xml_diff>
--- a/docs/presentation-orig.pptx
+++ b/docs/presentation-orig.pptx
@@ -6144,7 +6144,7 @@
                       </a:pPr>
                       <a:r>
                         <a:rPr/>
-                        <a:t>std err</a:t>
+                        <a:t>s.e.</a:t>
                       </a:r>
                     </a:p>
                   </a:txBody>
@@ -6176,7 +6176,7 @@
                       </a:pPr>
                       <a:r>
                         <a:rPr/>
-                        <a:t>P&gt;</a:t>
+                        <a:t>p-value</a:t>
                       </a:r>
                     </a:p>
                   </a:txBody>

</xml_diff>

<commit_message>
Work done by Sun Jul  3 22:05:56 PDT 2022
</commit_message>
<xml_diff>
--- a/docs/presentation-orig.pptx
+++ b/docs/presentation-orig.pptx
@@ -6540,85 +6540,11 @@
             <a:r>
               <a:rPr>
                 <a:solidFill>
-                  <a:srgbClr val="003B4F"/>
-                </a:solidFill>
-                <a:latin typeface="Consolas"/>
-              </a:rPr>
-              <a:t>To create slides, you create sections </a:t>
-            </a:r>
-            <a:br/>
-            <a:r>
-              <a:rPr>
-                <a:solidFill>
-                  <a:srgbClr val="003B4F"/>
-                </a:solidFill>
-                <a:latin typeface="Consolas"/>
-              </a:rPr>
-              <a:t>with </a:t>
-            </a:r>
-            <a:r>
-              <a:rPr>
-                <a:solidFill>
-                  <a:srgbClr val="5E5E5E"/>
-                </a:solidFill>
-                <a:latin typeface="Consolas"/>
-              </a:rPr>
-              <a:t>`#`</a:t>
-            </a:r>
-            <a:r>
-              <a:rPr>
-                <a:solidFill>
-                  <a:srgbClr val="003B4F"/>
-                </a:solidFill>
-                <a:latin typeface="Consolas"/>
-              </a:rPr>
-              <a:t>, titles with </a:t>
-            </a:r>
-            <a:r>
-              <a:rPr>
-                <a:solidFill>
-                  <a:srgbClr val="5E5E5E"/>
-                </a:solidFill>
-                <a:latin typeface="Consolas"/>
-              </a:rPr>
-              <a:t>`##`</a:t>
-            </a:r>
-            <a:r>
-              <a:rPr>
-                <a:solidFill>
-                  <a:srgbClr val="003B4F"/>
-                </a:solidFill>
-                <a:latin typeface="Consolas"/>
-              </a:rPr>
-              <a:t>, and bullets </a:t>
-            </a:r>
-            <a:br/>
-            <a:r>
-              <a:rPr>
-                <a:solidFill>
-                  <a:srgbClr val="003B4F"/>
-                </a:solidFill>
-                <a:latin typeface="Consolas"/>
-              </a:rPr>
-              <a:t>with </a:t>
-            </a:r>
-            <a:r>
-              <a:rPr>
-                <a:solidFill>
-                  <a:srgbClr val="5E5E5E"/>
-                </a:solidFill>
-                <a:latin typeface="Consolas"/>
-              </a:rPr>
-              <a:t>`-`</a:t>
-            </a:r>
-            <a:r>
-              <a:rPr>
-                <a:solidFill>
-                  <a:srgbClr val="003B4F"/>
-                </a:solidFill>
-                <a:latin typeface="Consolas"/>
-              </a:rPr>
-              <a:t>.</a:t>
+                  <a:srgbClr val="4758AB"/>
+                </a:solidFill>
+                <a:latin typeface="Consolas"/>
+              </a:rPr>
+              <a:t>## Basic slide syntax</a:t>
             </a:r>
             <a:br/>
             <a:br/>
@@ -6629,7 +6555,81 @@
                 </a:solidFill>
                 <a:latin typeface="Consolas"/>
               </a:rPr>
-              <a:t>Quarto will render your content in slide form.</a:t>
+              <a:t>To create slides, you create sections </a:t>
+            </a:r>
+            <a:br/>
+            <a:r>
+              <a:rPr>
+                <a:solidFill>
+                  <a:srgbClr val="003B4F"/>
+                </a:solidFill>
+                <a:latin typeface="Consolas"/>
+              </a:rPr>
+              <a:t>with </a:t>
+            </a:r>
+            <a:r>
+              <a:rPr>
+                <a:solidFill>
+                  <a:srgbClr val="5E5E5E"/>
+                </a:solidFill>
+                <a:latin typeface="Consolas"/>
+              </a:rPr>
+              <a:t>`#`</a:t>
+            </a:r>
+            <a:r>
+              <a:rPr>
+                <a:solidFill>
+                  <a:srgbClr val="003B4F"/>
+                </a:solidFill>
+                <a:latin typeface="Consolas"/>
+              </a:rPr>
+              <a:t>, titles with </a:t>
+            </a:r>
+            <a:r>
+              <a:rPr>
+                <a:solidFill>
+                  <a:srgbClr val="5E5E5E"/>
+                </a:solidFill>
+                <a:latin typeface="Consolas"/>
+              </a:rPr>
+              <a:t>`##`</a:t>
+            </a:r>
+            <a:r>
+              <a:rPr>
+                <a:solidFill>
+                  <a:srgbClr val="003B4F"/>
+                </a:solidFill>
+                <a:latin typeface="Consolas"/>
+              </a:rPr>
+              <a:t>, and bullets </a:t>
+            </a:r>
+            <a:br/>
+            <a:r>
+              <a:rPr>
+                <a:solidFill>
+                  <a:srgbClr val="003B4F"/>
+                </a:solidFill>
+                <a:latin typeface="Consolas"/>
+              </a:rPr>
+              <a:t>with </a:t>
+            </a:r>
+            <a:r>
+              <a:rPr>
+                <a:solidFill>
+                  <a:srgbClr val="5E5E5E"/>
+                </a:solidFill>
+                <a:latin typeface="Consolas"/>
+              </a:rPr>
+              <a:t>`-`</a:t>
+            </a:r>
+            <a:r>
+              <a:rPr>
+                <a:solidFill>
+                  <a:srgbClr val="003B4F"/>
+                </a:solidFill>
+                <a:latin typeface="Consolas"/>
+              </a:rPr>
+              <a:t>.</a:t>
             </a:r>
             <a:br/>
             <a:br/>

</xml_diff>

<commit_message>
Work done by Sun Jul  3 22:19:01 PDT 2022
</commit_message>
<xml_diff>
--- a/docs/presentation-orig.pptx
+++ b/docs/presentation-orig.pptx
@@ -6856,15 +6856,7 @@
             </a:pPr>
             <a:r>
               <a:rPr/>
-              <a:t>The part I liked the </a:t>
-            </a:r>
-            <a:r>
-              <a:rPr i="1"/>
-              <a:t>least</a:t>
-            </a:r>
-            <a:r>
-              <a:rPr/>
-              <a:t> is that Quarto will use the </a:t>
+              <a:t>Quarto will use the </a:t>
             </a:r>
             <a:r>
               <a:rPr>
@@ -6884,7 +6876,7 @@
             </a:r>
             <a:r>
               <a:rPr/>
-              <a:t> into the </a:t>
+              <a:t> into </a:t>
             </a:r>
             <a:r>
               <a:rPr>
@@ -6903,7 +6895,7 @@
             </a:pPr>
             <a:r>
               <a:rPr/>
-              <a:t>The “pandoc rules” substantially limit the flexibility you would have in PowerPoint presentations. Quarto has better presentation support for </a:t>
+              <a:t>The “pandoc rules” limit the flexibility to create PowerPoint presentations. Quarto has better presentation support for </a:t>
             </a:r>
             <a:r>
               <a:rPr>
@@ -6946,15 +6938,23 @@
             <a:pPr lvl="0"/>
             <a:r>
               <a:rPr/>
-              <a:t>Quarto can use a template with (</a:t>
+              <a:t>PowerPoint can use a </a:t>
             </a:r>
             <a:r>
               <a:rPr b="1"/>
+              <a:t>template</a:t>
+            </a:r>
+            <a:r>
+              <a:rPr/>
+              <a:t> with </a:t>
+            </a:r>
+            <a:r>
+              <a:rPr i="1"/>
               <a:t>only</a:t>
             </a:r>
             <a:r>
               <a:rPr/>
-              <a:t>) these layouts:</a:t>
+              <a:t> these layouts:</a:t>
             </a:r>
           </a:p>
           <a:p>
@@ -7119,7 +7119,7 @@
             </a:r>
             <a:r>
               <a:rPr/>
-              <a:t> created from the top-level markdown headings (for example, </a:t>
+              <a:t> created from the top-level headings (</a:t>
             </a:r>
             <a:r>
               <a:rPr>
@@ -7156,21 +7156,19 @@
               <a:rPr>
                 <a:latin typeface="Consolas"/>
               </a:rPr>
-              <a:t>.columns</a:t>
-            </a:r>
-            <a:r>
-              <a:rPr/>
-              <a:t> div (</a:t>
-            </a:r>
-            <a:r>
-              <a:rPr>
-                <a:latin typeface="Consolas"/>
-              </a:rPr>
               <a:t>:::: {.columns}</a:t>
             </a:r>
             <a:r>
               <a:rPr/>
-              <a:t>) and text content</a:t>
+              <a:t> and only </a:t>
+            </a:r>
+            <a:r>
+              <a:rPr b="1"/>
+              <a:t>text</a:t>
+            </a:r>
+            <a:r>
+              <a:rPr/>
+              <a:t> content</a:t>
             </a:r>
           </a:p>
           <a:p>
@@ -7181,18 +7179,7 @@
             </a:r>
             <a:r>
               <a:rPr/>
-              <a:t> same as “Two Content”, but content of divs is not text</a:t>
-            </a:r>
-          </a:p>
-          <a:p>
-            <a:pPr lvl="0"/>
-            <a:r>
-              <a:rPr b="1"/>
-              <a:t>Blank:</a:t>
-            </a:r>
-            <a:r>
-              <a:rPr/>
-              <a:t> used for slides that have no displayable content (e.g. notes)</a:t>
+              <a:t> same as “Two Content”, but content of columns is not text</a:t>
             </a:r>
           </a:p>
           <a:p>
@@ -7203,25 +7190,7 @@
             </a:r>
             <a:r>
               <a:rPr/>
-              <a:t> used when content doesn’t have a </a:t>
-            </a:r>
-            <a:r>
-              <a:rPr>
-                <a:latin typeface="Consolas"/>
-              </a:rPr>
-              <a:t>columns</a:t>
-            </a:r>
-            <a:r>
-              <a:rPr/>
-              <a:t> div but has text </a:t>
-            </a:r>
-            <a:r>
-              <a:rPr b="1"/>
-              <a:t>and</a:t>
-            </a:r>
-            <a:r>
-              <a:rPr/>
-              <a:t> non-text content</a:t>
+              <a:t> used when slide has non-text content, but no columns</a:t>
             </a:r>
           </a:p>
           <a:p>
@@ -7738,6 +7707,16 @@
             <a:r>
               <a:rPr>
                 <a:solidFill>
+                  <a:srgbClr val="5E5E5E"/>
+                </a:solidFill>
+                <a:latin typeface="Consolas"/>
+              </a:rPr>
+              <a:t># Read data</a:t>
+            </a:r>
+            <a:br/>
+            <a:r>
+              <a:rPr>
+                <a:solidFill>
                   <a:srgbClr val="003B4F"/>
                 </a:solidFill>
                 <a:latin typeface="Consolas"/>
@@ -7885,6 +7864,16 @@
             <a:r>
               <a:rPr>
                 <a:solidFill>
+                  <a:srgbClr val="5E5E5E"/>
+                </a:solidFill>
+                <a:latin typeface="Consolas"/>
+              </a:rPr>
+              <a:t># Configure parameters</a:t>
+            </a:r>
+            <a:br/>
+            <a:r>
+              <a:rPr>
+                <a:solidFill>
                   <a:srgbClr val="003B4F"/>
                 </a:solidFill>
                 <a:latin typeface="Consolas"/>
@@ -8140,6 +8129,17 @@
             <a:r>
               <a:rPr>
                 <a:solidFill>
+                  <a:srgbClr val="5E5E5E"/>
+                </a:solidFill>
+                <a:latin typeface="Consolas"/>
+              </a:rPr>
+              <a:t># graph functions were importe earlier with </a:t>
+            </a:r>
+            <a:br/>
+            <a:br/>
+            <a:r>
+              <a:rPr>
+                <a:solidFill>
                   <a:srgbClr val="003B4F"/>
                 </a:solidFill>
                 <a:latin typeface="Consolas"/>
@@ -8154,6 +8154,25 @@
                 </a:solidFill>
                 <a:latin typeface="Consolas"/>
               </a:rPr>
+              <a:t>    </a:t>
+            </a:r>
+            <a:r>
+              <a:rPr>
+                <a:solidFill>
+                  <a:srgbClr val="5E5E5E"/>
+                </a:solidFill>
+                <a:latin typeface="Consolas"/>
+              </a:rPr>
+              <a:t># generate slide header</a:t>
+            </a:r>
+            <a:br/>
+            <a:r>
+              <a:rPr>
+                <a:solidFill>
+                  <a:srgbClr val="003B4F"/>
+                </a:solidFill>
+                <a:latin typeface="Consolas"/>
+              </a:rPr>
               <a:t>    display(Markdown(</a:t>
             </a:r>
             <a:r>
@@ -8218,6 +8237,35 @@
                 </a:solidFill>
                 <a:latin typeface="Consolas"/>
               </a:rPr>
+              <a:t>    </a:t>
+            </a:r>
+            <a:br/>
+            <a:r>
+              <a:rPr>
+                <a:solidFill>
+                  <a:srgbClr val="003B4F"/>
+                </a:solidFill>
+                <a:latin typeface="Consolas"/>
+              </a:rPr>
+              <a:t>    </a:t>
+            </a:r>
+            <a:r>
+              <a:rPr>
+                <a:solidFill>
+                  <a:srgbClr val="5E5E5E"/>
+                </a:solidFill>
+                <a:latin typeface="Consolas"/>
+              </a:rPr>
+              <a:t># generate columns</a:t>
+            </a:r>
+            <a:br/>
+            <a:r>
+              <a:rPr>
+                <a:solidFill>
+                  <a:srgbClr val="003B4F"/>
+                </a:solidFill>
+                <a:latin typeface="Consolas"/>
+              </a:rPr>
               <a:t>    display(Markdown(</a:t>
             </a:r>
             <a:r>
@@ -8274,6 +8322,25 @@
                 </a:solidFill>
                 <a:latin typeface="Consolas"/>
               </a:rPr>
+              <a:t>    </a:t>
+            </a:r>
+            <a:r>
+              <a:rPr>
+                <a:solidFill>
+                  <a:srgbClr val="5E5E5E"/>
+                </a:solidFill>
+                <a:latin typeface="Consolas"/>
+              </a:rPr>
+              <a:t># column 1 contains a dependency ratio plot</a:t>
+            </a:r>
+            <a:br/>
+            <a:r>
+              <a:rPr>
+                <a:solidFill>
+                  <a:srgbClr val="003B4F"/>
+                </a:solidFill>
+                <a:latin typeface="Consolas"/>
+              </a:rPr>
               <a:t>    plot_dependency_ratio(df_dr[df_dr.Location </a:t>
             </a:r>
             <a:r>
@@ -8349,6 +8416,25 @@
                 <a:latin typeface="Consolas"/>
               </a:rPr>
               <a:t>))</a:t>
+            </a:r>
+            <a:br/>
+            <a:r>
+              <a:rPr>
+                <a:solidFill>
+                  <a:srgbClr val="003B4F"/>
+                </a:solidFill>
+                <a:latin typeface="Consolas"/>
+              </a:rPr>
+              <a:t>    </a:t>
+            </a:r>
+            <a:r>
+              <a:rPr>
+                <a:solidFill>
+                  <a:srgbClr val="5E5E5E"/>
+                </a:solidFill>
+                <a:latin typeface="Consolas"/>
+              </a:rPr>
+              <a:t># column 2 contains a population pyramid</a:t>
             </a:r>
             <a:br/>
             <a:r>
@@ -10911,7 +10997,7 @@
             </a:pPr>
             <a:r>
               <a:rPr b="1"/>
-              <a:t>Articles: maybe yes</a:t>
+              <a:t>Articles: maybe</a:t>
             </a:r>
           </a:p>
           <a:p>
@@ -10949,7 +11035,7 @@
             </a:pPr>
             <a:r>
               <a:rPr/>
-              <a:t>Quarto adds to Python notebooks without detracting anything. All you need are a few YAML lines.</a:t>
+              <a:t>Quarto adds features to Python notebooks without detracting anything. All you need are a few YAML lines.</a:t>
             </a:r>
           </a:p>
         </p:txBody>
@@ -10998,7 +11084,7 @@
             </a:pPr>
             <a:r>
               <a:rPr b="1"/>
-              <a:t>Presentations: maybe not</a:t>
+              <a:t>Presentations: special cases</a:t>
             </a:r>
           </a:p>
           <a:p>
@@ -11007,7 +11093,7 @@
             </a:pPr>
             <a:r>
               <a:rPr/>
-              <a:t>Only if you have</a:t>
+              <a:t>For PowerPoint, render process = long edit cycle. Still useful when you have:</a:t>
             </a:r>
           </a:p>
           <a:p>
@@ -11033,6 +11119,15 @@
             <a:r>
               <a:rPr/>
               <a:t>Collaborators used to Git/Beamer</a:t>
+            </a:r>
+          </a:p>
+          <a:p>
+            <a:pPr lvl="0" indent="0" marL="0">
+              <a:buNone/>
+            </a:pPr>
+            <a:r>
+              <a:rPr/>
+              <a:t>Quarto works great for RevealJS.</a:t>
             </a:r>
           </a:p>
         </p:txBody>

</xml_diff>

<commit_message>
Work done by Sun Jul  3 22:50:18 PDT 2022
</commit_message>
<xml_diff>
--- a/docs/presentation-orig.pptx
+++ b/docs/presentation-orig.pptx
@@ -48,6 +48,8 @@
     <p:sldId id="296" r:id="rId42"/>
     <p:sldId id="297" r:id="rId43"/>
     <p:sldId id="298" r:id="rId44"/>
+    <p:sldId id="299" r:id="rId45"/>
+    <p:sldId id="300" r:id="rId46"/>
   </p:sldIdLst>
   <p:sldSz cx="9144000" cy="5143500" type="screen16x9"/>
   <p:notesSz cx="6858000" cy="9144000"/>
@@ -4736,7 +4738,7 @@
                 </a:pPr>
                 <a:r>
                   <a:rPr/>
-                  <a:t>Quarto’s Markdown supports everything figures, tables, bibliography, etc.</a:t>
+                  <a:t>Quarto’s Markdown supports figures, tables, bibliography, etc.</a:t>
                 </a:r>
               </a:p>
               <a:p>
@@ -4893,7 +4895,7 @@
                 </a:solidFill>
                 <a:latin typeface="Consolas"/>
               </a:rPr>
-              <a:t>Quarto's Markdown supports everything I'm</a:t>
+              <a:t>Quarto's Markdown supports</a:t>
             </a:r>
             <a:br/>
             <a:r>
@@ -4903,7 +4905,7 @@
                 </a:solidFill>
                 <a:latin typeface="Consolas"/>
               </a:rPr>
-              <a:t>used to: figures, tables, bibliography, etc.</a:t>
+              <a:t>figures, tables, bibliography, etc.       </a:t>
             </a:r>
             <a:br/>
             <a:br/>
@@ -9548,7 +9550,7 @@
                 </a:solidFill>
                 <a:latin typeface="Consolas"/>
               </a:rPr>
-              <a:t>"Using Quarto for everything"</a:t>
+              <a:t>"Quarto with Python"</a:t>
             </a:r>
             <a:br/>
             <a:r>
@@ -11179,7 +11181,7 @@
             </a:pPr>
             <a:r>
               <a:rPr/>
-              <a:t>THANK YOU</a:t>
+              <a:t>Next steps</a:t>
             </a:r>
           </a:p>
         </p:txBody>
@@ -11190,6 +11192,105 @@
 </file>
 
 <file path=ppt/slides/slide43.xml><?xml version="1.0" encoding="utf-8"?>
+<p:sld xmlns:a="http://schemas.openxmlformats.org/drawingml/2006/main" xmlns:r="http://schemas.openxmlformats.org/officeDocument/2006/relationships" xmlns:p="http://schemas.openxmlformats.org/presentationml/2006/main">
+  <p:cSld>
+    <p:spTree>
+      <p:nvGrpSpPr>
+        <p:cNvPr id="1" name=""/>
+        <p:cNvGrpSpPr/>
+        <p:nvPr/>
+      </p:nvGrpSpPr>
+      <p:grpSpPr>
+        <a:xfrm>
+          <a:off x="0" y="0"/>
+          <a:ext cx="0" cy="0"/>
+          <a:chOff x="0" y="0"/>
+          <a:chExt cx="0" cy="0"/>
+        </a:xfrm>
+      </p:grpSpPr>
+      <p:sp>
+        <p:nvSpPr>
+          <p:cNvPr id="3" name="Content Placeholder 2"/>
+          <p:cNvSpPr>
+            <a:spLocks noGrp="1"/>
+          </p:cNvSpPr>
+          <p:nvPr>
+            <p:ph idx="1"/>
+          </p:nvPr>
+        </p:nvSpPr>
+        <p:spPr/>
+        <p:txBody>
+          <a:bodyPr/>
+          <a:lstStyle/>
+          <a:p>
+            <a:pPr lvl="0" indent="0" marL="0">
+              <a:buNone/>
+            </a:pPr>
+            <a:r>
+              <a:rPr/>
+              <a:t>{{&lt; include slides/_next-steps.qmd &gt;&gt;}}</a:t>
+            </a:r>
+          </a:p>
+        </p:txBody>
+      </p:sp>
+    </p:spTree>
+  </p:cSld>
+</p:sld>
+</file>
+
+<file path=ppt/slides/slide44.xml><?xml version="1.0" encoding="utf-8"?>
+<p:sld xmlns:a="http://schemas.openxmlformats.org/drawingml/2006/main" xmlns:r="http://schemas.openxmlformats.org/officeDocument/2006/relationships" xmlns:p="http://schemas.openxmlformats.org/presentationml/2006/main">
+  <p:cSld>
+    <p:spTree>
+      <p:nvGrpSpPr>
+        <p:cNvPr id="1" name=""/>
+        <p:cNvGrpSpPr/>
+        <p:nvPr/>
+      </p:nvGrpSpPr>
+      <p:grpSpPr>
+        <a:xfrm>
+          <a:off x="0" y="0"/>
+          <a:ext cx="0" cy="0"/>
+          <a:chOff x="0" y="0"/>
+          <a:chExt cx="0" cy="0"/>
+        </a:xfrm>
+      </p:grpSpPr>
+      <p:sp>
+        <p:nvSpPr>
+          <p:cNvPr id="2" name="Title 1"/>
+          <p:cNvSpPr>
+            <a:spLocks noGrp="1"/>
+          </p:cNvSpPr>
+          <p:nvPr>
+            <p:ph type="title"/>
+          </p:nvPr>
+        </p:nvSpPr>
+        <p:spPr>
+          <a:xfrm>
+            <a:off x="722313" y="3305176"/>
+            <a:ext cx="7772400" cy="1021556"/>
+          </a:xfrm>
+        </p:spPr>
+        <p:txBody>
+          <a:bodyPr/>
+          <a:lstStyle/>
+          <a:p>
+            <a:pPr lvl="0" indent="0" marL="0">
+              <a:buNone/>
+            </a:pPr>
+            <a:r>
+              <a:rPr/>
+              <a:t>THANK YOU</a:t>
+            </a:r>
+          </a:p>
+        </p:txBody>
+      </p:sp>
+    </p:spTree>
+  </p:cSld>
+</p:sld>
+</file>
+
+<file path=ppt/slides/slide45.xml><?xml version="1.0" encoding="utf-8"?>
 <p:sld xmlns:a="http://schemas.openxmlformats.org/drawingml/2006/main" xmlns:r="http://schemas.openxmlformats.org/officeDocument/2006/relationships" xmlns:p="http://schemas.openxmlformats.org/presentationml/2006/main">
   <p:cSld>
     <p:spTree>

</xml_diff>

<commit_message>
Work done by Sun Jul  3 22:52:12 PDT 2022
</commit_message>
<xml_diff>
--- a/docs/presentation-orig.pptx
+++ b/docs/presentation-orig.pptx
@@ -11693,7 +11693,7 @@
             </a:pPr>
             <a:r>
               <a:rPr/>
-              <a:t>The name comes from the format of a book or pamphlet printed with eight pages of text, four to a side, then folded twice to produce four leaves.</a:t>
+              <a:t>The name “quarto” comes from the format of a book or pamphlet printed with eight pages of text, four to a side, then folded twice to produce four leaves.</a:t>
             </a:r>
           </a:p>
           <a:p>
@@ -11702,7 +11702,7 @@
             </a:pPr>
             <a:r>
               <a:rPr/>
-              <a:t>The earliest known European printed book, the Sibyllenbuch (Gutemberg, c.1452), was done in the quarto format, as were many of Shakespeare’s plays.</a:t>
+              <a:t>The earliest known European printed book, the Sibyllenbuch (Gutemberg, c.1452), was done in the quarto format. Shakespeare’s plays, too!</a:t>
             </a:r>
           </a:p>
         </p:txBody>

</xml_diff>

<commit_message>
Work done by Sun Jul  3 23:23:33 PDT 2022
</commit_message>
<xml_diff>
--- a/docs/presentation-orig.pptx
+++ b/docs/presentation-orig.pptx
@@ -9436,7 +9436,7 @@
             </a:pPr>
             <a:r>
               <a:rPr/>
-              <a:t>The content value chain from David Robinson’s (@drrob) Tweet</a:t>
+              <a:t>The content value chain by (@drrob) captured by Amelia McNamara</a:t>
             </a:r>
           </a:p>
         </p:txBody>
@@ -9483,7 +9483,7 @@
             </a:pPr>
             <a:r>
               <a:rPr/>
-              <a:t>What I could get by just changing the format in YAML</a:t>
+              <a:t>One-liner creates a website</a:t>
             </a:r>
           </a:p>
         </p:txBody>
@@ -9925,7 +9925,7 @@
             </a:pPr>
             <a:r>
               <a:rPr/>
-              <a:t>Writing a scholarly article</a:t>
+              <a:t>Writing scholarly articles</a:t>
             </a:r>
           </a:p>
         </p:txBody>
@@ -9950,7 +9950,7 @@
             </a:pPr>
             <a:r>
               <a:rPr/>
-              <a:t>I reused some of the content of this presentation to create two scholarly-looking articles. The purpose of the articles is just to show how easy it is to generate them with Quarto, they don’t contain original research.</a:t>
+              <a:t>I reused some of the content of this presentation to create two scholarly-looking articles. The purpose of the articles is just to show how easy it is to generate them with Quarto, they don’t contain original research. Quarto add cross-reference, citations and bibliography support to Markdown.</a:t>
             </a:r>
           </a:p>
           <a:p>
@@ -10229,7 +10229,7 @@
             </a:pPr>
             <a:r>
               <a:rPr/>
-              <a:t>Citations don’t work on presentations, but are easy to add to documents.</a:t>
+              <a:t>Citations don’t work on presentations, but are easy to add to articles.</a:t>
             </a:r>
           </a:p>
           <a:p>
@@ -10238,17 +10238,7 @@
             </a:pPr>
             <a:r>
               <a:rPr/>
-              <a:t>You need a BibTex file, e.g., </a:t>
-            </a:r>
-            <a:r>
-              <a:rPr>
-                <a:latin typeface="Consolas"/>
-              </a:rPr>
-              <a:t>bibliography.bib</a:t>
-            </a:r>
-            <a:r>
-              <a:rPr/>
-              <a:t>, and a reference to it </a:t>
+              <a:t>You need to reference a BibTex file in the YAML front-matter </a:t>
             </a:r>
             <a:r>
               <a:rPr>
@@ -10258,17 +10248,25 @@
             </a:r>
             <a:r>
               <a:rPr/>
-              <a:t> to the YAML front-matter. Quarto supports any </a:t>
+              <a:t>. Quarto supports any of the 8000+ </a:t>
             </a:r>
             <a:r>
               <a:rPr>
                 <a:hlinkClick r:id="rId2"/>
               </a:rPr>
-              <a:t>Citation Style Language</a:t>
-            </a:r>
-            <a:r>
-              <a:rPr/>
-              <a:t>.</a:t>
+              <a:t>Citation Style Languages</a:t>
+            </a:r>
+            <a:r>
+              <a:rPr/>
+              <a:t> and will generate the “</a:t>
+            </a:r>
+            <a:r>
+              <a:rPr b="1"/>
+              <a:t>References</a:t>
+            </a:r>
+            <a:r>
+              <a:rPr/>
+              <a:t>” section automatically.</a:t>
             </a:r>
           </a:p>
           <a:p>
@@ -10539,7 +10537,7 @@
               <a:rPr>
                 <a:hlinkClick r:id="rId3"/>
               </a:rPr>
-              <a:t>source</a:t>
+              <a:t>(source)</a:t>
             </a:r>
           </a:p>
           <a:p>
@@ -10558,7 +10556,7 @@
               <a:rPr>
                 <a:hlinkClick r:id="rId5"/>
               </a:rPr>
-              <a:t>source</a:t>
+              <a:t>(source)</a:t>
             </a:r>
           </a:p>
         </p:txBody>
@@ -10587,7 +10585,13 @@
       </p:grpSpPr>
       <p:sp>
         <p:nvSpPr>
-          <p:cNvPr id="2" name="Title 1"/>
+          <p:cNvPr id="9" name="Title 1">
+            <a:extLst>
+              <a:ext uri="{FF2B5EF4-FFF2-40B4-BE49-F238E27FC236}">
+                <a16:creationId xmlns:a16="http://schemas.microsoft.com/office/drawing/2014/main" id="{039B6DB2-D068-C680-F293-31EEF2D13404}"/>
+              </a:ext>
+            </a:extLst>
+          </p:cNvPr>
           <p:cNvSpPr>
             <a:spLocks noGrp="1"/>
           </p:cNvSpPr>
@@ -10595,7 +10599,12 @@
             <p:ph type="title"/>
           </p:nvPr>
         </p:nvSpPr>
-        <p:spPr/>
+        <p:spPr>
+          <a:xfrm>
+            <a:off x="457200" y="205979"/>
+            <a:ext cx="8229600" cy="857250"/>
+          </a:xfrm>
+        </p:spPr>
         <p:txBody>
           <a:bodyPr/>
           <a:lstStyle/>
@@ -10606,6 +10615,51 @@
             <a:r>
               <a:rPr/>
               <a:t>Hands-on Programming in R</a:t>
+            </a:r>
+          </a:p>
+        </p:txBody>
+      </p:sp>
+      <p:sp>
+        <p:nvSpPr>
+          <p:cNvPr id="4" name="Text Placeholder 3"/>
+          <p:cNvSpPr>
+            <a:spLocks noGrp="1"/>
+          </p:cNvSpPr>
+          <p:nvPr>
+            <p:ph idx="2" sz="half" type="body"/>
+          </p:nvPr>
+        </p:nvSpPr>
+        <p:spPr/>
+        <p:txBody>
+          <a:bodyPr/>
+          <a:lstStyle/>
+          <a:p>
+            <a:pPr lvl="0" indent="0" marL="0">
+              <a:buNone/>
+            </a:pPr>
+            <a:r>
+              <a:rPr/>
+              <a:t>This is a free </a:t>
+            </a:r>
+            <a:r>
+              <a:rPr>
+                <a:hlinkClick r:id="rId2"/>
+              </a:rPr>
+              <a:t>book</a:t>
+            </a:r>
+            <a:r>
+              <a:rPr/>
+              <a:t>, and you can see the Quarto </a:t>
+            </a:r>
+            <a:r>
+              <a:rPr>
+                <a:hlinkClick r:id="rId3"/>
+              </a:rPr>
+              <a:t>(source)</a:t>
+            </a:r>
+            <a:r>
+              <a:rPr/>
+              <a:t> that generated it.</a:t>
             </a:r>
           </a:p>
         </p:txBody>
@@ -10619,15 +10673,15 @@
           <p:nvPr/>
         </p:nvPicPr>
         <p:blipFill>
-          <a:blip r:embed="rId2"/>
+          <a:blip r:embed="rId4"/>
           <a:stretch>
             <a:fillRect/>
           </a:stretch>
         </p:blipFill>
         <p:spPr bwMode="auto">
           <a:xfrm>
-            <a:off x="1079500" y="1193800"/>
-            <a:ext cx="6997700" cy="3390900"/>
+            <a:off x="1498600" y="1689100"/>
+            <a:ext cx="6159500" cy="2984500"/>
           </a:xfrm>
           <a:prstGeom prst="rect">
             <a:avLst/>
@@ -10664,7 +10718,13 @@
       </p:grpSpPr>
       <p:sp>
         <p:nvSpPr>
-          <p:cNvPr id="2" name="Title 1"/>
+          <p:cNvPr id="9" name="Title 1">
+            <a:extLst>
+              <a:ext uri="{FF2B5EF4-FFF2-40B4-BE49-F238E27FC236}">
+                <a16:creationId xmlns:a16="http://schemas.microsoft.com/office/drawing/2014/main" id="{039B6DB2-D068-C680-F293-31EEF2D13404}"/>
+              </a:ext>
+            </a:extLst>
+          </p:cNvPr>
           <p:cNvSpPr>
             <a:spLocks noGrp="1"/>
           </p:cNvSpPr>
@@ -10672,7 +10732,12 @@
             <p:ph type="title"/>
           </p:nvPr>
         </p:nvSpPr>
-        <p:spPr/>
+        <p:spPr>
+          <a:xfrm>
+            <a:off x="457200" y="205979"/>
+            <a:ext cx="8229600" cy="857250"/>
+          </a:xfrm>
+        </p:spPr>
         <p:txBody>
           <a:bodyPr/>
           <a:lstStyle/>
@@ -10683,6 +10748,51 @@
             <a:r>
               <a:rPr/>
               <a:t>Python for Data Analysis, 3E</a:t>
+            </a:r>
+          </a:p>
+        </p:txBody>
+      </p:sp>
+      <p:sp>
+        <p:nvSpPr>
+          <p:cNvPr id="4" name="Text Placeholder 3"/>
+          <p:cNvSpPr>
+            <a:spLocks noGrp="1"/>
+          </p:cNvSpPr>
+          <p:nvPr>
+            <p:ph idx="2" sz="half" type="body"/>
+          </p:nvPr>
+        </p:nvSpPr>
+        <p:spPr/>
+        <p:txBody>
+          <a:bodyPr/>
+          <a:lstStyle/>
+          <a:p>
+            <a:pPr lvl="0" indent="0" marL="0">
+              <a:buNone/>
+            </a:pPr>
+            <a:r>
+              <a:rPr/>
+              <a:t>This is another free </a:t>
+            </a:r>
+            <a:r>
+              <a:rPr>
+                <a:hlinkClick r:id="rId2"/>
+              </a:rPr>
+              <a:t>book</a:t>
+            </a:r>
+            <a:r>
+              <a:rPr/>
+              <a:t>, and you can see the Quarto </a:t>
+            </a:r>
+            <a:r>
+              <a:rPr>
+                <a:hlinkClick r:id="rId3"/>
+              </a:rPr>
+              <a:t>(source)</a:t>
+            </a:r>
+            <a:r>
+              <a:rPr/>
+              <a:t> that generated it.</a:t>
             </a:r>
           </a:p>
         </p:txBody>
@@ -10696,15 +10806,15 @@
           <p:nvPr/>
         </p:nvPicPr>
         <p:blipFill>
-          <a:blip r:embed="rId2"/>
+          <a:blip r:embed="rId4"/>
           <a:stretch>
             <a:fillRect/>
           </a:stretch>
         </p:blipFill>
         <p:spPr bwMode="auto">
           <a:xfrm>
-            <a:off x="1130300" y="1193800"/>
-            <a:ext cx="6883400" cy="3390900"/>
+            <a:off x="1536700" y="1689100"/>
+            <a:ext cx="6057900" cy="2984500"/>
           </a:xfrm>
           <a:prstGeom prst="rect">
             <a:avLst/>
@@ -10784,7 +10894,7 @@
             </a:pPr>
             <a:r>
               <a:rPr/>
-              <a:t>Literate programming can help create high-quality reproducible, documented, code.</a:t>
+              <a:t>Literate programming can help create high-quality reproducible, documented code.</a:t>
             </a:r>
           </a:p>
           <a:p>
@@ -10812,7 +10922,7 @@
             </a:pPr>
             <a:r>
               <a:rPr/>
-              <a:t>Jupyter implements the literate programming paradigm, but generating high-quality output requires additional tools.</a:t>
+              <a:t>Jupyter implements the literate programming paradigm, but generating high-quality mass-consumable output (articles, websites) requires additional tools.</a:t>
             </a:r>
           </a:p>
         </p:txBody>
@@ -11016,7 +11126,16 @@
             </a:r>
             <a:r>
               <a:rPr/>
-              <a:t> Python notebooks or LaTeX to write articles. Microsoft Word collaboration through SharePoint and Teams is easier than Git and Quarto… but it’s not reproducible.</a:t>
+              <a:t> Python notebooks or LaTeX to write articles.</a:t>
+            </a:r>
+          </a:p>
+          <a:p>
+            <a:pPr lvl="0" indent="0" marL="0">
+              <a:buNone/>
+            </a:pPr>
+            <a:r>
+              <a:rPr/>
+              <a:t>Microsoft Word collaboration through SharePoint and Teams is easier than Git and Quarto… but it’s not reproducible.</a:t>
             </a:r>
           </a:p>
           <a:p>
@@ -11037,7 +11156,7 @@
             </a:pPr>
             <a:r>
               <a:rPr/>
-              <a:t>Quarto adds features to Python notebooks without detracting anything. All you need are a few YAML lines.</a:t>
+              <a:t>Quarto adds features to Python notebooks without detracting anything. You just need a few YAML lines.</a:t>
             </a:r>
           </a:p>
         </p:txBody>
@@ -11074,7 +11193,17 @@
             </a:pPr>
             <a:r>
               <a:rPr/>
-              <a:t>Quarto allows me to have a scriptable, Python-based blog. I can automate my blog to tweet and post to LinkedIn when I write new articles.</a:t>
+              <a:t>Quarto allowed me to have a scriptable, Python-based </a:t>
+            </a:r>
+            <a:r>
+              <a:rPr>
+                <a:hlinkClick r:id="rId2"/>
+              </a:rPr>
+              <a:t>blog</a:t>
+            </a:r>
+            <a:r>
+              <a:rPr/>
+              <a:t>. I can automate my blog to tweet and post to LinkedIn when I write new articles.</a:t>
             </a:r>
           </a:p>
           <a:p>
@@ -11095,7 +11224,7 @@
             </a:pPr>
             <a:r>
               <a:rPr/>
-              <a:t>For PowerPoint, render process = long edit cycle. Still useful when you have:</a:t>
+              <a:t>For PowerPoint, render process =&gt; long edit cycle. Still useful for:</a:t>
             </a:r>
           </a:p>
           <a:p>
@@ -11210,12 +11339,12 @@
       </p:grpSpPr>
       <p:sp>
         <p:nvSpPr>
-          <p:cNvPr id="3" name="Content Placeholder 2"/>
-          <p:cNvSpPr>
-            <a:spLocks noGrp="1"/>
-          </p:cNvSpPr>
-          <p:nvPr>
-            <p:ph idx="1"/>
+          <p:cNvPr id="2" name="Title 1"/>
+          <p:cNvSpPr>
+            <a:spLocks noGrp="1"/>
+          </p:cNvSpPr>
+          <p:nvPr>
+            <p:ph type="title"/>
           </p:nvPr>
         </p:nvSpPr>
         <p:spPr/>
@@ -11228,7 +11357,107 @@
             </a:pPr>
             <a:r>
               <a:rPr/>
-              <a:t>{{&lt; include slides/_next-steps.qmd &gt;&gt;}}</a:t>
+              <a:t>Next Steps</a:t>
+            </a:r>
+          </a:p>
+        </p:txBody>
+      </p:sp>
+      <p:sp>
+        <p:nvSpPr>
+          <p:cNvPr id="3" name="Content Placeholder 2"/>
+          <p:cNvSpPr>
+            <a:spLocks noGrp="1"/>
+          </p:cNvSpPr>
+          <p:nvPr>
+            <p:ph idx="1" sz="half"/>
+          </p:nvPr>
+        </p:nvSpPr>
+        <p:spPr/>
+        <p:txBody>
+          <a:bodyPr/>
+          <a:lstStyle/>
+          <a:p>
+            <a:pPr lvl="0"/>
+            <a:r>
+              <a:rPr/>
+              <a:t>The Quarto website has great tutorials:</a:t>
+            </a:r>
+          </a:p>
+          <a:p>
+            <a:pPr lvl="1"/>
+            <a:r>
+              <a:rPr>
+                <a:hlinkClick r:id="rId2"/>
+              </a:rPr>
+              <a:t>Jupyter</a:t>
+            </a:r>
+          </a:p>
+          <a:p>
+            <a:pPr lvl="1"/>
+            <a:r>
+              <a:rPr>
+                <a:hlinkClick r:id="rId3"/>
+              </a:rPr>
+              <a:t>VSCode</a:t>
+            </a:r>
+          </a:p>
+          <a:p>
+            <a:pPr lvl="0"/>
+            <a:r>
+              <a:rPr/>
+              <a:t>If you have multiple input files (e.g., </a:t>
+            </a:r>
+            <a:r>
+              <a:rPr>
+                <a:hlinkClick r:id="rId4"/>
+              </a:rPr>
+              <a:t>blog</a:t>
+            </a:r>
+            <a:r>
+              <a:rPr/>
+              <a:t> or book), you can create a </a:t>
+            </a:r>
+            <a:r>
+              <a:rPr>
+                <a:hlinkClick r:id="rId5"/>
+              </a:rPr>
+              <a:t>project</a:t>
+            </a:r>
+            <a:r>
+              <a:rPr/>
+              <a:t>.</a:t>
+            </a:r>
+          </a:p>
+          <a:p>
+            <a:pPr lvl="0"/>
+            <a:r>
+              <a:rPr/>
+              <a:t>Projects can have pre- and post-render steps</a:t>
+            </a:r>
+          </a:p>
+        </p:txBody>
+      </p:sp>
+      <p:sp>
+        <p:nvSpPr>
+          <p:cNvPr id="4" name="Content Placeholder 3"/>
+          <p:cNvSpPr>
+            <a:spLocks noGrp="1"/>
+          </p:cNvSpPr>
+          <p:nvPr>
+            <p:ph idx="2" sz="half"/>
+          </p:nvPr>
+        </p:nvSpPr>
+        <p:spPr/>
+        <p:txBody>
+          <a:bodyPr/>
+          <a:lstStyle/>
+          <a:p>
+            <a:pPr lvl="0" indent="0" marL="0">
+              <a:buNone/>
+            </a:pPr>
+            <a:r>
+              <a:rPr/>
+              <a:t>graph TD P[Pre-scripts] –&gt; Q style P fill:#AA99FF Q[.qmd] –&gt; A subgraph Quarto A[.ipynb] –&gt; B((“Pandoc”)) B –&gt; C[.md] B –&gt; D[.tex] D –&gt; F((Xetex)) C –&gt; I((Hugo)) style B fill:#FF6655AA style F fill:#88ffFF style I fill:#88ffFF end B —-&gt; E[.doc] B —-&gt; H[.pptx] F –&gt; G[.pdf] I –&gt; J[.html] E –&gt; X[Post-scripts] H –&gt; X G –&gt; X J –&gt; X style X fill:#AA99FF ```</a:t>
             </a:r>
           </a:p>
         </p:txBody>
@@ -12061,17 +12290,7 @@
             </a:pPr>
             <a:r>
               <a:rPr/>
-              <a:t>All you need to use Quarto is to add some YAML (mostly Pandoc configurations) to your </a:t>
-            </a:r>
-            <a:r>
-              <a:rPr>
-                <a:latin typeface="Consolas"/>
-              </a:rPr>
-              <a:t>.ipynb</a:t>
-            </a:r>
-            <a:r>
-              <a:rPr/>
-              <a:t> files: that’s a </a:t>
+              <a:t>All you need to use Quarto is to add some YAML (mostly simplified Pandoc configurations) to a </a:t>
             </a:r>
             <a:r>
               <a:rPr>
@@ -12081,7 +12300,27 @@
             </a:r>
             <a:r>
               <a:rPr/>
-              <a:t> file. This keeps the configuration and content in the same file.</a:t>
+              <a:t> file. </a:t>
+            </a:r>
+            <a:r>
+              <a:rPr>
+                <a:latin typeface="Consolas"/>
+              </a:rPr>
+              <a:t>ipynb</a:t>
+            </a:r>
+            <a:r>
+              <a:rPr/>
+              <a:t> + YAML = </a:t>
+            </a:r>
+            <a:r>
+              <a:rPr>
+                <a:latin typeface="Consolas"/>
+              </a:rPr>
+              <a:t>.qmd</a:t>
+            </a:r>
+            <a:r>
+              <a:rPr/>
+              <a:t>. This keeps the configuration and content in the same file.</a:t>
             </a:r>
           </a:p>
           <a:p>

</xml_diff>

<commit_message>
Work done by Sun Jul  3 23:30:30 PDT 2022
</commit_message>
<xml_diff>
--- a/docs/presentation-orig.pptx
+++ b/docs/presentation-orig.pptx
@@ -5667,7 +5667,7 @@
       </p:sp>
       <p:pic>
         <p:nvPicPr>
-          <p:cNvPr descr="presentation_files/figure-pptx/mermaid-figure-2.png" id="0" name="Picture 1"/>
+          <p:cNvPr descr="presentation_files/figure-pptx/mermaid-figure-3.png" id="0" name="Picture 1"/>
           <p:cNvPicPr>
             <a:picLocks noGrp="1" noChangeAspect="1"/>
           </p:cNvPicPr>
@@ -7706,6 +7706,16 @@
             <a:pPr lvl="0" indent="0">
               <a:buNone/>
             </a:pPr>
+            <a:br/>
+            <a:r>
+              <a:rPr>
+                <a:solidFill>
+                  <a:srgbClr val="003B4F"/>
+                </a:solidFill>
+                <a:latin typeface="Consolas"/>
+              </a:rPr>
+              <a:t>df_dr </a:t>
+            </a:r>
             <a:r>
               <a:rPr>
                 <a:solidFill>
@@ -7713,7 +7723,61 @@
                 </a:solidFill>
                 <a:latin typeface="Consolas"/>
               </a:rPr>
-              <a:t># Read data</a:t>
+              <a:t>=</a:t>
+            </a:r>
+            <a:r>
+              <a:rPr>
+                <a:solidFill>
+                  <a:srgbClr val="003B4F"/>
+                </a:solidFill>
+                <a:latin typeface="Consolas"/>
+              </a:rPr>
+              <a:t> pd.read_csv(</a:t>
+            </a:r>
+            <a:r>
+              <a:rPr>
+                <a:solidFill>
+                  <a:srgbClr val="20794D"/>
+                </a:solidFill>
+                <a:latin typeface="Consolas"/>
+              </a:rPr>
+              <a:t>"data/dr.csv.gz"</a:t>
+            </a:r>
+            <a:r>
+              <a:rPr>
+                <a:solidFill>
+                  <a:srgbClr val="003B4F"/>
+                </a:solidFill>
+                <a:latin typeface="Consolas"/>
+              </a:rPr>
+              <a:t>, compression</a:t>
+            </a:r>
+            <a:r>
+              <a:rPr>
+                <a:solidFill>
+                  <a:srgbClr val="5E5E5E"/>
+                </a:solidFill>
+                <a:latin typeface="Consolas"/>
+              </a:rPr>
+              <a:t>=</a:t>
+            </a:r>
+            <a:r>
+              <a:rPr>
+                <a:solidFill>
+                  <a:srgbClr val="20794D"/>
+                </a:solidFill>
+                <a:latin typeface="Consolas"/>
+              </a:rPr>
+              <a:t>"gzip"</a:t>
+            </a:r>
+            <a:r>
+              <a:rPr>
+                <a:solidFill>
+                  <a:srgbClr val="003B4F"/>
+                </a:solidFill>
+                <a:latin typeface="Consolas"/>
+              </a:rPr>
+              <a:t>)</a:t>
             </a:r>
             <a:br/>
             <a:r>
@@ -7723,7 +7787,7 @@
                 </a:solidFill>
                 <a:latin typeface="Consolas"/>
               </a:rPr>
-              <a:t>df_dr </a:t>
+              <a:t>df_pop </a:t>
             </a:r>
             <a:r>
               <a:rPr>
@@ -7750,7 +7814,7 @@
                 </a:solidFill>
                 <a:latin typeface="Consolas"/>
               </a:rPr>
-              <a:t>"data/dr.csv.gz"</a:t>
+              <a:t>"data/pop_brackets.csv.gz"</a:t>
             </a:r>
             <a:r>
               <a:rPr>
@@ -7796,7 +7860,7 @@
                 </a:solidFill>
                 <a:latin typeface="Consolas"/>
               </a:rPr>
-              <a:t>df_pop </a:t>
+              <a:t>years </a:t>
             </a:r>
             <a:r>
               <a:rPr>
@@ -7814,7 +7878,125 @@
                 </a:solidFill>
                 <a:latin typeface="Consolas"/>
               </a:rPr>
-              <a:t> pd.read_csv(</a:t>
+              <a:t> [</a:t>
+            </a:r>
+            <a:r>
+              <a:rPr>
+                <a:solidFill>
+                  <a:srgbClr val="AD0000"/>
+                </a:solidFill>
+                <a:latin typeface="Consolas"/>
+              </a:rPr>
+              <a:t>2000</a:t>
+            </a:r>
+            <a:r>
+              <a:rPr>
+                <a:solidFill>
+                  <a:srgbClr val="003B4F"/>
+                </a:solidFill>
+                <a:latin typeface="Consolas"/>
+              </a:rPr>
+              <a:t>, </a:t>
+            </a:r>
+            <a:r>
+              <a:rPr>
+                <a:solidFill>
+                  <a:srgbClr val="AD0000"/>
+                </a:solidFill>
+                <a:latin typeface="Consolas"/>
+              </a:rPr>
+              <a:t>2025</a:t>
+            </a:r>
+            <a:r>
+              <a:rPr>
+                <a:solidFill>
+                  <a:srgbClr val="003B4F"/>
+                </a:solidFill>
+                <a:latin typeface="Consolas"/>
+              </a:rPr>
+              <a:t>, </a:t>
+            </a:r>
+            <a:r>
+              <a:rPr>
+                <a:solidFill>
+                  <a:srgbClr val="AD0000"/>
+                </a:solidFill>
+                <a:latin typeface="Consolas"/>
+              </a:rPr>
+              <a:t>2050</a:t>
+            </a:r>
+            <a:r>
+              <a:rPr>
+                <a:solidFill>
+                  <a:srgbClr val="003B4F"/>
+                </a:solidFill>
+                <a:latin typeface="Consolas"/>
+              </a:rPr>
+              <a:t>, </a:t>
+            </a:r>
+            <a:r>
+              <a:rPr>
+                <a:solidFill>
+                  <a:srgbClr val="AD0000"/>
+                </a:solidFill>
+                <a:latin typeface="Consolas"/>
+              </a:rPr>
+              <a:t>2075</a:t>
+            </a:r>
+            <a:r>
+              <a:rPr>
+                <a:solidFill>
+                  <a:srgbClr val="003B4F"/>
+                </a:solidFill>
+                <a:latin typeface="Consolas"/>
+              </a:rPr>
+              <a:t>, </a:t>
+            </a:r>
+            <a:r>
+              <a:rPr>
+                <a:solidFill>
+                  <a:srgbClr val="AD0000"/>
+                </a:solidFill>
+                <a:latin typeface="Consolas"/>
+              </a:rPr>
+              <a:t>2100</a:t>
+            </a:r>
+            <a:r>
+              <a:rPr>
+                <a:solidFill>
+                  <a:srgbClr val="003B4F"/>
+                </a:solidFill>
+                <a:latin typeface="Consolas"/>
+              </a:rPr>
+              <a:t>]</a:t>
+            </a:r>
+            <a:br/>
+            <a:r>
+              <a:rPr>
+                <a:solidFill>
+                  <a:srgbClr val="003B4F"/>
+                </a:solidFill>
+                <a:latin typeface="Consolas"/>
+              </a:rPr>
+              <a:t>regions </a:t>
+            </a:r>
+            <a:r>
+              <a:rPr>
+                <a:solidFill>
+                  <a:srgbClr val="5E5E5E"/>
+                </a:solidFill>
+                <a:latin typeface="Consolas"/>
+              </a:rPr>
+              <a:t>=</a:t>
+            </a:r>
+            <a:r>
+              <a:rPr>
+                <a:solidFill>
+                  <a:srgbClr val="003B4F"/>
+                </a:solidFill>
+                <a:latin typeface="Consolas"/>
+              </a:rPr>
+              <a:t> [</a:t>
             </a:r>
             <a:r>
               <a:rPr>
@@ -7823,7 +8005,7 @@
                 </a:solidFill>
                 <a:latin typeface="Consolas"/>
               </a:rPr>
-              <a:t>"data/pop_brackets.csv.gz"</a:t>
+              <a:t>"Belgium"</a:t>
             </a:r>
             <a:r>
               <a:rPr>
@@ -7832,16 +8014,7 @@
                 </a:solidFill>
                 <a:latin typeface="Consolas"/>
               </a:rPr>
-              <a:t>, compression</a:t>
-            </a:r>
-            <a:r>
-              <a:rPr>
-                <a:solidFill>
-                  <a:srgbClr val="5E5E5E"/>
-                </a:solidFill>
-                <a:latin typeface="Consolas"/>
-              </a:rPr>
-              <a:t>=</a:t>
+              <a:t>, </a:t>
             </a:r>
             <a:r>
               <a:rPr>
@@ -7850,7 +8023,7 @@
                 </a:solidFill>
                 <a:latin typeface="Consolas"/>
               </a:rPr>
-              <a:t>"gzip"</a:t>
+              <a:t>"China"</a:t>
             </a:r>
             <a:r>
               <a:rPr>
@@ -7859,18 +8032,154 @@
                 </a:solidFill>
                 <a:latin typeface="Consolas"/>
               </a:rPr>
-              <a:t>)</a:t>
+              <a:t>, </a:t>
+            </a:r>
+            <a:r>
+              <a:rPr>
+                <a:solidFill>
+                  <a:srgbClr val="20794D"/>
+                </a:solidFill>
+                <a:latin typeface="Consolas"/>
+              </a:rPr>
+              <a:t>"Brazil"</a:t>
+            </a:r>
+            <a:r>
+              <a:rPr>
+                <a:solidFill>
+                  <a:srgbClr val="003B4F"/>
+                </a:solidFill>
+                <a:latin typeface="Consolas"/>
+              </a:rPr>
+              <a:t>, </a:t>
+            </a:r>
+            <a:r>
+              <a:rPr>
+                <a:solidFill>
+                  <a:srgbClr val="20794D"/>
+                </a:solidFill>
+                <a:latin typeface="Consolas"/>
+              </a:rPr>
+              <a:t>"India"</a:t>
+            </a:r>
+            <a:r>
+              <a:rPr>
+                <a:solidFill>
+                  <a:srgbClr val="003B4F"/>
+                </a:solidFill>
+                <a:latin typeface="Consolas"/>
+              </a:rPr>
+              <a:t>, </a:t>
+            </a:r>
+            <a:r>
+              <a:rPr>
+                <a:solidFill>
+                  <a:srgbClr val="20794D"/>
+                </a:solidFill>
+                <a:latin typeface="Consolas"/>
+              </a:rPr>
+              <a:t>"Japan"</a:t>
+            </a:r>
+            <a:r>
+              <a:rPr>
+                <a:solidFill>
+                  <a:srgbClr val="003B4F"/>
+                </a:solidFill>
+                <a:latin typeface="Consolas"/>
+              </a:rPr>
+              <a:t>, </a:t>
+            </a:r>
+            <a:r>
+              <a:rPr>
+                <a:solidFill>
+                  <a:srgbClr val="20794D"/>
+                </a:solidFill>
+                <a:latin typeface="Consolas"/>
+              </a:rPr>
+              <a:t>"Nigeria"</a:t>
+            </a:r>
+            <a:r>
+              <a:rPr>
+                <a:solidFill>
+                  <a:srgbClr val="003B4F"/>
+                </a:solidFill>
+                <a:latin typeface="Consolas"/>
+              </a:rPr>
+              <a:t>]</a:t>
             </a:r>
             <a:br/>
             <a:br/>
             <a:r>
               <a:rPr>
                 <a:solidFill>
+                  <a:srgbClr val="003B4F"/>
+                </a:solidFill>
+                <a:latin typeface="Consolas"/>
+              </a:rPr>
+              <a:t>for name in regions:</a:t>
+            </a:r>
+            <a:br/>
+            <a:r>
+              <a:rPr>
+                <a:solidFill>
+                  <a:srgbClr val="003B4F"/>
+                </a:solidFill>
+                <a:latin typeface="Consolas"/>
+              </a:rPr>
+              <a:t>    display(Markdown(</a:t>
+            </a:r>
+            <a:r>
+              <a:rPr>
+                <a:solidFill>
+                  <a:srgbClr val="20794D"/>
+                </a:solidFill>
+                <a:latin typeface="Consolas"/>
+              </a:rPr>
+              <a:t>f"## Age and Population Pyramids for </a:t>
+            </a:r>
+            <a:r>
+              <a:rPr>
+                <a:solidFill>
                   <a:srgbClr val="5E5E5E"/>
                 </a:solidFill>
                 <a:latin typeface="Consolas"/>
               </a:rPr>
-              <a:t># Configure parameters</a:t>
+              <a:t>{</a:t>
+            </a:r>
+            <a:r>
+              <a:rPr>
+                <a:solidFill>
+                  <a:srgbClr val="003B4F"/>
+                </a:solidFill>
+                <a:latin typeface="Consolas"/>
+              </a:rPr>
+              <a:t>name</a:t>
+            </a:r>
+            <a:r>
+              <a:rPr>
+                <a:solidFill>
+                  <a:srgbClr val="5E5E5E"/>
+                </a:solidFill>
+                <a:latin typeface="Consolas"/>
+              </a:rPr>
+              <a:t>}</a:t>
+            </a:r>
+            <a:r>
+              <a:rPr>
+                <a:solidFill>
+                  <a:srgbClr val="20794D"/>
+                </a:solidFill>
+                <a:latin typeface="Consolas"/>
+              </a:rPr>
+              <a:t>"</a:t>
+            </a:r>
+            <a:r>
+              <a:rPr>
+                <a:solidFill>
+                  <a:srgbClr val="003B4F"/>
+                </a:solidFill>
+                <a:latin typeface="Consolas"/>
+              </a:rPr>
+              <a:t>))</a:t>
             </a:r>
             <a:br/>
             <a:r>
@@ -7880,7 +8189,63 @@
                 </a:solidFill>
                 <a:latin typeface="Consolas"/>
               </a:rPr>
-              <a:t>years </a:t>
+              <a:t>    display(Markdown(</a:t>
+            </a:r>
+            <a:r>
+              <a:rPr>
+                <a:solidFill>
+                  <a:srgbClr val="20794D"/>
+                </a:solidFill>
+                <a:latin typeface="Consolas"/>
+              </a:rPr>
+              <a:t>f'&lt;div class="columns"&gt;'</a:t>
+            </a:r>
+            <a:r>
+              <a:rPr>
+                <a:solidFill>
+                  <a:srgbClr val="003B4F"/>
+                </a:solidFill>
+                <a:latin typeface="Consolas"/>
+              </a:rPr>
+              <a:t>))</a:t>
+            </a:r>
+            <a:br/>
+            <a:r>
+              <a:rPr>
+                <a:solidFill>
+                  <a:srgbClr val="003B4F"/>
+                </a:solidFill>
+                <a:latin typeface="Consolas"/>
+              </a:rPr>
+              <a:t>    display(Markdown(</a:t>
+            </a:r>
+            <a:r>
+              <a:rPr>
+                <a:solidFill>
+                  <a:srgbClr val="20794D"/>
+                </a:solidFill>
+                <a:latin typeface="Consolas"/>
+              </a:rPr>
+              <a:t>f'&lt;div class="column"&gt;'</a:t>
+            </a:r>
+            <a:r>
+              <a:rPr>
+                <a:solidFill>
+                  <a:srgbClr val="003B4F"/>
+                </a:solidFill>
+                <a:latin typeface="Consolas"/>
+              </a:rPr>
+              <a:t>))</a:t>
+            </a:r>
+            <a:br/>
+            <a:r>
+              <a:rPr>
+                <a:solidFill>
+                  <a:srgbClr val="003B4F"/>
+                </a:solidFill>
+                <a:latin typeface="Consolas"/>
+              </a:rPr>
+              <a:t>    plot_dependency_ratio(df_dr[df_dr.Location </a:t>
             </a:r>
             <a:r>
               <a:rPr>
@@ -7889,7 +8254,7 @@
                 </a:solidFill>
                 <a:latin typeface="Consolas"/>
               </a:rPr>
-              <a:t>=</a:t>
+              <a:t>==</a:t>
             </a:r>
             <a:r>
               <a:rPr>
@@ -7898,17 +8263,9 @@
                 </a:solidFill>
                 <a:latin typeface="Consolas"/>
               </a:rPr>
-              <a:t> [</a:t>
-            </a:r>
-            <a:r>
-              <a:rPr>
-                <a:solidFill>
-                  <a:srgbClr val="AD0000"/>
-                </a:solidFill>
-                <a:latin typeface="Consolas"/>
-              </a:rPr>
-              <a:t>2000</a:t>
-            </a:r>
+              <a:t> name])</a:t>
+            </a:r>
+            <a:br/>
             <a:r>
               <a:rPr>
                 <a:solidFill>
@@ -7916,16 +8273,16 @@
                 </a:solidFill>
                 <a:latin typeface="Consolas"/>
               </a:rPr>
-              <a:t>, </a:t>
-            </a:r>
-            <a:r>
-              <a:rPr>
-                <a:solidFill>
-                  <a:srgbClr val="AD0000"/>
-                </a:solidFill>
-                <a:latin typeface="Consolas"/>
-              </a:rPr>
-              <a:t>2025</a:t>
+              <a:t>    display(Markdown(</a:t>
+            </a:r>
+            <a:r>
+              <a:rPr>
+                <a:solidFill>
+                  <a:srgbClr val="20794D"/>
+                </a:solidFill>
+                <a:latin typeface="Consolas"/>
+              </a:rPr>
+              <a:t>f'&lt;/div&gt;'</a:t>
             </a:r>
             <a:r>
               <a:rPr>
@@ -7934,17 +8291,9 @@
                 </a:solidFill>
                 <a:latin typeface="Consolas"/>
               </a:rPr>
-              <a:t>, </a:t>
-            </a:r>
-            <a:r>
-              <a:rPr>
-                <a:solidFill>
-                  <a:srgbClr val="AD0000"/>
-                </a:solidFill>
-                <a:latin typeface="Consolas"/>
-              </a:rPr>
-              <a:t>2050</a:t>
-            </a:r>
+              <a:t>))</a:t>
+            </a:r>
+            <a:br/>
             <a:r>
               <a:rPr>
                 <a:solidFill>
@@ -7952,16 +8301,16 @@
                 </a:solidFill>
                 <a:latin typeface="Consolas"/>
               </a:rPr>
-              <a:t>, </a:t>
-            </a:r>
-            <a:r>
-              <a:rPr>
-                <a:solidFill>
-                  <a:srgbClr val="AD0000"/>
-                </a:solidFill>
-                <a:latin typeface="Consolas"/>
-              </a:rPr>
-              <a:t>2075</a:t>
+              <a:t>    display(Markdown(</a:t>
+            </a:r>
+            <a:r>
+              <a:rPr>
+                <a:solidFill>
+                  <a:srgbClr val="20794D"/>
+                </a:solidFill>
+                <a:latin typeface="Consolas"/>
+              </a:rPr>
+              <a:t>f'&lt;div class="column"&gt;'</a:t>
             </a:r>
             <a:r>
               <a:rPr>
@@ -7970,473 +8319,7 @@
                 </a:solidFill>
                 <a:latin typeface="Consolas"/>
               </a:rPr>
-              <a:t>, </a:t>
-            </a:r>
-            <a:r>
-              <a:rPr>
-                <a:solidFill>
-                  <a:srgbClr val="AD0000"/>
-                </a:solidFill>
-                <a:latin typeface="Consolas"/>
-              </a:rPr>
-              <a:t>2100</a:t>
-            </a:r>
-            <a:r>
-              <a:rPr>
-                <a:solidFill>
-                  <a:srgbClr val="003B4F"/>
-                </a:solidFill>
-                <a:latin typeface="Consolas"/>
-              </a:rPr>
-              <a:t>]</a:t>
-            </a:r>
-            <a:br/>
-            <a:r>
-              <a:rPr>
-                <a:solidFill>
-                  <a:srgbClr val="003B4F"/>
-                </a:solidFill>
-                <a:latin typeface="Consolas"/>
-              </a:rPr>
-              <a:t>regions </a:t>
-            </a:r>
-            <a:r>
-              <a:rPr>
-                <a:solidFill>
-                  <a:srgbClr val="5E5E5E"/>
-                </a:solidFill>
-                <a:latin typeface="Consolas"/>
-              </a:rPr>
-              <a:t>=</a:t>
-            </a:r>
-            <a:r>
-              <a:rPr>
-                <a:solidFill>
-                  <a:srgbClr val="003B4F"/>
-                </a:solidFill>
-                <a:latin typeface="Consolas"/>
-              </a:rPr>
-              <a:t> [</a:t>
-            </a:r>
-            <a:r>
-              <a:rPr>
-                <a:solidFill>
-                  <a:srgbClr val="20794D"/>
-                </a:solidFill>
-                <a:latin typeface="Consolas"/>
-              </a:rPr>
-              <a:t>"Belgium"</a:t>
-            </a:r>
-            <a:r>
-              <a:rPr>
-                <a:solidFill>
-                  <a:srgbClr val="003B4F"/>
-                </a:solidFill>
-                <a:latin typeface="Consolas"/>
-              </a:rPr>
-              <a:t>, </a:t>
-            </a:r>
-            <a:r>
-              <a:rPr>
-                <a:solidFill>
-                  <a:srgbClr val="20794D"/>
-                </a:solidFill>
-                <a:latin typeface="Consolas"/>
-              </a:rPr>
-              <a:t>"China"</a:t>
-            </a:r>
-            <a:r>
-              <a:rPr>
-                <a:solidFill>
-                  <a:srgbClr val="003B4F"/>
-                </a:solidFill>
-                <a:latin typeface="Consolas"/>
-              </a:rPr>
-              <a:t>, </a:t>
-            </a:r>
-            <a:r>
-              <a:rPr>
-                <a:solidFill>
-                  <a:srgbClr val="20794D"/>
-                </a:solidFill>
-                <a:latin typeface="Consolas"/>
-              </a:rPr>
-              <a:t>"Brazil"</a:t>
-            </a:r>
-            <a:r>
-              <a:rPr>
-                <a:solidFill>
-                  <a:srgbClr val="003B4F"/>
-                </a:solidFill>
-                <a:latin typeface="Consolas"/>
-              </a:rPr>
-              <a:t>, </a:t>
-            </a:r>
-            <a:r>
-              <a:rPr>
-                <a:solidFill>
-                  <a:srgbClr val="20794D"/>
-                </a:solidFill>
-                <a:latin typeface="Consolas"/>
-              </a:rPr>
-              <a:t>"India"</a:t>
-            </a:r>
-            <a:r>
-              <a:rPr>
-                <a:solidFill>
-                  <a:srgbClr val="003B4F"/>
-                </a:solidFill>
-                <a:latin typeface="Consolas"/>
-              </a:rPr>
-              <a:t>, </a:t>
-            </a:r>
-            <a:r>
-              <a:rPr>
-                <a:solidFill>
-                  <a:srgbClr val="20794D"/>
-                </a:solidFill>
-                <a:latin typeface="Consolas"/>
-              </a:rPr>
-              <a:t>"Japan"</a:t>
-            </a:r>
-            <a:r>
-              <a:rPr>
-                <a:solidFill>
-                  <a:srgbClr val="003B4F"/>
-                </a:solidFill>
-                <a:latin typeface="Consolas"/>
-              </a:rPr>
-              <a:t>, </a:t>
-            </a:r>
-            <a:r>
-              <a:rPr>
-                <a:solidFill>
-                  <a:srgbClr val="20794D"/>
-                </a:solidFill>
-                <a:latin typeface="Consolas"/>
-              </a:rPr>
-              <a:t>"Nigeria"</a:t>
-            </a:r>
-            <a:r>
-              <a:rPr>
-                <a:solidFill>
-                  <a:srgbClr val="003B4F"/>
-                </a:solidFill>
-                <a:latin typeface="Consolas"/>
-              </a:rPr>
-              <a:t>]</a:t>
-            </a:r>
-            <a:br/>
-            <a:br/>
-            <a:r>
-              <a:rPr>
-                <a:solidFill>
-                  <a:srgbClr val="5E5E5E"/>
-                </a:solidFill>
-                <a:latin typeface="Consolas"/>
-              </a:rPr>
-              <a:t># graph functions were importe earlier with </a:t>
-            </a:r>
-            <a:br/>
-            <a:br/>
-            <a:r>
-              <a:rPr>
-                <a:solidFill>
-                  <a:srgbClr val="003B4F"/>
-                </a:solidFill>
-                <a:latin typeface="Consolas"/>
-              </a:rPr>
-              <a:t>for name in regions:</a:t>
-            </a:r>
-            <a:br/>
-            <a:r>
-              <a:rPr>
-                <a:solidFill>
-                  <a:srgbClr val="003B4F"/>
-                </a:solidFill>
-                <a:latin typeface="Consolas"/>
-              </a:rPr>
-              <a:t>    </a:t>
-            </a:r>
-            <a:r>
-              <a:rPr>
-                <a:solidFill>
-                  <a:srgbClr val="5E5E5E"/>
-                </a:solidFill>
-                <a:latin typeface="Consolas"/>
-              </a:rPr>
-              <a:t># generate slide header</a:t>
-            </a:r>
-            <a:br/>
-            <a:r>
-              <a:rPr>
-                <a:solidFill>
-                  <a:srgbClr val="003B4F"/>
-                </a:solidFill>
-                <a:latin typeface="Consolas"/>
-              </a:rPr>
-              <a:t>    display(Markdown(</a:t>
-            </a:r>
-            <a:r>
-              <a:rPr>
-                <a:solidFill>
-                  <a:srgbClr val="20794D"/>
-                </a:solidFill>
-                <a:latin typeface="Consolas"/>
-              </a:rPr>
-              <a:t>f"## Age and Population Pyramids for </a:t>
-            </a:r>
-            <a:r>
-              <a:rPr>
-                <a:solidFill>
-                  <a:srgbClr val="5E5E5E"/>
-                </a:solidFill>
-                <a:latin typeface="Consolas"/>
-              </a:rPr>
-              <a:t>{</a:t>
-            </a:r>
-            <a:r>
-              <a:rPr>
-                <a:solidFill>
-                  <a:srgbClr val="003B4F"/>
-                </a:solidFill>
-                <a:latin typeface="Consolas"/>
-              </a:rPr>
-              <a:t>name</a:t>
-            </a:r>
-            <a:r>
-              <a:rPr>
-                <a:solidFill>
-                  <a:srgbClr val="5E5E5E"/>
-                </a:solidFill>
-                <a:latin typeface="Consolas"/>
-              </a:rPr>
-              <a:t>}</a:t>
-            </a:r>
-            <a:r>
-              <a:rPr>
-                <a:solidFill>
-                  <a:srgbClr val="20794D"/>
-                </a:solidFill>
-                <a:latin typeface="Consolas"/>
-              </a:rPr>
-              <a:t>"</a:t>
-            </a:r>
-            <a:r>
-              <a:rPr>
-                <a:solidFill>
-                  <a:srgbClr val="003B4F"/>
-                </a:solidFill>
-                <a:latin typeface="Consolas"/>
-              </a:rPr>
               <a:t>))</a:t>
-            </a:r>
-            <a:br/>
-            <a:r>
-              <a:rPr>
-                <a:solidFill>
-                  <a:srgbClr val="003B4F"/>
-                </a:solidFill>
-                <a:latin typeface="Consolas"/>
-              </a:rPr>
-              <a:t>    </a:t>
-            </a:r>
-            <a:br/>
-            <a:r>
-              <a:rPr>
-                <a:solidFill>
-                  <a:srgbClr val="003B4F"/>
-                </a:solidFill>
-                <a:latin typeface="Consolas"/>
-              </a:rPr>
-              <a:t>    </a:t>
-            </a:r>
-            <a:r>
-              <a:rPr>
-                <a:solidFill>
-                  <a:srgbClr val="5E5E5E"/>
-                </a:solidFill>
-                <a:latin typeface="Consolas"/>
-              </a:rPr>
-              <a:t># generate columns</a:t>
-            </a:r>
-            <a:br/>
-            <a:r>
-              <a:rPr>
-                <a:solidFill>
-                  <a:srgbClr val="003B4F"/>
-                </a:solidFill>
-                <a:latin typeface="Consolas"/>
-              </a:rPr>
-              <a:t>    display(Markdown(</a:t>
-            </a:r>
-            <a:r>
-              <a:rPr>
-                <a:solidFill>
-                  <a:srgbClr val="20794D"/>
-                </a:solidFill>
-                <a:latin typeface="Consolas"/>
-              </a:rPr>
-              <a:t>f'&lt;div class="columns"&gt;'</a:t>
-            </a:r>
-            <a:r>
-              <a:rPr>
-                <a:solidFill>
-                  <a:srgbClr val="003B4F"/>
-                </a:solidFill>
-                <a:latin typeface="Consolas"/>
-              </a:rPr>
-              <a:t>))</a:t>
-            </a:r>
-            <a:br/>
-            <a:r>
-              <a:rPr>
-                <a:solidFill>
-                  <a:srgbClr val="003B4F"/>
-                </a:solidFill>
-                <a:latin typeface="Consolas"/>
-              </a:rPr>
-              <a:t>    display(Markdown(</a:t>
-            </a:r>
-            <a:r>
-              <a:rPr>
-                <a:solidFill>
-                  <a:srgbClr val="20794D"/>
-                </a:solidFill>
-                <a:latin typeface="Consolas"/>
-              </a:rPr>
-              <a:t>f'&lt;div class="column"&gt;'</a:t>
-            </a:r>
-            <a:r>
-              <a:rPr>
-                <a:solidFill>
-                  <a:srgbClr val="003B4F"/>
-                </a:solidFill>
-                <a:latin typeface="Consolas"/>
-              </a:rPr>
-              <a:t>))</a:t>
-            </a:r>
-            <a:br/>
-            <a:r>
-              <a:rPr>
-                <a:solidFill>
-                  <a:srgbClr val="003B4F"/>
-                </a:solidFill>
-                <a:latin typeface="Consolas"/>
-              </a:rPr>
-              <a:t>    </a:t>
-            </a:r>
-            <a:r>
-              <a:rPr>
-                <a:solidFill>
-                  <a:srgbClr val="5E5E5E"/>
-                </a:solidFill>
-                <a:latin typeface="Consolas"/>
-              </a:rPr>
-              <a:t># column 1 contains a dependency ratio plot</a:t>
-            </a:r>
-            <a:br/>
-            <a:r>
-              <a:rPr>
-                <a:solidFill>
-                  <a:srgbClr val="003B4F"/>
-                </a:solidFill>
-                <a:latin typeface="Consolas"/>
-              </a:rPr>
-              <a:t>    plot_dependency_ratio(df_dr[df_dr.Location </a:t>
-            </a:r>
-            <a:r>
-              <a:rPr>
-                <a:solidFill>
-                  <a:srgbClr val="5E5E5E"/>
-                </a:solidFill>
-                <a:latin typeface="Consolas"/>
-              </a:rPr>
-              <a:t>==</a:t>
-            </a:r>
-            <a:r>
-              <a:rPr>
-                <a:solidFill>
-                  <a:srgbClr val="003B4F"/>
-                </a:solidFill>
-                <a:latin typeface="Consolas"/>
-              </a:rPr>
-              <a:t> name])</a:t>
-            </a:r>
-            <a:br/>
-            <a:r>
-              <a:rPr>
-                <a:solidFill>
-                  <a:srgbClr val="003B4F"/>
-                </a:solidFill>
-                <a:latin typeface="Consolas"/>
-              </a:rPr>
-              <a:t>    display(Markdown(</a:t>
-            </a:r>
-            <a:r>
-              <a:rPr>
-                <a:solidFill>
-                  <a:srgbClr val="20794D"/>
-                </a:solidFill>
-                <a:latin typeface="Consolas"/>
-              </a:rPr>
-              <a:t>f'&lt;/div&gt;'</a:t>
-            </a:r>
-            <a:r>
-              <a:rPr>
-                <a:solidFill>
-                  <a:srgbClr val="003B4F"/>
-                </a:solidFill>
-                <a:latin typeface="Consolas"/>
-              </a:rPr>
-              <a:t>))</a:t>
-            </a:r>
-            <a:br/>
-            <a:r>
-              <a:rPr>
-                <a:solidFill>
-                  <a:srgbClr val="003B4F"/>
-                </a:solidFill>
-                <a:latin typeface="Consolas"/>
-              </a:rPr>
-              <a:t>    display(Markdown(</a:t>
-            </a:r>
-            <a:r>
-              <a:rPr>
-                <a:solidFill>
-                  <a:srgbClr val="20794D"/>
-                </a:solidFill>
-                <a:latin typeface="Consolas"/>
-              </a:rPr>
-              <a:t>f'&lt;div class="column"&gt;'</a:t>
-            </a:r>
-            <a:r>
-              <a:rPr>
-                <a:solidFill>
-                  <a:srgbClr val="003B4F"/>
-                </a:solidFill>
-                <a:latin typeface="Consolas"/>
-              </a:rPr>
-              <a:t>))</a:t>
-            </a:r>
-            <a:br/>
-            <a:r>
-              <a:rPr>
-                <a:solidFill>
-                  <a:srgbClr val="003B4F"/>
-                </a:solidFill>
-                <a:latin typeface="Consolas"/>
-              </a:rPr>
-              <a:t>    </a:t>
-            </a:r>
-            <a:r>
-              <a:rPr>
-                <a:solidFill>
-                  <a:srgbClr val="5E5E5E"/>
-                </a:solidFill>
-                <a:latin typeface="Consolas"/>
-              </a:rPr>
-              <a:t># column 2 contains a population pyramid</a:t>
             </a:r>
             <a:br/>
             <a:r>
@@ -11437,31 +11320,36 @@
           </a:p>
         </p:txBody>
       </p:sp>
-      <p:sp>
-        <p:nvSpPr>
-          <p:cNvPr id="4" name="Content Placeholder 3"/>
-          <p:cNvSpPr>
-            <a:spLocks noGrp="1"/>
-          </p:cNvSpPr>
-          <p:nvPr>
-            <p:ph idx="2" sz="half"/>
-          </p:nvPr>
-        </p:nvSpPr>
-        <p:spPr/>
-        <p:txBody>
-          <a:bodyPr/>
-          <a:lstStyle/>
-          <a:p>
-            <a:pPr lvl="0" indent="0" marL="0">
-              <a:buNone/>
-            </a:pPr>
-            <a:r>
-              <a:rPr/>
-              <a:t>graph TD P[Pre-scripts] –&gt; Q style P fill:#AA99FF Q[.qmd] –&gt; A subgraph Quarto A[.ipynb] –&gt; B((“Pandoc”)) B –&gt; C[.md] B –&gt; D[.tex] D –&gt; F((Xetex)) C –&gt; I((Hugo)) style B fill:#FF6655AA style F fill:#88ffFF style I fill:#88ffFF end B —-&gt; E[.doc] B —-&gt; H[.pptx] F –&gt; G[.pdf] I –&gt; J[.html] E –&gt; X[Post-scripts] H –&gt; X G –&gt; X J –&gt; X style X fill:#AA99FF ```</a:t>
-            </a:r>
-          </a:p>
-        </p:txBody>
-      </p:sp>
+      <p:pic>
+        <p:nvPicPr>
+          <p:cNvPr descr="presentation_files/figure-pptx/mermaid-figure-2.png" id="0" name="Picture 1"/>
+          <p:cNvPicPr>
+            <a:picLocks noGrp="1" noChangeAspect="1"/>
+          </p:cNvPicPr>
+          <p:nvPr/>
+        </p:nvPicPr>
+        <p:blipFill>
+          <a:blip r:embed="rId6"/>
+          <a:stretch>
+            <a:fillRect/>
+          </a:stretch>
+        </p:blipFill>
+        <p:spPr bwMode="auto">
+          <a:xfrm>
+            <a:off x="5727700" y="1193800"/>
+            <a:ext cx="1892300" cy="3390900"/>
+          </a:xfrm>
+          <a:prstGeom prst="rect">
+            <a:avLst/>
+          </a:prstGeom>
+          <a:noFill/>
+          <a:ln w="9525">
+            <a:noFill/>
+            <a:headEnd/>
+            <a:tailEnd/>
+          </a:ln>
+        </p:spPr>
+      </p:pic>
     </p:spTree>
   </p:cSld>
 </p:sld>
@@ -12320,16 +12208,7 @@
             </a:r>
             <a:r>
               <a:rPr/>
-              <a:t>. This keeps the configuration and content in the same file.</a:t>
-            </a:r>
-          </a:p>
-          <a:p>
-            <a:pPr lvl="0" indent="0" marL="0">
-              <a:buNone/>
-            </a:pPr>
-            <a:r>
-              <a:rPr/>
-              <a:t>You can then render the outputs using </a:t>
+              <a:t>. This keeps the configuration and content in the same file. You can then render the outputs using </a:t>
             </a:r>
             <a:r>
               <a:rPr>
@@ -12346,7 +12225,7 @@
       </p:sp>
       <p:pic>
         <p:nvPicPr>
-          <p:cNvPr descr="presentation_files/figure-pptx/mermaid-figure-3.png" id="0" name="Picture 1"/>
+          <p:cNvPr descr="presentation_files/figure-pptx/mermaid-figure-4.png" id="0" name="Picture 1"/>
           <p:cNvPicPr>
             <a:picLocks noGrp="1" noChangeAspect="1"/>
           </p:cNvPicPr>

</xml_diff>

<commit_message>
Work done by Sun Jul  3 23:40:49 PDT 2022
</commit_message>
<xml_diff>
--- a/docs/presentation-orig.pptx
+++ b/docs/presentation-orig.pptx
@@ -11086,7 +11086,7 @@
             </a:r>
             <a:r>
               <a:rPr/>
-              <a:t>. I can automate my blog to tweet and post to LinkedIn when I write new articles.</a:t>
+              <a:t>. I wrote code to post new articles to Twitter and LinkedIn.</a:t>
             </a:r>
           </a:p>
           <a:p>
@@ -11098,7 +11098,7 @@
             </a:pPr>
             <a:r>
               <a:rPr b="1"/>
-              <a:t>Presentations: special cases</a:t>
+              <a:t>Presentations</a:t>
             </a:r>
           </a:p>
           <a:p>
@@ -11107,7 +11107,7 @@
             </a:pPr>
             <a:r>
               <a:rPr/>
-              <a:t>For PowerPoint, render process =&gt; long edit cycle. Still useful for:</a:t>
+              <a:t>Great for RevealJS. For PPT, render process =&gt; long edit cycle. Useful for:</a:t>
             </a:r>
           </a:p>
           <a:p>
@@ -11133,15 +11133,6 @@
             <a:r>
               <a:rPr/>
               <a:t>Collaborators used to Git/Beamer</a:t>
-            </a:r>
-          </a:p>
-          <a:p>
-            <a:pPr lvl="0" indent="0" marL="0">
-              <a:buNone/>
-            </a:pPr>
-            <a:r>
-              <a:rPr/>
-              <a:t>Quarto works great for RevealJS.</a:t>
             </a:r>
           </a:p>
         </p:txBody>
@@ -11972,13 +11963,7 @@
       </p:grpSpPr>
       <p:sp>
         <p:nvSpPr>
-          <p:cNvPr id="9" name="Title 1">
-            <a:extLst>
-              <a:ext uri="{FF2B5EF4-FFF2-40B4-BE49-F238E27FC236}">
-                <a16:creationId xmlns:a16="http://schemas.microsoft.com/office/drawing/2014/main" id="{039B6DB2-D068-C680-F293-31EEF2D13404}"/>
-              </a:ext>
-            </a:extLst>
-          </p:cNvPr>
+          <p:cNvPr id="2" name="Title 1"/>
           <p:cNvSpPr>
             <a:spLocks noGrp="1"/>
           </p:cNvSpPr>
@@ -11986,12 +11971,7 @@
             <p:ph type="title"/>
           </p:nvPr>
         </p:nvSpPr>
-        <p:spPr>
-          <a:xfrm>
-            <a:off x="457200" y="205979"/>
-            <a:ext cx="8229600" cy="857250"/>
-          </a:xfrm>
-        </p:spPr>
+        <p:spPr/>
         <p:txBody>
           <a:bodyPr/>
           <a:lstStyle/>
@@ -12008,12 +11988,12 @@
       </p:sp>
       <p:sp>
         <p:nvSpPr>
-          <p:cNvPr id="4" name="Text Placeholder 3"/>
-          <p:cNvSpPr>
-            <a:spLocks noGrp="1"/>
-          </p:cNvSpPr>
-          <p:nvPr>
-            <p:ph idx="2" sz="half" type="body"/>
+          <p:cNvPr id="3" name="Content Placeholder 2"/>
+          <p:cNvSpPr>
+            <a:spLocks noGrp="1"/>
+          </p:cNvSpPr>
+          <p:nvPr>
+            <p:ph idx="1" sz="half"/>
           </p:nvPr>
         </p:nvSpPr>
         <p:spPr/>
@@ -12052,11 +12032,11 @@
                 <a:hlinkClick r:id="rId3"/>
                 <a:latin typeface="Consolas"/>
               </a:rPr>
-              <a:t>pandoc</a:t>
-            </a:r>
-            <a:r>
-              <a:rPr/>
-              <a:t> to generate papers, HTML, PowerPoint, etc.</a:t>
+              <a:t>Pandoc</a:t>
+            </a:r>
+            <a:r>
+              <a:rPr/>
+              <a:t> on .ipynb files to generate papers, HTML, PowerPoint, etc.</a:t>
             </a:r>
           </a:p>
           <a:p>
@@ -12065,7 +12045,7 @@
             </a:pPr>
             <a:r>
               <a:rPr/>
-              <a:t>You just need to learn Pandoc.</a:t>
+              <a:t>You just need to learn Pandoc and shell scripting.</a:t>
             </a:r>
           </a:p>
         </p:txBody>
@@ -12086,8 +12066,8 @@
         </p:blipFill>
         <p:spPr bwMode="auto">
           <a:xfrm>
-            <a:off x="2362200" y="1689100"/>
-            <a:ext cx="4406900" cy="2984500"/>
+            <a:off x="5232400" y="1193800"/>
+            <a:ext cx="2870200" cy="3390900"/>
           </a:xfrm>
           <a:prstGeom prst="rect">
             <a:avLst/>
@@ -12124,13 +12104,7 @@
       </p:grpSpPr>
       <p:sp>
         <p:nvSpPr>
-          <p:cNvPr id="9" name="Title 1">
-            <a:extLst>
-              <a:ext uri="{FF2B5EF4-FFF2-40B4-BE49-F238E27FC236}">
-                <a16:creationId xmlns:a16="http://schemas.microsoft.com/office/drawing/2014/main" id="{039B6DB2-D068-C680-F293-31EEF2D13404}"/>
-              </a:ext>
-            </a:extLst>
-          </p:cNvPr>
+          <p:cNvPr id="2" name="Title 1"/>
           <p:cNvSpPr>
             <a:spLocks noGrp="1"/>
           </p:cNvSpPr>
@@ -12138,12 +12112,7 @@
             <p:ph type="title"/>
           </p:nvPr>
         </p:nvSpPr>
-        <p:spPr>
-          <a:xfrm>
-            <a:off x="457200" y="205979"/>
-            <a:ext cx="8229600" cy="857250"/>
-          </a:xfrm>
-        </p:spPr>
+        <p:spPr/>
         <p:txBody>
           <a:bodyPr/>
           <a:lstStyle/>
@@ -12160,12 +12129,12 @@
       </p:sp>
       <p:sp>
         <p:nvSpPr>
-          <p:cNvPr id="4" name="Text Placeholder 3"/>
-          <p:cNvSpPr>
-            <a:spLocks noGrp="1"/>
-          </p:cNvSpPr>
-          <p:nvPr>
-            <p:ph idx="2" sz="half" type="body"/>
+          <p:cNvPr id="3" name="Content Placeholder 2"/>
+          <p:cNvSpPr>
+            <a:spLocks noGrp="1"/>
+          </p:cNvSpPr>
+          <p:nvPr>
+            <p:ph idx="1" sz="half"/>
           </p:nvPr>
         </p:nvSpPr>
         <p:spPr/>
@@ -12188,8 +12157,13 @@
             </a:r>
             <a:r>
               <a:rPr/>
-              <a:t> file. </a:t>
-            </a:r>
+              <a:t> file.</a:t>
+            </a:r>
+          </a:p>
+          <a:p>
+            <a:pPr lvl="0" indent="0" marL="0">
+              <a:buNone/>
+            </a:pPr>
             <a:r>
               <a:rPr>
                 <a:latin typeface="Consolas"/>
@@ -12208,7 +12182,16 @@
             </a:r>
             <a:r>
               <a:rPr/>
-              <a:t>. This keeps the configuration and content in the same file. You can then render the outputs using </a:t>
+              <a:t>.</a:t>
+            </a:r>
+          </a:p>
+          <a:p>
+            <a:pPr lvl="0" indent="0" marL="0">
+              <a:buNone/>
+            </a:pPr>
+            <a:r>
+              <a:rPr/>
+              <a:t>This keeps the configuration and content in the same file. You can then render the outputs using </a:t>
             </a:r>
             <a:r>
               <a:rPr>
@@ -12239,8 +12222,8 @@
         </p:blipFill>
         <p:spPr bwMode="auto">
           <a:xfrm>
-            <a:off x="1943100" y="1689100"/>
-            <a:ext cx="5245100" cy="2984500"/>
+            <a:off x="5486400" y="1193800"/>
+            <a:ext cx="2362200" cy="3390900"/>
           </a:xfrm>
           <a:prstGeom prst="rect">
             <a:avLst/>

</xml_diff>

<commit_message>
Work done by Sun Jul  3 23:53:16 PDT 2022
</commit_message>
<xml_diff>
--- a/docs/presentation-orig.pptx
+++ b/docs/presentation-orig.pptx
@@ -5764,78 +5764,8 @@
                 </a:pPr>
                 <a:r>
                   <a:rPr/>
-                  <a:t>Here’s an example of the first regression in Wooldridge’s Introductory Econometrics book:</a:t>
+                  <a:t>This code runs the first regression in Wooldridge’s Econometrics:</a:t>
                 </a:r>
-              </a:p>
-              <a:p>
-                <a:pPr lvl="0" indent="0" marL="0">
-                  <a:buNone/>
-                </a:pPr>
-                <a14:m>
-                  <m:oMathPara xmlns:m="http://schemas.openxmlformats.org/officeDocument/2006/math">
-                    <m:oMathParaPr>
-                      <m:jc m:val="center"/>
-                    </m:oMathParaPr>
-                    <m:oMath>
-                      <m:r>
-                        <m:rPr>
-                          <m:nor/>
-                          <m:sty m:val="p"/>
-                        </m:rPr>
-                        <m:t>wage</m:t>
-                      </m:r>
-                      <m:r>
-                        <m:rPr>
-                          <m:sty m:val="p"/>
-                        </m:rPr>
-                        <m:t>=</m:t>
-                      </m:r>
-                      <m:r>
-                        <m:t>α</m:t>
-                      </m:r>
-                      <m:r>
-                        <m:rPr>
-                          <m:sty m:val="p"/>
-                        </m:rPr>
-                        <m:t>+</m:t>
-                      </m:r>
-                      <m:sSub>
-                        <m:e>
-                          <m:r>
-                            <m:t>β</m:t>
-                          </m:r>
-                        </m:e>
-                        <m:sub>
-                          <m:r>
-                            <m:t>1</m:t>
-                          </m:r>
-                        </m:sub>
-                      </m:sSub>
-                      <m:r>
-                        <m:rPr>
-                          <m:sty m:val="p"/>
-                        </m:rPr>
-                        <m:t>×</m:t>
-                      </m:r>
-                      <m:r>
-                        <m:rPr>
-                          <m:nor/>
-                          <m:sty m:val="p"/>
-                        </m:rPr>
-                        <m:t>educ</m:t>
-                      </m:r>
-                      <m:r>
-                        <m:rPr>
-                          <m:sty m:val="p"/>
-                        </m:rPr>
-                        <m:t>+</m:t>
-                      </m:r>
-                      <m:r>
-                        <m:t>ϵ</m:t>
-                      </m:r>
-                    </m:oMath>
-                  </m:oMathPara>
-                </a14:m>
               </a:p>
               <a:p>
                 <a:pPr lvl="0" indent="0">
@@ -6088,6 +6018,76 @@
                   </a:rPr>
                   <a:t>].as_html())))</a:t>
                 </a:r>
+              </a:p>
+              <a:p>
+                <a:pPr lvl="0" indent="0" marL="0">
+                  <a:buNone/>
+                </a:pPr>
+                <a14:m>
+                  <m:oMathPara xmlns:m="http://schemas.openxmlformats.org/officeDocument/2006/math">
+                    <m:oMathParaPr>
+                      <m:jc m:val="center"/>
+                    </m:oMathParaPr>
+                    <m:oMath>
+                      <m:r>
+                        <m:rPr>
+                          <m:nor/>
+                          <m:sty m:val="p"/>
+                        </m:rPr>
+                        <m:t>wage</m:t>
+                      </m:r>
+                      <m:r>
+                        <m:rPr>
+                          <m:sty m:val="p"/>
+                        </m:rPr>
+                        <m:t>=</m:t>
+                      </m:r>
+                      <m:r>
+                        <m:t>α</m:t>
+                      </m:r>
+                      <m:r>
+                        <m:rPr>
+                          <m:sty m:val="p"/>
+                        </m:rPr>
+                        <m:t>+</m:t>
+                      </m:r>
+                      <m:sSub>
+                        <m:e>
+                          <m:r>
+                            <m:t>β</m:t>
+                          </m:r>
+                        </m:e>
+                        <m:sub>
+                          <m:r>
+                            <m:t>1</m:t>
+                          </m:r>
+                        </m:sub>
+                      </m:sSub>
+                      <m:r>
+                        <m:rPr>
+                          <m:sty m:val="p"/>
+                        </m:rPr>
+                        <m:t>×</m:t>
+                      </m:r>
+                      <m:r>
+                        <m:rPr>
+                          <m:nor/>
+                          <m:sty m:val="p"/>
+                        </m:rPr>
+                        <m:t>educ</m:t>
+                      </m:r>
+                      <m:r>
+                        <m:rPr>
+                          <m:sty m:val="p"/>
+                        </m:rPr>
+                        <m:t>+</m:t>
+                      </m:r>
+                      <m:r>
+                        <m:t>ϵ</m:t>
+                      </m:r>
+                    </m:oMath>
+                  </m:oMathPara>
+                </a14:m>
               </a:p>
             </p:txBody>
           </p:sp>

</xml_diff>

<commit_message>
Work done by Mon Jul  4 00:03:27 PDT 2022
</commit_message>
<xml_diff>
--- a/docs/presentation-orig.pptx
+++ b/docs/presentation-orig.pptx
@@ -5742,16 +5742,284 @@
           </a:p>
         </p:txBody>
       </p:sp>
+      <p:sp>
+        <p:nvSpPr>
+          <p:cNvPr id="3" name="Text Placeholder 2"/>
+          <p:cNvSpPr>
+            <a:spLocks noGrp="1"/>
+          </p:cNvSpPr>
+          <p:nvPr>
+            <p:ph idx="1" type="body"/>
+          </p:nvPr>
+        </p:nvSpPr>
+        <p:spPr/>
+        <p:txBody>
+          <a:bodyPr/>
+          <a:lstStyle/>
+          <a:p>
+            <a:pPr lvl="0" indent="0">
+              <a:buNone/>
+            </a:pPr>
+            <a:r>
+              <a:rPr>
+                <a:solidFill>
+                  <a:srgbClr val="5E5E5E"/>
+                </a:solidFill>
+                <a:latin typeface="Consolas"/>
+              </a:rPr>
+              <a:t># Load the data</a:t>
+            </a:r>
+            <a:br/>
+            <a:r>
+              <a:rPr>
+                <a:solidFill>
+                  <a:srgbClr val="003B4F"/>
+                </a:solidFill>
+                <a:latin typeface="Consolas"/>
+              </a:rPr>
+              <a:t>df_wage </a:t>
+            </a:r>
+            <a:r>
+              <a:rPr>
+                <a:solidFill>
+                  <a:srgbClr val="5E5E5E"/>
+                </a:solidFill>
+                <a:latin typeface="Consolas"/>
+              </a:rPr>
+              <a:t>=</a:t>
+            </a:r>
+            <a:r>
+              <a:rPr>
+                <a:solidFill>
+                  <a:srgbClr val="003B4F"/>
+                </a:solidFill>
+                <a:latin typeface="Consolas"/>
+              </a:rPr>
+              <a:t> pd.read_csv(</a:t>
+            </a:r>
+            <a:r>
+              <a:rPr>
+                <a:solidFill>
+                  <a:srgbClr val="20794D"/>
+                </a:solidFill>
+                <a:latin typeface="Consolas"/>
+              </a:rPr>
+              <a:t>"data/wage1.csv"</a:t>
+            </a:r>
+            <a:r>
+              <a:rPr>
+                <a:solidFill>
+                  <a:srgbClr val="003B4F"/>
+                </a:solidFill>
+                <a:latin typeface="Consolas"/>
+              </a:rPr>
+              <a:t>)</a:t>
+            </a:r>
+            <a:br/>
+            <a:br/>
+            <a:r>
+              <a:rPr>
+                <a:solidFill>
+                  <a:srgbClr val="5E5E5E"/>
+                </a:solidFill>
+                <a:latin typeface="Consolas"/>
+              </a:rPr>
+              <a:t># Create an OLS model using </a:t>
+            </a:r>
+            <a:br/>
+            <a:r>
+              <a:rPr>
+                <a:solidFill>
+                  <a:srgbClr val="5E5E5E"/>
+                </a:solidFill>
+                <a:latin typeface="Consolas"/>
+              </a:rPr>
+              <a:t># the R syntax - assumes an intercept</a:t>
+            </a:r>
+            <a:br/>
+            <a:r>
+              <a:rPr>
+                <a:solidFill>
+                  <a:srgbClr val="003B4F"/>
+                </a:solidFill>
+                <a:latin typeface="Consolas"/>
+              </a:rPr>
+              <a:t>mod </a:t>
+            </a:r>
+            <a:r>
+              <a:rPr>
+                <a:solidFill>
+                  <a:srgbClr val="5E5E5E"/>
+                </a:solidFill>
+                <a:latin typeface="Consolas"/>
+              </a:rPr>
+              <a:t>=</a:t>
+            </a:r>
+            <a:r>
+              <a:rPr>
+                <a:solidFill>
+                  <a:srgbClr val="003B4F"/>
+                </a:solidFill>
+                <a:latin typeface="Consolas"/>
+              </a:rPr>
+              <a:t> smf.ols(formula</a:t>
+            </a:r>
+            <a:r>
+              <a:rPr>
+                <a:solidFill>
+                  <a:srgbClr val="5E5E5E"/>
+                </a:solidFill>
+                <a:latin typeface="Consolas"/>
+              </a:rPr>
+              <a:t>=</a:t>
+            </a:r>
+            <a:r>
+              <a:rPr>
+                <a:solidFill>
+                  <a:srgbClr val="20794D"/>
+                </a:solidFill>
+                <a:latin typeface="Consolas"/>
+              </a:rPr>
+              <a:t>"wage ~ educ"</a:t>
+            </a:r>
+            <a:r>
+              <a:rPr>
+                <a:solidFill>
+                  <a:srgbClr val="003B4F"/>
+                </a:solidFill>
+                <a:latin typeface="Consolas"/>
+              </a:rPr>
+              <a:t>,</a:t>
+            </a:r>
+            <a:br/>
+            <a:r>
+              <a:rPr>
+                <a:solidFill>
+                  <a:srgbClr val="003B4F"/>
+                </a:solidFill>
+                <a:latin typeface="Consolas"/>
+              </a:rPr>
+              <a:t>              data</a:t>
+            </a:r>
+            <a:r>
+              <a:rPr>
+                <a:solidFill>
+                  <a:srgbClr val="5E5E5E"/>
+                </a:solidFill>
+                <a:latin typeface="Consolas"/>
+              </a:rPr>
+              <a:t>=</a:t>
+            </a:r>
+            <a:r>
+              <a:rPr>
+                <a:solidFill>
+                  <a:srgbClr val="003B4F"/>
+                </a:solidFill>
+                <a:latin typeface="Consolas"/>
+              </a:rPr>
+              <a:t>df_wage)</a:t>
+            </a:r>
+            <a:br/>
+            <a:br/>
+            <a:r>
+              <a:rPr>
+                <a:solidFill>
+                  <a:srgbClr val="5E5E5E"/>
+                </a:solidFill>
+                <a:latin typeface="Consolas"/>
+              </a:rPr>
+              <a:t># Fit the model</a:t>
+            </a:r>
+            <a:br/>
+            <a:r>
+              <a:rPr>
+                <a:solidFill>
+                  <a:srgbClr val="003B4F"/>
+                </a:solidFill>
+                <a:latin typeface="Consolas"/>
+              </a:rPr>
+              <a:t>res </a:t>
+            </a:r>
+            <a:r>
+              <a:rPr>
+                <a:solidFill>
+                  <a:srgbClr val="5E5E5E"/>
+                </a:solidFill>
+                <a:latin typeface="Consolas"/>
+              </a:rPr>
+              <a:t>=</a:t>
+            </a:r>
+            <a:r>
+              <a:rPr>
+                <a:solidFill>
+                  <a:srgbClr val="003B4F"/>
+                </a:solidFill>
+                <a:latin typeface="Consolas"/>
+              </a:rPr>
+              <a:t> mod.fit()</a:t>
+            </a:r>
+            <a:br/>
+            <a:br/>
+            <a:r>
+              <a:rPr>
+                <a:solidFill>
+                  <a:srgbClr val="5E5E5E"/>
+                </a:solidFill>
+                <a:latin typeface="Consolas"/>
+              </a:rPr>
+              <a:t># Show the results</a:t>
+            </a:r>
+            <a:br/>
+            <a:r>
+              <a:rPr>
+                <a:solidFill>
+                  <a:srgbClr val="003B4F"/>
+                </a:solidFill>
+                <a:latin typeface="Consolas"/>
+              </a:rPr>
+              <a:t>display(Markdown(md(res.summary().</a:t>
+            </a:r>
+            <a:br/>
+            <a:r>
+              <a:rPr>
+                <a:solidFill>
+                  <a:srgbClr val="003B4F"/>
+                </a:solidFill>
+                <a:latin typeface="Consolas"/>
+              </a:rPr>
+              <a:t>        tables[</a:t>
+            </a:r>
+            <a:r>
+              <a:rPr>
+                <a:solidFill>
+                  <a:srgbClr val="AD0000"/>
+                </a:solidFill>
+                <a:latin typeface="Consolas"/>
+              </a:rPr>
+              <a:t>1</a:t>
+            </a:r>
+            <a:r>
+              <a:rPr>
+                <a:solidFill>
+                  <a:srgbClr val="003B4F"/>
+                </a:solidFill>
+                <a:latin typeface="Consolas"/>
+              </a:rPr>
+              <a:t>].as_html())))</a:t>
+            </a:r>
+          </a:p>
+        </p:txBody>
+      </p:sp>
       <mc:AlternateContent xmlns:mc="http://schemas.openxmlformats.org/markup-compatibility/2006">
         <mc:Choice xmlns:a14="http://schemas.microsoft.com/office/drawing/2010/main" Requires="a14">
           <p:sp>
             <p:nvSpPr>
-              <p:cNvPr id="3" name="Content Placeholder 2"/>
+              <p:cNvPr id="5" name="Text Placeholder 4"/>
               <p:cNvSpPr>
                 <a:spLocks noGrp="1"/>
               </p:cNvSpPr>
               <p:nvPr>
-                <p:ph idx="1" sz="half"/>
+                <p:ph idx="3" sz="quarter" type="body"/>
               </p:nvPr>
             </p:nvSpPr>
             <p:spPr/>
@@ -5765,258 +6033,6 @@
                 <a:r>
                   <a:rPr/>
                   <a:t>This code runs the first regression in Wooldridge’s Econometrics:</a:t>
-                </a:r>
-              </a:p>
-              <a:p>
-                <a:pPr lvl="0" indent="0">
-                  <a:buNone/>
-                </a:pPr>
-                <a:r>
-                  <a:rPr>
-                    <a:solidFill>
-                      <a:srgbClr val="5E5E5E"/>
-                    </a:solidFill>
-                    <a:latin typeface="Consolas"/>
-                  </a:rPr>
-                  <a:t># Load the data</a:t>
-                </a:r>
-                <a:br/>
-                <a:r>
-                  <a:rPr>
-                    <a:solidFill>
-                      <a:srgbClr val="003B4F"/>
-                    </a:solidFill>
-                    <a:latin typeface="Consolas"/>
-                  </a:rPr>
-                  <a:t>df_wage </a:t>
-                </a:r>
-                <a:r>
-                  <a:rPr>
-                    <a:solidFill>
-                      <a:srgbClr val="5E5E5E"/>
-                    </a:solidFill>
-                    <a:latin typeface="Consolas"/>
-                  </a:rPr>
-                  <a:t>=</a:t>
-                </a:r>
-                <a:r>
-                  <a:rPr>
-                    <a:solidFill>
-                      <a:srgbClr val="003B4F"/>
-                    </a:solidFill>
-                    <a:latin typeface="Consolas"/>
-                  </a:rPr>
-                  <a:t> pd.read_csv(</a:t>
-                </a:r>
-                <a:r>
-                  <a:rPr>
-                    <a:solidFill>
-                      <a:srgbClr val="20794D"/>
-                    </a:solidFill>
-                    <a:latin typeface="Consolas"/>
-                  </a:rPr>
-                  <a:t>"data/wage1.csv"</a:t>
-                </a:r>
-                <a:r>
-                  <a:rPr>
-                    <a:solidFill>
-                      <a:srgbClr val="003B4F"/>
-                    </a:solidFill>
-                    <a:latin typeface="Consolas"/>
-                  </a:rPr>
-                  <a:t>)</a:t>
-                </a:r>
-                <a:br/>
-                <a:br/>
-                <a:r>
-                  <a:rPr>
-                    <a:solidFill>
-                      <a:srgbClr val="5E5E5E"/>
-                    </a:solidFill>
-                    <a:latin typeface="Consolas"/>
-                  </a:rPr>
-                  <a:t># Create an OLS model using </a:t>
-                </a:r>
-                <a:br/>
-                <a:r>
-                  <a:rPr>
-                    <a:solidFill>
-                      <a:srgbClr val="5E5E5E"/>
-                    </a:solidFill>
-                    <a:latin typeface="Consolas"/>
-                  </a:rPr>
-                  <a:t># the R syntax - assumes an intercept</a:t>
-                </a:r>
-                <a:br/>
-                <a:r>
-                  <a:rPr>
-                    <a:solidFill>
-                      <a:srgbClr val="003B4F"/>
-                    </a:solidFill>
-                    <a:latin typeface="Consolas"/>
-                  </a:rPr>
-                  <a:t>mod </a:t>
-                </a:r>
-                <a:r>
-                  <a:rPr>
-                    <a:solidFill>
-                      <a:srgbClr val="5E5E5E"/>
-                    </a:solidFill>
-                    <a:latin typeface="Consolas"/>
-                  </a:rPr>
-                  <a:t>=</a:t>
-                </a:r>
-                <a:r>
-                  <a:rPr>
-                    <a:solidFill>
-                      <a:srgbClr val="003B4F"/>
-                    </a:solidFill>
-                    <a:latin typeface="Consolas"/>
-                  </a:rPr>
-                  <a:t> smf.ols(formula</a:t>
-                </a:r>
-                <a:r>
-                  <a:rPr>
-                    <a:solidFill>
-                      <a:srgbClr val="5E5E5E"/>
-                    </a:solidFill>
-                    <a:latin typeface="Consolas"/>
-                  </a:rPr>
-                  <a:t>=</a:t>
-                </a:r>
-                <a:r>
-                  <a:rPr>
-                    <a:solidFill>
-                      <a:srgbClr val="20794D"/>
-                    </a:solidFill>
-                    <a:latin typeface="Consolas"/>
-                  </a:rPr>
-                  <a:t>"wage ~ educ"</a:t>
-                </a:r>
-                <a:r>
-                  <a:rPr>
-                    <a:solidFill>
-                      <a:srgbClr val="003B4F"/>
-                    </a:solidFill>
-                    <a:latin typeface="Consolas"/>
-                  </a:rPr>
-                  <a:t>,</a:t>
-                </a:r>
-                <a:br/>
-                <a:r>
-                  <a:rPr>
-                    <a:solidFill>
-                      <a:srgbClr val="003B4F"/>
-                    </a:solidFill>
-                    <a:latin typeface="Consolas"/>
-                  </a:rPr>
-                  <a:t>              data</a:t>
-                </a:r>
-                <a:r>
-                  <a:rPr>
-                    <a:solidFill>
-                      <a:srgbClr val="5E5E5E"/>
-                    </a:solidFill>
-                    <a:latin typeface="Consolas"/>
-                  </a:rPr>
-                  <a:t>=</a:t>
-                </a:r>
-                <a:r>
-                  <a:rPr>
-                    <a:solidFill>
-                      <a:srgbClr val="003B4F"/>
-                    </a:solidFill>
-                    <a:latin typeface="Consolas"/>
-                  </a:rPr>
-                  <a:t>df_wage)</a:t>
-                </a:r>
-                <a:br/>
-                <a:br/>
-                <a:r>
-                  <a:rPr>
-                    <a:solidFill>
-                      <a:srgbClr val="5E5E5E"/>
-                    </a:solidFill>
-                    <a:latin typeface="Consolas"/>
-                  </a:rPr>
-                  <a:t># Fit the model</a:t>
-                </a:r>
-                <a:br/>
-                <a:r>
-                  <a:rPr>
-                    <a:solidFill>
-                      <a:srgbClr val="003B4F"/>
-                    </a:solidFill>
-                    <a:latin typeface="Consolas"/>
-                  </a:rPr>
-                  <a:t>res </a:t>
-                </a:r>
-                <a:r>
-                  <a:rPr>
-                    <a:solidFill>
-                      <a:srgbClr val="5E5E5E"/>
-                    </a:solidFill>
-                    <a:latin typeface="Consolas"/>
-                  </a:rPr>
-                  <a:t>=</a:t>
-                </a:r>
-                <a:r>
-                  <a:rPr>
-                    <a:solidFill>
-                      <a:srgbClr val="003B4F"/>
-                    </a:solidFill>
-                    <a:latin typeface="Consolas"/>
-                  </a:rPr>
-                  <a:t> mod.fit()</a:t>
-                </a:r>
-                <a:br/>
-                <a:br/>
-                <a:r>
-                  <a:rPr>
-                    <a:solidFill>
-                      <a:srgbClr val="5E5E5E"/>
-                    </a:solidFill>
-                    <a:latin typeface="Consolas"/>
-                  </a:rPr>
-                  <a:t># Show the results</a:t>
-                </a:r>
-                <a:br/>
-                <a:r>
-                  <a:rPr>
-                    <a:solidFill>
-                      <a:srgbClr val="003B4F"/>
-                    </a:solidFill>
-                    <a:latin typeface="Consolas"/>
-                  </a:rPr>
-                  <a:t>display(Markdown(md(res.summary().</a:t>
-                </a:r>
-                <a:br/>
-                <a:r>
-                  <a:rPr>
-                    <a:solidFill>
-                      <a:srgbClr val="003B4F"/>
-                    </a:solidFill>
-                    <a:latin typeface="Consolas"/>
-                  </a:rPr>
-                  <a:t>        tables[</a:t>
-                </a:r>
-                <a:r>
-                  <a:rPr>
-                    <a:solidFill>
-                      <a:srgbClr val="AD0000"/>
-                    </a:solidFill>
-                    <a:latin typeface="Consolas"/>
-                  </a:rPr>
-                  <a:t>1</a:t>
-                </a:r>
-                <a:r>
-                  <a:rPr>
-                    <a:solidFill>
-                      <a:srgbClr val="003B4F"/>
-                    </a:solidFill>
-                    <a:latin typeface="Consolas"/>
-                  </a:rPr>
-                  <a:t>].as_html())))</a:t>
                 </a:r>
               </a:p>
               <a:p>
@@ -6104,8 +6120,8 @@
           </p:nvPr>
         </p:nvGraphicFramePr>
         <p:xfrm>
-          <a:off x="4648200" y="1193800"/>
-          <a:ext cx="4038600" cy="3390900"/>
+          <a:off x="4635500" y="1625600"/>
+          <a:ext cx="4038600" cy="2959100"/>
         </p:xfrm>
         <a:graphic>
           <a:graphicData uri="http://schemas.openxmlformats.org/drawingml/2006/table">

</xml_diff>

<commit_message>
Work done by Mon Jul  4 00:12:06 PDT 2022
</commit_message>
<xml_diff>
--- a/docs/presentation-orig.pptx
+++ b/docs/presentation-orig.pptx
@@ -5757,6 +5757,18 @@
           <a:bodyPr/>
           <a:lstStyle/>
           <a:p>
+            <a:pPr lvl="0" indent="0" marL="0">
+              <a:spcBef>
+                <a:spcPts val="3000"/>
+              </a:spcBef>
+              <a:buNone/>
+            </a:pPr>
+            <a:r>
+              <a:rPr b="1"/>
+              <a:t>Education impact on wage</a:t>
+            </a:r>
+          </a:p>
+          <a:p>
             <a:pPr lvl="0" indent="0">
               <a:buNone/>
             </a:pPr>
@@ -6032,7 +6044,7 @@
                 </a:pPr>
                 <a:r>
                   <a:rPr/>
-                  <a:t>This code runs the first regression in Wooldridge’s Econometrics:</a:t>
+                  <a:t>This code runs the first regression in Wooldridge’s Econometrics. This simple regression omits variables and is used (both here and in Wooldridge’s book) for its simplicity.</a:t>
                 </a:r>
               </a:p>
               <a:p>

</xml_diff>

<commit_message>
Work done by Mon Jul  4 00:17:59 PDT 2022
</commit_message>
<xml_diff>
--- a/docs/presentation-orig.pptx
+++ b/docs/presentation-orig.pptx
@@ -5758,14 +5758,11 @@
           <a:lstStyle/>
           <a:p>
             <a:pPr lvl="0" indent="0" marL="0">
-              <a:spcBef>
-                <a:spcPts val="3000"/>
-              </a:spcBef>
               <a:buNone/>
             </a:pPr>
             <a:r>
-              <a:rPr b="1"/>
-              <a:t>Education impact on wage</a:t>
+              <a:rPr/>
+              <a:t>This code runs the first regression in Wooldridge’s Econometrics. This simple regression omits variables and is used (both here and in Wooldridge’s book) for its simplicity.</a:t>
             </a:r>
           </a:p>
           <a:p>
@@ -6038,15 +6035,6 @@
             <p:txBody>
               <a:bodyPr/>
               <a:lstStyle/>
-              <a:p>
-                <a:pPr lvl="0" indent="0" marL="0">
-                  <a:buNone/>
-                </a:pPr>
-                <a:r>
-                  <a:rPr/>
-                  <a:t>This code runs the first regression in Wooldridge’s Econometrics. This simple regression omits variables and is used (both here and in Wooldridge’s book) for its simplicity.</a:t>
-                </a:r>
-              </a:p>
               <a:p>
                 <a:pPr lvl="0" indent="0" marL="0">
                   <a:buNone/>

</xml_diff>

<commit_message>
Work done by Mon Jul  4 00:24:10 PDT 2022
</commit_message>
<xml_diff>
--- a/docs/presentation-orig.pptx
+++ b/docs/presentation-orig.pptx
@@ -5719,7 +5719,13 @@
       </p:grpSpPr>
       <p:sp>
         <p:nvSpPr>
-          <p:cNvPr id="2" name="Title 1"/>
+          <p:cNvPr id="9" name="Title 1">
+            <a:extLst>
+              <a:ext uri="{FF2B5EF4-FFF2-40B4-BE49-F238E27FC236}">
+                <a16:creationId xmlns:a16="http://schemas.microsoft.com/office/drawing/2014/main" id="{039B6DB2-D068-C680-F293-31EEF2D13404}"/>
+              </a:ext>
+            </a:extLst>
+          </p:cNvPr>
           <p:cNvSpPr>
             <a:spLocks noGrp="1"/>
           </p:cNvSpPr>
@@ -5727,7 +5733,12 @@
             <p:ph type="title"/>
           </p:nvPr>
         </p:nvSpPr>
-        <p:spPr/>
+        <p:spPr>
+          <a:xfrm>
+            <a:off x="457200" y="205979"/>
+            <a:ext cx="8229600" cy="857250"/>
+          </a:xfrm>
+        </p:spPr>
         <p:txBody>
           <a:bodyPr/>
           <a:lstStyle/>
@@ -5738,283 +5749,6 @@
             <a:r>
               <a:rPr/>
               <a:t>Regression and results</a:t>
-            </a:r>
-          </a:p>
-        </p:txBody>
-      </p:sp>
-      <p:sp>
-        <p:nvSpPr>
-          <p:cNvPr id="3" name="Text Placeholder 2"/>
-          <p:cNvSpPr>
-            <a:spLocks noGrp="1"/>
-          </p:cNvSpPr>
-          <p:nvPr>
-            <p:ph idx="1" type="body"/>
-          </p:nvPr>
-        </p:nvSpPr>
-        <p:spPr/>
-        <p:txBody>
-          <a:bodyPr/>
-          <a:lstStyle/>
-          <a:p>
-            <a:pPr lvl="0" indent="0" marL="0">
-              <a:buNone/>
-            </a:pPr>
-            <a:r>
-              <a:rPr/>
-              <a:t>This code runs the first regression in Wooldridge’s Econometrics. This simple regression omits variables and is used (both here and in Wooldridge’s book) for its simplicity.</a:t>
-            </a:r>
-          </a:p>
-          <a:p>
-            <a:pPr lvl="0" indent="0">
-              <a:buNone/>
-            </a:pPr>
-            <a:r>
-              <a:rPr>
-                <a:solidFill>
-                  <a:srgbClr val="5E5E5E"/>
-                </a:solidFill>
-                <a:latin typeface="Consolas"/>
-              </a:rPr>
-              <a:t># Load the data</a:t>
-            </a:r>
-            <a:br/>
-            <a:r>
-              <a:rPr>
-                <a:solidFill>
-                  <a:srgbClr val="003B4F"/>
-                </a:solidFill>
-                <a:latin typeface="Consolas"/>
-              </a:rPr>
-              <a:t>df_wage </a:t>
-            </a:r>
-            <a:r>
-              <a:rPr>
-                <a:solidFill>
-                  <a:srgbClr val="5E5E5E"/>
-                </a:solidFill>
-                <a:latin typeface="Consolas"/>
-              </a:rPr>
-              <a:t>=</a:t>
-            </a:r>
-            <a:r>
-              <a:rPr>
-                <a:solidFill>
-                  <a:srgbClr val="003B4F"/>
-                </a:solidFill>
-                <a:latin typeface="Consolas"/>
-              </a:rPr>
-              <a:t> pd.read_csv(</a:t>
-            </a:r>
-            <a:r>
-              <a:rPr>
-                <a:solidFill>
-                  <a:srgbClr val="20794D"/>
-                </a:solidFill>
-                <a:latin typeface="Consolas"/>
-              </a:rPr>
-              <a:t>"data/wage1.csv"</a:t>
-            </a:r>
-            <a:r>
-              <a:rPr>
-                <a:solidFill>
-                  <a:srgbClr val="003B4F"/>
-                </a:solidFill>
-                <a:latin typeface="Consolas"/>
-              </a:rPr>
-              <a:t>)</a:t>
-            </a:r>
-            <a:br/>
-            <a:br/>
-            <a:r>
-              <a:rPr>
-                <a:solidFill>
-                  <a:srgbClr val="5E5E5E"/>
-                </a:solidFill>
-                <a:latin typeface="Consolas"/>
-              </a:rPr>
-              <a:t># Create an OLS model using </a:t>
-            </a:r>
-            <a:br/>
-            <a:r>
-              <a:rPr>
-                <a:solidFill>
-                  <a:srgbClr val="5E5E5E"/>
-                </a:solidFill>
-                <a:latin typeface="Consolas"/>
-              </a:rPr>
-              <a:t># the R syntax - assumes an intercept</a:t>
-            </a:r>
-            <a:br/>
-            <a:r>
-              <a:rPr>
-                <a:solidFill>
-                  <a:srgbClr val="003B4F"/>
-                </a:solidFill>
-                <a:latin typeface="Consolas"/>
-              </a:rPr>
-              <a:t>mod </a:t>
-            </a:r>
-            <a:r>
-              <a:rPr>
-                <a:solidFill>
-                  <a:srgbClr val="5E5E5E"/>
-                </a:solidFill>
-                <a:latin typeface="Consolas"/>
-              </a:rPr>
-              <a:t>=</a:t>
-            </a:r>
-            <a:r>
-              <a:rPr>
-                <a:solidFill>
-                  <a:srgbClr val="003B4F"/>
-                </a:solidFill>
-                <a:latin typeface="Consolas"/>
-              </a:rPr>
-              <a:t> smf.ols(formula</a:t>
-            </a:r>
-            <a:r>
-              <a:rPr>
-                <a:solidFill>
-                  <a:srgbClr val="5E5E5E"/>
-                </a:solidFill>
-                <a:latin typeface="Consolas"/>
-              </a:rPr>
-              <a:t>=</a:t>
-            </a:r>
-            <a:r>
-              <a:rPr>
-                <a:solidFill>
-                  <a:srgbClr val="20794D"/>
-                </a:solidFill>
-                <a:latin typeface="Consolas"/>
-              </a:rPr>
-              <a:t>"wage ~ educ"</a:t>
-            </a:r>
-            <a:r>
-              <a:rPr>
-                <a:solidFill>
-                  <a:srgbClr val="003B4F"/>
-                </a:solidFill>
-                <a:latin typeface="Consolas"/>
-              </a:rPr>
-              <a:t>,</a:t>
-            </a:r>
-            <a:br/>
-            <a:r>
-              <a:rPr>
-                <a:solidFill>
-                  <a:srgbClr val="003B4F"/>
-                </a:solidFill>
-                <a:latin typeface="Consolas"/>
-              </a:rPr>
-              <a:t>              data</a:t>
-            </a:r>
-            <a:r>
-              <a:rPr>
-                <a:solidFill>
-                  <a:srgbClr val="5E5E5E"/>
-                </a:solidFill>
-                <a:latin typeface="Consolas"/>
-              </a:rPr>
-              <a:t>=</a:t>
-            </a:r>
-            <a:r>
-              <a:rPr>
-                <a:solidFill>
-                  <a:srgbClr val="003B4F"/>
-                </a:solidFill>
-                <a:latin typeface="Consolas"/>
-              </a:rPr>
-              <a:t>df_wage)</a:t>
-            </a:r>
-            <a:br/>
-            <a:br/>
-            <a:r>
-              <a:rPr>
-                <a:solidFill>
-                  <a:srgbClr val="5E5E5E"/>
-                </a:solidFill>
-                <a:latin typeface="Consolas"/>
-              </a:rPr>
-              <a:t># Fit the model</a:t>
-            </a:r>
-            <a:br/>
-            <a:r>
-              <a:rPr>
-                <a:solidFill>
-                  <a:srgbClr val="003B4F"/>
-                </a:solidFill>
-                <a:latin typeface="Consolas"/>
-              </a:rPr>
-              <a:t>res </a:t>
-            </a:r>
-            <a:r>
-              <a:rPr>
-                <a:solidFill>
-                  <a:srgbClr val="5E5E5E"/>
-                </a:solidFill>
-                <a:latin typeface="Consolas"/>
-              </a:rPr>
-              <a:t>=</a:t>
-            </a:r>
-            <a:r>
-              <a:rPr>
-                <a:solidFill>
-                  <a:srgbClr val="003B4F"/>
-                </a:solidFill>
-                <a:latin typeface="Consolas"/>
-              </a:rPr>
-              <a:t> mod.fit()</a:t>
-            </a:r>
-            <a:br/>
-            <a:br/>
-            <a:r>
-              <a:rPr>
-                <a:solidFill>
-                  <a:srgbClr val="5E5E5E"/>
-                </a:solidFill>
-                <a:latin typeface="Consolas"/>
-              </a:rPr>
-              <a:t># Show the results</a:t>
-            </a:r>
-            <a:br/>
-            <a:r>
-              <a:rPr>
-                <a:solidFill>
-                  <a:srgbClr val="003B4F"/>
-                </a:solidFill>
-                <a:latin typeface="Consolas"/>
-              </a:rPr>
-              <a:t>display(Markdown(md(res.summary().</a:t>
-            </a:r>
-            <a:br/>
-            <a:r>
-              <a:rPr>
-                <a:solidFill>
-                  <a:srgbClr val="003B4F"/>
-                </a:solidFill>
-                <a:latin typeface="Consolas"/>
-              </a:rPr>
-              <a:t>        tables[</a:t>
-            </a:r>
-            <a:r>
-              <a:rPr>
-                <a:solidFill>
-                  <a:srgbClr val="AD0000"/>
-                </a:solidFill>
-                <a:latin typeface="Consolas"/>
-              </a:rPr>
-              <a:t>1</a:t>
-            </a:r>
-            <a:r>
-              <a:rPr>
-                <a:solidFill>
-                  <a:srgbClr val="003B4F"/>
-                </a:solidFill>
-                <a:latin typeface="Consolas"/>
-              </a:rPr>
-              <a:t>].as_html())))</a:t>
             </a:r>
           </a:p>
         </p:txBody>
@@ -6023,18 +5757,279 @@
         <mc:Choice xmlns:a14="http://schemas.microsoft.com/office/drawing/2010/main" Requires="a14">
           <p:sp>
             <p:nvSpPr>
-              <p:cNvPr id="5" name="Text Placeholder 4"/>
+              <p:cNvPr id="4" name="Text Placeholder 3"/>
               <p:cNvSpPr>
                 <a:spLocks noGrp="1"/>
               </p:cNvSpPr>
               <p:nvPr>
-                <p:ph idx="3" sz="quarter" type="body"/>
+                <p:ph idx="2" sz="half" type="body"/>
               </p:nvPr>
             </p:nvSpPr>
             <p:spPr/>
             <p:txBody>
               <a:bodyPr/>
               <a:lstStyle/>
+              <a:p>
+                <a:pPr lvl="0" indent="0" marL="0">
+                  <a:buNone/>
+                </a:pPr>
+                <a:r>
+                  <a:rPr/>
+                  <a:t>This code runs the first simple regression in Wooldridge’s Econometrics.</a:t>
+                </a:r>
+              </a:p>
+              <a:p>
+                <a:pPr lvl="0" indent="0">
+                  <a:buNone/>
+                </a:pPr>
+                <a:r>
+                  <a:rPr>
+                    <a:solidFill>
+                      <a:srgbClr val="5E5E5E"/>
+                    </a:solidFill>
+                    <a:latin typeface="Consolas"/>
+                  </a:rPr>
+                  <a:t># Load the data</a:t>
+                </a:r>
+                <a:br/>
+                <a:r>
+                  <a:rPr>
+                    <a:solidFill>
+                      <a:srgbClr val="003B4F"/>
+                    </a:solidFill>
+                    <a:latin typeface="Consolas"/>
+                  </a:rPr>
+                  <a:t>df_wage </a:t>
+                </a:r>
+                <a:r>
+                  <a:rPr>
+                    <a:solidFill>
+                      <a:srgbClr val="5E5E5E"/>
+                    </a:solidFill>
+                    <a:latin typeface="Consolas"/>
+                  </a:rPr>
+                  <a:t>=</a:t>
+                </a:r>
+                <a:r>
+                  <a:rPr>
+                    <a:solidFill>
+                      <a:srgbClr val="003B4F"/>
+                    </a:solidFill>
+                    <a:latin typeface="Consolas"/>
+                  </a:rPr>
+                  <a:t> pd.read_csv(</a:t>
+                </a:r>
+                <a:r>
+                  <a:rPr>
+                    <a:solidFill>
+                      <a:srgbClr val="20794D"/>
+                    </a:solidFill>
+                    <a:latin typeface="Consolas"/>
+                  </a:rPr>
+                  <a:t>"data/wage1.csv"</a:t>
+                </a:r>
+                <a:r>
+                  <a:rPr>
+                    <a:solidFill>
+                      <a:srgbClr val="003B4F"/>
+                    </a:solidFill>
+                    <a:latin typeface="Consolas"/>
+                  </a:rPr>
+                  <a:t>)</a:t>
+                </a:r>
+                <a:br/>
+                <a:br/>
+                <a:r>
+                  <a:rPr>
+                    <a:solidFill>
+                      <a:srgbClr val="5E5E5E"/>
+                    </a:solidFill>
+                    <a:latin typeface="Consolas"/>
+                  </a:rPr>
+                  <a:t># Create an OLS model using </a:t>
+                </a:r>
+                <a:br/>
+                <a:r>
+                  <a:rPr>
+                    <a:solidFill>
+                      <a:srgbClr val="5E5E5E"/>
+                    </a:solidFill>
+                    <a:latin typeface="Consolas"/>
+                  </a:rPr>
+                  <a:t># the R syntax - assumes an intercept</a:t>
+                </a:r>
+                <a:br/>
+                <a:r>
+                  <a:rPr>
+                    <a:solidFill>
+                      <a:srgbClr val="003B4F"/>
+                    </a:solidFill>
+                    <a:latin typeface="Consolas"/>
+                  </a:rPr>
+                  <a:t>mod </a:t>
+                </a:r>
+                <a:r>
+                  <a:rPr>
+                    <a:solidFill>
+                      <a:srgbClr val="5E5E5E"/>
+                    </a:solidFill>
+                    <a:latin typeface="Consolas"/>
+                  </a:rPr>
+                  <a:t>=</a:t>
+                </a:r>
+                <a:r>
+                  <a:rPr>
+                    <a:solidFill>
+                      <a:srgbClr val="003B4F"/>
+                    </a:solidFill>
+                    <a:latin typeface="Consolas"/>
+                  </a:rPr>
+                  <a:t> smf.ols(formula</a:t>
+                </a:r>
+                <a:r>
+                  <a:rPr>
+                    <a:solidFill>
+                      <a:srgbClr val="5E5E5E"/>
+                    </a:solidFill>
+                    <a:latin typeface="Consolas"/>
+                  </a:rPr>
+                  <a:t>=</a:t>
+                </a:r>
+                <a:r>
+                  <a:rPr>
+                    <a:solidFill>
+                      <a:srgbClr val="20794D"/>
+                    </a:solidFill>
+                    <a:latin typeface="Consolas"/>
+                  </a:rPr>
+                  <a:t>"wage ~ educ"</a:t>
+                </a:r>
+                <a:r>
+                  <a:rPr>
+                    <a:solidFill>
+                      <a:srgbClr val="003B4F"/>
+                    </a:solidFill>
+                    <a:latin typeface="Consolas"/>
+                  </a:rPr>
+                  <a:t>,</a:t>
+                </a:r>
+                <a:br/>
+                <a:r>
+                  <a:rPr>
+                    <a:solidFill>
+                      <a:srgbClr val="003B4F"/>
+                    </a:solidFill>
+                    <a:latin typeface="Consolas"/>
+                  </a:rPr>
+                  <a:t>              data</a:t>
+                </a:r>
+                <a:r>
+                  <a:rPr>
+                    <a:solidFill>
+                      <a:srgbClr val="5E5E5E"/>
+                    </a:solidFill>
+                    <a:latin typeface="Consolas"/>
+                  </a:rPr>
+                  <a:t>=</a:t>
+                </a:r>
+                <a:r>
+                  <a:rPr>
+                    <a:solidFill>
+                      <a:srgbClr val="003B4F"/>
+                    </a:solidFill>
+                    <a:latin typeface="Consolas"/>
+                  </a:rPr>
+                  <a:t>df_wage)</a:t>
+                </a:r>
+                <a:br/>
+                <a:br/>
+                <a:r>
+                  <a:rPr>
+                    <a:solidFill>
+                      <a:srgbClr val="5E5E5E"/>
+                    </a:solidFill>
+                    <a:latin typeface="Consolas"/>
+                  </a:rPr>
+                  <a:t># Fit the model</a:t>
+                </a:r>
+                <a:br/>
+                <a:r>
+                  <a:rPr>
+                    <a:solidFill>
+                      <a:srgbClr val="003B4F"/>
+                    </a:solidFill>
+                    <a:latin typeface="Consolas"/>
+                  </a:rPr>
+                  <a:t>res </a:t>
+                </a:r>
+                <a:r>
+                  <a:rPr>
+                    <a:solidFill>
+                      <a:srgbClr val="5E5E5E"/>
+                    </a:solidFill>
+                    <a:latin typeface="Consolas"/>
+                  </a:rPr>
+                  <a:t>=</a:t>
+                </a:r>
+                <a:r>
+                  <a:rPr>
+                    <a:solidFill>
+                      <a:srgbClr val="003B4F"/>
+                    </a:solidFill>
+                    <a:latin typeface="Consolas"/>
+                  </a:rPr>
+                  <a:t> mod.fit()</a:t>
+                </a:r>
+                <a:br/>
+                <a:br/>
+                <a:r>
+                  <a:rPr>
+                    <a:solidFill>
+                      <a:srgbClr val="5E5E5E"/>
+                    </a:solidFill>
+                    <a:latin typeface="Consolas"/>
+                  </a:rPr>
+                  <a:t># Show the results</a:t>
+                </a:r>
+                <a:br/>
+                <a:r>
+                  <a:rPr>
+                    <a:solidFill>
+                      <a:srgbClr val="003B4F"/>
+                    </a:solidFill>
+                    <a:latin typeface="Consolas"/>
+                  </a:rPr>
+                  <a:t>display(Markdown(md(res.summary().</a:t>
+                </a:r>
+                <a:br/>
+                <a:r>
+                  <a:rPr>
+                    <a:solidFill>
+                      <a:srgbClr val="003B4F"/>
+                    </a:solidFill>
+                    <a:latin typeface="Consolas"/>
+                  </a:rPr>
+                  <a:t>        tables[</a:t>
+                </a:r>
+                <a:r>
+                  <a:rPr>
+                    <a:solidFill>
+                      <a:srgbClr val="AD0000"/>
+                    </a:solidFill>
+                    <a:latin typeface="Consolas"/>
+                  </a:rPr>
+                  <a:t>1</a:t>
+                </a:r>
+                <a:r>
+                  <a:rPr>
+                    <a:solidFill>
+                      <a:srgbClr val="003B4F"/>
+                    </a:solidFill>
+                    <a:latin typeface="Consolas"/>
+                  </a:rPr>
+                  <a:t>].as_html())))</a:t>
+                </a:r>
+              </a:p>
               <a:p>
                 <a:pPr lvl="0" indent="0" marL="0">
                   <a:buNone/>
@@ -6120,8 +6115,8 @@
           </p:nvPr>
         </p:nvGraphicFramePr>
         <p:xfrm>
-          <a:off x="4635500" y="1625600"/>
-          <a:ext cx="4038600" cy="2959100"/>
+          <a:off x="457200" y="1689100"/>
+          <a:ext cx="8229600" cy="2984500"/>
         </p:xfrm>
         <a:graphic>
           <a:graphicData uri="http://schemas.openxmlformats.org/drawingml/2006/table">
@@ -6130,10 +6125,10 @@
                 <a:tableStyleId>{5C22544A-7EE6-4342-B048-85BDC9FD1C3A}</a:tableStyleId>
               </a:tblPr>
               <a:tblGrid>
-                <a:gridCol w="1003300"/>
-                <a:gridCol w="1003300"/>
-                <a:gridCol w="1003300"/>
-                <a:gridCol w="1003300"/>
+                <a:gridCol w="2057400"/>
+                <a:gridCol w="2057400"/>
+                <a:gridCol w="2057400"/>
+                <a:gridCol w="2057400"/>
               </a:tblGrid>
               <a:tr h="0">
                 <a:tc>

</xml_diff>

<commit_message>
Work done by Mon Jul  4 00:27:18 PDT 2022
</commit_message>
<xml_diff>
--- a/docs/presentation-orig.pptx
+++ b/docs/presentation-orig.pptx
@@ -5546,7 +5546,7 @@
         <p:spPr bwMode="auto">
           <a:xfrm>
             <a:off x="4927600" y="1193800"/>
-            <a:ext cx="3492500" cy="3390900"/>
+            <a:ext cx="3467100" cy="3390900"/>
           </a:xfrm>
           <a:prstGeom prst="rect">
             <a:avLst/>
@@ -5777,6 +5777,76 @@
                   <a:rPr/>
                   <a:t>This code runs the first simple regression in Wooldridge’s Econometrics.</a:t>
                 </a:r>
+              </a:p>
+              <a:p>
+                <a:pPr lvl="0" indent="0" marL="0">
+                  <a:buNone/>
+                </a:pPr>
+                <a14:m>
+                  <m:oMathPara xmlns:m="http://schemas.openxmlformats.org/officeDocument/2006/math">
+                    <m:oMathParaPr>
+                      <m:jc m:val="center"/>
+                    </m:oMathParaPr>
+                    <m:oMath>
+                      <m:r>
+                        <m:rPr>
+                          <m:nor/>
+                          <m:sty m:val="p"/>
+                        </m:rPr>
+                        <m:t>wage</m:t>
+                      </m:r>
+                      <m:r>
+                        <m:rPr>
+                          <m:sty m:val="p"/>
+                        </m:rPr>
+                        <m:t>=</m:t>
+                      </m:r>
+                      <m:r>
+                        <m:t>α</m:t>
+                      </m:r>
+                      <m:r>
+                        <m:rPr>
+                          <m:sty m:val="p"/>
+                        </m:rPr>
+                        <m:t>+</m:t>
+                      </m:r>
+                      <m:sSub>
+                        <m:e>
+                          <m:r>
+                            <m:t>β</m:t>
+                          </m:r>
+                        </m:e>
+                        <m:sub>
+                          <m:r>
+                            <m:t>1</m:t>
+                          </m:r>
+                        </m:sub>
+                      </m:sSub>
+                      <m:r>
+                        <m:rPr>
+                          <m:sty m:val="p"/>
+                        </m:rPr>
+                        <m:t>×</m:t>
+                      </m:r>
+                      <m:r>
+                        <m:rPr>
+                          <m:nor/>
+                          <m:sty m:val="p"/>
+                        </m:rPr>
+                        <m:t>educ</m:t>
+                      </m:r>
+                      <m:r>
+                        <m:rPr>
+                          <m:sty m:val="p"/>
+                        </m:rPr>
+                        <m:t>+</m:t>
+                      </m:r>
+                      <m:r>
+                        <m:t>ϵ</m:t>
+                      </m:r>
+                    </m:oMath>
+                  </m:oMathPara>
+                </a14:m>
               </a:p>
               <a:p>
                 <a:pPr lvl="0" indent="0">
@@ -5911,17 +5981,7 @@
                     </a:solidFill>
                     <a:latin typeface="Consolas"/>
                   </a:rPr>
-                  <a:t>,</a:t>
-                </a:r>
-                <a:br/>
-                <a:r>
-                  <a:rPr>
-                    <a:solidFill>
-                      <a:srgbClr val="003B4F"/>
-                    </a:solidFill>
-                    <a:latin typeface="Consolas"/>
-                  </a:rPr>
-                  <a:t>              data</a:t>
+                  <a:t>, data</a:t>
                 </a:r>
                 <a:r>
                   <a:rPr>
@@ -5999,17 +6059,7 @@
                     </a:solidFill>
                     <a:latin typeface="Consolas"/>
                   </a:rPr>
-                  <a:t>display(Markdown(md(res.summary().</a:t>
-                </a:r>
-                <a:br/>
-                <a:r>
-                  <a:rPr>
-                    <a:solidFill>
-                      <a:srgbClr val="003B4F"/>
-                    </a:solidFill>
-                    <a:latin typeface="Consolas"/>
-                  </a:rPr>
-                  <a:t>        tables[</a:t>
+                  <a:t>display(Markdown(md(res.summary().tables[</a:t>
                 </a:r>
                 <a:r>
                   <a:rPr>
@@ -6029,76 +6079,6 @@
                   </a:rPr>
                   <a:t>].as_html())))</a:t>
                 </a:r>
-              </a:p>
-              <a:p>
-                <a:pPr lvl="0" indent="0" marL="0">
-                  <a:buNone/>
-                </a:pPr>
-                <a14:m>
-                  <m:oMathPara xmlns:m="http://schemas.openxmlformats.org/officeDocument/2006/math">
-                    <m:oMathParaPr>
-                      <m:jc m:val="center"/>
-                    </m:oMathParaPr>
-                    <m:oMath>
-                      <m:r>
-                        <m:rPr>
-                          <m:nor/>
-                          <m:sty m:val="p"/>
-                        </m:rPr>
-                        <m:t>wage</m:t>
-                      </m:r>
-                      <m:r>
-                        <m:rPr>
-                          <m:sty m:val="p"/>
-                        </m:rPr>
-                        <m:t>=</m:t>
-                      </m:r>
-                      <m:r>
-                        <m:t>α</m:t>
-                      </m:r>
-                      <m:r>
-                        <m:rPr>
-                          <m:sty m:val="p"/>
-                        </m:rPr>
-                        <m:t>+</m:t>
-                      </m:r>
-                      <m:sSub>
-                        <m:e>
-                          <m:r>
-                            <m:t>β</m:t>
-                          </m:r>
-                        </m:e>
-                        <m:sub>
-                          <m:r>
-                            <m:t>1</m:t>
-                          </m:r>
-                        </m:sub>
-                      </m:sSub>
-                      <m:r>
-                        <m:rPr>
-                          <m:sty m:val="p"/>
-                        </m:rPr>
-                        <m:t>×</m:t>
-                      </m:r>
-                      <m:r>
-                        <m:rPr>
-                          <m:nor/>
-                          <m:sty m:val="p"/>
-                        </m:rPr>
-                        <m:t>educ</m:t>
-                      </m:r>
-                      <m:r>
-                        <m:rPr>
-                          <m:sty m:val="p"/>
-                        </m:rPr>
-                        <m:t>+</m:t>
-                      </m:r>
-                      <m:r>
-                        <m:t>ϵ</m:t>
-                      </m:r>
-                    </m:oMath>
-                  </m:oMathPara>
-                </a14:m>
               </a:p>
             </p:txBody>
           </p:sp>
@@ -8500,8 +8480,8 @@
         </p:blipFill>
         <p:spPr bwMode="auto">
           <a:xfrm>
-            <a:off x="457200" y="1524000"/>
-            <a:ext cx="4038600" cy="2730500"/>
+            <a:off x="457200" y="1841500"/>
+            <a:ext cx="4038600" cy="2095500"/>
           </a:xfrm>
           <a:prstGeom prst="rect">
             <a:avLst/>
@@ -8530,8 +8510,8 @@
         </p:blipFill>
         <p:spPr bwMode="auto">
           <a:xfrm>
-            <a:off x="4648200" y="1549400"/>
-            <a:ext cx="4038600" cy="2679700"/>
+            <a:off x="4648200" y="1866900"/>
+            <a:ext cx="4038600" cy="2044700"/>
           </a:xfrm>
           <a:prstGeom prst="rect">
             <a:avLst/>
@@ -8607,8 +8587,8 @@
         </p:blipFill>
         <p:spPr bwMode="auto">
           <a:xfrm>
-            <a:off x="457200" y="1524000"/>
-            <a:ext cx="4038600" cy="2730500"/>
+            <a:off x="457200" y="1841500"/>
+            <a:ext cx="4038600" cy="2095500"/>
           </a:xfrm>
           <a:prstGeom prst="rect">
             <a:avLst/>
@@ -8637,8 +8617,8 @@
         </p:blipFill>
         <p:spPr bwMode="auto">
           <a:xfrm>
-            <a:off x="4648200" y="1549400"/>
-            <a:ext cx="4038600" cy="2679700"/>
+            <a:off x="4648200" y="1866900"/>
+            <a:ext cx="4038600" cy="2044700"/>
           </a:xfrm>
           <a:prstGeom prst="rect">
             <a:avLst/>
@@ -8714,8 +8694,8 @@
         </p:blipFill>
         <p:spPr bwMode="auto">
           <a:xfrm>
-            <a:off x="457200" y="1524000"/>
-            <a:ext cx="4038600" cy="2730500"/>
+            <a:off x="457200" y="1841500"/>
+            <a:ext cx="4038600" cy="2095500"/>
           </a:xfrm>
           <a:prstGeom prst="rect">
             <a:avLst/>
@@ -8744,8 +8724,8 @@
         </p:blipFill>
         <p:spPr bwMode="auto">
           <a:xfrm>
-            <a:off x="4648200" y="1549400"/>
-            <a:ext cx="4038600" cy="2679700"/>
+            <a:off x="4648200" y="1866900"/>
+            <a:ext cx="4038600" cy="2044700"/>
           </a:xfrm>
           <a:prstGeom prst="rect">
             <a:avLst/>
@@ -8821,8 +8801,8 @@
         </p:blipFill>
         <p:spPr bwMode="auto">
           <a:xfrm>
-            <a:off x="457200" y="1524000"/>
-            <a:ext cx="4038600" cy="2730500"/>
+            <a:off x="457200" y="1841500"/>
+            <a:ext cx="4038600" cy="2095500"/>
           </a:xfrm>
           <a:prstGeom prst="rect">
             <a:avLst/>
@@ -8851,8 +8831,8 @@
         </p:blipFill>
         <p:spPr bwMode="auto">
           <a:xfrm>
-            <a:off x="4648200" y="1562100"/>
-            <a:ext cx="4038600" cy="2654300"/>
+            <a:off x="4648200" y="1866900"/>
+            <a:ext cx="4038600" cy="2044700"/>
           </a:xfrm>
           <a:prstGeom prst="rect">
             <a:avLst/>
@@ -8928,8 +8908,8 @@
         </p:blipFill>
         <p:spPr bwMode="auto">
           <a:xfrm>
-            <a:off x="457200" y="1524000"/>
-            <a:ext cx="4038600" cy="2730500"/>
+            <a:off x="457200" y="1841500"/>
+            <a:ext cx="4038600" cy="2095500"/>
           </a:xfrm>
           <a:prstGeom prst="rect">
             <a:avLst/>
@@ -8958,8 +8938,8 @@
         </p:blipFill>
         <p:spPr bwMode="auto">
           <a:xfrm>
-            <a:off x="4648200" y="1549400"/>
-            <a:ext cx="4038600" cy="2679700"/>
+            <a:off x="4648200" y="1866900"/>
+            <a:ext cx="4038600" cy="2044700"/>
           </a:xfrm>
           <a:prstGeom prst="rect">
             <a:avLst/>
@@ -9035,8 +9015,8 @@
         </p:blipFill>
         <p:spPr bwMode="auto">
           <a:xfrm>
-            <a:off x="457200" y="1524000"/>
-            <a:ext cx="4038600" cy="2730500"/>
+            <a:off x="457200" y="1841500"/>
+            <a:ext cx="4038600" cy="2095500"/>
           </a:xfrm>
           <a:prstGeom prst="rect">
             <a:avLst/>
@@ -9065,8 +9045,8 @@
         </p:blipFill>
         <p:spPr bwMode="auto">
           <a:xfrm>
-            <a:off x="4648200" y="1587500"/>
-            <a:ext cx="4038600" cy="2590800"/>
+            <a:off x="4648200" y="1879600"/>
+            <a:ext cx="4038600" cy="2032000"/>
           </a:xfrm>
           <a:prstGeom prst="rect">
             <a:avLst/>

</xml_diff>

<commit_message>
Work done by Mon Jul  4 00:41:23 PDT 2022
</commit_message>
<xml_diff>
--- a/docs/presentation-orig.pptx
+++ b/docs/presentation-orig.pptx
@@ -5828,16 +5828,6 @@
                 <a:r>
                   <a:rPr>
                     <a:solidFill>
-                      <a:srgbClr val="5E5E5E"/>
-                    </a:solidFill>
-                    <a:latin typeface="Consolas"/>
-                  </a:rPr>
-                  <a:t># Load the data</a:t>
-                </a:r>
-                <a:br/>
-                <a:r>
-                  <a:rPr>
-                    <a:solidFill>
                       <a:srgbClr val="003B4F"/>
                     </a:solidFill>
                     <a:latin typeface="Consolas"/>
@@ -5879,27 +5869,6 @@
                     <a:latin typeface="Consolas"/>
                   </a:rPr>
                   <a:t>)</a:t>
-                </a:r>
-                <a:br/>
-                <a:br/>
-                <a:r>
-                  <a:rPr>
-                    <a:solidFill>
-                      <a:srgbClr val="5E5E5E"/>
-                    </a:solidFill>
-                    <a:latin typeface="Consolas"/>
-                  </a:rPr>
-                  <a:t># Create an OLS model using </a:t>
-                </a:r>
-                <a:br/>
-                <a:r>
-                  <a:rPr>
-                    <a:solidFill>
-                      <a:srgbClr val="5E5E5E"/>
-                    </a:solidFill>
-                    <a:latin typeface="Consolas"/>
-                  </a:rPr>
-                  <a:t># the R syntax - assumes an intercept</a:t>
                 </a:r>
                 <a:br/>
                 <a:r>
@@ -5975,17 +5944,6 @@
                   <a:t>df_wage)</a:t>
                 </a:r>
                 <a:br/>
-                <a:br/>
-                <a:r>
-                  <a:rPr>
-                    <a:solidFill>
-                      <a:srgbClr val="5E5E5E"/>
-                    </a:solidFill>
-                    <a:latin typeface="Consolas"/>
-                  </a:rPr>
-                  <a:t># Fit the model</a:t>
-                </a:r>
-                <a:br/>
                 <a:r>
                   <a:rPr>
                     <a:solidFill>
@@ -6014,17 +5972,6 @@
                   <a:t> mod.fit()</a:t>
                 </a:r>
                 <a:br/>
-                <a:br/>
-                <a:r>
-                  <a:rPr>
-                    <a:solidFill>
-                      <a:srgbClr val="5E5E5E"/>
-                    </a:solidFill>
-                    <a:latin typeface="Consolas"/>
-                  </a:rPr>
-                  <a:t># Show the results</a:t>
-                </a:r>
-                <a:br/>
                 <a:r>
                   <a:rPr>
                     <a:solidFill>
@@ -6032,7 +5979,7 @@
                     </a:solidFill>
                     <a:latin typeface="Consolas"/>
                   </a:rPr>
-                  <a:t>display(Markdown(md(res.summary().tables[</a:t>
+                  <a:t>display(Markdown(res.summary().tables[</a:t>
                 </a:r>
                 <a:r>
                   <a:rPr>
@@ -6050,7 +5997,7 @@
                     </a:solidFill>
                     <a:latin typeface="Consolas"/>
                   </a:rPr>
-                  <a:t>].as_html())))</a:t>
+                  <a:t>]))</a:t>
                 </a:r>
               </a:p>
             </p:txBody>

</xml_diff>

<commit_message>
Work done by Mon Jul  4 00:45:11 PDT 2022
</commit_message>
<xml_diff>
--- a/docs/presentation-orig.pptx
+++ b/docs/presentation-orig.pptx
@@ -5746,12 +5746,12 @@
         <mc:Choice xmlns:a14="http://schemas.microsoft.com/office/drawing/2010/main" Requires="a14">
           <p:sp>
             <p:nvSpPr>
-              <p:cNvPr id="3" name="Content Placeholder 2"/>
+              <p:cNvPr id="3" name="Text Placeholder 2"/>
               <p:cNvSpPr>
                 <a:spLocks noGrp="1"/>
               </p:cNvSpPr>
               <p:nvPr>
-                <p:ph idx="1" sz="half"/>
+                <p:ph idx="1" type="body"/>
               </p:nvPr>
             </p:nvSpPr>
             <p:spPr/>
@@ -5821,185 +5821,6 @@
                   </m:oMath>
                 </a14:m>
               </a:p>
-              <a:p>
-                <a:pPr lvl="0" indent="0">
-                  <a:buNone/>
-                </a:pPr>
-                <a:r>
-                  <a:rPr>
-                    <a:solidFill>
-                      <a:srgbClr val="003B4F"/>
-                    </a:solidFill>
-                    <a:latin typeface="Consolas"/>
-                  </a:rPr>
-                  <a:t>df_wage </a:t>
-                </a:r>
-                <a:r>
-                  <a:rPr>
-                    <a:solidFill>
-                      <a:srgbClr val="5E5E5E"/>
-                    </a:solidFill>
-                    <a:latin typeface="Consolas"/>
-                  </a:rPr>
-                  <a:t>=</a:t>
-                </a:r>
-                <a:r>
-                  <a:rPr>
-                    <a:solidFill>
-                      <a:srgbClr val="003B4F"/>
-                    </a:solidFill>
-                    <a:latin typeface="Consolas"/>
-                  </a:rPr>
-                  <a:t> pd.read_csv(</a:t>
-                </a:r>
-                <a:r>
-                  <a:rPr>
-                    <a:solidFill>
-                      <a:srgbClr val="20794D"/>
-                    </a:solidFill>
-                    <a:latin typeface="Consolas"/>
-                  </a:rPr>
-                  <a:t>"data/wage1.csv"</a:t>
-                </a:r>
-                <a:r>
-                  <a:rPr>
-                    <a:solidFill>
-                      <a:srgbClr val="003B4F"/>
-                    </a:solidFill>
-                    <a:latin typeface="Consolas"/>
-                  </a:rPr>
-                  <a:t>)</a:t>
-                </a:r>
-                <a:br/>
-                <a:r>
-                  <a:rPr>
-                    <a:solidFill>
-                      <a:srgbClr val="003B4F"/>
-                    </a:solidFill>
-                    <a:latin typeface="Consolas"/>
-                  </a:rPr>
-                  <a:t>mod </a:t>
-                </a:r>
-                <a:r>
-                  <a:rPr>
-                    <a:solidFill>
-                      <a:srgbClr val="5E5E5E"/>
-                    </a:solidFill>
-                    <a:latin typeface="Consolas"/>
-                  </a:rPr>
-                  <a:t>=</a:t>
-                </a:r>
-                <a:r>
-                  <a:rPr>
-                    <a:solidFill>
-                      <a:srgbClr val="003B4F"/>
-                    </a:solidFill>
-                    <a:latin typeface="Consolas"/>
-                  </a:rPr>
-                  <a:t> smf.ols(formula</a:t>
-                </a:r>
-                <a:r>
-                  <a:rPr>
-                    <a:solidFill>
-                      <a:srgbClr val="5E5E5E"/>
-                    </a:solidFill>
-                    <a:latin typeface="Consolas"/>
-                  </a:rPr>
-                  <a:t>=</a:t>
-                </a:r>
-                <a:r>
-                  <a:rPr>
-                    <a:solidFill>
-                      <a:srgbClr val="20794D"/>
-                    </a:solidFill>
-                    <a:latin typeface="Consolas"/>
-                  </a:rPr>
-                  <a:t>"wage ~ educ"</a:t>
-                </a:r>
-                <a:r>
-                  <a:rPr>
-                    <a:solidFill>
-                      <a:srgbClr val="003B4F"/>
-                    </a:solidFill>
-                    <a:latin typeface="Consolas"/>
-                  </a:rPr>
-                  <a:t>, data</a:t>
-                </a:r>
-                <a:r>
-                  <a:rPr>
-                    <a:solidFill>
-                      <a:srgbClr val="5E5E5E"/>
-                    </a:solidFill>
-                    <a:latin typeface="Consolas"/>
-                  </a:rPr>
-                  <a:t>=</a:t>
-                </a:r>
-                <a:r>
-                  <a:rPr>
-                    <a:solidFill>
-                      <a:srgbClr val="003B4F"/>
-                    </a:solidFill>
-                    <a:latin typeface="Consolas"/>
-                  </a:rPr>
-                  <a:t>df_wage)</a:t>
-                </a:r>
-                <a:br/>
-                <a:r>
-                  <a:rPr>
-                    <a:solidFill>
-                      <a:srgbClr val="003B4F"/>
-                    </a:solidFill>
-                    <a:latin typeface="Consolas"/>
-                  </a:rPr>
-                  <a:t>res </a:t>
-                </a:r>
-                <a:r>
-                  <a:rPr>
-                    <a:solidFill>
-                      <a:srgbClr val="5E5E5E"/>
-                    </a:solidFill>
-                    <a:latin typeface="Consolas"/>
-                  </a:rPr>
-                  <a:t>=</a:t>
-                </a:r>
-                <a:r>
-                  <a:rPr>
-                    <a:solidFill>
-                      <a:srgbClr val="003B4F"/>
-                    </a:solidFill>
-                    <a:latin typeface="Consolas"/>
-                  </a:rPr>
-                  <a:t> mod.fit()</a:t>
-                </a:r>
-                <a:br/>
-                <a:r>
-                  <a:rPr>
-                    <a:solidFill>
-                      <a:srgbClr val="003B4F"/>
-                    </a:solidFill>
-                    <a:latin typeface="Consolas"/>
-                  </a:rPr>
-                  <a:t>display(Markdown(res.summary().tables[</a:t>
-                </a:r>
-                <a:r>
-                  <a:rPr>
-                    <a:solidFill>
-                      <a:srgbClr val="AD0000"/>
-                    </a:solidFill>
-                    <a:latin typeface="Consolas"/>
-                  </a:rPr>
-                  <a:t>1</a:t>
-                </a:r>
-                <a:r>
-                  <a:rPr>
-                    <a:solidFill>
-                      <a:srgbClr val="003B4F"/>
-                    </a:solidFill>
-                    <a:latin typeface="Consolas"/>
-                  </a:rPr>
-                  <a:t>]))</a:t>
-                </a:r>
-              </a:p>
             </p:txBody>
           </p:sp>
         </mc:Choice>
@@ -6015,8 +5836,8 @@
           </p:nvPr>
         </p:nvGraphicFramePr>
         <p:xfrm>
-          <a:off x="4648200" y="1193800"/>
-          <a:ext cx="4038600" cy="3390900"/>
+          <a:off x="457200" y="1625600"/>
+          <a:ext cx="4038600" cy="2959100"/>
         </p:xfrm>
         <a:graphic>
           <a:graphicData uri="http://schemas.openxmlformats.org/drawingml/2006/table">
@@ -6224,6 +6045,201 @@
           </a:graphicData>
         </a:graphic>
       </p:graphicFrame>
+      <p:sp>
+        <p:nvSpPr>
+          <p:cNvPr id="5" name="Text Placeholder 4"/>
+          <p:cNvSpPr>
+            <a:spLocks noGrp="1"/>
+          </p:cNvSpPr>
+          <p:nvPr>
+            <p:ph idx="3" sz="quarter" type="body"/>
+          </p:nvPr>
+        </p:nvSpPr>
+        <p:spPr/>
+        <p:txBody>
+          <a:bodyPr/>
+          <a:lstStyle/>
+          <a:p>
+            <a:pPr lvl="0" indent="0">
+              <a:buNone/>
+            </a:pPr>
+            <a:r>
+              <a:rPr>
+                <a:solidFill>
+                  <a:srgbClr val="003B4F"/>
+                </a:solidFill>
+                <a:latin typeface="Consolas"/>
+              </a:rPr>
+              <a:t>df_wage </a:t>
+            </a:r>
+            <a:r>
+              <a:rPr>
+                <a:solidFill>
+                  <a:srgbClr val="5E5E5E"/>
+                </a:solidFill>
+                <a:latin typeface="Consolas"/>
+              </a:rPr>
+              <a:t>=</a:t>
+            </a:r>
+            <a:r>
+              <a:rPr>
+                <a:solidFill>
+                  <a:srgbClr val="003B4F"/>
+                </a:solidFill>
+                <a:latin typeface="Consolas"/>
+              </a:rPr>
+              <a:t> pd.read_csv(</a:t>
+            </a:r>
+            <a:r>
+              <a:rPr>
+                <a:solidFill>
+                  <a:srgbClr val="20794D"/>
+                </a:solidFill>
+                <a:latin typeface="Consolas"/>
+              </a:rPr>
+              <a:t>"data/wage1.csv"</a:t>
+            </a:r>
+            <a:r>
+              <a:rPr>
+                <a:solidFill>
+                  <a:srgbClr val="003B4F"/>
+                </a:solidFill>
+                <a:latin typeface="Consolas"/>
+              </a:rPr>
+              <a:t>)</a:t>
+            </a:r>
+            <a:br/>
+            <a:r>
+              <a:rPr>
+                <a:solidFill>
+                  <a:srgbClr val="003B4F"/>
+                </a:solidFill>
+                <a:latin typeface="Consolas"/>
+              </a:rPr>
+              <a:t>mod </a:t>
+            </a:r>
+            <a:r>
+              <a:rPr>
+                <a:solidFill>
+                  <a:srgbClr val="5E5E5E"/>
+                </a:solidFill>
+                <a:latin typeface="Consolas"/>
+              </a:rPr>
+              <a:t>=</a:t>
+            </a:r>
+            <a:r>
+              <a:rPr>
+                <a:solidFill>
+                  <a:srgbClr val="003B4F"/>
+                </a:solidFill>
+                <a:latin typeface="Consolas"/>
+              </a:rPr>
+              <a:t> smf.ols(formula</a:t>
+            </a:r>
+            <a:r>
+              <a:rPr>
+                <a:solidFill>
+                  <a:srgbClr val="5E5E5E"/>
+                </a:solidFill>
+                <a:latin typeface="Consolas"/>
+              </a:rPr>
+              <a:t>=</a:t>
+            </a:r>
+            <a:r>
+              <a:rPr>
+                <a:solidFill>
+                  <a:srgbClr val="20794D"/>
+                </a:solidFill>
+                <a:latin typeface="Consolas"/>
+              </a:rPr>
+              <a:t>"wage ~ educ"</a:t>
+            </a:r>
+            <a:r>
+              <a:rPr>
+                <a:solidFill>
+                  <a:srgbClr val="003B4F"/>
+                </a:solidFill>
+                <a:latin typeface="Consolas"/>
+              </a:rPr>
+              <a:t>, data</a:t>
+            </a:r>
+            <a:r>
+              <a:rPr>
+                <a:solidFill>
+                  <a:srgbClr val="5E5E5E"/>
+                </a:solidFill>
+                <a:latin typeface="Consolas"/>
+              </a:rPr>
+              <a:t>=</a:t>
+            </a:r>
+            <a:r>
+              <a:rPr>
+                <a:solidFill>
+                  <a:srgbClr val="003B4F"/>
+                </a:solidFill>
+                <a:latin typeface="Consolas"/>
+              </a:rPr>
+              <a:t>df_wage)</a:t>
+            </a:r>
+            <a:br/>
+            <a:r>
+              <a:rPr>
+                <a:solidFill>
+                  <a:srgbClr val="003B4F"/>
+                </a:solidFill>
+                <a:latin typeface="Consolas"/>
+              </a:rPr>
+              <a:t>res </a:t>
+            </a:r>
+            <a:r>
+              <a:rPr>
+                <a:solidFill>
+                  <a:srgbClr val="5E5E5E"/>
+                </a:solidFill>
+                <a:latin typeface="Consolas"/>
+              </a:rPr>
+              <a:t>=</a:t>
+            </a:r>
+            <a:r>
+              <a:rPr>
+                <a:solidFill>
+                  <a:srgbClr val="003B4F"/>
+                </a:solidFill>
+                <a:latin typeface="Consolas"/>
+              </a:rPr>
+              <a:t> mod.fit()</a:t>
+            </a:r>
+            <a:br/>
+            <a:r>
+              <a:rPr>
+                <a:solidFill>
+                  <a:srgbClr val="003B4F"/>
+                </a:solidFill>
+                <a:latin typeface="Consolas"/>
+              </a:rPr>
+              <a:t>display(Markdown(res.summary().tables[</a:t>
+            </a:r>
+            <a:r>
+              <a:rPr>
+                <a:solidFill>
+                  <a:srgbClr val="AD0000"/>
+                </a:solidFill>
+                <a:latin typeface="Consolas"/>
+              </a:rPr>
+              <a:t>1</a:t>
+            </a:r>
+            <a:r>
+              <a:rPr>
+                <a:solidFill>
+                  <a:srgbClr val="003B4F"/>
+                </a:solidFill>
+                <a:latin typeface="Consolas"/>
+              </a:rPr>
+              <a:t>]))</a:t>
+            </a:r>
+          </a:p>
+        </p:txBody>
+      </p:sp>
     </p:spTree>
   </p:cSld>
 </p:sld>

</xml_diff>

<commit_message>
Work done by Mon Jul  4 00:48:14 PDT 2022
</commit_message>
<xml_diff>
--- a/docs/presentation-orig.pptx
+++ b/docs/presentation-orig.pptx
@@ -5764,8 +5764,13 @@
                 </a:pPr>
                 <a:r>
                   <a:rPr/>
-                  <a:t>This code runs the first simple regression in Wooldridge’s Econometrics </a:t>
+                  <a:t>This code runs the first simple regression in Wooldridge’s Econometrics</a:t>
                 </a:r>
+              </a:p>
+              <a:p>
+                <a:pPr lvl="0" indent="0" marL="0">
+                  <a:buNone/>
+                </a:pPr>
                 <a14:m>
                   <m:oMath xmlns:m="http://schemas.openxmlformats.org/officeDocument/2006/math">
                     <m:r>
@@ -6066,6 +6071,16 @@
             <a:r>
               <a:rPr>
                 <a:solidFill>
+                  <a:srgbClr val="5E5E5E"/>
+                </a:solidFill>
+                <a:latin typeface="Consolas"/>
+              </a:rPr>
+              <a:t># Load the data</a:t>
+            </a:r>
+            <a:br/>
+            <a:r>
+              <a:rPr>
+                <a:solidFill>
                   <a:srgbClr val="003B4F"/>
                 </a:solidFill>
                 <a:latin typeface="Consolas"/>
@@ -6109,6 +6124,27 @@
               <a:t>)</a:t>
             </a:r>
             <a:br/>
+            <a:br/>
+            <a:r>
+              <a:rPr>
+                <a:solidFill>
+                  <a:srgbClr val="5E5E5E"/>
+                </a:solidFill>
+                <a:latin typeface="Consolas"/>
+              </a:rPr>
+              <a:t># Create an OLS model using </a:t>
+            </a:r>
+            <a:br/>
+            <a:r>
+              <a:rPr>
+                <a:solidFill>
+                  <a:srgbClr val="5E5E5E"/>
+                </a:solidFill>
+                <a:latin typeface="Consolas"/>
+              </a:rPr>
+              <a:t># the R syntax - assumes an intercept</a:t>
+            </a:r>
+            <a:br/>
             <a:r>
               <a:rPr>
                 <a:solidFill>
@@ -6161,7 +6197,17 @@
                 </a:solidFill>
                 <a:latin typeface="Consolas"/>
               </a:rPr>
-              <a:t>, data</a:t>
+              <a:t>,</a:t>
+            </a:r>
+            <a:br/>
+            <a:r>
+              <a:rPr>
+                <a:solidFill>
+                  <a:srgbClr val="003B4F"/>
+                </a:solidFill>
+                <a:latin typeface="Consolas"/>
+              </a:rPr>
+              <a:t>              data</a:t>
             </a:r>
             <a:r>
               <a:rPr>
@@ -6182,6 +6228,17 @@
               <a:t>df_wage)</a:t>
             </a:r>
             <a:br/>
+            <a:br/>
+            <a:r>
+              <a:rPr>
+                <a:solidFill>
+                  <a:srgbClr val="5E5E5E"/>
+                </a:solidFill>
+                <a:latin typeface="Consolas"/>
+              </a:rPr>
+              <a:t># Fit the model</a:t>
+            </a:r>
+            <a:br/>
             <a:r>
               <a:rPr>
                 <a:solidFill>
@@ -6210,14 +6267,53 @@
               <a:t> mod.fit()</a:t>
             </a:r>
             <a:br/>
-            <a:r>
-              <a:rPr>
-                <a:solidFill>
-                  <a:srgbClr val="003B4F"/>
-                </a:solidFill>
-                <a:latin typeface="Consolas"/>
-              </a:rPr>
-              <a:t>display(Markdown(res.summary().tables[</a:t>
+            <a:br/>
+            <a:r>
+              <a:rPr>
+                <a:solidFill>
+                  <a:srgbClr val="5E5E5E"/>
+                </a:solidFill>
+                <a:latin typeface="Consolas"/>
+              </a:rPr>
+              <a:t># Show the results</a:t>
+            </a:r>
+            <a:br/>
+            <a:r>
+              <a:rPr>
+                <a:solidFill>
+                  <a:srgbClr val="003B4F"/>
+                </a:solidFill>
+                <a:latin typeface="Consolas"/>
+              </a:rPr>
+              <a:t>reg_table </a:t>
+            </a:r>
+            <a:r>
+              <a:rPr>
+                <a:solidFill>
+                  <a:srgbClr val="5E5E5E"/>
+                </a:solidFill>
+                <a:latin typeface="Consolas"/>
+              </a:rPr>
+              <a:t>=</a:t>
+            </a:r>
+            <a:r>
+              <a:rPr>
+                <a:solidFill>
+                  <a:srgbClr val="003B4F"/>
+                </a:solidFill>
+                <a:latin typeface="Consolas"/>
+              </a:rPr>
+              <a:t> pd.read_html(res.summary().</a:t>
+            </a:r>
+            <a:br/>
+            <a:r>
+              <a:rPr>
+                <a:solidFill>
+                  <a:srgbClr val="003B4F"/>
+                </a:solidFill>
+                <a:latin typeface="Consolas"/>
+              </a:rPr>
+              <a:t>  tables[</a:t>
             </a:r>
             <a:r>
               <a:rPr>
@@ -6235,7 +6331,289 @@
                 </a:solidFill>
                 <a:latin typeface="Consolas"/>
               </a:rPr>
-              <a:t>]))</a:t>
+              <a:t>].as_html(), header</a:t>
+            </a:r>
+            <a:r>
+              <a:rPr>
+                <a:solidFill>
+                  <a:srgbClr val="5E5E5E"/>
+                </a:solidFill>
+                <a:latin typeface="Consolas"/>
+              </a:rPr>
+              <a:t>=</a:t>
+            </a:r>
+            <a:r>
+              <a:rPr>
+                <a:solidFill>
+                  <a:srgbClr val="AD0000"/>
+                </a:solidFill>
+                <a:latin typeface="Consolas"/>
+              </a:rPr>
+              <a:t>0</a:t>
+            </a:r>
+            <a:r>
+              <a:rPr>
+                <a:solidFill>
+                  <a:srgbClr val="003B4F"/>
+                </a:solidFill>
+                <a:latin typeface="Consolas"/>
+              </a:rPr>
+              <a:t>)[</a:t>
+            </a:r>
+            <a:r>
+              <a:rPr>
+                <a:solidFill>
+                  <a:srgbClr val="AD0000"/>
+                </a:solidFill>
+                <a:latin typeface="Consolas"/>
+              </a:rPr>
+              <a:t>0</a:t>
+            </a:r>
+            <a:r>
+              <a:rPr>
+                <a:solidFill>
+                  <a:srgbClr val="003B4F"/>
+                </a:solidFill>
+                <a:latin typeface="Consolas"/>
+              </a:rPr>
+              <a:t>]</a:t>
+            </a:r>
+            <a:br/>
+            <a:r>
+              <a:rPr>
+                <a:solidFill>
+                  <a:srgbClr val="003B4F"/>
+                </a:solidFill>
+                <a:latin typeface="Consolas"/>
+              </a:rPr>
+              <a:t>reg_table </a:t>
+            </a:r>
+            <a:r>
+              <a:rPr>
+                <a:solidFill>
+                  <a:srgbClr val="5E5E5E"/>
+                </a:solidFill>
+                <a:latin typeface="Consolas"/>
+              </a:rPr>
+              <a:t>=</a:t>
+            </a:r>
+            <a:r>
+              <a:rPr>
+                <a:solidFill>
+                  <a:srgbClr val="003B4F"/>
+                </a:solidFill>
+                <a:latin typeface="Consolas"/>
+              </a:rPr>
+              <a:t> reg_table[[</a:t>
+            </a:r>
+            <a:r>
+              <a:rPr>
+                <a:solidFill>
+                  <a:srgbClr val="20794D"/>
+                </a:solidFill>
+                <a:latin typeface="Consolas"/>
+              </a:rPr>
+              <a:t>"coef"</a:t>
+            </a:r>
+            <a:r>
+              <a:rPr>
+                <a:solidFill>
+                  <a:srgbClr val="003B4F"/>
+                </a:solidFill>
+                <a:latin typeface="Consolas"/>
+              </a:rPr>
+              <a:t>, </a:t>
+            </a:r>
+            <a:r>
+              <a:rPr>
+                <a:solidFill>
+                  <a:srgbClr val="20794D"/>
+                </a:solidFill>
+                <a:latin typeface="Consolas"/>
+              </a:rPr>
+              <a:t>'std err'</a:t>
+            </a:r>
+            <a:r>
+              <a:rPr>
+                <a:solidFill>
+                  <a:srgbClr val="003B4F"/>
+                </a:solidFill>
+                <a:latin typeface="Consolas"/>
+              </a:rPr>
+              <a:t>, </a:t>
+            </a:r>
+            <a:r>
+              <a:rPr>
+                <a:solidFill>
+                  <a:srgbClr val="20794D"/>
+                </a:solidFill>
+                <a:latin typeface="Consolas"/>
+              </a:rPr>
+              <a:t>'t'</a:t>
+            </a:r>
+            <a:r>
+              <a:rPr>
+                <a:solidFill>
+                  <a:srgbClr val="003B4F"/>
+                </a:solidFill>
+                <a:latin typeface="Consolas"/>
+              </a:rPr>
+              <a:t>, </a:t>
+            </a:r>
+            <a:r>
+              <a:rPr>
+                <a:solidFill>
+                  <a:srgbClr val="20794D"/>
+                </a:solidFill>
+                <a:latin typeface="Consolas"/>
+              </a:rPr>
+              <a:t>'P&gt;|t|'</a:t>
+            </a:r>
+            <a:r>
+              <a:rPr>
+                <a:solidFill>
+                  <a:srgbClr val="003B4F"/>
+                </a:solidFill>
+                <a:latin typeface="Consolas"/>
+              </a:rPr>
+              <a:t>]]</a:t>
+            </a:r>
+            <a:br/>
+            <a:r>
+              <a:rPr>
+                <a:solidFill>
+                  <a:srgbClr val="003B4F"/>
+                </a:solidFill>
+                <a:latin typeface="Consolas"/>
+              </a:rPr>
+              <a:t>reg_table.columns </a:t>
+            </a:r>
+            <a:r>
+              <a:rPr>
+                <a:solidFill>
+                  <a:srgbClr val="5E5E5E"/>
+                </a:solidFill>
+                <a:latin typeface="Consolas"/>
+              </a:rPr>
+              <a:t>=</a:t>
+            </a:r>
+            <a:r>
+              <a:rPr>
+                <a:solidFill>
+                  <a:srgbClr val="003B4F"/>
+                </a:solidFill>
+                <a:latin typeface="Consolas"/>
+              </a:rPr>
+              <a:t> [</a:t>
+            </a:r>
+            <a:r>
+              <a:rPr>
+                <a:solidFill>
+                  <a:srgbClr val="20794D"/>
+                </a:solidFill>
+                <a:latin typeface="Consolas"/>
+              </a:rPr>
+              <a:t>"coef"</a:t>
+            </a:r>
+            <a:r>
+              <a:rPr>
+                <a:solidFill>
+                  <a:srgbClr val="003B4F"/>
+                </a:solidFill>
+                <a:latin typeface="Consolas"/>
+              </a:rPr>
+              <a:t>, </a:t>
+            </a:r>
+            <a:r>
+              <a:rPr>
+                <a:solidFill>
+                  <a:srgbClr val="20794D"/>
+                </a:solidFill>
+                <a:latin typeface="Consolas"/>
+              </a:rPr>
+              <a:t>"s.e."</a:t>
+            </a:r>
+            <a:r>
+              <a:rPr>
+                <a:solidFill>
+                  <a:srgbClr val="003B4F"/>
+                </a:solidFill>
+                <a:latin typeface="Consolas"/>
+              </a:rPr>
+              <a:t>, </a:t>
+            </a:r>
+            <a:r>
+              <a:rPr>
+                <a:solidFill>
+                  <a:srgbClr val="20794D"/>
+                </a:solidFill>
+                <a:latin typeface="Consolas"/>
+              </a:rPr>
+              <a:t>"t"</a:t>
+            </a:r>
+            <a:r>
+              <a:rPr>
+                <a:solidFill>
+                  <a:srgbClr val="003B4F"/>
+                </a:solidFill>
+                <a:latin typeface="Consolas"/>
+              </a:rPr>
+              <a:t>, </a:t>
+            </a:r>
+            <a:r>
+              <a:rPr>
+                <a:solidFill>
+                  <a:srgbClr val="20794D"/>
+                </a:solidFill>
+                <a:latin typeface="Consolas"/>
+              </a:rPr>
+              <a:t>"p-value"</a:t>
+            </a:r>
+            <a:r>
+              <a:rPr>
+                <a:solidFill>
+                  <a:srgbClr val="003B4F"/>
+                </a:solidFill>
+                <a:latin typeface="Consolas"/>
+              </a:rPr>
+              <a:t>]</a:t>
+            </a:r>
+            <a:br/>
+            <a:r>
+              <a:rPr>
+                <a:solidFill>
+                  <a:srgbClr val="003B4F"/>
+                </a:solidFill>
+                <a:latin typeface="Consolas"/>
+              </a:rPr>
+              <a:t>display(Markdown(reg_table.to_markdown(index</a:t>
+            </a:r>
+            <a:r>
+              <a:rPr>
+                <a:solidFill>
+                  <a:srgbClr val="5E5E5E"/>
+                </a:solidFill>
+                <a:latin typeface="Consolas"/>
+              </a:rPr>
+              <a:t>=</a:t>
+            </a:r>
+            <a:r>
+              <a:rPr>
+                <a:solidFill>
+                  <a:srgbClr val="111111"/>
+                </a:solidFill>
+                <a:latin typeface="Consolas"/>
+              </a:rPr>
+              <a:t>False</a:t>
+            </a:r>
+            <a:r>
+              <a:rPr>
+                <a:solidFill>
+                  <a:srgbClr val="003B4F"/>
+                </a:solidFill>
+                <a:latin typeface="Consolas"/>
+              </a:rPr>
+              <a:t>)))</a:t>
             </a:r>
           </a:p>
         </p:txBody>

</xml_diff>

<commit_message>
Work done by Mon Jul  4 00:53:57 PDT 2022
</commit_message>
<xml_diff>
--- a/docs/presentation-orig.pptx
+++ b/docs/presentation-orig.pptx
@@ -370,7 +370,7 @@
             <a:fld id="{241EB5C9-1307-BA42-ABA2-0BC069CD8E7F}" type="datetimeFigureOut">
               <a:rPr lang="en-US" smtClean="0"/>
               <a:pPr/>
-              <a:t>7/1/2022</a:t>
+              <a:t>7/4/2022</a:t>
             </a:fld>
             <a:endParaRPr lang="en-US"/>
           </a:p>
@@ -717,7 +717,7 @@
           <a:p>
             <a:fld id="{241EB5C9-1307-BA42-ABA2-0BC069CD8E7F}" type="datetimeFigureOut">
               <a:rPr lang="en-US" smtClean="0"/>
-              <a:t>7/1/2022</a:t>
+              <a:t>7/4/2022</a:t>
             </a:fld>
             <a:endParaRPr lang="en-US"/>
           </a:p>
@@ -893,7 +893,7 @@
           <a:p>
             <a:fld id="{241EB5C9-1307-BA42-ABA2-0BC069CD8E7F}" type="datetimeFigureOut">
               <a:rPr lang="en-US" smtClean="0"/>
-              <a:t>7/1/2022</a:t>
+              <a:t>7/4/2022</a:t>
             </a:fld>
             <a:endParaRPr lang="en-US"/>
           </a:p>
@@ -1079,7 +1079,7 @@
           <a:p>
             <a:fld id="{241EB5C9-1307-BA42-ABA2-0BC069CD8E7F}" type="datetimeFigureOut">
               <a:rPr lang="en-US" smtClean="0"/>
-              <a:t>7/1/2022</a:t>
+              <a:t>7/4/2022</a:t>
             </a:fld>
             <a:endParaRPr lang="en-US"/>
           </a:p>
@@ -1303,7 +1303,7 @@
             <a:fld id="{241EB5C9-1307-BA42-ABA2-0BC069CD8E7F}" type="datetimeFigureOut">
               <a:rPr lang="en-US" smtClean="0"/>
               <a:pPr/>
-              <a:t>7/1/2022</a:t>
+              <a:t>7/4/2022</a:t>
             </a:fld>
             <a:endParaRPr lang="en-US"/>
           </a:p>
@@ -1626,7 +1626,7 @@
           <a:p>
             <a:fld id="{241EB5C9-1307-BA42-ABA2-0BC069CD8E7F}" type="datetimeFigureOut">
               <a:rPr lang="en-US" smtClean="0"/>
-              <a:t>7/1/2022</a:t>
+              <a:t>7/4/2022</a:t>
             </a:fld>
             <a:endParaRPr lang="en-US"/>
           </a:p>
@@ -2072,7 +2072,7 @@
             <a:fld id="{241EB5C9-1307-BA42-ABA2-0BC069CD8E7F}" type="datetimeFigureOut">
               <a:rPr lang="en-US" smtClean="0"/>
               <a:pPr/>
-              <a:t>7/1/2022</a:t>
+              <a:t>7/4/2022</a:t>
             </a:fld>
             <a:endParaRPr lang="en-US"/>
           </a:p>
@@ -2214,8 +2214,8 @@
         </p:nvSpPr>
         <p:spPr>
           <a:xfrm>
-            <a:off x="457200" y="1151335"/>
-            <a:ext cx="4040188" cy="479822"/>
+            <a:off x="457200" y="1151334"/>
+            <a:ext cx="4040188" cy="2531666"/>
           </a:xfrm>
         </p:spPr>
         <p:txBody>
@@ -2264,7 +2264,7 @@
           <a:p>
             <a:pPr lvl="0"/>
             <a:r>
-              <a:rPr lang="en-US"/>
+              <a:rPr lang="en-US" dirty="0"/>
               <a:t>Click to edit Master text styles</a:t>
             </a:r>
           </a:p>
@@ -2282,8 +2282,8 @@
         </p:nvSpPr>
         <p:spPr>
           <a:xfrm>
-            <a:off x="457200" y="1631156"/>
-            <a:ext cx="4040188" cy="2963466"/>
+            <a:off x="457200" y="3749674"/>
+            <a:ext cx="4040188" cy="844947"/>
           </a:xfrm>
         </p:spPr>
         <p:txBody>
@@ -2382,7 +2382,7 @@
         <p:spPr>
           <a:xfrm>
             <a:off x="4645026" y="1151335"/>
-            <a:ext cx="4041775" cy="479822"/>
+            <a:ext cx="4041775" cy="3443286"/>
           </a:xfrm>
         </p:spPr>
         <p:txBody>
@@ -2431,7 +2431,7 @@
           <a:p>
             <a:pPr lvl="0"/>
             <a:r>
-              <a:rPr lang="en-US"/>
+              <a:rPr lang="en-US" dirty="0"/>
               <a:t>Click to edit Master text styles</a:t>
             </a:r>
           </a:p>
@@ -2449,8 +2449,8 @@
         </p:nvSpPr>
         <p:spPr>
           <a:xfrm>
-            <a:off x="4645026" y="1631156"/>
-            <a:ext cx="4041775" cy="2963466"/>
+            <a:off x="4645026" y="4548902"/>
+            <a:ext cx="4041775" cy="45719"/>
           </a:xfrm>
         </p:spPr>
         <p:txBody>
@@ -2561,7 +2561,7 @@
             <a:fld id="{241EB5C9-1307-BA42-ABA2-0BC069CD8E7F}" type="datetimeFigureOut">
               <a:rPr lang="en-US" smtClean="0"/>
               <a:pPr/>
-              <a:t>7/1/2022</a:t>
+              <a:t>7/4/2022</a:t>
             </a:fld>
             <a:endParaRPr lang="en-US"/>
           </a:p>
@@ -2701,7 +2701,7 @@
           <a:p>
             <a:fld id="{241EB5C9-1307-BA42-ABA2-0BC069CD8E7F}" type="datetimeFigureOut">
               <a:rPr lang="en-US" smtClean="0"/>
-              <a:t>7/1/2022</a:t>
+              <a:t>7/4/2022</a:t>
             </a:fld>
             <a:endParaRPr lang="en-US"/>
           </a:p>
@@ -2804,7 +2804,7 @@
           <a:p>
             <a:fld id="{241EB5C9-1307-BA42-ABA2-0BC069CD8E7F}" type="datetimeFigureOut">
               <a:rPr lang="en-US" smtClean="0"/>
-              <a:t>7/1/2022</a:t>
+              <a:t>7/4/2022</a:t>
             </a:fld>
             <a:endParaRPr lang="en-US"/>
           </a:p>
@@ -3087,7 +3087,7 @@
           <a:p>
             <a:fld id="{241EB5C9-1307-BA42-ABA2-0BC069CD8E7F}" type="datetimeFigureOut">
               <a:rPr lang="en-US" smtClean="0"/>
-              <a:t>7/1/2022</a:t>
+              <a:t>7/4/2022</a:t>
             </a:fld>
             <a:endParaRPr lang="en-US"/>
           </a:p>
@@ -3269,7 +3269,7 @@
             <a:fld id="{241EB5C9-1307-BA42-ABA2-0BC069CD8E7F}" type="datetimeFigureOut">
               <a:rPr lang="en-US" smtClean="0"/>
               <a:pPr/>
-              <a:t>7/1/2022</a:t>
+              <a:t>7/4/2022</a:t>
             </a:fld>
             <a:endParaRPr lang="en-US"/>
           </a:p>
@@ -3650,7 +3650,7 @@
           <a:p>
             <a:fld id="{241EB5C9-1307-BA42-ABA2-0BC069CD8E7F}" type="datetimeFigureOut">
               <a:rPr lang="en-US" smtClean="0"/>
-              <a:t>7/1/2022</a:t>
+              <a:t>7/4/2022</a:t>
             </a:fld>
             <a:endParaRPr lang="en-US"/>
           </a:p>
@@ -5841,8 +5841,8 @@
           </p:nvPr>
         </p:nvGraphicFramePr>
         <p:xfrm>
-          <a:off x="457200" y="1625600"/>
-          <a:ext cx="4038600" cy="2959100"/>
+          <a:off x="457200" y="3746500"/>
+          <a:ext cx="4038600" cy="838200"/>
         </p:xfrm>
         <a:graphic>
           <a:graphicData uri="http://schemas.openxmlformats.org/drawingml/2006/table">

</xml_diff>

<commit_message>
Work done by Mon Jul  4 00:58:21 PDT 2022
</commit_message>
<xml_diff>
--- a/docs/presentation-orig.pptx
+++ b/docs/presentation-orig.pptx
@@ -2214,8 +2214,8 @@
         </p:nvSpPr>
         <p:spPr>
           <a:xfrm>
-            <a:off x="457200" y="1151334"/>
-            <a:ext cx="4040188" cy="2531666"/>
+            <a:off x="457200" y="1151333"/>
+            <a:ext cx="4040188" cy="1468041"/>
           </a:xfrm>
         </p:spPr>
         <p:txBody>
@@ -2282,8 +2282,8 @@
         </p:nvSpPr>
         <p:spPr>
           <a:xfrm>
-            <a:off x="457200" y="3749674"/>
-            <a:ext cx="4040188" cy="844947"/>
+            <a:off x="457200" y="2959100"/>
+            <a:ext cx="4040188" cy="1635521"/>
           </a:xfrm>
         </p:spPr>
         <p:txBody>
@@ -5841,8 +5841,8 @@
           </p:nvPr>
         </p:nvGraphicFramePr>
         <p:xfrm>
-          <a:off x="457200" y="3746500"/>
-          <a:ext cx="4038600" cy="838200"/>
+          <a:off x="457200" y="2959100"/>
+          <a:ext cx="4038600" cy="1625600"/>
         </p:xfrm>
         <a:graphic>
           <a:graphicData uri="http://schemas.openxmlformats.org/drawingml/2006/table">
@@ -6386,97 +6386,7 @@
                 </a:solidFill>
                 <a:latin typeface="Consolas"/>
               </a:rPr>
-              <a:t>reg_table </a:t>
-            </a:r>
-            <a:r>
-              <a:rPr>
-                <a:solidFill>
-                  <a:srgbClr val="5E5E5E"/>
-                </a:solidFill>
-                <a:latin typeface="Consolas"/>
-              </a:rPr>
-              <a:t>=</a:t>
-            </a:r>
-            <a:r>
-              <a:rPr>
-                <a:solidFill>
-                  <a:srgbClr val="003B4F"/>
-                </a:solidFill>
-                <a:latin typeface="Consolas"/>
-              </a:rPr>
-              <a:t> reg_table[[</a:t>
-            </a:r>
-            <a:r>
-              <a:rPr>
-                <a:solidFill>
-                  <a:srgbClr val="20794D"/>
-                </a:solidFill>
-                <a:latin typeface="Consolas"/>
-              </a:rPr>
-              <a:t>"coef"</a:t>
-            </a:r>
-            <a:r>
-              <a:rPr>
-                <a:solidFill>
-                  <a:srgbClr val="003B4F"/>
-                </a:solidFill>
-                <a:latin typeface="Consolas"/>
-              </a:rPr>
-              <a:t>, </a:t>
-            </a:r>
-            <a:r>
-              <a:rPr>
-                <a:solidFill>
-                  <a:srgbClr val="20794D"/>
-                </a:solidFill>
-                <a:latin typeface="Consolas"/>
-              </a:rPr>
-              <a:t>'std err'</a:t>
-            </a:r>
-            <a:r>
-              <a:rPr>
-                <a:solidFill>
-                  <a:srgbClr val="003B4F"/>
-                </a:solidFill>
-                <a:latin typeface="Consolas"/>
-              </a:rPr>
-              <a:t>, </a:t>
-            </a:r>
-            <a:r>
-              <a:rPr>
-                <a:solidFill>
-                  <a:srgbClr val="20794D"/>
-                </a:solidFill>
-                <a:latin typeface="Consolas"/>
-              </a:rPr>
-              <a:t>'t'</a:t>
-            </a:r>
-            <a:r>
-              <a:rPr>
-                <a:solidFill>
-                  <a:srgbClr val="003B4F"/>
-                </a:solidFill>
-                <a:latin typeface="Consolas"/>
-              </a:rPr>
-              <a:t>, </a:t>
-            </a:r>
-            <a:r>
-              <a:rPr>
-                <a:solidFill>
-                  <a:srgbClr val="20794D"/>
-                </a:solidFill>
-                <a:latin typeface="Consolas"/>
-              </a:rPr>
-              <a:t>'P&gt;|t|'</a:t>
-            </a:r>
-            <a:r>
-              <a:rPr>
-                <a:solidFill>
-                  <a:srgbClr val="003B4F"/>
-                </a:solidFill>
-                <a:latin typeface="Consolas"/>
-              </a:rPr>
-              <a:t>]]</a:t>
+              <a:t>display(Markdown(reg_table.</a:t>
             </a:r>
             <a:br/>
             <a:r>
@@ -6486,107 +6396,7 @@
                 </a:solidFill>
                 <a:latin typeface="Consolas"/>
               </a:rPr>
-              <a:t>reg_table.columns </a:t>
-            </a:r>
-            <a:r>
-              <a:rPr>
-                <a:solidFill>
-                  <a:srgbClr val="5E5E5E"/>
-                </a:solidFill>
-                <a:latin typeface="Consolas"/>
-              </a:rPr>
-              <a:t>=</a:t>
-            </a:r>
-            <a:r>
-              <a:rPr>
-                <a:solidFill>
-                  <a:srgbClr val="003B4F"/>
-                </a:solidFill>
-                <a:latin typeface="Consolas"/>
-              </a:rPr>
-              <a:t> [</a:t>
-            </a:r>
-            <a:r>
-              <a:rPr>
-                <a:solidFill>
-                  <a:srgbClr val="20794D"/>
-                </a:solidFill>
-                <a:latin typeface="Consolas"/>
-              </a:rPr>
-              <a:t>"coef"</a:t>
-            </a:r>
-            <a:r>
-              <a:rPr>
-                <a:solidFill>
-                  <a:srgbClr val="003B4F"/>
-                </a:solidFill>
-                <a:latin typeface="Consolas"/>
-              </a:rPr>
-              <a:t>, </a:t>
-            </a:r>
-            <a:r>
-              <a:rPr>
-                <a:solidFill>
-                  <a:srgbClr val="20794D"/>
-                </a:solidFill>
-                <a:latin typeface="Consolas"/>
-              </a:rPr>
-              <a:t>"s.e."</a:t>
-            </a:r>
-            <a:r>
-              <a:rPr>
-                <a:solidFill>
-                  <a:srgbClr val="003B4F"/>
-                </a:solidFill>
-                <a:latin typeface="Consolas"/>
-              </a:rPr>
-              <a:t>, </a:t>
-            </a:r>
-            <a:r>
-              <a:rPr>
-                <a:solidFill>
-                  <a:srgbClr val="20794D"/>
-                </a:solidFill>
-                <a:latin typeface="Consolas"/>
-              </a:rPr>
-              <a:t>"t"</a:t>
-            </a:r>
-            <a:r>
-              <a:rPr>
-                <a:solidFill>
-                  <a:srgbClr val="003B4F"/>
-                </a:solidFill>
-                <a:latin typeface="Consolas"/>
-              </a:rPr>
-              <a:t>, </a:t>
-            </a:r>
-            <a:r>
-              <a:rPr>
-                <a:solidFill>
-                  <a:srgbClr val="20794D"/>
-                </a:solidFill>
-                <a:latin typeface="Consolas"/>
-              </a:rPr>
-              <a:t>"p-value"</a:t>
-            </a:r>
-            <a:r>
-              <a:rPr>
-                <a:solidFill>
-                  <a:srgbClr val="003B4F"/>
-                </a:solidFill>
-                <a:latin typeface="Consolas"/>
-              </a:rPr>
-              <a:t>]</a:t>
-            </a:r>
-            <a:br/>
-            <a:r>
-              <a:rPr>
-                <a:solidFill>
-                  <a:srgbClr val="003B4F"/>
-                </a:solidFill>
-                <a:latin typeface="Consolas"/>
-              </a:rPr>
-              <a:t>display(Markdown(reg_table.to_markdown(index</a:t>
+              <a:t>  to_markdown(index</a:t>
             </a:r>
             <a:r>
               <a:rPr>

</xml_diff>

<commit_message>
Work done by Mon Jul  4 01:12:51 PDT 2022
</commit_message>
<xml_diff>
--- a/docs/presentation-orig.pptx
+++ b/docs/presentation-orig.pptx
@@ -11442,8 +11442,8 @@
         </p:blipFill>
         <p:spPr bwMode="auto">
           <a:xfrm>
-            <a:off x="5727700" y="1193800"/>
-            <a:ext cx="1892300" cy="3390900"/>
+            <a:off x="4648200" y="2387600"/>
+            <a:ext cx="4038600" cy="1016000"/>
           </a:xfrm>
           <a:prstGeom prst="rect">
             <a:avLst/>

</xml_diff>

<commit_message>
Work done by Mon Jul  4 01:15:39 PDT 2022
</commit_message>
<xml_diff>
--- a/docs/presentation-orig.pptx
+++ b/docs/presentation-orig.pptx
@@ -11442,8 +11442,8 @@
         </p:blipFill>
         <p:spPr bwMode="auto">
           <a:xfrm>
-            <a:off x="4648200" y="2387600"/>
-            <a:ext cx="4038600" cy="1016000"/>
+            <a:off x="5727700" y="1193800"/>
+            <a:ext cx="1892300" cy="3390900"/>
           </a:xfrm>
           <a:prstGeom prst="rect">
             <a:avLst/>

</xml_diff>

<commit_message>
Work done by Mon Jul  4 01:20:43 PDT 2022
</commit_message>
<xml_diff>
--- a/docs/presentation-orig.pptx
+++ b/docs/presentation-orig.pptx
@@ -5667,7 +5667,7 @@
       </p:sp>
       <p:pic>
         <p:nvPicPr>
-          <p:cNvPr descr="presentation_files/figure-pptx/mermaid-figure-3.png" id="0" name="Picture 1"/>
+          <p:cNvPr descr="presentation_files/figure-pptx/mermaid-figure-2.png" id="0" name="Picture 1"/>
           <p:cNvPicPr>
             <a:picLocks noGrp="1" noChangeAspect="1"/>
           </p:cNvPicPr>
@@ -11213,7 +11213,7 @@
             </a:pPr>
             <a:r>
               <a:rPr b="1"/>
-              <a:t>Presentations</a:t>
+              <a:t>Presentations: maybe</a:t>
             </a:r>
           </a:p>
           <a:p>
@@ -11358,7 +11358,7 @@
             <a:spLocks noGrp="1"/>
           </p:cNvSpPr>
           <p:nvPr>
-            <p:ph idx="1" sz="half"/>
+            <p:ph idx="1"/>
           </p:nvPr>
         </p:nvSpPr>
         <p:spPr/>
@@ -11414,48 +11414,18 @@
             </a:r>
             <a:r>
               <a:rPr/>
-              <a:t>.</a:t>
+              <a:t>. This allows rendering multiple files that link to each other.</a:t>
             </a:r>
           </a:p>
           <a:p>
             <a:pPr lvl="0"/>
             <a:r>
               <a:rPr/>
-              <a:t>Projects can have pre- and post-render steps</a:t>
-            </a:r>
-          </a:p>
-        </p:txBody>
-      </p:sp>
-      <p:pic>
-        <p:nvPicPr>
-          <p:cNvPr descr="presentation_files/figure-pptx/mermaid-figure-2.png" id="0" name="Picture 1"/>
-          <p:cNvPicPr>
-            <a:picLocks noGrp="1" noChangeAspect="1"/>
-          </p:cNvPicPr>
-          <p:nvPr/>
-        </p:nvPicPr>
-        <p:blipFill>
-          <a:blip r:embed="rId6"/>
-          <a:stretch>
-            <a:fillRect/>
-          </a:stretch>
-        </p:blipFill>
-        <p:spPr bwMode="auto">
-          <a:xfrm>
-            <a:off x="5727700" y="1193800"/>
-            <a:ext cx="1892300" cy="3390900"/>
-          </a:xfrm>
-          <a:prstGeom prst="rect">
-            <a:avLst/>
-          </a:prstGeom>
-          <a:noFill/>
-          <a:ln w="9525">
-            <a:noFill/>
-            <a:headEnd/>
-            <a:tailEnd/>
-          </a:ln>
-        </p:spPr>
-      </p:pic>
+              <a:t>Projects can have pre- and post-render steps in Python, R, Lua and shell script</a:t>
+            </a:r>
+          </a:p>
+        </p:txBody>
+      </p:sp>
     </p:spTree>
   </p:cSld>
 </p:sld>
@@ -12323,7 +12293,7 @@
       </p:sp>
       <p:pic>
         <p:nvPicPr>
-          <p:cNvPr descr="presentation_files/figure-pptx/mermaid-figure-4.png" id="0" name="Picture 1"/>
+          <p:cNvPr descr="presentation_files/figure-pptx/mermaid-figure-3.png" id="0" name="Picture 1"/>
           <p:cNvPicPr>
             <a:picLocks noGrp="1" noChangeAspect="1"/>
           </p:cNvPicPr>

</xml_diff>

<commit_message>
Work done by Mon Jul  4 10:06:48 PDT 2022
</commit_message>
<xml_diff>
--- a/docs/presentation-orig.pptx
+++ b/docs/presentation-orig.pptx
@@ -44,12 +44,6 @@
     <p:sldId id="292" r:id="rId38"/>
     <p:sldId id="293" r:id="rId39"/>
     <p:sldId id="294" r:id="rId40"/>
-    <p:sldId id="295" r:id="rId41"/>
-    <p:sldId id="296" r:id="rId42"/>
-    <p:sldId id="297" r:id="rId43"/>
-    <p:sldId id="298" r:id="rId44"/>
-    <p:sldId id="299" r:id="rId45"/>
-    <p:sldId id="300" r:id="rId46"/>
   </p:sldIdLst>
   <p:sldSz cx="9144000" cy="5143500" type="screen16x9"/>
   <p:notesSz cx="6858000" cy="9144000"/>
@@ -8539,6 +8533,15 @@
               <a:t>))</a:t>
             </a:r>
           </a:p>
+          <a:p>
+            <a:pPr lvl="0" indent="0" marL="0">
+              <a:buNone/>
+            </a:pPr>
+            <a:r>
+              <a:rPr/>
+              <a:t>{{&lt; include _dynamic-content.qmd &gt;&gt;}}</a:t>
+            </a:r>
+          </a:p>
         </p:txBody>
       </p:sp>
     </p:spTree>
@@ -8573,7 +8576,12 @@
             <p:ph type="title"/>
           </p:nvPr>
         </p:nvSpPr>
-        <p:spPr/>
+        <p:spPr>
+          <a:xfrm>
+            <a:off x="722313" y="3305176"/>
+            <a:ext cx="7772400" cy="1021556"/>
+          </a:xfrm>
+        </p:spPr>
         <p:txBody>
           <a:bodyPr/>
           <a:lstStyle/>
@@ -8583,71 +8591,11 @@
             </a:pPr>
             <a:r>
               <a:rPr/>
-              <a:t>Age and Population Pyramids for Belgium</a:t>
-            </a:r>
-          </a:p>
-        </p:txBody>
-      </p:sp>
-      <p:pic>
-        <p:nvPicPr>
-          <p:cNvPr descr="presentation_files/figure-pptx/cell-8-output-4.png" id="0" name="Picture 1"/>
-          <p:cNvPicPr>
-            <a:picLocks noGrp="1" noChangeAspect="1"/>
-          </p:cNvPicPr>
-          <p:nvPr/>
-        </p:nvPicPr>
-        <p:blipFill>
-          <a:blip r:embed="rId2"/>
-          <a:stretch>
-            <a:fillRect/>
-          </a:stretch>
-        </p:blipFill>
-        <p:spPr bwMode="auto">
-          <a:xfrm>
-            <a:off x="457200" y="1524000"/>
-            <a:ext cx="4038600" cy="2730500"/>
-          </a:xfrm>
-          <a:prstGeom prst="rect">
-            <a:avLst/>
-          </a:prstGeom>
-          <a:noFill/>
-          <a:ln w="9525">
-            <a:noFill/>
-            <a:headEnd/>
-            <a:tailEnd/>
-          </a:ln>
-        </p:spPr>
-      </p:pic>
-      <p:pic>
-        <p:nvPicPr>
-          <p:cNvPr descr="presentation_files/figure-pptx/cell-8-output-7.png" id="0" name="Picture 1"/>
-          <p:cNvPicPr>
-            <a:picLocks noGrp="1" noChangeAspect="1"/>
-          </p:cNvPicPr>
-          <p:nvPr/>
-        </p:nvPicPr>
-        <p:blipFill>
-          <a:blip r:embed="rId3"/>
-          <a:stretch>
-            <a:fillRect/>
-          </a:stretch>
-        </p:blipFill>
-        <p:spPr bwMode="auto">
-          <a:xfrm>
-            <a:off x="4648200" y="1549400"/>
-            <a:ext cx="4038600" cy="2679700"/>
-          </a:xfrm>
-          <a:prstGeom prst="rect">
-            <a:avLst/>
-          </a:prstGeom>
-          <a:noFill/>
-          <a:ln w="9525">
-            <a:noFill/>
-            <a:headEnd/>
-            <a:tailEnd/>
-          </a:ln>
-        </p:spPr>
-      </p:pic>
+              <a:t>Generating a website</a:t>
+            </a:r>
+          </a:p>
+        </p:txBody>
+      </p:sp>
     </p:spTree>
   </p:cSld>
 </p:sld>
@@ -8690,1074 +8638,283 @@
             </a:pPr>
             <a:r>
               <a:rPr/>
-              <a:t>Age and Population Pyramids for China</a:t>
-            </a:r>
-          </a:p>
-        </p:txBody>
-      </p:sp>
-      <p:pic>
-        <p:nvPicPr>
-          <p:cNvPr descr="presentation_files/figure-pptx/cell-8-output-13.png" id="0" name="Picture 1"/>
-          <p:cNvPicPr>
-            <a:picLocks noGrp="1" noChangeAspect="1"/>
-          </p:cNvPicPr>
-          <p:nvPr/>
-        </p:nvPicPr>
-        <p:blipFill>
-          <a:blip r:embed="rId2"/>
-          <a:stretch>
-            <a:fillRect/>
-          </a:stretch>
-        </p:blipFill>
-        <p:spPr bwMode="auto">
-          <a:xfrm>
-            <a:off x="457200" y="1524000"/>
-            <a:ext cx="4038600" cy="2730500"/>
-          </a:xfrm>
-          <a:prstGeom prst="rect">
-            <a:avLst/>
-          </a:prstGeom>
-          <a:noFill/>
-          <a:ln w="9525">
-            <a:noFill/>
-            <a:headEnd/>
-            <a:tailEnd/>
-          </a:ln>
-        </p:spPr>
-      </p:pic>
-      <p:pic>
-        <p:nvPicPr>
-          <p:cNvPr descr="presentation_files/figure-pptx/cell-8-output-16.png" id="0" name="Picture 1"/>
-          <p:cNvPicPr>
-            <a:picLocks noGrp="1" noChangeAspect="1"/>
-          </p:cNvPicPr>
-          <p:nvPr/>
-        </p:nvPicPr>
-        <p:blipFill>
-          <a:blip r:embed="rId3"/>
-          <a:stretch>
-            <a:fillRect/>
-          </a:stretch>
-        </p:blipFill>
-        <p:spPr bwMode="auto">
-          <a:xfrm>
-            <a:off x="4648200" y="1549400"/>
-            <a:ext cx="4038600" cy="2679700"/>
-          </a:xfrm>
-          <a:prstGeom prst="rect">
-            <a:avLst/>
-          </a:prstGeom>
-          <a:noFill/>
-          <a:ln w="9525">
-            <a:noFill/>
-            <a:headEnd/>
-            <a:tailEnd/>
-          </a:ln>
-        </p:spPr>
-      </p:pic>
+              <a:t>One-liner creates a website</a:t>
+            </a:r>
+          </a:p>
+        </p:txBody>
+      </p:sp>
+      <p:sp>
+        <p:nvSpPr>
+          <p:cNvPr id="3" name="Content Placeholder 2"/>
+          <p:cNvSpPr>
+            <a:spLocks noGrp="1"/>
+          </p:cNvSpPr>
+          <p:nvPr>
+            <p:ph idx="1"/>
+          </p:nvPr>
+        </p:nvSpPr>
+        <p:spPr/>
+        <p:txBody>
+          <a:bodyPr/>
+          <a:lstStyle/>
+          <a:p>
+            <a:pPr lvl="0" indent="0">
+              <a:buNone/>
+            </a:pPr>
+            <a:r>
+              <a:rPr>
+                <a:solidFill>
+                  <a:srgbClr val="AD0000"/>
+                </a:solidFill>
+                <a:latin typeface="Consolas"/>
+              </a:rPr>
+              <a:t>---</a:t>
+            </a:r>
+            <a:br/>
+            <a:r>
+              <a:rPr>
+                <a:solidFill>
+                  <a:srgbClr val="4758AB"/>
+                </a:solidFill>
+                <a:latin typeface="Consolas"/>
+              </a:rPr>
+              <a:t>title</a:t>
+            </a:r>
+            <a:r>
+              <a:rPr>
+                <a:solidFill>
+                  <a:srgbClr val="003B4F"/>
+                </a:solidFill>
+                <a:latin typeface="Consolas"/>
+              </a:rPr>
+              <a:t>:</a:t>
+            </a:r>
+            <a:r>
+              <a:rPr>
+                <a:solidFill>
+                  <a:srgbClr val="657422"/>
+                </a:solidFill>
+                <a:latin typeface="Consolas"/>
+              </a:rPr>
+              <a:t> </a:t>
+            </a:r>
+            <a:r>
+              <a:rPr>
+                <a:solidFill>
+                  <a:srgbClr val="20794D"/>
+                </a:solidFill>
+                <a:latin typeface="Consolas"/>
+              </a:rPr>
+              <a:t>"Quarto with Python"</a:t>
+            </a:r>
+            <a:br/>
+            <a:r>
+              <a:rPr>
+                <a:solidFill>
+                  <a:srgbClr val="4758AB"/>
+                </a:solidFill>
+                <a:latin typeface="Consolas"/>
+              </a:rPr>
+              <a:t>format</a:t>
+            </a:r>
+            <a:r>
+              <a:rPr>
+                <a:solidFill>
+                  <a:srgbClr val="003B4F"/>
+                </a:solidFill>
+                <a:latin typeface="Consolas"/>
+              </a:rPr>
+              <a:t>:</a:t>
+            </a:r>
+            <a:r>
+              <a:rPr>
+                <a:solidFill>
+                  <a:srgbClr val="657422"/>
+                </a:solidFill>
+                <a:latin typeface="Consolas"/>
+              </a:rPr>
+              <a:t> html</a:t>
+            </a:r>
+            <a:br/>
+            <a:r>
+              <a:rPr>
+                <a:solidFill>
+                  <a:srgbClr val="5E5E5E"/>
+                </a:solidFill>
+                <a:latin typeface="Consolas"/>
+              </a:rPr>
+              <a:t>    # revealjs:</a:t>
+            </a:r>
+            <a:br/>
+            <a:r>
+              <a:rPr>
+                <a:solidFill>
+                  <a:srgbClr val="5E5E5E"/>
+                </a:solidFill>
+                <a:latin typeface="Consolas"/>
+              </a:rPr>
+              <a:t>    #     incremental: false</a:t>
+            </a:r>
+            <a:br/>
+            <a:r>
+              <a:rPr>
+                <a:solidFill>
+                  <a:srgbClr val="5E5E5E"/>
+                </a:solidFill>
+                <a:latin typeface="Consolas"/>
+              </a:rPr>
+              <a:t>    #     theme: [simple, revealjs-customizations.scss]</a:t>
+            </a:r>
+            <a:br/>
+            <a:r>
+              <a:rPr>
+                <a:solidFill>
+                  <a:srgbClr val="5E5E5E"/>
+                </a:solidFill>
+                <a:latin typeface="Consolas"/>
+              </a:rPr>
+              <a:t>    #     title-slide-attributes:</a:t>
+            </a:r>
+            <a:br/>
+            <a:r>
+              <a:rPr>
+                <a:solidFill>
+                  <a:srgbClr val="5E5E5E"/>
+                </a:solidFill>
+                <a:latin typeface="Consolas"/>
+              </a:rPr>
+              <a:t>    #         data-background-image: images/data-viz-bg.jpg</a:t>
+            </a:r>
+            <a:br/>
+            <a:r>
+              <a:rPr>
+                <a:solidFill>
+                  <a:srgbClr val="5E5E5E"/>
+                </a:solidFill>
+                <a:latin typeface="Consolas"/>
+              </a:rPr>
+              <a:t>    #         data-background-size: contain</a:t>
+            </a:r>
+            <a:br/>
+            <a:r>
+              <a:rPr>
+                <a:solidFill>
+                  <a:srgbClr val="5E5E5E"/>
+                </a:solidFill>
+                <a:latin typeface="Consolas"/>
+              </a:rPr>
+              <a:t>    #         data-background-position: right</a:t>
+            </a:r>
+            <a:br/>
+            <a:br/>
+            <a:r>
+              <a:rPr>
+                <a:solidFill>
+                  <a:srgbClr val="4758AB"/>
+                </a:solidFill>
+                <a:latin typeface="Consolas"/>
+              </a:rPr>
+              <a:t>author</a:t>
+            </a:r>
+            <a:r>
+              <a:rPr>
+                <a:solidFill>
+                  <a:srgbClr val="003B4F"/>
+                </a:solidFill>
+                <a:latin typeface="Consolas"/>
+              </a:rPr>
+              <a:t>:</a:t>
+            </a:r>
+            <a:r>
+              <a:rPr>
+                <a:solidFill>
+                  <a:srgbClr val="657422"/>
+                </a:solidFill>
+                <a:latin typeface="Consolas"/>
+              </a:rPr>
+              <a:t> Lucas A. Meyer</a:t>
+            </a:r>
+            <a:br/>
+            <a:r>
+              <a:rPr>
+                <a:solidFill>
+                  <a:srgbClr val="4758AB"/>
+                </a:solidFill>
+                <a:latin typeface="Consolas"/>
+              </a:rPr>
+              <a:t>date</a:t>
+            </a:r>
+            <a:r>
+              <a:rPr>
+                <a:solidFill>
+                  <a:srgbClr val="003B4F"/>
+                </a:solidFill>
+                <a:latin typeface="Consolas"/>
+              </a:rPr>
+              <a:t>:</a:t>
+            </a:r>
+            <a:r>
+              <a:rPr>
+                <a:solidFill>
+                  <a:srgbClr val="657422"/>
+                </a:solidFill>
+                <a:latin typeface="Consolas"/>
+              </a:rPr>
+              <a:t> 2022-07-14</a:t>
+            </a:r>
+            <a:br/>
+            <a:r>
+              <a:rPr>
+                <a:solidFill>
+                  <a:srgbClr val="AD0000"/>
+                </a:solidFill>
+                <a:latin typeface="Consolas"/>
+              </a:rPr>
+              <a:t>---</a:t>
+            </a:r>
+          </a:p>
+          <a:p>
+            <a:pPr lvl="0" indent="0" marL="0">
+              <a:buNone/>
+            </a:pPr>
+          </a:p>
+          <a:p>
+            <a:pPr lvl="0" indent="0" marL="0">
+              <a:buNone/>
+            </a:pPr>
+            <a:r>
+              <a:rPr/>
+              <a:t>Adding or changing the format to </a:t>
+            </a:r>
+            <a:r>
+              <a:rPr>
+                <a:latin typeface="Consolas"/>
+              </a:rPr>
+              <a:t>html</a:t>
+            </a:r>
+            <a:r>
+              <a:rPr/>
+              <a:t> will create a </a:t>
+            </a:r>
+            <a:r>
+              <a:rPr>
+                <a:hlinkClick r:id="rId2"/>
+              </a:rPr>
+              <a:t>website</a:t>
+            </a:r>
+            <a:r>
+              <a:rPr/>
+              <a:t>.</a:t>
+            </a:r>
+          </a:p>
+        </p:txBody>
+      </p:sp>
     </p:spTree>
   </p:cSld>
 </p:sld>
 </file>
 
 <file path=ppt/slides/slide25.xml><?xml version="1.0" encoding="utf-8"?>
-<p:sld xmlns:a="http://schemas.openxmlformats.org/drawingml/2006/main" xmlns:r="http://schemas.openxmlformats.org/officeDocument/2006/relationships" xmlns:p="http://schemas.openxmlformats.org/presentationml/2006/main">
-  <p:cSld>
-    <p:spTree>
-      <p:nvGrpSpPr>
-        <p:cNvPr id="1" name=""/>
-        <p:cNvGrpSpPr/>
-        <p:nvPr/>
-      </p:nvGrpSpPr>
-      <p:grpSpPr>
-        <a:xfrm>
-          <a:off x="0" y="0"/>
-          <a:ext cx="0" cy="0"/>
-          <a:chOff x="0" y="0"/>
-          <a:chExt cx="0" cy="0"/>
-        </a:xfrm>
-      </p:grpSpPr>
-      <p:sp>
-        <p:nvSpPr>
-          <p:cNvPr id="2" name="Title 1"/>
-          <p:cNvSpPr>
-            <a:spLocks noGrp="1"/>
-          </p:cNvSpPr>
-          <p:nvPr>
-            <p:ph type="title"/>
-          </p:nvPr>
-        </p:nvSpPr>
-        <p:spPr/>
-        <p:txBody>
-          <a:bodyPr/>
-          <a:lstStyle/>
-          <a:p>
-            <a:pPr lvl="0" indent="0" marL="0">
-              <a:buNone/>
-            </a:pPr>
-            <a:r>
-              <a:rPr/>
-              <a:t>Age and Population Pyramids for Brazil</a:t>
-            </a:r>
-          </a:p>
-        </p:txBody>
-      </p:sp>
-      <p:pic>
-        <p:nvPicPr>
-          <p:cNvPr descr="presentation_files/figure-pptx/cell-8-output-22.png" id="0" name="Picture 1"/>
-          <p:cNvPicPr>
-            <a:picLocks noGrp="1" noChangeAspect="1"/>
-          </p:cNvPicPr>
-          <p:nvPr/>
-        </p:nvPicPr>
-        <p:blipFill>
-          <a:blip r:embed="rId2"/>
-          <a:stretch>
-            <a:fillRect/>
-          </a:stretch>
-        </p:blipFill>
-        <p:spPr bwMode="auto">
-          <a:xfrm>
-            <a:off x="457200" y="1524000"/>
-            <a:ext cx="4038600" cy="2730500"/>
-          </a:xfrm>
-          <a:prstGeom prst="rect">
-            <a:avLst/>
-          </a:prstGeom>
-          <a:noFill/>
-          <a:ln w="9525">
-            <a:noFill/>
-            <a:headEnd/>
-            <a:tailEnd/>
-          </a:ln>
-        </p:spPr>
-      </p:pic>
-      <p:pic>
-        <p:nvPicPr>
-          <p:cNvPr descr="presentation_files/figure-pptx/cell-8-output-25.png" id="0" name="Picture 1"/>
-          <p:cNvPicPr>
-            <a:picLocks noGrp="1" noChangeAspect="1"/>
-          </p:cNvPicPr>
-          <p:nvPr/>
-        </p:nvPicPr>
-        <p:blipFill>
-          <a:blip r:embed="rId3"/>
-          <a:stretch>
-            <a:fillRect/>
-          </a:stretch>
-        </p:blipFill>
-        <p:spPr bwMode="auto">
-          <a:xfrm>
-            <a:off x="4648200" y="1549400"/>
-            <a:ext cx="4038600" cy="2679700"/>
-          </a:xfrm>
-          <a:prstGeom prst="rect">
-            <a:avLst/>
-          </a:prstGeom>
-          <a:noFill/>
-          <a:ln w="9525">
-            <a:noFill/>
-            <a:headEnd/>
-            <a:tailEnd/>
-          </a:ln>
-        </p:spPr>
-      </p:pic>
-    </p:spTree>
-  </p:cSld>
-</p:sld>
-</file>
-
-<file path=ppt/slides/slide26.xml><?xml version="1.0" encoding="utf-8"?>
-<p:sld xmlns:a="http://schemas.openxmlformats.org/drawingml/2006/main" xmlns:r="http://schemas.openxmlformats.org/officeDocument/2006/relationships" xmlns:p="http://schemas.openxmlformats.org/presentationml/2006/main">
-  <p:cSld>
-    <p:spTree>
-      <p:nvGrpSpPr>
-        <p:cNvPr id="1" name=""/>
-        <p:cNvGrpSpPr/>
-        <p:nvPr/>
-      </p:nvGrpSpPr>
-      <p:grpSpPr>
-        <a:xfrm>
-          <a:off x="0" y="0"/>
-          <a:ext cx="0" cy="0"/>
-          <a:chOff x="0" y="0"/>
-          <a:chExt cx="0" cy="0"/>
-        </a:xfrm>
-      </p:grpSpPr>
-      <p:sp>
-        <p:nvSpPr>
-          <p:cNvPr id="2" name="Title 1"/>
-          <p:cNvSpPr>
-            <a:spLocks noGrp="1"/>
-          </p:cNvSpPr>
-          <p:nvPr>
-            <p:ph type="title"/>
-          </p:nvPr>
-        </p:nvSpPr>
-        <p:spPr/>
-        <p:txBody>
-          <a:bodyPr/>
-          <a:lstStyle/>
-          <a:p>
-            <a:pPr lvl="0" indent="0" marL="0">
-              <a:buNone/>
-            </a:pPr>
-            <a:r>
-              <a:rPr/>
-              <a:t>Age and Population Pyramids for India</a:t>
-            </a:r>
-          </a:p>
-        </p:txBody>
-      </p:sp>
-      <p:pic>
-        <p:nvPicPr>
-          <p:cNvPr descr="presentation_files/figure-pptx/cell-8-output-31.png" id="0" name="Picture 1"/>
-          <p:cNvPicPr>
-            <a:picLocks noGrp="1" noChangeAspect="1"/>
-          </p:cNvPicPr>
-          <p:nvPr/>
-        </p:nvPicPr>
-        <p:blipFill>
-          <a:blip r:embed="rId2"/>
-          <a:stretch>
-            <a:fillRect/>
-          </a:stretch>
-        </p:blipFill>
-        <p:spPr bwMode="auto">
-          <a:xfrm>
-            <a:off x="457200" y="1524000"/>
-            <a:ext cx="4038600" cy="2730500"/>
-          </a:xfrm>
-          <a:prstGeom prst="rect">
-            <a:avLst/>
-          </a:prstGeom>
-          <a:noFill/>
-          <a:ln w="9525">
-            <a:noFill/>
-            <a:headEnd/>
-            <a:tailEnd/>
-          </a:ln>
-        </p:spPr>
-      </p:pic>
-      <p:pic>
-        <p:nvPicPr>
-          <p:cNvPr descr="presentation_files/figure-pptx/cell-8-output-34.png" id="0" name="Picture 1"/>
-          <p:cNvPicPr>
-            <a:picLocks noGrp="1" noChangeAspect="1"/>
-          </p:cNvPicPr>
-          <p:nvPr/>
-        </p:nvPicPr>
-        <p:blipFill>
-          <a:blip r:embed="rId3"/>
-          <a:stretch>
-            <a:fillRect/>
-          </a:stretch>
-        </p:blipFill>
-        <p:spPr bwMode="auto">
-          <a:xfrm>
-            <a:off x="4648200" y="1562100"/>
-            <a:ext cx="4038600" cy="2654300"/>
-          </a:xfrm>
-          <a:prstGeom prst="rect">
-            <a:avLst/>
-          </a:prstGeom>
-          <a:noFill/>
-          <a:ln w="9525">
-            <a:noFill/>
-            <a:headEnd/>
-            <a:tailEnd/>
-          </a:ln>
-        </p:spPr>
-      </p:pic>
-    </p:spTree>
-  </p:cSld>
-</p:sld>
-</file>
-
-<file path=ppt/slides/slide27.xml><?xml version="1.0" encoding="utf-8"?>
-<p:sld xmlns:a="http://schemas.openxmlformats.org/drawingml/2006/main" xmlns:r="http://schemas.openxmlformats.org/officeDocument/2006/relationships" xmlns:p="http://schemas.openxmlformats.org/presentationml/2006/main">
-  <p:cSld>
-    <p:spTree>
-      <p:nvGrpSpPr>
-        <p:cNvPr id="1" name=""/>
-        <p:cNvGrpSpPr/>
-        <p:nvPr/>
-      </p:nvGrpSpPr>
-      <p:grpSpPr>
-        <a:xfrm>
-          <a:off x="0" y="0"/>
-          <a:ext cx="0" cy="0"/>
-          <a:chOff x="0" y="0"/>
-          <a:chExt cx="0" cy="0"/>
-        </a:xfrm>
-      </p:grpSpPr>
-      <p:sp>
-        <p:nvSpPr>
-          <p:cNvPr id="2" name="Title 1"/>
-          <p:cNvSpPr>
-            <a:spLocks noGrp="1"/>
-          </p:cNvSpPr>
-          <p:nvPr>
-            <p:ph type="title"/>
-          </p:nvPr>
-        </p:nvSpPr>
-        <p:spPr/>
-        <p:txBody>
-          <a:bodyPr/>
-          <a:lstStyle/>
-          <a:p>
-            <a:pPr lvl="0" indent="0" marL="0">
-              <a:buNone/>
-            </a:pPr>
-            <a:r>
-              <a:rPr/>
-              <a:t>Age and Population Pyramids for Japan</a:t>
-            </a:r>
-          </a:p>
-        </p:txBody>
-      </p:sp>
-      <p:pic>
-        <p:nvPicPr>
-          <p:cNvPr descr="presentation_files/figure-pptx/cell-8-output-40.png" id="0" name="Picture 1"/>
-          <p:cNvPicPr>
-            <a:picLocks noGrp="1" noChangeAspect="1"/>
-          </p:cNvPicPr>
-          <p:nvPr/>
-        </p:nvPicPr>
-        <p:blipFill>
-          <a:blip r:embed="rId2"/>
-          <a:stretch>
-            <a:fillRect/>
-          </a:stretch>
-        </p:blipFill>
-        <p:spPr bwMode="auto">
-          <a:xfrm>
-            <a:off x="457200" y="1524000"/>
-            <a:ext cx="4038600" cy="2730500"/>
-          </a:xfrm>
-          <a:prstGeom prst="rect">
-            <a:avLst/>
-          </a:prstGeom>
-          <a:noFill/>
-          <a:ln w="9525">
-            <a:noFill/>
-            <a:headEnd/>
-            <a:tailEnd/>
-          </a:ln>
-        </p:spPr>
-      </p:pic>
-      <p:pic>
-        <p:nvPicPr>
-          <p:cNvPr descr="presentation_files/figure-pptx/cell-8-output-43.png" id="0" name="Picture 1"/>
-          <p:cNvPicPr>
-            <a:picLocks noGrp="1" noChangeAspect="1"/>
-          </p:cNvPicPr>
-          <p:nvPr/>
-        </p:nvPicPr>
-        <p:blipFill>
-          <a:blip r:embed="rId3"/>
-          <a:stretch>
-            <a:fillRect/>
-          </a:stretch>
-        </p:blipFill>
-        <p:spPr bwMode="auto">
-          <a:xfrm>
-            <a:off x="4648200" y="1549400"/>
-            <a:ext cx="4038600" cy="2679700"/>
-          </a:xfrm>
-          <a:prstGeom prst="rect">
-            <a:avLst/>
-          </a:prstGeom>
-          <a:noFill/>
-          <a:ln w="9525">
-            <a:noFill/>
-            <a:headEnd/>
-            <a:tailEnd/>
-          </a:ln>
-        </p:spPr>
-      </p:pic>
-    </p:spTree>
-  </p:cSld>
-</p:sld>
-</file>
-
-<file path=ppt/slides/slide28.xml><?xml version="1.0" encoding="utf-8"?>
-<p:sld xmlns:a="http://schemas.openxmlformats.org/drawingml/2006/main" xmlns:r="http://schemas.openxmlformats.org/officeDocument/2006/relationships" xmlns:p="http://schemas.openxmlformats.org/presentationml/2006/main">
-  <p:cSld>
-    <p:spTree>
-      <p:nvGrpSpPr>
-        <p:cNvPr id="1" name=""/>
-        <p:cNvGrpSpPr/>
-        <p:nvPr/>
-      </p:nvGrpSpPr>
-      <p:grpSpPr>
-        <a:xfrm>
-          <a:off x="0" y="0"/>
-          <a:ext cx="0" cy="0"/>
-          <a:chOff x="0" y="0"/>
-          <a:chExt cx="0" cy="0"/>
-        </a:xfrm>
-      </p:grpSpPr>
-      <p:sp>
-        <p:nvSpPr>
-          <p:cNvPr id="2" name="Title 1"/>
-          <p:cNvSpPr>
-            <a:spLocks noGrp="1"/>
-          </p:cNvSpPr>
-          <p:nvPr>
-            <p:ph type="title"/>
-          </p:nvPr>
-        </p:nvSpPr>
-        <p:spPr/>
-        <p:txBody>
-          <a:bodyPr/>
-          <a:lstStyle/>
-          <a:p>
-            <a:pPr lvl="0" indent="0" marL="0">
-              <a:buNone/>
-            </a:pPr>
-            <a:r>
-              <a:rPr/>
-              <a:t>Age and Population Pyramids for Nigeria</a:t>
-            </a:r>
-          </a:p>
-        </p:txBody>
-      </p:sp>
-      <p:pic>
-        <p:nvPicPr>
-          <p:cNvPr descr="presentation_files/figure-pptx/cell-8-output-49.png" id="0" name="Picture 1"/>
-          <p:cNvPicPr>
-            <a:picLocks noGrp="1" noChangeAspect="1"/>
-          </p:cNvPicPr>
-          <p:nvPr/>
-        </p:nvPicPr>
-        <p:blipFill>
-          <a:blip r:embed="rId2"/>
-          <a:stretch>
-            <a:fillRect/>
-          </a:stretch>
-        </p:blipFill>
-        <p:spPr bwMode="auto">
-          <a:xfrm>
-            <a:off x="457200" y="1524000"/>
-            <a:ext cx="4038600" cy="2730500"/>
-          </a:xfrm>
-          <a:prstGeom prst="rect">
-            <a:avLst/>
-          </a:prstGeom>
-          <a:noFill/>
-          <a:ln w="9525">
-            <a:noFill/>
-            <a:headEnd/>
-            <a:tailEnd/>
-          </a:ln>
-        </p:spPr>
-      </p:pic>
-      <p:pic>
-        <p:nvPicPr>
-          <p:cNvPr descr="presentation_files/figure-pptx/cell-8-output-52.png" id="0" name="Picture 1"/>
-          <p:cNvPicPr>
-            <a:picLocks noGrp="1" noChangeAspect="1"/>
-          </p:cNvPicPr>
-          <p:nvPr/>
-        </p:nvPicPr>
-        <p:blipFill>
-          <a:blip r:embed="rId3"/>
-          <a:stretch>
-            <a:fillRect/>
-          </a:stretch>
-        </p:blipFill>
-        <p:spPr bwMode="auto">
-          <a:xfrm>
-            <a:off x="4648200" y="1587500"/>
-            <a:ext cx="4038600" cy="2590800"/>
-          </a:xfrm>
-          <a:prstGeom prst="rect">
-            <a:avLst/>
-          </a:prstGeom>
-          <a:noFill/>
-          <a:ln w="9525">
-            <a:noFill/>
-            <a:headEnd/>
-            <a:tailEnd/>
-          </a:ln>
-        </p:spPr>
-      </p:pic>
-    </p:spTree>
-  </p:cSld>
-</p:sld>
-</file>
-
-<file path=ppt/slides/slide29.xml><?xml version="1.0" encoding="utf-8"?>
-<p:sld xmlns:a="http://schemas.openxmlformats.org/drawingml/2006/main" xmlns:r="http://schemas.openxmlformats.org/officeDocument/2006/relationships" xmlns:p="http://schemas.openxmlformats.org/presentationml/2006/main">
-  <p:cSld>
-    <p:spTree>
-      <p:nvGrpSpPr>
-        <p:cNvPr id="1" name=""/>
-        <p:cNvGrpSpPr/>
-        <p:nvPr/>
-      </p:nvGrpSpPr>
-      <p:grpSpPr>
-        <a:xfrm>
-          <a:off x="0" y="0"/>
-          <a:ext cx="0" cy="0"/>
-          <a:chOff x="0" y="0"/>
-          <a:chExt cx="0" cy="0"/>
-        </a:xfrm>
-      </p:grpSpPr>
-      <p:sp>
-        <p:nvSpPr>
-          <p:cNvPr id="2" name="Title 1"/>
-          <p:cNvSpPr>
-            <a:spLocks noGrp="1"/>
-          </p:cNvSpPr>
-          <p:nvPr>
-            <p:ph type="title"/>
-          </p:nvPr>
-        </p:nvSpPr>
-        <p:spPr>
-          <a:xfrm>
-            <a:off x="722313" y="3305176"/>
-            <a:ext cx="7772400" cy="1021556"/>
-          </a:xfrm>
-        </p:spPr>
-        <p:txBody>
-          <a:bodyPr/>
-          <a:lstStyle/>
-          <a:p>
-            <a:pPr lvl="0" indent="0" marL="0">
-              <a:buNone/>
-            </a:pPr>
-            <a:r>
-              <a:rPr/>
-              <a:t>Generating a website</a:t>
-            </a:r>
-          </a:p>
-        </p:txBody>
-      </p:sp>
-    </p:spTree>
-  </p:cSld>
-</p:sld>
-</file>
-
-<file path=ppt/slides/slide3.xml><?xml version="1.0" encoding="utf-8"?>
-<p:sld xmlns:a="http://schemas.openxmlformats.org/drawingml/2006/main" xmlns:r="http://schemas.openxmlformats.org/officeDocument/2006/relationships" xmlns:p="http://schemas.openxmlformats.org/presentationml/2006/main">
-  <p:cSld>
-    <p:spTree>
-      <p:nvGrpSpPr>
-        <p:cNvPr id="1" name=""/>
-        <p:cNvGrpSpPr/>
-        <p:nvPr/>
-      </p:nvGrpSpPr>
-      <p:grpSpPr>
-        <a:xfrm>
-          <a:off x="0" y="0"/>
-          <a:ext cx="0" cy="0"/>
-          <a:chOff x="0" y="0"/>
-          <a:chExt cx="0" cy="0"/>
-        </a:xfrm>
-      </p:grpSpPr>
-      <p:sp>
-        <p:nvSpPr>
-          <p:cNvPr id="2" name="Title 1"/>
-          <p:cNvSpPr>
-            <a:spLocks noGrp="1"/>
-          </p:cNvSpPr>
-          <p:nvPr>
-            <p:ph type="title"/>
-          </p:nvPr>
-        </p:nvSpPr>
-        <p:spPr/>
-        <p:txBody>
-          <a:bodyPr/>
-          <a:lstStyle/>
-          <a:p>
-            <a:pPr lvl="0" indent="0" marL="0">
-              <a:buNone/>
-            </a:pPr>
-            <a:r>
-              <a:rPr/>
-              <a:t>The content value chain</a:t>
-            </a:r>
-          </a:p>
-        </p:txBody>
-      </p:sp>
-      <p:sp>
-        <p:nvSpPr>
-          <p:cNvPr id="3" name="Content Placeholder 2"/>
-          <p:cNvSpPr>
-            <a:spLocks noGrp="1"/>
-          </p:cNvSpPr>
-          <p:nvPr>
-            <p:ph idx="1" sz="half"/>
-          </p:nvPr>
-        </p:nvSpPr>
-        <p:spPr/>
-        <p:txBody>
-          <a:bodyPr/>
-          <a:lstStyle/>
-          <a:p>
-            <a:pPr lvl="0" indent="0" marL="0">
-              <a:buNone/>
-            </a:pPr>
-            <a:r>
-              <a:rPr/>
-              <a:t>Content stuck in my computer is nearly worthless.</a:t>
-            </a:r>
-          </a:p>
-          <a:p>
-            <a:pPr lvl="0" indent="0" marL="0">
-              <a:spcBef>
-                <a:spcPts val="3000"/>
-              </a:spcBef>
-              <a:buNone/>
-            </a:pPr>
-            <a:r>
-              <a:rPr b="1"/>
-              <a:t>Goal</a:t>
-            </a:r>
-          </a:p>
-          <a:p>
-            <a:pPr lvl="0"/>
-            <a:r>
-              <a:rPr/>
-              <a:t>Move good content out of my computer </a:t>
-            </a:r>
-            <a:r>
-              <a:rPr b="1"/>
-              <a:t>as fast as possible</a:t>
-            </a:r>
-          </a:p>
-          <a:p>
-            <a:pPr lvl="0"/>
-            <a:r>
-              <a:rPr/>
-              <a:t>Reproducible</a:t>
-            </a:r>
-          </a:p>
-          <a:p>
-            <a:pPr lvl="0"/>
-            <a:r>
-              <a:rPr/>
-              <a:t>Git-based collaboration</a:t>
-            </a:r>
-          </a:p>
-          <a:p>
-            <a:pPr lvl="0"/>
-            <a:r>
-              <a:rPr/>
-              <a:t>Write once, generate:</a:t>
-            </a:r>
-          </a:p>
-          <a:p>
-            <a:pPr lvl="1"/>
-            <a:r>
-              <a:rPr/>
-              <a:t>Code</a:t>
-            </a:r>
-          </a:p>
-          <a:p>
-            <a:pPr lvl="1"/>
-            <a:r>
-              <a:rPr/>
-              <a:t>Paper</a:t>
-            </a:r>
-          </a:p>
-          <a:p>
-            <a:pPr lvl="1"/>
-            <a:r>
-              <a:rPr/>
-              <a:t>PowerPoint</a:t>
-            </a:r>
-          </a:p>
-          <a:p>
-            <a:pPr lvl="1"/>
-            <a:r>
-              <a:rPr/>
-              <a:t>Site/documentation</a:t>
-            </a:r>
-          </a:p>
-        </p:txBody>
-      </p:sp>
-      <p:pic>
-        <p:nvPicPr>
-          <p:cNvPr descr="fig:  images/content-value-chain.jpg" id="0" name="Picture 1"/>
-          <p:cNvPicPr>
-            <a:picLocks noGrp="1" noChangeAspect="1"/>
-          </p:cNvPicPr>
-          <p:nvPr/>
-        </p:nvPicPr>
-        <p:blipFill>
-          <a:blip r:embed="rId2"/>
-          <a:stretch>
-            <a:fillRect/>
-          </a:stretch>
-        </p:blipFill>
-        <p:spPr bwMode="auto">
-          <a:xfrm>
-            <a:off x="4749800" y="1193800"/>
-            <a:ext cx="3835400" cy="2882900"/>
-          </a:xfrm>
-          <a:prstGeom prst="rect">
-            <a:avLst/>
-          </a:prstGeom>
-          <a:noFill/>
-          <a:ln w="9525">
-            <a:noFill/>
-            <a:headEnd/>
-            <a:tailEnd/>
-          </a:ln>
-        </p:spPr>
-      </p:pic>
-      <p:sp>
-        <p:nvSpPr>
-          <p:cNvPr id="1" name="TextBox 3"/>
-          <p:cNvSpPr txBox="1"/>
-          <p:nvPr/>
-        </p:nvSpPr>
-        <p:spPr>
-          <a:xfrm>
-            <a:off x="4648200" y="4076700"/>
-            <a:ext cx="4038600" cy="508000"/>
-          </a:xfrm>
-          <a:prstGeom prst="rect">
-            <a:avLst/>
-          </a:prstGeom>
-          <a:noFill/>
-        </p:spPr>
-        <p:txBody>
-          <a:bodyPr/>
-          <a:lstStyle/>
-          <a:p>
-            <a:pPr lvl="0" indent="0" marL="0" algn="ctr">
-              <a:buNone/>
-            </a:pPr>
-            <a:r>
-              <a:rPr/>
-              <a:t>The content value chain by (@drrob) captured by Amelia McNamara</a:t>
-            </a:r>
-          </a:p>
-        </p:txBody>
-      </p:sp>
-    </p:spTree>
-  </p:cSld>
-</p:sld>
-</file>
-
-<file path=ppt/slides/slide30.xml><?xml version="1.0" encoding="utf-8"?>
-<p:sld xmlns:a="http://schemas.openxmlformats.org/drawingml/2006/main" xmlns:r="http://schemas.openxmlformats.org/officeDocument/2006/relationships" xmlns:p="http://schemas.openxmlformats.org/presentationml/2006/main">
-  <p:cSld>
-    <p:spTree>
-      <p:nvGrpSpPr>
-        <p:cNvPr id="1" name=""/>
-        <p:cNvGrpSpPr/>
-        <p:nvPr/>
-      </p:nvGrpSpPr>
-      <p:grpSpPr>
-        <a:xfrm>
-          <a:off x="0" y="0"/>
-          <a:ext cx="0" cy="0"/>
-          <a:chOff x="0" y="0"/>
-          <a:chExt cx="0" cy="0"/>
-        </a:xfrm>
-      </p:grpSpPr>
-      <p:sp>
-        <p:nvSpPr>
-          <p:cNvPr id="2" name="Title 1"/>
-          <p:cNvSpPr>
-            <a:spLocks noGrp="1"/>
-          </p:cNvSpPr>
-          <p:nvPr>
-            <p:ph type="title"/>
-          </p:nvPr>
-        </p:nvSpPr>
-        <p:spPr/>
-        <p:txBody>
-          <a:bodyPr/>
-          <a:lstStyle/>
-          <a:p>
-            <a:pPr lvl="0" indent="0" marL="0">
-              <a:buNone/>
-            </a:pPr>
-            <a:r>
-              <a:rPr/>
-              <a:t>One-liner creates a website</a:t>
-            </a:r>
-          </a:p>
-        </p:txBody>
-      </p:sp>
-      <p:sp>
-        <p:nvSpPr>
-          <p:cNvPr id="3" name="Content Placeholder 2"/>
-          <p:cNvSpPr>
-            <a:spLocks noGrp="1"/>
-          </p:cNvSpPr>
-          <p:nvPr>
-            <p:ph idx="1"/>
-          </p:nvPr>
-        </p:nvSpPr>
-        <p:spPr/>
-        <p:txBody>
-          <a:bodyPr/>
-          <a:lstStyle/>
-          <a:p>
-            <a:pPr lvl="0" indent="0">
-              <a:buNone/>
-            </a:pPr>
-            <a:r>
-              <a:rPr>
-                <a:solidFill>
-                  <a:srgbClr val="AD0000"/>
-                </a:solidFill>
-                <a:latin typeface="Consolas"/>
-              </a:rPr>
-              <a:t>---</a:t>
-            </a:r>
-            <a:br/>
-            <a:r>
-              <a:rPr>
-                <a:solidFill>
-                  <a:srgbClr val="4758AB"/>
-                </a:solidFill>
-                <a:latin typeface="Consolas"/>
-              </a:rPr>
-              <a:t>title</a:t>
-            </a:r>
-            <a:r>
-              <a:rPr>
-                <a:solidFill>
-                  <a:srgbClr val="003B4F"/>
-                </a:solidFill>
-                <a:latin typeface="Consolas"/>
-              </a:rPr>
-              <a:t>:</a:t>
-            </a:r>
-            <a:r>
-              <a:rPr>
-                <a:solidFill>
-                  <a:srgbClr val="657422"/>
-                </a:solidFill>
-                <a:latin typeface="Consolas"/>
-              </a:rPr>
-              <a:t> </a:t>
-            </a:r>
-            <a:r>
-              <a:rPr>
-                <a:solidFill>
-                  <a:srgbClr val="20794D"/>
-                </a:solidFill>
-                <a:latin typeface="Consolas"/>
-              </a:rPr>
-              <a:t>"Quarto with Python"</a:t>
-            </a:r>
-            <a:br/>
-            <a:r>
-              <a:rPr>
-                <a:solidFill>
-                  <a:srgbClr val="4758AB"/>
-                </a:solidFill>
-                <a:latin typeface="Consolas"/>
-              </a:rPr>
-              <a:t>format</a:t>
-            </a:r>
-            <a:r>
-              <a:rPr>
-                <a:solidFill>
-                  <a:srgbClr val="003B4F"/>
-                </a:solidFill>
-                <a:latin typeface="Consolas"/>
-              </a:rPr>
-              <a:t>:</a:t>
-            </a:r>
-            <a:r>
-              <a:rPr>
-                <a:solidFill>
-                  <a:srgbClr val="657422"/>
-                </a:solidFill>
-                <a:latin typeface="Consolas"/>
-              </a:rPr>
-              <a:t> html</a:t>
-            </a:r>
-            <a:br/>
-            <a:r>
-              <a:rPr>
-                <a:solidFill>
-                  <a:srgbClr val="5E5E5E"/>
-                </a:solidFill>
-                <a:latin typeface="Consolas"/>
-              </a:rPr>
-              <a:t>    # revealjs:</a:t>
-            </a:r>
-            <a:br/>
-            <a:r>
-              <a:rPr>
-                <a:solidFill>
-                  <a:srgbClr val="5E5E5E"/>
-                </a:solidFill>
-                <a:latin typeface="Consolas"/>
-              </a:rPr>
-              <a:t>    #     incremental: false</a:t>
-            </a:r>
-            <a:br/>
-            <a:r>
-              <a:rPr>
-                <a:solidFill>
-                  <a:srgbClr val="5E5E5E"/>
-                </a:solidFill>
-                <a:latin typeface="Consolas"/>
-              </a:rPr>
-              <a:t>    #     theme: [simple, revealjs-customizations.scss]</a:t>
-            </a:r>
-            <a:br/>
-            <a:r>
-              <a:rPr>
-                <a:solidFill>
-                  <a:srgbClr val="5E5E5E"/>
-                </a:solidFill>
-                <a:latin typeface="Consolas"/>
-              </a:rPr>
-              <a:t>    #     title-slide-attributes:</a:t>
-            </a:r>
-            <a:br/>
-            <a:r>
-              <a:rPr>
-                <a:solidFill>
-                  <a:srgbClr val="5E5E5E"/>
-                </a:solidFill>
-                <a:latin typeface="Consolas"/>
-              </a:rPr>
-              <a:t>    #         data-background-image: images/data-viz-bg.jpg</a:t>
-            </a:r>
-            <a:br/>
-            <a:r>
-              <a:rPr>
-                <a:solidFill>
-                  <a:srgbClr val="5E5E5E"/>
-                </a:solidFill>
-                <a:latin typeface="Consolas"/>
-              </a:rPr>
-              <a:t>    #         data-background-size: contain</a:t>
-            </a:r>
-            <a:br/>
-            <a:r>
-              <a:rPr>
-                <a:solidFill>
-                  <a:srgbClr val="5E5E5E"/>
-                </a:solidFill>
-                <a:latin typeface="Consolas"/>
-              </a:rPr>
-              <a:t>    #         data-background-position: right</a:t>
-            </a:r>
-            <a:br/>
-            <a:br/>
-            <a:r>
-              <a:rPr>
-                <a:solidFill>
-                  <a:srgbClr val="4758AB"/>
-                </a:solidFill>
-                <a:latin typeface="Consolas"/>
-              </a:rPr>
-              <a:t>author</a:t>
-            </a:r>
-            <a:r>
-              <a:rPr>
-                <a:solidFill>
-                  <a:srgbClr val="003B4F"/>
-                </a:solidFill>
-                <a:latin typeface="Consolas"/>
-              </a:rPr>
-              <a:t>:</a:t>
-            </a:r>
-            <a:r>
-              <a:rPr>
-                <a:solidFill>
-                  <a:srgbClr val="657422"/>
-                </a:solidFill>
-                <a:latin typeface="Consolas"/>
-              </a:rPr>
-              <a:t> Lucas A. Meyer</a:t>
-            </a:r>
-            <a:br/>
-            <a:r>
-              <a:rPr>
-                <a:solidFill>
-                  <a:srgbClr val="4758AB"/>
-                </a:solidFill>
-                <a:latin typeface="Consolas"/>
-              </a:rPr>
-              <a:t>date</a:t>
-            </a:r>
-            <a:r>
-              <a:rPr>
-                <a:solidFill>
-                  <a:srgbClr val="003B4F"/>
-                </a:solidFill>
-                <a:latin typeface="Consolas"/>
-              </a:rPr>
-              <a:t>:</a:t>
-            </a:r>
-            <a:r>
-              <a:rPr>
-                <a:solidFill>
-                  <a:srgbClr val="657422"/>
-                </a:solidFill>
-                <a:latin typeface="Consolas"/>
-              </a:rPr>
-              <a:t> 2022-07-14</a:t>
-            </a:r>
-            <a:br/>
-            <a:r>
-              <a:rPr>
-                <a:solidFill>
-                  <a:srgbClr val="AD0000"/>
-                </a:solidFill>
-                <a:latin typeface="Consolas"/>
-              </a:rPr>
-              <a:t>---</a:t>
-            </a:r>
-          </a:p>
-          <a:p>
-            <a:pPr lvl="0" indent="0" marL="0">
-              <a:buNone/>
-            </a:pPr>
-          </a:p>
-          <a:p>
-            <a:pPr lvl="0" indent="0" marL="0">
-              <a:buNone/>
-            </a:pPr>
-            <a:r>
-              <a:rPr/>
-              <a:t>Adding or changing the format to </a:t>
-            </a:r>
-            <a:r>
-              <a:rPr>
-                <a:latin typeface="Consolas"/>
-              </a:rPr>
-              <a:t>html</a:t>
-            </a:r>
-            <a:r>
-              <a:rPr/>
-              <a:t> will create a </a:t>
-            </a:r>
-            <a:r>
-              <a:rPr>
-                <a:hlinkClick r:id="rId2"/>
-              </a:rPr>
-              <a:t>website</a:t>
-            </a:r>
-            <a:r>
-              <a:rPr/>
-              <a:t>.</a:t>
-            </a:r>
-          </a:p>
-        </p:txBody>
-      </p:sp>
-    </p:spTree>
-  </p:cSld>
-</p:sld>
-</file>
-
-<file path=ppt/slides/slide31.xml><?xml version="1.0" encoding="utf-8"?>
 <p:sld xmlns:a="http://schemas.openxmlformats.org/drawingml/2006/main" xmlns:r="http://schemas.openxmlformats.org/officeDocument/2006/relationships" xmlns:p="http://schemas.openxmlformats.org/presentationml/2006/main">
   <p:cSld>
     <p:spTree>
@@ -9834,7 +8991,7 @@
 </p:sld>
 </file>
 
-<file path=ppt/slides/slide32.xml><?xml version="1.0" encoding="utf-8"?>
+<file path=ppt/slides/slide26.xml><?xml version="1.0" encoding="utf-8"?>
 <p:sld xmlns:a="http://schemas.openxmlformats.org/drawingml/2006/main" xmlns:r="http://schemas.openxmlformats.org/officeDocument/2006/relationships" xmlns:p="http://schemas.openxmlformats.org/presentationml/2006/main">
   <p:cSld>
     <p:spTree>
@@ -9886,7 +9043,7 @@
 </p:sld>
 </file>
 
-<file path=ppt/slides/slide33.xml><?xml version="1.0" encoding="utf-8"?>
+<file path=ppt/slides/slide27.xml><?xml version="1.0" encoding="utf-8"?>
 <p:sld xmlns:a="http://schemas.openxmlformats.org/drawingml/2006/main" xmlns:r="http://schemas.openxmlformats.org/officeDocument/2006/relationships" xmlns:p="http://schemas.openxmlformats.org/presentationml/2006/main">
   <p:cSld>
     <p:spTree>
@@ -9998,7 +9155,7 @@
 </p:sld>
 </file>
 
-<file path=ppt/slides/slide34.xml><?xml version="1.0" encoding="utf-8"?>
+<file path=ppt/slides/slide28.xml><?xml version="1.0" encoding="utf-8"?>
 <p:sld xmlns:a="http://schemas.openxmlformats.org/drawingml/2006/main" xmlns:r="http://schemas.openxmlformats.org/officeDocument/2006/relationships" xmlns:p="http://schemas.openxmlformats.org/presentationml/2006/main">
   <p:cSld>
     <p:spTree>
@@ -10165,7 +9322,7 @@
 </p:sld>
 </file>
 
-<file path=ppt/slides/slide35.xml><?xml version="1.0" encoding="utf-8"?>
+<file path=ppt/slides/slide29.xml><?xml version="1.0" encoding="utf-8"?>
 <p:sld xmlns:a="http://schemas.openxmlformats.org/drawingml/2006/main" xmlns:r="http://schemas.openxmlformats.org/officeDocument/2006/relationships" xmlns:p="http://schemas.openxmlformats.org/presentationml/2006/main">
   <p:cSld>
     <p:spTree>
@@ -10362,7 +9519,7 @@
 </p:sld>
 </file>
 
-<file path=ppt/slides/slide36.xml><?xml version="1.0" encoding="utf-8"?>
+<file path=ppt/slides/slide3.xml><?xml version="1.0" encoding="utf-8"?>
 <p:sld xmlns:a="http://schemas.openxmlformats.org/drawingml/2006/main" xmlns:r="http://schemas.openxmlformats.org/officeDocument/2006/relationships" xmlns:p="http://schemas.openxmlformats.org/presentationml/2006/main">
   <p:cSld>
     <p:spTree>
@@ -10389,22 +9546,174 @@
             <p:ph type="title"/>
           </p:nvPr>
         </p:nvSpPr>
+        <p:spPr/>
+        <p:txBody>
+          <a:bodyPr/>
+          <a:lstStyle/>
+          <a:p>
+            <a:pPr lvl="0" indent="0" marL="0">
+              <a:buNone/>
+            </a:pPr>
+            <a:r>
+              <a:rPr/>
+              <a:t>The content value chain</a:t>
+            </a:r>
+          </a:p>
+        </p:txBody>
+      </p:sp>
+      <p:sp>
+        <p:nvSpPr>
+          <p:cNvPr id="3" name="Content Placeholder 2"/>
+          <p:cNvSpPr>
+            <a:spLocks noGrp="1"/>
+          </p:cNvSpPr>
+          <p:nvPr>
+            <p:ph idx="1" sz="half"/>
+          </p:nvPr>
+        </p:nvSpPr>
+        <p:spPr/>
+        <p:txBody>
+          <a:bodyPr/>
+          <a:lstStyle/>
+          <a:p>
+            <a:pPr lvl="0" indent="0" marL="0">
+              <a:buNone/>
+            </a:pPr>
+            <a:r>
+              <a:rPr/>
+              <a:t>Content stuck in my computer is nearly worthless.</a:t>
+            </a:r>
+          </a:p>
+          <a:p>
+            <a:pPr lvl="0" indent="0" marL="0">
+              <a:spcBef>
+                <a:spcPts val="3000"/>
+              </a:spcBef>
+              <a:buNone/>
+            </a:pPr>
+            <a:r>
+              <a:rPr b="1"/>
+              <a:t>Goal</a:t>
+            </a:r>
+          </a:p>
+          <a:p>
+            <a:pPr lvl="0"/>
+            <a:r>
+              <a:rPr/>
+              <a:t>Move good content out of my computer </a:t>
+            </a:r>
+            <a:r>
+              <a:rPr b="1"/>
+              <a:t>as fast as possible</a:t>
+            </a:r>
+          </a:p>
+          <a:p>
+            <a:pPr lvl="0"/>
+            <a:r>
+              <a:rPr/>
+              <a:t>Reproducible</a:t>
+            </a:r>
+          </a:p>
+          <a:p>
+            <a:pPr lvl="0"/>
+            <a:r>
+              <a:rPr/>
+              <a:t>Git-based collaboration</a:t>
+            </a:r>
+          </a:p>
+          <a:p>
+            <a:pPr lvl="0"/>
+            <a:r>
+              <a:rPr/>
+              <a:t>Write once, generate:</a:t>
+            </a:r>
+          </a:p>
+          <a:p>
+            <a:pPr lvl="1"/>
+            <a:r>
+              <a:rPr/>
+              <a:t>Code</a:t>
+            </a:r>
+          </a:p>
+          <a:p>
+            <a:pPr lvl="1"/>
+            <a:r>
+              <a:rPr/>
+              <a:t>Paper</a:t>
+            </a:r>
+          </a:p>
+          <a:p>
+            <a:pPr lvl="1"/>
+            <a:r>
+              <a:rPr/>
+              <a:t>PowerPoint</a:t>
+            </a:r>
+          </a:p>
+          <a:p>
+            <a:pPr lvl="1"/>
+            <a:r>
+              <a:rPr/>
+              <a:t>Site/documentation</a:t>
+            </a:r>
+          </a:p>
+        </p:txBody>
+      </p:sp>
+      <p:pic>
+        <p:nvPicPr>
+          <p:cNvPr descr="fig:  images/content-value-chain.jpg" id="0" name="Picture 1"/>
+          <p:cNvPicPr>
+            <a:picLocks noGrp="1" noChangeAspect="1"/>
+          </p:cNvPicPr>
+          <p:nvPr/>
+        </p:nvPicPr>
+        <p:blipFill>
+          <a:blip r:embed="rId2"/>
+          <a:stretch>
+            <a:fillRect/>
+          </a:stretch>
+        </p:blipFill>
+        <p:spPr bwMode="auto">
+          <a:xfrm>
+            <a:off x="4749800" y="1193800"/>
+            <a:ext cx="3835400" cy="2882900"/>
+          </a:xfrm>
+          <a:prstGeom prst="rect">
+            <a:avLst/>
+          </a:prstGeom>
+          <a:noFill/>
+          <a:ln w="9525">
+            <a:noFill/>
+            <a:headEnd/>
+            <a:tailEnd/>
+          </a:ln>
+        </p:spPr>
+      </p:pic>
+      <p:sp>
+        <p:nvSpPr>
+          <p:cNvPr id="1" name="TextBox 3"/>
+          <p:cNvSpPr txBox="1"/>
+          <p:nvPr/>
+        </p:nvSpPr>
         <p:spPr>
           <a:xfrm>
-            <a:off x="722313" y="3305176"/>
-            <a:ext cx="7772400" cy="1021556"/>
+            <a:off x="4648200" y="4076700"/>
+            <a:ext cx="4038600" cy="508000"/>
           </a:xfrm>
+          <a:prstGeom prst="rect">
+            <a:avLst/>
+          </a:prstGeom>
+          <a:noFill/>
         </p:spPr>
         <p:txBody>
           <a:bodyPr/>
           <a:lstStyle/>
           <a:p>
-            <a:pPr lvl="0" indent="0" marL="0">
+            <a:pPr lvl="0" indent="0" marL="0" algn="ctr">
               <a:buNone/>
             </a:pPr>
             <a:r>
               <a:rPr/>
-              <a:t>Books in Quarto</a:t>
+              <a:t>The content value chain by (@drrob) captured by Amelia McNamara</a:t>
             </a:r>
           </a:p>
         </p:txBody>
@@ -10414,7 +9723,7 @@
 </p:sld>
 </file>
 
-<file path=ppt/slides/slide37.xml><?xml version="1.0" encoding="utf-8"?>
+<file path=ppt/slides/slide30.xml><?xml version="1.0" encoding="utf-8"?>
 <p:sld xmlns:a="http://schemas.openxmlformats.org/drawingml/2006/main" xmlns:r="http://schemas.openxmlformats.org/officeDocument/2006/relationships" xmlns:p="http://schemas.openxmlformats.org/presentationml/2006/main">
   <p:cSld>
     <p:spTree>
@@ -10441,7 +9750,12 @@
             <p:ph type="title"/>
           </p:nvPr>
         </p:nvSpPr>
-        <p:spPr/>
+        <p:spPr>
+          <a:xfrm>
+            <a:off x="722313" y="3305176"/>
+            <a:ext cx="7772400" cy="1021556"/>
+          </a:xfrm>
+        </p:spPr>
         <p:txBody>
           <a:bodyPr/>
           <a:lstStyle/>
@@ -10452,109 +9766,6 @@
             <a:r>
               <a:rPr/>
               <a:t>Books in Quarto</a:t>
-            </a:r>
-          </a:p>
-        </p:txBody>
-      </p:sp>
-      <p:sp>
-        <p:nvSpPr>
-          <p:cNvPr id="3" name="Content Placeholder 2"/>
-          <p:cNvSpPr>
-            <a:spLocks noGrp="1"/>
-          </p:cNvSpPr>
-          <p:nvPr>
-            <p:ph idx="1"/>
-          </p:nvPr>
-        </p:nvSpPr>
-        <p:spPr/>
-        <p:txBody>
-          <a:bodyPr/>
-          <a:lstStyle/>
-          <a:p>
-            <a:pPr lvl="0" indent="0" marL="0">
-              <a:buNone/>
-            </a:pPr>
-            <a:r>
-              <a:rPr/>
-              <a:t>You can also write books with quarto. From the same collection of </a:t>
-            </a:r>
-            <a:r>
-              <a:rPr>
-                <a:latin typeface="Consolas"/>
-              </a:rPr>
-              <a:t>.qmd</a:t>
-            </a:r>
-            <a:r>
-              <a:rPr/>
-              <a:t> files, Quarto can generate:</a:t>
-            </a:r>
-          </a:p>
-          <a:p>
-            <a:pPr lvl="0"/>
-            <a:r>
-              <a:rPr/>
-              <a:t>ePub</a:t>
-            </a:r>
-          </a:p>
-          <a:p>
-            <a:pPr lvl="0"/>
-            <a:r>
-              <a:rPr/>
-              <a:t>PDF</a:t>
-            </a:r>
-          </a:p>
-          <a:p>
-            <a:pPr lvl="0"/>
-            <a:r>
-              <a:rPr/>
-              <a:t>Online book</a:t>
-            </a:r>
-          </a:p>
-          <a:p>
-            <a:pPr lvl="0" indent="0" marL="0">
-              <a:buNone/>
-            </a:pPr>
-            <a:r>
-              <a:rPr/>
-              <a:t>Two recent examples are:</a:t>
-            </a:r>
-          </a:p>
-          <a:p>
-            <a:pPr lvl="0"/>
-            <a:r>
-              <a:rPr>
-                <a:hlinkClick r:id="rId2"/>
-              </a:rPr>
-              <a:t>Hands-on Programming in R</a:t>
-            </a:r>
-            <a:r>
-              <a:rPr/>
-              <a:t>, by Garrett Grolemund </a:t>
-            </a:r>
-            <a:r>
-              <a:rPr>
-                <a:hlinkClick r:id="rId3"/>
-              </a:rPr>
-              <a:t>(source)</a:t>
-            </a:r>
-          </a:p>
-          <a:p>
-            <a:pPr lvl="0"/>
-            <a:r>
-              <a:rPr>
-                <a:hlinkClick r:id="rId4"/>
-              </a:rPr>
-              <a:t>Python for Data Analysis, 3E</a:t>
-            </a:r>
-            <a:r>
-              <a:rPr/>
-              <a:t>, by Wes McKinney </a:t>
-            </a:r>
-            <a:r>
-              <a:rPr>
-                <a:hlinkClick r:id="rId5"/>
-              </a:rPr>
-              <a:t>(source)</a:t>
             </a:r>
           </a:p>
         </p:txBody>
@@ -10564,7 +9775,157 @@
 </p:sld>
 </file>
 
-<file path=ppt/slides/slide38.xml><?xml version="1.0" encoding="utf-8"?>
+<file path=ppt/slides/slide31.xml><?xml version="1.0" encoding="utf-8"?>
+<p:sld xmlns:a="http://schemas.openxmlformats.org/drawingml/2006/main" xmlns:r="http://schemas.openxmlformats.org/officeDocument/2006/relationships" xmlns:p="http://schemas.openxmlformats.org/presentationml/2006/main">
+  <p:cSld>
+    <p:spTree>
+      <p:nvGrpSpPr>
+        <p:cNvPr id="1" name=""/>
+        <p:cNvGrpSpPr/>
+        <p:nvPr/>
+      </p:nvGrpSpPr>
+      <p:grpSpPr>
+        <a:xfrm>
+          <a:off x="0" y="0"/>
+          <a:ext cx="0" cy="0"/>
+          <a:chOff x="0" y="0"/>
+          <a:chExt cx="0" cy="0"/>
+        </a:xfrm>
+      </p:grpSpPr>
+      <p:sp>
+        <p:nvSpPr>
+          <p:cNvPr id="2" name="Title 1"/>
+          <p:cNvSpPr>
+            <a:spLocks noGrp="1"/>
+          </p:cNvSpPr>
+          <p:nvPr>
+            <p:ph type="title"/>
+          </p:nvPr>
+        </p:nvSpPr>
+        <p:spPr/>
+        <p:txBody>
+          <a:bodyPr/>
+          <a:lstStyle/>
+          <a:p>
+            <a:pPr lvl="0" indent="0" marL="0">
+              <a:buNone/>
+            </a:pPr>
+            <a:r>
+              <a:rPr/>
+              <a:t>Books in Quarto</a:t>
+            </a:r>
+          </a:p>
+        </p:txBody>
+      </p:sp>
+      <p:sp>
+        <p:nvSpPr>
+          <p:cNvPr id="3" name="Content Placeholder 2"/>
+          <p:cNvSpPr>
+            <a:spLocks noGrp="1"/>
+          </p:cNvSpPr>
+          <p:nvPr>
+            <p:ph idx="1"/>
+          </p:nvPr>
+        </p:nvSpPr>
+        <p:spPr/>
+        <p:txBody>
+          <a:bodyPr/>
+          <a:lstStyle/>
+          <a:p>
+            <a:pPr lvl="0" indent="0" marL="0">
+              <a:buNone/>
+            </a:pPr>
+            <a:r>
+              <a:rPr/>
+              <a:t>You can also write books with quarto. From the same collection of </a:t>
+            </a:r>
+            <a:r>
+              <a:rPr>
+                <a:latin typeface="Consolas"/>
+              </a:rPr>
+              <a:t>.qmd</a:t>
+            </a:r>
+            <a:r>
+              <a:rPr/>
+              <a:t> files, Quarto can generate:</a:t>
+            </a:r>
+          </a:p>
+          <a:p>
+            <a:pPr lvl="0"/>
+            <a:r>
+              <a:rPr/>
+              <a:t>ePub</a:t>
+            </a:r>
+          </a:p>
+          <a:p>
+            <a:pPr lvl="0"/>
+            <a:r>
+              <a:rPr/>
+              <a:t>PDF</a:t>
+            </a:r>
+          </a:p>
+          <a:p>
+            <a:pPr lvl="0"/>
+            <a:r>
+              <a:rPr/>
+              <a:t>Online book</a:t>
+            </a:r>
+          </a:p>
+          <a:p>
+            <a:pPr lvl="0" indent="0" marL="0">
+              <a:buNone/>
+            </a:pPr>
+            <a:r>
+              <a:rPr/>
+              <a:t>Two recent examples are:</a:t>
+            </a:r>
+          </a:p>
+          <a:p>
+            <a:pPr lvl="0"/>
+            <a:r>
+              <a:rPr>
+                <a:hlinkClick r:id="rId2"/>
+              </a:rPr>
+              <a:t>Hands-on Programming in R</a:t>
+            </a:r>
+            <a:r>
+              <a:rPr/>
+              <a:t>, by Garrett Grolemund </a:t>
+            </a:r>
+            <a:r>
+              <a:rPr>
+                <a:hlinkClick r:id="rId3"/>
+              </a:rPr>
+              <a:t>(source)</a:t>
+            </a:r>
+          </a:p>
+          <a:p>
+            <a:pPr lvl="0"/>
+            <a:r>
+              <a:rPr>
+                <a:hlinkClick r:id="rId4"/>
+              </a:rPr>
+              <a:t>Python for Data Analysis, 3E</a:t>
+            </a:r>
+            <a:r>
+              <a:rPr/>
+              <a:t>, by Wes McKinney </a:t>
+            </a:r>
+            <a:r>
+              <a:rPr>
+                <a:hlinkClick r:id="rId5"/>
+              </a:rPr>
+              <a:t>(source)</a:t>
+            </a:r>
+          </a:p>
+        </p:txBody>
+      </p:sp>
+    </p:spTree>
+  </p:cSld>
+</p:sld>
+</file>
+
+<file path=ppt/slides/slide32.xml><?xml version="1.0" encoding="utf-8"?>
 <p:sld xmlns:a="http://schemas.openxmlformats.org/drawingml/2006/main" xmlns:r="http://schemas.openxmlformats.org/officeDocument/2006/relationships" xmlns:p="http://schemas.openxmlformats.org/presentationml/2006/main">
   <p:cSld>
     <p:spTree>
@@ -10697,7 +10058,7 @@
 </p:sld>
 </file>
 
-<file path=ppt/slides/slide39.xml><?xml version="1.0" encoding="utf-8"?>
+<file path=ppt/slides/slide33.xml><?xml version="1.0" encoding="utf-8"?>
 <p:sld xmlns:a="http://schemas.openxmlformats.org/drawingml/2006/main" xmlns:r="http://schemas.openxmlformats.org/officeDocument/2006/relationships" xmlns:p="http://schemas.openxmlformats.org/presentationml/2006/main">
   <p:cSld>
     <p:spTree>
@@ -10830,6 +10191,571 @@
 </p:sld>
 </file>
 
+<file path=ppt/slides/slide34.xml><?xml version="1.0" encoding="utf-8"?>
+<p:sld xmlns:a="http://schemas.openxmlformats.org/drawingml/2006/main" xmlns:r="http://schemas.openxmlformats.org/officeDocument/2006/relationships" xmlns:p="http://schemas.openxmlformats.org/presentationml/2006/main">
+  <p:cSld>
+    <p:spTree>
+      <p:nvGrpSpPr>
+        <p:cNvPr id="1" name=""/>
+        <p:cNvGrpSpPr/>
+        <p:nvPr/>
+      </p:nvGrpSpPr>
+      <p:grpSpPr>
+        <a:xfrm>
+          <a:off x="0" y="0"/>
+          <a:ext cx="0" cy="0"/>
+          <a:chOff x="0" y="0"/>
+          <a:chExt cx="0" cy="0"/>
+        </a:xfrm>
+      </p:grpSpPr>
+      <p:sp>
+        <p:nvSpPr>
+          <p:cNvPr id="2" name="Title 1"/>
+          <p:cNvSpPr>
+            <a:spLocks noGrp="1"/>
+          </p:cNvSpPr>
+          <p:nvPr>
+            <p:ph type="title"/>
+          </p:nvPr>
+        </p:nvSpPr>
+        <p:spPr>
+          <a:xfrm>
+            <a:off x="722313" y="3305176"/>
+            <a:ext cx="7772400" cy="1021556"/>
+          </a:xfrm>
+        </p:spPr>
+        <p:txBody>
+          <a:bodyPr/>
+          <a:lstStyle/>
+          <a:p>
+            <a:pPr lvl="0" indent="0" marL="0">
+              <a:buNone/>
+            </a:pPr>
+            <a:r>
+              <a:rPr/>
+              <a:t>Should I use Quarto?</a:t>
+            </a:r>
+          </a:p>
+        </p:txBody>
+      </p:sp>
+    </p:spTree>
+  </p:cSld>
+</p:sld>
+</file>
+
+<file path=ppt/slides/slide35.xml><?xml version="1.0" encoding="utf-8"?>
+<p:sld xmlns:a="http://schemas.openxmlformats.org/drawingml/2006/main" xmlns:r="http://schemas.openxmlformats.org/officeDocument/2006/relationships" xmlns:p="http://schemas.openxmlformats.org/presentationml/2006/main">
+  <p:cSld>
+    <p:spTree>
+      <p:nvGrpSpPr>
+        <p:cNvPr id="1" name=""/>
+        <p:cNvGrpSpPr/>
+        <p:nvPr/>
+      </p:nvGrpSpPr>
+      <p:grpSpPr>
+        <a:xfrm>
+          <a:off x="0" y="0"/>
+          <a:ext cx="0" cy="0"/>
+          <a:chOff x="0" y="0"/>
+          <a:chExt cx="0" cy="0"/>
+        </a:xfrm>
+      </p:grpSpPr>
+      <p:sp>
+        <p:nvSpPr>
+          <p:cNvPr id="2" name="Title 1"/>
+          <p:cNvSpPr>
+            <a:spLocks noGrp="1"/>
+          </p:cNvSpPr>
+          <p:nvPr>
+            <p:ph type="title"/>
+          </p:nvPr>
+        </p:nvSpPr>
+        <p:spPr/>
+        <p:txBody>
+          <a:bodyPr/>
+          <a:lstStyle/>
+          <a:p>
+            <a:pPr lvl="0" indent="0" marL="0">
+              <a:buNone/>
+            </a:pPr>
+            <a:r>
+              <a:rPr/>
+              <a:t>Where I think Quarto is good (July 2022)</a:t>
+            </a:r>
+          </a:p>
+        </p:txBody>
+      </p:sp>
+      <p:sp>
+        <p:nvSpPr>
+          <p:cNvPr id="3" name="Content Placeholder 2"/>
+          <p:cNvSpPr>
+            <a:spLocks noGrp="1"/>
+          </p:cNvSpPr>
+          <p:nvPr>
+            <p:ph idx="1" sz="half"/>
+          </p:nvPr>
+        </p:nvSpPr>
+        <p:spPr/>
+        <p:txBody>
+          <a:bodyPr/>
+          <a:lstStyle/>
+          <a:p>
+            <a:pPr lvl="0" indent="0" marL="0">
+              <a:spcBef>
+                <a:spcPts val="3000"/>
+              </a:spcBef>
+              <a:buNone/>
+            </a:pPr>
+            <a:r>
+              <a:rPr b="1"/>
+              <a:t>Articles: maybe</a:t>
+            </a:r>
+          </a:p>
+          <a:p>
+            <a:pPr lvl="0" indent="0" marL="0">
+              <a:buNone/>
+            </a:pPr>
+            <a:r>
+              <a:rPr/>
+              <a:t>I think Quarto is more helpful for a team that already uses Git </a:t>
+            </a:r>
+            <a:r>
+              <a:rPr b="1"/>
+              <a:t>with</a:t>
+            </a:r>
+            <a:r>
+              <a:rPr/>
+              <a:t> Python notebooks or LaTeX to write articles.</a:t>
+            </a:r>
+          </a:p>
+          <a:p>
+            <a:pPr lvl="0" indent="0" marL="0">
+              <a:buNone/>
+            </a:pPr>
+            <a:r>
+              <a:rPr/>
+              <a:t>Microsoft Word collaboration through SharePoint and Teams is easier than Git and Quarto… but it’s not reproducible.</a:t>
+            </a:r>
+          </a:p>
+          <a:p>
+            <a:pPr lvl="0" indent="0" marL="0">
+              <a:spcBef>
+                <a:spcPts val="3000"/>
+              </a:spcBef>
+              <a:buNone/>
+            </a:pPr>
+            <a:r>
+              <a:rPr b="1"/>
+              <a:t>Python notebook: excellent</a:t>
+            </a:r>
+          </a:p>
+          <a:p>
+            <a:pPr lvl="0" indent="0" marL="0">
+              <a:buNone/>
+            </a:pPr>
+            <a:r>
+              <a:rPr/>
+              <a:t>Quarto adds features to Python notebooks without detracting anything. You just need a few YAML lines.</a:t>
+            </a:r>
+          </a:p>
+        </p:txBody>
+      </p:sp>
+      <p:sp>
+        <p:nvSpPr>
+          <p:cNvPr id="4" name="Content Placeholder 3"/>
+          <p:cNvSpPr>
+            <a:spLocks noGrp="1"/>
+          </p:cNvSpPr>
+          <p:nvPr>
+            <p:ph idx="2" sz="half"/>
+          </p:nvPr>
+        </p:nvSpPr>
+        <p:spPr/>
+        <p:txBody>
+          <a:bodyPr/>
+          <a:lstStyle/>
+          <a:p>
+            <a:pPr lvl="0" indent="0" marL="0">
+              <a:spcBef>
+                <a:spcPts val="3000"/>
+              </a:spcBef>
+              <a:buNone/>
+            </a:pPr>
+            <a:r>
+              <a:rPr b="1"/>
+              <a:t>Blog: excellent</a:t>
+            </a:r>
+          </a:p>
+          <a:p>
+            <a:pPr lvl="0" indent="0" marL="0">
+              <a:buNone/>
+            </a:pPr>
+            <a:r>
+              <a:rPr/>
+              <a:t>Quarto allowed me to have a scriptable, Python-based </a:t>
+            </a:r>
+            <a:r>
+              <a:rPr>
+                <a:hlinkClick r:id="rId2"/>
+              </a:rPr>
+              <a:t>blog</a:t>
+            </a:r>
+            <a:r>
+              <a:rPr/>
+              <a:t>. I wrote code to post new articles to Twitter and LinkedIn.</a:t>
+            </a:r>
+          </a:p>
+          <a:p>
+            <a:pPr lvl="0" indent="0" marL="0">
+              <a:spcBef>
+                <a:spcPts val="3000"/>
+              </a:spcBef>
+              <a:buNone/>
+            </a:pPr>
+            <a:r>
+              <a:rPr b="1"/>
+              <a:t>Presentations: maybe</a:t>
+            </a:r>
+          </a:p>
+          <a:p>
+            <a:pPr lvl="0" indent="0" marL="0">
+              <a:buNone/>
+            </a:pPr>
+            <a:r>
+              <a:rPr/>
+              <a:t>Great for RevealJS. For PPT, render process =&gt; long edit cycle. Useful for:</a:t>
+            </a:r>
+          </a:p>
+          <a:p>
+            <a:pPr lvl="0"/>
+            <a:r>
+              <a:rPr i="1"/>
+              <a:t>a lot</a:t>
+            </a:r>
+            <a:r>
+              <a:rPr/>
+              <a:t> of dynamic content</a:t>
+            </a:r>
+          </a:p>
+          <a:p>
+            <a:pPr lvl="0"/>
+            <a:r>
+              <a:rPr/>
+              <a:t>Reproducibility needs</a:t>
+            </a:r>
+          </a:p>
+          <a:p>
+            <a:pPr lvl="0"/>
+            <a:r>
+              <a:rPr/>
+              <a:t>Collaborators used to Git/Beamer</a:t>
+            </a:r>
+          </a:p>
+        </p:txBody>
+      </p:sp>
+    </p:spTree>
+  </p:cSld>
+</p:sld>
+</file>
+
+<file path=ppt/slides/slide36.xml><?xml version="1.0" encoding="utf-8"?>
+<p:sld xmlns:a="http://schemas.openxmlformats.org/drawingml/2006/main" xmlns:r="http://schemas.openxmlformats.org/officeDocument/2006/relationships" xmlns:p="http://schemas.openxmlformats.org/presentationml/2006/main">
+  <p:cSld>
+    <p:spTree>
+      <p:nvGrpSpPr>
+        <p:cNvPr id="1" name=""/>
+        <p:cNvGrpSpPr/>
+        <p:nvPr/>
+      </p:nvGrpSpPr>
+      <p:grpSpPr>
+        <a:xfrm>
+          <a:off x="0" y="0"/>
+          <a:ext cx="0" cy="0"/>
+          <a:chOff x="0" y="0"/>
+          <a:chExt cx="0" cy="0"/>
+        </a:xfrm>
+      </p:grpSpPr>
+      <p:sp>
+        <p:nvSpPr>
+          <p:cNvPr id="2" name="Title 1"/>
+          <p:cNvSpPr>
+            <a:spLocks noGrp="1"/>
+          </p:cNvSpPr>
+          <p:nvPr>
+            <p:ph type="title"/>
+          </p:nvPr>
+        </p:nvSpPr>
+        <p:spPr>
+          <a:xfrm>
+            <a:off x="722313" y="3305176"/>
+            <a:ext cx="7772400" cy="1021556"/>
+          </a:xfrm>
+        </p:spPr>
+        <p:txBody>
+          <a:bodyPr/>
+          <a:lstStyle/>
+          <a:p>
+            <a:pPr lvl="0" indent="0" marL="0">
+              <a:buNone/>
+            </a:pPr>
+            <a:r>
+              <a:rPr/>
+              <a:t>Next steps</a:t>
+            </a:r>
+          </a:p>
+        </p:txBody>
+      </p:sp>
+    </p:spTree>
+  </p:cSld>
+</p:sld>
+</file>
+
+<file path=ppt/slides/slide37.xml><?xml version="1.0" encoding="utf-8"?>
+<p:sld xmlns:a="http://schemas.openxmlformats.org/drawingml/2006/main" xmlns:r="http://schemas.openxmlformats.org/officeDocument/2006/relationships" xmlns:p="http://schemas.openxmlformats.org/presentationml/2006/main">
+  <p:cSld>
+    <p:spTree>
+      <p:nvGrpSpPr>
+        <p:cNvPr id="1" name=""/>
+        <p:cNvGrpSpPr/>
+        <p:nvPr/>
+      </p:nvGrpSpPr>
+      <p:grpSpPr>
+        <a:xfrm>
+          <a:off x="0" y="0"/>
+          <a:ext cx="0" cy="0"/>
+          <a:chOff x="0" y="0"/>
+          <a:chExt cx="0" cy="0"/>
+        </a:xfrm>
+      </p:grpSpPr>
+      <p:sp>
+        <p:nvSpPr>
+          <p:cNvPr id="2" name="Title 1"/>
+          <p:cNvSpPr>
+            <a:spLocks noGrp="1"/>
+          </p:cNvSpPr>
+          <p:nvPr>
+            <p:ph type="title"/>
+          </p:nvPr>
+        </p:nvSpPr>
+        <p:spPr/>
+        <p:txBody>
+          <a:bodyPr/>
+          <a:lstStyle/>
+          <a:p>
+            <a:pPr lvl="0" indent="0" marL="0">
+              <a:buNone/>
+            </a:pPr>
+            <a:r>
+              <a:rPr/>
+              <a:t>Next Steps</a:t>
+            </a:r>
+          </a:p>
+        </p:txBody>
+      </p:sp>
+      <p:sp>
+        <p:nvSpPr>
+          <p:cNvPr id="3" name="Content Placeholder 2"/>
+          <p:cNvSpPr>
+            <a:spLocks noGrp="1"/>
+          </p:cNvSpPr>
+          <p:nvPr>
+            <p:ph idx="1"/>
+          </p:nvPr>
+        </p:nvSpPr>
+        <p:spPr/>
+        <p:txBody>
+          <a:bodyPr/>
+          <a:lstStyle/>
+          <a:p>
+            <a:pPr lvl="0"/>
+            <a:r>
+              <a:rPr/>
+              <a:t>The Quarto website has great tutorials:</a:t>
+            </a:r>
+          </a:p>
+          <a:p>
+            <a:pPr lvl="1"/>
+            <a:r>
+              <a:rPr>
+                <a:hlinkClick r:id="rId2"/>
+              </a:rPr>
+              <a:t>Jupyter</a:t>
+            </a:r>
+          </a:p>
+          <a:p>
+            <a:pPr lvl="1"/>
+            <a:r>
+              <a:rPr>
+                <a:hlinkClick r:id="rId3"/>
+              </a:rPr>
+              <a:t>VSCode</a:t>
+            </a:r>
+          </a:p>
+          <a:p>
+            <a:pPr lvl="0"/>
+            <a:r>
+              <a:rPr/>
+              <a:t>If you have multiple input files (e.g., </a:t>
+            </a:r>
+            <a:r>
+              <a:rPr>
+                <a:hlinkClick r:id="rId4"/>
+              </a:rPr>
+              <a:t>blog</a:t>
+            </a:r>
+            <a:r>
+              <a:rPr/>
+              <a:t> or book), you can create a </a:t>
+            </a:r>
+            <a:r>
+              <a:rPr>
+                <a:hlinkClick r:id="rId5"/>
+              </a:rPr>
+              <a:t>project</a:t>
+            </a:r>
+            <a:r>
+              <a:rPr/>
+              <a:t>. This allows rendering multiple files that link to each other.</a:t>
+            </a:r>
+          </a:p>
+          <a:p>
+            <a:pPr lvl="0"/>
+            <a:r>
+              <a:rPr/>
+              <a:t>Projects can have pre- and post-render steps in Python, R, Lua and shell script</a:t>
+            </a:r>
+          </a:p>
+        </p:txBody>
+      </p:sp>
+    </p:spTree>
+  </p:cSld>
+</p:sld>
+</file>
+
+<file path=ppt/slides/slide38.xml><?xml version="1.0" encoding="utf-8"?>
+<p:sld xmlns:a="http://schemas.openxmlformats.org/drawingml/2006/main" xmlns:r="http://schemas.openxmlformats.org/officeDocument/2006/relationships" xmlns:p="http://schemas.openxmlformats.org/presentationml/2006/main">
+  <p:cSld>
+    <p:spTree>
+      <p:nvGrpSpPr>
+        <p:cNvPr id="1" name=""/>
+        <p:cNvGrpSpPr/>
+        <p:nvPr/>
+      </p:nvGrpSpPr>
+      <p:grpSpPr>
+        <a:xfrm>
+          <a:off x="0" y="0"/>
+          <a:ext cx="0" cy="0"/>
+          <a:chOff x="0" y="0"/>
+          <a:chExt cx="0" cy="0"/>
+        </a:xfrm>
+      </p:grpSpPr>
+      <p:sp>
+        <p:nvSpPr>
+          <p:cNvPr id="2" name="Title 1"/>
+          <p:cNvSpPr>
+            <a:spLocks noGrp="1"/>
+          </p:cNvSpPr>
+          <p:nvPr>
+            <p:ph type="title"/>
+          </p:nvPr>
+        </p:nvSpPr>
+        <p:spPr>
+          <a:xfrm>
+            <a:off x="722313" y="3305176"/>
+            <a:ext cx="7772400" cy="1021556"/>
+          </a:xfrm>
+        </p:spPr>
+        <p:txBody>
+          <a:bodyPr/>
+          <a:lstStyle/>
+          <a:p>
+            <a:pPr lvl="0" indent="0" marL="0">
+              <a:buNone/>
+            </a:pPr>
+            <a:r>
+              <a:rPr/>
+              <a:t>THANK YOU</a:t>
+            </a:r>
+          </a:p>
+        </p:txBody>
+      </p:sp>
+    </p:spTree>
+  </p:cSld>
+</p:sld>
+</file>
+
+<file path=ppt/slides/slide39.xml><?xml version="1.0" encoding="utf-8"?>
+<p:sld xmlns:a="http://schemas.openxmlformats.org/drawingml/2006/main" xmlns:r="http://schemas.openxmlformats.org/officeDocument/2006/relationships" xmlns:p="http://schemas.openxmlformats.org/presentationml/2006/main">
+  <p:cSld>
+    <p:spTree>
+      <p:nvGrpSpPr>
+        <p:cNvPr id="1" name=""/>
+        <p:cNvGrpSpPr/>
+        <p:nvPr/>
+      </p:nvGrpSpPr>
+      <p:grpSpPr>
+        <a:xfrm>
+          <a:off x="0" y="0"/>
+          <a:ext cx="0" cy="0"/>
+          <a:chOff x="0" y="0"/>
+          <a:chExt cx="0" cy="0"/>
+        </a:xfrm>
+      </p:grpSpPr>
+      <p:sp>
+        <p:nvSpPr>
+          <p:cNvPr id="2" name="Title 1"/>
+          <p:cNvSpPr>
+            <a:spLocks noGrp="1"/>
+          </p:cNvSpPr>
+          <p:nvPr>
+            <p:ph type="title"/>
+          </p:nvPr>
+        </p:nvSpPr>
+        <p:spPr/>
+        <p:txBody>
+          <a:bodyPr/>
+          <a:lstStyle/>
+          <a:p>
+            <a:pPr lvl="0" indent="0" marL="0">
+              <a:buNone/>
+            </a:pPr>
+            <a:r>
+              <a:rPr/>
+              <a:t>Notes</a:t>
+            </a:r>
+          </a:p>
+        </p:txBody>
+      </p:sp>
+      <p:sp>
+        <p:nvSpPr>
+          <p:cNvPr id="3" name="Content Placeholder 2"/>
+          <p:cNvSpPr>
+            <a:spLocks noGrp="1"/>
+          </p:cNvSpPr>
+          <p:nvPr>
+            <p:ph idx="1"/>
+          </p:nvPr>
+        </p:nvSpPr>
+        <p:spPr/>
+        <p:txBody>
+          <a:bodyPr/>
+          <a:lstStyle/>
+          <a:p>
+            <a:pPr lvl="0" indent="0" marL="0">
+              <a:buNone/>
+            </a:pPr>
+            <a:r>
+              <a:rPr sz="1800"/>
+              <a:t>1. You can use footnotes in presentations and websites, too</a:t>
+            </a:r>
+          </a:p>
+        </p:txBody>
+      </p:sp>
+    </p:spTree>
+  </p:cSld>
+</p:sld>
+</file>
+
 <file path=ppt/slides/slide4.xml><?xml version="1.0" encoding="utf-8"?>
 <p:sld xmlns:a="http://schemas.openxmlformats.org/drawingml/2006/main" xmlns:r="http://schemas.openxmlformats.org/officeDocument/2006/relationships" xmlns:p="http://schemas.openxmlformats.org/presentationml/2006/main">
   <p:cSld>
@@ -10981,571 +10907,6 @@
             <a:r>
               <a:rPr/>
               <a:t>Donald Knuth’s Literate Programming</a:t>
-            </a:r>
-          </a:p>
-        </p:txBody>
-      </p:sp>
-    </p:spTree>
-  </p:cSld>
-</p:sld>
-</file>
-
-<file path=ppt/slides/slide40.xml><?xml version="1.0" encoding="utf-8"?>
-<p:sld xmlns:a="http://schemas.openxmlformats.org/drawingml/2006/main" xmlns:r="http://schemas.openxmlformats.org/officeDocument/2006/relationships" xmlns:p="http://schemas.openxmlformats.org/presentationml/2006/main">
-  <p:cSld>
-    <p:spTree>
-      <p:nvGrpSpPr>
-        <p:cNvPr id="1" name=""/>
-        <p:cNvGrpSpPr/>
-        <p:nvPr/>
-      </p:nvGrpSpPr>
-      <p:grpSpPr>
-        <a:xfrm>
-          <a:off x="0" y="0"/>
-          <a:ext cx="0" cy="0"/>
-          <a:chOff x="0" y="0"/>
-          <a:chExt cx="0" cy="0"/>
-        </a:xfrm>
-      </p:grpSpPr>
-      <p:sp>
-        <p:nvSpPr>
-          <p:cNvPr id="2" name="Title 1"/>
-          <p:cNvSpPr>
-            <a:spLocks noGrp="1"/>
-          </p:cNvSpPr>
-          <p:nvPr>
-            <p:ph type="title"/>
-          </p:nvPr>
-        </p:nvSpPr>
-        <p:spPr>
-          <a:xfrm>
-            <a:off x="722313" y="3305176"/>
-            <a:ext cx="7772400" cy="1021556"/>
-          </a:xfrm>
-        </p:spPr>
-        <p:txBody>
-          <a:bodyPr/>
-          <a:lstStyle/>
-          <a:p>
-            <a:pPr lvl="0" indent="0" marL="0">
-              <a:buNone/>
-            </a:pPr>
-            <a:r>
-              <a:rPr/>
-              <a:t>Should I use Quarto?</a:t>
-            </a:r>
-          </a:p>
-        </p:txBody>
-      </p:sp>
-    </p:spTree>
-  </p:cSld>
-</p:sld>
-</file>
-
-<file path=ppt/slides/slide41.xml><?xml version="1.0" encoding="utf-8"?>
-<p:sld xmlns:a="http://schemas.openxmlformats.org/drawingml/2006/main" xmlns:r="http://schemas.openxmlformats.org/officeDocument/2006/relationships" xmlns:p="http://schemas.openxmlformats.org/presentationml/2006/main">
-  <p:cSld>
-    <p:spTree>
-      <p:nvGrpSpPr>
-        <p:cNvPr id="1" name=""/>
-        <p:cNvGrpSpPr/>
-        <p:nvPr/>
-      </p:nvGrpSpPr>
-      <p:grpSpPr>
-        <a:xfrm>
-          <a:off x="0" y="0"/>
-          <a:ext cx="0" cy="0"/>
-          <a:chOff x="0" y="0"/>
-          <a:chExt cx="0" cy="0"/>
-        </a:xfrm>
-      </p:grpSpPr>
-      <p:sp>
-        <p:nvSpPr>
-          <p:cNvPr id="2" name="Title 1"/>
-          <p:cNvSpPr>
-            <a:spLocks noGrp="1"/>
-          </p:cNvSpPr>
-          <p:nvPr>
-            <p:ph type="title"/>
-          </p:nvPr>
-        </p:nvSpPr>
-        <p:spPr/>
-        <p:txBody>
-          <a:bodyPr/>
-          <a:lstStyle/>
-          <a:p>
-            <a:pPr lvl="0" indent="0" marL="0">
-              <a:buNone/>
-            </a:pPr>
-            <a:r>
-              <a:rPr/>
-              <a:t>Where I think Quarto is good (July 2022)</a:t>
-            </a:r>
-          </a:p>
-        </p:txBody>
-      </p:sp>
-      <p:sp>
-        <p:nvSpPr>
-          <p:cNvPr id="3" name="Content Placeholder 2"/>
-          <p:cNvSpPr>
-            <a:spLocks noGrp="1"/>
-          </p:cNvSpPr>
-          <p:nvPr>
-            <p:ph idx="1" sz="half"/>
-          </p:nvPr>
-        </p:nvSpPr>
-        <p:spPr/>
-        <p:txBody>
-          <a:bodyPr/>
-          <a:lstStyle/>
-          <a:p>
-            <a:pPr lvl="0" indent="0" marL="0">
-              <a:spcBef>
-                <a:spcPts val="3000"/>
-              </a:spcBef>
-              <a:buNone/>
-            </a:pPr>
-            <a:r>
-              <a:rPr b="1"/>
-              <a:t>Articles: maybe</a:t>
-            </a:r>
-          </a:p>
-          <a:p>
-            <a:pPr lvl="0" indent="0" marL="0">
-              <a:buNone/>
-            </a:pPr>
-            <a:r>
-              <a:rPr/>
-              <a:t>I think Quarto is more helpful for a team that already uses Git </a:t>
-            </a:r>
-            <a:r>
-              <a:rPr b="1"/>
-              <a:t>with</a:t>
-            </a:r>
-            <a:r>
-              <a:rPr/>
-              <a:t> Python notebooks or LaTeX to write articles.</a:t>
-            </a:r>
-          </a:p>
-          <a:p>
-            <a:pPr lvl="0" indent="0" marL="0">
-              <a:buNone/>
-            </a:pPr>
-            <a:r>
-              <a:rPr/>
-              <a:t>Microsoft Word collaboration through SharePoint and Teams is easier than Git and Quarto… but it’s not reproducible.</a:t>
-            </a:r>
-          </a:p>
-          <a:p>
-            <a:pPr lvl="0" indent="0" marL="0">
-              <a:spcBef>
-                <a:spcPts val="3000"/>
-              </a:spcBef>
-              <a:buNone/>
-            </a:pPr>
-            <a:r>
-              <a:rPr b="1"/>
-              <a:t>Python notebook: excellent</a:t>
-            </a:r>
-          </a:p>
-          <a:p>
-            <a:pPr lvl="0" indent="0" marL="0">
-              <a:buNone/>
-            </a:pPr>
-            <a:r>
-              <a:rPr/>
-              <a:t>Quarto adds features to Python notebooks without detracting anything. You just need a few YAML lines.</a:t>
-            </a:r>
-          </a:p>
-        </p:txBody>
-      </p:sp>
-      <p:sp>
-        <p:nvSpPr>
-          <p:cNvPr id="4" name="Content Placeholder 3"/>
-          <p:cNvSpPr>
-            <a:spLocks noGrp="1"/>
-          </p:cNvSpPr>
-          <p:nvPr>
-            <p:ph idx="2" sz="half"/>
-          </p:nvPr>
-        </p:nvSpPr>
-        <p:spPr/>
-        <p:txBody>
-          <a:bodyPr/>
-          <a:lstStyle/>
-          <a:p>
-            <a:pPr lvl="0" indent="0" marL="0">
-              <a:spcBef>
-                <a:spcPts val="3000"/>
-              </a:spcBef>
-              <a:buNone/>
-            </a:pPr>
-            <a:r>
-              <a:rPr b="1"/>
-              <a:t>Blog: excellent</a:t>
-            </a:r>
-          </a:p>
-          <a:p>
-            <a:pPr lvl="0" indent="0" marL="0">
-              <a:buNone/>
-            </a:pPr>
-            <a:r>
-              <a:rPr/>
-              <a:t>Quarto allowed me to have a scriptable, Python-based </a:t>
-            </a:r>
-            <a:r>
-              <a:rPr>
-                <a:hlinkClick r:id="rId2"/>
-              </a:rPr>
-              <a:t>blog</a:t>
-            </a:r>
-            <a:r>
-              <a:rPr/>
-              <a:t>. I wrote code to post new articles to Twitter and LinkedIn.</a:t>
-            </a:r>
-          </a:p>
-          <a:p>
-            <a:pPr lvl="0" indent="0" marL="0">
-              <a:spcBef>
-                <a:spcPts val="3000"/>
-              </a:spcBef>
-              <a:buNone/>
-            </a:pPr>
-            <a:r>
-              <a:rPr b="1"/>
-              <a:t>Presentations: maybe</a:t>
-            </a:r>
-          </a:p>
-          <a:p>
-            <a:pPr lvl="0" indent="0" marL="0">
-              <a:buNone/>
-            </a:pPr>
-            <a:r>
-              <a:rPr/>
-              <a:t>Great for RevealJS. For PPT, render process =&gt; long edit cycle. Useful for:</a:t>
-            </a:r>
-          </a:p>
-          <a:p>
-            <a:pPr lvl="0"/>
-            <a:r>
-              <a:rPr i="1"/>
-              <a:t>a lot</a:t>
-            </a:r>
-            <a:r>
-              <a:rPr/>
-              <a:t> of dynamic content</a:t>
-            </a:r>
-          </a:p>
-          <a:p>
-            <a:pPr lvl="0"/>
-            <a:r>
-              <a:rPr/>
-              <a:t>Reproducibility needs</a:t>
-            </a:r>
-          </a:p>
-          <a:p>
-            <a:pPr lvl="0"/>
-            <a:r>
-              <a:rPr/>
-              <a:t>Collaborators used to Git/Beamer</a:t>
-            </a:r>
-          </a:p>
-        </p:txBody>
-      </p:sp>
-    </p:spTree>
-  </p:cSld>
-</p:sld>
-</file>
-
-<file path=ppt/slides/slide42.xml><?xml version="1.0" encoding="utf-8"?>
-<p:sld xmlns:a="http://schemas.openxmlformats.org/drawingml/2006/main" xmlns:r="http://schemas.openxmlformats.org/officeDocument/2006/relationships" xmlns:p="http://schemas.openxmlformats.org/presentationml/2006/main">
-  <p:cSld>
-    <p:spTree>
-      <p:nvGrpSpPr>
-        <p:cNvPr id="1" name=""/>
-        <p:cNvGrpSpPr/>
-        <p:nvPr/>
-      </p:nvGrpSpPr>
-      <p:grpSpPr>
-        <a:xfrm>
-          <a:off x="0" y="0"/>
-          <a:ext cx="0" cy="0"/>
-          <a:chOff x="0" y="0"/>
-          <a:chExt cx="0" cy="0"/>
-        </a:xfrm>
-      </p:grpSpPr>
-      <p:sp>
-        <p:nvSpPr>
-          <p:cNvPr id="2" name="Title 1"/>
-          <p:cNvSpPr>
-            <a:spLocks noGrp="1"/>
-          </p:cNvSpPr>
-          <p:nvPr>
-            <p:ph type="title"/>
-          </p:nvPr>
-        </p:nvSpPr>
-        <p:spPr>
-          <a:xfrm>
-            <a:off x="722313" y="3305176"/>
-            <a:ext cx="7772400" cy="1021556"/>
-          </a:xfrm>
-        </p:spPr>
-        <p:txBody>
-          <a:bodyPr/>
-          <a:lstStyle/>
-          <a:p>
-            <a:pPr lvl="0" indent="0" marL="0">
-              <a:buNone/>
-            </a:pPr>
-            <a:r>
-              <a:rPr/>
-              <a:t>Next steps</a:t>
-            </a:r>
-          </a:p>
-        </p:txBody>
-      </p:sp>
-    </p:spTree>
-  </p:cSld>
-</p:sld>
-</file>
-
-<file path=ppt/slides/slide43.xml><?xml version="1.0" encoding="utf-8"?>
-<p:sld xmlns:a="http://schemas.openxmlformats.org/drawingml/2006/main" xmlns:r="http://schemas.openxmlformats.org/officeDocument/2006/relationships" xmlns:p="http://schemas.openxmlformats.org/presentationml/2006/main">
-  <p:cSld>
-    <p:spTree>
-      <p:nvGrpSpPr>
-        <p:cNvPr id="1" name=""/>
-        <p:cNvGrpSpPr/>
-        <p:nvPr/>
-      </p:nvGrpSpPr>
-      <p:grpSpPr>
-        <a:xfrm>
-          <a:off x="0" y="0"/>
-          <a:ext cx="0" cy="0"/>
-          <a:chOff x="0" y="0"/>
-          <a:chExt cx="0" cy="0"/>
-        </a:xfrm>
-      </p:grpSpPr>
-      <p:sp>
-        <p:nvSpPr>
-          <p:cNvPr id="2" name="Title 1"/>
-          <p:cNvSpPr>
-            <a:spLocks noGrp="1"/>
-          </p:cNvSpPr>
-          <p:nvPr>
-            <p:ph type="title"/>
-          </p:nvPr>
-        </p:nvSpPr>
-        <p:spPr/>
-        <p:txBody>
-          <a:bodyPr/>
-          <a:lstStyle/>
-          <a:p>
-            <a:pPr lvl="0" indent="0" marL="0">
-              <a:buNone/>
-            </a:pPr>
-            <a:r>
-              <a:rPr/>
-              <a:t>Next Steps</a:t>
-            </a:r>
-          </a:p>
-        </p:txBody>
-      </p:sp>
-      <p:sp>
-        <p:nvSpPr>
-          <p:cNvPr id="3" name="Content Placeholder 2"/>
-          <p:cNvSpPr>
-            <a:spLocks noGrp="1"/>
-          </p:cNvSpPr>
-          <p:nvPr>
-            <p:ph idx="1"/>
-          </p:nvPr>
-        </p:nvSpPr>
-        <p:spPr/>
-        <p:txBody>
-          <a:bodyPr/>
-          <a:lstStyle/>
-          <a:p>
-            <a:pPr lvl="0"/>
-            <a:r>
-              <a:rPr/>
-              <a:t>The Quarto website has great tutorials:</a:t>
-            </a:r>
-          </a:p>
-          <a:p>
-            <a:pPr lvl="1"/>
-            <a:r>
-              <a:rPr>
-                <a:hlinkClick r:id="rId2"/>
-              </a:rPr>
-              <a:t>Jupyter</a:t>
-            </a:r>
-          </a:p>
-          <a:p>
-            <a:pPr lvl="1"/>
-            <a:r>
-              <a:rPr>
-                <a:hlinkClick r:id="rId3"/>
-              </a:rPr>
-              <a:t>VSCode</a:t>
-            </a:r>
-          </a:p>
-          <a:p>
-            <a:pPr lvl="0"/>
-            <a:r>
-              <a:rPr/>
-              <a:t>If you have multiple input files (e.g., </a:t>
-            </a:r>
-            <a:r>
-              <a:rPr>
-                <a:hlinkClick r:id="rId4"/>
-              </a:rPr>
-              <a:t>blog</a:t>
-            </a:r>
-            <a:r>
-              <a:rPr/>
-              <a:t> or book), you can create a </a:t>
-            </a:r>
-            <a:r>
-              <a:rPr>
-                <a:hlinkClick r:id="rId5"/>
-              </a:rPr>
-              <a:t>project</a:t>
-            </a:r>
-            <a:r>
-              <a:rPr/>
-              <a:t>. This allows rendering multiple files that link to each other.</a:t>
-            </a:r>
-          </a:p>
-          <a:p>
-            <a:pPr lvl="0"/>
-            <a:r>
-              <a:rPr/>
-              <a:t>Projects can have pre- and post-render steps in Python, R, Lua and shell script</a:t>
-            </a:r>
-          </a:p>
-        </p:txBody>
-      </p:sp>
-    </p:spTree>
-  </p:cSld>
-</p:sld>
-</file>
-
-<file path=ppt/slides/slide44.xml><?xml version="1.0" encoding="utf-8"?>
-<p:sld xmlns:a="http://schemas.openxmlformats.org/drawingml/2006/main" xmlns:r="http://schemas.openxmlformats.org/officeDocument/2006/relationships" xmlns:p="http://schemas.openxmlformats.org/presentationml/2006/main">
-  <p:cSld>
-    <p:spTree>
-      <p:nvGrpSpPr>
-        <p:cNvPr id="1" name=""/>
-        <p:cNvGrpSpPr/>
-        <p:nvPr/>
-      </p:nvGrpSpPr>
-      <p:grpSpPr>
-        <a:xfrm>
-          <a:off x="0" y="0"/>
-          <a:ext cx="0" cy="0"/>
-          <a:chOff x="0" y="0"/>
-          <a:chExt cx="0" cy="0"/>
-        </a:xfrm>
-      </p:grpSpPr>
-      <p:sp>
-        <p:nvSpPr>
-          <p:cNvPr id="2" name="Title 1"/>
-          <p:cNvSpPr>
-            <a:spLocks noGrp="1"/>
-          </p:cNvSpPr>
-          <p:nvPr>
-            <p:ph type="title"/>
-          </p:nvPr>
-        </p:nvSpPr>
-        <p:spPr>
-          <a:xfrm>
-            <a:off x="722313" y="3305176"/>
-            <a:ext cx="7772400" cy="1021556"/>
-          </a:xfrm>
-        </p:spPr>
-        <p:txBody>
-          <a:bodyPr/>
-          <a:lstStyle/>
-          <a:p>
-            <a:pPr lvl="0" indent="0" marL="0">
-              <a:buNone/>
-            </a:pPr>
-            <a:r>
-              <a:rPr/>
-              <a:t>THANK YOU</a:t>
-            </a:r>
-          </a:p>
-        </p:txBody>
-      </p:sp>
-    </p:spTree>
-  </p:cSld>
-</p:sld>
-</file>
-
-<file path=ppt/slides/slide45.xml><?xml version="1.0" encoding="utf-8"?>
-<p:sld xmlns:a="http://schemas.openxmlformats.org/drawingml/2006/main" xmlns:r="http://schemas.openxmlformats.org/officeDocument/2006/relationships" xmlns:p="http://schemas.openxmlformats.org/presentationml/2006/main">
-  <p:cSld>
-    <p:spTree>
-      <p:nvGrpSpPr>
-        <p:cNvPr id="1" name=""/>
-        <p:cNvGrpSpPr/>
-        <p:nvPr/>
-      </p:nvGrpSpPr>
-      <p:grpSpPr>
-        <a:xfrm>
-          <a:off x="0" y="0"/>
-          <a:ext cx="0" cy="0"/>
-          <a:chOff x="0" y="0"/>
-          <a:chExt cx="0" cy="0"/>
-        </a:xfrm>
-      </p:grpSpPr>
-      <p:sp>
-        <p:nvSpPr>
-          <p:cNvPr id="2" name="Title 1"/>
-          <p:cNvSpPr>
-            <a:spLocks noGrp="1"/>
-          </p:cNvSpPr>
-          <p:nvPr>
-            <p:ph type="title"/>
-          </p:nvPr>
-        </p:nvSpPr>
-        <p:spPr/>
-        <p:txBody>
-          <a:bodyPr/>
-          <a:lstStyle/>
-          <a:p>
-            <a:pPr lvl="0" indent="0" marL="0">
-              <a:buNone/>
-            </a:pPr>
-            <a:r>
-              <a:rPr/>
-              <a:t>Notes</a:t>
-            </a:r>
-          </a:p>
-        </p:txBody>
-      </p:sp>
-      <p:sp>
-        <p:nvSpPr>
-          <p:cNvPr id="3" name="Content Placeholder 2"/>
-          <p:cNvSpPr>
-            <a:spLocks noGrp="1"/>
-          </p:cNvSpPr>
-          <p:nvPr>
-            <p:ph idx="1"/>
-          </p:nvPr>
-        </p:nvSpPr>
-        <p:spPr/>
-        <p:txBody>
-          <a:bodyPr/>
-          <a:lstStyle/>
-          <a:p>
-            <a:pPr lvl="0" indent="0" marL="0">
-              <a:buNone/>
-            </a:pPr>
-            <a:r>
-              <a:rPr sz="1800"/>
-              <a:t>1. You can use footnotes in presentations and websites, too</a:t>
             </a:r>
           </a:p>
         </p:txBody>

</xml_diff>

<commit_message>
Work done by Mon Jul  4 10:26:59 PDT 2022
</commit_message>
<xml_diff>
--- a/docs/presentation-orig.pptx
+++ b/docs/presentation-orig.pptx
@@ -44,6 +44,8 @@
     <p:sldId id="292" r:id="rId38"/>
     <p:sldId id="293" r:id="rId39"/>
     <p:sldId id="294" r:id="rId40"/>
+    <p:sldId id="295" r:id="rId41"/>
+    <p:sldId id="296" r:id="rId42"/>
   </p:sldIdLst>
   <p:sldSz cx="9144000" cy="5143500" type="screen16x9"/>
   <p:notesSz cx="6858000" cy="9144000"/>
@@ -9750,12 +9752,7 @@
             <p:ph type="title"/>
           </p:nvPr>
         </p:nvSpPr>
-        <p:spPr>
-          <a:xfrm>
-            <a:off x="722313" y="3305176"/>
-            <a:ext cx="7772400" cy="1021556"/>
-          </a:xfrm>
-        </p:spPr>
+        <p:spPr/>
         <p:txBody>
           <a:bodyPr/>
           <a:lstStyle/>
@@ -9765,7 +9762,131 @@
             </a:pPr>
             <a:r>
               <a:rPr/>
-              <a:t>Books in Quarto</a:t>
+              <a:t>Cross references</a:t>
+            </a:r>
+          </a:p>
+        </p:txBody>
+      </p:sp>
+      <p:sp>
+        <p:nvSpPr>
+          <p:cNvPr id="3" name="Content Placeholder 2"/>
+          <p:cNvSpPr>
+            <a:spLocks noGrp="1"/>
+          </p:cNvSpPr>
+          <p:nvPr>
+            <p:ph idx="1" sz="half"/>
+          </p:nvPr>
+        </p:nvSpPr>
+        <p:spPr/>
+        <p:txBody>
+          <a:bodyPr/>
+          <a:lstStyle/>
+          <a:p>
+            <a:pPr lvl="0" indent="0" marL="0">
+              <a:buNone/>
+            </a:pPr>
+            <a:r>
+              <a:rPr/>
+              <a:t>The [Quarto guide] has a great section on [cross-references]. I cover only the main points.</a:t>
+            </a:r>
+          </a:p>
+          <a:p>
+            <a:pPr lvl="0" indent="0" marL="0">
+              <a:buNone/>
+            </a:pPr>
+            <a:r>
+              <a:rPr/>
+              <a:t>To create a cross-referenceable figure, section or equation, you need to tag it with its corresponding prefix, respectively “fig”, “sec” and “eq”.</a:t>
+            </a:r>
+          </a:p>
+          <a:p>
+            <a:pPr lvl="0" indent="0" marL="0">
+              <a:buNone/>
+            </a:pPr>
+            <a:r>
+              <a:rPr/>
+              <a:t>To tag it, use the following syntax: </a:t>
+            </a:r>
+            <a:r>
+              <a:rPr>
+                <a:latin typeface="Consolas"/>
+              </a:rPr>
+              <a:t>#prefix-name</a:t>
+            </a:r>
+            <a:r>
+              <a:rPr/>
+              <a:t>.</a:t>
+            </a:r>
+          </a:p>
+        </p:txBody>
+      </p:sp>
+      <p:sp>
+        <p:nvSpPr>
+          <p:cNvPr id="4" name="Content Placeholder 3"/>
+          <p:cNvSpPr>
+            <a:spLocks noGrp="1"/>
+          </p:cNvSpPr>
+          <p:nvPr>
+            <p:ph idx="2" sz="half"/>
+          </p:nvPr>
+        </p:nvSpPr>
+        <p:spPr/>
+        <p:txBody>
+          <a:bodyPr/>
+          <a:lstStyle/>
+          <a:p>
+            <a:pPr lvl="0" indent="0" marL="0">
+              <a:buNone/>
+            </a:pPr>
+            <a:r>
+              <a:rPr/>
+              <a:t>For example, when declaring a figure, you can use:</a:t>
+            </a:r>
+          </a:p>
+          <a:p>
+            <a:pPr lvl="0" indent="0">
+              <a:buNone/>
+            </a:pPr>
+            <a:r>
+              <a:rPr>
+                <a:solidFill>
+                  <a:srgbClr val="AD0000"/>
+                </a:solidFill>
+                <a:latin typeface="Consolas"/>
+              </a:rPr>
+              <a:t>![Elephant](elephant.png)</a:t>
+            </a:r>
+            <a:r>
+              <a:rPr>
+                <a:solidFill>
+                  <a:srgbClr val="003B4F"/>
+                </a:solidFill>
+                <a:latin typeface="Consolas"/>
+              </a:rPr>
+              <a:t>{#fig-elephant}</a:t>
+            </a:r>
+          </a:p>
+          <a:p>
+            <a:pPr lvl="0" indent="0" marL="0">
+              <a:buNone/>
+            </a:pPr>
+            <a:r>
+              <a:rPr/>
+              <a:t>Later, you can refer to it using:</a:t>
+            </a:r>
+          </a:p>
+          <a:p>
+            <a:pPr lvl="0" indent="0">
+              <a:buNone/>
+            </a:pPr>
+            <a:r>
+              <a:rPr>
+                <a:solidFill>
+                  <a:srgbClr val="003B4F"/>
+                </a:solidFill>
+                <a:latin typeface="Consolas"/>
+              </a:rPr>
+              <a:t>See @fig-elephant for an illustration.</a:t>
             </a:r>
           </a:p>
         </p:txBody>
@@ -9802,7 +9923,12 @@
             <p:ph type="title"/>
           </p:nvPr>
         </p:nvSpPr>
-        <p:spPr/>
+        <p:spPr>
+          <a:xfrm>
+            <a:off x="722313" y="3305176"/>
+            <a:ext cx="7772400" cy="1021556"/>
+          </a:xfrm>
+        </p:spPr>
         <p:txBody>
           <a:bodyPr/>
           <a:lstStyle/>
@@ -9813,109 +9939,6 @@
             <a:r>
               <a:rPr/>
               <a:t>Books in Quarto</a:t>
-            </a:r>
-          </a:p>
-        </p:txBody>
-      </p:sp>
-      <p:sp>
-        <p:nvSpPr>
-          <p:cNvPr id="3" name="Content Placeholder 2"/>
-          <p:cNvSpPr>
-            <a:spLocks noGrp="1"/>
-          </p:cNvSpPr>
-          <p:nvPr>
-            <p:ph idx="1"/>
-          </p:nvPr>
-        </p:nvSpPr>
-        <p:spPr/>
-        <p:txBody>
-          <a:bodyPr/>
-          <a:lstStyle/>
-          <a:p>
-            <a:pPr lvl="0" indent="0" marL="0">
-              <a:buNone/>
-            </a:pPr>
-            <a:r>
-              <a:rPr/>
-              <a:t>You can also write books with quarto. From the same collection of </a:t>
-            </a:r>
-            <a:r>
-              <a:rPr>
-                <a:latin typeface="Consolas"/>
-              </a:rPr>
-              <a:t>.qmd</a:t>
-            </a:r>
-            <a:r>
-              <a:rPr/>
-              <a:t> files, Quarto can generate:</a:t>
-            </a:r>
-          </a:p>
-          <a:p>
-            <a:pPr lvl="0"/>
-            <a:r>
-              <a:rPr/>
-              <a:t>ePub</a:t>
-            </a:r>
-          </a:p>
-          <a:p>
-            <a:pPr lvl="0"/>
-            <a:r>
-              <a:rPr/>
-              <a:t>PDF</a:t>
-            </a:r>
-          </a:p>
-          <a:p>
-            <a:pPr lvl="0"/>
-            <a:r>
-              <a:rPr/>
-              <a:t>Online book</a:t>
-            </a:r>
-          </a:p>
-          <a:p>
-            <a:pPr lvl="0" indent="0" marL="0">
-              <a:buNone/>
-            </a:pPr>
-            <a:r>
-              <a:rPr/>
-              <a:t>Two recent examples are:</a:t>
-            </a:r>
-          </a:p>
-          <a:p>
-            <a:pPr lvl="0"/>
-            <a:r>
-              <a:rPr>
-                <a:hlinkClick r:id="rId2"/>
-              </a:rPr>
-              <a:t>Hands-on Programming in R</a:t>
-            </a:r>
-            <a:r>
-              <a:rPr/>
-              <a:t>, by Garrett Grolemund </a:t>
-            </a:r>
-            <a:r>
-              <a:rPr>
-                <a:hlinkClick r:id="rId3"/>
-              </a:rPr>
-              <a:t>(source)</a:t>
-            </a:r>
-          </a:p>
-          <a:p>
-            <a:pPr lvl="0"/>
-            <a:r>
-              <a:rPr>
-                <a:hlinkClick r:id="rId4"/>
-              </a:rPr>
-              <a:t>Python for Data Analysis, 3E</a:t>
-            </a:r>
-            <a:r>
-              <a:rPr/>
-              <a:t>, by Wes McKinney </a:t>
-            </a:r>
-            <a:r>
-              <a:rPr>
-                <a:hlinkClick r:id="rId5"/>
-              </a:rPr>
-              <a:t>(source)</a:t>
             </a:r>
           </a:p>
         </p:txBody>
@@ -9926,6 +9949,156 @@
 </file>
 
 <file path=ppt/slides/slide32.xml><?xml version="1.0" encoding="utf-8"?>
+<p:sld xmlns:a="http://schemas.openxmlformats.org/drawingml/2006/main" xmlns:r="http://schemas.openxmlformats.org/officeDocument/2006/relationships" xmlns:p="http://schemas.openxmlformats.org/presentationml/2006/main">
+  <p:cSld>
+    <p:spTree>
+      <p:nvGrpSpPr>
+        <p:cNvPr id="1" name=""/>
+        <p:cNvGrpSpPr/>
+        <p:nvPr/>
+      </p:nvGrpSpPr>
+      <p:grpSpPr>
+        <a:xfrm>
+          <a:off x="0" y="0"/>
+          <a:ext cx="0" cy="0"/>
+          <a:chOff x="0" y="0"/>
+          <a:chExt cx="0" cy="0"/>
+        </a:xfrm>
+      </p:grpSpPr>
+      <p:sp>
+        <p:nvSpPr>
+          <p:cNvPr id="2" name="Title 1"/>
+          <p:cNvSpPr>
+            <a:spLocks noGrp="1"/>
+          </p:cNvSpPr>
+          <p:nvPr>
+            <p:ph type="title"/>
+          </p:nvPr>
+        </p:nvSpPr>
+        <p:spPr/>
+        <p:txBody>
+          <a:bodyPr/>
+          <a:lstStyle/>
+          <a:p>
+            <a:pPr lvl="0" indent="0" marL="0">
+              <a:buNone/>
+            </a:pPr>
+            <a:r>
+              <a:rPr/>
+              <a:t>Books in Quarto</a:t>
+            </a:r>
+          </a:p>
+        </p:txBody>
+      </p:sp>
+      <p:sp>
+        <p:nvSpPr>
+          <p:cNvPr id="3" name="Content Placeholder 2"/>
+          <p:cNvSpPr>
+            <a:spLocks noGrp="1"/>
+          </p:cNvSpPr>
+          <p:nvPr>
+            <p:ph idx="1"/>
+          </p:nvPr>
+        </p:nvSpPr>
+        <p:spPr/>
+        <p:txBody>
+          <a:bodyPr/>
+          <a:lstStyle/>
+          <a:p>
+            <a:pPr lvl="0" indent="0" marL="0">
+              <a:buNone/>
+            </a:pPr>
+            <a:r>
+              <a:rPr/>
+              <a:t>You can also write books with quarto. From the same collection of </a:t>
+            </a:r>
+            <a:r>
+              <a:rPr>
+                <a:latin typeface="Consolas"/>
+              </a:rPr>
+              <a:t>.qmd</a:t>
+            </a:r>
+            <a:r>
+              <a:rPr/>
+              <a:t> files, Quarto can generate:</a:t>
+            </a:r>
+          </a:p>
+          <a:p>
+            <a:pPr lvl="0"/>
+            <a:r>
+              <a:rPr/>
+              <a:t>ePub</a:t>
+            </a:r>
+          </a:p>
+          <a:p>
+            <a:pPr lvl="0"/>
+            <a:r>
+              <a:rPr/>
+              <a:t>PDF</a:t>
+            </a:r>
+          </a:p>
+          <a:p>
+            <a:pPr lvl="0"/>
+            <a:r>
+              <a:rPr/>
+              <a:t>Online book</a:t>
+            </a:r>
+          </a:p>
+          <a:p>
+            <a:pPr lvl="0" indent="0" marL="0">
+              <a:buNone/>
+            </a:pPr>
+            <a:r>
+              <a:rPr/>
+              <a:t>Two recent examples are:</a:t>
+            </a:r>
+          </a:p>
+          <a:p>
+            <a:pPr lvl="0"/>
+            <a:r>
+              <a:rPr>
+                <a:hlinkClick r:id="rId2"/>
+              </a:rPr>
+              <a:t>Hands-on Programming in R</a:t>
+            </a:r>
+            <a:r>
+              <a:rPr/>
+              <a:t>, by Garrett Grolemund </a:t>
+            </a:r>
+            <a:r>
+              <a:rPr>
+                <a:hlinkClick r:id="rId3"/>
+              </a:rPr>
+              <a:t>(source)</a:t>
+            </a:r>
+          </a:p>
+          <a:p>
+            <a:pPr lvl="0"/>
+            <a:r>
+              <a:rPr>
+                <a:hlinkClick r:id="rId4"/>
+              </a:rPr>
+              <a:t>Python for Data Analysis, 3E</a:t>
+            </a:r>
+            <a:r>
+              <a:rPr/>
+              <a:t>, by Wes McKinney </a:t>
+            </a:r>
+            <a:r>
+              <a:rPr>
+                <a:hlinkClick r:id="rId5"/>
+              </a:rPr>
+              <a:t>(source)</a:t>
+            </a:r>
+          </a:p>
+        </p:txBody>
+      </p:sp>
+    </p:spTree>
+  </p:cSld>
+</p:sld>
+</file>
+
+<file path=ppt/slides/slide33.xml><?xml version="1.0" encoding="utf-8"?>
 <p:sld xmlns:a="http://schemas.openxmlformats.org/drawingml/2006/main" xmlns:r="http://schemas.openxmlformats.org/officeDocument/2006/relationships" xmlns:p="http://schemas.openxmlformats.org/presentationml/2006/main">
   <p:cSld>
     <p:spTree>
@@ -10058,7 +10231,7 @@
 </p:sld>
 </file>
 
-<file path=ppt/slides/slide33.xml><?xml version="1.0" encoding="utf-8"?>
+<file path=ppt/slides/slide34.xml><?xml version="1.0" encoding="utf-8"?>
 <p:sld xmlns:a="http://schemas.openxmlformats.org/drawingml/2006/main" xmlns:r="http://schemas.openxmlformats.org/officeDocument/2006/relationships" xmlns:p="http://schemas.openxmlformats.org/presentationml/2006/main">
   <p:cSld>
     <p:spTree>
@@ -10191,58 +10364,6 @@
 </p:sld>
 </file>
 
-<file path=ppt/slides/slide34.xml><?xml version="1.0" encoding="utf-8"?>
-<p:sld xmlns:a="http://schemas.openxmlformats.org/drawingml/2006/main" xmlns:r="http://schemas.openxmlformats.org/officeDocument/2006/relationships" xmlns:p="http://schemas.openxmlformats.org/presentationml/2006/main">
-  <p:cSld>
-    <p:spTree>
-      <p:nvGrpSpPr>
-        <p:cNvPr id="1" name=""/>
-        <p:cNvGrpSpPr/>
-        <p:nvPr/>
-      </p:nvGrpSpPr>
-      <p:grpSpPr>
-        <a:xfrm>
-          <a:off x="0" y="0"/>
-          <a:ext cx="0" cy="0"/>
-          <a:chOff x="0" y="0"/>
-          <a:chExt cx="0" cy="0"/>
-        </a:xfrm>
-      </p:grpSpPr>
-      <p:sp>
-        <p:nvSpPr>
-          <p:cNvPr id="2" name="Title 1"/>
-          <p:cNvSpPr>
-            <a:spLocks noGrp="1"/>
-          </p:cNvSpPr>
-          <p:nvPr>
-            <p:ph type="title"/>
-          </p:nvPr>
-        </p:nvSpPr>
-        <p:spPr>
-          <a:xfrm>
-            <a:off x="722313" y="3305176"/>
-            <a:ext cx="7772400" cy="1021556"/>
-          </a:xfrm>
-        </p:spPr>
-        <p:txBody>
-          <a:bodyPr/>
-          <a:lstStyle/>
-          <a:p>
-            <a:pPr lvl="0" indent="0" marL="0">
-              <a:buNone/>
-            </a:pPr>
-            <a:r>
-              <a:rPr/>
-              <a:t>Should I use Quarto?</a:t>
-            </a:r>
-          </a:p>
-        </p:txBody>
-      </p:sp>
-    </p:spTree>
-  </p:cSld>
-</p:sld>
-</file>
-
 <file path=ppt/slides/slide35.xml><?xml version="1.0" encoding="utf-8"?>
 <p:sld xmlns:a="http://schemas.openxmlformats.org/drawingml/2006/main" xmlns:r="http://schemas.openxmlformats.org/officeDocument/2006/relationships" xmlns:p="http://schemas.openxmlformats.org/presentationml/2006/main">
   <p:cSld>
@@ -10270,7 +10391,12 @@
             <p:ph type="title"/>
           </p:nvPr>
         </p:nvSpPr>
-        <p:spPr/>
+        <p:spPr>
+          <a:xfrm>
+            <a:off x="722313" y="3305176"/>
+            <a:ext cx="7772400" cy="1021556"/>
+          </a:xfrm>
+        </p:spPr>
         <p:txBody>
           <a:bodyPr/>
           <a:lstStyle/>
@@ -10280,175 +10406,7 @@
             </a:pPr>
             <a:r>
               <a:rPr/>
-              <a:t>Where I think Quarto is good (July 2022)</a:t>
-            </a:r>
-          </a:p>
-        </p:txBody>
-      </p:sp>
-      <p:sp>
-        <p:nvSpPr>
-          <p:cNvPr id="3" name="Content Placeholder 2"/>
-          <p:cNvSpPr>
-            <a:spLocks noGrp="1"/>
-          </p:cNvSpPr>
-          <p:nvPr>
-            <p:ph idx="1" sz="half"/>
-          </p:nvPr>
-        </p:nvSpPr>
-        <p:spPr/>
-        <p:txBody>
-          <a:bodyPr/>
-          <a:lstStyle/>
-          <a:p>
-            <a:pPr lvl="0" indent="0" marL="0">
-              <a:spcBef>
-                <a:spcPts val="3000"/>
-              </a:spcBef>
-              <a:buNone/>
-            </a:pPr>
-            <a:r>
-              <a:rPr b="1"/>
-              <a:t>Articles: maybe</a:t>
-            </a:r>
-          </a:p>
-          <a:p>
-            <a:pPr lvl="0" indent="0" marL="0">
-              <a:buNone/>
-            </a:pPr>
-            <a:r>
-              <a:rPr/>
-              <a:t>I think Quarto is more helpful for a team that already uses Git </a:t>
-            </a:r>
-            <a:r>
-              <a:rPr b="1"/>
-              <a:t>with</a:t>
-            </a:r>
-            <a:r>
-              <a:rPr/>
-              <a:t> Python notebooks or LaTeX to write articles.</a:t>
-            </a:r>
-          </a:p>
-          <a:p>
-            <a:pPr lvl="0" indent="0" marL="0">
-              <a:buNone/>
-            </a:pPr>
-            <a:r>
-              <a:rPr/>
-              <a:t>Microsoft Word collaboration through SharePoint and Teams is easier than Git and Quarto… but it’s not reproducible.</a:t>
-            </a:r>
-          </a:p>
-          <a:p>
-            <a:pPr lvl="0" indent="0" marL="0">
-              <a:spcBef>
-                <a:spcPts val="3000"/>
-              </a:spcBef>
-              <a:buNone/>
-            </a:pPr>
-            <a:r>
-              <a:rPr b="1"/>
-              <a:t>Python notebook: excellent</a:t>
-            </a:r>
-          </a:p>
-          <a:p>
-            <a:pPr lvl="0" indent="0" marL="0">
-              <a:buNone/>
-            </a:pPr>
-            <a:r>
-              <a:rPr/>
-              <a:t>Quarto adds features to Python notebooks without detracting anything. You just need a few YAML lines.</a:t>
-            </a:r>
-          </a:p>
-        </p:txBody>
-      </p:sp>
-      <p:sp>
-        <p:nvSpPr>
-          <p:cNvPr id="4" name="Content Placeholder 3"/>
-          <p:cNvSpPr>
-            <a:spLocks noGrp="1"/>
-          </p:cNvSpPr>
-          <p:nvPr>
-            <p:ph idx="2" sz="half"/>
-          </p:nvPr>
-        </p:nvSpPr>
-        <p:spPr/>
-        <p:txBody>
-          <a:bodyPr/>
-          <a:lstStyle/>
-          <a:p>
-            <a:pPr lvl="0" indent="0" marL="0">
-              <a:spcBef>
-                <a:spcPts val="3000"/>
-              </a:spcBef>
-              <a:buNone/>
-            </a:pPr>
-            <a:r>
-              <a:rPr b="1"/>
-              <a:t>Blog: excellent</a:t>
-            </a:r>
-          </a:p>
-          <a:p>
-            <a:pPr lvl="0" indent="0" marL="0">
-              <a:buNone/>
-            </a:pPr>
-            <a:r>
-              <a:rPr/>
-              <a:t>Quarto allowed me to have a scriptable, Python-based </a:t>
-            </a:r>
-            <a:r>
-              <a:rPr>
-                <a:hlinkClick r:id="rId2"/>
-              </a:rPr>
-              <a:t>blog</a:t>
-            </a:r>
-            <a:r>
-              <a:rPr/>
-              <a:t>. I wrote code to post new articles to Twitter and LinkedIn.</a:t>
-            </a:r>
-          </a:p>
-          <a:p>
-            <a:pPr lvl="0" indent="0" marL="0">
-              <a:spcBef>
-                <a:spcPts val="3000"/>
-              </a:spcBef>
-              <a:buNone/>
-            </a:pPr>
-            <a:r>
-              <a:rPr b="1"/>
-              <a:t>Presentations: maybe</a:t>
-            </a:r>
-          </a:p>
-          <a:p>
-            <a:pPr lvl="0" indent="0" marL="0">
-              <a:buNone/>
-            </a:pPr>
-            <a:r>
-              <a:rPr/>
-              <a:t>Great for RevealJS. For PPT, render process =&gt; long edit cycle. Useful for:</a:t>
-            </a:r>
-          </a:p>
-          <a:p>
-            <a:pPr lvl="0"/>
-            <a:r>
-              <a:rPr i="1"/>
-              <a:t>a lot</a:t>
-            </a:r>
-            <a:r>
-              <a:rPr/>
-              <a:t> of dynamic content</a:t>
-            </a:r>
-          </a:p>
-          <a:p>
-            <a:pPr lvl="0"/>
-            <a:r>
-              <a:rPr/>
-              <a:t>Reproducibility needs</a:t>
-            </a:r>
-          </a:p>
-          <a:p>
-            <a:pPr lvl="0"/>
-            <a:r>
-              <a:rPr/>
-              <a:t>Collaborators used to Git/Beamer</a:t>
+              <a:t>Should I use Quarto?</a:t>
             </a:r>
           </a:p>
         </p:txBody>
@@ -10485,12 +10443,7 @@
             <p:ph type="title"/>
           </p:nvPr>
         </p:nvSpPr>
-        <p:spPr>
-          <a:xfrm>
-            <a:off x="722313" y="3305176"/>
-            <a:ext cx="7772400" cy="1021556"/>
-          </a:xfrm>
-        </p:spPr>
+        <p:spPr/>
         <p:txBody>
           <a:bodyPr/>
           <a:lstStyle/>
@@ -10500,7 +10453,175 @@
             </a:pPr>
             <a:r>
               <a:rPr/>
-              <a:t>Next steps</a:t>
+              <a:t>Where I think Quarto is good (July 2022)</a:t>
+            </a:r>
+          </a:p>
+        </p:txBody>
+      </p:sp>
+      <p:sp>
+        <p:nvSpPr>
+          <p:cNvPr id="3" name="Content Placeholder 2"/>
+          <p:cNvSpPr>
+            <a:spLocks noGrp="1"/>
+          </p:cNvSpPr>
+          <p:nvPr>
+            <p:ph idx="1" sz="half"/>
+          </p:nvPr>
+        </p:nvSpPr>
+        <p:spPr/>
+        <p:txBody>
+          <a:bodyPr/>
+          <a:lstStyle/>
+          <a:p>
+            <a:pPr lvl="0" indent="0" marL="0">
+              <a:spcBef>
+                <a:spcPts val="3000"/>
+              </a:spcBef>
+              <a:buNone/>
+            </a:pPr>
+            <a:r>
+              <a:rPr b="1"/>
+              <a:t>Articles: maybe</a:t>
+            </a:r>
+          </a:p>
+          <a:p>
+            <a:pPr lvl="0" indent="0" marL="0">
+              <a:buNone/>
+            </a:pPr>
+            <a:r>
+              <a:rPr/>
+              <a:t>I think Quarto is more helpful for a team that already uses Git </a:t>
+            </a:r>
+            <a:r>
+              <a:rPr b="1"/>
+              <a:t>with</a:t>
+            </a:r>
+            <a:r>
+              <a:rPr/>
+              <a:t> Python notebooks or LaTeX to write articles.</a:t>
+            </a:r>
+          </a:p>
+          <a:p>
+            <a:pPr lvl="0" indent="0" marL="0">
+              <a:buNone/>
+            </a:pPr>
+            <a:r>
+              <a:rPr/>
+              <a:t>Microsoft Word collaboration through SharePoint and Teams is easier than Git and Quarto… but it’s not reproducible.</a:t>
+            </a:r>
+          </a:p>
+          <a:p>
+            <a:pPr lvl="0" indent="0" marL="0">
+              <a:spcBef>
+                <a:spcPts val="3000"/>
+              </a:spcBef>
+              <a:buNone/>
+            </a:pPr>
+            <a:r>
+              <a:rPr b="1"/>
+              <a:t>Python notebook: excellent</a:t>
+            </a:r>
+          </a:p>
+          <a:p>
+            <a:pPr lvl="0" indent="0" marL="0">
+              <a:buNone/>
+            </a:pPr>
+            <a:r>
+              <a:rPr/>
+              <a:t>Quarto adds features to Python notebooks without detracting anything. You just need a few YAML lines.</a:t>
+            </a:r>
+          </a:p>
+        </p:txBody>
+      </p:sp>
+      <p:sp>
+        <p:nvSpPr>
+          <p:cNvPr id="4" name="Content Placeholder 3"/>
+          <p:cNvSpPr>
+            <a:spLocks noGrp="1"/>
+          </p:cNvSpPr>
+          <p:nvPr>
+            <p:ph idx="2" sz="half"/>
+          </p:nvPr>
+        </p:nvSpPr>
+        <p:spPr/>
+        <p:txBody>
+          <a:bodyPr/>
+          <a:lstStyle/>
+          <a:p>
+            <a:pPr lvl="0" indent="0" marL="0">
+              <a:spcBef>
+                <a:spcPts val="3000"/>
+              </a:spcBef>
+              <a:buNone/>
+            </a:pPr>
+            <a:r>
+              <a:rPr b="1"/>
+              <a:t>Blog: excellent</a:t>
+            </a:r>
+          </a:p>
+          <a:p>
+            <a:pPr lvl="0" indent="0" marL="0">
+              <a:buNone/>
+            </a:pPr>
+            <a:r>
+              <a:rPr/>
+              <a:t>Quarto allowed me to have a scriptable, Python-based </a:t>
+            </a:r>
+            <a:r>
+              <a:rPr>
+                <a:hlinkClick r:id="rId2"/>
+              </a:rPr>
+              <a:t>blog</a:t>
+            </a:r>
+            <a:r>
+              <a:rPr/>
+              <a:t>. I wrote code to post new articles to Twitter and LinkedIn.</a:t>
+            </a:r>
+          </a:p>
+          <a:p>
+            <a:pPr lvl="0" indent="0" marL="0">
+              <a:spcBef>
+                <a:spcPts val="3000"/>
+              </a:spcBef>
+              <a:buNone/>
+            </a:pPr>
+            <a:r>
+              <a:rPr b="1"/>
+              <a:t>Presentations: maybe</a:t>
+            </a:r>
+          </a:p>
+          <a:p>
+            <a:pPr lvl="0" indent="0" marL="0">
+              <a:buNone/>
+            </a:pPr>
+            <a:r>
+              <a:rPr/>
+              <a:t>Great for RevealJS. For PPT, render process =&gt; long edit cycle. Useful for:</a:t>
+            </a:r>
+          </a:p>
+          <a:p>
+            <a:pPr lvl="0"/>
+            <a:r>
+              <a:rPr i="1"/>
+              <a:t>a lot</a:t>
+            </a:r>
+            <a:r>
+              <a:rPr/>
+              <a:t> of dynamic content</a:t>
+            </a:r>
+          </a:p>
+          <a:p>
+            <a:pPr lvl="0"/>
+            <a:r>
+              <a:rPr/>
+              <a:t>Reproducibility needs</a:t>
+            </a:r>
+          </a:p>
+          <a:p>
+            <a:pPr lvl="0"/>
+            <a:r>
+              <a:rPr/>
+              <a:t>Collaborators used to Git/Beamer</a:t>
             </a:r>
           </a:p>
         </p:txBody>
@@ -10537,7 +10658,12 @@
             <p:ph type="title"/>
           </p:nvPr>
         </p:nvSpPr>
-        <p:spPr/>
+        <p:spPr>
+          <a:xfrm>
+            <a:off x="722313" y="3305176"/>
+            <a:ext cx="7772400" cy="1021556"/>
+          </a:xfrm>
+        </p:spPr>
         <p:txBody>
           <a:bodyPr/>
           <a:lstStyle/>
@@ -10547,82 +10673,7 @@
             </a:pPr>
             <a:r>
               <a:rPr/>
-              <a:t>Next Steps</a:t>
-            </a:r>
-          </a:p>
-        </p:txBody>
-      </p:sp>
-      <p:sp>
-        <p:nvSpPr>
-          <p:cNvPr id="3" name="Content Placeholder 2"/>
-          <p:cNvSpPr>
-            <a:spLocks noGrp="1"/>
-          </p:cNvSpPr>
-          <p:nvPr>
-            <p:ph idx="1"/>
-          </p:nvPr>
-        </p:nvSpPr>
-        <p:spPr/>
-        <p:txBody>
-          <a:bodyPr/>
-          <a:lstStyle/>
-          <a:p>
-            <a:pPr lvl="0"/>
-            <a:r>
-              <a:rPr/>
-              <a:t>The Quarto website has great tutorials:</a:t>
-            </a:r>
-          </a:p>
-          <a:p>
-            <a:pPr lvl="1"/>
-            <a:r>
-              <a:rPr>
-                <a:hlinkClick r:id="rId2"/>
-              </a:rPr>
-              <a:t>Jupyter</a:t>
-            </a:r>
-          </a:p>
-          <a:p>
-            <a:pPr lvl="1"/>
-            <a:r>
-              <a:rPr>
-                <a:hlinkClick r:id="rId3"/>
-              </a:rPr>
-              <a:t>VSCode</a:t>
-            </a:r>
-          </a:p>
-          <a:p>
-            <a:pPr lvl="0"/>
-            <a:r>
-              <a:rPr/>
-              <a:t>If you have multiple input files (e.g., </a:t>
-            </a:r>
-            <a:r>
-              <a:rPr>
-                <a:hlinkClick r:id="rId4"/>
-              </a:rPr>
-              <a:t>blog</a:t>
-            </a:r>
-            <a:r>
-              <a:rPr/>
-              <a:t> or book), you can create a </a:t>
-            </a:r>
-            <a:r>
-              <a:rPr>
-                <a:hlinkClick r:id="rId5"/>
-              </a:rPr>
-              <a:t>project</a:t>
-            </a:r>
-            <a:r>
-              <a:rPr/>
-              <a:t>. This allows rendering multiple files that link to each other.</a:t>
-            </a:r>
-          </a:p>
-          <a:p>
-            <a:pPr lvl="0"/>
-            <a:r>
-              <a:rPr/>
-              <a:t>Projects can have pre- and post-render steps in Python, R, Lua and shell script</a:t>
+              <a:t>Where to go next</a:t>
             </a:r>
           </a:p>
         </p:txBody>
@@ -10651,20 +10702,15 @@
       </p:grpSpPr>
       <p:sp>
         <p:nvSpPr>
-          <p:cNvPr id="2" name="Title 1"/>
-          <p:cNvSpPr>
-            <a:spLocks noGrp="1"/>
-          </p:cNvSpPr>
-          <p:nvPr>
-            <p:ph type="title"/>
-          </p:nvPr>
-        </p:nvSpPr>
-        <p:spPr>
-          <a:xfrm>
-            <a:off x="722313" y="3305176"/>
-            <a:ext cx="7772400" cy="1021556"/>
-          </a:xfrm>
-        </p:spPr>
+          <p:cNvPr id="3" name="Content Placeholder 2"/>
+          <p:cNvSpPr>
+            <a:spLocks noGrp="1"/>
+          </p:cNvSpPr>
+          <p:nvPr>
+            <p:ph idx="1"/>
+          </p:nvPr>
+        </p:nvSpPr>
+        <p:spPr/>
         <p:txBody>
           <a:bodyPr/>
           <a:lstStyle/>
@@ -10674,7 +10720,7 @@
             </a:pPr>
             <a:r>
               <a:rPr/>
-              <a:t>THANK YOU</a:t>
+              <a:t>{{&lt; include slides/_hacks.qmd &gt;&gt;}}</a:t>
             </a:r>
           </a:p>
         </p:txBody>
@@ -10721,7 +10767,7 @@
             </a:pPr>
             <a:r>
               <a:rPr/>
-              <a:t>Notes</a:t>
+              <a:t>Next Steps</a:t>
             </a:r>
           </a:p>
         </p:txBody>
@@ -10741,12 +10787,62 @@
           <a:bodyPr/>
           <a:lstStyle/>
           <a:p>
-            <a:pPr lvl="0" indent="0" marL="0">
-              <a:buNone/>
-            </a:pPr>
-            <a:r>
-              <a:rPr sz="1800"/>
-              <a:t>1. You can use footnotes in presentations and websites, too</a:t>
+            <a:pPr lvl="0"/>
+            <a:r>
+              <a:rPr/>
+              <a:t>The Quarto website has great tutorials:</a:t>
+            </a:r>
+          </a:p>
+          <a:p>
+            <a:pPr lvl="1"/>
+            <a:r>
+              <a:rPr>
+                <a:hlinkClick r:id="rId2"/>
+              </a:rPr>
+              <a:t>Jupyter</a:t>
+            </a:r>
+          </a:p>
+          <a:p>
+            <a:pPr lvl="1"/>
+            <a:r>
+              <a:rPr>
+                <a:hlinkClick r:id="rId3"/>
+              </a:rPr>
+              <a:t>VSCode</a:t>
+            </a:r>
+          </a:p>
+          <a:p>
+            <a:pPr lvl="0"/>
+            <a:r>
+              <a:rPr/>
+              <a:t>If you have multiple input files (e.g., </a:t>
+            </a:r>
+            <a:r>
+              <a:rPr>
+                <a:hlinkClick r:id="rId4"/>
+              </a:rPr>
+              <a:t>blog</a:t>
+            </a:r>
+            <a:r>
+              <a:rPr/>
+              <a:t> or book), you can create a </a:t>
+            </a:r>
+            <a:r>
+              <a:rPr>
+                <a:hlinkClick r:id="rId5"/>
+              </a:rPr>
+              <a:t>project</a:t>
+            </a:r>
+            <a:r>
+              <a:rPr/>
+              <a:t>. This allows rendering multiple files that link to each other.</a:t>
+            </a:r>
+          </a:p>
+          <a:p>
+            <a:pPr lvl="0"/>
+            <a:r>
+              <a:rPr/>
+              <a:t>Projects can have pre- and post-render steps in Python, R, Lua and shell script</a:t>
             </a:r>
           </a:p>
         </p:txBody>
@@ -10907,6 +11003,130 @@
             <a:r>
               <a:rPr/>
               <a:t>Donald Knuth’s Literate Programming</a:t>
+            </a:r>
+          </a:p>
+        </p:txBody>
+      </p:sp>
+    </p:spTree>
+  </p:cSld>
+</p:sld>
+</file>
+
+<file path=ppt/slides/slide40.xml><?xml version="1.0" encoding="utf-8"?>
+<p:sld xmlns:a="http://schemas.openxmlformats.org/drawingml/2006/main" xmlns:r="http://schemas.openxmlformats.org/officeDocument/2006/relationships" xmlns:p="http://schemas.openxmlformats.org/presentationml/2006/main">
+  <p:cSld>
+    <p:spTree>
+      <p:nvGrpSpPr>
+        <p:cNvPr id="1" name=""/>
+        <p:cNvGrpSpPr/>
+        <p:nvPr/>
+      </p:nvGrpSpPr>
+      <p:grpSpPr>
+        <a:xfrm>
+          <a:off x="0" y="0"/>
+          <a:ext cx="0" cy="0"/>
+          <a:chOff x="0" y="0"/>
+          <a:chExt cx="0" cy="0"/>
+        </a:xfrm>
+      </p:grpSpPr>
+      <p:sp>
+        <p:nvSpPr>
+          <p:cNvPr id="2" name="Title 1"/>
+          <p:cNvSpPr>
+            <a:spLocks noGrp="1"/>
+          </p:cNvSpPr>
+          <p:nvPr>
+            <p:ph type="title"/>
+          </p:nvPr>
+        </p:nvSpPr>
+        <p:spPr>
+          <a:xfrm>
+            <a:off x="722313" y="3305176"/>
+            <a:ext cx="7772400" cy="1021556"/>
+          </a:xfrm>
+        </p:spPr>
+        <p:txBody>
+          <a:bodyPr/>
+          <a:lstStyle/>
+          <a:p>
+            <a:pPr lvl="0" indent="0" marL="0">
+              <a:buNone/>
+            </a:pPr>
+            <a:r>
+              <a:rPr/>
+              <a:t>THANK YOU</a:t>
+            </a:r>
+          </a:p>
+        </p:txBody>
+      </p:sp>
+    </p:spTree>
+  </p:cSld>
+</p:sld>
+</file>
+
+<file path=ppt/slides/slide41.xml><?xml version="1.0" encoding="utf-8"?>
+<p:sld xmlns:a="http://schemas.openxmlformats.org/drawingml/2006/main" xmlns:r="http://schemas.openxmlformats.org/officeDocument/2006/relationships" xmlns:p="http://schemas.openxmlformats.org/presentationml/2006/main">
+  <p:cSld>
+    <p:spTree>
+      <p:nvGrpSpPr>
+        <p:cNvPr id="1" name=""/>
+        <p:cNvGrpSpPr/>
+        <p:nvPr/>
+      </p:nvGrpSpPr>
+      <p:grpSpPr>
+        <a:xfrm>
+          <a:off x="0" y="0"/>
+          <a:ext cx="0" cy="0"/>
+          <a:chOff x="0" y="0"/>
+          <a:chExt cx="0" cy="0"/>
+        </a:xfrm>
+      </p:grpSpPr>
+      <p:sp>
+        <p:nvSpPr>
+          <p:cNvPr id="2" name="Title 1"/>
+          <p:cNvSpPr>
+            <a:spLocks noGrp="1"/>
+          </p:cNvSpPr>
+          <p:nvPr>
+            <p:ph type="title"/>
+          </p:nvPr>
+        </p:nvSpPr>
+        <p:spPr/>
+        <p:txBody>
+          <a:bodyPr/>
+          <a:lstStyle/>
+          <a:p>
+            <a:pPr lvl="0" indent="0" marL="0">
+              <a:buNone/>
+            </a:pPr>
+            <a:r>
+              <a:rPr/>
+              <a:t>Notes</a:t>
+            </a:r>
+          </a:p>
+        </p:txBody>
+      </p:sp>
+      <p:sp>
+        <p:nvSpPr>
+          <p:cNvPr id="3" name="Content Placeholder 2"/>
+          <p:cNvSpPr>
+            <a:spLocks noGrp="1"/>
+          </p:cNvSpPr>
+          <p:nvPr>
+            <p:ph idx="1"/>
+          </p:nvPr>
+        </p:nvSpPr>
+        <p:spPr/>
+        <p:txBody>
+          <a:bodyPr/>
+          <a:lstStyle/>
+          <a:p>
+            <a:pPr lvl="0" indent="0" marL="0">
+              <a:buNone/>
+            </a:pPr>
+            <a:r>
+              <a:rPr sz="1800"/>
+              <a:t>1. You can use footnotes in presentations and websites, too</a:t>
             </a:r>
           </a:p>
         </p:txBody>

</xml_diff>

<commit_message>
Work done by Mon Jul  4 10:33:47 PDT 2022
</commit_message>
<xml_diff>
--- a/docs/presentation-orig.pptx
+++ b/docs/presentation-orig.pptx
@@ -9787,7 +9787,27 @@
             </a:pPr>
             <a:r>
               <a:rPr/>
-              <a:t>The [Quarto guide] has a great section on [cross-references]. I cover only the main points.</a:t>
+              <a:t>The </a:t>
+            </a:r>
+            <a:r>
+              <a:rPr>
+                <a:hlinkClick r:id="rId2"/>
+              </a:rPr>
+              <a:t>Quarto guide</a:t>
+            </a:r>
+            <a:r>
+              <a:rPr/>
+              <a:t> has a great section on </a:t>
+            </a:r>
+            <a:r>
+              <a:rPr>
+                <a:hlinkClick r:id="rId3"/>
+              </a:rPr>
+              <a:t>cross-references</a:t>
+            </a:r>
+            <a:r>
+              <a:rPr/>
+              <a:t>. I cover only the main points.</a:t>
             </a:r>
           </a:p>
           <a:p>
@@ -10686,6 +10706,20 @@
 <file path=ppt/slides/slide38.xml><?xml version="1.0" encoding="utf-8"?>
 <p:sld xmlns:a="http://schemas.openxmlformats.org/drawingml/2006/main" xmlns:r="http://schemas.openxmlformats.org/officeDocument/2006/relationships" xmlns:p="http://schemas.openxmlformats.org/presentationml/2006/main">
   <p:cSld>
+    <p:bg>
+      <p:bgPr>
+        <a:blipFill dpi="0" rotWithShape="1">
+          <a:blip r:embed="rId2">
+            <a:lum/>
+          </a:blip>
+          <a:srcRect/>
+          <a:stretch>
+            <a:fillRect l="-6000" r="-6000"/>
+          </a:stretch>
+        </a:blipFill>
+        <a:effectsLst/>
+      </p:bgPr>
+    </p:bg>
     <p:spTree>
       <p:nvGrpSpPr>
         <p:cNvPr id="1" name=""/>
@@ -10702,6 +10736,31 @@
       </p:grpSpPr>
       <p:sp>
         <p:nvSpPr>
+          <p:cNvPr id="2" name="Title 1"/>
+          <p:cNvSpPr>
+            <a:spLocks noGrp="1"/>
+          </p:cNvSpPr>
+          <p:nvPr>
+            <p:ph type="title"/>
+          </p:nvPr>
+        </p:nvSpPr>
+        <p:spPr/>
+        <p:txBody>
+          <a:bodyPr/>
+          <a:lstStyle/>
+          <a:p>
+            <a:pPr lvl="0" indent="0" marL="0">
+              <a:buNone/>
+            </a:pPr>
+            <a:r>
+              <a:rPr/>
+              <a:t>Hacks</a:t>
+            </a:r>
+          </a:p>
+        </p:txBody>
+      </p:sp>
+      <p:sp>
+        <p:nvSpPr>
           <p:cNvPr id="3" name="Content Placeholder 2"/>
           <p:cNvSpPr>
             <a:spLocks noGrp="1"/>
@@ -10720,7 +10779,97 @@
             </a:pPr>
             <a:r>
               <a:rPr/>
-              <a:t>{{&lt; include slides/_hacks.qmd &gt;&gt;}}</a:t>
+              <a:t>Quarto is under active development, and quickly reaching v1.0. While creating this content, I had to do some workarounds.</a:t>
+            </a:r>
+          </a:p>
+          <a:p>
+            <a:pPr lvl="0" indent="-342900" marL="342900">
+              <a:buAutoNum type="arabicPeriod"/>
+            </a:pPr>
+            <a:r>
+              <a:rPr/>
+              <a:t>To ensure I always have the latest version, I created a quick script that downloads and installs Quarto.</a:t>
+            </a:r>
+          </a:p>
+          <a:p>
+            <a:pPr lvl="0" indent="-342900" marL="342900">
+              <a:buAutoNum type="arabicPeriod"/>
+            </a:pPr>
+            <a:r>
+              <a:rPr/>
+              <a:t>Mermaid diagrams were not rendering in PowerPoints. I submitted a bug and it was quickly fixed.</a:t>
+            </a:r>
+          </a:p>
+          <a:p>
+            <a:pPr lvl="0" indent="-342900" marL="342900">
+              <a:buAutoNum type="arabicPeriod"/>
+            </a:pPr>
+            <a:r>
+              <a:rPr/>
+              <a:t>Mermaid diagrams require refreshing RevealJS pages twice, at least in Edge. I didn’t yet submit a bug about this.</a:t>
+            </a:r>
+          </a:p>
+          <a:p>
+            <a:pPr lvl="0" indent="-342900" marL="342900">
+              <a:buAutoNum type="arabicPeriod"/>
+            </a:pPr>
+            <a:r>
+              <a:rPr/>
+              <a:t>When creating a HTML website and a HTML RevealJS presentation from the same source, only one keeps the images.</a:t>
+            </a:r>
+          </a:p>
+          <a:p>
+            <a:pPr lvl="1"/>
+            <a:r>
+              <a:rPr/>
+              <a:t>Workaround: force both to be </a:t>
+            </a:r>
+            <a:r>
+              <a:rPr>
+                <a:latin typeface="Consolas"/>
+              </a:rPr>
+              <a:t>self-contained</a:t>
+            </a:r>
+            <a:r>
+              <a:rPr/>
+              <a:t>, by adding </a:t>
+            </a:r>
+            <a:r>
+              <a:rPr>
+                <a:latin typeface="Consolas"/>
+              </a:rPr>
+              <a:t>self-contained: true</a:t>
+            </a:r>
+            <a:r>
+              <a:rPr/>
+              <a:t> to the YAML front-matter</a:t>
+            </a:r>
+          </a:p>
+          <a:p>
+            <a:pPr lvl="0" indent="-342900" marL="342900">
+              <a:buAutoNum type="arabicPeriod"/>
+            </a:pPr>
+            <a:r>
+              <a:rPr/>
+              <a:t>Pandoc doesn’t have a way to control the monospaced font size for PowerPoint. I wrote a script to do that.</a:t>
+            </a:r>
+          </a:p>
+          <a:p>
+            <a:pPr lvl="0" indent="-342900" marL="342900">
+              <a:buAutoNum type="arabicPeriod"/>
+            </a:pPr>
+            <a:r>
+              <a:rPr/>
+              <a:t>The decorations on this slide (background color, background image) only appear on RevealJS, no workaround.</a:t>
+            </a:r>
+          </a:p>
+          <a:p>
+            <a:pPr lvl="0" indent="-342900" marL="342900">
+              <a:buAutoNum type="arabicPeriod"/>
+            </a:pPr>
+            <a:r>
+              <a:rPr/>
+              <a:t>The slide with the two article figures renders weird in HTML but perfectly in PPTX. No workaround.</a:t>
             </a:r>
           </a:p>
         </p:txBody>

</xml_diff>

<commit_message>
Work done by Mon Jul  4 10:46:05 PDT 2022
</commit_message>
<xml_diff>
--- a/docs/presentation-orig.pptx
+++ b/docs/presentation-orig.pptx
@@ -10788,7 +10788,7 @@
             </a:pPr>
             <a:r>
               <a:rPr/>
-              <a:t>To ensure I always have the latest version, I created a quick script that downloads and installs Quarto.</a:t>
+              <a:t>I create a script to quickly install the latest version</a:t>
             </a:r>
           </a:p>
           <a:p>
@@ -10797,7 +10797,7 @@
             </a:pPr>
             <a:r>
               <a:rPr/>
-              <a:t>Mermaid diagrams were not rendering in PowerPoints. I submitted a bug and it was quickly fixed.</a:t>
+              <a:t>Mermaid diagrams were blank in PPTX. I opened an issue that was quickly fixed.</a:t>
             </a:r>
           </a:p>
           <a:p>
@@ -10806,7 +10806,7 @@
             </a:pPr>
             <a:r>
               <a:rPr/>
-              <a:t>Mermaid diagrams require refreshing RevealJS pages twice, at least in Edge. I didn’t yet submit a bug about this.</a:t>
+              <a:t>Mermaid diagrams need refresh in RevealJS. I didn’t submit an issue yet.</a:t>
             </a:r>
           </a:p>
           <a:p>
@@ -10815,24 +10815,14 @@
             </a:pPr>
             <a:r>
               <a:rPr/>
-              <a:t>When creating a HTML website and a HTML RevealJS presentation from the same source, only one keeps the images.</a:t>
+              <a:t>Creating a HTML website &amp; HTML RevealJS from the same source, images disappear</a:t>
             </a:r>
           </a:p>
           <a:p>
             <a:pPr lvl="1"/>
             <a:r>
               <a:rPr/>
-              <a:t>Workaround: force both to be </a:t>
-            </a:r>
-            <a:r>
-              <a:rPr>
-                <a:latin typeface="Consolas"/>
-              </a:rPr>
-              <a:t>self-contained</a:t>
-            </a:r>
-            <a:r>
-              <a:rPr/>
-              <a:t>, by adding </a:t>
+              <a:t>Workaround: add </a:t>
             </a:r>
             <a:r>
               <a:rPr>
@@ -10842,7 +10832,7 @@
             </a:r>
             <a:r>
               <a:rPr/>
-              <a:t> to the YAML front-matter</a:t>
+              <a:t> to the YAML front-matter of both</a:t>
             </a:r>
           </a:p>
           <a:p>
@@ -10851,7 +10841,7 @@
             </a:pPr>
             <a:r>
               <a:rPr/>
-              <a:t>Pandoc doesn’t have a way to control the monospaced font size for PowerPoint. I wrote a script to do that.</a:t>
+              <a:t>Pandoc can’t change monospaced font size in PowerPoint. I wrote a script.</a:t>
             </a:r>
           </a:p>
           <a:p>
@@ -10860,7 +10850,7 @@
             </a:pPr>
             <a:r>
               <a:rPr/>
-              <a:t>The decorations on this slide (background color, background image) only appear on RevealJS, no workaround.</a:t>
+              <a:t>The decorations on this slide only appear on RevealJS, no workaround.</a:t>
             </a:r>
           </a:p>
           <a:p>
@@ -10869,7 +10859,7 @@
             </a:pPr>
             <a:r>
               <a:rPr/>
-              <a:t>The slide with the two article figures renders weird in HTML but perfectly in PPTX. No workaround.</a:t>
+              <a:t>The slide with the article screenshots render weird in HTML. No workaround.</a:t>
             </a:r>
           </a:p>
         </p:txBody>

</xml_diff>

<commit_message>
Work done by Mon Jul  4 10:52:42 PDT 2022
</commit_message>
<xml_diff>
--- a/docs/presentation-orig.pptx
+++ b/docs/presentation-orig.pptx
@@ -10797,7 +10797,7 @@
             </a:pPr>
             <a:r>
               <a:rPr/>
-              <a:t>Mermaid diagrams were blank in PPTX. I opened an issue that was quickly fixed.</a:t>
+              <a:t>Mermaid diagrams blank in PPTX. Issue quickly fixed.</a:t>
             </a:r>
           </a:p>
           <a:p>
@@ -10806,7 +10806,7 @@
             </a:pPr>
             <a:r>
               <a:rPr/>
-              <a:t>Mermaid diagrams need refresh in RevealJS. I didn’t submit an issue yet.</a:t>
+              <a:t>Mermaid diagrams blank in RevealJS. Workaround: refresh.</a:t>
             </a:r>
           </a:p>
           <a:p>
@@ -10815,7 +10815,7 @@
             </a:pPr>
             <a:r>
               <a:rPr/>
-              <a:t>Creating a HTML website &amp; HTML RevealJS from the same source, images disappear</a:t>
+              <a:t>HTML website and RevealJS from same source: images disappear</a:t>
             </a:r>
           </a:p>
           <a:p>
@@ -10832,7 +10832,7 @@
             </a:r>
             <a:r>
               <a:rPr/>
-              <a:t> to the YAML front-matter of both</a:t>
+              <a:t> to YAML front-matter</a:t>
             </a:r>
           </a:p>
           <a:p>
@@ -10841,7 +10841,7 @@
             </a:pPr>
             <a:r>
               <a:rPr/>
-              <a:t>Pandoc can’t change monospaced font size in PowerPoint. I wrote a script.</a:t>
+              <a:t>Pandoc large monospaced font size in PowerPoint. Workaround: script.</a:t>
             </a:r>
           </a:p>
           <a:p>
@@ -10859,7 +10859,7 @@
             </a:pPr>
             <a:r>
               <a:rPr/>
-              <a:t>The slide with the article screenshots render weird in HTML. No workaround.</a:t>
+              <a:t>Slide with article screenshots renders weird in HTML, no workaround.</a:t>
             </a:r>
           </a:p>
         </p:txBody>

</xml_diff>

<commit_message>
Work done by Mon Jul  4 10:59:05 PDT 2022
</commit_message>
<xml_diff>
--- a/docs/presentation-orig.pptx
+++ b/docs/presentation-orig.pptx
@@ -10706,20 +10706,6 @@
 <file path=ppt/slides/slide38.xml><?xml version="1.0" encoding="utf-8"?>
 <p:sld xmlns:a="http://schemas.openxmlformats.org/drawingml/2006/main" xmlns:r="http://schemas.openxmlformats.org/officeDocument/2006/relationships" xmlns:p="http://schemas.openxmlformats.org/presentationml/2006/main">
   <p:cSld>
-    <p:bg>
-      <p:bgPr>
-        <a:blipFill dpi="0" rotWithShape="1">
-          <a:blip r:embed="rId2">
-            <a:lum/>
-          </a:blip>
-          <a:srcRect/>
-          <a:stretch>
-            <a:fillRect l="-6000" r="-6000"/>
-          </a:stretch>
-        </a:blipFill>
-        <a:effectsLst/>
-      </p:bgPr>
-    </p:bg>
     <p:spTree>
       <p:nvGrpSpPr>
         <p:cNvPr id="1" name=""/>
@@ -10736,12 +10722,12 @@
       </p:grpSpPr>
       <p:sp>
         <p:nvSpPr>
-          <p:cNvPr id="2" name="Title 1"/>
-          <p:cNvSpPr>
-            <a:spLocks noGrp="1"/>
-          </p:cNvSpPr>
-          <p:nvPr>
-            <p:ph type="title"/>
+          <p:cNvPr id="3" name="Content Placeholder 2"/>
+          <p:cNvSpPr>
+            <a:spLocks noGrp="1"/>
+          </p:cNvSpPr>
+          <p:nvPr>
+            <p:ph idx="1"/>
           </p:nvPr>
         </p:nvSpPr>
         <p:spPr/>
@@ -10750,29 +10736,16 @@
           <a:lstStyle/>
           <a:p>
             <a:pPr lvl="0" indent="0" marL="0">
-              <a:buNone/>
-            </a:pPr>
-            <a:r>
-              <a:rPr/>
+              <a:spcBef>
+                <a:spcPts val="3000"/>
+              </a:spcBef>
+              <a:buNone/>
+            </a:pPr>
+            <a:r>
+              <a:rPr b="1"/>
               <a:t>Hacks</a:t>
             </a:r>
           </a:p>
-        </p:txBody>
-      </p:sp>
-      <p:sp>
-        <p:nvSpPr>
-          <p:cNvPr id="3" name="Content Placeholder 2"/>
-          <p:cNvSpPr>
-            <a:spLocks noGrp="1"/>
-          </p:cNvSpPr>
-          <p:nvPr>
-            <p:ph idx="1"/>
-          </p:nvPr>
-        </p:nvSpPr>
-        <p:spPr/>
-        <p:txBody>
-          <a:bodyPr/>
-          <a:lstStyle/>
           <a:p>
             <a:pPr lvl="0" indent="0" marL="0">
               <a:buNone/>
@@ -10850,7 +10823,7 @@
             </a:pPr>
             <a:r>
               <a:rPr/>
-              <a:t>The decorations on this slide only appear on RevealJS, no workaround.</a:t>
+              <a:t>The decorations on this slide only appear on RevealJS, by design.</a:t>
             </a:r>
           </a:p>
           <a:p>

</xml_diff>

<commit_message>
Work done by Mon Jul  4 11:03:24 PDT 2022
</commit_message>
<xml_diff>
--- a/docs/presentation-orig.pptx
+++ b/docs/presentation-orig.pptx
@@ -10761,7 +10761,17 @@
             </a:pPr>
             <a:r>
               <a:rPr/>
-              <a:t>I create a script to quickly install the latest version</a:t>
+              <a:t>I created a </a:t>
+            </a:r>
+            <a:r>
+              <a:rPr>
+                <a:hlinkClick r:id="rId2"/>
+              </a:rPr>
+              <a:t>script</a:t>
+            </a:r>
+            <a:r>
+              <a:rPr/>
+              <a:t> to quickly install the latest version</a:t>
             </a:r>
           </a:p>
           <a:p>
@@ -10770,7 +10780,17 @@
             </a:pPr>
             <a:r>
               <a:rPr/>
-              <a:t>Mermaid diagrams blank in PPTX. Issue quickly fixed.</a:t>
+              <a:t>Mermaid diagrams blank in PPTX. </a:t>
+            </a:r>
+            <a:r>
+              <a:rPr>
+                <a:hlinkClick r:id="rId3"/>
+              </a:rPr>
+              <a:t>Bug</a:t>
+            </a:r>
+            <a:r>
+              <a:rPr/>
+              <a:t> quickly fixed.</a:t>
             </a:r>
           </a:p>
           <a:p>
@@ -10814,7 +10834,17 @@
             </a:pPr>
             <a:r>
               <a:rPr/>
-              <a:t>Pandoc large monospaced font size in PowerPoint. Workaround: script.</a:t>
+              <a:t>Pandoc large monospaced font size in PowerPoint. Workaround: </a:t>
+            </a:r>
+            <a:r>
+              <a:rPr>
+                <a:hlinkClick r:id="rId4"/>
+              </a:rPr>
+              <a:t>script</a:t>
+            </a:r>
+            <a:r>
+              <a:rPr/>
+              <a:t>.</a:t>
             </a:r>
           </a:p>
           <a:p>

</xml_diff>

<commit_message>
Work done by Mon Jul  4 11:13:36 PDT 2022
</commit_message>
<xml_diff>
--- a/docs/presentation-orig.pptx
+++ b/docs/presentation-orig.pptx
@@ -45,7 +45,6 @@
     <p:sldId id="293" r:id="rId39"/>
     <p:sldId id="294" r:id="rId40"/>
     <p:sldId id="295" r:id="rId41"/>
-    <p:sldId id="296" r:id="rId42"/>
   </p:sldIdLst>
   <p:sldSz cx="9144000" cy="5143500" type="screen16x9"/>
   <p:notesSz cx="6858000" cy="9144000"/>
@@ -10722,18 +10721,102 @@
       </p:grpSpPr>
       <p:sp>
         <p:nvSpPr>
-          <p:cNvPr id="3" name="Content Placeholder 2"/>
-          <p:cNvSpPr>
-            <a:spLocks noGrp="1"/>
-          </p:cNvSpPr>
-          <p:nvPr>
-            <p:ph idx="1"/>
+          <p:cNvPr id="2" name="Title 1"/>
+          <p:cNvSpPr>
+            <a:spLocks noGrp="1"/>
+          </p:cNvSpPr>
+          <p:nvPr>
+            <p:ph type="title"/>
           </p:nvPr>
         </p:nvSpPr>
         <p:spPr/>
         <p:txBody>
           <a:bodyPr/>
           <a:lstStyle/>
+          <a:p>
+            <a:pPr lvl="0" indent="0" marL="0">
+              <a:buNone/>
+            </a:pPr>
+            <a:r>
+              <a:rPr/>
+              <a:t>Next Steps</a:t>
+            </a:r>
+          </a:p>
+        </p:txBody>
+      </p:sp>
+      <p:sp>
+        <p:nvSpPr>
+          <p:cNvPr id="3" name="Content Placeholder 2"/>
+          <p:cNvSpPr>
+            <a:spLocks noGrp="1"/>
+          </p:cNvSpPr>
+          <p:nvPr>
+            <p:ph idx="1"/>
+          </p:nvPr>
+        </p:nvSpPr>
+        <p:spPr/>
+        <p:txBody>
+          <a:bodyPr/>
+          <a:lstStyle/>
+          <a:p>
+            <a:pPr lvl="0"/>
+            <a:r>
+              <a:rPr/>
+              <a:t>The Quarto website has great tutorials:</a:t>
+            </a:r>
+          </a:p>
+          <a:p>
+            <a:pPr lvl="1"/>
+            <a:r>
+              <a:rPr>
+                <a:hlinkClick r:id="rId2"/>
+              </a:rPr>
+              <a:t>Jupyter</a:t>
+            </a:r>
+          </a:p>
+          <a:p>
+            <a:pPr lvl="1"/>
+            <a:r>
+              <a:rPr>
+                <a:hlinkClick r:id="rId3"/>
+              </a:rPr>
+              <a:t>VSCode</a:t>
+            </a:r>
+          </a:p>
+          <a:p>
+            <a:pPr lvl="0"/>
+            <a:r>
+              <a:rPr/>
+              <a:t>If you have multiple input files (e.g., </a:t>
+            </a:r>
+            <a:r>
+              <a:rPr>
+                <a:hlinkClick r:id="rId4"/>
+              </a:rPr>
+              <a:t>blog</a:t>
+            </a:r>
+            <a:r>
+              <a:rPr/>
+              <a:t> or book), you can create a </a:t>
+            </a:r>
+            <a:r>
+              <a:rPr>
+                <a:hlinkClick r:id="rId5"/>
+              </a:rPr>
+              <a:t>project</a:t>
+            </a:r>
+            <a:r>
+              <a:rPr/>
+              <a:t>. This allows rendering multiple files that link to each other.</a:t>
+            </a:r>
+          </a:p>
+          <a:p>
+            <a:pPr lvl="0"/>
+            <a:r>
+              <a:rPr/>
+              <a:t>Projects can have pre- and post-render steps in Python, R, Lua and shell script</a:t>
+            </a:r>
+          </a:p>
           <a:p>
             <a:pPr lvl="0" indent="0" marL="0">
               <a:spcBef>
@@ -10765,7 +10848,7 @@
             </a:r>
             <a:r>
               <a:rPr>
-                <a:hlinkClick r:id="rId2"/>
+                <a:hlinkClick r:id="rId6"/>
               </a:rPr>
               <a:t>script</a:t>
             </a:r>
@@ -10784,7 +10867,7 @@
             </a:r>
             <a:r>
               <a:rPr>
-                <a:hlinkClick r:id="rId3"/>
+                <a:hlinkClick r:id="rId7"/>
               </a:rPr>
               <a:t>Bug</a:t>
             </a:r>
@@ -10838,7 +10921,138 @@
             </a:r>
             <a:r>
               <a:rPr>
-                <a:hlinkClick r:id="rId4"/>
+                <a:hlinkClick r:id="rId8"/>
+              </a:rPr>
+              <a:t>script</a:t>
+            </a:r>
+            <a:r>
+              <a:rPr/>
+              <a:t>.</a:t>
+            </a:r>
+          </a:p>
+          <a:p>
+            <a:pPr lvl="0" indent="-342900" marL="342900">
+              <a:buAutoNum type="arabicPeriod"/>
+            </a:pPr>
+            <a:r>
+              <a:rPr/>
+              <a:t>The decorations on this slide only appear on RevealJS, by design.</a:t>
+            </a:r>
+          </a:p>
+          <a:p>
+            <a:pPr lvl="0" indent="-342900" marL="342900">
+              <a:buAutoNum type="arabicPeriod"/>
+            </a:pPr>
+            <a:r>
+              <a:rPr/>
+              <a:t>Slide with article screenshots renders weird in HTML, no workaround.</a:t>
+            </a:r>
+          </a:p>
+          <a:p>
+            <a:pPr lvl="0" indent="0" marL="0">
+              <a:spcBef>
+                <a:spcPts val="3000"/>
+              </a:spcBef>
+              <a:buNone/>
+            </a:pPr>
+            <a:r>
+              <a:rPr b="1"/>
+              <a:t>Hacks</a:t>
+            </a:r>
+          </a:p>
+          <a:p>
+            <a:pPr lvl="0" indent="0" marL="0">
+              <a:buNone/>
+            </a:pPr>
+            <a:r>
+              <a:rPr/>
+              <a:t>Quarto is under active development, and quickly reaching v1.0. While creating this content, I had to do some workarounds.</a:t>
+            </a:r>
+          </a:p>
+          <a:p>
+            <a:pPr lvl="0" indent="-342900" marL="342900">
+              <a:buAutoNum type="arabicPeriod"/>
+            </a:pPr>
+            <a:r>
+              <a:rPr/>
+              <a:t>I created a </a:t>
+            </a:r>
+            <a:r>
+              <a:rPr>
+                <a:hlinkClick r:id="rId9"/>
+              </a:rPr>
+              <a:t>script</a:t>
+            </a:r>
+            <a:r>
+              <a:rPr/>
+              <a:t> to quickly install the latest version</a:t>
+            </a:r>
+          </a:p>
+          <a:p>
+            <a:pPr lvl="0" indent="-342900" marL="342900">
+              <a:buAutoNum type="arabicPeriod"/>
+            </a:pPr>
+            <a:r>
+              <a:rPr/>
+              <a:t>Mermaid diagrams blank in PPTX. </a:t>
+            </a:r>
+            <a:r>
+              <a:rPr>
+                <a:hlinkClick r:id="rId10"/>
+              </a:rPr>
+              <a:t>Bug</a:t>
+            </a:r>
+            <a:r>
+              <a:rPr/>
+              <a:t> quickly fixed.</a:t>
+            </a:r>
+          </a:p>
+          <a:p>
+            <a:pPr lvl="0" indent="-342900" marL="342900">
+              <a:buAutoNum type="arabicPeriod"/>
+            </a:pPr>
+            <a:r>
+              <a:rPr/>
+              <a:t>Mermaid diagrams blank in RevealJS. Workaround: refresh.</a:t>
+            </a:r>
+          </a:p>
+          <a:p>
+            <a:pPr lvl="0" indent="-342900" marL="342900">
+              <a:buAutoNum type="arabicPeriod"/>
+            </a:pPr>
+            <a:r>
+              <a:rPr/>
+              <a:t>HTML website and RevealJS from same source: images disappear</a:t>
+            </a:r>
+          </a:p>
+          <a:p>
+            <a:pPr lvl="1"/>
+            <a:r>
+              <a:rPr/>
+              <a:t>Workaround: add </a:t>
+            </a:r>
+            <a:r>
+              <a:rPr>
+                <a:latin typeface="Consolas"/>
+              </a:rPr>
+              <a:t>self-contained: true</a:t>
+            </a:r>
+            <a:r>
+              <a:rPr/>
+              <a:t> to YAML front-matter</a:t>
+            </a:r>
+          </a:p>
+          <a:p>
+            <a:pPr lvl="0" indent="-342900" marL="342900">
+              <a:buAutoNum type="arabicPeriod"/>
+            </a:pPr>
+            <a:r>
+              <a:rPr/>
+              <a:t>Pandoc large monospaced font size in PowerPoint. Workaround: </a:t>
+            </a:r>
+            <a:r>
+              <a:rPr>
+                <a:hlinkClick r:id="rId11"/>
               </a:rPr>
               <a:t>script</a:t>
             </a:r>
@@ -10899,7 +11113,12 @@
             <p:ph type="title"/>
           </p:nvPr>
         </p:nvSpPr>
-        <p:spPr/>
+        <p:spPr>
+          <a:xfrm>
+            <a:off x="722313" y="3305176"/>
+            <a:ext cx="7772400" cy="1021556"/>
+          </a:xfrm>
+        </p:spPr>
         <p:txBody>
           <a:bodyPr/>
           <a:lstStyle/>
@@ -10909,82 +11128,7 @@
             </a:pPr>
             <a:r>
               <a:rPr/>
-              <a:t>Next Steps</a:t>
-            </a:r>
-          </a:p>
-        </p:txBody>
-      </p:sp>
-      <p:sp>
-        <p:nvSpPr>
-          <p:cNvPr id="3" name="Content Placeholder 2"/>
-          <p:cNvSpPr>
-            <a:spLocks noGrp="1"/>
-          </p:cNvSpPr>
-          <p:nvPr>
-            <p:ph idx="1"/>
-          </p:nvPr>
-        </p:nvSpPr>
-        <p:spPr/>
-        <p:txBody>
-          <a:bodyPr/>
-          <a:lstStyle/>
-          <a:p>
-            <a:pPr lvl="0"/>
-            <a:r>
-              <a:rPr/>
-              <a:t>The Quarto website has great tutorials:</a:t>
-            </a:r>
-          </a:p>
-          <a:p>
-            <a:pPr lvl="1"/>
-            <a:r>
-              <a:rPr>
-                <a:hlinkClick r:id="rId2"/>
-              </a:rPr>
-              <a:t>Jupyter</a:t>
-            </a:r>
-          </a:p>
-          <a:p>
-            <a:pPr lvl="1"/>
-            <a:r>
-              <a:rPr>
-                <a:hlinkClick r:id="rId3"/>
-              </a:rPr>
-              <a:t>VSCode</a:t>
-            </a:r>
-          </a:p>
-          <a:p>
-            <a:pPr lvl="0"/>
-            <a:r>
-              <a:rPr/>
-              <a:t>If you have multiple input files (e.g., </a:t>
-            </a:r>
-            <a:r>
-              <a:rPr>
-                <a:hlinkClick r:id="rId4"/>
-              </a:rPr>
-              <a:t>blog</a:t>
-            </a:r>
-            <a:r>
-              <a:rPr/>
-              <a:t> or book), you can create a </a:t>
-            </a:r>
-            <a:r>
-              <a:rPr>
-                <a:hlinkClick r:id="rId5"/>
-              </a:rPr>
-              <a:t>project</a:t>
-            </a:r>
-            <a:r>
-              <a:rPr/>
-              <a:t>. This allows rendering multiple files that link to each other.</a:t>
-            </a:r>
-          </a:p>
-          <a:p>
-            <a:pPr lvl="0"/>
-            <a:r>
-              <a:rPr/>
-              <a:t>Projects can have pre- and post-render steps in Python, R, Lua and shell script</a:t>
+              <a:t>THANK YOU</a:t>
             </a:r>
           </a:p>
         </p:txBody>
@@ -11155,58 +11299,6 @@
 </file>
 
 <file path=ppt/slides/slide40.xml><?xml version="1.0" encoding="utf-8"?>
-<p:sld xmlns:a="http://schemas.openxmlformats.org/drawingml/2006/main" xmlns:r="http://schemas.openxmlformats.org/officeDocument/2006/relationships" xmlns:p="http://schemas.openxmlformats.org/presentationml/2006/main">
-  <p:cSld>
-    <p:spTree>
-      <p:nvGrpSpPr>
-        <p:cNvPr id="1" name=""/>
-        <p:cNvGrpSpPr/>
-        <p:nvPr/>
-      </p:nvGrpSpPr>
-      <p:grpSpPr>
-        <a:xfrm>
-          <a:off x="0" y="0"/>
-          <a:ext cx="0" cy="0"/>
-          <a:chOff x="0" y="0"/>
-          <a:chExt cx="0" cy="0"/>
-        </a:xfrm>
-      </p:grpSpPr>
-      <p:sp>
-        <p:nvSpPr>
-          <p:cNvPr id="2" name="Title 1"/>
-          <p:cNvSpPr>
-            <a:spLocks noGrp="1"/>
-          </p:cNvSpPr>
-          <p:nvPr>
-            <p:ph type="title"/>
-          </p:nvPr>
-        </p:nvSpPr>
-        <p:spPr>
-          <a:xfrm>
-            <a:off x="722313" y="3305176"/>
-            <a:ext cx="7772400" cy="1021556"/>
-          </a:xfrm>
-        </p:spPr>
-        <p:txBody>
-          <a:bodyPr/>
-          <a:lstStyle/>
-          <a:p>
-            <a:pPr lvl="0" indent="0" marL="0">
-              <a:buNone/>
-            </a:pPr>
-            <a:r>
-              <a:rPr/>
-              <a:t>THANK YOU</a:t>
-            </a:r>
-          </a:p>
-        </p:txBody>
-      </p:sp>
-    </p:spTree>
-  </p:cSld>
-</p:sld>
-</file>
-
-<file path=ppt/slides/slide41.xml><?xml version="1.0" encoding="utf-8"?>
 <p:sld xmlns:a="http://schemas.openxmlformats.org/drawingml/2006/main" xmlns:r="http://schemas.openxmlformats.org/officeDocument/2006/relationships" xmlns:p="http://schemas.openxmlformats.org/presentationml/2006/main">
   <p:cSld>
     <p:spTree>

</xml_diff>

<commit_message>
Work done by Mon Jul  4 11:14:23 PDT 2022
</commit_message>
<xml_diff>
--- a/docs/presentation-orig.pptx
+++ b/docs/presentation-orig.pptx
@@ -9143,10 +9143,6 @@
                 <a:hlinkClick r:id="rId4"/>
               </a:rPr>
               <a:t>LaTeX PDF output</a:t>
-            </a:r>
-            <a:r>
-              <a:rPr/>
-              <a:t> `</a:t>
             </a:r>
           </a:p>
         </p:txBody>

</xml_diff>

<commit_message>
Work done by Mon Jul  4 11:16:33 PDT 2022
</commit_message>
<xml_diff>
--- a/docs/presentation-orig.pptx
+++ b/docs/presentation-orig.pptx
@@ -10918,137 +10918,6 @@
             <a:r>
               <a:rPr>
                 <a:hlinkClick r:id="rId8"/>
-              </a:rPr>
-              <a:t>script</a:t>
-            </a:r>
-            <a:r>
-              <a:rPr/>
-              <a:t>.</a:t>
-            </a:r>
-          </a:p>
-          <a:p>
-            <a:pPr lvl="0" indent="-342900" marL="342900">
-              <a:buAutoNum type="arabicPeriod"/>
-            </a:pPr>
-            <a:r>
-              <a:rPr/>
-              <a:t>The decorations on this slide only appear on RevealJS, by design.</a:t>
-            </a:r>
-          </a:p>
-          <a:p>
-            <a:pPr lvl="0" indent="-342900" marL="342900">
-              <a:buAutoNum type="arabicPeriod"/>
-            </a:pPr>
-            <a:r>
-              <a:rPr/>
-              <a:t>Slide with article screenshots renders weird in HTML, no workaround.</a:t>
-            </a:r>
-          </a:p>
-          <a:p>
-            <a:pPr lvl="0" indent="0" marL="0">
-              <a:spcBef>
-                <a:spcPts val="3000"/>
-              </a:spcBef>
-              <a:buNone/>
-            </a:pPr>
-            <a:r>
-              <a:rPr b="1"/>
-              <a:t>Hacks</a:t>
-            </a:r>
-          </a:p>
-          <a:p>
-            <a:pPr lvl="0" indent="0" marL="0">
-              <a:buNone/>
-            </a:pPr>
-            <a:r>
-              <a:rPr/>
-              <a:t>Quarto is under active development, and quickly reaching v1.0. While creating this content, I had to do some workarounds.</a:t>
-            </a:r>
-          </a:p>
-          <a:p>
-            <a:pPr lvl="0" indent="-342900" marL="342900">
-              <a:buAutoNum type="arabicPeriod"/>
-            </a:pPr>
-            <a:r>
-              <a:rPr/>
-              <a:t>I created a </a:t>
-            </a:r>
-            <a:r>
-              <a:rPr>
-                <a:hlinkClick r:id="rId9"/>
-              </a:rPr>
-              <a:t>script</a:t>
-            </a:r>
-            <a:r>
-              <a:rPr/>
-              <a:t> to quickly install the latest version</a:t>
-            </a:r>
-          </a:p>
-          <a:p>
-            <a:pPr lvl="0" indent="-342900" marL="342900">
-              <a:buAutoNum type="arabicPeriod"/>
-            </a:pPr>
-            <a:r>
-              <a:rPr/>
-              <a:t>Mermaid diagrams blank in PPTX. </a:t>
-            </a:r>
-            <a:r>
-              <a:rPr>
-                <a:hlinkClick r:id="rId10"/>
-              </a:rPr>
-              <a:t>Bug</a:t>
-            </a:r>
-            <a:r>
-              <a:rPr/>
-              <a:t> quickly fixed.</a:t>
-            </a:r>
-          </a:p>
-          <a:p>
-            <a:pPr lvl="0" indent="-342900" marL="342900">
-              <a:buAutoNum type="arabicPeriod"/>
-            </a:pPr>
-            <a:r>
-              <a:rPr/>
-              <a:t>Mermaid diagrams blank in RevealJS. Workaround: refresh.</a:t>
-            </a:r>
-          </a:p>
-          <a:p>
-            <a:pPr lvl="0" indent="-342900" marL="342900">
-              <a:buAutoNum type="arabicPeriod"/>
-            </a:pPr>
-            <a:r>
-              <a:rPr/>
-              <a:t>HTML website and RevealJS from same source: images disappear</a:t>
-            </a:r>
-          </a:p>
-          <a:p>
-            <a:pPr lvl="1"/>
-            <a:r>
-              <a:rPr/>
-              <a:t>Workaround: add </a:t>
-            </a:r>
-            <a:r>
-              <a:rPr>
-                <a:latin typeface="Consolas"/>
-              </a:rPr>
-              <a:t>self-contained: true</a:t>
-            </a:r>
-            <a:r>
-              <a:rPr/>
-              <a:t> to YAML front-matter</a:t>
-            </a:r>
-          </a:p>
-          <a:p>
-            <a:pPr lvl="0" indent="-342900" marL="342900">
-              <a:buAutoNum type="arabicPeriod"/>
-            </a:pPr>
-            <a:r>
-              <a:rPr/>
-              <a:t>Pandoc large monospaced font size in PowerPoint. Workaround: </a:t>
-            </a:r>
-            <a:r>
-              <a:rPr>
-                <a:hlinkClick r:id="rId11"/>
               </a:rPr>
               <a:t>script</a:t>
             </a:r>

</xml_diff>

<commit_message>
Work done by Mon Jul  4 11:23:29 PDT 2022
</commit_message>
<xml_diff>
--- a/docs/presentation-orig.pptx
+++ b/docs/presentation-orig.pptx
@@ -45,6 +45,12 @@
     <p:sldId id="293" r:id="rId39"/>
     <p:sldId id="294" r:id="rId40"/>
     <p:sldId id="295" r:id="rId41"/>
+    <p:sldId id="296" r:id="rId42"/>
+    <p:sldId id="297" r:id="rId43"/>
+    <p:sldId id="298" r:id="rId44"/>
+    <p:sldId id="299" r:id="rId45"/>
+    <p:sldId id="300" r:id="rId46"/>
+    <p:sldId id="301" r:id="rId47"/>
   </p:sldIdLst>
   <p:sldSz cx="9144000" cy="5143500" type="screen16x9"/>
   <p:notesSz cx="6858000" cy="9144000"/>
@@ -8534,15 +8540,6 @@
               <a:t>))</a:t>
             </a:r>
           </a:p>
-          <a:p>
-            <a:pPr lvl="0" indent="0" marL="0">
-              <a:buNone/>
-            </a:pPr>
-            <a:r>
-              <a:rPr/>
-              <a:t>{{&lt; include _dynamic-content.qmd &gt;&gt;}}</a:t>
-            </a:r>
-          </a:p>
         </p:txBody>
       </p:sp>
     </p:spTree>
@@ -8577,12 +8574,7 @@
             <p:ph type="title"/>
           </p:nvPr>
         </p:nvSpPr>
-        <p:spPr>
-          <a:xfrm>
-            <a:off x="722313" y="3305176"/>
-            <a:ext cx="7772400" cy="1021556"/>
-          </a:xfrm>
-        </p:spPr>
+        <p:spPr/>
         <p:txBody>
           <a:bodyPr/>
           <a:lstStyle/>
@@ -8592,11 +8584,71 @@
             </a:pPr>
             <a:r>
               <a:rPr/>
-              <a:t>Generating a website</a:t>
-            </a:r>
-          </a:p>
-        </p:txBody>
-      </p:sp>
+              <a:t>Age and Population Pyramids for Belgium</a:t>
+            </a:r>
+          </a:p>
+        </p:txBody>
+      </p:sp>
+      <p:pic>
+        <p:nvPicPr>
+          <p:cNvPr descr="presentation_files/figure-pptx/cell-8-output-4.png" id="0" name="Picture 1"/>
+          <p:cNvPicPr>
+            <a:picLocks noGrp="1" noChangeAspect="1"/>
+          </p:cNvPicPr>
+          <p:nvPr/>
+        </p:nvPicPr>
+        <p:blipFill>
+          <a:blip r:embed="rId2"/>
+          <a:stretch>
+            <a:fillRect/>
+          </a:stretch>
+        </p:blipFill>
+        <p:spPr bwMode="auto">
+          <a:xfrm>
+            <a:off x="457200" y="1524000"/>
+            <a:ext cx="4038600" cy="2730500"/>
+          </a:xfrm>
+          <a:prstGeom prst="rect">
+            <a:avLst/>
+          </a:prstGeom>
+          <a:noFill/>
+          <a:ln w="9525">
+            <a:noFill/>
+            <a:headEnd/>
+            <a:tailEnd/>
+          </a:ln>
+        </p:spPr>
+      </p:pic>
+      <p:pic>
+        <p:nvPicPr>
+          <p:cNvPr descr="presentation_files/figure-pptx/cell-8-output-7.png" id="0" name="Picture 1"/>
+          <p:cNvPicPr>
+            <a:picLocks noGrp="1" noChangeAspect="1"/>
+          </p:cNvPicPr>
+          <p:nvPr/>
+        </p:nvPicPr>
+        <p:blipFill>
+          <a:blip r:embed="rId3"/>
+          <a:stretch>
+            <a:fillRect/>
+          </a:stretch>
+        </p:blipFill>
+        <p:spPr bwMode="auto">
+          <a:xfrm>
+            <a:off x="4648200" y="1549400"/>
+            <a:ext cx="4038600" cy="2679700"/>
+          </a:xfrm>
+          <a:prstGeom prst="rect">
+            <a:avLst/>
+          </a:prstGeom>
+          <a:noFill/>
+          <a:ln w="9525">
+            <a:noFill/>
+            <a:headEnd/>
+            <a:tailEnd/>
+          </a:ln>
+        </p:spPr>
+      </p:pic>
     </p:spTree>
   </p:cSld>
 </p:sld>
@@ -8639,283 +8691,1074 @@
             </a:pPr>
             <a:r>
               <a:rPr/>
-              <a:t>One-liner creates a website</a:t>
-            </a:r>
-          </a:p>
-        </p:txBody>
-      </p:sp>
-      <p:sp>
-        <p:nvSpPr>
-          <p:cNvPr id="3" name="Content Placeholder 2"/>
-          <p:cNvSpPr>
-            <a:spLocks noGrp="1"/>
-          </p:cNvSpPr>
-          <p:nvPr>
-            <p:ph idx="1"/>
-          </p:nvPr>
-        </p:nvSpPr>
-        <p:spPr/>
-        <p:txBody>
-          <a:bodyPr/>
-          <a:lstStyle/>
-          <a:p>
-            <a:pPr lvl="0" indent="0">
-              <a:buNone/>
-            </a:pPr>
-            <a:r>
-              <a:rPr>
-                <a:solidFill>
-                  <a:srgbClr val="AD0000"/>
-                </a:solidFill>
-                <a:latin typeface="Consolas"/>
-              </a:rPr>
-              <a:t>---</a:t>
-            </a:r>
-            <a:br/>
-            <a:r>
-              <a:rPr>
-                <a:solidFill>
-                  <a:srgbClr val="4758AB"/>
-                </a:solidFill>
-                <a:latin typeface="Consolas"/>
-              </a:rPr>
-              <a:t>title</a:t>
-            </a:r>
-            <a:r>
-              <a:rPr>
-                <a:solidFill>
-                  <a:srgbClr val="003B4F"/>
-                </a:solidFill>
-                <a:latin typeface="Consolas"/>
-              </a:rPr>
-              <a:t>:</a:t>
-            </a:r>
-            <a:r>
-              <a:rPr>
-                <a:solidFill>
-                  <a:srgbClr val="657422"/>
-                </a:solidFill>
-                <a:latin typeface="Consolas"/>
-              </a:rPr>
-              <a:t> </a:t>
-            </a:r>
-            <a:r>
-              <a:rPr>
-                <a:solidFill>
-                  <a:srgbClr val="20794D"/>
-                </a:solidFill>
-                <a:latin typeface="Consolas"/>
-              </a:rPr>
-              <a:t>"Quarto with Python"</a:t>
-            </a:r>
-            <a:br/>
-            <a:r>
-              <a:rPr>
-                <a:solidFill>
-                  <a:srgbClr val="4758AB"/>
-                </a:solidFill>
-                <a:latin typeface="Consolas"/>
-              </a:rPr>
-              <a:t>format</a:t>
-            </a:r>
-            <a:r>
-              <a:rPr>
-                <a:solidFill>
-                  <a:srgbClr val="003B4F"/>
-                </a:solidFill>
-                <a:latin typeface="Consolas"/>
-              </a:rPr>
-              <a:t>:</a:t>
-            </a:r>
-            <a:r>
-              <a:rPr>
-                <a:solidFill>
-                  <a:srgbClr val="657422"/>
-                </a:solidFill>
-                <a:latin typeface="Consolas"/>
-              </a:rPr>
-              <a:t> html</a:t>
-            </a:r>
-            <a:br/>
-            <a:r>
-              <a:rPr>
-                <a:solidFill>
-                  <a:srgbClr val="5E5E5E"/>
-                </a:solidFill>
-                <a:latin typeface="Consolas"/>
-              </a:rPr>
-              <a:t>    # revealjs:</a:t>
-            </a:r>
-            <a:br/>
-            <a:r>
-              <a:rPr>
-                <a:solidFill>
-                  <a:srgbClr val="5E5E5E"/>
-                </a:solidFill>
-                <a:latin typeface="Consolas"/>
-              </a:rPr>
-              <a:t>    #     incremental: false</a:t>
-            </a:r>
-            <a:br/>
-            <a:r>
-              <a:rPr>
-                <a:solidFill>
-                  <a:srgbClr val="5E5E5E"/>
-                </a:solidFill>
-                <a:latin typeface="Consolas"/>
-              </a:rPr>
-              <a:t>    #     theme: [simple, revealjs-customizations.scss]</a:t>
-            </a:r>
-            <a:br/>
-            <a:r>
-              <a:rPr>
-                <a:solidFill>
-                  <a:srgbClr val="5E5E5E"/>
-                </a:solidFill>
-                <a:latin typeface="Consolas"/>
-              </a:rPr>
-              <a:t>    #     title-slide-attributes:</a:t>
-            </a:r>
-            <a:br/>
-            <a:r>
-              <a:rPr>
-                <a:solidFill>
-                  <a:srgbClr val="5E5E5E"/>
-                </a:solidFill>
-                <a:latin typeface="Consolas"/>
-              </a:rPr>
-              <a:t>    #         data-background-image: images/data-viz-bg.jpg</a:t>
-            </a:r>
-            <a:br/>
-            <a:r>
-              <a:rPr>
-                <a:solidFill>
-                  <a:srgbClr val="5E5E5E"/>
-                </a:solidFill>
-                <a:latin typeface="Consolas"/>
-              </a:rPr>
-              <a:t>    #         data-background-size: contain</a:t>
-            </a:r>
-            <a:br/>
-            <a:r>
-              <a:rPr>
-                <a:solidFill>
-                  <a:srgbClr val="5E5E5E"/>
-                </a:solidFill>
-                <a:latin typeface="Consolas"/>
-              </a:rPr>
-              <a:t>    #         data-background-position: right</a:t>
-            </a:r>
-            <a:br/>
-            <a:br/>
-            <a:r>
-              <a:rPr>
-                <a:solidFill>
-                  <a:srgbClr val="4758AB"/>
-                </a:solidFill>
-                <a:latin typeface="Consolas"/>
-              </a:rPr>
-              <a:t>author</a:t>
-            </a:r>
-            <a:r>
-              <a:rPr>
-                <a:solidFill>
-                  <a:srgbClr val="003B4F"/>
-                </a:solidFill>
-                <a:latin typeface="Consolas"/>
-              </a:rPr>
-              <a:t>:</a:t>
-            </a:r>
-            <a:r>
-              <a:rPr>
-                <a:solidFill>
-                  <a:srgbClr val="657422"/>
-                </a:solidFill>
-                <a:latin typeface="Consolas"/>
-              </a:rPr>
-              <a:t> Lucas A. Meyer</a:t>
-            </a:r>
-            <a:br/>
-            <a:r>
-              <a:rPr>
-                <a:solidFill>
-                  <a:srgbClr val="4758AB"/>
-                </a:solidFill>
-                <a:latin typeface="Consolas"/>
-              </a:rPr>
-              <a:t>date</a:t>
-            </a:r>
-            <a:r>
-              <a:rPr>
-                <a:solidFill>
-                  <a:srgbClr val="003B4F"/>
-                </a:solidFill>
-                <a:latin typeface="Consolas"/>
-              </a:rPr>
-              <a:t>:</a:t>
-            </a:r>
-            <a:r>
-              <a:rPr>
-                <a:solidFill>
-                  <a:srgbClr val="657422"/>
-                </a:solidFill>
-                <a:latin typeface="Consolas"/>
-              </a:rPr>
-              <a:t> 2022-07-14</a:t>
-            </a:r>
-            <a:br/>
-            <a:r>
-              <a:rPr>
-                <a:solidFill>
-                  <a:srgbClr val="AD0000"/>
-                </a:solidFill>
-                <a:latin typeface="Consolas"/>
-              </a:rPr>
-              <a:t>---</a:t>
-            </a:r>
-          </a:p>
-          <a:p>
-            <a:pPr lvl="0" indent="0" marL="0">
-              <a:buNone/>
-            </a:pPr>
-          </a:p>
-          <a:p>
-            <a:pPr lvl="0" indent="0" marL="0">
-              <a:buNone/>
-            </a:pPr>
-            <a:r>
-              <a:rPr/>
-              <a:t>Adding or changing the format to </a:t>
-            </a:r>
-            <a:r>
-              <a:rPr>
-                <a:latin typeface="Consolas"/>
-              </a:rPr>
-              <a:t>html</a:t>
-            </a:r>
-            <a:r>
-              <a:rPr/>
-              <a:t> will create a </a:t>
-            </a:r>
-            <a:r>
-              <a:rPr>
-                <a:hlinkClick r:id="rId2"/>
-              </a:rPr>
-              <a:t>website</a:t>
-            </a:r>
-            <a:r>
-              <a:rPr/>
-              <a:t>.</a:t>
-            </a:r>
-          </a:p>
-        </p:txBody>
-      </p:sp>
+              <a:t>Age and Population Pyramids for China</a:t>
+            </a:r>
+          </a:p>
+        </p:txBody>
+      </p:sp>
+      <p:pic>
+        <p:nvPicPr>
+          <p:cNvPr descr="presentation_files/figure-pptx/cell-8-output-13.png" id="0" name="Picture 1"/>
+          <p:cNvPicPr>
+            <a:picLocks noGrp="1" noChangeAspect="1"/>
+          </p:cNvPicPr>
+          <p:nvPr/>
+        </p:nvPicPr>
+        <p:blipFill>
+          <a:blip r:embed="rId2"/>
+          <a:stretch>
+            <a:fillRect/>
+          </a:stretch>
+        </p:blipFill>
+        <p:spPr bwMode="auto">
+          <a:xfrm>
+            <a:off x="457200" y="1524000"/>
+            <a:ext cx="4038600" cy="2730500"/>
+          </a:xfrm>
+          <a:prstGeom prst="rect">
+            <a:avLst/>
+          </a:prstGeom>
+          <a:noFill/>
+          <a:ln w="9525">
+            <a:noFill/>
+            <a:headEnd/>
+            <a:tailEnd/>
+          </a:ln>
+        </p:spPr>
+      </p:pic>
+      <p:pic>
+        <p:nvPicPr>
+          <p:cNvPr descr="presentation_files/figure-pptx/cell-8-output-16.png" id="0" name="Picture 1"/>
+          <p:cNvPicPr>
+            <a:picLocks noGrp="1" noChangeAspect="1"/>
+          </p:cNvPicPr>
+          <p:nvPr/>
+        </p:nvPicPr>
+        <p:blipFill>
+          <a:blip r:embed="rId3"/>
+          <a:stretch>
+            <a:fillRect/>
+          </a:stretch>
+        </p:blipFill>
+        <p:spPr bwMode="auto">
+          <a:xfrm>
+            <a:off x="4648200" y="1549400"/>
+            <a:ext cx="4038600" cy="2679700"/>
+          </a:xfrm>
+          <a:prstGeom prst="rect">
+            <a:avLst/>
+          </a:prstGeom>
+          <a:noFill/>
+          <a:ln w="9525">
+            <a:noFill/>
+            <a:headEnd/>
+            <a:tailEnd/>
+          </a:ln>
+        </p:spPr>
+      </p:pic>
     </p:spTree>
   </p:cSld>
 </p:sld>
 </file>
 
 <file path=ppt/slides/slide25.xml><?xml version="1.0" encoding="utf-8"?>
+<p:sld xmlns:a="http://schemas.openxmlformats.org/drawingml/2006/main" xmlns:r="http://schemas.openxmlformats.org/officeDocument/2006/relationships" xmlns:p="http://schemas.openxmlformats.org/presentationml/2006/main">
+  <p:cSld>
+    <p:spTree>
+      <p:nvGrpSpPr>
+        <p:cNvPr id="1" name=""/>
+        <p:cNvGrpSpPr/>
+        <p:nvPr/>
+      </p:nvGrpSpPr>
+      <p:grpSpPr>
+        <a:xfrm>
+          <a:off x="0" y="0"/>
+          <a:ext cx="0" cy="0"/>
+          <a:chOff x="0" y="0"/>
+          <a:chExt cx="0" cy="0"/>
+        </a:xfrm>
+      </p:grpSpPr>
+      <p:sp>
+        <p:nvSpPr>
+          <p:cNvPr id="2" name="Title 1"/>
+          <p:cNvSpPr>
+            <a:spLocks noGrp="1"/>
+          </p:cNvSpPr>
+          <p:nvPr>
+            <p:ph type="title"/>
+          </p:nvPr>
+        </p:nvSpPr>
+        <p:spPr/>
+        <p:txBody>
+          <a:bodyPr/>
+          <a:lstStyle/>
+          <a:p>
+            <a:pPr lvl="0" indent="0" marL="0">
+              <a:buNone/>
+            </a:pPr>
+            <a:r>
+              <a:rPr/>
+              <a:t>Age and Population Pyramids for Brazil</a:t>
+            </a:r>
+          </a:p>
+        </p:txBody>
+      </p:sp>
+      <p:pic>
+        <p:nvPicPr>
+          <p:cNvPr descr="presentation_files/figure-pptx/cell-8-output-22.png" id="0" name="Picture 1"/>
+          <p:cNvPicPr>
+            <a:picLocks noGrp="1" noChangeAspect="1"/>
+          </p:cNvPicPr>
+          <p:nvPr/>
+        </p:nvPicPr>
+        <p:blipFill>
+          <a:blip r:embed="rId2"/>
+          <a:stretch>
+            <a:fillRect/>
+          </a:stretch>
+        </p:blipFill>
+        <p:spPr bwMode="auto">
+          <a:xfrm>
+            <a:off x="457200" y="1524000"/>
+            <a:ext cx="4038600" cy="2730500"/>
+          </a:xfrm>
+          <a:prstGeom prst="rect">
+            <a:avLst/>
+          </a:prstGeom>
+          <a:noFill/>
+          <a:ln w="9525">
+            <a:noFill/>
+            <a:headEnd/>
+            <a:tailEnd/>
+          </a:ln>
+        </p:spPr>
+      </p:pic>
+      <p:pic>
+        <p:nvPicPr>
+          <p:cNvPr descr="presentation_files/figure-pptx/cell-8-output-25.png" id="0" name="Picture 1"/>
+          <p:cNvPicPr>
+            <a:picLocks noGrp="1" noChangeAspect="1"/>
+          </p:cNvPicPr>
+          <p:nvPr/>
+        </p:nvPicPr>
+        <p:blipFill>
+          <a:blip r:embed="rId3"/>
+          <a:stretch>
+            <a:fillRect/>
+          </a:stretch>
+        </p:blipFill>
+        <p:spPr bwMode="auto">
+          <a:xfrm>
+            <a:off x="4648200" y="1549400"/>
+            <a:ext cx="4038600" cy="2679700"/>
+          </a:xfrm>
+          <a:prstGeom prst="rect">
+            <a:avLst/>
+          </a:prstGeom>
+          <a:noFill/>
+          <a:ln w="9525">
+            <a:noFill/>
+            <a:headEnd/>
+            <a:tailEnd/>
+          </a:ln>
+        </p:spPr>
+      </p:pic>
+    </p:spTree>
+  </p:cSld>
+</p:sld>
+</file>
+
+<file path=ppt/slides/slide26.xml><?xml version="1.0" encoding="utf-8"?>
+<p:sld xmlns:a="http://schemas.openxmlformats.org/drawingml/2006/main" xmlns:r="http://schemas.openxmlformats.org/officeDocument/2006/relationships" xmlns:p="http://schemas.openxmlformats.org/presentationml/2006/main">
+  <p:cSld>
+    <p:spTree>
+      <p:nvGrpSpPr>
+        <p:cNvPr id="1" name=""/>
+        <p:cNvGrpSpPr/>
+        <p:nvPr/>
+      </p:nvGrpSpPr>
+      <p:grpSpPr>
+        <a:xfrm>
+          <a:off x="0" y="0"/>
+          <a:ext cx="0" cy="0"/>
+          <a:chOff x="0" y="0"/>
+          <a:chExt cx="0" cy="0"/>
+        </a:xfrm>
+      </p:grpSpPr>
+      <p:sp>
+        <p:nvSpPr>
+          <p:cNvPr id="2" name="Title 1"/>
+          <p:cNvSpPr>
+            <a:spLocks noGrp="1"/>
+          </p:cNvSpPr>
+          <p:nvPr>
+            <p:ph type="title"/>
+          </p:nvPr>
+        </p:nvSpPr>
+        <p:spPr/>
+        <p:txBody>
+          <a:bodyPr/>
+          <a:lstStyle/>
+          <a:p>
+            <a:pPr lvl="0" indent="0" marL="0">
+              <a:buNone/>
+            </a:pPr>
+            <a:r>
+              <a:rPr/>
+              <a:t>Age and Population Pyramids for India</a:t>
+            </a:r>
+          </a:p>
+        </p:txBody>
+      </p:sp>
+      <p:pic>
+        <p:nvPicPr>
+          <p:cNvPr descr="presentation_files/figure-pptx/cell-8-output-31.png" id="0" name="Picture 1"/>
+          <p:cNvPicPr>
+            <a:picLocks noGrp="1" noChangeAspect="1"/>
+          </p:cNvPicPr>
+          <p:nvPr/>
+        </p:nvPicPr>
+        <p:blipFill>
+          <a:blip r:embed="rId2"/>
+          <a:stretch>
+            <a:fillRect/>
+          </a:stretch>
+        </p:blipFill>
+        <p:spPr bwMode="auto">
+          <a:xfrm>
+            <a:off x="457200" y="1524000"/>
+            <a:ext cx="4038600" cy="2730500"/>
+          </a:xfrm>
+          <a:prstGeom prst="rect">
+            <a:avLst/>
+          </a:prstGeom>
+          <a:noFill/>
+          <a:ln w="9525">
+            <a:noFill/>
+            <a:headEnd/>
+            <a:tailEnd/>
+          </a:ln>
+        </p:spPr>
+      </p:pic>
+      <p:pic>
+        <p:nvPicPr>
+          <p:cNvPr descr="presentation_files/figure-pptx/cell-8-output-34.png" id="0" name="Picture 1"/>
+          <p:cNvPicPr>
+            <a:picLocks noGrp="1" noChangeAspect="1"/>
+          </p:cNvPicPr>
+          <p:nvPr/>
+        </p:nvPicPr>
+        <p:blipFill>
+          <a:blip r:embed="rId3"/>
+          <a:stretch>
+            <a:fillRect/>
+          </a:stretch>
+        </p:blipFill>
+        <p:spPr bwMode="auto">
+          <a:xfrm>
+            <a:off x="4648200" y="1562100"/>
+            <a:ext cx="4038600" cy="2654300"/>
+          </a:xfrm>
+          <a:prstGeom prst="rect">
+            <a:avLst/>
+          </a:prstGeom>
+          <a:noFill/>
+          <a:ln w="9525">
+            <a:noFill/>
+            <a:headEnd/>
+            <a:tailEnd/>
+          </a:ln>
+        </p:spPr>
+      </p:pic>
+    </p:spTree>
+  </p:cSld>
+</p:sld>
+</file>
+
+<file path=ppt/slides/slide27.xml><?xml version="1.0" encoding="utf-8"?>
+<p:sld xmlns:a="http://schemas.openxmlformats.org/drawingml/2006/main" xmlns:r="http://schemas.openxmlformats.org/officeDocument/2006/relationships" xmlns:p="http://schemas.openxmlformats.org/presentationml/2006/main">
+  <p:cSld>
+    <p:spTree>
+      <p:nvGrpSpPr>
+        <p:cNvPr id="1" name=""/>
+        <p:cNvGrpSpPr/>
+        <p:nvPr/>
+      </p:nvGrpSpPr>
+      <p:grpSpPr>
+        <a:xfrm>
+          <a:off x="0" y="0"/>
+          <a:ext cx="0" cy="0"/>
+          <a:chOff x="0" y="0"/>
+          <a:chExt cx="0" cy="0"/>
+        </a:xfrm>
+      </p:grpSpPr>
+      <p:sp>
+        <p:nvSpPr>
+          <p:cNvPr id="2" name="Title 1"/>
+          <p:cNvSpPr>
+            <a:spLocks noGrp="1"/>
+          </p:cNvSpPr>
+          <p:nvPr>
+            <p:ph type="title"/>
+          </p:nvPr>
+        </p:nvSpPr>
+        <p:spPr/>
+        <p:txBody>
+          <a:bodyPr/>
+          <a:lstStyle/>
+          <a:p>
+            <a:pPr lvl="0" indent="0" marL="0">
+              <a:buNone/>
+            </a:pPr>
+            <a:r>
+              <a:rPr/>
+              <a:t>Age and Population Pyramids for Japan</a:t>
+            </a:r>
+          </a:p>
+        </p:txBody>
+      </p:sp>
+      <p:pic>
+        <p:nvPicPr>
+          <p:cNvPr descr="presentation_files/figure-pptx/cell-8-output-40.png" id="0" name="Picture 1"/>
+          <p:cNvPicPr>
+            <a:picLocks noGrp="1" noChangeAspect="1"/>
+          </p:cNvPicPr>
+          <p:nvPr/>
+        </p:nvPicPr>
+        <p:blipFill>
+          <a:blip r:embed="rId2"/>
+          <a:stretch>
+            <a:fillRect/>
+          </a:stretch>
+        </p:blipFill>
+        <p:spPr bwMode="auto">
+          <a:xfrm>
+            <a:off x="457200" y="1524000"/>
+            <a:ext cx="4038600" cy="2730500"/>
+          </a:xfrm>
+          <a:prstGeom prst="rect">
+            <a:avLst/>
+          </a:prstGeom>
+          <a:noFill/>
+          <a:ln w="9525">
+            <a:noFill/>
+            <a:headEnd/>
+            <a:tailEnd/>
+          </a:ln>
+        </p:spPr>
+      </p:pic>
+      <p:pic>
+        <p:nvPicPr>
+          <p:cNvPr descr="presentation_files/figure-pptx/cell-8-output-43.png" id="0" name="Picture 1"/>
+          <p:cNvPicPr>
+            <a:picLocks noGrp="1" noChangeAspect="1"/>
+          </p:cNvPicPr>
+          <p:nvPr/>
+        </p:nvPicPr>
+        <p:blipFill>
+          <a:blip r:embed="rId3"/>
+          <a:stretch>
+            <a:fillRect/>
+          </a:stretch>
+        </p:blipFill>
+        <p:spPr bwMode="auto">
+          <a:xfrm>
+            <a:off x="4648200" y="1549400"/>
+            <a:ext cx="4038600" cy="2679700"/>
+          </a:xfrm>
+          <a:prstGeom prst="rect">
+            <a:avLst/>
+          </a:prstGeom>
+          <a:noFill/>
+          <a:ln w="9525">
+            <a:noFill/>
+            <a:headEnd/>
+            <a:tailEnd/>
+          </a:ln>
+        </p:spPr>
+      </p:pic>
+    </p:spTree>
+  </p:cSld>
+</p:sld>
+</file>
+
+<file path=ppt/slides/slide28.xml><?xml version="1.0" encoding="utf-8"?>
+<p:sld xmlns:a="http://schemas.openxmlformats.org/drawingml/2006/main" xmlns:r="http://schemas.openxmlformats.org/officeDocument/2006/relationships" xmlns:p="http://schemas.openxmlformats.org/presentationml/2006/main">
+  <p:cSld>
+    <p:spTree>
+      <p:nvGrpSpPr>
+        <p:cNvPr id="1" name=""/>
+        <p:cNvGrpSpPr/>
+        <p:nvPr/>
+      </p:nvGrpSpPr>
+      <p:grpSpPr>
+        <a:xfrm>
+          <a:off x="0" y="0"/>
+          <a:ext cx="0" cy="0"/>
+          <a:chOff x="0" y="0"/>
+          <a:chExt cx="0" cy="0"/>
+        </a:xfrm>
+      </p:grpSpPr>
+      <p:sp>
+        <p:nvSpPr>
+          <p:cNvPr id="2" name="Title 1"/>
+          <p:cNvSpPr>
+            <a:spLocks noGrp="1"/>
+          </p:cNvSpPr>
+          <p:nvPr>
+            <p:ph type="title"/>
+          </p:nvPr>
+        </p:nvSpPr>
+        <p:spPr/>
+        <p:txBody>
+          <a:bodyPr/>
+          <a:lstStyle/>
+          <a:p>
+            <a:pPr lvl="0" indent="0" marL="0">
+              <a:buNone/>
+            </a:pPr>
+            <a:r>
+              <a:rPr/>
+              <a:t>Age and Population Pyramids for Nigeria</a:t>
+            </a:r>
+          </a:p>
+        </p:txBody>
+      </p:sp>
+      <p:pic>
+        <p:nvPicPr>
+          <p:cNvPr descr="presentation_files/figure-pptx/cell-8-output-49.png" id="0" name="Picture 1"/>
+          <p:cNvPicPr>
+            <a:picLocks noGrp="1" noChangeAspect="1"/>
+          </p:cNvPicPr>
+          <p:nvPr/>
+        </p:nvPicPr>
+        <p:blipFill>
+          <a:blip r:embed="rId2"/>
+          <a:stretch>
+            <a:fillRect/>
+          </a:stretch>
+        </p:blipFill>
+        <p:spPr bwMode="auto">
+          <a:xfrm>
+            <a:off x="457200" y="1524000"/>
+            <a:ext cx="4038600" cy="2730500"/>
+          </a:xfrm>
+          <a:prstGeom prst="rect">
+            <a:avLst/>
+          </a:prstGeom>
+          <a:noFill/>
+          <a:ln w="9525">
+            <a:noFill/>
+            <a:headEnd/>
+            <a:tailEnd/>
+          </a:ln>
+        </p:spPr>
+      </p:pic>
+      <p:pic>
+        <p:nvPicPr>
+          <p:cNvPr descr="presentation_files/figure-pptx/cell-8-output-52.png" id="0" name="Picture 1"/>
+          <p:cNvPicPr>
+            <a:picLocks noGrp="1" noChangeAspect="1"/>
+          </p:cNvPicPr>
+          <p:nvPr/>
+        </p:nvPicPr>
+        <p:blipFill>
+          <a:blip r:embed="rId3"/>
+          <a:stretch>
+            <a:fillRect/>
+          </a:stretch>
+        </p:blipFill>
+        <p:spPr bwMode="auto">
+          <a:xfrm>
+            <a:off x="4648200" y="1587500"/>
+            <a:ext cx="4038600" cy="2590800"/>
+          </a:xfrm>
+          <a:prstGeom prst="rect">
+            <a:avLst/>
+          </a:prstGeom>
+          <a:noFill/>
+          <a:ln w="9525">
+            <a:noFill/>
+            <a:headEnd/>
+            <a:tailEnd/>
+          </a:ln>
+        </p:spPr>
+      </p:pic>
+    </p:spTree>
+  </p:cSld>
+</p:sld>
+</file>
+
+<file path=ppt/slides/slide29.xml><?xml version="1.0" encoding="utf-8"?>
+<p:sld xmlns:a="http://schemas.openxmlformats.org/drawingml/2006/main" xmlns:r="http://schemas.openxmlformats.org/officeDocument/2006/relationships" xmlns:p="http://schemas.openxmlformats.org/presentationml/2006/main">
+  <p:cSld>
+    <p:spTree>
+      <p:nvGrpSpPr>
+        <p:cNvPr id="1" name=""/>
+        <p:cNvGrpSpPr/>
+        <p:nvPr/>
+      </p:nvGrpSpPr>
+      <p:grpSpPr>
+        <a:xfrm>
+          <a:off x="0" y="0"/>
+          <a:ext cx="0" cy="0"/>
+          <a:chOff x="0" y="0"/>
+          <a:chExt cx="0" cy="0"/>
+        </a:xfrm>
+      </p:grpSpPr>
+      <p:sp>
+        <p:nvSpPr>
+          <p:cNvPr id="2" name="Title 1"/>
+          <p:cNvSpPr>
+            <a:spLocks noGrp="1"/>
+          </p:cNvSpPr>
+          <p:nvPr>
+            <p:ph type="title"/>
+          </p:nvPr>
+        </p:nvSpPr>
+        <p:spPr>
+          <a:xfrm>
+            <a:off x="722313" y="3305176"/>
+            <a:ext cx="7772400" cy="1021556"/>
+          </a:xfrm>
+        </p:spPr>
+        <p:txBody>
+          <a:bodyPr/>
+          <a:lstStyle/>
+          <a:p>
+            <a:pPr lvl="0" indent="0" marL="0">
+              <a:buNone/>
+            </a:pPr>
+            <a:r>
+              <a:rPr/>
+              <a:t>Generating a website</a:t>
+            </a:r>
+          </a:p>
+        </p:txBody>
+      </p:sp>
+    </p:spTree>
+  </p:cSld>
+</p:sld>
+</file>
+
+<file path=ppt/slides/slide3.xml><?xml version="1.0" encoding="utf-8"?>
+<p:sld xmlns:a="http://schemas.openxmlformats.org/drawingml/2006/main" xmlns:r="http://schemas.openxmlformats.org/officeDocument/2006/relationships" xmlns:p="http://schemas.openxmlformats.org/presentationml/2006/main">
+  <p:cSld>
+    <p:spTree>
+      <p:nvGrpSpPr>
+        <p:cNvPr id="1" name=""/>
+        <p:cNvGrpSpPr/>
+        <p:nvPr/>
+      </p:nvGrpSpPr>
+      <p:grpSpPr>
+        <a:xfrm>
+          <a:off x="0" y="0"/>
+          <a:ext cx="0" cy="0"/>
+          <a:chOff x="0" y="0"/>
+          <a:chExt cx="0" cy="0"/>
+        </a:xfrm>
+      </p:grpSpPr>
+      <p:sp>
+        <p:nvSpPr>
+          <p:cNvPr id="2" name="Title 1"/>
+          <p:cNvSpPr>
+            <a:spLocks noGrp="1"/>
+          </p:cNvSpPr>
+          <p:nvPr>
+            <p:ph type="title"/>
+          </p:nvPr>
+        </p:nvSpPr>
+        <p:spPr/>
+        <p:txBody>
+          <a:bodyPr/>
+          <a:lstStyle/>
+          <a:p>
+            <a:pPr lvl="0" indent="0" marL="0">
+              <a:buNone/>
+            </a:pPr>
+            <a:r>
+              <a:rPr/>
+              <a:t>The content value chain</a:t>
+            </a:r>
+          </a:p>
+        </p:txBody>
+      </p:sp>
+      <p:sp>
+        <p:nvSpPr>
+          <p:cNvPr id="3" name="Content Placeholder 2"/>
+          <p:cNvSpPr>
+            <a:spLocks noGrp="1"/>
+          </p:cNvSpPr>
+          <p:nvPr>
+            <p:ph idx="1" sz="half"/>
+          </p:nvPr>
+        </p:nvSpPr>
+        <p:spPr/>
+        <p:txBody>
+          <a:bodyPr/>
+          <a:lstStyle/>
+          <a:p>
+            <a:pPr lvl="0" indent="0" marL="0">
+              <a:buNone/>
+            </a:pPr>
+            <a:r>
+              <a:rPr/>
+              <a:t>Content stuck in my computer is nearly worthless.</a:t>
+            </a:r>
+          </a:p>
+          <a:p>
+            <a:pPr lvl="0" indent="0" marL="0">
+              <a:spcBef>
+                <a:spcPts val="3000"/>
+              </a:spcBef>
+              <a:buNone/>
+            </a:pPr>
+            <a:r>
+              <a:rPr b="1"/>
+              <a:t>Goal</a:t>
+            </a:r>
+          </a:p>
+          <a:p>
+            <a:pPr lvl="0"/>
+            <a:r>
+              <a:rPr/>
+              <a:t>Move good content out of my computer </a:t>
+            </a:r>
+            <a:r>
+              <a:rPr b="1"/>
+              <a:t>as fast as possible</a:t>
+            </a:r>
+          </a:p>
+          <a:p>
+            <a:pPr lvl="0"/>
+            <a:r>
+              <a:rPr/>
+              <a:t>Reproducible</a:t>
+            </a:r>
+          </a:p>
+          <a:p>
+            <a:pPr lvl="0"/>
+            <a:r>
+              <a:rPr/>
+              <a:t>Git-based collaboration</a:t>
+            </a:r>
+          </a:p>
+          <a:p>
+            <a:pPr lvl="0"/>
+            <a:r>
+              <a:rPr/>
+              <a:t>Write once, generate:</a:t>
+            </a:r>
+          </a:p>
+          <a:p>
+            <a:pPr lvl="1"/>
+            <a:r>
+              <a:rPr/>
+              <a:t>Code</a:t>
+            </a:r>
+          </a:p>
+          <a:p>
+            <a:pPr lvl="1"/>
+            <a:r>
+              <a:rPr/>
+              <a:t>Paper</a:t>
+            </a:r>
+          </a:p>
+          <a:p>
+            <a:pPr lvl="1"/>
+            <a:r>
+              <a:rPr/>
+              <a:t>PowerPoint</a:t>
+            </a:r>
+          </a:p>
+          <a:p>
+            <a:pPr lvl="1"/>
+            <a:r>
+              <a:rPr/>
+              <a:t>Site/documentation</a:t>
+            </a:r>
+          </a:p>
+        </p:txBody>
+      </p:sp>
+      <p:pic>
+        <p:nvPicPr>
+          <p:cNvPr descr="fig:  images/content-value-chain.jpg" id="0" name="Picture 1"/>
+          <p:cNvPicPr>
+            <a:picLocks noGrp="1" noChangeAspect="1"/>
+          </p:cNvPicPr>
+          <p:nvPr/>
+        </p:nvPicPr>
+        <p:blipFill>
+          <a:blip r:embed="rId2"/>
+          <a:stretch>
+            <a:fillRect/>
+          </a:stretch>
+        </p:blipFill>
+        <p:spPr bwMode="auto">
+          <a:xfrm>
+            <a:off x="4749800" y="1193800"/>
+            <a:ext cx="3835400" cy="2882900"/>
+          </a:xfrm>
+          <a:prstGeom prst="rect">
+            <a:avLst/>
+          </a:prstGeom>
+          <a:noFill/>
+          <a:ln w="9525">
+            <a:noFill/>
+            <a:headEnd/>
+            <a:tailEnd/>
+          </a:ln>
+        </p:spPr>
+      </p:pic>
+      <p:sp>
+        <p:nvSpPr>
+          <p:cNvPr id="1" name="TextBox 3"/>
+          <p:cNvSpPr txBox="1"/>
+          <p:nvPr/>
+        </p:nvSpPr>
+        <p:spPr>
+          <a:xfrm>
+            <a:off x="4648200" y="4076700"/>
+            <a:ext cx="4038600" cy="508000"/>
+          </a:xfrm>
+          <a:prstGeom prst="rect">
+            <a:avLst/>
+          </a:prstGeom>
+          <a:noFill/>
+        </p:spPr>
+        <p:txBody>
+          <a:bodyPr/>
+          <a:lstStyle/>
+          <a:p>
+            <a:pPr lvl="0" indent="0" marL="0" algn="ctr">
+              <a:buNone/>
+            </a:pPr>
+            <a:r>
+              <a:rPr/>
+              <a:t>The content value chain by (@drrob) captured by Amelia McNamara</a:t>
+            </a:r>
+          </a:p>
+        </p:txBody>
+      </p:sp>
+    </p:spTree>
+  </p:cSld>
+</p:sld>
+</file>
+
+<file path=ppt/slides/slide30.xml><?xml version="1.0" encoding="utf-8"?>
+<p:sld xmlns:a="http://schemas.openxmlformats.org/drawingml/2006/main" xmlns:r="http://schemas.openxmlformats.org/officeDocument/2006/relationships" xmlns:p="http://schemas.openxmlformats.org/presentationml/2006/main">
+  <p:cSld>
+    <p:spTree>
+      <p:nvGrpSpPr>
+        <p:cNvPr id="1" name=""/>
+        <p:cNvGrpSpPr/>
+        <p:nvPr/>
+      </p:nvGrpSpPr>
+      <p:grpSpPr>
+        <a:xfrm>
+          <a:off x="0" y="0"/>
+          <a:ext cx="0" cy="0"/>
+          <a:chOff x="0" y="0"/>
+          <a:chExt cx="0" cy="0"/>
+        </a:xfrm>
+      </p:grpSpPr>
+      <p:sp>
+        <p:nvSpPr>
+          <p:cNvPr id="2" name="Title 1"/>
+          <p:cNvSpPr>
+            <a:spLocks noGrp="1"/>
+          </p:cNvSpPr>
+          <p:nvPr>
+            <p:ph type="title"/>
+          </p:nvPr>
+        </p:nvSpPr>
+        <p:spPr/>
+        <p:txBody>
+          <a:bodyPr/>
+          <a:lstStyle/>
+          <a:p>
+            <a:pPr lvl="0" indent="0" marL="0">
+              <a:buNone/>
+            </a:pPr>
+            <a:r>
+              <a:rPr/>
+              <a:t>One-liner creates a website</a:t>
+            </a:r>
+          </a:p>
+        </p:txBody>
+      </p:sp>
+      <p:sp>
+        <p:nvSpPr>
+          <p:cNvPr id="3" name="Content Placeholder 2"/>
+          <p:cNvSpPr>
+            <a:spLocks noGrp="1"/>
+          </p:cNvSpPr>
+          <p:nvPr>
+            <p:ph idx="1"/>
+          </p:nvPr>
+        </p:nvSpPr>
+        <p:spPr/>
+        <p:txBody>
+          <a:bodyPr/>
+          <a:lstStyle/>
+          <a:p>
+            <a:pPr lvl="0" indent="0">
+              <a:buNone/>
+            </a:pPr>
+            <a:r>
+              <a:rPr>
+                <a:solidFill>
+                  <a:srgbClr val="AD0000"/>
+                </a:solidFill>
+                <a:latin typeface="Consolas"/>
+              </a:rPr>
+              <a:t>---</a:t>
+            </a:r>
+            <a:br/>
+            <a:r>
+              <a:rPr>
+                <a:solidFill>
+                  <a:srgbClr val="4758AB"/>
+                </a:solidFill>
+                <a:latin typeface="Consolas"/>
+              </a:rPr>
+              <a:t>title</a:t>
+            </a:r>
+            <a:r>
+              <a:rPr>
+                <a:solidFill>
+                  <a:srgbClr val="003B4F"/>
+                </a:solidFill>
+                <a:latin typeface="Consolas"/>
+              </a:rPr>
+              <a:t>:</a:t>
+            </a:r>
+            <a:r>
+              <a:rPr>
+                <a:solidFill>
+                  <a:srgbClr val="657422"/>
+                </a:solidFill>
+                <a:latin typeface="Consolas"/>
+              </a:rPr>
+              <a:t> </a:t>
+            </a:r>
+            <a:r>
+              <a:rPr>
+                <a:solidFill>
+                  <a:srgbClr val="20794D"/>
+                </a:solidFill>
+                <a:latin typeface="Consolas"/>
+              </a:rPr>
+              <a:t>"Quarto with Python"</a:t>
+            </a:r>
+            <a:br/>
+            <a:r>
+              <a:rPr>
+                <a:solidFill>
+                  <a:srgbClr val="4758AB"/>
+                </a:solidFill>
+                <a:latin typeface="Consolas"/>
+              </a:rPr>
+              <a:t>format</a:t>
+            </a:r>
+            <a:r>
+              <a:rPr>
+                <a:solidFill>
+                  <a:srgbClr val="003B4F"/>
+                </a:solidFill>
+                <a:latin typeface="Consolas"/>
+              </a:rPr>
+              <a:t>:</a:t>
+            </a:r>
+            <a:r>
+              <a:rPr>
+                <a:solidFill>
+                  <a:srgbClr val="657422"/>
+                </a:solidFill>
+                <a:latin typeface="Consolas"/>
+              </a:rPr>
+              <a:t> html</a:t>
+            </a:r>
+            <a:br/>
+            <a:r>
+              <a:rPr>
+                <a:solidFill>
+                  <a:srgbClr val="5E5E5E"/>
+                </a:solidFill>
+                <a:latin typeface="Consolas"/>
+              </a:rPr>
+              <a:t>    # revealjs:</a:t>
+            </a:r>
+            <a:br/>
+            <a:r>
+              <a:rPr>
+                <a:solidFill>
+                  <a:srgbClr val="5E5E5E"/>
+                </a:solidFill>
+                <a:latin typeface="Consolas"/>
+              </a:rPr>
+              <a:t>    #     incremental: false</a:t>
+            </a:r>
+            <a:br/>
+            <a:r>
+              <a:rPr>
+                <a:solidFill>
+                  <a:srgbClr val="5E5E5E"/>
+                </a:solidFill>
+                <a:latin typeface="Consolas"/>
+              </a:rPr>
+              <a:t>    #     theme: [simple, revealjs-customizations.scss]</a:t>
+            </a:r>
+            <a:br/>
+            <a:r>
+              <a:rPr>
+                <a:solidFill>
+                  <a:srgbClr val="5E5E5E"/>
+                </a:solidFill>
+                <a:latin typeface="Consolas"/>
+              </a:rPr>
+              <a:t>    #     title-slide-attributes:</a:t>
+            </a:r>
+            <a:br/>
+            <a:r>
+              <a:rPr>
+                <a:solidFill>
+                  <a:srgbClr val="5E5E5E"/>
+                </a:solidFill>
+                <a:latin typeface="Consolas"/>
+              </a:rPr>
+              <a:t>    #         data-background-image: images/data-viz-bg.jpg</a:t>
+            </a:r>
+            <a:br/>
+            <a:r>
+              <a:rPr>
+                <a:solidFill>
+                  <a:srgbClr val="5E5E5E"/>
+                </a:solidFill>
+                <a:latin typeface="Consolas"/>
+              </a:rPr>
+              <a:t>    #         data-background-size: contain</a:t>
+            </a:r>
+            <a:br/>
+            <a:r>
+              <a:rPr>
+                <a:solidFill>
+                  <a:srgbClr val="5E5E5E"/>
+                </a:solidFill>
+                <a:latin typeface="Consolas"/>
+              </a:rPr>
+              <a:t>    #         data-background-position: right</a:t>
+            </a:r>
+            <a:br/>
+            <a:br/>
+            <a:r>
+              <a:rPr>
+                <a:solidFill>
+                  <a:srgbClr val="4758AB"/>
+                </a:solidFill>
+                <a:latin typeface="Consolas"/>
+              </a:rPr>
+              <a:t>author</a:t>
+            </a:r>
+            <a:r>
+              <a:rPr>
+                <a:solidFill>
+                  <a:srgbClr val="003B4F"/>
+                </a:solidFill>
+                <a:latin typeface="Consolas"/>
+              </a:rPr>
+              <a:t>:</a:t>
+            </a:r>
+            <a:r>
+              <a:rPr>
+                <a:solidFill>
+                  <a:srgbClr val="657422"/>
+                </a:solidFill>
+                <a:latin typeface="Consolas"/>
+              </a:rPr>
+              <a:t> Lucas A. Meyer</a:t>
+            </a:r>
+            <a:br/>
+            <a:r>
+              <a:rPr>
+                <a:solidFill>
+                  <a:srgbClr val="4758AB"/>
+                </a:solidFill>
+                <a:latin typeface="Consolas"/>
+              </a:rPr>
+              <a:t>date</a:t>
+            </a:r>
+            <a:r>
+              <a:rPr>
+                <a:solidFill>
+                  <a:srgbClr val="003B4F"/>
+                </a:solidFill>
+                <a:latin typeface="Consolas"/>
+              </a:rPr>
+              <a:t>:</a:t>
+            </a:r>
+            <a:r>
+              <a:rPr>
+                <a:solidFill>
+                  <a:srgbClr val="657422"/>
+                </a:solidFill>
+                <a:latin typeface="Consolas"/>
+              </a:rPr>
+              <a:t> 2022-07-14</a:t>
+            </a:r>
+            <a:br/>
+            <a:r>
+              <a:rPr>
+                <a:solidFill>
+                  <a:srgbClr val="AD0000"/>
+                </a:solidFill>
+                <a:latin typeface="Consolas"/>
+              </a:rPr>
+              <a:t>---</a:t>
+            </a:r>
+          </a:p>
+          <a:p>
+            <a:pPr lvl="0" indent="0" marL="0">
+              <a:buNone/>
+            </a:pPr>
+          </a:p>
+          <a:p>
+            <a:pPr lvl="0" indent="0" marL="0">
+              <a:buNone/>
+            </a:pPr>
+            <a:r>
+              <a:rPr/>
+              <a:t>Adding or changing the format to </a:t>
+            </a:r>
+            <a:r>
+              <a:rPr>
+                <a:latin typeface="Consolas"/>
+              </a:rPr>
+              <a:t>html</a:t>
+            </a:r>
+            <a:r>
+              <a:rPr/>
+              <a:t> will create a </a:t>
+            </a:r>
+            <a:r>
+              <a:rPr>
+                <a:hlinkClick r:id="rId2"/>
+              </a:rPr>
+              <a:t>website</a:t>
+            </a:r>
+            <a:r>
+              <a:rPr/>
+              <a:t>.</a:t>
+            </a:r>
+          </a:p>
+        </p:txBody>
+      </p:sp>
+    </p:spTree>
+  </p:cSld>
+</p:sld>
+</file>
+
+<file path=ppt/slides/slide31.xml><?xml version="1.0" encoding="utf-8"?>
 <p:sld xmlns:a="http://schemas.openxmlformats.org/drawingml/2006/main" xmlns:r="http://schemas.openxmlformats.org/officeDocument/2006/relationships" xmlns:p="http://schemas.openxmlformats.org/presentationml/2006/main">
   <p:cSld>
     <p:spTree>
@@ -8992,7 +9835,7 @@
 </p:sld>
 </file>
 
-<file path=ppt/slides/slide26.xml><?xml version="1.0" encoding="utf-8"?>
+<file path=ppt/slides/slide32.xml><?xml version="1.0" encoding="utf-8"?>
 <p:sld xmlns:a="http://schemas.openxmlformats.org/drawingml/2006/main" xmlns:r="http://schemas.openxmlformats.org/officeDocument/2006/relationships" xmlns:p="http://schemas.openxmlformats.org/presentationml/2006/main">
   <p:cSld>
     <p:spTree>
@@ -9044,7 +9887,7 @@
 </p:sld>
 </file>
 
-<file path=ppt/slides/slide27.xml><?xml version="1.0" encoding="utf-8"?>
+<file path=ppt/slides/slide33.xml><?xml version="1.0" encoding="utf-8"?>
 <p:sld xmlns:a="http://schemas.openxmlformats.org/drawingml/2006/main" xmlns:r="http://schemas.openxmlformats.org/officeDocument/2006/relationships" xmlns:p="http://schemas.openxmlformats.org/presentationml/2006/main">
   <p:cSld>
     <p:spTree>
@@ -9152,7 +9995,7 @@
 </p:sld>
 </file>
 
-<file path=ppt/slides/slide28.xml><?xml version="1.0" encoding="utf-8"?>
+<file path=ppt/slides/slide34.xml><?xml version="1.0" encoding="utf-8"?>
 <p:sld xmlns:a="http://schemas.openxmlformats.org/drawingml/2006/main" xmlns:r="http://schemas.openxmlformats.org/officeDocument/2006/relationships" xmlns:p="http://schemas.openxmlformats.org/presentationml/2006/main">
   <p:cSld>
     <p:spTree>
@@ -9319,7 +10162,7 @@
 </p:sld>
 </file>
 
-<file path=ppt/slides/slide29.xml><?xml version="1.0" encoding="utf-8"?>
+<file path=ppt/slides/slide35.xml><?xml version="1.0" encoding="utf-8"?>
 <p:sld xmlns:a="http://schemas.openxmlformats.org/drawingml/2006/main" xmlns:r="http://schemas.openxmlformats.org/officeDocument/2006/relationships" xmlns:p="http://schemas.openxmlformats.org/presentationml/2006/main">
   <p:cSld>
     <p:spTree>
@@ -9516,7 +10359,7 @@
 </p:sld>
 </file>
 
-<file path=ppt/slides/slide3.xml><?xml version="1.0" encoding="utf-8"?>
+<file path=ppt/slides/slide36.xml><?xml version="1.0" encoding="utf-8"?>
 <p:sld xmlns:a="http://schemas.openxmlformats.org/drawingml/2006/main" xmlns:r="http://schemas.openxmlformats.org/officeDocument/2006/relationships" xmlns:p="http://schemas.openxmlformats.org/presentationml/2006/main">
   <p:cSld>
     <p:spTree>
@@ -9553,7 +10396,7 @@
             </a:pPr>
             <a:r>
               <a:rPr/>
-              <a:t>The content value chain</a:t>
+              <a:t>Cross references</a:t>
             </a:r>
           </a:p>
         </p:txBody>
@@ -9578,139 +10421,126 @@
             </a:pPr>
             <a:r>
               <a:rPr/>
-              <a:t>Content stuck in my computer is nearly worthless.</a:t>
+              <a:t>The </a:t>
+            </a:r>
+            <a:r>
+              <a:rPr>
+                <a:hlinkClick r:id="rId2"/>
+              </a:rPr>
+              <a:t>Quarto guide</a:t>
+            </a:r>
+            <a:r>
+              <a:rPr/>
+              <a:t> has a great section on </a:t>
+            </a:r>
+            <a:r>
+              <a:rPr>
+                <a:hlinkClick r:id="rId3"/>
+              </a:rPr>
+              <a:t>cross-references</a:t>
+            </a:r>
+            <a:r>
+              <a:rPr/>
+              <a:t>. I cover only the main points.</a:t>
             </a:r>
           </a:p>
           <a:p>
             <a:pPr lvl="0" indent="0" marL="0">
-              <a:spcBef>
-                <a:spcPts val="3000"/>
-              </a:spcBef>
-              <a:buNone/>
-            </a:pPr>
-            <a:r>
-              <a:rPr b="1"/>
-              <a:t>Goal</a:t>
-            </a:r>
-          </a:p>
-          <a:p>
-            <a:pPr lvl="0"/>
-            <a:r>
-              <a:rPr/>
-              <a:t>Move good content out of my computer </a:t>
-            </a:r>
-            <a:r>
-              <a:rPr b="1"/>
-              <a:t>as fast as possible</a:t>
-            </a:r>
-          </a:p>
-          <a:p>
-            <a:pPr lvl="0"/>
-            <a:r>
-              <a:rPr/>
-              <a:t>Reproducible</a:t>
-            </a:r>
-          </a:p>
-          <a:p>
-            <a:pPr lvl="0"/>
-            <a:r>
-              <a:rPr/>
-              <a:t>Git-based collaboration</a:t>
-            </a:r>
-          </a:p>
-          <a:p>
-            <a:pPr lvl="0"/>
-            <a:r>
-              <a:rPr/>
-              <a:t>Write once, generate:</a:t>
-            </a:r>
-          </a:p>
-          <a:p>
-            <a:pPr lvl="1"/>
-            <a:r>
-              <a:rPr/>
-              <a:t>Code</a:t>
-            </a:r>
-          </a:p>
-          <a:p>
-            <a:pPr lvl="1"/>
-            <a:r>
-              <a:rPr/>
-              <a:t>Paper</a:t>
-            </a:r>
-          </a:p>
-          <a:p>
-            <a:pPr lvl="1"/>
-            <a:r>
-              <a:rPr/>
-              <a:t>PowerPoint</a:t>
-            </a:r>
-          </a:p>
-          <a:p>
-            <a:pPr lvl="1"/>
-            <a:r>
-              <a:rPr/>
-              <a:t>Site/documentation</a:t>
-            </a:r>
-          </a:p>
-        </p:txBody>
-      </p:sp>
-      <p:pic>
-        <p:nvPicPr>
-          <p:cNvPr descr="fig:  images/content-value-chain.jpg" id="0" name="Picture 1"/>
-          <p:cNvPicPr>
-            <a:picLocks noGrp="1" noChangeAspect="1"/>
-          </p:cNvPicPr>
-          <p:nvPr/>
-        </p:nvPicPr>
-        <p:blipFill>
-          <a:blip r:embed="rId2"/>
-          <a:stretch>
-            <a:fillRect/>
-          </a:stretch>
-        </p:blipFill>
-        <p:spPr bwMode="auto">
-          <a:xfrm>
-            <a:off x="4749800" y="1193800"/>
-            <a:ext cx="3835400" cy="2882900"/>
-          </a:xfrm>
-          <a:prstGeom prst="rect">
-            <a:avLst/>
-          </a:prstGeom>
-          <a:noFill/>
-          <a:ln w="9525">
-            <a:noFill/>
-            <a:headEnd/>
-            <a:tailEnd/>
-          </a:ln>
-        </p:spPr>
-      </p:pic>
-      <p:sp>
-        <p:nvSpPr>
-          <p:cNvPr id="1" name="TextBox 3"/>
-          <p:cNvSpPr txBox="1"/>
-          <p:nvPr/>
-        </p:nvSpPr>
-        <p:spPr>
-          <a:xfrm>
-            <a:off x="4648200" y="4076700"/>
-            <a:ext cx="4038600" cy="508000"/>
-          </a:xfrm>
-          <a:prstGeom prst="rect">
-            <a:avLst/>
-          </a:prstGeom>
-          <a:noFill/>
-        </p:spPr>
+              <a:buNone/>
+            </a:pPr>
+            <a:r>
+              <a:rPr/>
+              <a:t>To create a cross-referenceable figure, section or equation, you need to tag it with its corresponding prefix, respectively “fig”, “sec” and “eq”.</a:t>
+            </a:r>
+          </a:p>
+          <a:p>
+            <a:pPr lvl="0" indent="0" marL="0">
+              <a:buNone/>
+            </a:pPr>
+            <a:r>
+              <a:rPr/>
+              <a:t>To tag it, use the following syntax: </a:t>
+            </a:r>
+            <a:r>
+              <a:rPr>
+                <a:latin typeface="Consolas"/>
+              </a:rPr>
+              <a:t>#prefix-name</a:t>
+            </a:r>
+            <a:r>
+              <a:rPr/>
+              <a:t>.</a:t>
+            </a:r>
+          </a:p>
+        </p:txBody>
+      </p:sp>
+      <p:sp>
+        <p:nvSpPr>
+          <p:cNvPr id="4" name="Content Placeholder 3"/>
+          <p:cNvSpPr>
+            <a:spLocks noGrp="1"/>
+          </p:cNvSpPr>
+          <p:nvPr>
+            <p:ph idx="2" sz="half"/>
+          </p:nvPr>
+        </p:nvSpPr>
+        <p:spPr/>
         <p:txBody>
           <a:bodyPr/>
           <a:lstStyle/>
           <a:p>
-            <a:pPr lvl="0" indent="0" marL="0" algn="ctr">
-              <a:buNone/>
-            </a:pPr>
-            <a:r>
-              <a:rPr/>
-              <a:t>The content value chain by (@drrob) captured by Amelia McNamara</a:t>
+            <a:pPr lvl="0" indent="0" marL="0">
+              <a:buNone/>
+            </a:pPr>
+            <a:r>
+              <a:rPr/>
+              <a:t>For example, when declaring a figure, you can use:</a:t>
+            </a:r>
+          </a:p>
+          <a:p>
+            <a:pPr lvl="0" indent="0">
+              <a:buNone/>
+            </a:pPr>
+            <a:r>
+              <a:rPr>
+                <a:solidFill>
+                  <a:srgbClr val="AD0000"/>
+                </a:solidFill>
+                <a:latin typeface="Consolas"/>
+              </a:rPr>
+              <a:t>![Elephant](elephant.png)</a:t>
+            </a:r>
+            <a:r>
+              <a:rPr>
+                <a:solidFill>
+                  <a:srgbClr val="003B4F"/>
+                </a:solidFill>
+                <a:latin typeface="Consolas"/>
+              </a:rPr>
+              <a:t>{#fig-elephant}</a:t>
+            </a:r>
+          </a:p>
+          <a:p>
+            <a:pPr lvl="0" indent="0" marL="0">
+              <a:buNone/>
+            </a:pPr>
+            <a:r>
+              <a:rPr/>
+              <a:t>Later, you can refer to it using:</a:t>
+            </a:r>
+          </a:p>
+          <a:p>
+            <a:pPr lvl="0" indent="0">
+              <a:buNone/>
+            </a:pPr>
+            <a:r>
+              <a:rPr>
+                <a:solidFill>
+                  <a:srgbClr val="003B4F"/>
+                </a:solidFill>
+                <a:latin typeface="Consolas"/>
+              </a:rPr>
+              <a:t>See @fig-elephant for an illustration.</a:t>
             </a:r>
           </a:p>
         </p:txBody>
@@ -9720,7 +10550,7 @@
 </p:sld>
 </file>
 
-<file path=ppt/slides/slide30.xml><?xml version="1.0" encoding="utf-8"?>
+<file path=ppt/slides/slide37.xml><?xml version="1.0" encoding="utf-8"?>
 <p:sld xmlns:a="http://schemas.openxmlformats.org/drawingml/2006/main" xmlns:r="http://schemas.openxmlformats.org/officeDocument/2006/relationships" xmlns:p="http://schemas.openxmlformats.org/presentationml/2006/main">
   <p:cSld>
     <p:spTree>
@@ -9747,7 +10577,12 @@
             <p:ph type="title"/>
           </p:nvPr>
         </p:nvSpPr>
-        <p:spPr/>
+        <p:spPr>
+          <a:xfrm>
+            <a:off x="722313" y="3305176"/>
+            <a:ext cx="7772400" cy="1021556"/>
+          </a:xfrm>
+        </p:spPr>
         <p:txBody>
           <a:bodyPr/>
           <a:lstStyle/>
@@ -9757,151 +10592,7 @@
             </a:pPr>
             <a:r>
               <a:rPr/>
-              <a:t>Cross references</a:t>
-            </a:r>
-          </a:p>
-        </p:txBody>
-      </p:sp>
-      <p:sp>
-        <p:nvSpPr>
-          <p:cNvPr id="3" name="Content Placeholder 2"/>
-          <p:cNvSpPr>
-            <a:spLocks noGrp="1"/>
-          </p:cNvSpPr>
-          <p:nvPr>
-            <p:ph idx="1" sz="half"/>
-          </p:nvPr>
-        </p:nvSpPr>
-        <p:spPr/>
-        <p:txBody>
-          <a:bodyPr/>
-          <a:lstStyle/>
-          <a:p>
-            <a:pPr lvl="0" indent="0" marL="0">
-              <a:buNone/>
-            </a:pPr>
-            <a:r>
-              <a:rPr/>
-              <a:t>The </a:t>
-            </a:r>
-            <a:r>
-              <a:rPr>
-                <a:hlinkClick r:id="rId2"/>
-              </a:rPr>
-              <a:t>Quarto guide</a:t>
-            </a:r>
-            <a:r>
-              <a:rPr/>
-              <a:t> has a great section on </a:t>
-            </a:r>
-            <a:r>
-              <a:rPr>
-                <a:hlinkClick r:id="rId3"/>
-              </a:rPr>
-              <a:t>cross-references</a:t>
-            </a:r>
-            <a:r>
-              <a:rPr/>
-              <a:t>. I cover only the main points.</a:t>
-            </a:r>
-          </a:p>
-          <a:p>
-            <a:pPr lvl="0" indent="0" marL="0">
-              <a:buNone/>
-            </a:pPr>
-            <a:r>
-              <a:rPr/>
-              <a:t>To create a cross-referenceable figure, section or equation, you need to tag it with its corresponding prefix, respectively “fig”, “sec” and “eq”.</a:t>
-            </a:r>
-          </a:p>
-          <a:p>
-            <a:pPr lvl="0" indent="0" marL="0">
-              <a:buNone/>
-            </a:pPr>
-            <a:r>
-              <a:rPr/>
-              <a:t>To tag it, use the following syntax: </a:t>
-            </a:r>
-            <a:r>
-              <a:rPr>
-                <a:latin typeface="Consolas"/>
-              </a:rPr>
-              <a:t>#prefix-name</a:t>
-            </a:r>
-            <a:r>
-              <a:rPr/>
-              <a:t>.</a:t>
-            </a:r>
-          </a:p>
-        </p:txBody>
-      </p:sp>
-      <p:sp>
-        <p:nvSpPr>
-          <p:cNvPr id="4" name="Content Placeholder 3"/>
-          <p:cNvSpPr>
-            <a:spLocks noGrp="1"/>
-          </p:cNvSpPr>
-          <p:nvPr>
-            <p:ph idx="2" sz="half"/>
-          </p:nvPr>
-        </p:nvSpPr>
-        <p:spPr/>
-        <p:txBody>
-          <a:bodyPr/>
-          <a:lstStyle/>
-          <a:p>
-            <a:pPr lvl="0" indent="0" marL="0">
-              <a:buNone/>
-            </a:pPr>
-            <a:r>
-              <a:rPr/>
-              <a:t>For example, when declaring a figure, you can use:</a:t>
-            </a:r>
-          </a:p>
-          <a:p>
-            <a:pPr lvl="0" indent="0">
-              <a:buNone/>
-            </a:pPr>
-            <a:r>
-              <a:rPr>
-                <a:solidFill>
-                  <a:srgbClr val="AD0000"/>
-                </a:solidFill>
-                <a:latin typeface="Consolas"/>
-              </a:rPr>
-              <a:t>![Elephant](elephant.png)</a:t>
-            </a:r>
-            <a:r>
-              <a:rPr>
-                <a:solidFill>
-                  <a:srgbClr val="003B4F"/>
-                </a:solidFill>
-                <a:latin typeface="Consolas"/>
-              </a:rPr>
-              <a:t>{#fig-elephant}</a:t>
-            </a:r>
-          </a:p>
-          <a:p>
-            <a:pPr lvl="0" indent="0" marL="0">
-              <a:buNone/>
-            </a:pPr>
-            <a:r>
-              <a:rPr/>
-              <a:t>Later, you can refer to it using:</a:t>
-            </a:r>
-          </a:p>
-          <a:p>
-            <a:pPr lvl="0" indent="0">
-              <a:buNone/>
-            </a:pPr>
-            <a:r>
-              <a:rPr>
-                <a:solidFill>
-                  <a:srgbClr val="003B4F"/>
-                </a:solidFill>
-                <a:latin typeface="Consolas"/>
-              </a:rPr>
-              <a:t>See @fig-elephant for an illustration.</a:t>
+              <a:t>Books in Quarto</a:t>
             </a:r>
           </a:p>
         </p:txBody>
@@ -9911,7 +10602,7 @@
 </p:sld>
 </file>
 
-<file path=ppt/slides/slide31.xml><?xml version="1.0" encoding="utf-8"?>
+<file path=ppt/slides/slide38.xml><?xml version="1.0" encoding="utf-8"?>
 <p:sld xmlns:a="http://schemas.openxmlformats.org/drawingml/2006/main" xmlns:r="http://schemas.openxmlformats.org/officeDocument/2006/relationships" xmlns:p="http://schemas.openxmlformats.org/presentationml/2006/main">
   <p:cSld>
     <p:spTree>
@@ -9938,12 +10629,7 @@
             <p:ph type="title"/>
           </p:nvPr>
         </p:nvSpPr>
-        <p:spPr>
-          <a:xfrm>
-            <a:off x="722313" y="3305176"/>
-            <a:ext cx="7772400" cy="1021556"/>
-          </a:xfrm>
-        </p:spPr>
+        <p:spPr/>
         <p:txBody>
           <a:bodyPr/>
           <a:lstStyle/>
@@ -9954,6 +10640,109 @@
             <a:r>
               <a:rPr/>
               <a:t>Books in Quarto</a:t>
+            </a:r>
+          </a:p>
+        </p:txBody>
+      </p:sp>
+      <p:sp>
+        <p:nvSpPr>
+          <p:cNvPr id="3" name="Content Placeholder 2"/>
+          <p:cNvSpPr>
+            <a:spLocks noGrp="1"/>
+          </p:cNvSpPr>
+          <p:nvPr>
+            <p:ph idx="1"/>
+          </p:nvPr>
+        </p:nvSpPr>
+        <p:spPr/>
+        <p:txBody>
+          <a:bodyPr/>
+          <a:lstStyle/>
+          <a:p>
+            <a:pPr lvl="0" indent="0" marL="0">
+              <a:buNone/>
+            </a:pPr>
+            <a:r>
+              <a:rPr/>
+              <a:t>You can also write books with quarto. From the same collection of </a:t>
+            </a:r>
+            <a:r>
+              <a:rPr>
+                <a:latin typeface="Consolas"/>
+              </a:rPr>
+              <a:t>.qmd</a:t>
+            </a:r>
+            <a:r>
+              <a:rPr/>
+              <a:t> files, Quarto can generate:</a:t>
+            </a:r>
+          </a:p>
+          <a:p>
+            <a:pPr lvl="0"/>
+            <a:r>
+              <a:rPr/>
+              <a:t>ePub</a:t>
+            </a:r>
+          </a:p>
+          <a:p>
+            <a:pPr lvl="0"/>
+            <a:r>
+              <a:rPr/>
+              <a:t>PDF</a:t>
+            </a:r>
+          </a:p>
+          <a:p>
+            <a:pPr lvl="0"/>
+            <a:r>
+              <a:rPr/>
+              <a:t>Online book</a:t>
+            </a:r>
+          </a:p>
+          <a:p>
+            <a:pPr lvl="0" indent="0" marL="0">
+              <a:buNone/>
+            </a:pPr>
+            <a:r>
+              <a:rPr/>
+              <a:t>Two recent examples are:</a:t>
+            </a:r>
+          </a:p>
+          <a:p>
+            <a:pPr lvl="0"/>
+            <a:r>
+              <a:rPr>
+                <a:hlinkClick r:id="rId2"/>
+              </a:rPr>
+              <a:t>Hands-on Programming in R</a:t>
+            </a:r>
+            <a:r>
+              <a:rPr/>
+              <a:t>, by Garrett Grolemund </a:t>
+            </a:r>
+            <a:r>
+              <a:rPr>
+                <a:hlinkClick r:id="rId3"/>
+              </a:rPr>
+              <a:t>(source)</a:t>
+            </a:r>
+          </a:p>
+          <a:p>
+            <a:pPr lvl="0"/>
+            <a:r>
+              <a:rPr>
+                <a:hlinkClick r:id="rId4"/>
+              </a:rPr>
+              <a:t>Python for Data Analysis, 3E</a:t>
+            </a:r>
+            <a:r>
+              <a:rPr/>
+              <a:t>, by Wes McKinney </a:t>
+            </a:r>
+            <a:r>
+              <a:rPr>
+                <a:hlinkClick r:id="rId5"/>
+              </a:rPr>
+              <a:t>(source)</a:t>
             </a:r>
           </a:p>
         </p:txBody>
@@ -9963,157 +10752,7 @@
 </p:sld>
 </file>
 
-<file path=ppt/slides/slide32.xml><?xml version="1.0" encoding="utf-8"?>
-<p:sld xmlns:a="http://schemas.openxmlformats.org/drawingml/2006/main" xmlns:r="http://schemas.openxmlformats.org/officeDocument/2006/relationships" xmlns:p="http://schemas.openxmlformats.org/presentationml/2006/main">
-  <p:cSld>
-    <p:spTree>
-      <p:nvGrpSpPr>
-        <p:cNvPr id="1" name=""/>
-        <p:cNvGrpSpPr/>
-        <p:nvPr/>
-      </p:nvGrpSpPr>
-      <p:grpSpPr>
-        <a:xfrm>
-          <a:off x="0" y="0"/>
-          <a:ext cx="0" cy="0"/>
-          <a:chOff x="0" y="0"/>
-          <a:chExt cx="0" cy="0"/>
-        </a:xfrm>
-      </p:grpSpPr>
-      <p:sp>
-        <p:nvSpPr>
-          <p:cNvPr id="2" name="Title 1"/>
-          <p:cNvSpPr>
-            <a:spLocks noGrp="1"/>
-          </p:cNvSpPr>
-          <p:nvPr>
-            <p:ph type="title"/>
-          </p:nvPr>
-        </p:nvSpPr>
-        <p:spPr/>
-        <p:txBody>
-          <a:bodyPr/>
-          <a:lstStyle/>
-          <a:p>
-            <a:pPr lvl="0" indent="0" marL="0">
-              <a:buNone/>
-            </a:pPr>
-            <a:r>
-              <a:rPr/>
-              <a:t>Books in Quarto</a:t>
-            </a:r>
-          </a:p>
-        </p:txBody>
-      </p:sp>
-      <p:sp>
-        <p:nvSpPr>
-          <p:cNvPr id="3" name="Content Placeholder 2"/>
-          <p:cNvSpPr>
-            <a:spLocks noGrp="1"/>
-          </p:cNvSpPr>
-          <p:nvPr>
-            <p:ph idx="1"/>
-          </p:nvPr>
-        </p:nvSpPr>
-        <p:spPr/>
-        <p:txBody>
-          <a:bodyPr/>
-          <a:lstStyle/>
-          <a:p>
-            <a:pPr lvl="0" indent="0" marL="0">
-              <a:buNone/>
-            </a:pPr>
-            <a:r>
-              <a:rPr/>
-              <a:t>You can also write books with quarto. From the same collection of </a:t>
-            </a:r>
-            <a:r>
-              <a:rPr>
-                <a:latin typeface="Consolas"/>
-              </a:rPr>
-              <a:t>.qmd</a:t>
-            </a:r>
-            <a:r>
-              <a:rPr/>
-              <a:t> files, Quarto can generate:</a:t>
-            </a:r>
-          </a:p>
-          <a:p>
-            <a:pPr lvl="0"/>
-            <a:r>
-              <a:rPr/>
-              <a:t>ePub</a:t>
-            </a:r>
-          </a:p>
-          <a:p>
-            <a:pPr lvl="0"/>
-            <a:r>
-              <a:rPr/>
-              <a:t>PDF</a:t>
-            </a:r>
-          </a:p>
-          <a:p>
-            <a:pPr lvl="0"/>
-            <a:r>
-              <a:rPr/>
-              <a:t>Online book</a:t>
-            </a:r>
-          </a:p>
-          <a:p>
-            <a:pPr lvl="0" indent="0" marL="0">
-              <a:buNone/>
-            </a:pPr>
-            <a:r>
-              <a:rPr/>
-              <a:t>Two recent examples are:</a:t>
-            </a:r>
-          </a:p>
-          <a:p>
-            <a:pPr lvl="0"/>
-            <a:r>
-              <a:rPr>
-                <a:hlinkClick r:id="rId2"/>
-              </a:rPr>
-              <a:t>Hands-on Programming in R</a:t>
-            </a:r>
-            <a:r>
-              <a:rPr/>
-              <a:t>, by Garrett Grolemund </a:t>
-            </a:r>
-            <a:r>
-              <a:rPr>
-                <a:hlinkClick r:id="rId3"/>
-              </a:rPr>
-              <a:t>(source)</a:t>
-            </a:r>
-          </a:p>
-          <a:p>
-            <a:pPr lvl="0"/>
-            <a:r>
-              <a:rPr>
-                <a:hlinkClick r:id="rId4"/>
-              </a:rPr>
-              <a:t>Python for Data Analysis, 3E</a:t>
-            </a:r>
-            <a:r>
-              <a:rPr/>
-              <a:t>, by Wes McKinney </a:t>
-            </a:r>
-            <a:r>
-              <a:rPr>
-                <a:hlinkClick r:id="rId5"/>
-              </a:rPr>
-              <a:t>(source)</a:t>
-            </a:r>
-          </a:p>
-        </p:txBody>
-      </p:sp>
-    </p:spTree>
-  </p:cSld>
-</p:sld>
-</file>
-
-<file path=ppt/slides/slide33.xml><?xml version="1.0" encoding="utf-8"?>
+<file path=ppt/slides/slide39.xml><?xml version="1.0" encoding="utf-8"?>
 <p:sld xmlns:a="http://schemas.openxmlformats.org/drawingml/2006/main" xmlns:r="http://schemas.openxmlformats.org/officeDocument/2006/relationships" xmlns:p="http://schemas.openxmlformats.org/presentationml/2006/main">
   <p:cSld>
     <p:spTree>
@@ -10246,7 +10885,167 @@
 </p:sld>
 </file>
 
-<file path=ppt/slides/slide34.xml><?xml version="1.0" encoding="utf-8"?>
+<file path=ppt/slides/slide4.xml><?xml version="1.0" encoding="utf-8"?>
+<p:sld xmlns:a="http://schemas.openxmlformats.org/drawingml/2006/main" xmlns:r="http://schemas.openxmlformats.org/officeDocument/2006/relationships" xmlns:p="http://schemas.openxmlformats.org/presentationml/2006/main">
+  <p:cSld>
+    <p:spTree>
+      <p:nvGrpSpPr>
+        <p:cNvPr id="1" name=""/>
+        <p:cNvGrpSpPr/>
+        <p:nvPr/>
+      </p:nvGrpSpPr>
+      <p:grpSpPr>
+        <a:xfrm>
+          <a:off x="0" y="0"/>
+          <a:ext cx="0" cy="0"/>
+          <a:chOff x="0" y="0"/>
+          <a:chExt cx="0" cy="0"/>
+        </a:xfrm>
+      </p:grpSpPr>
+      <p:sp>
+        <p:nvSpPr>
+          <p:cNvPr id="2" name="Title 1"/>
+          <p:cNvSpPr>
+            <a:spLocks noGrp="1"/>
+          </p:cNvSpPr>
+          <p:nvPr>
+            <p:ph type="title"/>
+          </p:nvPr>
+        </p:nvSpPr>
+        <p:spPr/>
+        <p:txBody>
+          <a:bodyPr/>
+          <a:lstStyle/>
+          <a:p>
+            <a:pPr lvl="0" indent="0" marL="0">
+              <a:buNone/>
+            </a:pPr>
+            <a:r>
+              <a:rPr/>
+              <a:t>Literate Programming</a:t>
+            </a:r>
+          </a:p>
+        </p:txBody>
+      </p:sp>
+      <p:sp>
+        <p:nvSpPr>
+          <p:cNvPr id="3" name="Content Placeholder 2"/>
+          <p:cNvSpPr>
+            <a:spLocks noGrp="1"/>
+          </p:cNvSpPr>
+          <p:nvPr>
+            <p:ph idx="1" sz="half"/>
+          </p:nvPr>
+        </p:nvSpPr>
+        <p:spPr/>
+        <p:txBody>
+          <a:bodyPr/>
+          <a:lstStyle/>
+          <a:p>
+            <a:pPr lvl="0" indent="0" marL="0">
+              <a:buNone/>
+            </a:pPr>
+            <a:r>
+              <a:rPr/>
+              <a:t>Literate programming can help create high-quality reproducible, documented code.</a:t>
+            </a:r>
+          </a:p>
+          <a:p>
+            <a:pPr lvl="0" indent="0" marL="0">
+              <a:buNone/>
+            </a:pPr>
+            <a:r>
+              <a:rPr/>
+              <a:t>Donald E. Knuth proposed literate programming in a 1984 </a:t>
+            </a:r>
+            <a:r>
+              <a:rPr>
+                <a:hlinkClick r:id="rId2"/>
+              </a:rPr>
+              <a:t>article</a:t>
+            </a:r>
+            <a:r>
+              <a:rPr/>
+              <a:t>.</a:t>
+            </a:r>
+          </a:p>
+          <a:p>
+            <a:pPr lvl="0" indent="0" marL="0">
+              <a:buNone/>
+            </a:pPr>
+            <a:r>
+              <a:rPr/>
+              <a:t>Jupyter implements the literate programming paradigm, but generating high-quality mass-consumable output (articles, websites) requires additional tools.</a:t>
+            </a:r>
+          </a:p>
+        </p:txBody>
+      </p:sp>
+      <p:pic>
+        <p:nvPicPr>
+          <p:cNvPr descr="fig:  images/literate-programming.jpg" id="0" name="Picture 1"/>
+          <p:cNvPicPr>
+            <a:picLocks noGrp="1" noChangeAspect="1"/>
+          </p:cNvPicPr>
+          <p:nvPr/>
+        </p:nvPicPr>
+        <p:blipFill>
+          <a:blip r:embed="rId3"/>
+          <a:stretch>
+            <a:fillRect/>
+          </a:stretch>
+        </p:blipFill>
+        <p:spPr bwMode="auto">
+          <a:xfrm>
+            <a:off x="5702300" y="1193800"/>
+            <a:ext cx="1917700" cy="2882900"/>
+          </a:xfrm>
+          <a:prstGeom prst="rect">
+            <a:avLst/>
+          </a:prstGeom>
+          <a:noFill/>
+          <a:ln w="9525">
+            <a:noFill/>
+            <a:headEnd/>
+            <a:tailEnd/>
+          </a:ln>
+        </p:spPr>
+      </p:pic>
+      <p:sp>
+        <p:nvSpPr>
+          <p:cNvPr id="1" name="TextBox 3"/>
+          <p:cNvSpPr txBox="1"/>
+          <p:nvPr/>
+        </p:nvSpPr>
+        <p:spPr>
+          <a:xfrm>
+            <a:off x="4648200" y="4076700"/>
+            <a:ext cx="4038600" cy="508000"/>
+          </a:xfrm>
+          <a:prstGeom prst="rect">
+            <a:avLst/>
+          </a:prstGeom>
+          <a:noFill/>
+        </p:spPr>
+        <p:txBody>
+          <a:bodyPr/>
+          <a:lstStyle/>
+          <a:p>
+            <a:pPr lvl="0" indent="0" marL="0" algn="ctr">
+              <a:buNone/>
+            </a:pPr>
+            <a:r>
+              <a:rPr/>
+              <a:t>Donald Knuth’s Literate Programming</a:t>
+            </a:r>
+          </a:p>
+        </p:txBody>
+      </p:sp>
+    </p:spTree>
+  </p:cSld>
+</p:sld>
+</file>
+
+<file path=ppt/slides/slide40.xml><?xml version="1.0" encoding="utf-8"?>
 <p:sld xmlns:a="http://schemas.openxmlformats.org/drawingml/2006/main" xmlns:r="http://schemas.openxmlformats.org/officeDocument/2006/relationships" xmlns:p="http://schemas.openxmlformats.org/presentationml/2006/main">
   <p:cSld>
     <p:spTree>
@@ -10379,7 +11178,7 @@
 </p:sld>
 </file>
 
-<file path=ppt/slides/slide35.xml><?xml version="1.0" encoding="utf-8"?>
+<file path=ppt/slides/slide41.xml><?xml version="1.0" encoding="utf-8"?>
 <p:sld xmlns:a="http://schemas.openxmlformats.org/drawingml/2006/main" xmlns:r="http://schemas.openxmlformats.org/officeDocument/2006/relationships" xmlns:p="http://schemas.openxmlformats.org/presentationml/2006/main">
   <p:cSld>
     <p:spTree>
@@ -10431,7 +11230,7 @@
 </p:sld>
 </file>
 
-<file path=ppt/slides/slide36.xml><?xml version="1.0" encoding="utf-8"?>
+<file path=ppt/slides/slide42.xml><?xml version="1.0" encoding="utf-8"?>
 <p:sld xmlns:a="http://schemas.openxmlformats.org/drawingml/2006/main" xmlns:r="http://schemas.openxmlformats.org/officeDocument/2006/relationships" xmlns:p="http://schemas.openxmlformats.org/presentationml/2006/main">
   <p:cSld>
     <p:spTree>
@@ -10646,7 +11445,7 @@
 </p:sld>
 </file>
 
-<file path=ppt/slides/slide37.xml><?xml version="1.0" encoding="utf-8"?>
+<file path=ppt/slides/slide43.xml><?xml version="1.0" encoding="utf-8"?>
 <p:sld xmlns:a="http://schemas.openxmlformats.org/drawingml/2006/main" xmlns:r="http://schemas.openxmlformats.org/officeDocument/2006/relationships" xmlns:p="http://schemas.openxmlformats.org/presentationml/2006/main">
   <p:cSld>
     <p:spTree>
@@ -10698,7 +11497,7 @@
 </p:sld>
 </file>
 
-<file path=ppt/slides/slide38.xml><?xml version="1.0" encoding="utf-8"?>
+<file path=ppt/slides/slide44.xml><?xml version="1.0" encoding="utf-8"?>
 <p:sld xmlns:a="http://schemas.openxmlformats.org/drawingml/2006/main" xmlns:r="http://schemas.openxmlformats.org/officeDocument/2006/relationships" xmlns:p="http://schemas.openxmlformats.org/presentationml/2006/main">
   <p:cSld>
     <p:spTree>
@@ -10951,7 +11750,7 @@
 </p:sld>
 </file>
 
-<file path=ppt/slides/slide39.xml><?xml version="1.0" encoding="utf-8"?>
+<file path=ppt/slides/slide45.xml><?xml version="1.0" encoding="utf-8"?>
 <p:sld xmlns:a="http://schemas.openxmlformats.org/drawingml/2006/main" xmlns:r="http://schemas.openxmlformats.org/officeDocument/2006/relationships" xmlns:p="http://schemas.openxmlformats.org/presentationml/2006/main">
   <p:cSld>
     <p:spTree>
@@ -11003,167 +11802,7 @@
 </p:sld>
 </file>
 
-<file path=ppt/slides/slide4.xml><?xml version="1.0" encoding="utf-8"?>
-<p:sld xmlns:a="http://schemas.openxmlformats.org/drawingml/2006/main" xmlns:r="http://schemas.openxmlformats.org/officeDocument/2006/relationships" xmlns:p="http://schemas.openxmlformats.org/presentationml/2006/main">
-  <p:cSld>
-    <p:spTree>
-      <p:nvGrpSpPr>
-        <p:cNvPr id="1" name=""/>
-        <p:cNvGrpSpPr/>
-        <p:nvPr/>
-      </p:nvGrpSpPr>
-      <p:grpSpPr>
-        <a:xfrm>
-          <a:off x="0" y="0"/>
-          <a:ext cx="0" cy="0"/>
-          <a:chOff x="0" y="0"/>
-          <a:chExt cx="0" cy="0"/>
-        </a:xfrm>
-      </p:grpSpPr>
-      <p:sp>
-        <p:nvSpPr>
-          <p:cNvPr id="2" name="Title 1"/>
-          <p:cNvSpPr>
-            <a:spLocks noGrp="1"/>
-          </p:cNvSpPr>
-          <p:nvPr>
-            <p:ph type="title"/>
-          </p:nvPr>
-        </p:nvSpPr>
-        <p:spPr/>
-        <p:txBody>
-          <a:bodyPr/>
-          <a:lstStyle/>
-          <a:p>
-            <a:pPr lvl="0" indent="0" marL="0">
-              <a:buNone/>
-            </a:pPr>
-            <a:r>
-              <a:rPr/>
-              <a:t>Literate Programming</a:t>
-            </a:r>
-          </a:p>
-        </p:txBody>
-      </p:sp>
-      <p:sp>
-        <p:nvSpPr>
-          <p:cNvPr id="3" name="Content Placeholder 2"/>
-          <p:cNvSpPr>
-            <a:spLocks noGrp="1"/>
-          </p:cNvSpPr>
-          <p:nvPr>
-            <p:ph idx="1" sz="half"/>
-          </p:nvPr>
-        </p:nvSpPr>
-        <p:spPr/>
-        <p:txBody>
-          <a:bodyPr/>
-          <a:lstStyle/>
-          <a:p>
-            <a:pPr lvl="0" indent="0" marL="0">
-              <a:buNone/>
-            </a:pPr>
-            <a:r>
-              <a:rPr/>
-              <a:t>Literate programming can help create high-quality reproducible, documented code.</a:t>
-            </a:r>
-          </a:p>
-          <a:p>
-            <a:pPr lvl="0" indent="0" marL="0">
-              <a:buNone/>
-            </a:pPr>
-            <a:r>
-              <a:rPr/>
-              <a:t>Donald E. Knuth proposed literate programming in a 1984 </a:t>
-            </a:r>
-            <a:r>
-              <a:rPr>
-                <a:hlinkClick r:id="rId2"/>
-              </a:rPr>
-              <a:t>article</a:t>
-            </a:r>
-            <a:r>
-              <a:rPr/>
-              <a:t>.</a:t>
-            </a:r>
-          </a:p>
-          <a:p>
-            <a:pPr lvl="0" indent="0" marL="0">
-              <a:buNone/>
-            </a:pPr>
-            <a:r>
-              <a:rPr/>
-              <a:t>Jupyter implements the literate programming paradigm, but generating high-quality mass-consumable output (articles, websites) requires additional tools.</a:t>
-            </a:r>
-          </a:p>
-        </p:txBody>
-      </p:sp>
-      <p:pic>
-        <p:nvPicPr>
-          <p:cNvPr descr="fig:  images/literate-programming.jpg" id="0" name="Picture 1"/>
-          <p:cNvPicPr>
-            <a:picLocks noGrp="1" noChangeAspect="1"/>
-          </p:cNvPicPr>
-          <p:nvPr/>
-        </p:nvPicPr>
-        <p:blipFill>
-          <a:blip r:embed="rId3"/>
-          <a:stretch>
-            <a:fillRect/>
-          </a:stretch>
-        </p:blipFill>
-        <p:spPr bwMode="auto">
-          <a:xfrm>
-            <a:off x="5702300" y="1193800"/>
-            <a:ext cx="1917700" cy="2882900"/>
-          </a:xfrm>
-          <a:prstGeom prst="rect">
-            <a:avLst/>
-          </a:prstGeom>
-          <a:noFill/>
-          <a:ln w="9525">
-            <a:noFill/>
-            <a:headEnd/>
-            <a:tailEnd/>
-          </a:ln>
-        </p:spPr>
-      </p:pic>
-      <p:sp>
-        <p:nvSpPr>
-          <p:cNvPr id="1" name="TextBox 3"/>
-          <p:cNvSpPr txBox="1"/>
-          <p:nvPr/>
-        </p:nvSpPr>
-        <p:spPr>
-          <a:xfrm>
-            <a:off x="4648200" y="4076700"/>
-            <a:ext cx="4038600" cy="508000"/>
-          </a:xfrm>
-          <a:prstGeom prst="rect">
-            <a:avLst/>
-          </a:prstGeom>
-          <a:noFill/>
-        </p:spPr>
-        <p:txBody>
-          <a:bodyPr/>
-          <a:lstStyle/>
-          <a:p>
-            <a:pPr lvl="0" indent="0" marL="0" algn="ctr">
-              <a:buNone/>
-            </a:pPr>
-            <a:r>
-              <a:rPr/>
-              <a:t>Donald Knuth’s Literate Programming</a:t>
-            </a:r>
-          </a:p>
-        </p:txBody>
-      </p:sp>
-    </p:spTree>
-  </p:cSld>
-</p:sld>
-</file>
-
-<file path=ppt/slides/slide40.xml><?xml version="1.0" encoding="utf-8"?>
+<file path=ppt/slides/slide46.xml><?xml version="1.0" encoding="utf-8"?>
 <p:sld xmlns:a="http://schemas.openxmlformats.org/drawingml/2006/main" xmlns:r="http://schemas.openxmlformats.org/officeDocument/2006/relationships" xmlns:p="http://schemas.openxmlformats.org/presentationml/2006/main">
   <p:cSld>
     <p:spTree>

</xml_diff>

<commit_message>
Work done by Mon Jul  4 11:33:50 PDT 2022
</commit_message>
<xml_diff>
--- a/docs/presentation-orig.pptx
+++ b/docs/presentation-orig.pptx
@@ -11610,137 +11610,6 @@
             <a:r>
               <a:rPr/>
               <a:t>Projects can have pre- and post-render steps in Python, R, Lua and shell script</a:t>
-            </a:r>
-          </a:p>
-          <a:p>
-            <a:pPr lvl="0" indent="0" marL="0">
-              <a:spcBef>
-                <a:spcPts val="3000"/>
-              </a:spcBef>
-              <a:buNone/>
-            </a:pPr>
-            <a:r>
-              <a:rPr b="1"/>
-              <a:t>Hacks</a:t>
-            </a:r>
-          </a:p>
-          <a:p>
-            <a:pPr lvl="0" indent="0" marL="0">
-              <a:buNone/>
-            </a:pPr>
-            <a:r>
-              <a:rPr/>
-              <a:t>Quarto is under active development, and quickly reaching v1.0. While creating this content, I had to do some workarounds.</a:t>
-            </a:r>
-          </a:p>
-          <a:p>
-            <a:pPr lvl="0" indent="-342900" marL="342900">
-              <a:buAutoNum type="arabicPeriod"/>
-            </a:pPr>
-            <a:r>
-              <a:rPr/>
-              <a:t>I created a </a:t>
-            </a:r>
-            <a:r>
-              <a:rPr>
-                <a:hlinkClick r:id="rId6"/>
-              </a:rPr>
-              <a:t>script</a:t>
-            </a:r>
-            <a:r>
-              <a:rPr/>
-              <a:t> to quickly install the latest version</a:t>
-            </a:r>
-          </a:p>
-          <a:p>
-            <a:pPr lvl="0" indent="-342900" marL="342900">
-              <a:buAutoNum type="arabicPeriod"/>
-            </a:pPr>
-            <a:r>
-              <a:rPr/>
-              <a:t>Mermaid diagrams blank in PPTX. </a:t>
-            </a:r>
-            <a:r>
-              <a:rPr>
-                <a:hlinkClick r:id="rId7"/>
-              </a:rPr>
-              <a:t>Bug</a:t>
-            </a:r>
-            <a:r>
-              <a:rPr/>
-              <a:t> quickly fixed.</a:t>
-            </a:r>
-          </a:p>
-          <a:p>
-            <a:pPr lvl="0" indent="-342900" marL="342900">
-              <a:buAutoNum type="arabicPeriod"/>
-            </a:pPr>
-            <a:r>
-              <a:rPr/>
-              <a:t>Mermaid diagrams blank in RevealJS. Workaround: refresh.</a:t>
-            </a:r>
-          </a:p>
-          <a:p>
-            <a:pPr lvl="0" indent="-342900" marL="342900">
-              <a:buAutoNum type="arabicPeriod"/>
-            </a:pPr>
-            <a:r>
-              <a:rPr/>
-              <a:t>HTML website and RevealJS from same source: images disappear</a:t>
-            </a:r>
-          </a:p>
-          <a:p>
-            <a:pPr lvl="1"/>
-            <a:r>
-              <a:rPr/>
-              <a:t>Workaround: add </a:t>
-            </a:r>
-            <a:r>
-              <a:rPr>
-                <a:latin typeface="Consolas"/>
-              </a:rPr>
-              <a:t>self-contained: true</a:t>
-            </a:r>
-            <a:r>
-              <a:rPr/>
-              <a:t> to YAML front-matter</a:t>
-            </a:r>
-          </a:p>
-          <a:p>
-            <a:pPr lvl="0" indent="-342900" marL="342900">
-              <a:buAutoNum type="arabicPeriod"/>
-            </a:pPr>
-            <a:r>
-              <a:rPr/>
-              <a:t>Pandoc large monospaced font size in PowerPoint. Workaround: </a:t>
-            </a:r>
-            <a:r>
-              <a:rPr>
-                <a:hlinkClick r:id="rId8"/>
-              </a:rPr>
-              <a:t>script</a:t>
-            </a:r>
-            <a:r>
-              <a:rPr/>
-              <a:t>.</a:t>
-            </a:r>
-          </a:p>
-          <a:p>
-            <a:pPr lvl="0" indent="-342900" marL="342900">
-              <a:buAutoNum type="arabicPeriod"/>
-            </a:pPr>
-            <a:r>
-              <a:rPr/>
-              <a:t>The decorations on this slide only appear on RevealJS, by design.</a:t>
-            </a:r>
-          </a:p>
-          <a:p>
-            <a:pPr lvl="0" indent="-342900" marL="342900">
-              <a:buAutoNum type="arabicPeriod"/>
-            </a:pPr>
-            <a:r>
-              <a:rPr/>
-              <a:t>Slide with article screenshots renders weird in HTML, no workaround.</a:t>
             </a:r>
           </a:p>
         </p:txBody>

</xml_diff>

<commit_message>
Work done by Mon Jul  4 11:56:37 PDT 2022
</commit_message>
<xml_diff>
--- a/docs/presentation-orig.pptx
+++ b/docs/presentation-orig.pptx
@@ -7264,7 +7264,7 @@
               <a:rPr>
                 <a:latin typeface="Consolas"/>
               </a:rPr>
-              <a:t>.md</a:t>
+              <a:t>.qmd</a:t>
             </a:r>
             <a:r>
               <a:rPr/>
@@ -7286,7 +7286,17 @@
             </a:r>
             <a:r>
               <a:rPr/>
-              <a:t> content</a:t>
+              <a:t> content. </a:t>
+            </a:r>
+            <a:r>
+              <a:rPr>
+                <a:hlinkClick r:id="rId3"/>
+              </a:rPr>
+              <a:t>Previous slide</a:t>
+            </a:r>
+            <a:r>
+              <a:rPr/>
+              <a:t> is an example.</a:t>
             </a:r>
           </a:p>
           <a:p>

</xml_diff>

<commit_message>
Work done by Mon Jul  4 12:50:19 PDT 2022
</commit_message>
<xml_diff>
--- a/docs/presentation-orig.pptx
+++ b/docs/presentation-orig.pptx
@@ -4229,7 +4229,17 @@
             </a:pPr>
             <a:r>
               <a:rPr/>
-              <a:t>Quarto files always start with a YAML front-matter.</a:t>
+              <a:t>Quarto </a:t>
+            </a:r>
+            <a:r>
+              <a:rPr>
+                <a:latin typeface="Consolas"/>
+              </a:rPr>
+              <a:t>.qmd</a:t>
+            </a:r>
+            <a:r>
+              <a:rPr/>
+              <a:t> files always start with a YAML front-matter.</a:t>
             </a:r>
           </a:p>
           <a:p>
@@ -5852,12 +5862,29 @@
                 <a:tableStyleId>{5C22544A-7EE6-4342-B048-85BDC9FD1C3A}</a:tableStyleId>
               </a:tblPr>
               <a:tblGrid>
-                <a:gridCol w="1003300"/>
-                <a:gridCol w="1003300"/>
-                <a:gridCol w="1003300"/>
-                <a:gridCol w="1003300"/>
+                <a:gridCol w="800100"/>
+                <a:gridCol w="800100"/>
+                <a:gridCol w="800100"/>
+                <a:gridCol w="800100"/>
+                <a:gridCol w="800100"/>
               </a:tblGrid>
               <a:tr h="0">
+                <a:tc>
+                  <a:txBody>
+                    <a:bodyPr/>
+                    <a:lstStyle/>
+                    <a:p>
+                      <a:pPr lvl="0" indent="0" marL="0" algn="l">
+                        <a:buNone/>
+                      </a:pPr>
+                      <a:r>
+                        <a:rPr/>
+                        <a:t>var</a:t>
+                      </a:r>
+                    </a:p>
+                  </a:txBody>
+                  <a:tcPr/>
+                </a:tc>
                 <a:tc>
                   <a:txBody>
                     <a:bodyPr/>
@@ -5929,12 +5956,12 @@
                     <a:bodyPr/>
                     <a:lstStyle/>
                     <a:p>
-                      <a:pPr lvl="0" indent="0" marL="0" algn="r">
+                      <a:pPr lvl="0" indent="0" marL="0" algn="l">
                         <a:buNone/>
                       </a:pPr>
                       <a:r>
                         <a:rPr/>
-                        <a:t>-0.9049</a:t>
+                        <a:t>Intercept</a:t>
                       </a:r>
                     </a:p>
                   </a:txBody>
@@ -5949,7 +5976,7 @@
                       </a:pPr>
                       <a:r>
                         <a:rPr/>
-                        <a:t>0.685</a:t>
+                        <a:t>-0.9</a:t>
                       </a:r>
                     </a:p>
                   </a:txBody>
@@ -5964,7 +5991,7 @@
                       </a:pPr>
                       <a:r>
                         <a:rPr/>
-                        <a:t>-1.321</a:t>
+                        <a:t>0.68</a:t>
                       </a:r>
                     </a:p>
                   </a:txBody>
@@ -5979,24 +6006,7 @@
                       </a:pPr>
                       <a:r>
                         <a:rPr/>
-                        <a:t>0.187</a:t>
-                      </a:r>
-                    </a:p>
-                  </a:txBody>
-                </a:tc>
-              </a:tr>
-              <a:tr h="0">
-                <a:tc>
-                  <a:txBody>
-                    <a:bodyPr/>
-                    <a:lstStyle/>
-                    <a:p>
-                      <a:pPr lvl="0" indent="0" marL="0" algn="r">
-                        <a:buNone/>
-                      </a:pPr>
-                      <a:r>
-                        <a:rPr/>
-                        <a:t>0.5414</a:t>
+                        <a:t>-1.32</a:t>
                       </a:r>
                     </a:p>
                   </a:txBody>
@@ -6011,7 +6021,24 @@
                       </a:pPr>
                       <a:r>
                         <a:rPr/>
-                        <a:t>0.053</a:t>
+                        <a:t>0.19</a:t>
+                      </a:r>
+                    </a:p>
+                  </a:txBody>
+                </a:tc>
+              </a:tr>
+              <a:tr h="0">
+                <a:tc>
+                  <a:txBody>
+                    <a:bodyPr/>
+                    <a:lstStyle/>
+                    <a:p>
+                      <a:pPr lvl="0" indent="0" marL="0" algn="l">
+                        <a:buNone/>
+                      </a:pPr>
+                      <a:r>
+                        <a:rPr/>
+                        <a:t>educ</a:t>
                       </a:r>
                     </a:p>
                   </a:txBody>
@@ -6026,7 +6053,37 @@
                       </a:pPr>
                       <a:r>
                         <a:rPr/>
-                        <a:t>10.167</a:t>
+                        <a:t>0.54</a:t>
+                      </a:r>
+                    </a:p>
+                  </a:txBody>
+                </a:tc>
+                <a:tc>
+                  <a:txBody>
+                    <a:bodyPr/>
+                    <a:lstStyle/>
+                    <a:p>
+                      <a:pPr lvl="0" indent="0" marL="0" algn="r">
+                        <a:buNone/>
+                      </a:pPr>
+                      <a:r>
+                        <a:rPr/>
+                        <a:t>0.05</a:t>
+                      </a:r>
+                    </a:p>
+                  </a:txBody>
+                </a:tc>
+                <a:tc>
+                  <a:txBody>
+                    <a:bodyPr/>
+                    <a:lstStyle/>
+                    <a:p>
+                      <a:pPr lvl="0" indent="0" marL="0" algn="r">
+                        <a:buNone/>
+                      </a:pPr>
+                      <a:r>
+                        <a:rPr/>
+                        <a:t>10.17</a:t>
                       </a:r>
                     </a:p>
                   </a:txBody>
@@ -6133,17 +6190,7 @@
                 </a:solidFill>
                 <a:latin typeface="Consolas"/>
               </a:rPr>
-              <a:t># Create an OLS model using </a:t>
-            </a:r>
-            <a:br/>
-            <a:r>
-              <a:rPr>
-                <a:solidFill>
-                  <a:srgbClr val="5E5E5E"/>
-                </a:solidFill>
-                <a:latin typeface="Consolas"/>
-              </a:rPr>
-              <a:t># the R syntax - assumes an intercept</a:t>
+              <a:t># Create an OLS model using R syntax</a:t>
             </a:r>
             <a:br/>
             <a:r>
@@ -7744,7 +7791,7 @@
             </a:pPr>
             <a:r>
               <a:rPr/>
-              <a:t>On the presentation day, you learn that Belgium, China, Brazil, India, Japan and Nigeria are attending.</a:t>
+              <a:t>On the presentation day, you learn that Italy, China, Brazil, India, Japan and Nigeria are attending.</a:t>
             </a:r>
           </a:p>
           <a:p>
@@ -8131,7 +8178,7 @@
                 </a:solidFill>
                 <a:latin typeface="Consolas"/>
               </a:rPr>
-              <a:t>"Belgium"</a:t>
+              <a:t>"Italy"</a:t>
             </a:r>
             <a:r>
               <a:rPr>
@@ -9445,7 +9492,7 @@
             </a:pPr>
             <a:r>
               <a:rPr/>
-              <a:t>The content value chain by (@drrob) captured by Amelia McNamara</a:t>
+              <a:t>The content value chain by David Robinson (@drrob) captured by Amelia McNamara</a:t>
             </a:r>
           </a:p>
         </p:txBody>
@@ -9959,7 +10006,25 @@
             </a:pPr>
             <a:r>
               <a:rPr/>
-              <a:t>I reused some of the content of this presentation to create two scholarly-looking articles. The purpose of the articles is just to show how easy it is to generate them with Quarto, they don’t contain original research. Quarto add cross-reference, citations and bibliography support to Markdown.</a:t>
+              <a:t>I reused some of the content of this presentation to create two scholarly-looking articles.</a:t>
+            </a:r>
+          </a:p>
+          <a:p>
+            <a:pPr lvl="0" indent="0" marL="0">
+              <a:buNone/>
+            </a:pPr>
+            <a:r>
+              <a:rPr/>
+              <a:t>The purpose of the articles is just to show how easy it is to generate them with Quarto, they don’t contain original research.</a:t>
+            </a:r>
+          </a:p>
+          <a:p>
+            <a:pPr lvl="0" indent="0" marL="0">
+              <a:buNone/>
+            </a:pPr>
+            <a:r>
+              <a:rPr/>
+              <a:t>Quarto adds cross-reference, citations and bibliography support to Markdown.</a:t>
             </a:r>
           </a:p>
           <a:p>
@@ -11277,7 +11342,7 @@
             </a:pPr>
             <a:r>
               <a:rPr/>
-              <a:t>Where I think Quarto is good (July 2022)</a:t>
+              <a:t>Where Quarto excels (July 2022)</a:t>
             </a:r>
           </a:p>
         </p:txBody>
@@ -11314,7 +11379,7 @@
             </a:pPr>
             <a:r>
               <a:rPr/>
-              <a:t>I think Quarto is more helpful for a team that already uses Git </a:t>
+              <a:t>I think Quarto® is more helpful for a team that already uses Git </a:t>
             </a:r>
             <a:r>
               <a:rPr b="1"/>
@@ -11420,7 +11485,7 @@
             </a:pPr>
             <a:r>
               <a:rPr/>
-              <a:t>Great for RevealJS. For PPT, render process =&gt; long edit cycle. Useful for:</a:t>
+              <a:t>Great for RevealJS. For PPT, render process -&gt; long edit cycle. Useful for:</a:t>
             </a:r>
           </a:p>
           <a:p>
@@ -11743,7 +11808,7 @@
             </a:pPr>
             <a:r>
               <a:rPr sz="1800"/>
-              <a:t>1. You can use footnotes in presentations and websites, too</a:t>
+              <a:t>1. You can use footnotes in presentations and websites, too. In PowerPoint, they appear in the appendix.</a:t>
             </a:r>
           </a:p>
         </p:txBody>
@@ -11825,6 +11890,13 @@
             <a:pPr lvl="0"/>
             <a:r>
               <a:rPr/>
+              <a:t>Needs extra tools like CWeb</a:t>
+            </a:r>
+          </a:p>
+          <a:p>
+            <a:pPr lvl="0"/>
+            <a:r>
+              <a:rPr/>
               <a:t>Great for PDFs… Beamer for slides</a:t>
             </a:r>
           </a:p>
@@ -11839,7 +11911,7 @@
             <a:pPr lvl="0"/>
             <a:r>
               <a:rPr/>
-              <a:t>Dynamic content: coding Latex</a:t>
+              <a:t>Dynamic content -&gt; code in Latex</a:t>
             </a:r>
           </a:p>
           <a:p>
@@ -11879,21 +11951,21 @@
             </a:pPr>
             <a:r>
               <a:rPr b="1"/>
-              <a:t>Word/PPT</a:t>
+              <a:t>Python notebooks</a:t>
             </a:r>
           </a:p>
           <a:p>
             <a:pPr lvl="0"/>
             <a:r>
               <a:rPr/>
-              <a:t>Hard to collaborate before O365</a:t>
+              <a:t>Great, with Pandoc</a:t>
             </a:r>
           </a:p>
           <a:p>
             <a:pPr lvl="0"/>
             <a:r>
               <a:rPr/>
-              <a:t>Hard to reproduce / auto-generate</a:t>
+              <a:t>Config separated from files</a:t>
             </a:r>
           </a:p>
         </p:txBody>
@@ -11921,40 +11993,28 @@
             </a:pPr>
             <a:r>
               <a:rPr b="1"/>
-              <a:t>Jekyll / Github Pages</a:t>
+              <a:t>Word/PPT</a:t>
             </a:r>
           </a:p>
           <a:p>
             <a:pPr lvl="0"/>
             <a:r>
               <a:rPr/>
-              <a:t>Great for sites</a:t>
+              <a:t>Hard to collaborate before O365</a:t>
             </a:r>
           </a:p>
           <a:p>
             <a:pPr lvl="0"/>
             <a:r>
               <a:rPr/>
-              <a:t>Not great for slides, papers</a:t>
-            </a:r>
-          </a:p>
-          <a:p>
-            <a:pPr lvl="0" indent="0" marL="0">
-              <a:spcBef>
-                <a:spcPts val="3000"/>
-              </a:spcBef>
-              <a:buNone/>
-            </a:pPr>
-            <a:r>
-              <a:rPr b="1"/>
-              <a:t>Python notebooks</a:t>
-            </a:r>
-          </a:p>
-          <a:p>
-            <a:pPr lvl="0"/>
-            <a:r>
-              <a:rPr/>
-              <a:t>Great, with Pandoc</a:t>
+              <a:t>Hard to reproduce / auto-generate</a:t>
+            </a:r>
+          </a:p>
+          <a:p>
+            <a:pPr lvl="1"/>
+            <a:r>
+              <a:rPr/>
+              <a:t>code and writing separate</a:t>
             </a:r>
           </a:p>
           <a:p>

</xml_diff>

<commit_message>
Work done by Mon Jul  4 13:26:37 PDT 2022
</commit_message>
<xml_diff>
--- a/docs/presentation-orig.pptx
+++ b/docs/presentation-orig.pptx
@@ -5943,7 +5943,7 @@
                       </a:pPr>
                       <a:r>
                         <a:rPr/>
-                        <a:t>p-value</a:t>
+                        <a:t>p-val</a:t>
                       </a:r>
                     </a:p>
                   </a:txBody>
@@ -5961,7 +5961,7 @@
                       </a:pPr>
                       <a:r>
                         <a:rPr/>
-                        <a:t>Intercept</a:t>
+                        <a:t>int</a:t>
                       </a:r>
                     </a:p>
                   </a:txBody>

</xml_diff>

<commit_message>
Work done by Mon Jul  4 14:39:25 PDT 2022
</commit_message>
<xml_diff>
--- a/docs/presentation-orig.pptx
+++ b/docs/presentation-orig.pptx
@@ -11681,10 +11681,34 @@
             </a:r>
           </a:p>
           <a:p>
+            <a:pPr lvl="1"/>
+            <a:r>
+              <a:rPr/>
+              <a:t>This allows people that write in Python and R to collaborate natively on the same project</a:t>
+            </a:r>
+          </a:p>
+          <a:p>
+            <a:pPr lvl="1"/>
+            <a:r>
+              <a:rPr/>
+              <a:t>Some writers can use R, some can use Python, their content can link to each other as long as they’re in different </a:t>
+            </a:r>
+            <a:r>
+              <a:rPr>
+                <a:latin typeface="Consolas"/>
+              </a:rPr>
+              <a:t>.qmd</a:t>
+            </a:r>
+            <a:r>
+              <a:rPr/>
+              <a:t> files.</a:t>
+            </a:r>
+          </a:p>
+          <a:p>
             <a:pPr lvl="0"/>
             <a:r>
               <a:rPr/>
-              <a:t>Projects can have pre- and post-render steps in Python, R, Lua and shell script</a:t>
+              <a:t>Projects can have pre-render and post-render steps in Python, R, Lua and shell script. I tend to use shell scripts that call other scripts.</a:t>
             </a:r>
           </a:p>
         </p:txBody>

</xml_diff>

<commit_message>
Work done by Thu Jul  7 10:39:46 PDT 2022
</commit_message>
<xml_diff>
--- a/docs/presentation-orig.pptx
+++ b/docs/presentation-orig.pptx
@@ -4232,7 +4232,7 @@
               <a:t>Quarto </a:t>
             </a:r>
             <a:r>
-              <a:rPr>
+              <a:rPr sz="1200">
                 <a:latin typeface="Consolas"/>
               </a:rPr>
               <a:t>.qmd</a:t>
@@ -4251,7 +4251,7 @@
               <a:t>The YAML configuration determines what’s the output format of your document. A few popular output options are </a:t>
             </a:r>
             <a:r>
-              <a:rPr>
+              <a:rPr sz="1200">
                 <a:latin typeface="Consolas"/>
               </a:rPr>
               <a:t>html</a:t>
@@ -4261,7 +4261,7 @@
               <a:t>, </a:t>
             </a:r>
             <a:r>
-              <a:rPr>
+              <a:rPr sz="1200">
                 <a:latin typeface="Consolas"/>
               </a:rPr>
               <a:t>pptx</a:t>
@@ -4271,7 +4271,7 @@
               <a:t>, </a:t>
             </a:r>
             <a:r>
-              <a:rPr>
+              <a:rPr sz="1200">
                 <a:latin typeface="Consolas"/>
               </a:rPr>
               <a:t>docx</a:t>
@@ -4281,7 +4281,7 @@
               <a:t>, and </a:t>
             </a:r>
             <a:r>
-              <a:rPr>
+              <a:rPr sz="1200">
                 <a:latin typeface="Consolas"/>
               </a:rPr>
               <a:t>pdf</a:t>
@@ -4330,7 +4330,7 @@
               <a:buNone/>
             </a:pPr>
             <a:r>
-              <a:rPr>
+              <a:rPr sz="1200">
                 <a:solidFill>
                   <a:srgbClr val="AD0000"/>
                 </a:solidFill>
@@ -4340,7 +4340,7 @@
             </a:r>
             <a:br/>
             <a:r>
-              <a:rPr>
+              <a:rPr sz="1200">
                 <a:solidFill>
                   <a:srgbClr val="4758AB"/>
                 </a:solidFill>
@@ -4349,7 +4349,7 @@
               <a:t>title</a:t>
             </a:r>
             <a:r>
-              <a:rPr>
+              <a:rPr sz="1200">
                 <a:solidFill>
                   <a:srgbClr val="003B4F"/>
                 </a:solidFill>
@@ -4358,7 +4358,7 @@
               <a:t>:</a:t>
             </a:r>
             <a:r>
-              <a:rPr>
+              <a:rPr sz="1200">
                 <a:solidFill>
                   <a:srgbClr val="657422"/>
                 </a:solidFill>
@@ -4367,7 +4367,7 @@
               <a:t> </a:t>
             </a:r>
             <a:r>
-              <a:rPr>
+              <a:rPr sz="1200">
                 <a:solidFill>
                   <a:srgbClr val="20794D"/>
                 </a:solidFill>
@@ -4377,7 +4377,7 @@
             </a:r>
             <a:br/>
             <a:r>
-              <a:rPr>
+              <a:rPr sz="1200">
                 <a:solidFill>
                   <a:srgbClr val="4758AB"/>
                 </a:solidFill>
@@ -4386,7 +4386,7 @@
               <a:t>format</a:t>
             </a:r>
             <a:r>
-              <a:rPr>
+              <a:rPr sz="1200">
                 <a:solidFill>
                   <a:srgbClr val="003B4F"/>
                 </a:solidFill>
@@ -4395,7 +4395,7 @@
               <a:t>:</a:t>
             </a:r>
             <a:r>
-              <a:rPr>
+              <a:rPr sz="1200">
                 <a:solidFill>
                   <a:srgbClr val="657422"/>
                 </a:solidFill>
@@ -4405,7 +4405,7 @@
             </a:r>
             <a:br/>
             <a:r>
-              <a:rPr>
+              <a:rPr sz="1200">
                 <a:solidFill>
                   <a:srgbClr val="657422"/>
                 </a:solidFill>
@@ -4414,7 +4414,7 @@
               <a:t>  </a:t>
             </a:r>
             <a:r>
-              <a:rPr>
+              <a:rPr sz="1200">
                 <a:solidFill>
                   <a:srgbClr val="4758AB"/>
                 </a:solidFill>
@@ -4423,7 +4423,7 @@
               <a:t>pptx</a:t>
             </a:r>
             <a:r>
-              <a:rPr>
+              <a:rPr sz="1200">
                 <a:solidFill>
                   <a:srgbClr val="003B4F"/>
                 </a:solidFill>
@@ -4433,7 +4433,7 @@
             </a:r>
             <a:br/>
             <a:r>
-              <a:rPr>
+              <a:rPr sz="1200">
                 <a:solidFill>
                   <a:srgbClr val="657422"/>
                 </a:solidFill>
@@ -4442,7 +4442,7 @@
               <a:t>    </a:t>
             </a:r>
             <a:r>
-              <a:rPr>
+              <a:rPr sz="1200">
                 <a:solidFill>
                   <a:srgbClr val="4758AB"/>
                 </a:solidFill>
@@ -4451,7 +4451,7 @@
               <a:t>reference-doc</a:t>
             </a:r>
             <a:r>
-              <a:rPr>
+              <a:rPr sz="1200">
                 <a:solidFill>
                   <a:srgbClr val="003B4F"/>
                 </a:solidFill>
@@ -4460,7 +4460,7 @@
               <a:t>:</a:t>
             </a:r>
             <a:r>
-              <a:rPr>
+              <a:rPr sz="1200">
                 <a:solidFill>
                   <a:srgbClr val="657422"/>
                 </a:solidFill>
@@ -4470,7 +4470,7 @@
             </a:r>
             <a:br/>
             <a:r>
-              <a:rPr>
+              <a:rPr sz="1200">
                 <a:solidFill>
                   <a:srgbClr val="657422"/>
                 </a:solidFill>
@@ -4479,7 +4479,7 @@
               <a:t>  </a:t>
             </a:r>
             <a:r>
-              <a:rPr>
+              <a:rPr sz="1200">
                 <a:solidFill>
                   <a:srgbClr val="4758AB"/>
                 </a:solidFill>
@@ -4488,7 +4488,7 @@
               <a:t>revealjs</a:t>
             </a:r>
             <a:r>
-              <a:rPr>
+              <a:rPr sz="1200">
                 <a:solidFill>
                   <a:srgbClr val="003B4F"/>
                 </a:solidFill>
@@ -4498,7 +4498,7 @@
             </a:r>
             <a:br/>
             <a:r>
-              <a:rPr>
+              <a:rPr sz="1200">
                 <a:solidFill>
                   <a:srgbClr val="657422"/>
                 </a:solidFill>
@@ -4507,7 +4507,7 @@
               <a:t>    </a:t>
             </a:r>
             <a:r>
-              <a:rPr>
+              <a:rPr sz="1200">
                 <a:solidFill>
                   <a:srgbClr val="4758AB"/>
                 </a:solidFill>
@@ -4516,7 +4516,7 @@
               <a:t>incremental</a:t>
             </a:r>
             <a:r>
-              <a:rPr>
+              <a:rPr sz="1200">
                 <a:solidFill>
                   <a:srgbClr val="003B4F"/>
                 </a:solidFill>
@@ -4525,7 +4525,7 @@
               <a:t>:</a:t>
             </a:r>
             <a:r>
-              <a:rPr>
+              <a:rPr sz="1200">
                 <a:solidFill>
                   <a:srgbClr val="657422"/>
                 </a:solidFill>
@@ -4534,7 +4534,7 @@
               <a:t> </a:t>
             </a:r>
             <a:r>
-              <a:rPr>
+              <a:rPr sz="1200">
                 <a:solidFill>
                   <a:srgbClr val="20794D"/>
                 </a:solidFill>
@@ -4544,7 +4544,7 @@
             </a:r>
             <a:br/>
             <a:r>
-              <a:rPr>
+              <a:rPr sz="1200">
                 <a:solidFill>
                   <a:srgbClr val="657422"/>
                 </a:solidFill>
@@ -4553,7 +4553,7 @@
               <a:t>    </a:t>
             </a:r>
             <a:r>
-              <a:rPr>
+              <a:rPr sz="1200">
                 <a:solidFill>
                   <a:srgbClr val="4758AB"/>
                 </a:solidFill>
@@ -4562,7 +4562,7 @@
               <a:t>theme</a:t>
             </a:r>
             <a:r>
-              <a:rPr>
+              <a:rPr sz="1200">
                 <a:solidFill>
                   <a:srgbClr val="003B4F"/>
                 </a:solidFill>
@@ -4571,7 +4571,7 @@
               <a:t>:</a:t>
             </a:r>
             <a:r>
-              <a:rPr>
+              <a:rPr sz="1200">
                 <a:solidFill>
                   <a:srgbClr val="657422"/>
                 </a:solidFill>
@@ -4582,7 +4582,7 @@
             <a:br/>
             <a:br/>
             <a:r>
-              <a:rPr>
+              <a:rPr sz="1200">
                 <a:solidFill>
                   <a:srgbClr val="4758AB"/>
                 </a:solidFill>
@@ -4591,7 +4591,7 @@
               <a:t>author</a:t>
             </a:r>
             <a:r>
-              <a:rPr>
+              <a:rPr sz="1200">
                 <a:solidFill>
                   <a:srgbClr val="003B4F"/>
                 </a:solidFill>
@@ -4600,7 +4600,7 @@
               <a:t>:</a:t>
             </a:r>
             <a:r>
-              <a:rPr>
+              <a:rPr sz="1200">
                 <a:solidFill>
                   <a:srgbClr val="657422"/>
                 </a:solidFill>
@@ -4610,7 +4610,7 @@
             </a:r>
             <a:br/>
             <a:r>
-              <a:rPr>
+              <a:rPr sz="1200">
                 <a:solidFill>
                   <a:srgbClr val="4758AB"/>
                 </a:solidFill>
@@ -4619,7 +4619,7 @@
               <a:t>date</a:t>
             </a:r>
             <a:r>
-              <a:rPr>
+              <a:rPr sz="1200">
                 <a:solidFill>
                   <a:srgbClr val="003B4F"/>
                 </a:solidFill>
@@ -4628,7 +4628,7 @@
               <a:t>:</a:t>
             </a:r>
             <a:r>
-              <a:rPr>
+              <a:rPr sz="1200">
                 <a:solidFill>
                   <a:srgbClr val="657422"/>
                 </a:solidFill>
@@ -4638,7 +4638,7 @@
             </a:r>
             <a:br/>
             <a:r>
-              <a:rPr>
+              <a:rPr sz="1200">
                 <a:solidFill>
                   <a:srgbClr val="AD0000"/>
                 </a:solidFill>
@@ -4842,7 +4842,7 @@
               <a:buNone/>
             </a:pPr>
             <a:r>
-              <a:rPr>
+              <a:rPr sz="1200">
                 <a:solidFill>
                   <a:srgbClr val="4758AB"/>
                 </a:solidFill>
@@ -4853,7 +4853,7 @@
             <a:br/>
             <a:br/>
             <a:r>
-              <a:rPr>
+              <a:rPr sz="1200">
                 <a:solidFill>
                   <a:srgbClr val="003B4F"/>
                 </a:solidFill>
@@ -4862,7 +4862,7 @@
               <a:t>Write content in </a:t>
             </a:r>
             <a:r>
-              <a:rPr>
+              <a:rPr sz="1200">
                 <a:solidFill>
                   <a:srgbClr val="5E5E5E"/>
                 </a:solidFill>
@@ -4871,7 +4871,7 @@
               <a:t>[</a:t>
             </a:r>
             <a:r>
-              <a:rPr>
+              <a:rPr sz="1200">
                 <a:solidFill>
                   <a:srgbClr val="003B4F"/>
                 </a:solidFill>
@@ -4880,7 +4880,7 @@
               <a:t>Markdown</a:t>
             </a:r>
             <a:r>
-              <a:rPr>
+              <a:rPr sz="1200">
                 <a:solidFill>
                   <a:srgbClr val="5E5E5E"/>
                 </a:solidFill>
@@ -4889,7 +4889,7 @@
               <a:t>]</a:t>
             </a:r>
             <a:r>
-              <a:rPr>
+              <a:rPr sz="1200">
                 <a:solidFill>
                   <a:srgbClr val="003B4F"/>
                 </a:solidFill>
@@ -4900,7 +4900,7 @@
             <a:br/>
             <a:br/>
             <a:r>
-              <a:rPr>
+              <a:rPr sz="1200">
                 <a:solidFill>
                   <a:srgbClr val="003B4F"/>
                 </a:solidFill>
@@ -4910,7 +4910,7 @@
             </a:r>
             <a:br/>
             <a:r>
-              <a:rPr>
+              <a:rPr sz="1200">
                 <a:solidFill>
                   <a:srgbClr val="003B4F"/>
                 </a:solidFill>
@@ -4921,7 +4921,7 @@
             <a:br/>
             <a:br/>
             <a:r>
-              <a:rPr>
+              <a:rPr sz="1200">
                 <a:solidFill>
                   <a:srgbClr val="003B4F"/>
                 </a:solidFill>
@@ -4931,7 +4931,7 @@
             </a:r>
             <a:br/>
             <a:r>
-              <a:rPr>
+              <a:rPr sz="1200">
                 <a:solidFill>
                   <a:srgbClr val="003B4F"/>
                 </a:solidFill>
@@ -4940,7 +4940,7 @@
               <a:t>like diagrams with </a:t>
             </a:r>
             <a:r>
-              <a:rPr>
+              <a:rPr sz="1200">
                 <a:solidFill>
                   <a:srgbClr val="5E5E5E"/>
                 </a:solidFill>
@@ -4949,7 +4949,7 @@
               <a:t>`mermaid`</a:t>
             </a:r>
             <a:r>
-              <a:rPr>
+              <a:rPr sz="1200">
                 <a:solidFill>
                   <a:srgbClr val="003B4F"/>
                 </a:solidFill>
@@ -4959,7 +4959,7 @@
             </a:r>
             <a:br/>
             <a:r>
-              <a:rPr>
+              <a:rPr sz="1200">
                 <a:solidFill>
                   <a:srgbClr val="5E5E5E"/>
                 </a:solidFill>
@@ -4968,7 +4968,7 @@
               <a:t>`GraphViz`</a:t>
             </a:r>
             <a:r>
-              <a:rPr>
+              <a:rPr sz="1200">
                 <a:solidFill>
                   <a:srgbClr val="003B4F"/>
                 </a:solidFill>
@@ -4979,7 +4979,7 @@
             <a:br/>
             <a:br/>
             <a:r>
-              <a:rPr>
+              <a:rPr sz="1200">
                 <a:solidFill>
                   <a:srgbClr val="003B4F"/>
                 </a:solidFill>
@@ -4989,7 +4989,7 @@
             </a:r>
             <a:br/>
             <a:r>
-              <a:rPr>
+              <a:rPr sz="1200">
                 <a:solidFill>
                   <a:srgbClr val="003B4F"/>
                 </a:solidFill>
@@ -4999,7 +4999,7 @@
             </a:r>
             <a:br/>
             <a:r>
-              <a:rPr>
+              <a:rPr sz="1200">
                 <a:solidFill>
                   <a:srgbClr val="003B4F"/>
                 </a:solidFill>
@@ -5087,7 +5087,7 @@
             </a:pPr>
             <a:br/>
             <a:r>
-              <a:rPr>
+              <a:rPr sz="1200">
                 <a:solidFill>
                   <a:srgbClr val="00769E"/>
                 </a:solidFill>
@@ -5096,7 +5096,7 @@
               <a:t>import</a:t>
             </a:r>
             <a:r>
-              <a:rPr>
+              <a:rPr sz="1200">
                 <a:solidFill>
                   <a:srgbClr val="003B4F"/>
                 </a:solidFill>
@@ -5105,7 +5105,7 @@
               <a:t> numpy </a:t>
             </a:r>
             <a:r>
-              <a:rPr>
+              <a:rPr sz="1200">
                 <a:solidFill>
                   <a:srgbClr val="00769E"/>
                 </a:solidFill>
@@ -5114,7 +5114,7 @@
               <a:t>as</a:t>
             </a:r>
             <a:r>
-              <a:rPr>
+              <a:rPr sz="1200">
                 <a:solidFill>
                   <a:srgbClr val="003B4F"/>
                 </a:solidFill>
@@ -5124,7 +5124,7 @@
             </a:r>
             <a:br/>
             <a:r>
-              <a:rPr>
+              <a:rPr sz="1200">
                 <a:solidFill>
                   <a:srgbClr val="00769E"/>
                 </a:solidFill>
@@ -5133,7 +5133,7 @@
               <a:t>import</a:t>
             </a:r>
             <a:r>
-              <a:rPr>
+              <a:rPr sz="1200">
                 <a:solidFill>
                   <a:srgbClr val="003B4F"/>
                 </a:solidFill>
@@ -5142,7 +5142,7 @@
               <a:t> matplotlib.pyplot </a:t>
             </a:r>
             <a:r>
-              <a:rPr>
+              <a:rPr sz="1200">
                 <a:solidFill>
                   <a:srgbClr val="00769E"/>
                 </a:solidFill>
@@ -5151,7 +5151,7 @@
               <a:t>as</a:t>
             </a:r>
             <a:r>
-              <a:rPr>
+              <a:rPr sz="1200">
                 <a:solidFill>
                   <a:srgbClr val="003B4F"/>
                 </a:solidFill>
@@ -5162,7 +5162,7 @@
             <a:br/>
             <a:br/>
             <a:r>
-              <a:rPr>
+              <a:rPr sz="1200">
                 <a:solidFill>
                   <a:srgbClr val="003B4F"/>
                 </a:solidFill>
@@ -5171,7 +5171,7 @@
               <a:t>r </a:t>
             </a:r>
             <a:r>
-              <a:rPr>
+              <a:rPr sz="1200">
                 <a:solidFill>
                   <a:srgbClr val="5E5E5E"/>
                 </a:solidFill>
@@ -5180,7 +5180,7 @@
               <a:t>=</a:t>
             </a:r>
             <a:r>
-              <a:rPr>
+              <a:rPr sz="1200">
                 <a:solidFill>
                   <a:srgbClr val="003B4F"/>
                 </a:solidFill>
@@ -5189,7 +5189,7 @@
               <a:t> np.arange(</a:t>
             </a:r>
             <a:r>
-              <a:rPr>
+              <a:rPr sz="1200">
                 <a:solidFill>
                   <a:srgbClr val="AD0000"/>
                 </a:solidFill>
@@ -5198,7 +5198,7 @@
               <a:t>0</a:t>
             </a:r>
             <a:r>
-              <a:rPr>
+              <a:rPr sz="1200">
                 <a:solidFill>
                   <a:srgbClr val="003B4F"/>
                 </a:solidFill>
@@ -5207,7 +5207,7 @@
               <a:t>, </a:t>
             </a:r>
             <a:r>
-              <a:rPr>
+              <a:rPr sz="1200">
                 <a:solidFill>
                   <a:srgbClr val="AD0000"/>
                 </a:solidFill>
@@ -5216,7 +5216,7 @@
               <a:t>2</a:t>
             </a:r>
             <a:r>
-              <a:rPr>
+              <a:rPr sz="1200">
                 <a:solidFill>
                   <a:srgbClr val="003B4F"/>
                 </a:solidFill>
@@ -5225,7 +5225,7 @@
               <a:t>, </a:t>
             </a:r>
             <a:r>
-              <a:rPr>
+              <a:rPr sz="1200">
                 <a:solidFill>
                   <a:srgbClr val="AD0000"/>
                 </a:solidFill>
@@ -5234,7 +5234,7 @@
               <a:t>0.01</a:t>
             </a:r>
             <a:r>
-              <a:rPr>
+              <a:rPr sz="1200">
                 <a:solidFill>
                   <a:srgbClr val="003B4F"/>
                 </a:solidFill>
@@ -5244,7 +5244,7 @@
             </a:r>
             <a:br/>
             <a:r>
-              <a:rPr>
+              <a:rPr sz="1200">
                 <a:solidFill>
                   <a:srgbClr val="003B4F"/>
                 </a:solidFill>
@@ -5253,7 +5253,7 @@
               <a:t>theta </a:t>
             </a:r>
             <a:r>
-              <a:rPr>
+              <a:rPr sz="1200">
                 <a:solidFill>
                   <a:srgbClr val="5E5E5E"/>
                 </a:solidFill>
@@ -5262,7 +5262,7 @@
               <a:t>=</a:t>
             </a:r>
             <a:r>
-              <a:rPr>
+              <a:rPr sz="1200">
                 <a:solidFill>
                   <a:srgbClr val="003B4F"/>
                 </a:solidFill>
@@ -5271,7 +5271,7 @@
               <a:t> </a:t>
             </a:r>
             <a:r>
-              <a:rPr>
+              <a:rPr sz="1200">
                 <a:solidFill>
                   <a:srgbClr val="AD0000"/>
                 </a:solidFill>
@@ -5280,7 +5280,7 @@
               <a:t>2</a:t>
             </a:r>
             <a:r>
-              <a:rPr>
+              <a:rPr sz="1200">
                 <a:solidFill>
                   <a:srgbClr val="003B4F"/>
                 </a:solidFill>
@@ -5289,7 +5289,7 @@
               <a:t> </a:t>
             </a:r>
             <a:r>
-              <a:rPr>
+              <a:rPr sz="1200">
                 <a:solidFill>
                   <a:srgbClr val="5E5E5E"/>
                 </a:solidFill>
@@ -5298,7 +5298,7 @@
               <a:t>*</a:t>
             </a:r>
             <a:r>
-              <a:rPr>
+              <a:rPr sz="1200">
                 <a:solidFill>
                   <a:srgbClr val="003B4F"/>
                 </a:solidFill>
@@ -5307,7 +5307,7 @@
               <a:t> np.pi </a:t>
             </a:r>
             <a:r>
-              <a:rPr>
+              <a:rPr sz="1200">
                 <a:solidFill>
                   <a:srgbClr val="5E5E5E"/>
                 </a:solidFill>
@@ -5316,7 +5316,7 @@
               <a:t>*</a:t>
             </a:r>
             <a:r>
-              <a:rPr>
+              <a:rPr sz="1200">
                 <a:solidFill>
                   <a:srgbClr val="003B4F"/>
                 </a:solidFill>
@@ -5326,7 +5326,7 @@
             </a:r>
             <a:br/>
             <a:r>
-              <a:rPr>
+              <a:rPr sz="1200">
                 <a:solidFill>
                   <a:srgbClr val="003B4F"/>
                 </a:solidFill>
@@ -5335,7 +5335,7 @@
               <a:t>fig, ax </a:t>
             </a:r>
             <a:r>
-              <a:rPr>
+              <a:rPr sz="1200">
                 <a:solidFill>
                   <a:srgbClr val="5E5E5E"/>
                 </a:solidFill>
@@ -5344,7 +5344,7 @@
               <a:t>=</a:t>
             </a:r>
             <a:r>
-              <a:rPr>
+              <a:rPr sz="1200">
                 <a:solidFill>
                   <a:srgbClr val="003B4F"/>
                 </a:solidFill>
@@ -5353,7 +5353,7 @@
               <a:t> plt.subplots(subplot_kw</a:t>
             </a:r>
             <a:r>
-              <a:rPr>
+              <a:rPr sz="1200">
                 <a:solidFill>
                   <a:srgbClr val="5E5E5E"/>
                 </a:solidFill>
@@ -5363,7 +5363,7 @@
             </a:r>
             <a:br/>
             <a:r>
-              <a:rPr>
+              <a:rPr sz="1200">
                 <a:solidFill>
                   <a:srgbClr val="003B4F"/>
                 </a:solidFill>
@@ -5372,7 +5372,7 @@
               <a:t>                {</a:t>
             </a:r>
             <a:r>
-              <a:rPr>
+              <a:rPr sz="1200">
                 <a:solidFill>
                   <a:srgbClr val="20794D"/>
                 </a:solidFill>
@@ -5381,7 +5381,7 @@
               <a:t>'projection'</a:t>
             </a:r>
             <a:r>
-              <a:rPr>
+              <a:rPr sz="1200">
                 <a:solidFill>
                   <a:srgbClr val="003B4F"/>
                 </a:solidFill>
@@ -5390,7 +5390,7 @@
               <a:t>: </a:t>
             </a:r>
             <a:r>
-              <a:rPr>
+              <a:rPr sz="1200">
                 <a:solidFill>
                   <a:srgbClr val="20794D"/>
                 </a:solidFill>
@@ -5399,7 +5399,7 @@
               <a:t>'polar'</a:t>
             </a:r>
             <a:r>
-              <a:rPr>
+              <a:rPr sz="1200">
                 <a:solidFill>
                   <a:srgbClr val="003B4F"/>
                 </a:solidFill>
@@ -5409,7 +5409,7 @@
             </a:r>
             <a:br/>
             <a:r>
-              <a:rPr>
+              <a:rPr sz="1200">
                 <a:solidFill>
                   <a:srgbClr val="003B4F"/>
                 </a:solidFill>
@@ -5419,7 +5419,7 @@
             </a:r>
             <a:br/>
             <a:r>
-              <a:rPr>
+              <a:rPr sz="1200">
                 <a:solidFill>
                   <a:srgbClr val="003B4F"/>
                 </a:solidFill>
@@ -5428,7 +5428,7 @@
               <a:t>ax.set_rticks([</a:t>
             </a:r>
             <a:r>
-              <a:rPr>
+              <a:rPr sz="1200">
                 <a:solidFill>
                   <a:srgbClr val="AD0000"/>
                 </a:solidFill>
@@ -5437,7 +5437,7 @@
               <a:t>0.5</a:t>
             </a:r>
             <a:r>
-              <a:rPr>
+              <a:rPr sz="1200">
                 <a:solidFill>
                   <a:srgbClr val="003B4F"/>
                 </a:solidFill>
@@ -5446,7 +5446,7 @@
               <a:t>, </a:t>
             </a:r>
             <a:r>
-              <a:rPr>
+              <a:rPr sz="1200">
                 <a:solidFill>
                   <a:srgbClr val="AD0000"/>
                 </a:solidFill>
@@ -5455,7 +5455,7 @@
               <a:t>1</a:t>
             </a:r>
             <a:r>
-              <a:rPr>
+              <a:rPr sz="1200">
                 <a:solidFill>
                   <a:srgbClr val="003B4F"/>
                 </a:solidFill>
@@ -5464,7 +5464,7 @@
               <a:t>, </a:t>
             </a:r>
             <a:r>
-              <a:rPr>
+              <a:rPr sz="1200">
                 <a:solidFill>
                   <a:srgbClr val="AD0000"/>
                 </a:solidFill>
@@ -5473,7 +5473,7 @@
               <a:t>1.5</a:t>
             </a:r>
             <a:r>
-              <a:rPr>
+              <a:rPr sz="1200">
                 <a:solidFill>
                   <a:srgbClr val="003B4F"/>
                 </a:solidFill>
@@ -5482,7 +5482,7 @@
               <a:t>, </a:t>
             </a:r>
             <a:r>
-              <a:rPr>
+              <a:rPr sz="1200">
                 <a:solidFill>
                   <a:srgbClr val="AD0000"/>
                 </a:solidFill>
@@ -5491,7 +5491,7 @@
               <a:t>2</a:t>
             </a:r>
             <a:r>
-              <a:rPr>
+              <a:rPr sz="1200">
                 <a:solidFill>
                   <a:srgbClr val="003B4F"/>
                 </a:solidFill>
@@ -5501,7 +5501,7 @@
             </a:r>
             <a:br/>
             <a:r>
-              <a:rPr>
+              <a:rPr sz="1200">
                 <a:solidFill>
                   <a:srgbClr val="003B4F"/>
                 </a:solidFill>
@@ -5510,7 +5510,7 @@
               <a:t>ax.grid(</a:t>
             </a:r>
             <a:r>
-              <a:rPr>
+              <a:rPr sz="1200">
                 <a:solidFill>
                   <a:srgbClr val="111111"/>
                 </a:solidFill>
@@ -5519,7 +5519,7 @@
               <a:t>True</a:t>
             </a:r>
             <a:r>
-              <a:rPr>
+              <a:rPr sz="1200">
                 <a:solidFill>
                   <a:srgbClr val="003B4F"/>
                 </a:solidFill>
@@ -5529,7 +5529,7 @@
             </a:r>
             <a:br/>
             <a:r>
-              <a:rPr>
+              <a:rPr sz="1200">
                 <a:solidFill>
                   <a:srgbClr val="003B4F"/>
                 </a:solidFill>
@@ -5664,7 +5664,7 @@
               <a:buNone/>
             </a:pPr>
             <a:r>
-              <a:rPr>
+              <a:rPr sz="1200">
                 <a:latin typeface="Consolas"/>
               </a:rPr>
               <a:t>flowchart TD
@@ -6127,7 +6127,7 @@
               <a:buNone/>
             </a:pPr>
             <a:r>
-              <a:rPr>
+              <a:rPr sz="1200">
                 <a:solidFill>
                   <a:srgbClr val="5E5E5E"/>
                 </a:solidFill>
@@ -6137,7 +6137,7 @@
             </a:r>
             <a:br/>
             <a:r>
-              <a:rPr>
+              <a:rPr sz="1200">
                 <a:solidFill>
                   <a:srgbClr val="003B4F"/>
                 </a:solidFill>
@@ -6146,7 +6146,7 @@
               <a:t>df_wage </a:t>
             </a:r>
             <a:r>
-              <a:rPr>
+              <a:rPr sz="1200">
                 <a:solidFill>
                   <a:srgbClr val="5E5E5E"/>
                 </a:solidFill>
@@ -6155,7 +6155,7 @@
               <a:t>=</a:t>
             </a:r>
             <a:r>
-              <a:rPr>
+              <a:rPr sz="1200">
                 <a:solidFill>
                   <a:srgbClr val="003B4F"/>
                 </a:solidFill>
@@ -6164,7 +6164,7 @@
               <a:t> pd.read_csv(</a:t>
             </a:r>
             <a:r>
-              <a:rPr>
+              <a:rPr sz="1200">
                 <a:solidFill>
                   <a:srgbClr val="20794D"/>
                 </a:solidFill>
@@ -6173,7 +6173,7 @@
               <a:t>"data/wage1.csv"</a:t>
             </a:r>
             <a:r>
-              <a:rPr>
+              <a:rPr sz="1200">
                 <a:solidFill>
                   <a:srgbClr val="003B4F"/>
                 </a:solidFill>
@@ -6184,7 +6184,7 @@
             <a:br/>
             <a:br/>
             <a:r>
-              <a:rPr>
+              <a:rPr sz="1200">
                 <a:solidFill>
                   <a:srgbClr val="5E5E5E"/>
                 </a:solidFill>
@@ -6194,7 +6194,7 @@
             </a:r>
             <a:br/>
             <a:r>
-              <a:rPr>
+              <a:rPr sz="1200">
                 <a:solidFill>
                   <a:srgbClr val="003B4F"/>
                 </a:solidFill>
@@ -6203,7 +6203,7 @@
               <a:t>mod </a:t>
             </a:r>
             <a:r>
-              <a:rPr>
+              <a:rPr sz="1200">
                 <a:solidFill>
                   <a:srgbClr val="5E5E5E"/>
                 </a:solidFill>
@@ -6212,7 +6212,7 @@
               <a:t>=</a:t>
             </a:r>
             <a:r>
-              <a:rPr>
+              <a:rPr sz="1200">
                 <a:solidFill>
                   <a:srgbClr val="003B4F"/>
                 </a:solidFill>
@@ -6221,7 +6221,7 @@
               <a:t> smf.ols(formula</a:t>
             </a:r>
             <a:r>
-              <a:rPr>
+              <a:rPr sz="1200">
                 <a:solidFill>
                   <a:srgbClr val="5E5E5E"/>
                 </a:solidFill>
@@ -6230,7 +6230,7 @@
               <a:t>=</a:t>
             </a:r>
             <a:r>
-              <a:rPr>
+              <a:rPr sz="1200">
                 <a:solidFill>
                   <a:srgbClr val="20794D"/>
                 </a:solidFill>
@@ -6239,7 +6239,7 @@
               <a:t>"wage ~ educ"</a:t>
             </a:r>
             <a:r>
-              <a:rPr>
+              <a:rPr sz="1200">
                 <a:solidFill>
                   <a:srgbClr val="003B4F"/>
                 </a:solidFill>
@@ -6249,7 +6249,7 @@
             </a:r>
             <a:br/>
             <a:r>
-              <a:rPr>
+              <a:rPr sz="1200">
                 <a:solidFill>
                   <a:srgbClr val="003B4F"/>
                 </a:solidFill>
@@ -6258,7 +6258,7 @@
               <a:t>              data</a:t>
             </a:r>
             <a:r>
-              <a:rPr>
+              <a:rPr sz="1200">
                 <a:solidFill>
                   <a:srgbClr val="5E5E5E"/>
                 </a:solidFill>
@@ -6267,7 +6267,7 @@
               <a:t>=</a:t>
             </a:r>
             <a:r>
-              <a:rPr>
+              <a:rPr sz="1200">
                 <a:solidFill>
                   <a:srgbClr val="003B4F"/>
                 </a:solidFill>
@@ -6278,7 +6278,7 @@
             <a:br/>
             <a:br/>
             <a:r>
-              <a:rPr>
+              <a:rPr sz="1200">
                 <a:solidFill>
                   <a:srgbClr val="5E5E5E"/>
                 </a:solidFill>
@@ -6288,7 +6288,7 @@
             </a:r>
             <a:br/>
             <a:r>
-              <a:rPr>
+              <a:rPr sz="1200">
                 <a:solidFill>
                   <a:srgbClr val="003B4F"/>
                 </a:solidFill>
@@ -6297,7 +6297,7 @@
               <a:t>res </a:t>
             </a:r>
             <a:r>
-              <a:rPr>
+              <a:rPr sz="1200">
                 <a:solidFill>
                   <a:srgbClr val="5E5E5E"/>
                 </a:solidFill>
@@ -6306,7 +6306,7 @@
               <a:t>=</a:t>
             </a:r>
             <a:r>
-              <a:rPr>
+              <a:rPr sz="1200">
                 <a:solidFill>
                   <a:srgbClr val="003B4F"/>
                 </a:solidFill>
@@ -6317,7 +6317,7 @@
             <a:br/>
             <a:br/>
             <a:r>
-              <a:rPr>
+              <a:rPr sz="1200">
                 <a:solidFill>
                   <a:srgbClr val="5E5E5E"/>
                 </a:solidFill>
@@ -6327,7 +6327,7 @@
             </a:r>
             <a:br/>
             <a:r>
-              <a:rPr>
+              <a:rPr sz="1200">
                 <a:solidFill>
                   <a:srgbClr val="003B4F"/>
                 </a:solidFill>
@@ -6336,7 +6336,7 @@
               <a:t>reg_table </a:t>
             </a:r>
             <a:r>
-              <a:rPr>
+              <a:rPr sz="1200">
                 <a:solidFill>
                   <a:srgbClr val="5E5E5E"/>
                 </a:solidFill>
@@ -6345,7 +6345,7 @@
               <a:t>=</a:t>
             </a:r>
             <a:r>
-              <a:rPr>
+              <a:rPr sz="1200">
                 <a:solidFill>
                   <a:srgbClr val="003B4F"/>
                 </a:solidFill>
@@ -6355,7 +6355,7 @@
             </a:r>
             <a:br/>
             <a:r>
-              <a:rPr>
+              <a:rPr sz="1200">
                 <a:solidFill>
                   <a:srgbClr val="003B4F"/>
                 </a:solidFill>
@@ -6364,7 +6364,7 @@
               <a:t>  tables[</a:t>
             </a:r>
             <a:r>
-              <a:rPr>
+              <a:rPr sz="1200">
                 <a:solidFill>
                   <a:srgbClr val="AD0000"/>
                 </a:solidFill>
@@ -6373,7 +6373,7 @@
               <a:t>1</a:t>
             </a:r>
             <a:r>
-              <a:rPr>
+              <a:rPr sz="1200">
                 <a:solidFill>
                   <a:srgbClr val="003B4F"/>
                 </a:solidFill>
@@ -6382,7 +6382,7 @@
               <a:t>].as_html(), header</a:t>
             </a:r>
             <a:r>
-              <a:rPr>
+              <a:rPr sz="1200">
                 <a:solidFill>
                   <a:srgbClr val="5E5E5E"/>
                 </a:solidFill>
@@ -6391,7 +6391,7 @@
               <a:t>=</a:t>
             </a:r>
             <a:r>
-              <a:rPr>
+              <a:rPr sz="1200">
                 <a:solidFill>
                   <a:srgbClr val="AD0000"/>
                 </a:solidFill>
@@ -6400,7 +6400,7 @@
               <a:t>0</a:t>
             </a:r>
             <a:r>
-              <a:rPr>
+              <a:rPr sz="1200">
                 <a:solidFill>
                   <a:srgbClr val="003B4F"/>
                 </a:solidFill>
@@ -6409,7 +6409,7 @@
               <a:t>)[</a:t>
             </a:r>
             <a:r>
-              <a:rPr>
+              <a:rPr sz="1200">
                 <a:solidFill>
                   <a:srgbClr val="AD0000"/>
                 </a:solidFill>
@@ -6418,7 +6418,7 @@
               <a:t>0</a:t>
             </a:r>
             <a:r>
-              <a:rPr>
+              <a:rPr sz="1200">
                 <a:solidFill>
                   <a:srgbClr val="003B4F"/>
                 </a:solidFill>
@@ -6428,7 +6428,7 @@
             </a:r>
             <a:br/>
             <a:r>
-              <a:rPr>
+              <a:rPr sz="1200">
                 <a:solidFill>
                   <a:srgbClr val="003B4F"/>
                 </a:solidFill>
@@ -6438,7 +6438,7 @@
             </a:r>
             <a:br/>
             <a:r>
-              <a:rPr>
+              <a:rPr sz="1200">
                 <a:solidFill>
                   <a:srgbClr val="003B4F"/>
                 </a:solidFill>
@@ -6447,7 +6447,7 @@
               <a:t>  to_markdown(index</a:t>
             </a:r>
             <a:r>
-              <a:rPr>
+              <a:rPr sz="1200">
                 <a:solidFill>
                   <a:srgbClr val="5E5E5E"/>
                 </a:solidFill>
@@ -6456,7 +6456,7 @@
               <a:t>=</a:t>
             </a:r>
             <a:r>
-              <a:rPr>
+              <a:rPr sz="1200">
                 <a:solidFill>
                   <a:srgbClr val="111111"/>
                 </a:solidFill>
@@ -6465,7 +6465,7 @@
               <a:t>False</a:t>
             </a:r>
             <a:r>
-              <a:rPr>
+              <a:rPr sz="1200">
                 <a:solidFill>
                   <a:srgbClr val="003B4F"/>
                 </a:solidFill>
@@ -6598,7 +6598,7 @@
               <a:t>To create slides, you create sections with </a:t>
             </a:r>
             <a:r>
-              <a:rPr>
+              <a:rPr sz="1200">
                 <a:latin typeface="Consolas"/>
               </a:rPr>
               <a:t>#</a:t>
@@ -6608,7 +6608,7 @@
               <a:t>, titles with </a:t>
             </a:r>
             <a:r>
-              <a:rPr>
+              <a:rPr sz="1200">
                 <a:latin typeface="Consolas"/>
               </a:rPr>
               <a:t>##</a:t>
@@ -6618,7 +6618,7 @@
               <a:t>, and bullets with </a:t>
             </a:r>
             <a:r>
-              <a:rPr>
+              <a:rPr sz="1200">
                 <a:latin typeface="Consolas"/>
               </a:rPr>
               <a:t>-</a:t>
@@ -6703,7 +6703,7 @@
               <a:buNone/>
             </a:pPr>
             <a:r>
-              <a:rPr>
+              <a:rPr sz="1200">
                 <a:solidFill>
                   <a:srgbClr val="4758AB"/>
                 </a:solidFill>
@@ -6714,7 +6714,7 @@
             <a:br/>
             <a:br/>
             <a:r>
-              <a:rPr>
+              <a:rPr sz="1200">
                 <a:solidFill>
                   <a:srgbClr val="003B4F"/>
                 </a:solidFill>
@@ -6724,7 +6724,7 @@
             </a:r>
             <a:br/>
             <a:r>
-              <a:rPr>
+              <a:rPr sz="1200">
                 <a:solidFill>
                   <a:srgbClr val="003B4F"/>
                 </a:solidFill>
@@ -6733,7 +6733,7 @@
               <a:t>with </a:t>
             </a:r>
             <a:r>
-              <a:rPr>
+              <a:rPr sz="1200">
                 <a:solidFill>
                   <a:srgbClr val="5E5E5E"/>
                 </a:solidFill>
@@ -6742,7 +6742,7 @@
               <a:t>`#`</a:t>
             </a:r>
             <a:r>
-              <a:rPr>
+              <a:rPr sz="1200">
                 <a:solidFill>
                   <a:srgbClr val="003B4F"/>
                 </a:solidFill>
@@ -6751,7 +6751,7 @@
               <a:t>, titles with </a:t>
             </a:r>
             <a:r>
-              <a:rPr>
+              <a:rPr sz="1200">
                 <a:solidFill>
                   <a:srgbClr val="5E5E5E"/>
                 </a:solidFill>
@@ -6760,7 +6760,7 @@
               <a:t>`##`</a:t>
             </a:r>
             <a:r>
-              <a:rPr>
+              <a:rPr sz="1200">
                 <a:solidFill>
                   <a:srgbClr val="003B4F"/>
                 </a:solidFill>
@@ -6770,7 +6770,7 @@
             </a:r>
             <a:br/>
             <a:r>
-              <a:rPr>
+              <a:rPr sz="1200">
                 <a:solidFill>
                   <a:srgbClr val="003B4F"/>
                 </a:solidFill>
@@ -6779,7 +6779,7 @@
               <a:t>with </a:t>
             </a:r>
             <a:r>
-              <a:rPr>
+              <a:rPr sz="1200">
                 <a:solidFill>
                   <a:srgbClr val="5E5E5E"/>
                 </a:solidFill>
@@ -6788,7 +6788,7 @@
               <a:t>`-`</a:t>
             </a:r>
             <a:r>
-              <a:rPr>
+              <a:rPr sz="1200">
                 <a:solidFill>
                   <a:srgbClr val="003B4F"/>
                 </a:solidFill>
@@ -6799,7 +6799,7 @@
             <a:br/>
             <a:br/>
             <a:r>
-              <a:rPr>
+              <a:rPr sz="1200">
                 <a:solidFill>
                   <a:srgbClr val="4758AB"/>
                 </a:solidFill>
@@ -6810,7 +6810,7 @@
             <a:br/>
             <a:br/>
             <a:r>
-              <a:rPr>
+              <a:rPr sz="1200">
                 <a:solidFill>
                   <a:srgbClr val="20794D"/>
                 </a:solidFill>
@@ -6819,7 +6819,7 @@
               <a:t>- </a:t>
             </a:r>
             <a:r>
-              <a:rPr>
+              <a:rPr sz="1200">
                 <a:solidFill>
                   <a:srgbClr val="003B4F"/>
                 </a:solidFill>
@@ -6829,7 +6829,7 @@
             </a:r>
             <a:br/>
             <a:r>
-              <a:rPr>
+              <a:rPr sz="1200">
                 <a:solidFill>
                   <a:srgbClr val="20794D"/>
                 </a:solidFill>
@@ -6838,7 +6838,7 @@
               <a:t>    - </a:t>
             </a:r>
             <a:r>
-              <a:rPr>
+              <a:rPr sz="1200">
                 <a:solidFill>
                   <a:srgbClr val="003B4F"/>
                 </a:solidFill>
@@ -6848,7 +6848,7 @@
             </a:r>
             <a:br/>
             <a:r>
-              <a:rPr>
+              <a:rPr sz="1200">
                 <a:solidFill>
                   <a:srgbClr val="20794D"/>
                 </a:solidFill>
@@ -6857,7 +6857,7 @@
               <a:t>    - </a:t>
             </a:r>
             <a:r>
-              <a:rPr>
+              <a:rPr sz="1200">
                 <a:solidFill>
                   <a:srgbClr val="003B4F"/>
                 </a:solidFill>
@@ -6867,7 +6867,7 @@
             </a:r>
             <a:br/>
             <a:r>
-              <a:rPr>
+              <a:rPr sz="1200">
                 <a:solidFill>
                   <a:srgbClr val="20794D"/>
                 </a:solidFill>
@@ -6876,7 +6876,7 @@
               <a:t>    - </a:t>
             </a:r>
             <a:r>
-              <a:rPr>
+              <a:rPr sz="1200">
                 <a:solidFill>
                   <a:srgbClr val="003B4F"/>
                 </a:solidFill>
@@ -6886,7 +6886,7 @@
             </a:r>
             <a:br/>
             <a:r>
-              <a:rPr>
+              <a:rPr sz="1200">
                 <a:solidFill>
                   <a:srgbClr val="20794D"/>
                 </a:solidFill>
@@ -6895,7 +6895,7 @@
               <a:t>    - </a:t>
             </a:r>
             <a:r>
-              <a:rPr>
+              <a:rPr sz="1200">
                 <a:solidFill>
                   <a:srgbClr val="003B4F"/>
                 </a:solidFill>
@@ -6905,7 +6905,7 @@
             </a:r>
             <a:br/>
             <a:r>
-              <a:rPr>
+              <a:rPr sz="1200">
                 <a:solidFill>
                   <a:srgbClr val="20794D"/>
                 </a:solidFill>
@@ -6914,7 +6914,7 @@
               <a:t>    - </a:t>
             </a:r>
             <a:r>
-              <a:rPr>
+              <a:rPr sz="1200">
                 <a:solidFill>
                   <a:srgbClr val="003B4F"/>
                 </a:solidFill>
@@ -6995,7 +6995,7 @@
               <a:t>To generate a presentation from a </a:t>
             </a:r>
             <a:r>
-              <a:rPr>
+              <a:rPr sz="1200">
                 <a:latin typeface="Consolas"/>
               </a:rPr>
               <a:t>.qmd</a:t>
@@ -7005,7 +7005,7 @@
               <a:t> file, add </a:t>
             </a:r>
             <a:r>
-              <a:rPr>
+              <a:rPr sz="1200">
                 <a:latin typeface="Consolas"/>
               </a:rPr>
               <a:t>format: pptx</a:t>
@@ -7034,7 +7034,7 @@
               <a:t> to render the content from the </a:t>
             </a:r>
             <a:r>
-              <a:rPr>
+              <a:rPr sz="1200">
                 <a:latin typeface="Consolas"/>
               </a:rPr>
               <a:t>.qmd</a:t>
@@ -7044,7 +7044,7 @@
               <a:t> into </a:t>
             </a:r>
             <a:r>
-              <a:rPr>
+              <a:rPr sz="1200">
                 <a:latin typeface="Consolas"/>
               </a:rPr>
               <a:t>.pptx</a:t>
@@ -7063,7 +7063,7 @@
               <a:t>The “pandoc rules” limit the flexibility to create PowerPoint presentations. Quarto has better presentation support for </a:t>
             </a:r>
             <a:r>
-              <a:rPr>
+              <a:rPr sz="1200">
                 <a:latin typeface="Consolas"/>
               </a:rPr>
               <a:t>revealjs</a:t>
@@ -7073,7 +7073,7 @@
               <a:t> and </a:t>
             </a:r>
             <a:r>
-              <a:rPr>
+              <a:rPr sz="1200">
                 <a:latin typeface="Consolas"/>
               </a:rPr>
               <a:t>beamer</a:t>
@@ -7260,7 +7260,7 @@
               <a:t> created from metadata fields like </a:t>
             </a:r>
             <a:r>
-              <a:rPr>
+              <a:rPr sz="1200">
                 <a:latin typeface="Consolas"/>
               </a:rPr>
               <a:t>title</a:t>
@@ -7270,7 +7270,7 @@
               <a:t> and </a:t>
             </a:r>
             <a:r>
-              <a:rPr>
+              <a:rPr sz="1200">
                 <a:latin typeface="Consolas"/>
               </a:rPr>
               <a:t>author</a:t>
@@ -7287,7 +7287,7 @@
               <a:t> created from the top-level headings (</a:t>
             </a:r>
             <a:r>
-              <a:rPr>
+              <a:rPr sz="1200">
                 <a:latin typeface="Consolas"/>
               </a:rPr>
               <a:t>#</a:t>
@@ -7308,7 +7308,7 @@
               <a:t> used when </a:t>
             </a:r>
             <a:r>
-              <a:rPr>
+              <a:rPr sz="1200">
                 <a:latin typeface="Consolas"/>
               </a:rPr>
               <a:t>.qmd</a:t>
@@ -7318,7 +7318,7 @@
               <a:t> source contains </a:t>
             </a:r>
             <a:r>
-              <a:rPr>
+              <a:rPr sz="1200">
                 <a:latin typeface="Consolas"/>
               </a:rPr>
               <a:t>:::: {.columns}</a:t>
@@ -7503,7 +7503,7 @@
               <a:t>By adding a </a:t>
             </a:r>
             <a:r>
-              <a:rPr>
+              <a:rPr sz="1200">
                 <a:latin typeface="Consolas"/>
               </a:rPr>
               <a:t>reference-doc</a:t>
@@ -7545,7 +7545,7 @@
               <a:buNone/>
             </a:pPr>
             <a:r>
-              <a:rPr>
+              <a:rPr sz="1200">
                 <a:solidFill>
                   <a:srgbClr val="AD0000"/>
                 </a:solidFill>
@@ -7555,7 +7555,7 @@
             </a:r>
             <a:br/>
             <a:r>
-              <a:rPr>
+              <a:rPr sz="1200">
                 <a:solidFill>
                   <a:srgbClr val="4758AB"/>
                 </a:solidFill>
@@ -7564,7 +7564,7 @@
               <a:t>title</a:t>
             </a:r>
             <a:r>
-              <a:rPr>
+              <a:rPr sz="1200">
                 <a:solidFill>
                   <a:srgbClr val="003B4F"/>
                 </a:solidFill>
@@ -7573,7 +7573,7 @@
               <a:t>:</a:t>
             </a:r>
             <a:r>
-              <a:rPr>
+              <a:rPr sz="1200">
                 <a:solidFill>
                   <a:srgbClr val="657422"/>
                 </a:solidFill>
@@ -7582,7 +7582,7 @@
               <a:t> </a:t>
             </a:r>
             <a:r>
-              <a:rPr>
+              <a:rPr sz="1200">
                 <a:solidFill>
                   <a:srgbClr val="20794D"/>
                 </a:solidFill>
@@ -7592,7 +7592,7 @@
             </a:r>
             <a:br/>
             <a:r>
-              <a:rPr>
+              <a:rPr sz="1200">
                 <a:solidFill>
                   <a:srgbClr val="4758AB"/>
                 </a:solidFill>
@@ -7601,7 +7601,7 @@
               <a:t>format</a:t>
             </a:r>
             <a:r>
-              <a:rPr>
+              <a:rPr sz="1200">
                 <a:solidFill>
                   <a:srgbClr val="003B4F"/>
                 </a:solidFill>
@@ -7610,7 +7610,7 @@
               <a:t>:</a:t>
             </a:r>
             <a:r>
-              <a:rPr>
+              <a:rPr sz="1200">
                 <a:solidFill>
                   <a:srgbClr val="657422"/>
                 </a:solidFill>
@@ -7620,7 +7620,7 @@
             </a:r>
             <a:br/>
             <a:r>
-              <a:rPr>
+              <a:rPr sz="1200">
                 <a:solidFill>
                   <a:srgbClr val="4758AB"/>
                 </a:solidFill>
@@ -7629,7 +7629,7 @@
               <a:t>reference-doc</a:t>
             </a:r>
             <a:r>
-              <a:rPr>
+              <a:rPr sz="1200">
                 <a:solidFill>
                   <a:srgbClr val="003B4F"/>
                 </a:solidFill>
@@ -7638,7 +7638,7 @@
               <a:t>:</a:t>
             </a:r>
             <a:r>
-              <a:rPr>
+              <a:rPr sz="1200">
                 <a:solidFill>
                   <a:srgbClr val="657422"/>
                 </a:solidFill>
@@ -7648,7 +7648,7 @@
             </a:r>
             <a:br/>
             <a:r>
-              <a:rPr>
+              <a:rPr sz="1200">
                 <a:solidFill>
                   <a:srgbClr val="4758AB"/>
                 </a:solidFill>
@@ -7657,7 +7657,7 @@
               <a:t>author</a:t>
             </a:r>
             <a:r>
-              <a:rPr>
+              <a:rPr sz="1200">
                 <a:solidFill>
                   <a:srgbClr val="003B4F"/>
                 </a:solidFill>
@@ -7666,7 +7666,7 @@
               <a:t>:</a:t>
             </a:r>
             <a:r>
-              <a:rPr>
+              <a:rPr sz="1200">
                 <a:solidFill>
                   <a:srgbClr val="657422"/>
                 </a:solidFill>
@@ -7676,7 +7676,7 @@
             </a:r>
             <a:br/>
             <a:r>
-              <a:rPr>
+              <a:rPr sz="1200">
                 <a:solidFill>
                   <a:srgbClr val="4758AB"/>
                 </a:solidFill>
@@ -7685,7 +7685,7 @@
               <a:t>date</a:t>
             </a:r>
             <a:r>
-              <a:rPr>
+              <a:rPr sz="1200">
                 <a:solidFill>
                   <a:srgbClr val="003B4F"/>
                 </a:solidFill>
@@ -7694,7 +7694,7 @@
               <a:t>:</a:t>
             </a:r>
             <a:r>
-              <a:rPr>
+              <a:rPr sz="1200">
                 <a:solidFill>
                   <a:srgbClr val="657422"/>
                 </a:solidFill>
@@ -7704,7 +7704,7 @@
             </a:r>
             <a:br/>
             <a:r>
-              <a:rPr>
+              <a:rPr sz="1200">
                 <a:solidFill>
                   <a:srgbClr val="AD0000"/>
                 </a:solidFill>
@@ -7881,7 +7881,7 @@
             </a:pPr>
             <a:br/>
             <a:r>
-              <a:rPr>
+              <a:rPr sz="1200">
                 <a:solidFill>
                   <a:srgbClr val="003B4F"/>
                 </a:solidFill>
@@ -7890,7 +7890,7 @@
               <a:t>df_dr </a:t>
             </a:r>
             <a:r>
-              <a:rPr>
+              <a:rPr sz="1200">
                 <a:solidFill>
                   <a:srgbClr val="5E5E5E"/>
                 </a:solidFill>
@@ -7899,7 +7899,7 @@
               <a:t>=</a:t>
             </a:r>
             <a:r>
-              <a:rPr>
+              <a:rPr sz="1200">
                 <a:solidFill>
                   <a:srgbClr val="003B4F"/>
                 </a:solidFill>
@@ -7908,7 +7908,7 @@
               <a:t> pd.read_csv(</a:t>
             </a:r>
             <a:r>
-              <a:rPr>
+              <a:rPr sz="1200">
                 <a:solidFill>
                   <a:srgbClr val="20794D"/>
                 </a:solidFill>
@@ -7917,7 +7917,7 @@
               <a:t>"data/dr.csv.gz"</a:t>
             </a:r>
             <a:r>
-              <a:rPr>
+              <a:rPr sz="1200">
                 <a:solidFill>
                   <a:srgbClr val="003B4F"/>
                 </a:solidFill>
@@ -7926,7 +7926,7 @@
               <a:t>, compression</a:t>
             </a:r>
             <a:r>
-              <a:rPr>
+              <a:rPr sz="1200">
                 <a:solidFill>
                   <a:srgbClr val="5E5E5E"/>
                 </a:solidFill>
@@ -7935,7 +7935,7 @@
               <a:t>=</a:t>
             </a:r>
             <a:r>
-              <a:rPr>
+              <a:rPr sz="1200">
                 <a:solidFill>
                   <a:srgbClr val="20794D"/>
                 </a:solidFill>
@@ -7944,7 +7944,7 @@
               <a:t>"gzip"</a:t>
             </a:r>
             <a:r>
-              <a:rPr>
+              <a:rPr sz="1200">
                 <a:solidFill>
                   <a:srgbClr val="003B4F"/>
                 </a:solidFill>
@@ -7954,7 +7954,7 @@
             </a:r>
             <a:br/>
             <a:r>
-              <a:rPr>
+              <a:rPr sz="1200">
                 <a:solidFill>
                   <a:srgbClr val="003B4F"/>
                 </a:solidFill>
@@ -7963,7 +7963,7 @@
               <a:t>df_pop </a:t>
             </a:r>
             <a:r>
-              <a:rPr>
+              <a:rPr sz="1200">
                 <a:solidFill>
                   <a:srgbClr val="5E5E5E"/>
                 </a:solidFill>
@@ -7972,7 +7972,7 @@
               <a:t>=</a:t>
             </a:r>
             <a:r>
-              <a:rPr>
+              <a:rPr sz="1200">
                 <a:solidFill>
                   <a:srgbClr val="003B4F"/>
                 </a:solidFill>
@@ -7981,7 +7981,7 @@
               <a:t> pd.read_csv(</a:t>
             </a:r>
             <a:r>
-              <a:rPr>
+              <a:rPr sz="1200">
                 <a:solidFill>
                   <a:srgbClr val="20794D"/>
                 </a:solidFill>
@@ -7990,7 +7990,7 @@
               <a:t>"data/pop_brackets.csv.gz"</a:t>
             </a:r>
             <a:r>
-              <a:rPr>
+              <a:rPr sz="1200">
                 <a:solidFill>
                   <a:srgbClr val="003B4F"/>
                 </a:solidFill>
@@ -7999,7 +7999,7 @@
               <a:t>, compression</a:t>
             </a:r>
             <a:r>
-              <a:rPr>
+              <a:rPr sz="1200">
                 <a:solidFill>
                   <a:srgbClr val="5E5E5E"/>
                 </a:solidFill>
@@ -8008,7 +8008,7 @@
               <a:t>=</a:t>
             </a:r>
             <a:r>
-              <a:rPr>
+              <a:rPr sz="1200">
                 <a:solidFill>
                   <a:srgbClr val="20794D"/>
                 </a:solidFill>
@@ -8017,7 +8017,7 @@
               <a:t>"gzip"</a:t>
             </a:r>
             <a:r>
-              <a:rPr>
+              <a:rPr sz="1200">
                 <a:solidFill>
                   <a:srgbClr val="003B4F"/>
                 </a:solidFill>
@@ -8027,7 +8027,7 @@
             </a:r>
             <a:br/>
             <a:r>
-              <a:rPr>
+              <a:rPr sz="1200">
                 <a:solidFill>
                   <a:srgbClr val="003B4F"/>
                 </a:solidFill>
@@ -8036,7 +8036,7 @@
               <a:t>years </a:t>
             </a:r>
             <a:r>
-              <a:rPr>
+              <a:rPr sz="1200">
                 <a:solidFill>
                   <a:srgbClr val="5E5E5E"/>
                 </a:solidFill>
@@ -8045,7 +8045,7 @@
               <a:t>=</a:t>
             </a:r>
             <a:r>
-              <a:rPr>
+              <a:rPr sz="1200">
                 <a:solidFill>
                   <a:srgbClr val="003B4F"/>
                 </a:solidFill>
@@ -8054,7 +8054,7 @@
               <a:t> [</a:t>
             </a:r>
             <a:r>
-              <a:rPr>
+              <a:rPr sz="1200">
                 <a:solidFill>
                   <a:srgbClr val="AD0000"/>
                 </a:solidFill>
@@ -8063,7 +8063,7 @@
               <a:t>2000</a:t>
             </a:r>
             <a:r>
-              <a:rPr>
+              <a:rPr sz="1200">
                 <a:solidFill>
                   <a:srgbClr val="003B4F"/>
                 </a:solidFill>
@@ -8072,7 +8072,7 @@
               <a:t>, </a:t>
             </a:r>
             <a:r>
-              <a:rPr>
+              <a:rPr sz="1200">
                 <a:solidFill>
                   <a:srgbClr val="AD0000"/>
                 </a:solidFill>
@@ -8081,7 +8081,7 @@
               <a:t>2025</a:t>
             </a:r>
             <a:r>
-              <a:rPr>
+              <a:rPr sz="1200">
                 <a:solidFill>
                   <a:srgbClr val="003B4F"/>
                 </a:solidFill>
@@ -8090,7 +8090,7 @@
               <a:t>, </a:t>
             </a:r>
             <a:r>
-              <a:rPr>
+              <a:rPr sz="1200">
                 <a:solidFill>
                   <a:srgbClr val="AD0000"/>
                 </a:solidFill>
@@ -8099,7 +8099,7 @@
               <a:t>2050</a:t>
             </a:r>
             <a:r>
-              <a:rPr>
+              <a:rPr sz="1200">
                 <a:solidFill>
                   <a:srgbClr val="003B4F"/>
                 </a:solidFill>
@@ -8108,7 +8108,7 @@
               <a:t>, </a:t>
             </a:r>
             <a:r>
-              <a:rPr>
+              <a:rPr sz="1200">
                 <a:solidFill>
                   <a:srgbClr val="AD0000"/>
                 </a:solidFill>
@@ -8117,7 +8117,7 @@
               <a:t>2075</a:t>
             </a:r>
             <a:r>
-              <a:rPr>
+              <a:rPr sz="1200">
                 <a:solidFill>
                   <a:srgbClr val="003B4F"/>
                 </a:solidFill>
@@ -8126,7 +8126,7 @@
               <a:t>, </a:t>
             </a:r>
             <a:r>
-              <a:rPr>
+              <a:rPr sz="1200">
                 <a:solidFill>
                   <a:srgbClr val="AD0000"/>
                 </a:solidFill>
@@ -8135,7 +8135,7 @@
               <a:t>2100</a:t>
             </a:r>
             <a:r>
-              <a:rPr>
+              <a:rPr sz="1200">
                 <a:solidFill>
                   <a:srgbClr val="003B4F"/>
                 </a:solidFill>
@@ -8145,7 +8145,7 @@
             </a:r>
             <a:br/>
             <a:r>
-              <a:rPr>
+              <a:rPr sz="1200">
                 <a:solidFill>
                   <a:srgbClr val="003B4F"/>
                 </a:solidFill>
@@ -8154,7 +8154,7 @@
               <a:t>regions </a:t>
             </a:r>
             <a:r>
-              <a:rPr>
+              <a:rPr sz="1200">
                 <a:solidFill>
                   <a:srgbClr val="5E5E5E"/>
                 </a:solidFill>
@@ -8163,7 +8163,7 @@
               <a:t>=</a:t>
             </a:r>
             <a:r>
-              <a:rPr>
+              <a:rPr sz="1200">
                 <a:solidFill>
                   <a:srgbClr val="003B4F"/>
                 </a:solidFill>
@@ -8172,7 +8172,7 @@
               <a:t> [</a:t>
             </a:r>
             <a:r>
-              <a:rPr>
+              <a:rPr sz="1200">
                 <a:solidFill>
                   <a:srgbClr val="20794D"/>
                 </a:solidFill>
@@ -8181,7 +8181,7 @@
               <a:t>"Italy"</a:t>
             </a:r>
             <a:r>
-              <a:rPr>
+              <a:rPr sz="1200">
                 <a:solidFill>
                   <a:srgbClr val="003B4F"/>
                 </a:solidFill>
@@ -8190,7 +8190,7 @@
               <a:t>, </a:t>
             </a:r>
             <a:r>
-              <a:rPr>
+              <a:rPr sz="1200">
                 <a:solidFill>
                   <a:srgbClr val="20794D"/>
                 </a:solidFill>
@@ -8199,7 +8199,7 @@
               <a:t>"China"</a:t>
             </a:r>
             <a:r>
-              <a:rPr>
+              <a:rPr sz="1200">
                 <a:solidFill>
                   <a:srgbClr val="003B4F"/>
                 </a:solidFill>
@@ -8208,7 +8208,7 @@
               <a:t>, </a:t>
             </a:r>
             <a:r>
-              <a:rPr>
+              <a:rPr sz="1200">
                 <a:solidFill>
                   <a:srgbClr val="20794D"/>
                 </a:solidFill>
@@ -8217,7 +8217,7 @@
               <a:t>"Brazil"</a:t>
             </a:r>
             <a:r>
-              <a:rPr>
+              <a:rPr sz="1200">
                 <a:solidFill>
                   <a:srgbClr val="003B4F"/>
                 </a:solidFill>
@@ -8226,7 +8226,7 @@
               <a:t>, </a:t>
             </a:r>
             <a:r>
-              <a:rPr>
+              <a:rPr sz="1200">
                 <a:solidFill>
                   <a:srgbClr val="20794D"/>
                 </a:solidFill>
@@ -8235,7 +8235,7 @@
               <a:t>"India"</a:t>
             </a:r>
             <a:r>
-              <a:rPr>
+              <a:rPr sz="1200">
                 <a:solidFill>
                   <a:srgbClr val="003B4F"/>
                 </a:solidFill>
@@ -8244,7 +8244,7 @@
               <a:t>, </a:t>
             </a:r>
             <a:r>
-              <a:rPr>
+              <a:rPr sz="1200">
                 <a:solidFill>
                   <a:srgbClr val="20794D"/>
                 </a:solidFill>
@@ -8253,7 +8253,7 @@
               <a:t>"Japan"</a:t>
             </a:r>
             <a:r>
-              <a:rPr>
+              <a:rPr sz="1200">
                 <a:solidFill>
                   <a:srgbClr val="003B4F"/>
                 </a:solidFill>
@@ -8262,7 +8262,7 @@
               <a:t>, </a:t>
             </a:r>
             <a:r>
-              <a:rPr>
+              <a:rPr sz="1200">
                 <a:solidFill>
                   <a:srgbClr val="20794D"/>
                 </a:solidFill>
@@ -8271,7 +8271,7 @@
               <a:t>"Nigeria"</a:t>
             </a:r>
             <a:r>
-              <a:rPr>
+              <a:rPr sz="1200">
                 <a:solidFill>
                   <a:srgbClr val="003B4F"/>
                 </a:solidFill>
@@ -8282,7 +8282,7 @@
             <a:br/>
             <a:br/>
             <a:r>
-              <a:rPr>
+              <a:rPr sz="1200">
                 <a:solidFill>
                   <a:srgbClr val="003B4F"/>
                 </a:solidFill>
@@ -8292,7 +8292,7 @@
             </a:r>
             <a:br/>
             <a:r>
-              <a:rPr>
+              <a:rPr sz="1200">
                 <a:solidFill>
                   <a:srgbClr val="003B4F"/>
                 </a:solidFill>
@@ -8301,7 +8301,7 @@
               <a:t>    display(Markdown(</a:t>
             </a:r>
             <a:r>
-              <a:rPr>
+              <a:rPr sz="1200">
                 <a:solidFill>
                   <a:srgbClr val="20794D"/>
                 </a:solidFill>
@@ -8310,7 +8310,7 @@
               <a:t>f"## Age and Population Pyramids for </a:t>
             </a:r>
             <a:r>
-              <a:rPr>
+              <a:rPr sz="1200">
                 <a:solidFill>
                   <a:srgbClr val="5E5E5E"/>
                 </a:solidFill>
@@ -8319,7 +8319,7 @@
               <a:t>{</a:t>
             </a:r>
             <a:r>
-              <a:rPr>
+              <a:rPr sz="1200">
                 <a:solidFill>
                   <a:srgbClr val="003B4F"/>
                 </a:solidFill>
@@ -8328,7 +8328,7 @@
               <a:t>name</a:t>
             </a:r>
             <a:r>
-              <a:rPr>
+              <a:rPr sz="1200">
                 <a:solidFill>
                   <a:srgbClr val="5E5E5E"/>
                 </a:solidFill>
@@ -8337,7 +8337,7 @@
               <a:t>}</a:t>
             </a:r>
             <a:r>
-              <a:rPr>
+              <a:rPr sz="1200">
                 <a:solidFill>
                   <a:srgbClr val="20794D"/>
                 </a:solidFill>
@@ -8346,7 +8346,7 @@
               <a:t>"</a:t>
             </a:r>
             <a:r>
-              <a:rPr>
+              <a:rPr sz="1200">
                 <a:solidFill>
                   <a:srgbClr val="003B4F"/>
                 </a:solidFill>
@@ -8356,7 +8356,7 @@
             </a:r>
             <a:br/>
             <a:r>
-              <a:rPr>
+              <a:rPr sz="1200">
                 <a:solidFill>
                   <a:srgbClr val="003B4F"/>
                 </a:solidFill>
@@ -8365,7 +8365,7 @@
               <a:t>    display(Markdown(</a:t>
             </a:r>
             <a:r>
-              <a:rPr>
+              <a:rPr sz="1200">
                 <a:solidFill>
                   <a:srgbClr val="20794D"/>
                 </a:solidFill>
@@ -8374,7 +8374,7 @@
               <a:t>f'&lt;div class="columns"&gt;'</a:t>
             </a:r>
             <a:r>
-              <a:rPr>
+              <a:rPr sz="1200">
                 <a:solidFill>
                   <a:srgbClr val="003B4F"/>
                 </a:solidFill>
@@ -8384,7 +8384,7 @@
             </a:r>
             <a:br/>
             <a:r>
-              <a:rPr>
+              <a:rPr sz="1200">
                 <a:solidFill>
                   <a:srgbClr val="003B4F"/>
                 </a:solidFill>
@@ -8393,7 +8393,7 @@
               <a:t>    display(Markdown(</a:t>
             </a:r>
             <a:r>
-              <a:rPr>
+              <a:rPr sz="1200">
                 <a:solidFill>
                   <a:srgbClr val="20794D"/>
                 </a:solidFill>
@@ -8402,7 +8402,7 @@
               <a:t>f'&lt;div class="column"&gt;'</a:t>
             </a:r>
             <a:r>
-              <a:rPr>
+              <a:rPr sz="1200">
                 <a:solidFill>
                   <a:srgbClr val="003B4F"/>
                 </a:solidFill>
@@ -8412,7 +8412,7 @@
             </a:r>
             <a:br/>
             <a:r>
-              <a:rPr>
+              <a:rPr sz="1200">
                 <a:solidFill>
                   <a:srgbClr val="003B4F"/>
                 </a:solidFill>
@@ -8421,7 +8421,7 @@
               <a:t>    plot_dependency_ratio(df_dr[df_dr.Location </a:t>
             </a:r>
             <a:r>
-              <a:rPr>
+              <a:rPr sz="1200">
                 <a:solidFill>
                   <a:srgbClr val="5E5E5E"/>
                 </a:solidFill>
@@ -8430,7 +8430,7 @@
               <a:t>==</a:t>
             </a:r>
             <a:r>
-              <a:rPr>
+              <a:rPr sz="1200">
                 <a:solidFill>
                   <a:srgbClr val="003B4F"/>
                 </a:solidFill>
@@ -8440,7 +8440,7 @@
             </a:r>
             <a:br/>
             <a:r>
-              <a:rPr>
+              <a:rPr sz="1200">
                 <a:solidFill>
                   <a:srgbClr val="003B4F"/>
                 </a:solidFill>
@@ -8449,7 +8449,7 @@
               <a:t>    display(Markdown(</a:t>
             </a:r>
             <a:r>
-              <a:rPr>
+              <a:rPr sz="1200">
                 <a:solidFill>
                   <a:srgbClr val="20794D"/>
                 </a:solidFill>
@@ -8458,7 +8458,7 @@
               <a:t>f'&lt;/div&gt;'</a:t>
             </a:r>
             <a:r>
-              <a:rPr>
+              <a:rPr sz="1200">
                 <a:solidFill>
                   <a:srgbClr val="003B4F"/>
                 </a:solidFill>
@@ -8468,7 +8468,7 @@
             </a:r>
             <a:br/>
             <a:r>
-              <a:rPr>
+              <a:rPr sz="1200">
                 <a:solidFill>
                   <a:srgbClr val="003B4F"/>
                 </a:solidFill>
@@ -8477,7 +8477,7 @@
               <a:t>    display(Markdown(</a:t>
             </a:r>
             <a:r>
-              <a:rPr>
+              <a:rPr sz="1200">
                 <a:solidFill>
                   <a:srgbClr val="20794D"/>
                 </a:solidFill>
@@ -8486,7 +8486,7 @@
               <a:t>f'&lt;div class="column"&gt;'</a:t>
             </a:r>
             <a:r>
-              <a:rPr>
+              <a:rPr sz="1200">
                 <a:solidFill>
                   <a:srgbClr val="003B4F"/>
                 </a:solidFill>
@@ -8496,7 +8496,7 @@
             </a:r>
             <a:br/>
             <a:r>
-              <a:rPr>
+              <a:rPr sz="1200">
                 <a:solidFill>
                   <a:srgbClr val="003B4F"/>
                 </a:solidFill>
@@ -8505,7 +8505,7 @@
               <a:t>    plot_population_pyramid_series(df_pop[df_pop[</a:t>
             </a:r>
             <a:r>
-              <a:rPr>
+              <a:rPr sz="1200">
                 <a:solidFill>
                   <a:srgbClr val="20794D"/>
                 </a:solidFill>
@@ -8514,7 +8514,7 @@
               <a:t>"Location"</a:t>
             </a:r>
             <a:r>
-              <a:rPr>
+              <a:rPr sz="1200">
                 <a:solidFill>
                   <a:srgbClr val="003B4F"/>
                 </a:solidFill>
@@ -8523,7 +8523,7 @@
               <a:t>]</a:t>
             </a:r>
             <a:r>
-              <a:rPr>
+              <a:rPr sz="1200">
                 <a:solidFill>
                   <a:srgbClr val="5E5E5E"/>
                 </a:solidFill>
@@ -8532,7 +8532,7 @@
               <a:t>==</a:t>
             </a:r>
             <a:r>
-              <a:rPr>
+              <a:rPr sz="1200">
                 <a:solidFill>
                   <a:srgbClr val="003B4F"/>
                 </a:solidFill>
@@ -8542,7 +8542,7 @@
             </a:r>
             <a:br/>
             <a:r>
-              <a:rPr>
+              <a:rPr sz="1200">
                 <a:solidFill>
                   <a:srgbClr val="003B4F"/>
                 </a:solidFill>
@@ -8551,7 +8551,7 @@
               <a:t>    display(Markdown(</a:t>
             </a:r>
             <a:r>
-              <a:rPr>
+              <a:rPr sz="1200">
                 <a:solidFill>
                   <a:srgbClr val="20794D"/>
                 </a:solidFill>
@@ -8560,7 +8560,7 @@
               <a:t>f'&lt;/div&gt;'</a:t>
             </a:r>
             <a:r>
-              <a:rPr>
+              <a:rPr sz="1200">
                 <a:solidFill>
                   <a:srgbClr val="003B4F"/>
                 </a:solidFill>
@@ -8570,7 +8570,7 @@
             </a:r>
             <a:br/>
             <a:r>
-              <a:rPr>
+              <a:rPr sz="1200">
                 <a:solidFill>
                   <a:srgbClr val="003B4F"/>
                 </a:solidFill>
@@ -8579,7 +8579,7 @@
               <a:t>    display(Markdown(</a:t>
             </a:r>
             <a:r>
-              <a:rPr>
+              <a:rPr sz="1200">
                 <a:solidFill>
                   <a:srgbClr val="20794D"/>
                 </a:solidFill>
@@ -8588,7 +8588,7 @@
               <a:t>f'&lt;/div&gt;'</a:t>
             </a:r>
             <a:r>
-              <a:rPr>
+              <a:rPr sz="1200">
                 <a:solidFill>
                   <a:srgbClr val="003B4F"/>
                 </a:solidFill>
@@ -9563,7 +9563,7 @@
               <a:buNone/>
             </a:pPr>
             <a:r>
-              <a:rPr>
+              <a:rPr sz="1200">
                 <a:solidFill>
                   <a:srgbClr val="AD0000"/>
                 </a:solidFill>
@@ -9573,7 +9573,7 @@
             </a:r>
             <a:br/>
             <a:r>
-              <a:rPr>
+              <a:rPr sz="1200">
                 <a:solidFill>
                   <a:srgbClr val="4758AB"/>
                 </a:solidFill>
@@ -9582,7 +9582,7 @@
               <a:t>title</a:t>
             </a:r>
             <a:r>
-              <a:rPr>
+              <a:rPr sz="1200">
                 <a:solidFill>
                   <a:srgbClr val="003B4F"/>
                 </a:solidFill>
@@ -9591,7 +9591,7 @@
               <a:t>:</a:t>
             </a:r>
             <a:r>
-              <a:rPr>
+              <a:rPr sz="1200">
                 <a:solidFill>
                   <a:srgbClr val="657422"/>
                 </a:solidFill>
@@ -9600,7 +9600,7 @@
               <a:t> </a:t>
             </a:r>
             <a:r>
-              <a:rPr>
+              <a:rPr sz="1200">
                 <a:solidFill>
                   <a:srgbClr val="20794D"/>
                 </a:solidFill>
@@ -9610,7 +9610,7 @@
             </a:r>
             <a:br/>
             <a:r>
-              <a:rPr>
+              <a:rPr sz="1200">
                 <a:solidFill>
                   <a:srgbClr val="4758AB"/>
                 </a:solidFill>
@@ -9619,7 +9619,7 @@
               <a:t>format</a:t>
             </a:r>
             <a:r>
-              <a:rPr>
+              <a:rPr sz="1200">
                 <a:solidFill>
                   <a:srgbClr val="003B4F"/>
                 </a:solidFill>
@@ -9628,7 +9628,7 @@
               <a:t>:</a:t>
             </a:r>
             <a:r>
-              <a:rPr>
+              <a:rPr sz="1200">
                 <a:solidFill>
                   <a:srgbClr val="657422"/>
                 </a:solidFill>
@@ -9638,7 +9638,7 @@
             </a:r>
             <a:br/>
             <a:r>
-              <a:rPr>
+              <a:rPr sz="1200">
                 <a:solidFill>
                   <a:srgbClr val="5E5E5E"/>
                 </a:solidFill>
@@ -9648,7 +9648,7 @@
             </a:r>
             <a:br/>
             <a:r>
-              <a:rPr>
+              <a:rPr sz="1200">
                 <a:solidFill>
                   <a:srgbClr val="5E5E5E"/>
                 </a:solidFill>
@@ -9658,7 +9658,7 @@
             </a:r>
             <a:br/>
             <a:r>
-              <a:rPr>
+              <a:rPr sz="1200">
                 <a:solidFill>
                   <a:srgbClr val="5E5E5E"/>
                 </a:solidFill>
@@ -9668,7 +9668,7 @@
             </a:r>
             <a:br/>
             <a:r>
-              <a:rPr>
+              <a:rPr sz="1200">
                 <a:solidFill>
                   <a:srgbClr val="5E5E5E"/>
                 </a:solidFill>
@@ -9678,7 +9678,7 @@
             </a:r>
             <a:br/>
             <a:r>
-              <a:rPr>
+              <a:rPr sz="1200">
                 <a:solidFill>
                   <a:srgbClr val="5E5E5E"/>
                 </a:solidFill>
@@ -9688,7 +9688,7 @@
             </a:r>
             <a:br/>
             <a:r>
-              <a:rPr>
+              <a:rPr sz="1200">
                 <a:solidFill>
                   <a:srgbClr val="5E5E5E"/>
                 </a:solidFill>
@@ -9698,7 +9698,7 @@
             </a:r>
             <a:br/>
             <a:r>
-              <a:rPr>
+              <a:rPr sz="1200">
                 <a:solidFill>
                   <a:srgbClr val="5E5E5E"/>
                 </a:solidFill>
@@ -9709,7 +9709,7 @@
             <a:br/>
             <a:br/>
             <a:r>
-              <a:rPr>
+              <a:rPr sz="1200">
                 <a:solidFill>
                   <a:srgbClr val="4758AB"/>
                 </a:solidFill>
@@ -9718,7 +9718,7 @@
               <a:t>author</a:t>
             </a:r>
             <a:r>
-              <a:rPr>
+              <a:rPr sz="1200">
                 <a:solidFill>
                   <a:srgbClr val="003B4F"/>
                 </a:solidFill>
@@ -9727,7 +9727,7 @@
               <a:t>:</a:t>
             </a:r>
             <a:r>
-              <a:rPr>
+              <a:rPr sz="1200">
                 <a:solidFill>
                   <a:srgbClr val="657422"/>
                 </a:solidFill>
@@ -9737,7 +9737,7 @@
             </a:r>
             <a:br/>
             <a:r>
-              <a:rPr>
+              <a:rPr sz="1200">
                 <a:solidFill>
                   <a:srgbClr val="4758AB"/>
                 </a:solidFill>
@@ -9746,7 +9746,7 @@
               <a:t>date</a:t>
             </a:r>
             <a:r>
-              <a:rPr>
+              <a:rPr sz="1200">
                 <a:solidFill>
                   <a:srgbClr val="003B4F"/>
                 </a:solidFill>
@@ -9755,7 +9755,7 @@
               <a:t>:</a:t>
             </a:r>
             <a:r>
-              <a:rPr>
+              <a:rPr sz="1200">
                 <a:solidFill>
                   <a:srgbClr val="657422"/>
                 </a:solidFill>
@@ -9765,7 +9765,7 @@
             </a:r>
             <a:br/>
             <a:r>
-              <a:rPr>
+              <a:rPr sz="1200">
                 <a:solidFill>
                   <a:srgbClr val="AD0000"/>
                 </a:solidFill>
@@ -9788,7 +9788,7 @@
               <a:t>Adding or changing the format to </a:t>
             </a:r>
             <a:r>
-              <a:rPr>
+              <a:rPr sz="1200">
                 <a:latin typeface="Consolas"/>
               </a:rPr>
               <a:t>html</a:t>
@@ -10311,7 +10311,7 @@
               <a:t>You need to reference a BibTex file in the YAML front-matter </a:t>
             </a:r>
             <a:r>
-              <a:rPr>
+              <a:rPr sz="1200">
                 <a:latin typeface="Consolas"/>
               </a:rPr>
               <a:t>bibliography: references.bib</a:t>
@@ -10348,7 +10348,7 @@
               <a:t>You can cite by using </a:t>
             </a:r>
             <a:r>
-              <a:rPr>
+              <a:rPr sz="1200">
                 <a:latin typeface="Consolas"/>
               </a:rPr>
               <a:t>[@citation-name]</a:t>
@@ -10397,7 +10397,7 @@
               <a:t>Generating footnotes is also easy. Using </a:t>
             </a:r>
             <a:r>
-              <a:rPr>
+              <a:rPr sz="1200">
                 <a:latin typeface="Consolas"/>
               </a:rPr>
               <a:t>[^ref]</a:t>
@@ -10407,7 +10407,7 @@
               <a:t> links to a footnote, and </a:t>
             </a:r>
             <a:r>
-              <a:rPr>
+              <a:rPr sz="1200">
                 <a:latin typeface="Consolas"/>
               </a:rPr>
               <a:t>[^ref: content of the footnote]</a:t>
@@ -10537,7 +10537,7 @@
               <a:t>To tag it, use the following syntax: </a:t>
             </a:r>
             <a:r>
-              <a:rPr>
+              <a:rPr sz="1200">
                 <a:latin typeface="Consolas"/>
               </a:rPr>
               <a:t>#prefix-name</a:t>
@@ -10577,7 +10577,7 @@
               <a:buNone/>
             </a:pPr>
             <a:r>
-              <a:rPr>
+              <a:rPr sz="1200">
                 <a:solidFill>
                   <a:srgbClr val="AD0000"/>
                 </a:solidFill>
@@ -10586,7 +10586,7 @@
               <a:t>![Elephant](elephant.png)</a:t>
             </a:r>
             <a:r>
-              <a:rPr>
+              <a:rPr sz="1200">
                 <a:solidFill>
                   <a:srgbClr val="003B4F"/>
                 </a:solidFill>
@@ -10609,7 +10609,7 @@
               <a:buNone/>
             </a:pPr>
             <a:r>
-              <a:rPr>
+              <a:rPr sz="1200">
                 <a:solidFill>
                   <a:srgbClr val="003B4F"/>
                 </a:solidFill>
@@ -10742,7 +10742,7 @@
               <a:t>You can also write books with quarto. From the same collection of </a:t>
             </a:r>
             <a:r>
-              <a:rPr>
+              <a:rPr sz="1200">
                 <a:latin typeface="Consolas"/>
               </a:rPr>
               <a:t>.qmd</a:t>
@@ -11694,7 +11694,7 @@
               <a:t>Some writers can use R, some can use Python, their content can link to each other as long as they’re in different </a:t>
             </a:r>
             <a:r>
-              <a:rPr>
+              <a:rPr sz="1200">
                 <a:latin typeface="Consolas"/>
               </a:rPr>
               <a:t>.qmd</a:t>
@@ -11941,7 +11941,7 @@
           <a:p>
             <a:pPr lvl="1"/>
             <a:r>
-              <a:rPr>
+              <a:rPr sz="1200">
                 <a:latin typeface="Consolas"/>
               </a:rPr>
               <a:t>\usepackage{ifthen}</a:t>
@@ -11950,7 +11950,7 @@
           <a:p>
             <a:pPr lvl="1"/>
             <a:r>
-              <a:rPr>
+              <a:rPr sz="1200">
                 <a:latin typeface="Consolas"/>
               </a:rPr>
               <a:t>@for</a:t>
@@ -11960,7 +11960,7 @@
               <a:t>, </a:t>
             </a:r>
             <a:r>
-              <a:rPr>
+              <a:rPr sz="1200">
                 <a:latin typeface="Consolas"/>
               </a:rPr>
               <a:t>@while</a:t>
@@ -12395,7 +12395,7 @@
               <a:t>With some scripting, you can use </a:t>
             </a:r>
             <a:r>
-              <a:rPr>
+              <a:rPr sz="1200">
                 <a:hlinkClick r:id="rId3"/>
                 <a:latin typeface="Consolas"/>
               </a:rPr>
@@ -12517,7 +12517,7 @@
               <a:t>All you need to use Quarto is to add some YAML (mostly simplified Pandoc configurations) to a </a:t>
             </a:r>
             <a:r>
-              <a:rPr>
+              <a:rPr sz="1200">
                 <a:latin typeface="Consolas"/>
               </a:rPr>
               <a:t>.qmd</a:t>
@@ -12532,7 +12532,7 @@
               <a:buNone/>
             </a:pPr>
             <a:r>
-              <a:rPr>
+              <a:rPr sz="1200">
                 <a:latin typeface="Consolas"/>
               </a:rPr>
               <a:t>ipynb</a:t>
@@ -12542,7 +12542,7 @@
               <a:t> + YAML = </a:t>
             </a:r>
             <a:r>
-              <a:rPr>
+              <a:rPr sz="1200">
                 <a:latin typeface="Consolas"/>
               </a:rPr>
               <a:t>.qmd</a:t>
@@ -12561,7 +12561,7 @@
               <a:t>This keeps the configuration and content in the same file. You can then render the outputs using </a:t>
             </a:r>
             <a:r>
-              <a:rPr>
+              <a:rPr sz="1200">
                 <a:latin typeface="Consolas"/>
               </a:rPr>
               <a:t>quarto render &lt;file.qmd&gt;</a:t>
@@ -12926,299 +12926,4 @@
   </a:objectDefaults>
   <a:extraClrSchemeLst/>
 </a:theme>
-</file>
-
-<file path=ppt/theme/theme2.xml><?xml version="1.0" encoding="utf-8"?>
-<a:theme xmlns:a="http://schemas.openxmlformats.org/drawingml/2006/main" name="Office Theme">
-  <a:themeElements>
-    <a:clrScheme name="Office">
-      <a:dk1>
-        <a:sysClr val="windowText" lastClr="000000"/>
-      </a:dk1>
-      <a:lt1>
-        <a:sysClr val="window" lastClr="FFFFFF"/>
-      </a:lt1>
-      <a:dk2>
-        <a:srgbClr val="44546A"/>
-      </a:dk2>
-      <a:lt2>
-        <a:srgbClr val="E7E6E6"/>
-      </a:lt2>
-      <a:accent1>
-        <a:srgbClr val="4472C4"/>
-      </a:accent1>
-      <a:accent2>
-        <a:srgbClr val="ED7D31"/>
-      </a:accent2>
-      <a:accent3>
-        <a:srgbClr val="A5A5A5"/>
-      </a:accent3>
-      <a:accent4>
-        <a:srgbClr val="FFC000"/>
-      </a:accent4>
-      <a:accent5>
-        <a:srgbClr val="5B9BD5"/>
-      </a:accent5>
-      <a:accent6>
-        <a:srgbClr val="70AD47"/>
-      </a:accent6>
-      <a:hlink>
-        <a:srgbClr val="0563C1"/>
-      </a:hlink>
-      <a:folHlink>
-        <a:srgbClr val="954F72"/>
-      </a:folHlink>
-    </a:clrScheme>
-    <a:fontScheme name="Office">
-      <a:majorFont>
-        <a:latin typeface="Calibri Light" panose="020F0302020204030204"/>
-        <a:ea typeface=""/>
-        <a:cs typeface=""/>
-        <a:font script="Jpan" typeface="游ゴシック Light"/>
-        <a:font script="Hang" typeface="맑은 고딕"/>
-        <a:font script="Hans" typeface="等线 Light"/>
-        <a:font script="Hant" typeface="新細明體"/>
-        <a:font script="Arab" typeface="Times New Roman"/>
-        <a:font script="Hebr" typeface="Times New Roman"/>
-        <a:font script="Thai" typeface="Angsana New"/>
-        <a:font script="Ethi" typeface="Nyala"/>
-        <a:font script="Beng" typeface="Vrinda"/>
-        <a:font script="Gujr" typeface="Shruti"/>
-        <a:font script="Khmr" typeface="MoolBoran"/>
-        <a:font script="Knda" typeface="Tunga"/>
-        <a:font script="Guru" typeface="Raavi"/>
-        <a:font script="Cans" typeface="Euphemia"/>
-        <a:font script="Cher" typeface="Plantagenet Cherokee"/>
-        <a:font script="Yiii" typeface="Microsoft Yi Baiti"/>
-        <a:font script="Tibt" typeface="Microsoft Himalaya"/>
-        <a:font script="Thaa" typeface="MV Boli"/>
-        <a:font script="Deva" typeface="Mangal"/>
-        <a:font script="Telu" typeface="Gautami"/>
-        <a:font script="Taml" typeface="Latha"/>
-        <a:font script="Syrc" typeface="Estrangelo Edessa"/>
-        <a:font script="Orya" typeface="Kalinga"/>
-        <a:font script="Mlym" typeface="Kartika"/>
-        <a:font script="Laoo" typeface="DokChampa"/>
-        <a:font script="Sinh" typeface="Iskoola Pota"/>
-        <a:font script="Mong" typeface="Mongolian Baiti"/>
-        <a:font script="Viet" typeface="Times New Roman"/>
-        <a:font script="Uigh" typeface="Microsoft Uighur"/>
-        <a:font script="Geor" typeface="Sylfaen"/>
-        <a:font script="Armn" typeface="Arial"/>
-        <a:font script="Bugi" typeface="Leelawadee UI"/>
-        <a:font script="Bopo" typeface="Microsoft JhengHei"/>
-        <a:font script="Java" typeface="Javanese Text"/>
-        <a:font script="Lisu" typeface="Segoe UI"/>
-        <a:font script="Mymr" typeface="Myanmar Text"/>
-        <a:font script="Nkoo" typeface="Ebrima"/>
-        <a:font script="Olck" typeface="Nirmala UI"/>
-        <a:font script="Osma" typeface="Ebrima"/>
-        <a:font script="Phag" typeface="Phagspa"/>
-        <a:font script="Syrn" typeface="Estrangelo Edessa"/>
-        <a:font script="Syrj" typeface="Estrangelo Edessa"/>
-        <a:font script="Syre" typeface="Estrangelo Edessa"/>
-        <a:font script="Sora" typeface="Nirmala UI"/>
-        <a:font script="Tale" typeface="Microsoft Tai Le"/>
-        <a:font script="Talu" typeface="Microsoft New Tai Lue"/>
-        <a:font script="Tfng" typeface="Ebrima"/>
-      </a:majorFont>
-      <a:minorFont>
-        <a:latin typeface="Calibri" panose="020F0502020204030204"/>
-        <a:ea typeface=""/>
-        <a:cs typeface=""/>
-        <a:font script="Jpan" typeface="游ゴシック"/>
-        <a:font script="Hang" typeface="맑은 고딕"/>
-        <a:font script="Hans" typeface="等线"/>
-        <a:font script="Hant" typeface="新細明體"/>
-        <a:font script="Arab" typeface="Arial"/>
-        <a:font script="Hebr" typeface="Arial"/>
-        <a:font script="Thai" typeface="Cordia New"/>
-        <a:font script="Ethi" typeface="Nyala"/>
-        <a:font script="Beng" typeface="Vrinda"/>
-        <a:font script="Gujr" typeface="Shruti"/>
-        <a:font script="Khmr" typeface="DaunPenh"/>
-        <a:font script="Knda" typeface="Tunga"/>
-        <a:font script="Guru" typeface="Raavi"/>
-        <a:font script="Cans" typeface="Euphemia"/>
-        <a:font script="Cher" typeface="Plantagenet Cherokee"/>
-        <a:font script="Yiii" typeface="Microsoft Yi Baiti"/>
-        <a:font script="Tibt" typeface="Microsoft Himalaya"/>
-        <a:font script="Thaa" typeface="MV Boli"/>
-        <a:font script="Deva" typeface="Mangal"/>
-        <a:font script="Telu" typeface="Gautami"/>
-        <a:font script="Taml" typeface="Latha"/>
-        <a:font script="Syrc" typeface="Estrangelo Edessa"/>
-        <a:font script="Orya" typeface="Kalinga"/>
-        <a:font script="Mlym" typeface="Kartika"/>
-        <a:font script="Laoo" typeface="DokChampa"/>
-        <a:font script="Sinh" typeface="Iskoola Pota"/>
-        <a:font script="Mong" typeface="Mongolian Baiti"/>
-        <a:font script="Viet" typeface="Arial"/>
-        <a:font script="Uigh" typeface="Microsoft Uighur"/>
-        <a:font script="Geor" typeface="Sylfaen"/>
-        <a:font script="Armn" typeface="Arial"/>
-        <a:font script="Bugi" typeface="Leelawadee UI"/>
-        <a:font script="Bopo" typeface="Microsoft JhengHei"/>
-        <a:font script="Java" typeface="Javanese Text"/>
-        <a:font script="Lisu" typeface="Segoe UI"/>
-        <a:font script="Mymr" typeface="Myanmar Text"/>
-        <a:font script="Nkoo" typeface="Ebrima"/>
-        <a:font script="Olck" typeface="Nirmala UI"/>
-        <a:font script="Osma" typeface="Ebrima"/>
-        <a:font script="Phag" typeface="Phagspa"/>
-        <a:font script="Syrn" typeface="Estrangelo Edessa"/>
-        <a:font script="Syrj" typeface="Estrangelo Edessa"/>
-        <a:font script="Syre" typeface="Estrangelo Edessa"/>
-        <a:font script="Sora" typeface="Nirmala UI"/>
-        <a:font script="Tale" typeface="Microsoft Tai Le"/>
-        <a:font script="Talu" typeface="Microsoft New Tai Lue"/>
-        <a:font script="Tfng" typeface="Ebrima"/>
-      </a:minorFont>
-    </a:fontScheme>
-    <a:fmtScheme name="Office">
-      <a:fillStyleLst>
-        <a:solidFill>
-          <a:schemeClr val="phClr"/>
-        </a:solidFill>
-        <a:gradFill rotWithShape="1">
-          <a:gsLst>
-            <a:gs pos="0">
-              <a:schemeClr val="phClr">
-                <a:lumMod val="110000"/>
-                <a:satMod val="105000"/>
-                <a:tint val="67000"/>
-              </a:schemeClr>
-            </a:gs>
-            <a:gs pos="50000">
-              <a:schemeClr val="phClr">
-                <a:lumMod val="105000"/>
-                <a:satMod val="103000"/>
-                <a:tint val="73000"/>
-              </a:schemeClr>
-            </a:gs>
-            <a:gs pos="100000">
-              <a:schemeClr val="phClr">
-                <a:lumMod val="105000"/>
-                <a:satMod val="109000"/>
-                <a:tint val="81000"/>
-              </a:schemeClr>
-            </a:gs>
-          </a:gsLst>
-          <a:lin ang="5400000" scaled="0"/>
-        </a:gradFill>
-        <a:gradFill rotWithShape="1">
-          <a:gsLst>
-            <a:gs pos="0">
-              <a:schemeClr val="phClr">
-                <a:satMod val="103000"/>
-                <a:lumMod val="102000"/>
-                <a:tint val="94000"/>
-              </a:schemeClr>
-            </a:gs>
-            <a:gs pos="50000">
-              <a:schemeClr val="phClr">
-                <a:satMod val="110000"/>
-                <a:lumMod val="100000"/>
-                <a:shade val="100000"/>
-              </a:schemeClr>
-            </a:gs>
-            <a:gs pos="100000">
-              <a:schemeClr val="phClr">
-                <a:lumMod val="99000"/>
-                <a:satMod val="120000"/>
-                <a:shade val="78000"/>
-              </a:schemeClr>
-            </a:gs>
-          </a:gsLst>
-          <a:lin ang="5400000" scaled="0"/>
-        </a:gradFill>
-      </a:fillStyleLst>
-      <a:lnStyleLst>
-        <a:ln w="6350" cap="flat" cmpd="sng" algn="ctr">
-          <a:solidFill>
-            <a:schemeClr val="phClr"/>
-          </a:solidFill>
-          <a:prstDash val="solid"/>
-          <a:miter lim="800000"/>
-        </a:ln>
-        <a:ln w="12700" cap="flat" cmpd="sng" algn="ctr">
-          <a:solidFill>
-            <a:schemeClr val="phClr"/>
-          </a:solidFill>
-          <a:prstDash val="solid"/>
-          <a:miter lim="800000"/>
-        </a:ln>
-        <a:ln w="19050" cap="flat" cmpd="sng" algn="ctr">
-          <a:solidFill>
-            <a:schemeClr val="phClr"/>
-          </a:solidFill>
-          <a:prstDash val="solid"/>
-          <a:miter lim="800000"/>
-        </a:ln>
-      </a:lnStyleLst>
-      <a:effectStyleLst>
-        <a:effectStyle>
-          <a:effectLst/>
-        </a:effectStyle>
-        <a:effectStyle>
-          <a:effectLst/>
-        </a:effectStyle>
-        <a:effectStyle>
-          <a:effectLst>
-            <a:outerShdw blurRad="57150" dist="19050" dir="5400000" algn="ctr" rotWithShape="0">
-              <a:srgbClr val="000000">
-                <a:alpha val="63000"/>
-              </a:srgbClr>
-            </a:outerShdw>
-          </a:effectLst>
-        </a:effectStyle>
-      </a:effectStyleLst>
-      <a:bgFillStyleLst>
-        <a:solidFill>
-          <a:schemeClr val="phClr"/>
-        </a:solidFill>
-        <a:solidFill>
-          <a:schemeClr val="phClr">
-            <a:tint val="95000"/>
-            <a:satMod val="170000"/>
-          </a:schemeClr>
-        </a:solidFill>
-        <a:gradFill rotWithShape="1">
-          <a:gsLst>
-            <a:gs pos="0">
-              <a:schemeClr val="phClr">
-                <a:tint val="93000"/>
-                <a:satMod val="150000"/>
-                <a:shade val="98000"/>
-                <a:lumMod val="102000"/>
-              </a:schemeClr>
-            </a:gs>
-            <a:gs pos="50000">
-              <a:schemeClr val="phClr">
-                <a:tint val="98000"/>
-                <a:satMod val="130000"/>
-                <a:shade val="90000"/>
-                <a:lumMod val="103000"/>
-              </a:schemeClr>
-            </a:gs>
-            <a:gs pos="100000">
-              <a:schemeClr val="phClr">
-                <a:shade val="63000"/>
-                <a:satMod val="120000"/>
-              </a:schemeClr>
-            </a:gs>
-          </a:gsLst>
-          <a:lin ang="5400000" scaled="0"/>
-        </a:gradFill>
-      </a:bgFillStyleLst>
-    </a:fmtScheme>
-  </a:themeElements>
-  <a:objectDefaults/>
-  <a:extraClrSchemeLst/>
-  <a:extLst>
-    <a:ext uri="{05A4C25C-085E-4340-85A3-A5531E510DB2}">
-      <thm15:themeFamily xmlns:thm15="http://schemas.microsoft.com/office/thememl/2012/main" name="Office Theme" id="{62F939B6-93AF-4DB8-9C6B-D6C7DFDC589F}" vid="{4A3C46E8-61CC-4603-A589-7422A47A8E4A}"/>
-    </a:ext>
-  </a:extLst>
-</a:theme>
 </file>
</xml_diff>